<commit_message>
Updated some examinations materials
</commit_message>
<xml_diff>
--- a/examination_material/Project Canvas.pptx
+++ b/examination_material/Project Canvas.pptx
@@ -276,7 +276,7 @@
   </inkml:definitions>
   <inkml:trace contextRef="#ctx0" brushRef="#br0">16 262 8320,'-2'-2'399,"0"0"0,1 0 0,-1 0 0,1-1 0,-1 1 0,1 0 0,0-1 0,0 1 0,-1-3-399,2 4 88,0 0 0,0 0 0,0-1 0,0 1 0,0 0 1,0-1-1,0 1 0,0 0 0,0 0 0,1-1 0,-1 1 1,1 0-1,-1 0 0,1 0 0,-1 0 0,1-1 0,0 1 1,-1 0-1,1 0 0,0 0 0,0 0 0,0 0-88,6-6 78,1 0 0,-1 1 0,1 0 0,0 0 0,1 1 0,0 0 0,-1 0 1,2 1-1,7-2-78,16-5 231,1 1 1,7 1-232,-29 6 109,93-16 775,53-1-884,61-11 636,-215 31-636,52-11-576,46-15 576,-66 14-613</inkml:trace>
   <inkml:trace contextRef="#ctx0" brushRef="#br0" timeOffset="618.246">273 82 4992,'1'-1'147,"-1"1"0,0-1 0,0 1 0,0-1 0,1 1 0,-1-1-1,0 1 1,1-1 0,-1 1 0,0-1 0,1 1 0,-1-1 0,1 1 0,-1-1 0,1 1 0,-1 0 0,1-1 0,-1 1-147,1 0 86,-1 0 0,0 0 1,0 0-1,1 0 0,-1 0 1,0 0-1,0 0 0,0 0 1,1 0-1,-1 0 0,0 1 1,0-1-1,1 0 0,-1 0 1,0 0-1,0 0 0,0 0 1,0 1-1,1-1 0,-1 0 1,0 0-1,0 0 0,0 1 1,0-1-1,0 0 0,0 0 0,1 0 1,-1 1-1,0-1-86,1 2 231,0 0-1,-1 0 0,1 1 1,-1-1-1,1 0 1,-1 1-1,0-1 1,1 1-231,-2 60 532,-2 0 0,-3 0 0,-2-1 1,-4 0-1,-10 31-532,22-92-25,-2 5-86,1-1-1,-1 0 1,0 0-1,0 0 1,-1 0 0,-2 4 111,1-5-704</inkml:trace>
-  <inkml:trace contextRef="#ctx0" brushRef="#br0" timeOffset="1385.863">333 114 7040,'-1'-3'368,"1"0"1,0 1 0,0-1 0,0 0-1,1 1 1,-1-1 0,1 0-1,-1 1 1,1-1 0,0 0-1,0 1 1,0-1 0,0 1-1,1-1-367,-2 3 26,1-1 0,0 0 0,-1 0 1,1 0-1,0 0 0,0 0 1,0 1-1,-1-1 0,1 0 1,0 1-1,0-1 0,0 1 1,0-1-1,0 1 0,1 0 1,-1-1-1,0 1 0,0 0 1,0 0-1,0-1 0,0 1 0,0 0 1,0 0-1,1 0 0,-1 0 1,0 1-1,0-1 0,0 0 1,0 0-1,0 1 0,0-1 1,0 1-1,0-1 0,1 1-27,1 1 8,-1-1-1,1 1 0,-1 0 1,0 0-1,1 0 0,-1 0 1,0 0-1,0 0 0,0 1 1,-1-1-1,1 1 0,0-1 1,-1 1-1,0 0 0,0-1 1,0 1-1,0 0 1,0 0-1,0 0 0,-1 0-7,3 11 222,-1-1 0,-1 0-1,0 12-221,-1-20 95,-1 40 357,-3-1 0,-1 1 0,-2-1 0,-10 34-452,14-66 208,0 0 0,-1 0 0,0-1 0,-5 10-208,9-21-5,0 0 1,0 0-1,0 0 1,0 0 0,0 0-1,0 1 1,0-1-1,0 0 1,0 0-1,0 0 1,-1 0-1,1 0 1,0 1-1,0-1 1,0 0 0,0 0-1,0 0 1,0 0-1,0 0 1,0 0-1,-1 0 1,1 0-1,0 1 1,0-1 0,0 0-1,0 0 1,0 0-1,0 0 1,-1 0-1,1 0 1,0 0-1,0 0 1,0 0-1,0 0 1,0 0 0,-1 0-1,1 0 1,0 0-1,0 0 5,-2-7-150,3-10-65,1 10 186,-1-1-1,2 1 0,-1 0 1,1 0-1,0 1 1,0-1-1,1 0 0,-1 1 1,2 0-1,-1 0 30,-1 2-12,1-1-1,0 1 1,-1 0 0,1 1-1,1-1 1,-1 1-1,0 0 1,1 0 0,0 0-1,0 1 1,0-1 0,0 1-1,0 0 1,0 1 12,-4 0-4,1 1 0,-1 0 1,0 0-1,1 0 0,-1-1 1,0 1-1,1 1 0,-1-1 1,0 0-1,1 0 0,-1 0 0,0 1 1,1-1-1,-1 1 0,0-1 1,0 1-1,0-1 0,1 1 0,-1 0 1,0-1-1,0 1 0,0 0 1,0 0-1,0 0 0,0 0 1,0 0-1,0 0 0,-1 0 0,1 0 1,0 1-1,-1-1 0,1 0 1,0 1 3,2 5 125,-1 1 0,1-1 1,-1 1-1,-1 0 0,1 3-125,0-2 125,2 10 92,-1-8-264,-1 0-1,0 0 0,-1 0 0,0 0 1,0 1-1,-1 0 48,0-12-43,0 1 1,0-1-1,0 0 0,0 0 1,0 0-1,0 0 0,0 1 1,0-1-1,0 0 0,0 0 1,0 0-1,0 0 0,0 1 1,0-1-1,0 0 0,0 0 1,0 0-1,0 0 0,0 0 1,0 1-1,-1-1 0,1 0 1,0 0-1,0 0 0,0 0 1,0 0-1,0 1 0,0-1 1,0 0-1,-1 0 0,1 0 1,0 0-1,0 0 0,0 0 1,0 0-1,0 0 0,-1 0 1,1 0-1,0 1 0,0-1 1,0 0-1,0 0 0,-1 0 1,1 0-1,0 0 0,0 0 1,0 0-1,0 0 0,-1 0 1,1 0-1,0-1 43,-4-3-1477</inkml:trace>
+  <inkml:trace contextRef="#ctx0" brushRef="#br0" timeOffset="1385.862">333 114 7040,'-1'-3'368,"1"0"1,0 1 0,0-1 0,0 0-1,1 1 1,-1-1 0,1 0-1,-1 1 1,1-1 0,0 0-1,0 1 1,0-1 0,0 1-1,1-1-367,-2 3 26,1-1 0,0 0 0,-1 0 1,1 0-1,0 0 0,0 0 1,0 1-1,-1-1 0,1 0 1,0 1-1,0-1 0,0 1 1,0-1-1,0 1 0,1 0 1,-1-1-1,0 1 0,0 0 1,0 0-1,0-1 0,0 1 0,0 0 1,0 0-1,1 0 0,-1 0 1,0 1-1,0-1 0,0 0 1,0 0-1,0 1 0,0-1 1,0 1-1,0-1 0,1 1-27,1 1 8,-1-1-1,1 1 0,-1 0 1,0 0-1,1 0 0,-1 0 1,0 0-1,0 0 0,0 1 1,-1-1-1,1 1 0,0-1 1,-1 1-1,0 0 0,0-1 1,0 1-1,0 0 1,0 0-1,0 0 0,-1 0-7,3 11 222,-1-1 0,-1 0-1,0 12-221,-1-20 95,-1 40 357,-3-1 0,-1 1 0,-2-1 0,-10 34-452,14-66 208,0 0 0,-1 0 0,0-1 0,-5 10-208,9-21-5,0 0 1,0 0-1,0 0 1,0 0 0,0 0-1,0 1 1,0-1-1,0 0 1,0 0-1,0 0 1,-1 0-1,1 0 1,0 1-1,0-1 1,0 0 0,0 0-1,0 0 1,0 0-1,0 0 1,0 0-1,-1 0 1,1 0-1,0 1 1,0-1 0,0 0-1,0 0 1,0 0-1,0 0 1,-1 0-1,1 0 1,0 0-1,0 0 1,0 0-1,0 0 1,0 0 0,-1 0-1,1 0 1,0 0-1,0 0 5,-2-7-150,3-10-65,1 10 186,-1-1-1,2 1 0,-1 0 1,1 0-1,0 1 1,0-1-1,1 0 0,-1 1 1,2 0-1,-1 0 30,-1 2-12,1-1-1,0 1 1,-1 0 0,1 1-1,1-1 1,-1 1-1,0 0 1,1 0 0,0 0-1,0 1 1,0-1 0,0 1-1,0 0 1,0 1 12,-4 0-4,1 1 0,-1 0 1,0 0-1,1 0 0,-1-1 1,0 1-1,1 1 0,-1-1 1,0 0-1,1 0 0,-1 0 0,0 1 1,1-1-1,-1 1 0,0-1 1,0 1-1,0-1 0,1 1 0,-1 0 1,0-1-1,0 1 0,0 0 1,0 0-1,0 0 0,0 0 1,0 0-1,0 0 0,-1 0 0,1 0 1,0 1-1,-1-1 0,1 0 1,0 1 3,2 5 125,-1 1 0,1-1 1,-1 1-1,-1 0 0,1 3-125,0-2 125,2 10 92,-1-8-264,-1 0-1,0 0 0,-1 0 0,0 0 1,0 1-1,-1 0 48,0-12-43,0 1 1,0-1-1,0 0 0,0 0 1,0 0-1,0 0 0,0 1 1,0-1-1,0 0 0,0 0 1,0 0-1,0 0 0,0 1 1,0-1-1,0 0 0,0 0 1,0 0-1,0 0 0,0 0 1,0 1-1,-1-1 0,1 0 1,0 0-1,0 0 0,0 0 1,0 0-1,0 1 0,0-1 1,0 0-1,-1 0 0,1 0 1,0 0-1,0 0 0,0 0 1,0 0-1,0 0 0,-1 0 1,1 0-1,0 1 0,0-1 1,0 0-1,0 0 0,-1 0 1,1 0-1,0 0 0,0 0 1,0 0-1,0 0 0,-1 0 1,1 0-1,0-1 43,-4-3-1477</inkml:trace>
   <inkml:trace contextRef="#ctx0" brushRef="#br0" timeOffset="1954.514">579 490 7040,'1'0'178,"-1"0"0,0 1 1,0-1-1,0 0 0,1 0 1,-1 1-1,0-1 0,0 0 0,1 1 1,-1-1-1,0 0 0,0 0 1,1 0-1,-1 1 0,0-1 0,1 0 1,-1 0-1,0 0 0,1 0 1,-1 0-1,1 0 0,-1 0 0,0 0 1,1 1-1,-1-1 0,0 0 1,1-1-1,-1 1-178,14 1 569,-12-1-344,3 0-221,-1-1 0,1 1 1,0-1-1,-1 0 0,0 0 0,1-1 0,-1 1 0,0-1 0,1 0 0,-1 0 0,0 0 0,-1-1 0,1 1 0,0-1 0,1-1-4,-3 2 26,-1 1 0,1-1-1,-1 0 1,1 1-1,-1-1 1,0 0 0,0 0-1,0 0 1,0 0-1,0 0 1,0 0-1,0 0 1,-1 0 0,1 0-1,-1 0 1,1-1-1,-1 1 1,0 0 0,0 0-1,0 0 1,0-1-1,0 1 1,-1 0 0,1 0-1,-1 0 1,1 0-1,-1-1 1,0 1-1,0 0 1,0 0 0,0 0-1,-1-1-25,1 1 15,0 1 0,0-1-1,0 1 1,0 0 0,0-1 0,0 1-1,-1 0 1,1 0 0,0 0-1,-1 0 1,1 0 0,-1 0 0,1 0-1,-1 0 1,1 1 0,-1-1 0,0 1-1,1-1 1,-1 1 0,0-1-1,1 1 1,-1 0 0,0 0 0,0 0-1,1 0 1,-1 0 0,0 0-1,1 1 1,-1-1 0,0 0 0,1 1-1,-1-1 1,0 1 0,1 0 0,-1-1-1,0 2-14,-1-1 18,1 1 0,-1 0 0,0 0 0,0 0 0,1 0 0,-1 0 0,1 1 0,0-1 0,-1 1 0,1-1 0,0 1 0,1 0 0,-1 0 0,0 0 0,1 0 0,0 0 0,0 0 0,-1 2-18,1 1 76,1 0 1,-1 0 0,1-1 0,0 1 0,1 0 0,-1 0 0,1 0 0,0-1 0,1 1-1,-1-1 1,1 1 0,0-1 0,1 3-77,2 1-201,0 0-1,0 0 1,1 0-1,0-1 1,1 0-1,-1 0 1,3 0 201,-6-5-651,0-3-47</inkml:trace>
   <inkml:trace contextRef="#ctx0" brushRef="#br0" timeOffset="2342.699">775 387 8704,'-1'2'370,"0"0"-1,1 0 1,-1 0 0,1-1 0,-1 1 0,1 0-1,-1 0 1,1 0 0,0 0 0,0 0 0,0 0-370,0 5 224,1 0 0,0 0 0,1 0 0,0 2-224,2 7 524,-1 2-335,2 0 1,0-1 0,1 0 0,0 0 0,3 2-190,-8-54 1454,0 22-1415,-1-3-148,2 1 1,0 0-1,2-4 109,-3 13-169,0 1 1,1 1-1,-1-1 0,1 0 1,1 0-1,-1 0 0,0 1 1,1 0-1,0-1 1,0 1-1,3-2 169,3-2-1077</inkml:trace>
   <inkml:trace contextRef="#ctx0" brushRef="#br0" timeOffset="3115.732">977 398 7680,'0'1'133,"-1"-1"1,1 0-1,0 0 1,-1 1-1,1-1 1,0 0-1,-1 1 0,1-1 1,0 0-1,-1 1 1,1-1-1,0 0 1,0 1-1,-1-1 1,1 1-1,0-1 1,0 0-1,0 1 1,0-1-1,0 1 1,0-1-1,0 1 0,0-1 1,0 0-1,0 1 1,0-1-1,0 1 1,0-1-1,0 1 1,0-1-1,0 1 1,0-1-1,0 0-133,3 21 493,-2-18-281,4 23 192,-2-16-190,0 1-1,-2-1 1,1 1-1,-1 0 1,-1-1-1,1 1 1,-2 7-214,1-18 8,0 0 1,-1 0 0,1 0-1,0 0 1,0-1 0,0 1-1,0 0 1,0 0 0,0 0 0,0 0-1,0 0 1,0 0 0,0 0-1,0 0 1,0 0 0,0 0-1,-1 0 1,1 0 0,0 0-1,0 1 1,0-1 0,0 0 0,0 0-1,0 0 1,0 0 0,0 0-1,0 0 1,0 0 0,0 0-1,0 0 1,0 0 0,0 0 0,0 0-1,0 0 1,0 0 0,0 0-1,-1 0 1,1 0 0,0 0-1,0 0 1,0 0 0,0 1 0,0-1-1,0 0 1,0 0 0,0 0-1,0 0 1,0 0 0,0 0-1,0 0 1,0 0 0,0 0-1,0 0 1,0 0 0,0 0 0,0 0-1,0 1 1,0-1 0,0 0-1,1 0 1,-1 0 0,0 0-1,0 0 1,0 0 0,0 0-9,-2-7 257,0-12-434,2 2-180,1 0 0,2-14 357,-2 26 1,0-1 0,0 0 0,1 1 0,0 0 0,0-1 0,0 1 0,0 0 0,1 0 0,0 0 0,2-2-1,-5 7-4,0 0-1,0-1 1,1 1-1,-1 0 1,0 0 0,0-1-1,1 1 1,-1 0 0,0-1-1,0 1 1,1 0-1,-1 0 1,0 0 0,1-1-1,-1 1 1,0 0 0,1 0-1,-1 0 1,1 0-1,-1 0 1,0 0 0,1 0-1,-1-1 1,1 1 0,-1 0-1,0 0 1,1 1-1,-1-1 5,1 0 2,0 0-1,-1 1 0,1-1 0,-1 1 0,1-1 1,-1 1-1,1-1 0,-1 1 0,0-1 0,1 1 1,-1-1-1,0 1 0,1-1 0,-1 1 0,0 0-1,8 28 244,-7-26-191,3 22 334,-1-10-150,0 0 0,0 0 1,7 13-238,-4-45-902,-6 17 869,3-13-74,1 1-1,0 0 1,1 0 0,0 0 0,1-1 107,-4 10 36,-1 1 1,1-1 0,0 1-1,0-1 1,0 1 0,0 0-1,0 0 1,1-1 0,-1 2-1,1-1 1,0 0-37,-1 1 1,-1 0 0,1 0 1,0 1-1,0-1 0,-1 1 0,1-1 0,0 1 0,0 0 1,0 0-1,0 0 0,-1 0 0,1 0 0,0 0 0,0 0 1,0 1-1,-1-1 0,1 1 0,0-1 0,1 2-1,1-1 10,-1 1-1,1 1 0,-1-1 1,0 0-1,1 1 1,-2 0-1,1 0 0,0 0 1,0 0-1,-1 0 1,1 0-1,-1 1 0,1 2-9,3 5-103,0 1 1,-1 0-1,2 9 103,-4-12-187,-2-2-170</inkml:trace>
@@ -418,7 +418,7 @@
     </inkml:brush>
   </inkml:definitions>
   <inkml:trace contextRef="#ctx0" brushRef="#br0">118 224 6016,'0'-1'204,"0"0"0,-1 0 0,1 0 0,-1 0 0,0 0 0,1 0 0,-1 0 0,0 0 0,0 0 0,1 1 0,-1-1 0,0 0 0,0 0 0,0 1 0,0-1 0,0 1 0,0-1 1,0 1-1,0-1 0,0 1 0,0 0 0,-1-1 0,1 1 0,-1 0-204,0 0 52,-1 1 0,1 0 0,-1 0 0,1 0 1,0 0-1,0 0 0,-1 0 0,1 1 0,0-1 0,-1 2-52,-4 2 43,0 0 0,0 0 1,1 1-1,0 0 0,0 0 0,1 1 0,-1-1 0,-3 8-43,8-12 33,-1 1-1,1-1 1,0 0 0,0 1 0,0-1 0,0 1-1,1 0 1,-1-1 0,1 1 0,-1 0 0,1-1 0,0 1-1,0 0 1,0 0 0,0-1 0,1 1 0,-1 0-1,1-1 1,-1 1 0,1-1 0,0 1 0,0 0-1,0-1 1,1 0 0,-1 1 0,1-1 0,-1 0-1,1 0 1,1 2-33,-2-3 12,0 0-1,0 0 1,0 0-1,0 0 1,0 0-1,0 0 0,1-1 1,-1 1-1,0 0 1,1 0-1,-1-1 1,0 1-1,1-1 1,-1 0-1,0 1 0,1-1 1,-1 0-1,1 0 1,-1 0-1,1 0 1,-1 0-12,2 0-9,0-1 1,0 1 0,-1-1 0,1 0 0,0 0-1,-1 0 1,1 0 0,-1-1 0,1 1 0,1-2 8,3-2-79,-1 0 1,0-1 0,0 0 0,-1 0-1,1 0 1,-1 0 0,1-4 78,1-2-573,-1 0-1,-1 0 1,0 0-1,-1-1 1,0 0-1,-1 0 1,-1 0 0,0 0-1,0-13 574,-1 12 419,-1 1 0,-1-1 0,0-5-419,-4 7 2114,5 12-2071,0-1 1,0 1-1,0 0 1,0 0-1,0 0 1,-1 0 0,1-1-1,0 1 1,0 0-1,0 0 1,-1 0-1,1 0 1,0 0-1,0 0 1,0 0 0,-1 0-1,1 0 1,0 0-1,0 0 1,-1 0-1,1 0 1,0 0-1,0 0 1,0 0-1,-1 0 1,1 0 0,0 0-1,0 0 1,-1 0-1,1 0 1,0 0-44,-1 1 57,0 0 0,0-1 0,0 1 0,0 0 0,1 0 0,-1 0-1,0 0 1,0 0 0,1 0 0,-1 0 0,1 0 0,-1 0 0,1 1 0,-1-1 0,1 0 0,0 0 0,0 1-57,-7 26 36,2 0 0,1 0-1,2 0 1,1 1 0,1-1 0,1 1 0,2 7-36,0-21-251,0-4-10</inkml:trace>
-  <inkml:trace contextRef="#ctx0" brushRef="#br0" timeOffset="424.901">215 247 4224,'-2'2'667,"-1"1"-1,1 0 1,0-1 0,0 1-1,0 0 1,1 0 0,-1 0-1,0 3-666,-8 28 1728,10-32-1677,0 1 1,0 0-1,0-1 1,0 1-1,0 0 0,1 0 1,-1-1-1,1 1 1,0 0-1,-1-1 0,1 1 1,1-1-1,-1 1 1,0-1-1,1 0 0,-1 1 1,1-1-1,-1 0 1,1 0-1,0 0 0,0 0 1,0 0-1,0-1 0,1 1 1,-1-1-1,1 1-51,-1 0 25,1-1 0,-1 0 0,0 0-1,1 1 1,-1-2 0,1 1 0,-1 0-1,1-1 1,0 1 0,-1-1 0,1 1 0,0-1-1,-1 0 1,1 0 0,0-1 0,-1 1-1,1 0 1,-1-1 0,1 0 0,0 0 0,-1 1-1,0-1 1,1-1 0,-1 1 0,1 0-1,-1-1 1,0 1-25,2-2 40,-1 0 0,0 0 0,0 0 0,-1-1 0,1 1 0,-1-1 0,1 1 0,-1-1 0,0 0 0,0 0 0,-1 0 0,1 0 0,-1 0 0,0 0 0,0-3-40,0 5-5,-1 0 1,0 0-1,0 1 0,0-1 1,0 0-1,0 0 0,0 0 1,-1 0-1,1 0 0,-1 0 1,1 0-1,-1 1 1,0-1-1,1 0 0,-1 0 1,0 1-1,0-1 0,0 1 1,0-1-1,-1 1 0,1-1 1,0 1-1,-1-1 1,1 1-1,-1 0 0,1 0 1,-1 0-1,0 0 0,1 0 1,-1 0-1,0 0 0,0 1 1,1-1-1,-1 1 1,-1-1 4,-11-2-166,0 1-52</inkml:trace>
+  <inkml:trace contextRef="#ctx0" brushRef="#br0" timeOffset="424.9">215 247 4224,'-2'2'667,"-1"1"-1,1 0 1,0-1 0,0 1-1,0 0 1,1 0 0,-1 0-1,0 3-666,-8 28 1728,10-32-1677,0 1 1,0 0-1,0-1 1,0 1-1,0 0 0,1 0 1,-1-1-1,1 1 1,0 0-1,-1-1 0,1 1 1,1-1-1,-1 1 1,0-1-1,1 0 0,-1 1 1,1-1-1,-1 0 1,1 0-1,0 0 0,0 0 1,0 0-1,0-1 0,1 1 1,-1-1-1,1 1-51,-1 0 25,1-1 0,-1 0 0,0 0-1,1 1 1,-1-2 0,1 1 0,-1 0-1,1-1 1,0 1 0,-1-1 0,1 1 0,0-1-1,-1 0 1,1 0 0,0-1 0,-1 1-1,1 0 1,-1-1 0,1 0 0,0 0 0,-1 1-1,0-1 1,1-1 0,-1 1 0,1 0-1,-1-1 1,0 1-25,2-2 40,-1 0 0,0 0 0,0 0 0,-1-1 0,1 1 0,-1-1 0,1 1 0,-1-1 0,0 0 0,0 0 0,-1 0 0,1 0 0,-1 0 0,0 0 0,0-3-40,0 5-5,-1 0 1,0 0-1,0 1 0,0-1 1,0 0-1,0 0 0,0 0 1,-1 0-1,1 0 0,-1 0 1,1 0-1,-1 1 1,0-1-1,1 0 0,-1 0 1,0 1-1,0-1 0,0 1 1,0-1-1,-1 1 0,1-1 1,0 1-1,-1-1 1,1 1-1,-1 0 0,1 0 1,-1 0-1,0 0 0,1 0 1,-1 0-1,0 0 0,0 1 1,1-1-1,-1 1 1,-1-1 4,-11-2-166,0 1-52</inkml:trace>
   <inkml:trace contextRef="#ctx0" brushRef="#br0" timeOffset="1516.939">570 95 4736,'-1'3'489,"0"1"0,-1-1 0,1 0 0,1 1 1,-1-1-1,0 1 0,1-1 0,0 0 0,-1 1 0,1-1 1,1 4-490,-1 7 635,-10 212 1466,9-213-2118,1-13 22,0 0 0,0 0 0,0 0 0,0 0 0,0 0 0,0 0 0,0 0 0,0 0 0,0 0 0,0 0 0,0 0 0,-1 0-1,1 0 1,0 0 0,0 0 0,0 1 0,0-1 0,0 0 0,0 0 0,0 0 0,0 0 0,0 0 0,0 0 0,0 0 0,0 0-1,0 0 1,0 0 0,-1 0 0,1 0 0,0 0 0,0 0 0,0 0 0,0 0 0,0 0 0,0 0 0,0 0 0,0 0-1,0-1 1,0 1 0,0 0 0,0 0 0,0 0 0,-1 0 0,1 0 0,0 0 0,0 0 0,0 0 0,0 0 0,0 0 0,0 0-1,0 0 1,0 0 0,0 0 0,0 0 0,0 0 0,0 0 0,0-1 0,0 1 0,0 0 0,0 0 0,0 0-5,-8-19 621,5 12-710,-13-26 243,11 26-135,1-2-1,0 1 1,1 0 0,0-1 0,0 0 0,-1-5-19,4 13-6,0 1 0,0-1 1,1 1-1,-1-1 1,0 0-1,0 1 1,0-1-1,0 0 1,1 1-1,-1-1 1,0 1-1,0-1 0,1 1 1,-1-1-1,1 1 1,-1-1-1,0 1 1,1-1-1,-1 1 1,1-1-1,-1 1 1,1 0-1,-1-1 0,1 1 1,-1 0-1,1-1 1,0 1-1,-1 0 1,1 0-1,-1 0 1,1-1-1,0 1 1,-1 0-1,1 0 0,0 0 1,-1 0-1,1 0 1,0 0 5,31 1-35,-26-1 41,3 1-9,27 1-442,27-3 445,-47-1-256</inkml:trace>
   <inkml:trace contextRef="#ctx0" brushRef="#br0" timeOffset="2080.283">624 0 3072,'1'6'852,"-1"-1"1,1 0 0,0 0-1,1 0 1,0 0-1,-1-1 1,1 1-1,2 2-852,-1-1 439,0 1 0,-1 0 0,0 0 0,1 2-439,2 31 466,-1-1 1,-2 4-467,0-6 888,1 0 0,5 20-888,-8-56 16,0 0-1,0 0 1,1 0 0,-1 0 0,0 0-1,1 0 1,-1 0 0,0 0 0,1 0 0,-1 0-1,1 0 1,-1-1 0,1 1 0,0 0-1,0 0-15,-1-1 9,0 0-1,1 0 0,-1 0 1,0 0-1,0 0 0,1 1 1,-1-1-1,0 0 1,1 0-1,-1-1 0,0 1 1,0 0-1,1 0 0,-1 0 1,0 0-1,0 0 0,1 0 1,-1 0-1,0 0 1,1 0-1,-1-1 0,0 1 1,0 0-1,0 0 0,1 0 1,-1-1-1,0 1 0,0 0 1,0 0-1,1 0 1,-1-1-1,0 1-8,3-5-29,0 1 0,0-1 0,-1 0 0,2-5 29,0 2-489,4-12-163,-7 16 596,1 0 1,0 0-1,-1 0 1,1 1 0,0-1-1,1 0 1,-1 0 55,-1 4-1,-1 0 1,0 0-1,0 0 1,0 0 0,0 0-1,0 0 1,0 0-1,0 0 1,0 0 0,0 0-1,0 0 1,0 0-1,0 0 1,1 0 0,-1 0-1,0 0 1,0 0 0,0 0-1,0 0 1,0 0-1,0 0 1,0 0 0,0 0-1,0 0 1,0 0-1,0 0 1,1 0 0,-1 0-1,0 0 1,0 0-1,0 0 1,0 0 0,0 0-1,0 0 1,0 0-1,0 0 1,0 0 0,0 0-1,0 0 1,0 0 0,0 0-1,0 1 1,1-1-1,-1 0 1,0 0 0,0 0-1,0 0 1,0 0-1,0 0 1,0 0 0,0 0 0,2 8 104,1 7 100,-1 7 43,-3-15-203,2-1-1,-1 1 1,1 0 0,0-1 0,1 1-1,-1 0 1,1-1 0,2 3-44,-4-9 1,0 1 0,0-1 0,0 0 0,0 0 0,1 1 0,-1-1 0,0 0 0,0 1 0,0-1-1,1 0 1,-1 0 0,0 0 0,1 1 0,-1-1 0,0 0 0,1 0 0,-1 0 0,0 0 0,0 1 0,1-1 0,-1 0 0,1 0 0,-1 0 0,0 0 0,1 0 0,-1 0 0,0 0 0,1 0 0,-1 0 0,0 0 0,1 0 0,-1 0 0,0 0-1,1 0 1,-1-1 0,0 1 0,1 0 0,-1 0 0,0 0 0,1 0 0,-1-1 0,0 1 0,0 0 0,1 0 0,-1-1 0,0 1 0,0 0 0,1 0 0,-1-1 0,0 1 0,0 0 0,0-1 0,0 1-1,16-21-270,-12 14-7,5-5-304</inkml:trace>
   <inkml:trace contextRef="#ctx0" brushRef="#br0" timeOffset="2434.85">844 267 1792,'0'-2'768,"1"2"-576,-1 0 2400,0 0 1056,1 2-1728,2 2-736,-1-1-832,1 1-224,-1 3-64,0 0 32,0 2 64,0 1-64,-1 0-64,0 1 64,1-1 64,-2 0-352,0-2-160</inkml:trace>
@@ -453,7 +453,7 @@
   </inkml:definitions>
   <inkml:trace contextRef="#ctx0" brushRef="#br0">1908 112 5120,'1'61'6090,"1"31"-5725,-1-55 156,0-18-457,-2-5 65,2 0 0,0 0 0,0-1 0,2 1 0,1 5-129,-4-16-165</inkml:trace>
   <inkml:trace contextRef="#ctx0" brushRef="#br0" timeOffset="362.257">1885 265 6784,'1'-5'2624,"-1"5"-2048,0 3 64,2-1-128,-2 2-352,2-1-32,1 0-64,2-1 32,3 1-64,4-3 64,5 1 64,3 1-128,1 0-96,-3 0-1888</inkml:trace>
-  <inkml:trace contextRef="#ctx0" brushRef="#br0" timeOffset="1297.361">2081 305 5248,'-3'3'610,"1"0"1,0 1 0,0-1-1,0 0 1,1 1 0,-2 3-611,1-2 390,0 0 0,1 1 1,-1-1-1,1 1 0,1-1 0,-1 1 1,1 0-1,0 4-390,0-8 27,0-1-1,0 1 0,1-1 1,-1 1-1,0-1 1,1 1-1,-1-1 1,1 0-1,-1 1 1,1-1-1,0 0 1,0 0-1,-1 1 0,1-1 1,0 0-1,0 0 1,0 0-1,0 0 1,0 0-1,1 0 1,-1 0-1,0-1 1,0 1-1,1 0 0,-1-1 1,0 1-1,1-1 1,-1 1-1,0-1 1,1 1-1,-1-1 1,1 0-1,-1 0 1,1 0-1,-1 0 0,1 0 1,-1 0-27,4 0-11,-1-1 0,1 0 0,0 0 0,-1 0 1,1-1-1,-1 1 0,0-1 0,1 0 0,-1 0 0,0-1 0,0 1 0,0-1 0,-1 0 1,1 0-1,-1 0 0,1-1 0,-1 1 0,0-1 0,0 1 0,-1-1 0,1 0 1,-1 0-1,0-1 0,0 1 0,1-2 11,-2-1 62,-3 9-111,-3 13-151,5-12 191,0 1-1,0-1 1,1 1 0,-1-1-1,1 1 1,0-1 0,0 0-1,0 1 1,0-1-1,1 0 1,-1 0 0,1 0-1,0 0 1,0 0-1,0 0 1,0 0 0,0-1-1,1 1 1,-1-1-1,1 1 1,2 1 9,2-1-389</inkml:trace>
+  <inkml:trace contextRef="#ctx0" brushRef="#br0" timeOffset="1297.36">2081 305 5248,'-3'3'610,"1"0"1,0 1 0,0-1-1,0 0 1,1 1 0,-2 3-611,1-2 390,0 0 0,1 1 1,-1-1-1,1 1 0,1-1 0,-1 1 1,1 0-1,0 4-390,0-8 27,0-1-1,0 1 0,1-1 1,-1 1-1,0-1 1,1 1-1,-1-1 1,1 0-1,-1 1 1,1-1-1,0 0 1,0 0-1,-1 1 0,1-1 1,0 0-1,0 0 1,0 0-1,0 0 1,0 0-1,1 0 1,-1 0-1,0-1 1,0 1-1,1 0 0,-1-1 1,0 1-1,1-1 1,-1 1-1,0-1 1,1 1-1,-1-1 1,1 0-1,-1 0 1,1 0-1,-1 0 0,1 0 1,-1 0-27,4 0-11,-1-1 0,1 0 0,0 0 0,-1 0 1,1-1-1,-1 1 0,0-1 0,1 0 0,-1 0 0,0-1 0,0 1 0,0-1 0,-1 0 1,1 0-1,-1 0 0,1-1 0,-1 1 0,0-1 0,0 1 0,-1-1 0,1 0 1,-1 0-1,0-1 0,0 1 0,1-2 11,-2-1 62,-3 9-111,-3 13-151,5-12 191,0 1-1,0-1 1,1 1 0,-1-1-1,1 1 1,0-1 0,0 0-1,0 1 1,0-1-1,1 0 1,-1 0 0,1 0-1,0 0 1,0 0-1,0 0 1,0 0 0,0-1-1,1 1 1,-1-1-1,1 1 1,2 1 9,2-1-389</inkml:trace>
   <inkml:trace contextRef="#ctx0" brushRef="#br0" timeOffset="1645.48">2278 331 2560,'-6'-25'3194,"6"24"-906,-4 12-213,-28 242-454,30-242-2458,0-3-304</inkml:trace>
   <inkml:trace contextRef="#ctx0" brushRef="#br0" timeOffset="2030.422">2260 289 4224,'0'-2'180,"1"1"1,-1 0 0,1-1-1,0 1 1,-1-1-1,1 1 1,0 0 0,0-1-1,0 1 1,0 0-1,0 0 1,0 0 0,1 0-1,-1 0 1,0 0-1,0 0 1,1 0-1,-1 0 1,1 1 0,-1-1-1,0 1 1,1-1-1,-1 1 1,1-1 0,0 1-1,-1 0 1,1 0-1,-1-1 1,1 1-1,-1 1 1,1-1 0,0 0-1,-1 0 1,1 0-1,-1 1 1,1-1-181,1 1 145,0-1 0,-1 1 0,1 0 0,-1 0 0,1 0 0,-1 0 0,0 0 0,1 0 0,-1 1 1,0-1-1,0 1 0,0 0 0,0 0 0,0-1 0,0 1 0,0 0 0,-1 0 0,1 1 0,-1-1 0,1 0 0,0 3-145,-1-3 31,-1 0 0,1-1 0,0 1 0,-1 0-1,0 0 1,1 0 0,-1 0 0,0 0 0,0 0 0,0 0 0,-1 0-1,1 0 1,0 0 0,-1 0 0,1 0 0,-1 0 0,0 0 0,1 0 0,-1 0-1,0 0 1,0-1 0,0 1 0,-1 0 0,1-1 0,0 1 0,-1-1-1,1 1 1,0-1 0,-1 0-31,-4 4 64,-1 0-1,1-1 0,-7 3-63,8-5-261,0 1 0,0 1 0,0-1 0,0 0 0,0 1 0,-2 2 261,8-5-869,3-2-160</inkml:trace>
   <inkml:trace contextRef="#ctx0" brushRef="#br0" timeOffset="2373.95">2517 305 6144,'4'-6'1647,"-6"3"-777,-11 5-545,3 0-415,8-2 131,-32 8 836,31-7-675,0 0-1,1 0 1,-1 0-1,0 0 1,1 0-1,-1 1 1,1-1-1,0 1 1,-1 0-1,-1 1-201,4-2 31,0-1-1,-1 1 1,1 0-1,0 0 1,-1 0-1,1-1 1,0 1-1,0 0 1,0 0-1,0 0 1,0-1-1,0 1 1,0 0-1,0 0 1,0 0-1,0 0 1,0-1-1,1 1 1,-1 0-1,0 0 1,0 0 0,1-1-1,-1 1 1,1 0-1,-1-1 1,1 1-1,-1 0 1,1-1-1,-1 1 1,1 0-1,-1-1 1,1 1-31,23 21-11,-20-19 21,-2-1-6,1 0-1,-1 0 1,1 0-1,0 1 1,-1-1 0,0 1-1,0 0 1,2 1-4,-4-3 26,0 0-1,0-1 1,1 1 0,-1 0 0,0-1-1,0 1 1,0 0 0,0 0-1,0-1 1,0 1 0,0 0 0,0 0-1,0-1 1,0 1 0,0 0 0,-1-1-1,1 1 1,0 0 0,0-1 0,-1 1-1,1 0 1,0-1 0,-1 1 0,1 0-1,-1-1 1,1 1 0,-1-1 0,1 1-1,-1-1 1,1 1 0,-1-1 0,0 1-1,1-1 1,-1 0 0,1 1-1,-1-1 1,0 0-26,-33 17 785,17-10-1058,2 0-201</inkml:trace>
@@ -476,7 +476,7 @@
   <inkml:trace contextRef="#ctx0" brushRef="#br0" timeOffset="25613.993">251 1360 4480,'2'1'389,"1"0"0,-1-1 0,1 1 0,-1-1 0,1 1 0,0-1 1,-1 0-1,1 0 0,-1 0 0,1 0 0,0-1-389,36-4 2791,-35 5-2278,27-10 722,-30 10-1228,0 0 0,0-1 0,0 1 0,0-1 0,0 0 0,0 1 0,-1-1 0,1 0 1,0 1-1,0-1 0,-1 0 0,1 0 0,0 0-7,-1 1-3,0-1 0,0 1-1,0 0 1,0-1 0,0 1 0,0-1 0,0 1 0,0 0 0,0-1 0,0 1 0,0-1-1,0 1 1,0 0 0,0-1 0,0 1 0,0-1 0,-1 1 0,1 0 0,0-1 0,0 1-1,0 0 1,-1-1 0,1 1 0,0 0 0,0 0 0,-1-1 0,1 1 0,0 0 0,-1 0-1,1-1 1,0 1 0,-1 0 0,1 0 0,-1 0 3,-1-2-4,0 1-1,0 1 1,-1-1-1,1 0 1,-1 0 0,1 1-1,-1 0 1,1-1-1,-1 1 1,1 0 0,-1 0-1,1 0 1,-1 1-1,1-1 1,-1 0 0,1 1-1,0 0 1,-1 0 0,1-1-1,-1 2 5,-1-1-35,0 1 0,0 0 0,1 0-1,-1 0 1,0 0 0,1 0 0,-1 1 0,1 0 0,0 0-1,0 0 1,-2 2 35,4-4 10,1 0 1,-1 1-1,0-1 0,1 0 0,-1 1 1,1-1-1,0 0 0,-1 1 0,1-1 0,0 1 1,0-1-1,0 0 0,0 1 0,0-1 1,0 1-1,0-1 0,1 0 0,-1 1 0,0-1 1,1 1-1,-1-1 0,1 0 0,0 0 1,-1 1-1,1-1 0,0 0 0,0 0 0,-1 0 1,1 0-1,0 0 0,1 1-10,2 2 20,-1-1 0,1 1-1,0-1 1,0 0 0,1 0-1,-1 0 1,1-1 0,0 1-20,2 0-6,-1-1 0,1 0 0,0 0 0,0 0-1,0-1 1,0 0 0,4 0 6,13-2-154</inkml:trace>
   <inkml:trace contextRef="#ctx0" brushRef="#br0" timeOffset="26665.596">615 1346 1408,'5'-1'5299,"14"3"-3889,-11-1-1282,1 0 620,0-1 0,0 0-1,0 0 1,4-2-748,-11 2 95,0 0-1,-1 0 1,1 0 0,0-1-1,0 1 1,-1-1-1,1 1 1,0-1 0,-1 0-1,1 1 1,0-1-1,-1 0 1,1 0 0,-1 0-1,0-1 1,1 1-1,-1 0 1,0 0-1,0-1 1,0 1 0,1-1-1,-1 1 1,-1-1-1,1 1 1,0-1 0,0 0-95,-1 2-5,0-1 1,0 0 0,0 1 0,0-1-1,0 1 1,0-1 0,0 1 0,0-1-1,0 1 1,0-1 0,0 1 0,0-1-1,0 1 1,-1-1 0,1 1 0,0-1 0,0 1-1,0-1 1,-1 1 0,1-1 0,0 1-1,-1 0 1,1-1 0,0 1 0,-1 0-1,0-1 5,-15-6-138,11 6 124,-1 0 0,1 1-1,-1-1 1,1 1 0,-1 0 14,1 1-1,1-1 0,0 1 0,0 0 0,0 0 0,0 1 0,0-1 0,0 1 0,0 0 0,0 0 0,0 0 0,1 0 0,-2 1 1,4-1-3,-1-1 0,1 0 0,0 1 1,-1-1-1,1 1 0,0-1 1,0 1-1,0-1 0,0 1 0,0 0 1,0 0-1,0-1 0,1 1 1,-1 0-1,0 0 0,1 0 0,0 0 1,-1 0-1,1 0 0,0 0 1,0 0-1,0 0 0,0-1 0,1 1 1,-1 0-1,0 0 0,1 1 3,1 2 30,-1-1 0,1 1 0,1 0 0,-1-1-1,0 0 1,1 0 0,0 0 0,0 0 0,0 0 0,1 0-1,-1-1 1,1 1 0,0-1 0,0 0 0,2 1-30,-3-2-58,0-1 1,0 1-1,0-1 1,0 1 0,0-1-1,1 0 1,-1 0-1,0 0 1,1-1-1,-1 1 1,0-1 0,1 0-1,-1 0 1,1 0-1,-1-1 1,0 1-1,1-1 1,-1 1 0,0-1-1,1 0 1,-1-1-1,3 0 58,4-3-2842</inkml:trace>
   <inkml:trace contextRef="#ctx0" brushRef="#br0" timeOffset="27043.221">771 1307 5632,'0'0'120,"0"0"-1,0-1 1,0 1 0,0 0-1,0 0 1,0-1 0,1 1-1,-1 0 1,0 0 0,0-1-1,0 1 1,0 0 0,0 0-1,1 0 1,-1 0 0,0-1-1,0 1 1,0 0 0,1 0-1,-1 0 1,0 0 0,0 0-1,1-1 1,-1 1 0,0 0-1,0 0 1,1 0 0,-1 0-1,0 0 1,0 0 0,1 0-120,8 4 2056,12 13-829,-15-11-1058,27 18-361,-22-17 325,-1 0-1,0 1 0,0 0 0,-1 1 1,1 1-133,-5-3-176</inkml:trace>
-  <inkml:trace contextRef="#ctx0" brushRef="#br0" timeOffset="27371.31">899 1286 5376,'-1'0'183,"1"0"0,-1 0 0,1-1-1,-1 1 1,0 0 0,1 0 0,-1 0 0,1 0 0,-1 0 0,0 0 0,1 0 0,-1 0 0,0 0-1,1 0 1,-1 0 0,1 1 0,-1-1 0,0 0 0,1 0 0,-1 1 0,1-1 0,-1 0 0,1 1-1,-1-1 1,1 0 0,-1 1-183,-17 13 2142,13-10-2015,-11 9-104,2 0 0,0 1 1,0 1-1,2 0 0,0 0 1,0 1-1,1 1 0,0 3-23,7-14-1194</inkml:trace>
+  <inkml:trace contextRef="#ctx0" brushRef="#br0" timeOffset="27371.309">899 1286 5376,'-1'0'183,"1"0"0,-1 0 0,1-1-1,-1 1 1,0 0 0,1 0 0,-1 0 0,1 0 0,-1 0 0,0 0 0,1 0 0,-1 0 0,0 0-1,1 0 1,-1 0 0,1 1 0,-1-1 0,0 0 0,1 0 0,-1 1 0,1-1 0,-1 0 0,1 1-1,-1-1 1,1 0 0,-1 1-183,-17 13 2142,13-10-2015,-11 9-104,2 0 0,0 1 1,0 1-1,2 0 0,0 0 1,0 1-1,1 1 0,0 3-23,7-14-1194</inkml:trace>
   <inkml:trace contextRef="#ctx0" brushRef="#br0" timeOffset="27708.218">965 1337 4864,'-4'8'1824,"3"-4"-1408,-1 3 736,0-3 192,0 5-288,-2 6-128,1 5-544,-2 3-160,-2-1-160,0-2-64,-1 1 96,-1-1-128,0-1 0,-1 1 96,0-2 32,1-3-480,3-4-192</inkml:trace>
   <inkml:trace contextRef="#ctx0" brushRef="#br0" timeOffset="28048.445">960 1348 3712,'0'-1'421,"0"0"-1,1-1 1,-1 1 0,1 0-1,-1 0 1,1 0-1,-1 0 1,1-1 0,0 1-1,-1 0 1,1 0 0,0 0-1,0 0 1,0 1 0,0-1-1,0 0 1,0 0 0,1 0-421,0-1 259,1 1 1,-1 0 0,1 0 0,-1 0 0,1 0 0,0 1-1,-1-1 1,4 1-260,2-1-33,1 1-1,0 0 0,-1 0 1,1 1-1,2 1 34,-10-2 13,25 6 49,-24-5-35,-1-1 0,0 0-1,0 1 1,0-1 0,0 1-1,0-1 1,0 1 0,0 0-1,0-1 1,0 1-1,0 0 1,0 0 0,0-1-1,0 1 1,-1 0 0,1 0-1,0 0 1,-1 0 0,1 0-1,0 1-26,-1-2 54,0 1 0,0 0 0,-1 0 0,1-1 0,0 1 0,0 0 1,0 0-1,-1-1 0,1 1 0,0 0 0,-1-1 0,1 1 0,-1 0 0,1-1 0,-1 1 0,1-1 0,-1 1 0,1-1 0,-1 1 0,1-1 0,-2 1-54,-16 12 534,12-9-373,-6 6-188,2-2-13,0-1 0,0 0 0,-1 0 0,-3 0 40,14-7-32,0 0 0,0 1 0,0-1-1,-1 0 1,1 0 0,0 0 0,0 0 0,0 0 0,0 1 0,-1-1 0,1 0-1,0 0 1,0 0 0,0 0 0,-1 0 0,1 0 0,0 0 0,0 0 0,-1 0 0,1 0-1,0 0 1,0 0 0,0 0 0,-1 0 0,1 0 0,0 0 0,0 0 0,0 0-1,-1 0 1,1 0 0,0 0 0,0 0 0,0-1 0,-1 1 0,1 0 0,0 0 0,0 0-1,0 0 1,-1 0 0,1 0 0,0-1 0,0 1 0,0 0 0,0 0 0,0-1 32,1-3-1008</inkml:trace>
   <inkml:trace contextRef="#ctx0" brushRef="#br0" timeOffset="28403.705">1134 1372 256,'0'0'530,"1"0"0,-1 1 0,1-1 0,0 0 0,-1 0 0,1 0 0,-1 0 1,1 0-1,0 0 0,-1 0 0,1 0 0,-1 0 0,1 0 0,0-1 0,-1 1 0,1 0 0,-1 0 0,1-1-530,13-3 2283,-7 2-2211,-2 1-28,1-1-1,-1 0 0,0 0 0,0 0 1,0-1-1,5-3-43,-10 6 10,1-1-1,0 0 1,-1 1 0,1-1-1,-1 0 1,1 1 0,0-1-1,-1 0 1,0 0 0,1 1 0,-1-1-1,1 0 1,-1 0 0,0 0-1,0 0 1,1 1 0,-1-1 0,0-1-10,0 1 20,0-1 0,-1 1 0,1 0 1,0-1-1,-1 1 0,1 0 1,-1 0-1,1-1 0,-1 1 1,0 0-1,1 0 0,-1 0 1,0 0-1,0 0 0,0 0 1,0-1-21,0 1-9,1 1 1,-1-1-1,0 0 1,0 0-1,0 0 1,0 1-1,1-1 1,-1 0-1,0 1 1,0-1-1,0 1 1,-1-1 0,1 1-1,0 0 1,0-1-1,0 1 1,0 0-1,0 0 1,0 0-1,0 0 1,-1 0-1,1 0 1,0 0 8,-1 0 14,0 1 1,1-1-1,-1 1 0,0 0 0,1 0 1,-1 0-1,1-1 0,-1 1 1,1 1-1,0-1 0,-1 0 1,1 0-1,0 0 0,-1 1-14,0 1 6,0 0-1,0 0 0,0 0 1,0 0-1,0 1 0,0-1 0,1 1 1,0-1-1,0 1 0,0-1 1,0 1-1,0 0 0,1-1 1,-1 3-6,2 5 63,0 0-1,1 0 1,0 0 0,1-1 0,3 10-63,-3-12-218</inkml:trace>
@@ -516,7 +516,7 @@
   </inkml:definitions>
   <inkml:trace contextRef="#ctx0" brushRef="#br0">0 121 3968,'2'-1'322,"-1"1"0,1-1 0,-1 0-1,1 0 1,-1 1 0,1-1 0,0 1 0,-1 0 0,1-1 0,0 1 0,-1 0 0,1 0 0,0 0-1,0 0-321,152-3 3085,-68 4-3055,22-1 311,42 8-341,-130-6-5,-6 2 112</inkml:trace>
   <inkml:trace contextRef="#ctx0" brushRef="#br0" timeOffset="437.335">514 48 4480,'-1'0'1664,"0"9"-1312,-2 6 0,3-6-128,-1 3 192,0 1 96,1 1 192,0 2 96,1 2-416,0-1 0,2-2-32,-1-1-192,2-3-32,-1-2 0,0-3 0,1-6-160</inkml:trace>
-  <inkml:trace contextRef="#ctx0" brushRef="#br0" timeOffset="804.467">541 1 3072,'2'1'401,"0"0"0,0 0 0,0 0 0,0 0 0,0 1 1,0-1-1,-1 0 0,1 1 0,-1 0 0,2 0-401,25 25 1599,-12-11-1061,1 1 444,11 13-982,-23-24 116,-1-1 0,0 1 0,0 0 0,-1 0 0,0 0 0,0 1 0,0-1 0,-1 2-116,-1-6 51,-1-1 0,0 1 0,1-1 0,-1 1 0,0 0 0,0-1 0,0 1 0,0-1 0,-1 1-1,1-1 1,0 1 0,-1 0 0,1-1 0,-1 1 0,1-1 0,-1 0 0,0 1 0,0-1 0,0 0 0,1 1-1,-1-1 1,0 0 0,-1 0 0,1 0 0,0 0 0,0 0 0,0 0 0,-1 0 0,1 0 0,0 0 0,-2 0-51,-5 4 100,-1-1 1,-1-1-1,1 1 1,-9 1-101,1 0 115,-63 20-616,57-17-1504</inkml:trace>
+  <inkml:trace contextRef="#ctx0" brushRef="#br0" timeOffset="804.466">541 1 3072,'2'1'401,"0"0"0,0 0 0,0 0 0,0 0 0,0 1 1,0-1-1,-1 0 0,1 1 0,-1 0 0,2 0-401,25 25 1599,-12-11-1061,1 1 444,11 13-982,-23-24 116,-1-1 0,0 1 0,0 0 0,-1 0 0,0 0 0,0 1 0,0-1 0,-1 2-116,-1-6 51,-1-1 0,0 1 0,1-1 0,-1 1 0,0 0 0,0-1 0,0 1 0,0-1 0,-1 1-1,1-1 1,0 1 0,-1 0 0,1-1 0,-1 1 0,1-1 0,-1 0 0,0 1 0,0-1 0,0 0 0,1 1-1,-1-1 1,0 0 0,-1 0 0,1 0 0,0 0 0,0 0 0,0 0 0,-1 0 0,1 0 0,0 0 0,-2 0-51,-5 4 100,-1-1 1,-1-1-1,1 1 1,-9 1-101,1 0 115,-63 20-616,57-17-1504</inkml:trace>
   <inkml:trace contextRef="#ctx0" brushRef="#br0" timeOffset="3590.17">542 41 3072,'-5'1'4558,"11"-2"-3739,12-2-954,-6-2 430,-8 4 119,-12 7-483,7-6 86,-5 4 212,0 0 1,0 1-1,0 0 0,1-1 0,0 2 0,0-1 1,-1 2-230,6-7-2,0 0 1,0 0 0,-1 0 0,1 0-1,0 0 1,0 0 0,0 0 0,0 0 0,0 0-1,0 0 1,0 1 0,0-1 0,0 0-1,0 0 1,0 0 0,0 0 0,0 0-1,0 0 1,0 0 0,0 0 0,0 0-1,0 1 1,0-1 0,0 0 0,0 0-1,0 0 1,0 0 0,0 0 0,0 0 0,0 0-1,0 0 1,0 0 0,0 0 0,0 1-1,0-1 1,0 0 0,1 0 0,-1 0-1,0 0 1,0 0 0,0 0 0,0 0-1,0 0 1,0 0 0,0 0 0,0 0-1,0 0 1,0 0 0,0 0 0,0 0 0,1 0 1,6 1 147,12-5 234,-17 4-366,11-3 74,-4 2-135,-1-1-1,1 0 1,-1-1 0,8-2 46,-27 10 49,0 1 1,0 0 0,0 0 0,1 2 0,0-1-1,-6 7-49,16-14-4,0 0 0,0 0 0,0 0-1,0 0 1,0 0 0,0 0-1,0 0 1,-1 0 0,1 0 0,0 0-1,0 0 1,0 0 0,0 1 0,0-1-1,0 0 1,0 0 0,0 0-1,0 0 1,0 0 0,0 0 0,0 0-1,0 0 1,0 1 0,0-1 0,0 0-1,0 0 1,0 0 0,0 0-1,0 0 1,0 0 0,0 0 0,0 1-1,0-1 1,0 0 0,0 0 0,0 0-1,0 0 1,0 0 0,0 0-1,0 0 1,0 0 0,0 1 0,0-1-1,0 0 1,0 0 0,1 0 0,-1 0-1,0 0 1,0 0 0,0 0-1,0 0 1,0 0 4,9 1-45,8-3 142,64-20-49,-99 30-22,-7 3 158,1 1 0,-15 9-184,39-21 1,1 0 0,-1 0-1,0 0 1,0 0 0,0 0-1,0 0 1,0 0-1,0 0 1,0 0 0,0 0-1,0 0 1,0 0 0,0 0-1,0 0 1,0 0 0,0 0-1,0 0 1,0 0 0,1 0-1,-1 0 1,0 0 0,0 0-1,0 0 1,0 0-1,0 1 1,0-1 0,0 0-1,0 0 1,0 0 0,0 0-1,0 0 1,0 0 0,0 0-1,0 0 1,0 0 0,0 0-1,0 0 1,0 0 0,0 0-1,0 0 1,0 0 0,0 0-1,0 0 1,0 1-1,0-1 1,0 0 0,0 0-1,0 0 1,0 0 0,0 0-1,0 0 1,0 0 0,0 0-1,0 0 1,0 0 0,0 0-1,0 0 1,0 0 0,0 0-1,0 0 1,0 0-1,10 1 109,12-3-274,5-1 105,29-4 126,-69 9-54,-34 7 68,44-8-74,-1 0 0,0 1 1,1-1-1,-1 1 0,0-1 0,1 1 0,0 0 0,-1 1 0,1-1 1,0 0-1,-1 2-6,4-4 0,0 1 0,0-1 0,-1 0 0,1 0 0,0 0 0,0 0 0,0 0 0,0 0 0,0 1 0,0-1 0,0 0 0,0 0 0,0 0 0,0 0 0,0 1 0,0-1 0,0 0 0,0 0 0,0 0 0,0 0 0,0 1 0,0-1 0,0 0 0,0 0 0,0 0 0,0 0 0,0 1 0,0-1 0,0 0 0,0 0 0,0 0 0,0 0 0,0 0 0,0 1 0,1-1 0,-1 0 0,0 0 0,0 0 0,0 0 0,0 0 0,0 0 0,0 0 0,1 1 0,-1-1 0,0 0 0,0 0 0,0 0 0,0 0 0,1 0 0,-1 0 0,0 0 0,0 0 0,0 0 0,0 0 0,1 0 0,-1 0 0,0 0 0,0 0 0,0 0 0,0 0 0,1 0 0,-1 0 0,0 0 0,0 0 0,0 0 0,0 0 0,0 0 0,15-1-129,-13 1 151,17-2 234,-12 2-291,1 0 1,0-1-1,-1 0 0,1 0 1,-1-1-1,6-2 35,-43 5 363,25 0-439,1 0 73,0 0 0,-1 0-1,1 0 1,0 0 0,0 1-1,0 0 1,0-1 0,0 2-1,0-1 1,0 0 0,-2 3 3,6-5-1,0 0 1,0 0-1,0 0 0,0 0 1,0 0-1,0 0 1,0 0-1,0 0 1,0 0-1,0 0 1,0 0-1,-1 0 0,1 1 1,0-1-1,0 0 1,0 0-1,0 0 1,0 0-1,0 0 1,0 0-1,0 0 0,0 0 1,0 1-1,0-1 1,0 0-1,0 0 1,0 0-1,0 0 0,0 0 1,0 0-1,0 0 1,0 0-1,0 1 1,1-1-1,-1 0 1,0 0-1,0 0 0,0 0 1,0 0-1,0 0 1,0 0-1,0 0 1,0 0-1,0 0 1,0 0-1,0 0 0,0 1 1,1-1-1,-1 0 1,0 0-1,0 0 1,0 0-1,0 0 1,0 0-1,0 0 1,9 1-146,9-3 152,-10 1 175,-5 0-139,-1 1-1,0 0 1,1-1-1,-1 1 1,0-1-1,0 0 1,1 1-1,-1-1 1,0-1-42,-21 4-278,17-1 286,1 0 0,-1 0 0,0 0 0,0 0 0,0 1 0,1-1 0,-1 1 0,0 0-8,-2 3 182</inkml:trace>
 </inkml:ink>
 </file>
@@ -546,10 +546,10 @@
     </inkml:brush>
   </inkml:definitions>
   <inkml:trace contextRef="#ctx0" brushRef="#br0">56 45 2560,'0'0'958,"3"13"6144,1 22-6160,-8 3-492,-1-1-1,-2 0 0,-1 0 0,-9 20-449,2 1 225,13-53-315,1-3-56,1 1 0,-1-1 1,0 1-1,1 0 0,-1 0 1,1-1-1,0 1 0,0 0 1,0 0-1,0 1 146,1-6-1829</inkml:trace>
-  <inkml:trace contextRef="#ctx0" brushRef="#br0" timeOffset="515.32">47 32 6400,'-3'-4'2140,"4"7"-458,3 8-726,-3-5-764,0 1-1,0-1 1,1 0-1,0 0 1,0 0-1,0 0 1,1-1-1,0 1 1,1 1-192,-3-5 15,1 0 0,-1-1 1,0 1-1,1-1 1,-1 1-1,1-1 1,-1 0-1,1 1 0,0-1 1,-1 0-1,1 0 1,0 0-1,0 0 1,0-1-1,0 1 0,0 0 1,0-1-1,0 0 1,0 1-1,0-1 1,0 0-1,0 0 0,0 0 1,0 0-1,0 0 1,0 0-1,0-1 0,0 1 1,2-1-16,4-2 20,0 0 0,0-1 0,0 0 0,0 0-1,0-1 1,-1 0 0,0 0 0,0-1 0,0 1 0,-1-2 0,0 1 0,0-1 0,0 0 0,-1 0 0,4-7-20,-32 88-331,6-22 362,3-9 176,1 6-207,10-35 4,0-1-1,2 1 1,-1-1-1,2 1 1,0 12-4,3-7-5,3-6 5</inkml:trace>
+  <inkml:trace contextRef="#ctx0" brushRef="#br0" timeOffset="515.319">47 32 6400,'-3'-4'2140,"4"7"-458,3 8-726,-3-5-764,0 1-1,0-1 1,1 0-1,0 0 1,0 0-1,0 0 1,1-1-1,0 1 1,1 1-192,-3-5 15,1 0 0,-1-1 1,0 1-1,1-1 1,-1 1-1,1-1 1,-1 0-1,1 1 0,0-1 1,-1 0-1,1 0 1,0 0-1,0 0 1,0-1-1,0 1 0,0 0 1,0-1-1,0 0 1,0 1-1,0-1 1,0 0-1,0 0 0,0 0 1,0 0-1,0 0 1,0 0-1,0-1 0,0 1 1,2-1-16,4-2 20,0 0 0,0-1 0,0 0 0,0 0-1,0-1 1,-1 0 0,0 0 0,0-1 0,0 1 0,-1-2 0,0 1 0,0-1 0,0 0 0,-1 0 0,4-7-20,-32 88-331,6-22 362,3-9 176,1 6-207,10-35 4,0-1-1,2 1 1,-1-1-1,2 1 1,0 12-4,3-7-5,3-6 5</inkml:trace>
   <inkml:trace contextRef="#ctx0" brushRef="#br0" timeOffset="1157.616">340 267 1920,'-2'0'497,"-1"0"-1,1 0 1,0 0 0,-1 1 0,1-1 0,0 0-1,-1 1 1,1-1 0,0 1 0,0 0-1,-1 0 1,1 0 0,0 0 0,0 0-1,0 1 1,0-1 0,0 1 0,0-1-1,1 1 1,-1 0-497,-11 18 65,12-16 37,0 0 1,-1-1-1,2 1 1,-1 0-1,0-1 1,1 1 0,-1 0-1,1 0 1,0-1-1,1 1 1,-1 0-1,1 0 1,0 3-103,-1-7 4,0 1 1,0-1-1,0 0 1,0 0-1,0 0 1,0 0-1,1 1 1,-1-1-1,0 0 1,0 0-1,0 0 1,0 0-1,0 1 1,0-1-1,0 0 1,0 0-1,1 0 1,-1 0-1,0 0 1,0 0-1,0 1 1,0-1-1,1 0 1,-1 0-1,0 0 1,0 0-1,0 0 1,0 0-1,1 0 1,-1 0-1,0 0 1,0 0-1,0 0 0,0 0 1,1 0-1,-1 0 1,0 0-1,0 0 1,0 0-5,8-6 23,8-14-143,-13 16 111,3-4-188,0 1 0,1-1-1,0 2 1,0-1 0,1 1-1,4-3 198,-13 12 61,-1-1-1,1 1 1,0 0-1,0 0 1,0 0-1,0 0 1,1 0-1,-1 0 1,1 0-1,0 1-60,0-2-39,-1 2 63,1 1 0,0-1 0,1 1 1,-1 0-1,1-1 0,0 1 0,1 2-24,-2-6 1,0 0 0,0 0 0,0-1 0,0 1 1,0 0-1,1 0 0,-1 0 0,0-1 0,1 1 0,-1 0 0,1-1 0,-1 1 0,1 0 0,-1-1 0,1 1 0,-1 0 0,1-1 0,-1 1 0,1-1 1,0 1-1,-1-1 0,1 0 0,0 1 0,0-1 0,-1 0 0,1 1 0,0-1 0,0 0 0,-1 0 0,1 1 0,0-1 0,0 0 0,0 0 0,0 0 1,-1 0-1,1 0 0,0 0 0,0-1 0,0 1 0,-1 0 0,1 0 0,0 0 0,0-1 0,-1 1 0,1-1 0,0 1-1,11-8-218</inkml:trace>
   <inkml:trace contextRef="#ctx0" brushRef="#br0" timeOffset="1508.227">478 28 6144,'-2'-19'2272,"3"15"-1760,-1 1 64,0 1-32</inkml:trace>
-  <inkml:trace contextRef="#ctx0" brushRef="#br0" timeOffset="1885.653">477 5 10016,'-2'34'1961,"-4"27"-1961,-1-1 1079,3-11-741,0-25-152,2 0 0,1 0 0,2 0 0,0 1-186,-1-25 0,0 0 1,0 0-1,0 0 0,0 0 0,0 0 0,0 1 0,0-1 0,0 0 1,0 0-1,0 0 0,0 0 0,0 0 0,0 0 0,0 0 1,0 0-1,0 0 0,0 0 0,0 0 0,0 1 0,0-1 0,0 0 1,0 0-1,0 0 0,0 0 0,1 0 0,-1 0 0,0 0 1,0 0-1,0 0 0,0 0 0,0 0 0,0 0 0,0 0 0,0 0 1,0 0-1,0 0 0,0 0 0,1 0 0,-1 0 0,0 0 0,0 0 1,0 0-1,0 0 0,0 0 0,0 0 0,0 0 0,0 0 1,0 0-1,0 0 0,6-4-49,7-10-61,-10 10 117,36-31-172,-5 5-4374,-30 25 4208,-7 7 2527,-8 10 238,9-6-2329,-1 0 1,0 0-1,1 0 1,1 1-1,-1-1 1,1 1-1,-1 1-105,2-4-26,-1 0 0,1 1 0,0-1 1,0 0-1,0 0 0,1 1 0,-1-1 0,1 0 0,0 0 0,0 0 0,2 3 26,-3-7-15,0 1 1,0-1-1,0 1 0,1-1 1,-1 0-1,0 1 0,0-1 0,0 0 1,1 1-1,-1-1 0,0 0 0,0 0 1,1 1-1,-1-1 0,0 0 0,1 0 1,-1 1-1,0-1 0,1 0 0,-1 0 1,0 0-1,1 0 0,-1 1 0,0-1 1,1 0-1,-1 0 0,1 0 0,-1 0 1,0 0-1,1 0 0,-1 0 0,1 0 1,-1 0-1,1 0 15,5-3-293</inkml:trace>
+  <inkml:trace contextRef="#ctx0" brushRef="#br0" timeOffset="1885.652">477 5 10016,'-2'34'1961,"-4"27"-1961,-1-1 1079,3-11-741,0-25-152,2 0 0,1 0 0,2 0 0,0 1-186,-1-25 0,0 0 1,0 0-1,0 0 0,0 0 0,0 0 0,0 1 0,0-1 0,0 0 1,0 0-1,0 0 0,0 0 0,0 0 0,0 0 0,0 0 1,0 0-1,0 0 0,0 0 0,0 0 0,0 1 0,0-1 0,0 0 1,0 0-1,0 0 0,0 0 0,1 0 0,-1 0 0,0 0 1,0 0-1,0 0 0,0 0 0,0 0 0,0 0 0,0 0 0,0 0 1,0 0-1,0 0 0,0 0 0,1 0 0,-1 0 0,0 0 0,0 0 1,0 0-1,0 0 0,0 0 0,0 0 0,0 0 0,0 0 1,0 0-1,0 0 0,6-4-49,7-10-61,-10 10 117,36-31-172,-5 5-4374,-30 25 4208,-7 7 2527,-8 10 238,9-6-2329,-1 0 1,0 0-1,1 0 1,1 1-1,-1-1 1,1 1-1,-1 1-105,2-4-26,-1 0 0,1 1 0,0-1 1,0 0-1,0 0 0,1 1 0,-1-1 0,1 0 0,0 0 0,0 0 0,2 3 26,-3-7-15,0 1 1,0-1-1,0 1 0,1-1 1,-1 0-1,0 1 0,0-1 0,0 0 1,1 1-1,-1-1 0,0 0 0,0 0 1,1 1-1,-1-1 0,0 0 0,1 0 1,-1 1-1,0-1 0,1 0 0,-1 0 1,0 0-1,1 0 0,-1 1 0,0-1 1,1 0-1,-1 0 0,1 0 0,-1 0 1,0 0-1,1 0 0,-1 0 0,1 0 1,-1 0-1,1 0 15,5-3-293</inkml:trace>
   <inkml:trace contextRef="#ctx0" brushRef="#br0" timeOffset="2234.538">620 302 5504,'0'1'233,"0"-1"1,0 0-1,0 1 1,0-1-1,0 1 1,0-1-1,0 1 1,0-1-1,0 1 1,0-1-1,0 0 1,0 1-1,1-1 0,-1 1 1,0-1-1,0 0 1,1 1-1,-1-1 1,0 0-1,0 1 1,1-1-1,-1 0 1,0 1-1,1-1 1,-1 0-1,0 1 1,1-1-234,0 0 102,0 0 0,-1 0 1,1 0-1,0 1 1,0-1-1,0 0 0,-1-1 1,1 1-1,0 0 0,0 0 1,-1 0-1,1 0 0,0-1 1,0 1-1,-1 0-102,3-1-57,0-1 0,0 1 0,0-1 0,-1 0 0,1 0 0,0 0 0,0-1 57,-2 2 6,0 0 0,0 0 0,0 0 0,0 0 0,-1 0 0,1-1 0,0 1 0,-1 0 0,1-1 0,-1 1 0,1 0 0,-1-1 0,0 1 0,1 0 1,-1-1-1,0 1 0,0-1 0,0 1 0,0-1-6,0 1-2,0 1 0,0 0 1,-1-1-1,1 1 0,0-1 1,0 1-1,0 0 0,0-1 1,-1 1-1,1 0 0,0 0 1,0-1-1,-1 1 0,1 0 1,0-1-1,0 1 0,-1 0 1,1 0-1,0 0 0,-1-1 1,1 1-1,0 0 0,-1 0 1,1 0-1,0 0 0,-1-1 2,0 1 4,0 0-1,0 0 0,0 0 0,0 1 1,0-1-1,0 0 0,0 0 0,0 0 1,-1 1-1,1-1 0,1 1 0,-1-1 1,0 1-1,-1 0-3,-5 2-28,1 1 1,0 0-1,0 1 0,0-1 1,0 1-1,1 0 0,-4 5 28,8-9 29,0 0 0,0 1 0,0-1 0,0 0-1,0 1 1,0-1 0,0 0 0,1 1 0,-1-1-1,1 1 1,-1 0 0,1-1 0,0 1 0,0-1 0,-1 1-1,1-1 1,0 1 0,0 0 0,0-1 0,1 1-1,-1-1 1,0 1 0,1 0 0,-1-1 0,1 1-1,-1-1 1,1 0 0,0 1 0,-1-1 0,1 1 0,0-1-1,0 0 1,0 0 0,0 1 0,0-1 0,1 0-1,-1 0 1,1 1-29,0 0-13,1-1-1,0 1 1,-1 0-1,1 0 1,0-1-1,0 0 1,0 0-1,0 0 1,0 0-1,1 0 1,-1 0-1,0-1 1,0 1-1,0-1 1,3 0 13,17-1-128</inkml:trace>
 </inkml:ink>
 </file>
@@ -616,14 +616,14 @@
   </inkml:definitions>
   <inkml:trace contextRef="#ctx0" brushRef="#br0">1112 188 5888,'-2'0'275,"0"1"1,1-1-1,-1 1 1,0-1-1,0 1 1,1 0-1,-1 0 1,0-1-1,1 1 1,-1 1-1,1-1 1,-1 0-1,1 0 1,0 0-1,-1 1 1,1-1-1,0 1 1,0-1-1,0 1 1,0-1-1,-1 2-275,-1 5 137,-1 0 0,1 0-1,0 0 1,0 2-137,2-7-98,1-2 105,0 0 0,0 0 0,-1-1 0,1 1 0,0 0 0,0 0 0,0 0-1,0 0 1,0 0 0,1 0 0,-1 0 0,0 0 0,0 0 0,1-1 0,-1 1 0,0 0-1,1 0 1,-1 0 0,1 0 0,-1-1 0,1 1 0,-1 0 0,1-1 0,-1 1 0,1 0 0,0-1-1,0 1 1,-1-1 0,1 1 0,0-1 0,0 1 0,-1-1 0,1 1 0,1-1-7,5 3 26,-1-1 1,1 1-1,0-2 0,5 2-26,10 3 306,-21-6-304,0 0 1,-1 0-1,1 1 1,0-1-1,-1 0 1,1 1-1,0-1 1,-1 0-1,1 1 1,-1-1 0,1 1-1,-1-1 1,1 1-1,-1-1 1,1 1-1,-1-1 1,1 1-1,-1 0 1,0-1-1,1 1 1,-1-1-1,0 1 1,1 0 0,-1-1-1,0 1 1,0 0-1,0 0 1,0-1-1,0 1 1,0 0-1,0-1 1,0 1-1,0 0 1,0 0-1,0-1 1,0 1 0,0 0-1,-1-1 1,1 1-1,0 0 1,0-1-1,-1 1 1,1 0-1,-1-1 1,1 1-1,0-1 1,-1 1-1,1-1 1,-1 1-3,-4 4 251,1 1 1,-1-2-1,-1 1 1,1 0-1,-1-1-251,-1 1 75,-1 3-30,6-6-93,-1 1 0,1-1 1,-1 0-1,1 0 1,-1 0-1,0-1 0,0 1 1,-3 1 47,1-3-640</inkml:trace>
   <inkml:trace contextRef="#ctx0" brushRef="#br0" timeOffset="520.718">1218 296 6656,'16'4'4711,"1"-6"-3287,-16 2-1412,0-1-1,0 1 1,1-1 0,-1 1 0,0-1 0,0 0-1,0 0 1,-1 1 0,1-1 0,0 0-1,0 0 1,0 0 0,0 0 0,-1 0-1,1 0 1,-1 0 0,1 0 0,0 0 0,-1 0-1,0 0 1,1 0 0,-1 0 0,0 0-1,1-1 1,-1 1 0,0 0 0,0 0 0,0 0-1,0-1 1,0 1 0,0 0 0,-1-1-12,1-1-76,0 0 0,-1 0 0,1 0 0,-1 0 1,0 0-1,0 0 0,0 0 0,0 0 0,-1 0 76,2 2-1,-1 1 1,1-1-1,0 1 0,-1-1 0,1 1 0,-1-1 0,1 1 0,-1-1 1,1 1-1,-1 0 0,1-1 0,-1 1 0,1 0 0,-1-1 0,0 1 1,1 0-1,-1 0 0,1-1 0,-1 1 0,0 0 0,1 0 0,-1 0 1,0 0-1,1 0 0,-1 0 0,1 0 0,-1 0 0,0 0 0,1 0 1,-1 1-1,0-1 0,1 0 0,-1 0 0,1 1 0,-1-1 0,1 0 1,-1 0-1,0 1 0,1-1 0,-1 1 0,1-1 0,0 1 0,-1-1 1,0 1 0,-5 4 62,0 0 1,0 0 0,0 1-1,1 0 1,-4 6-63,7-10 39,1 0 1,-1 0-1,1 1 0,0-1 1,0 1-1,0-1 1,0 0-1,1 1 0,-1 0 1,1-1-1,-1 1 0,1-1 1,0 1-1,0-1 0,0 1 1,0 0-1,1-1 1,-1 1-1,1 2-39,2 2-40,0 0-1,0 0 1,0-1 0,1 1-1,0-1 1,0 0 0,1 0 0,0 0-1,1 1 41,3 1-186</inkml:trace>
-  <inkml:trace contextRef="#ctx0" brushRef="#br0" timeOffset="1050.633">1398 8 7168,'-5'-8'2361,"3"9"-974,3 14-573,0-2-971,0 285 2008,-1-287-1796,1-1 53,-1 0 1,-1 0-1,1 0 0,-2 0 1,0 3-109,2-13 14,0 0 1,0 1-1,0-1 1,0 0 0,0 1-1,0-1 1,0 0-1,0 1 1,0-1-1,0 0 1,0 0-1,0 1 1,-1-1-1,1 0 1,0 0-1,0 1 1,0-1-1,-1 0 1,1 0-1,0 1 1,0-1 0,-1 0-1,1 0 1,0 0-1,0 1 1,-1-1-1,1 0 1,0 0-1,-1 0 1,1 0-15,-6-6 238,-3-15-131,9 20-109,-2-4-25,1 1 0,-1-1 0,1 0 0,0 0 0,1 0 0,-1 1 0,1-1 0,0 0 0,0 0 0,1 0 0,-1 0 0,1-1 27,0 4-6,0 0 1,-1 0-1,1 0 1,0 0 0,0 0-1,0 0 1,1 0 0,-1 0-1,0 1 1,1-1-1,-1 0 1,1 1 0,0-1-1,-1 1 1,1 0-1,0-1 1,0 1 0,0 0-1,0 0 1,0 0 0,0 0-1,0 0 1,0 1-1,0-1 1,0 1 0,0-1-1,2 1 6,8-1-218</inkml:trace>
+  <inkml:trace contextRef="#ctx0" brushRef="#br0" timeOffset="1050.632">1398 8 7168,'-5'-8'2361,"3"9"-974,3 14-573,0-2-971,0 285 2008,-1-287-1796,1-1 53,-1 0 1,-1 0-1,1 0 0,-2 0 1,0 3-109,2-13 14,0 0 1,0 1-1,0-1 1,0 0 0,0 1-1,0-1 1,0 0-1,0 1 1,0-1-1,0 0 1,0 0-1,0 1 1,-1-1-1,1 0 1,0 0-1,0 1 1,0-1-1,-1 0 1,1 0-1,0 1 1,0-1 0,-1 0-1,1 0 1,0 0-1,0 1 1,-1-1-1,1 0 1,0 0-1,-1 0 1,1 0-15,-6-6 238,-3-15-131,9 20-109,-2-4-25,1 1 0,-1-1 0,1 0 0,0 0 0,1 0 0,-1 1 0,1-1 0,0 0 0,0 0 0,1 0 0,-1 0 0,1-1 27,0 4-6,0 0 1,-1 0-1,1 0 1,0 0 0,0 0-1,0 0 1,1 0 0,-1 0-1,0 1 1,1-1-1,-1 0 1,1 1 0,0-1-1,-1 1 1,1 0-1,0-1 1,0 1 0,0 0-1,0 0 1,0 0 0,0 0-1,0 0 1,0 1-1,0-1 1,0 1 0,0-1-1,2 1 6,8-1-218</inkml:trace>
   <inkml:trace contextRef="#ctx0" brushRef="#br0" timeOffset="1500.147">1518 282 6912,'-1'1'183,"0"-1"0,0 0 0,0 1 0,0-1 0,0 1 0,0-1 0,0 1 1,0 0-1,0-1 0,0 1 0,0 0 0,0 0 0,1 0 0,-1-1 0,0 1 0,0 0 0,1 0 1,-1 0-1,1 0 0,-1 0 0,1 1 0,-1-1 0,1 0 0,0 0-183,-11 33 179,10-30 144,0-1-139,0 1 1,1-1 0,0 1-1,-1-1 1,1 1 0,0-1 0,0 1-1,1 2-184,-1-6 24,0 1 0,0 0-1,1-1 1,-1 1 0,0-1-1,0 1 1,1 0 0,-1-1-1,0 1 1,1-1-1,-1 1 1,0 0 0,1-1-1,-1 1 1,1-1 0,-1 0-1,1 1 1,-1-1 0,1 1-1,0-1 1,-1 0 0,1 1-1,-1-1 1,1 0 0,0 0-1,-1 1 1,1-1 0,0 0-1,-1 0 1,1 0 0,0 0-1,-1 0 1,1 0 0,0 0-1,-1 0 1,1 0 0,0 0-1,-1 0 1,1-1 0,-1 1-1,1 0 1,0 0 0,-1-1-1,1 1 1,0 0 0,-1-1-1,1 1 1,-1 0-24,9-5-105,0-1-1,0 0 1,-1 0-1,0 0 1,0-1 0,-1 0-1,1-1 1,-2 0 0,6-7 105,4-4-497,-22 65 699,6-40-44,0 0 1,0 0-1,1-1 0,-1 1 0,2 3-158,-2-8-8,0 0 1,0 0-1,1 0 1,-1 0-1,0 0 1,0-1-1,1 1 0,-1 0 1,0 0-1,1 0 1,-1-1-1,1 1 0,-1 0 1,1 0-1,-1-1 1,1 1-1,-1 0 1,1-1-1,0 1 0,-1-1 1,1 1-1,0-1 1,0 1-1,-1-1 1,1 0-1,0 1 0,0-1 1,0 0-1,-1 1 1,1-1-1,0 0 0,0 0 1,0 0-1,0 0 1,0 0-1,0 0 1,-1 0-1,1 0 0,0 0 1,0 0-1,1-1 8,9-4-666</inkml:trace>
   <inkml:trace contextRef="#ctx0" brushRef="#br0" timeOffset="1830.523">1778 264 7296,'-1'-1'2791,"-2"4"-1251,-8 12-994,-9 22-1055,-7 26 962,2 1 0,3 0 1,-6 42-454,23-90-203,1-3-42</inkml:trace>
   <inkml:trace contextRef="#ctx0" brushRef="#br0" timeOffset="2205.214">1709 259 8960,'-1'0'174,"1"-1"-1,-1 1 1,1-1 0,-1 1 0,1-1 0,-1 1 0,1-1 0,-1 0 0,1 1-1,0-1 1,-1 0 0,1 1 0,0-1 0,0 0 0,0 1 0,-1-1-1,1 0 1,0 0 0,0 1 0,0-1 0,0 0 0,0 0 0,0 1 0,0-1-1,1 0-173,-1 0 59,1 1-1,0 0 1,0-1-1,0 1 0,0 0 1,0-1-1,0 1 1,0 0-1,0 0 0,0 0 1,0 0-1,0 0 0,0 0 1,0 0-1,0 0 1,0 0-1,0 0 0,0 0 1,0 1-1,0-1-58,3 1 4,0 0-1,0 0 1,0 1 0,0-1-1,0 1 1,0 0-1,0 0 1,-1 0 0,1 1-1,-1-1 1,1 1-1,-1 0 1,0 0 0,0 0-1,0 0 1,0 1-1,-1-1 1,0 1 0,1 0-4,-1-1 37,-1 1 1,1-1 0,-1 0 0,0 1 0,0-1 0,0 0-1,0 1 1,0-1 0,-1 1 0,0 0 0,0-1 0,0 1-1,0-1 1,0 1 0,-1-1 0,0 1 0,1-1 0,-1 1 0,0-1-1,-1 1 1,1-1 0,-1 0 0,-1 2-38,2-3-87,-1 0 0,1 0 0,-1 0-1,0 0 1,0 0 0,0 0 0,0-1 0,0 1 0,-1 0 87,-11 6-741</inkml:trace>
   <inkml:trace contextRef="#ctx0" brushRef="#br0" timeOffset="3539.052">2068 251 6784,'1'2'3720,"8"12"-2491,-6-10-977,22 27 564,-23-28-797,1-1 0,-1 0 0,1 0 0,-1 1 0,1-2 0,0 1 0,0 0 0,0 0 0,0-1 1,2 1-20,-4-2 72,1 0 1,0 0-1,0 0 1,0 0-1,0 0 1,0 0-1,-1-1 1,1 1-1,0-1 1,0 0-1,0 1 1,-1-1-1,1 0 1,0 0-1,-1 0 1,1 0-1,-1 0 1,1 0-1,-1-1-72,5-3-87,-1 1 0,0-2 0,0 1 0,1-2 87,-59 71-69,11-14 8,22-27-84,1 0 0,1 1 0,-7 15 145,19-29-464</inkml:trace>
   <inkml:trace contextRef="#ctx0" brushRef="#br0" timeOffset="3958.339">2347 235 3456,'-9'6'4986,"1"2"-3655,-5 6-2400,-12 0 2501,16-9-516,0 1 0,0-1 0,-7 8-916,14-11 56,-1 1 0,1-1 0,0 1 0,-1-1 0,2 1 0,-1 0 0,0 0 0,0 0 0,1 0 1,0 0-1,-1 0 0,1 0 0,0 0 0,0 2-56,1-4 4,0 0 0,0 0 0,-1-1 0,1 1 0,0 0 1,0 0-1,0 0 0,0 0 0,0-1 0,0 1 0,0 0 0,0 0 0,1 0 0,-1 0 1,0-1-1,0 1 0,1 0 0,-1 0 0,0 0 0,1-1 0,-1 1 0,1 0 0,-1-1 1,1 1-1,0 0 0,-1-1 0,1 1-4,0-1 8,0 1 1,1-1-1,-1 1 0,0-1 1,1 1-1,-1-1 1,0 0-1,1 0 0,-1 0 1,0 0-1,1 0 0,-1 0 1,0 0-1,1 0 1,0-1-9,4-1 59,1 1 0,-1-2 0,0 1 0,1-1 1,-1 0-1,2-1-59,-4 1 20,1 0-1,-2 0 1,1 0 0,0-1 0,-1 0-1,1 1 1,-1-1 0,1-3-20,-2 6-9,-1-1 0,0 0 0,0 1-1,0-1 1,-1 0 0,1 0 0,0 0 0,-1 0 0,1 0 0,-1 0 0,1 0-1,-1 0 1,0 0 0,0 0 0,0 0 0,0 0 0,-1 0 0,1 0 0,0 0-1,-1 0 1,1 0 0,-1-1 9,0 3-33,1-1 0,0 1 0,0 0 0,0-1-1,-1 1 1,1-1 0,0 1 0,-1 0 0,1-1 0,0 1-1,0 0 1,-1-1 0,1 1 0,-1 0 0,1 0 0,0-1-1,-1 1 1,1 0 0,-1 0 0,1 0 0,0 0 0,-1-1-1,1 1 1,-1 0 0,1 0 0,-1 0 0,1 0 0,-1 0-1,1 0 1,-1 0 0,1 0 0,-1 0 33,-5 1-453</inkml:trace>
   <inkml:trace contextRef="#ctx0" brushRef="#br0" timeOffset="4474.708">2385 283 6912,'-2'1'296,"1"1"0,-1-1 1,1 1-1,0-1 0,-1 1 1,1-1-1,0 1 0,0 0 1,0-1-1,0 1 0,0 0 0,0 0 1,1 0-1,-1 0 0,0 0 1,1 0-1,0 0 0,-1 0 1,1 0-1,0 1-296,0-1 69,0 0 1,0 1 0,0-1-1,0 0 1,0 0-1,0 0 1,0 0-1,1 0 1,-1 0 0,1 0-1,0 1 1,-1-1-1,1-1 1,0 1-1,0 0 1,0 0-1,1 0 1,-1 0 0,1 0-70,-1-1 23,0-1 0,0 0 0,0 1 0,0-1 0,0 0 0,0 1 1,0-1-1,0 0 0,0 0 0,0 0 0,0 0 0,0 0 1,0 0-1,0 0 0,0-1 0,0 1 0,0 0 0,0 0 0,0-1 1,0 1-1,0-1 0,0 1 0,0-1 0,0 1 0,0-1-23,26-18 117,-20 13-108,3-2-298,0-1 0,-1 0 0,4-5 289,16-16-899,-38 65 1897,5 11-476,4-42-523,0 0 0,1 0 0,-1 0 0,1 0 0,0 0 0,0-1 0,0 1 0,0 0 0,0 0 0,2 1 1,1-1-512,0-3-144</inkml:trace>
-  <inkml:trace contextRef="#ctx0" brushRef="#br0" timeOffset="4826.447">2577 268 6912,'1'6'4311,"5"16"-3614,-4-14 291,13 77 1901,-15-80-2685,0-9-600,1 3-457</inkml:trace>
+  <inkml:trace contextRef="#ctx0" brushRef="#br0" timeOffset="4826.446">2577 268 6912,'1'6'4311,"5"16"-3614,-4-14 291,13 77 1901,-15-80-2685,0-9-600,1 3-457</inkml:trace>
   <inkml:trace contextRef="#ctx0" brushRef="#br0" timeOffset="5292.258">2605 412 6784,'0'-5'1086,"0"-1"0,1 1 0,-1-1 0,2 1 0,-1 0 0,0 0 1,1-1-1087,0 2-12,-1 0 0,1 0 1,1 0-1,-1 0 1,0 0-1,1 1 1,0-1-1,0 1 1,0-1-1,0 1 1,0 0-1,1 0 1,-1 1-1,1-1 1,0 1-1,0 0 1,0 0-1,0 0 0,0 0 1,0 1-1,1-1 1,1 1 11,0 0-309</inkml:trace>
   <inkml:trace contextRef="#ctx0" brushRef="#br0" timeOffset="5822.572">2798 278 5632,'-1'-1'284,"1"1"0,-1-1 1,1 0-1,-1 1 0,1-1 0,-1 1 0,1-1 1,-1 1-1,0-1 0,1 1 0,-1 0 1,0-1-1,1 1 0,-1 0 0,0-1-284,0 2 125,0-1 0,0 0 0,0 0 0,0 0 0,0 1 0,0-1 0,0 0 0,0 1 0,0-1 0,0 1 0,0-1 0,1 1 0,-1 0-125,-2 0 125,1 0 1,0 1-1,0-1 1,0 1 0,1-1-1,-1 1 1,0 0-1,1 0 1,-1 0 0,1 0-1,-1 0 1,1 0-1,0 0 1,0 0 0,-1 2-126,1 0 41,1-1 0,-1 1-1,1-1 1,0 1 0,0-1 0,0 1 0,0-1 0,1 1 0,-1-1 0,2 3-41,-1 1 129,1 0-118,0 1-1,-1 0 1,0 0 0,-1 6-11,1-12 58,-1-1 1,-1 1 0,1 0 0,0 0 0,0-1 0,-1 1 0,1 0-1,-1 0 1,1-1 0,-1 1 0,0-1 0,0 1 0,1-1 0,-1 1-1,0-1 1,-1 1 0,1-1 0,0 0 0,0 1 0,0-1 0,-1 0-1,1 0 1,-2 1-59,2-2-30,1 0 0,0 1 0,-1-1 1,1 0-1,0 0 0,-1 0 0,1 0 0,-1 1 0,1-1 0,-1 0 0,1 0 0,0 0 0,-1 0 0,1 0 1,-1 0-1,1 0 0,0 0 0,-1 0 0,1 0 0,-1-1 0,1 1 0,-1 0 0,1 0 30,-6-4-1082</inkml:trace>
   <inkml:trace contextRef="#ctx0" brushRef="#br0" timeOffset="6288.546">2844 346 1152,'0'1'127,"0"0"-1,-1 0 1,1 0 0,0 1-1,0-1 1,0 0 0,0 0-1,0 0 1,0 0 0,0 0-1,0 0 1,0 0 0,1 1-127,-1-2 271,0 1 0,1 0 1,-1 0-1,1-1 1,-1 1-1,1 0 0,-1-1 1,1 1-1,-1 0 1,1-1-1,-1 1 1,1-1-1,0 1 0,-1-1 1,1 1-1,0-1 1,0 0-1,-1 1 0,1-1 1,0 0-1,0 1 1,-1-1-1,1 0 1,0 0-1,0 0 0,0 0 1,0 0-1,-1 0 1,1 0-1,0 0 1,0 0-1,0 0 0,0 0 1,-1 0-1,1-1-271,10-6-261,-5 2 420,-1-1 1,0 0-1,-1 0 0,1 0 0,0-2-159,-4 7 18,0-1-1,-1 0 0,1 0 0,0 0 0,-1 0 0,1 0 0,-1 0 0,1 0 0,-1 1 0,0-3-17,0 3 18,0 1-1,0-1 1,0 0 0,0 0 0,0 1-1,-1-1 1,1 0 0,0 1-1,0-1 1,-1 0 0,1 1 0,0-1-1,-1 0 1,1 1 0,-1-1-1,1 1 1,-1-1 0,1 1 0,-1-1-1,0 1 1,1-1 0,-1 1-1,1-1 1,-1 1 0,0 0 0,1 0-1,-1-1-17,-1 1-21,0-1 0,0 1 0,0 0 0,0-1 0,0 1 0,0 0 0,0 0 0,0 1 0,0-1 0,0 0 0,0 1 0,0-1 0,0 1 0,0-1 0,0 1 0,0 0 0,0 0 0,0 0 21,-3 2 23,1-1 0,0 1 0,0 0 0,0 0 0,0 1 0,-2 2-23,3-3 16,1 0-1,0 0 1,-1 0 0,2 0-1,-1 0 1,0 1 0,1-1-1,-1 1 1,1 0-1,0-1 1,0 1 0,1 0-1,-1-1 1,1 1-1,-1 0 1,1 0 0,1-1-1,-1 1-15,0-1-6,0-1 0,1 1 1,-1-1-1,1 0 0,0 1 0,0-1 0,0 0 0,0 0 1,0 1-1,0-1 0,0 0 0,1 0 0,-1 0 0,1 0 1,0-1-1,-1 1 0,1 0 0,0-1 0,0 1 0,0-1 0,0 0 1,0 1-1,0-1 0,1 0 0,-1 0 0,0-1 0,0 1 1,1 0 5,8 0-390,0-4-132</inkml:trace>
@@ -718,19 +718,19 @@
   <inkml:trace contextRef="#ctx0" brushRef="#br0" timeOffset="2114.161">596 295 8064,'-3'-2'1269,"2"1"-1108,0 0 0,0 0-1,0 0 1,0 0 0,0 0-1,0 0 1,0 0 0,0 1 0,0-1-1,0 0 1,-1 1 0,1-1 0,0 1-1,0 0 1,-1-1 0,1 1 0,0 0-1,-1 0 1,1 0 0,0 0-1,-1 0 1,1 0 0,0 0 0,-1 0-1,1 0 1,0 1 0,-1-1 0,1 0-1,-1 1-160,-1 1 61,0-1-1,0 1 1,0 0 0,0 0-1,0 0 1,0 0 0,1 1-1,-1-1 1,1 1-1,0 0 1,0-1 0,0 1-1,0 0 1,0 0-1,0 1-60,-4 9 113,0-1 0,1 1 0,0 2-113,3-10 75,1 1 0,0-1-1,0 1 1,0-1 0,1 1 0,0-1-1,0 3-74,0-6 24,0-1-1,0 0 0,1 0 0,-1 1 0,0-1 0,1 0 0,-1 0 0,0 0 0,1 0 1,0 1-1,-1-1 0,1 0 0,0 0 0,-1 0 0,2 1-23,-1-2 8,-1 0 0,1 1 0,0-1 0,0 1 0,-1-1-1,1 0 1,0 0 0,0 1 0,0-1 0,0 0 0,0 0 0,-1 0-1,1 0 1,0 0 0,0 0 0,0 0 0,0 0 0,0 0 0,-1-1 0,1 1-1,0 0 1,0-1 0,0 1 0,-1 0 0,2-1-8,8-4-185,-1 0 0,1-1 0,-1 0 0,0-1 0,0 0 0,3-4 185,8-8-703,18-23 703,-41 46 148,1 0 1,0 1 0,0-1 0,0 0-1,0 1 1,1-1 0,0 1 0,0 0 0,0 1-149,0-3-20,1-1 1,-1 0-1,1 1 1,0-1-1,0 0 1,0 1-1,0-1 1,1 0-1,-1 1 1,1-1-1,-1 0 1,1 1-1,0-1 1,0 0-1,0 0 1,0 0-1,0 0 1,0 0-1,1 0 1,-1 0-1,1 0 1,-1-1-1,1 1 1,-1 0-1,1-1 1,0 1 19,9 3-432,0-1 64</inkml:trace>
   <inkml:trace contextRef="#ctx0" brushRef="#br0" timeOffset="2502.267">812 257 6912,'-2'-1'319,"1"0"0,0 1 0,-1-1 1,0 1-1,1-1 0,-1 1 0,1-1 0,-1 1 1,1 0-1,-1 0 0,0 0 0,1 0 0,-1 0 1,0 0-1,1 0 0,-1 1 0,0-1-319,-1 1 200,0 0-1,-1 0 0,1 1 0,0-1 1,0 1-1,0 0 0,0 0 0,-1 1-199,0 0 73,1-1 0,0 1 0,0 0 0,0 1 0,0-1 0,1 0 0,-1 1 0,1-1 0,0 1 0,0 0 0,0 0 0,0 0 0,1 0 0,-1 0-73,2 2 37,0-1 0,1 0 0,-1 1 0,1-1 0,0 0-1,0 0 1,1 1 0,-1-1 0,1 0 0,0 0 0,1-1 0,1 5-37,0-3 80,-1 0 0,-1 1 1,1-1-1,-1 1 0,0 0 0,0 5-80,-2-10-1,0 1-1,0-1 0,0 0 1,0 0-1,0 1 0,-1-1 1,1 0-1,-1 0 0,0 1 0,1-1 1,-1 0-1,0 0 0,0 0 1,-1 0-1,1 0 0,0 0 1,-1-1-1,1 1 0,-1 0 1,1-1-1,-1 1 0,0-1 1,0 1 1,-5 3-496,0 0-96</inkml:trace>
   <inkml:trace contextRef="#ctx0" brushRef="#br0" timeOffset="2880.114">886 336 7296,'8'-10'2821,"-8"10"-2789,0 0-1,0 0 0,0 0 0,1 0 1,-1 0-1,0 0 0,0 0 0,0 0 1,0 0-1,0 0 0,0 0 0,0 0 1,0 0-1,0 0 0,0 0 0,0 0 1,0 0-1,1 0 0,-1 0 0,0 0 1,0 0-1,0 1 0,0-1 0,0 0 1,0 0-1,0 0 0,0 0 0,0 0 1,0 0-1,0 0 0,0 0 0,0 0 0,0 0 1,0 0-1,0 0 0,0 1 0,0-1 1,0 0-1,0 0 0,0 0 0,0 0 1,0 0-1,0 0 0,0 0 0,0 0 1,0 0-1,0 0 0,0 0 0,0 1 1,0-1-1,0 0 0,0 0 0,0 0 1,0 0-1,0 0 0,-1 0 0,1 0 1,0 0-32,-6 23 1448,4-17-1381,0-1 176,1 1 0,-1 0 0,1 0 0,1 0 0,-1-1 0,1 1 0,0 0 0,0 0 0,1 2-243,-1-6 26,1 0 1,-1-1 0,0 1 0,1-1 0,-1 1-1,1-1 1,-1 1 0,1-1 0,0 1 0,0-1 0,0 1-1,0-1 1,0 0 0,0 0 0,0 1 0,0-1-1,0 0 1,0 0 0,1 0 0,-1 0 0,0 0-1,1-1 1,-1 1 0,1 0 0,-1-1 0,1 1 0,-1-1-1,1 1 1,0-1 0,-1 0 0,1 1 0,-1-1-1,1 0 1,0 0 0,-1 0 0,2-1-27,-1 1-10,1 0 0,-1-1 0,0 0 0,1 0 1,-1 0-1,0 0 0,1 0 0,-1 0 0,0 0 0,0-1 0,0 1 0,0-1 1,0 1-1,-1-1 0,1 0 0,0 0 0,-1 0 0,1 0 0,-1 0 10,6-8-262,-1-1 0,0 0-1,2-5 263,2-4-700,-3 8 407,-4 7 320,0 0 0,0 0-1,-1 0 1,1 0-1,-1 0 1,0-1-27,-5 17 403,0 0-180,1 1-1,0 0 1,1 0-1,0 1-222,1-10-39,0 1 0,0-1 0,0 0-1,0 0 1,1 0 0,0 0 0,0 1-1,-1-1 1,2 0 0,-1 0-1,0 0 1,1-1 0,-1 1 0,1 0-1,0-1 1,0 1 0,0-1 0,0 1 39,6 3-816</inkml:trace>
-  <inkml:trace contextRef="#ctx0" brushRef="#br0" timeOffset="3235.166">1157 353 7552,'0'7'1369,"-1"4"-172,1 1-1,1 0 0,0-1 0,0 1 1,1-1-1,1 1 0,1 2-1196,-4-14 17,0 1-1,0-1 0,0 0 0,0 0 0,0 1 0,0-1 0,1 0 1,-1 0-1,0 1 0,0-1 0,0 0 0,0 0 0,0 0 0,1 1 1,-1-1-1,0 0 0,0 0 0,0 0 0,1 1 0,-1-1 0,0 0 1,0 0-1,1 0 0,-1 0 0,0 0 0,0 0 0,1 1 0,-1-1 0,0 0 1,0 0-1,1 0 0,-1 0 0,0 0-16,7-7 132,1-15-165,-7 21 57,3-12-122,-2 5-46,0 1 0,0 0-1,1 0 1,0 0 0,0 1-1,1-1 1,-1 1 0,1-1-1,1 1 1,3-4 144,6 0-1082</inkml:trace>
+  <inkml:trace contextRef="#ctx0" brushRef="#br0" timeOffset="3235.165">1157 353 7552,'0'7'1369,"-1"4"-172,1 1-1,1 0 0,0-1 0,0 1 1,1-1-1,1 1 0,1 2-1196,-4-14 17,0 1-1,0-1 0,0 0 0,0 0 0,0 1 0,0-1 0,1 0 1,-1 0-1,0 1 0,0-1 0,0 0 0,0 0 0,0 0 0,1 1 1,-1-1-1,0 0 0,0 0 0,0 0 0,1 1 0,-1-1 0,0 0 1,0 0-1,1 0 0,-1 0 0,0 0 0,0 0 0,1 1 0,-1-1 0,0 0 1,0 0-1,1 0 0,-1 0 0,0 0-16,7-7 132,1-15-165,-7 21 57,3-12-122,-2 5-46,0 1 0,0 0-1,1 0 1,0 0 0,0 1-1,1-1 1,-1 1 0,1-1-1,1 1 1,3-4 144,6 0-1082</inkml:trace>
   <inkml:trace contextRef="#ctx0" brushRef="#br0" timeOffset="3618.298">1322 443 7552,'2'0'480,"1"1"1,0-1-1,0 0 0,0 0 1,0 0-1,0 0 1,0 0-1,0-1 1,0 0-1,-1 1 0,3-2-480,0 0 244,0 0-1,0 0 0,-1 0 1,1-1-1,-1 0 1,0 0-1,2-2-243,-2 3 9,-1-1 0,0 0 1,0 0-1,-1 0 0,1 0 0,0 0 1,-1-1-1,0 0 0,0 1 0,0-1 1,0 0-1,-1 0 0,1 0 0,-1 0 1,0 0-1,0 0 0,-1 0 0,1 0 1,-1 0-1,0-3-9,0 6 14,0 0 1,0 0 0,0-1-1,0 1 1,-1 0-1,1 0 1,0 0-1,-1 0 1,1 0 0,-1 0-1,1 0 1,-1 0-1,0 0 1,1 0-1,-1 0 1,0 0-1,0 1 1,1-1 0,-1 0-1,0 0 1,0 1-1,0-1 1,0 1-1,0-1 1,0 1 0,0-1-1,0 1 1,0-1-1,0 1 1,0 0-1,-1 0 1,1-1-1,0 1 1,0 0 0,0 0-1,0 0 1,0 0-1,-1 1 1,1-1-1,-1 0-14,-4 1 22,-1 1 0,1-1 0,0 1 1,-1 0-1,1 1 0,-3 1-22,3-1 40,0 0 1,1 1-1,-1 0 1,1-1 0,0 2-1,0-1 1,1 1-1,-1-1 1,1 1-1,0 0 1,-1 2-41,4-5 14,0-1 0,0 1 1,0 0-1,0 0 0,1 0 0,-1-1 0,0 1 0,1 0 1,-1 0-1,1 0 0,0 0 0,-1 0 0,1 0 0,0 0 1,0 1-1,1-1 0,-1 0 0,0 0 0,1 0 0,-1 0 1,1-1-1,-1 1 0,1 0 0,0 0 0,0 0 0,0 0 1,0-1-1,0 1 0,1 0 0,-1-1 0,0 1 0,1-1 0,-1 1 1,1-1-1,-1 0 0,1 0 0,0 1-14,5 2-163,0 1 0,0-1 0,1 0 0,-1-1 0,1 0 0,0 0 0,7 1 163,3 0-869</inkml:trace>
-  <inkml:trace contextRef="#ctx0" brushRef="#br0" timeOffset="4354.734">1505 402 7552,'1'3'804,"-1"1"0,1 0 0,-1 0 0,0 1 0,0-1 0,0 0 0,0 0 0,-1 0 0,1 0 0,-1 1-804,-2 11 2311,3-15-2309,0-1 0,0 0 0,0 0-1,0 1 1,0-1 0,0 0 0,0 0-1,0 1 1,0-1 0,0 0 0,0 0-1,0 1 1,0-1 0,0 0 0,0 0-1,0 1 1,0-1 0,0 0 0,0 0-1,0 1 1,0-1 0,1 0 0,-1 0-1,0 1 1,0-1 0,0 0 0,0 0-1,1 0 1,-1 0 0,0 1 0,0-1-1,1 0 1,-1 0 0,0 0-1,0 0 1,0 0 0,1 0 0,-1 0-1,0 1-1,13-5-38,10-10-152,-14 5-76,0 0 0,7-9 266,-10 11-129,-1 1-1,1 0 0,0 0 1,0 0-1,1 1 0,-1-1 1,6-1 129,-12 7-7,1-1 1,-1 1 0,0 0 0,1 0 0,-1 0-1,0 0 1,1 0 0,-1-1 0,1 1 0,-1 0-1,0 0 1,1 0 0,-1 0 0,1 0 0,-1 0-1,0 0 1,1 0 0,-1 0 0,0 1 0,1-1-1,-1 0 1,1 0 0,-1 0 0,0 0 0,1 0-1,-1 1 1,0-1 0,1 0 0,-1 0 0,0 1 6,7 11 51,-5 17 915,-2-23-606,0-1-148,0 0 1,0 0-1,1 1 0,-1-1 1,2 2-213,-2-7 8,0 1 1,0-1-1,0 1 1,0-1 0,1 1-1,-1-1 1,0 1-1,0-1 1,1 1-1,-1-1 1,0 1-1,1-1 1,-1 1-1,0-1 1,1 0 0,-1 1-1,1-1 1,-1 0-1,1 1 1,-1-1-1,1 0-8,-1 0-5,1 0 0,0 0-1,0 0 1,-1 0-1,1 0 1,0 0 0,0 0-1,-1 0 1,1-1 0,0 1-1,-1 0 1,1 0-1,0-1 1,-1 1 0,1 0-1,0-1 1,-1 1-1,1-1 1,-1 1 0,1-1 5,19-16-1347,-16 13 1051,0 0 0,0 0-1,1 0 1,0 0 0,0 1 0,0 0-1,0 0 1,1 0 0,-1 1 0,4-2 296,-8 4 22,1 0 1,-1 0 0,0 0-1,0 0 1,1 0-1,-1 0 1,0 1 0,0-1-1,0 0 1,1 0 0,-1 1-1,0-1 1,0 1 0,0-1-1,0 1 1,0 0 0,0-1-1,0 1 1,0 0 0,1 0-23,19 23 1476,-2-4-462,16 1-1648,-29-16-91</inkml:trace>
+  <inkml:trace contextRef="#ctx0" brushRef="#br0" timeOffset="4354.733">1505 402 7552,'1'3'804,"-1"1"0,1 0 0,-1 0 0,0 1 0,0-1 0,0 0 0,0 0 0,-1 0 0,1 0 0,-1 1-804,-2 11 2311,3-15-2309,0-1 0,0 0 0,0 0-1,0 1 1,0-1 0,0 0 0,0 0-1,0 1 1,0-1 0,0 0 0,0 0-1,0 1 1,0-1 0,0 0 0,0 0-1,0 1 1,0-1 0,0 0 0,0 0-1,0 1 1,0-1 0,1 0 0,-1 0-1,0 1 1,0-1 0,0 0 0,0 0-1,1 0 1,-1 0 0,0 1 0,0-1-1,1 0 1,-1 0 0,0 0-1,0 0 1,0 0 0,1 0 0,-1 0-1,0 1-1,13-5-38,10-10-152,-14 5-76,0 0 0,7-9 266,-10 11-129,-1 1-1,1 0 0,0 0 1,0 0-1,1 1 0,-1-1 1,6-1 129,-12 7-7,1-1 1,-1 1 0,0 0 0,1 0 0,-1 0-1,0 0 1,1 0 0,-1-1 0,1 1 0,-1 0-1,0 0 1,1 0 0,-1 0 0,1 0 0,-1 0-1,0 0 1,1 0 0,-1 0 0,0 1 0,1-1-1,-1 0 1,1 0 0,-1 0 0,0 0 0,1 0-1,-1 1 1,0-1 0,1 0 0,-1 0 0,0 1 6,7 11 51,-5 17 915,-2-23-606,0-1-148,0 0 1,0 0-1,1 1 0,-1-1 1,2 2-213,-2-7 8,0 1 1,0-1-1,0 1 1,0-1 0,1 1-1,-1-1 1,0 1-1,0-1 1,1 1-1,-1-1 1,0 1-1,1-1 1,-1 1-1,0-1 1,1 0 0,-1 1-1,1-1 1,-1 0-1,1 1 1,-1-1-1,1 0-8,-1 0-5,1 0 0,0 0-1,0 0 1,-1 0-1,1 0 1,0 0 0,0 0-1,-1 0 1,1-1 0,0 1-1,-1 0 1,1 0-1,0-1 1,-1 1 0,1 0-1,0-1 1,-1 1-1,1-1 1,-1 1 0,1-1 5,19-16-1347,-16 13 1051,0 0 0,0 0-1,1 0 1,0 0 0,0 1 0,0 0-1,0 0 1,1 0 0,-1 1 0,4-2 296,-8 4 22,1 0 1,-1 0 0,0 0-1,0 0 1,1 0-1,-1 0 1,0 1 0,0-1-1,0 0 1,1 0 0,-1 1-1,0-1 1,0 1 0,0-1-1,0 1 1,0 0 0,0-1-1,0 1 1,0 0 0,1 0-23,19 23 1476,-2-4-462,16 1-1648,-29-16-91</inkml:trace>
   <inkml:trace contextRef="#ctx0" brushRef="#br0" timeOffset="4874.686">1905 387 3456,'0'2'401,"0"-1"0,0 1 1,0 0-1,0 0 0,0 0 1,1 0-1,-1 0 0,0 0 1,1 0-1,-1 0 0,1-1 1,0 1-1,0 0 0,0 0 0,0-1 1,0 1-1,0 0-401,0-1 171,0 0 0,0 0 0,-1-1 0,1 1 0,0 0 0,0-1 0,0 1 0,0-1 0,0 1 0,-1-1 0,1 1 0,0-1 0,0 0-1,0 1 1,1-1 0,-1 0 0,0 0 0,0 0 0,0 0 0,0 0 0,0 0 0,0 0 0,0 0 0,0 0 0,0 0 0,0 0 0,0-1 0,0 1 0,0-1 0,0 1 0,0 0 0,0-1-171,1-1 22,1 1 1,-1-1-1,1 0 1,-1 0-1,0 0 1,0 0-1,0 0 1,0 0-1,0-1 1,-1 1-1,1-1 1,-1 1 0,0-1-1,1 0 1,-1 1-1,0-1 1,0 0-1,-1 0 1,1 0-1,-1-1-22,1 1-45,-1-1 1,1 1-1,-1-1 0,0 1 1,0-1-1,-1 1 0,1-1 1,-1 1-1,0 0 0,0-1 1,0 1-1,0 0 0,0 0 1,-1-1-1,1 1 0,-1 0 1,-1-1 44,2 3 7,1 0 1,-1 1-1,1-1 1,-1 1-1,1-1 0,-1 0 1,1 1-1,-1-1 1,0 1-1,1 0 1,-1-1-1,0 1 1,0-1-1,1 1 1,-1 0-1,0 0 1,0-1-1,1 1 1,-1 0-1,0 0 1,0 0-1,0 0 1,1 0-1,-1 0 1,-1 0-8,1 1-7,-1-1 0,1 1 0,-1 0 0,1-1 1,-1 1-1,1 0 0,-1 0 0,1 0 0,0 0 0,0 0 0,-1 0 0,1 1 7,-5 5 149,1-1-1,1 1 1,-1 0-1,-1 5-148,3-6 92,1-1 0,0 1 0,0 0 0,0-1 1,1 1-1,-1 0 0,2 0 0,-1 0 0,1 0 0,0 0 0,0 3-92,0-5 2,1 1 1,-1-1-1,1 0 0,0 0 1,0 0-1,0 0 1,1 0-1,0 0 0,-1 0 1,1-1-1,1 1 0,-1 0 1,0-1-1,1 0 0,0 1 1,2 1-3,-3-4 17,0 0 1,0 0-1,0 0 1,0 0-1,0 0 1,0-1-1,0 1 1,0-1-1,0 0 1,0 1-1,0-1 1,0 0-1,0 0 1,2-1-18,0 1 160,13 0 741</inkml:trace>
   <inkml:trace contextRef="#ctx0" brushRef="#br0" timeOffset="5325.155">2149 359 8064,'-1'-6'1534,"-2"-1"1920,-2 15-1920,0 7-507,0 0-1,1 0 0,1 1 1,-1 10-1027,3-21 187,1-1-22,-1 1-1,1 0 0,0-1 0,0 1 0,1 0 0,0 0-164,-1-5 8,0 1-1,0 0 1,0 0 0,0-1-1,1 1 1,-1 0 0,0-1-1,0 1 1,1-1 0,-1 1-1,1 0 1,-1-1 0,0 1-1,1-1 1,-1 1-1,1-1 1,0 1 0,-1 0-8,1-1-20,0 0-1,-1 0 1,1 0 0,-1 0 0,1 0 0,0 0-1,-1 0 1,1 0 0,-1 0 0,1 0 0,0-1-1,-1 1 1,1 0 0,-1 0 0,1 0 0,-1-1-1,1 1 1,0 0 0,-1-1 0,1 1 0,-1 0-1,0-1 1,1 1 0,-1-1 0,1 1 0,-1-1 20,24-26-1757,-6 4 932,-17 22 792,4-4-106,1-1 1,-1 1-1,1 1 0,0-1 1,3-1 138,-8 6 19,0-1 1,-1 0-1,1 1 1,0-1-1,0 1 1,0 0 0,0-1-1,0 1 1,0 0-1,0-1 1,0 1 0,-1 0-1,1 0 1,0 0-1,0 0 1,0 0 0,0 0-1,0 0 1,0 0-1,0 0 1,0 0 0,0 1-1,0-1 1,0 0-1,0 1 1,0-1-1,0 1 1,0-1 0,-1 1-1,1-1 1,0 1-1,0 0 1,-1-1 0,1 1-1,0 0 1,-1-1-1,1 1 1,-1 0 0,1 0-1,-1 0 1,1 0-1,-1-1 1,1 1 0,-1 0-1,0 0-19,7 29 226,-6-27-204,-1 1 0,0-1 0,1 1 0,0-1 0,0 0 0,0 1-1,0-1 1,0 0 0,1 0 0,0 0 0,-1 0 0,1 0 0,0 0 0,1 0 0,-1 0-22,-1-2-70,0-1 1,0 0 0,0 1-1,0-1 1,0 0 0,0 1-1,0-1 1,-1 0 0,1 0-1,0 0 1,0 0 0,0 0-1,0 0 1,0 0 0,0 0-1,0 0 1,0-1 0,0 1-1,0 0 1,0 0 0,0-1 0,-1 1-1,1-1 1,0 1 0,0-1-1,0 1 1,-1-1 0,1 1-1,0-1 1,-1 0 0,1 0-1,0 1 1,-1-1 0,1 0 69,6-11-1136</inkml:trace>
   <inkml:trace contextRef="#ctx0" brushRef="#br0" timeOffset="5677.54">2416 88 5760,'-4'-8'1150,"-7"-13"747,2 10 5584,8 11-7439,1 0 0,0 0 0,0 0 0,0 0 0,-1 0 0,1-1 0,0 1 0,0 0 0,0 0 0,-1 0 0,1 0 0,0 0 1,0 0-1,0 0 0,-1 0 0,1 0 0,0 0 0,0 1 0,0-1 0,-1 0 0,1 0 0,0 0 0,0 0 0,0 0 1,-1 0-1,1 0 0,0 0 0,0 0 0,0 1 0,0-1 0,-1 0 0,1 0 0,0 0 0,0 0 0,0 1 0,0-1 0,0 0 1,0 0-1,0 0 0,0 0 0,-1 1 0,1-1 0,0 0 0,0 0 0,0 1-42,-3 9-299,-5 34 215,2 1-1,1 35 85,2-25 276,2-38-139,-2 11-215,1 0-1,2 0 0,0 1 1,2-1-1,4 13 79,-3-31-336,-3-10 298,0 1 0,0-1 0,0 0 0,0 0 0,0 0 0,0 1 0,0-1 0,0 0 0,0 0 0,0 0 0,0 1 0,0-1 0,0 0 0,1 0 0,-1 0 0,0 1 0,0-1 0,0 0 0,0 0 0,0 0 0,1 0 0,-1 0 0,0 0 0,0 1 0,0-1 0,0 0 0,1 0 0,-1 0 0,0 0 0,0 0 0,0 0 0,1 0 0,-1 0 0,0 0 0,0 0 0,0 0 0,1 0 0,-1 0 1,0 0-1,0 0 0,1 0 38,0-3-1152</inkml:trace>
   <inkml:trace contextRef="#ctx0" brushRef="#br0" timeOffset="6046.211">2337 299 9600,'-9'-17'3584,"6"14"-2784,-1 0 224,4 2-96,2-1-289,1 2 1,2 0-224,1 0-96,4 0-160,2 2-416,2 1-128,8-1-384,3 4-159</inkml:trace>
-  <inkml:trace contextRef="#ctx0" brushRef="#br0" timeOffset="8644.565">2772 73 8064,'0'0'137,"-3"-12"2599,3 12-2685,0 0 1,0 0-1,0-1 0,0 1 1,0 0-1,0-1 0,0 1 1,0 0-1,0 0 0,0-1 1,0 1-1,0 0 0,0 0 1,1 0-1,-1-1 0,0 1 1,0 0-1,0 0 0,0 0 1,1-1-1,-1 1 0,0 0 1,0 0-1,0 0 0,1 0 1,-1-1-1,0 1 0,0 0 1,1 0-1,-1 0 0,0 0 1,0 0-1,1 0 0,-1 0 1,0 0-1,0 0 0,1 0 1,-1 0-1,0 0 0,1 0 1,-1 0-1,0 0-51,-3 15 299,-15 36 230,6-19-131,2 0 0,1 1-1,0 7-397,7-27-2,-1 7-26,0 0 0,1 11 28,2-26 6,0-1 0,0 1 0,0-1 0,1 1 0,-1-1 1,1 0-1,0 1 0,1-1 0,-1 0 0,1 0 0,0 0 0,0 0 1,2 4-7,-3-6-9,1 0 1,-1-1-1,1 1 1,-1-1-1,1 0 1,-1 1-1,1-1 1,-1 0-1,1 0 1,0 0-1,0 0 1,0 0-1,0 0 1,0-1-1,0 1 1,0-1-1,0 1 1,0-1-1,0 0 1,0 1-1,0-1 1,0 0-1,0-1 1,0 1-1,0 0 1,0 0-1,0-1 1,0 1-1,0-1 1,0 0-1,0 0 1,0 0-1,-1 0 1,1 0 8,5-3 32,0 0 0,-1 0 0,0-1 0,1 0 0,-2-1 0,1 1 0,-1-1 1,1-1-33,23-30-59,-1-1 0,-2-1 1,18-37 58,-42 72 48,0 1 94,0-1-1,0 0 1,-1 1-1,1-1 1,-1 0 0,0 0-1,0 0 1,0 0-1,0-2-141,-1 6 10,0-1-1,0 1 1,0 0-1,0 0 1,0 0-1,0 0 1,0-1-1,0 1 1,0 0-1,0 0 1,0 0-1,0 0 1,0 0-1,0-1 1,0 1-1,0 0 1,0 0-1,0 0 1,0 0-1,0-1 1,0 1-1,0 0 1,-1 0-1,1 0 1,0 0-1,0 0 1,0 0-1,0-1 1,0 1-1,0 0 1,0 0-1,-1 0 1,1 0-1,0 0 1,0 0-1,0 0 1,0 0-1,0 0 1,-1 0-1,1-1 1,0 1-10,-6 5 121,-5 11-253,3 0 239,2 1 0,0-1 0,0 1 0,2 0 0,0 1-1,1-1 1,0 10-107,-2 3 297,5-26-354,-4 17 530,1 1 0,2 2-473,0-19-448,1 1 0,1-1 1,-1 1-1,1-1 0,0 1 0,0-1 0,0 0 1,1 1-1,0-1 0,1 4 448,5 3-4069</inkml:trace>
+  <inkml:trace contextRef="#ctx0" brushRef="#br0" timeOffset="8644.564">2772 73 8064,'0'0'137,"-3"-12"2599,3 12-2685,0 0 1,0 0-1,0-1 0,0 1 1,0 0-1,0-1 0,0 1 1,0 0-1,0 0 0,0-1 1,0 1-1,0 0 0,0 0 1,1 0-1,-1-1 0,0 1 1,0 0-1,0 0 0,0 0 1,1-1-1,-1 1 0,0 0 1,0 0-1,0 0 0,1 0 1,-1-1-1,0 1 0,0 0 1,1 0-1,-1 0 0,0 0 1,0 0-1,1 0 0,-1 0 1,0 0-1,0 0 0,1 0 1,-1 0-1,0 0 0,1 0 1,-1 0-1,0 0-51,-3 15 299,-15 36 230,6-19-131,2 0 0,1 1-1,0 7-397,7-27-2,-1 7-26,0 0 0,1 11 28,2-26 6,0-1 0,0 1 0,0-1 0,1 1 0,-1-1 1,1 0-1,0 1 0,1-1 0,-1 0 0,1 0 0,0 0 0,0 0 1,2 4-7,-3-6-9,1 0 1,-1-1-1,1 1 1,-1-1-1,1 0 1,-1 1-1,1-1 1,-1 0-1,1 0 1,0 0-1,0 0 1,0 0-1,0 0 1,0-1-1,0 1 1,0-1-1,0 1 1,0-1-1,0 0 1,0 1-1,0-1 1,0 0-1,0-1 1,0 1-1,0 0 1,0 0-1,0-1 1,0 1-1,0-1 1,0 0-1,0 0 1,0 0-1,-1 0 1,1 0 8,5-3 32,0 0 0,-1 0 0,0-1 0,1 0 0,-2-1 0,1 1 0,-1-1 1,1-1-33,23-30-59,-1-1 0,-2-1 1,18-37 58,-42 72 48,0 1 94,0-1-1,0 0 1,-1 1-1,1-1 1,-1 0 0,0 0-1,0 0 1,0 0-1,0-2-141,-1 6 10,0-1-1,0 1 1,0 0-1,0 0 1,0 0-1,0 0 1,0-1-1,0 1 1,0 0-1,0 0 1,0 0-1,0 0 1,0 0-1,0-1 1,0 1-1,0 0 1,0 0-1,0 0 1,0 0-1,0-1 1,0 1-1,0 0 1,-1 0-1,1 0 1,0 0-1,0 0 1,0 0-1,0-1 1,0 1-1,0 0 1,0 0-1,-1 0 1,1 0-1,0 0 1,0 0-1,0 0 1,0 0-1,0 0 1,-1 0-1,1-1 1,0 1-10,-6 5 121,-5 11-253,3 0 239,2 1 0,0-1 0,0 1 0,2 0 0,0 1-1,1-1 1,0 10-107,-2 3 297,5-26-354,-4 17 530,1 1 0,2 2-473,0-19-448,1 1 0,1-1 1,-1 1-1,1-1 0,0 1 0,0-1 0,0 0 1,1 1-1,0-1 0,1 4 448,5 3-4069</inkml:trace>
   <inkml:trace contextRef="#ctx0" brushRef="#br0" timeOffset="9033.962">3109 317 9216,'0'0'159,"0"-1"1,0 1-1,0-1 1,0 1-1,0 0 1,0-1-1,0 1 1,-1-1-1,1 1 1,0 0-1,0-1 1,0 1-1,-1-1 1,1 1-1,0 0 1,0-1-1,-1 1 1,1 0-1,0 0 1,0-1-1,-1 1 1,1 0-1,0 0 1,-1-1-1,1 1 1,-1 0-1,1 0-159,-11 6 915,9-5-1086,-8 6 339,0 1-39,0-1 1,1 2-1,-1-1-129,8-6 65,0 1 1,0-1-1,0 0 0,0 0 1,1 1-1,-1-1 0,1 1 1,0 0-1,-1-1 0,1 1 1,0 0-1,1 0 0,-1-1 1,0 1-1,1 1-65,0-2 0,0-1 0,0 1 0,0-1 0,0 1 0,0-1-1,1 1 1,-1-1 0,1 1 0,-1-1 0,1 1 0,0-1 0,-1 0 0,1 1 0,0-1-1,0 0 1,0 0 0,0 0 0,0 1 0,24 17 143,-22-17-129,0-1 1,-1 1-1,1 0 1,0 0-1,-1 0 0,0 0 1,1 0-1,-1 1 1,0-1-1,0 1 1,0-1-1,-1 1 1,1 0-1,-1-1 1,1 2-15,-2-3 27,0 0 1,0 0 0,0 0 0,0 0 0,0 0 0,-1 0-1,1 1 1,0-1 0,0 0 0,-1 0 0,1 0 0,-1-1-1,1 1 1,-1 0 0,1 0 0,-1 0 0,0 0 0,0 0-1,1-1 1,-1 1 0,0 0 0,0 0 0,0-1 0,1 1 0,-1-1-1,0 1 1,0-1 0,0 1 0,0-1 0,0 0 0,0 1-1,0-1 1,0 0-28,-5 2 62,1 0-1,0-1 1,-1 0 0,1 0-1,-5 0-61,7 0-179,2-1 25,0 0 0,0 0 0,0 0 0,0 0 0,0 0 0,-1 0 0,1 0 0,0 0 0,0 0 0,0-1 0,0 1 0,0 0 0,0-1 154,0 0-1157</inkml:trace>
   <inkml:trace contextRef="#ctx0" brushRef="#br0" timeOffset="9394.829">3185 399 8192,'-5'7'3072,"5"-5"-2400,4 4 544,-2-1 32,2 2-832,-1 2-192,-1-1-32,-1 0 0,-1 2-64,-1-2 128,1 0 64,0-1-256,1 0-64,0-2-480,4-2-64</inkml:trace>
   <inkml:trace contextRef="#ctx0" brushRef="#br0" timeOffset="9395.829">3196 254 3200,'-25'-17'1216,"18"15"-928,-3-3 3200,9 4 1408,-1 0-2912,2-1-1312,0 2-1280,0 0-384</inkml:trace>
   <inkml:trace contextRef="#ctx0" brushRef="#br0" timeOffset="9771.513">3320 406 11136,'0'0'132,"0"0"1,0 0-1,-1 0 1,1 0-1,0 0 1,0 0-1,-1 0 1,1 0-1,0 1 1,0-1-1,0 0 1,-1 0-1,1 0 1,0 0-1,0 1 1,0-1-1,0 0 0,0 0 1,-1 0-1,1 1 1,0-1-1,0 0 1,0 0-1,0 0 1,0 1-1,0-1 1,0 0-1,0 0 1,0 1-1,0-1 1,0 0-1,0 0 1,0 1-1,0-1 1,0 0-1,0 0 1,0 1-1,0-1 1,0 0-1,0 0 1,0 1-1,0-1 1,1 0-1,-1 0-132,6 18 507,-1-1-236,-5-8-49,0-7-106,0 1 0,0-1 0,1 0 0,-1 1 0,0-1 0,1 1 0,0-1 0,-1 0-116,1-2 5,-1 1 0,0-1 1,0 0-1,0 0 0,0 0 1,0 1-1,0-1 0,1 0 1,-1 0-1,0 0 0,0 0 1,0 0-1,0 1 0,1-1 0,-1 0 1,0 0-1,0 0 0,0 0 1,1 0-1,-1 0 0,0 0 1,0 0-1,1 0 0,-1 0 1,0 0-1,0 0 0,0 0 1,1 0-1,-1 0 0,0 0 0,0 0-5,12-8-391,14-23-1284,-21 24 1308,1 0 0,-1 1 0,1-1 0,0 1-1,1 0 1,0 1 0,2-2 367,-9 7 59,1 0 1,-1 0 0,1-1-1,0 1 1,-1 0-1,1 0 1,0 0-1,-1 0 1,1 0-1,0 0 1,-1 0 0,1 0-1,0 0 1,-1 0-1,1 0 1,0 0-1,-1 1 1,1-1 0,0 0-1,-1 0 1,1 1-1,-1-1 1,1 0-1,-1 1 1,1-1-1,-1 1 1,1-1 0,-1 1-1,1-1 1,-1 1-1,1-1 1,-1 1-1,0-1 1,1 1-1,-1-1 1,0 1-60,15 28 2013,-10-18-1685,-1-5-568,0 0 0,0 0 0,1-1 0,0 1 0,0-1 0,3 2 240,-7-6-139,8 8-1220</inkml:trace>
-  <inkml:trace contextRef="#ctx0" brushRef="#br0" timeOffset="10860.477">3665 381 5888,'1'-3'605,"0"1"1,0-1-1,0 1 1,-1-1 0,1 1-1,-1-1 1,1 0-1,-1 1 1,0-1-606,0 3 135,0-1 1,0 1-1,0-1 1,0 1 0,-1-1-1,1 1 1,0-1-1,0 1 1,0 0 0,0-1-1,-1 1 1,1-1-1,0 1 1,0 0 0,-1-1-1,1 1 1,0 0-1,-1-1 1,1 1 0,0 0-1,-1-1 1,1 1-136,-1 0 36,0 0 0,0-1 0,1 1 0,-1 0 0,0 0 0,0 0 0,0 0 0,0 0 0,1 0 0,-1 0 0,0 0 0,0 0 0,0 1 0,0-1 0,1 0 0,-1 0 0,0 1-36,-3 0 42,1 1-1,0 0 1,-1 0 0,1 0-1,0 1 1,0-1 0,0 1 0,1 0-1,-1-1 1,1 1 0,-2 2-42,-1 2 66,1-1 0,0 1 0,0 0 0,0 0 0,0 1-66,4-5 35,-1-1 0,0 1 0,1-1-1,-1 1 1,1 0 0,0-1 0,0 1 0,0 0 0,0-1-1,0 1 1,1 0 0,0 2-35,-1-5 6,0 1-1,0 0 1,1-1-1,-1 1 1,0-1-1,0 1 1,1 0-1,-1-1 1,1 1-1,-1-1 1,1 1-1,-1-1 1,1 1 0,-1-1-1,1 1 1,-1-1-1,1 0 1,-1 1-1,1-1 1,0 1-6,0-1 5,0 0 0,0 0 1,0 0-1,0 0 0,0 0 1,0 0-1,0 0 0,0 0 1,-1-1-1,1 1 0,0 0 0,0 0 1,0-1-1,0 1 0,0-1 1,0 1-1,0-1 0,-1 1 0,1-1-5,3-2-53,0 0-1,-1 0 0,1-1 0,-1 1 1,0-1-1,0 0 0,0 0 0,0 0 0,0-1 54,17-22-1265,-18 38 743,-13 201 2228,8-187-1117,-4 21-589,5-38 128,0 1 1,-1-1-1,0 1 1,0-1 0,-1 0-1,-4 7-128,8-14 1,-1 0 0,0 0-1,1 0 1,-1 0 0,0-1-1,0 1 1,0 0 0,0 0-1,0-1 1,1 1 0,-1-1-1,0 1 1,0-1 0,-1 1-1,1-1 1,0 1 0,0-1-1,0 0 1,0 0 0,0 0 0,0 1-1,0-1 1,0 0 0,-1 0-1,1-1 1,0 1 0,0 0-1,0 0 1,0 0 0,0-1-1,0 1 1,0-1 0,0 1-1,0-1 1,0 1 0,0-1-1,0 1 1,0-1 0,-1-1-1,0 1-3,0-1-1,0 1 1,0-1 0,0 0 0,1 1-1,-1-1 1,0 0 0,1 0-1,0 0 1,-1-1 0,1 1 0,0 0-1,0 0 1,0-1 0,0 1 0,1-1-1,-1 1 1,1-1 3,0-2 28,0 0 0,1 1 0,0-1-1,0 0 1,0 1 0,1-1 0,-1 0-1,1 1 1,0 0 0,0-1 0,1 0-28,2-3-7,0 0 0,1 1 1,-1-1-1,1 1 0,3-2 7,-5 5-196,1 0 1,0 1-1,0-1 0,-1 1 0,2 0 0,-1 0 1,2 0 195,14-5-1296</inkml:trace>
+  <inkml:trace contextRef="#ctx0" brushRef="#br0" timeOffset="10860.476">3665 381 5888,'1'-3'605,"0"1"1,0-1-1,0 1 1,-1-1 0,1 1-1,-1-1 1,1 0-1,-1 1 1,0-1-606,0 3 135,0-1 1,0 1-1,0-1 1,0 1 0,-1-1-1,1 1 1,0-1-1,0 1 1,0 0 0,0-1-1,-1 1 1,1-1-1,0 1 1,0 0 0,-1-1-1,1 1 1,0 0-1,-1-1 1,1 1 0,0 0-1,-1-1 1,1 1-136,-1 0 36,0 0 0,0-1 0,1 1 0,-1 0 0,0 0 0,0 0 0,0 0 0,0 0 0,1 0 0,-1 0 0,0 0 0,0 0 0,0 1 0,0-1 0,1 0 0,-1 0 0,0 1-36,-3 0 42,1 1-1,0 0 1,-1 0 0,1 0-1,0 1 1,0-1 0,0 1 0,1 0-1,-1-1 1,1 1 0,-2 2-42,-1 2 66,1-1 0,0 1 0,0 0 0,0 0 0,0 1-66,4-5 35,-1-1 0,0 1 0,1-1-1,-1 1 1,1 0 0,0-1 0,0 1 0,0 0 0,0-1-1,0 1 1,1 0 0,0 2-35,-1-5 6,0 1-1,0 0 1,1-1-1,-1 1 1,0-1-1,0 1 1,1 0-1,-1-1 1,1 1-1,-1-1 1,1 1-1,-1-1 1,1 1 0,-1-1-1,1 1 1,-1-1-1,1 0 1,-1 1-1,1-1 1,0 1-6,0-1 5,0 0 0,0 0 1,0 0-1,0 0 0,0 0 1,0 0-1,0 0 0,0 0 1,-1-1-1,1 1 0,0 0 0,0 0 1,0-1-1,0 1 0,0-1 1,0 1-1,0-1 0,-1 1 0,1-1-5,3-2-53,0 0-1,-1 0 0,1-1 0,-1 1 1,0-1-1,0 0 0,0 0 0,0 0 0,0-1 54,17-22-1265,-18 38 743,-13 201 2228,8-187-1117,-4 21-589,5-38 128,0 1 1,-1-1-1,0 1 1,0-1 0,-1 0-1,-4 7-128,8-14 1,-1 0 0,0 0-1,1 0 1,-1 0 0,0-1-1,0 1 1,0 0 0,0 0-1,0-1 1,1 1 0,-1-1-1,0 1 1,0-1 0,-1 1-1,1-1 1,0 1 0,0-1-1,0 0 1,0 0 0,0 0 0,0 1-1,0-1 1,0 0 0,-1 0-1,1-1 1,0 1 0,0 0-1,0 0 1,0 0 0,0-1-1,0 1 1,0-1 0,0 1-1,0-1 1,0 1 0,0-1-1,0 1 1,0-1 0,-1-1-1,0 1-3,0-1-1,0 1 1,0-1 0,0 0 0,1 1-1,-1-1 1,0 0 0,1 0-1,0 0 1,-1-1 0,1 1 0,0 0-1,0 0 1,0-1 0,0 1 0,1-1-1,-1 1 1,1-1 3,0-2 28,0 0 0,1 1 0,0-1-1,0 0 1,0 1 0,1-1 0,-1 0-1,1 1 1,0 0 0,0-1 0,1 0-28,2-3-7,0 0 0,1 1 1,-1-1-1,1 1 0,3-2 7,-5 5-196,1 0 1,0 1-1,0-1 0,-1 1 0,2 0 0,-1 0 1,2 0 195,14-5-1296</inkml:trace>
 </inkml:ink>
 </file>
 
@@ -791,8 +791,8 @@
   </inkml:definitions>
   <inkml:trace contextRef="#ctx0" brushRef="#br0">13 120 5888,'-6'43'2272,"4"-27"-1760,0 6 192,2-9 64,0 6-416,0 3-96,-1-2-96,0-3-32,1-3-64,0-2-64,1-2 32,0-4-192,2-1 32</inkml:trace>
   <inkml:trace contextRef="#ctx0" brushRef="#br0" timeOffset="526.303">15 12 4608,'0'0'65,"0"0"1,0-1-1,-1 1 0,1 0 1,0 0-1,0-1 1,0 1-1,0 0 0,0 0 1,-1 0-1,1-1 0,0 1 1,0 0-1,0 0 1,0 0-1,-1-1 0,1 1 1,0 0-1,0 0 0,-1 0 1,1 0-1,0 0 1,0 0-1,-1 0 0,1 0 1,0-1-1,0 1 1,-1 0-1,1 0 0,0 0 1,0 0-1,-1 0 0,1 0 1,0 0-1,0 1 1,-1-1-1,1 0 0,0 0-65,-4 11 1711,3-8-1415,1 1 0,0 0 1,0 0-1,0 0 1,0 0-1,1 2-296,2 2 195,0 0-1,0 0 1,1-1 0,0 1-1,1-1 1,0 0 0,0 0-1,0 0 1,1 0-195,-4-5 19,0 1 0,1-1 0,-1 1 0,1-1 1,-1 0-1,1 0 0,0 0 0,0 0 0,0-1 0,0 1 0,0-1 1,0 1-1,1-1 0,-1 0 0,0-1 0,1 1 0,-1 0 0,0-1 0,1 0 1,-1 0-1,1 0 0,-1 0 0,3-1-19,2-1 83,0-1 1,-1 0-1,0-1 0,0 1 0,0-1 1,0-1-1,0 1 0,-1-1 1,3-3-84,-1 0-2,0 0 1,0 0-1,0-1 1,-1 0 0,-1-1-1,3-3 2,-7 10 7,0-1 0,0 0 0,-1 1 0,1-1 0,-1 0 0,0 0 0,0 1 0,0-1 0,0 0 0,-1-1-7,0 5-6,0 0 0,1 0 0,-1 0 0,0-1 0,0 1 0,0 0 0,0 0 1,0 0-1,0 0 0,0 0 0,0 0 0,0 0 0,0 0 0,0 0 0,0 0 1,0 0-1,0 0 0,0 0 0,0 0 0,0-1 0,0 1 0,0 0 0,0 0 1,0 0-1,0 0 0,0 0 0,0 0 0,0 0 0,0 0 0,0 0 0,0 0 1,0 0-1,-1 0 0,1 0 0,0 0 0,0 0 0,0 0 0,0-1 0,0 1 1,0 0-1,0 0 0,0 0 0,0 0 0,0 0 0,0 0 0,0 0 0,0 0 1,0 0-1,0 0 0,0 0 0,-1 0 0,1 0 0,0 0 0,0 0 0,0 0 1,0 0-1,0 0 0,0 0 0,0 0 0,0 0 0,0 0 0,0 0 0,0 0 1,0 0-1,0 0 0,0 0 0,-1 0 6,-3 6-124,-4 10 124,-1 8 108,1 0 1,1 0-1,1 1 0,1 0 0,2 1 0,0-1 1,2 19-109,0-36 32,1 0 0,1 1 0,-1-1 0,1 0 0,1 0 0,0 0 0,0 0 0,0 0 0,3 5-32,-3-10-224</inkml:trace>
-  <inkml:trace contextRef="#ctx0" brushRef="#br0" timeOffset="1093.073">284 262 3200,'1'-1'411,"0"0"1,0 0-1,1 1 1,-1-1 0,0 1-1,1-1 1,-1 1-1,1-1 1,-1 1-1,1 0 1,-1 0-1,0 0 1,1 0-1,-1 0 1,1 0-1,1 0-411,8-1 1736,-10 1-1735,33-9 640,-32 9-615,-1-1 0,0 1 0,0-1-1,0 1 1,0-1 0,0 1 0,1-1-1,-1 0 1,0 0 0,-1 1 0,1-1-1,0 0 1,0 0 0,0 0-1,0 0 1,-1 0 0,1 0 0,0 0-1,-1 0 1,1-1 0,-1 1 0,0 0-1,1 0 1,-1 0 0,0-1 0,1 1-26,-2 0-5,1 0 0,0 0 0,-1 0 0,1 0 0,-1 1 0,1-1 0,-1 0 0,1 0 0,-1 0 0,1 1 0,-1-1 0,0 0 0,1 1 0,-1-1 0,0 0 0,0 1 0,0-1 0,1 1 0,-1-1 0,0 1 0,0 0 0,0-1 1,0 1-1,0 0 0,0 0 0,0-1 0,0 1 0,0 0 0,0 0 0,0 0 0,0 0 5,-33 0-284,31 1 300,0-1 0,0 1 0,0-1-1,0 1 1,0 0 0,1 0 0,-1 0-1,0 0 1,1 1 0,-1-1 0,1 1-1,-1 0 1,1 0 0,0-1 0,0 2-1,-1-1 1,2 0 0,-1 0 0,0 0 0,0 1-1,1-1 1,-1 1 0,1 0 0,0-1-1,0 1 1,0 0 0,0 0 0,0 0-1,0-1 1,1 1 0,0 0 0,-1 0-1,1 0 1,0 0 0,1 0 0,-1 0-1,0 0 1,1 0 0,0 0 0,-1 0 0,1-1-1,0 1 1,0 0 0,1-1 0,0 3-16,0-2 28,1 0 0,-1 0 1,0-1-1,1 0 1,0 1-1,-1-1 1,1 0-1,0 0 1,0 0-1,0 0 1,0-1-1,2 1-28,5 2-345,-1-1 0,0 0 0,9 2 345,-3-3-2746</inkml:trace>
-  <inkml:trace contextRef="#ctx0" brushRef="#br0" timeOffset="1591.823">498 208 3200,'-4'1'515,"0"-1"-1,1 1 1,-1 0 0,0 0-1,0 0 1,0 1 0,1 0 0,-1-1-1,1 1 1,-1 0 0,1 1-1,0-1 1,0 1 0,-2 1-515,0 1 295,1 1 0,0-1 1,0 1-1,0 0 0,1 0 0,0 0 0,0 0 1,0 1-296,3-5 8,-11 30 531,10-31-517,1 1 0,0-1-1,-1 1 1,1-1 0,0 0-1,0 1 1,0-1 0,0 1-1,0-1 1,0 1 0,1-1-1,-1 1 1,0-1 0,1 0-1,-1 1 1,1-1 0,0 0-1,-1 1 1,1-1 0,0 0-1,0 1-21,0-2 2,0 1-1,-1-1 0,1 0 0,0 1 1,0-1-1,0 0 0,0 1 0,0-1 1,0 0-1,0 0 0,0 0 1,0 0-1,0 0 0,0 0 0,0 0 1,0 0-1,0 0 0,0-1 1,0 1-1,0 0 0,0-1 0,0 1 1,-1 0-1,1-1 0,0 1 1,0-1-2,22-15-7,-15 8-72,0 0-1,-1 0 1,-1-1-1,1 0 1,-1 0-1,-1-1 1,0 0 0,0 0-1,0-2 80,-14 38-224,9-20 252,-1-1-1,1 1 1,1 0-1,-1-1 1,1 1-1,0-1 1,0 1-28,-1-4 0,0-1 1,1 0-1,-1 1 1,1-1-1,-1 0 1,1 1-1,-1-1 1,1 0 0,0 0-1,-1 1 1,1-1-1,0 0 1,0 0-1,0 0 1,0 0-1,0 0 1,0 0-1,0-1 1,0 1-1,0 0 1,1 0-1,-1-1 1,0 1-1,1-1 1,-1 1-1,0-1 1,1 1-1,-1-1 1,0 0-1,2 0 0,5-1 54</inkml:trace>
+  <inkml:trace contextRef="#ctx0" brushRef="#br0" timeOffset="1093.072">284 262 3200,'1'-1'411,"0"0"1,0 0-1,1 1 1,-1-1 0,0 1-1,1-1 1,-1 1-1,1-1 1,-1 1-1,1 0 1,-1 0-1,0 0 1,1 0-1,-1 0 1,1 0-1,1 0-411,8-1 1736,-10 1-1735,33-9 640,-32 9-615,-1-1 0,0 1 0,0-1-1,0 1 1,0-1 0,0 1 0,1-1-1,-1 0 1,0 0 0,-1 1 0,1-1-1,0 0 1,0 0 0,0 0-1,0 0 1,-1 0 0,1 0 0,0 0-1,-1 0 1,1-1 0,-1 1 0,0 0-1,1 0 1,-1 0 0,0-1 0,1 1-26,-2 0-5,1 0 0,0 0 0,-1 0 0,1 0 0,-1 1 0,1-1 0,-1 0 0,1 0 0,-1 0 0,1 1 0,-1-1 0,0 0 0,1 1 0,-1-1 0,0 0 0,0 1 0,0-1 0,1 1 0,-1-1 0,0 1 0,0 0 0,0-1 1,0 1-1,0 0 0,0 0 0,0-1 0,0 1 0,0 0 0,0 0 0,0 0 0,0 0 5,-33 0-284,31 1 300,0-1 0,0 1 0,0-1-1,0 1 1,0 0 0,1 0 0,-1 0-1,0 0 1,1 1 0,-1-1 0,1 1-1,-1 0 1,1 0 0,0-1 0,0 2-1,-1-1 1,2 0 0,-1 0 0,0 0 0,0 1-1,1-1 1,-1 1 0,1 0 0,0-1-1,0 1 1,0 0 0,0 0 0,0 0-1,0-1 1,1 1 0,0 0 0,-1 0-1,1 0 1,0 0 0,1 0 0,-1 0-1,0 0 1,1 0 0,0 0 0,-1 0 0,1-1-1,0 1 1,0 0 0,1-1 0,0 3-16,0-2 28,1 0 0,-1 0 1,0-1-1,1 0 1,0 1-1,-1-1 1,1 0-1,0 0 1,0 0-1,0 0 1,0-1-1,2 1-28,5 2-345,-1-1 0,0 0 0,9 2 345,-3-3-2746</inkml:trace>
+  <inkml:trace contextRef="#ctx0" brushRef="#br0" timeOffset="1591.822">498 208 3200,'-4'1'515,"0"-1"-1,1 1 1,-1 0 0,0 0-1,0 0 1,0 1 0,1 0 0,-1-1-1,1 1 1,-1 0 0,1 1-1,0-1 1,0 1 0,-2 1-515,0 1 295,1 1 0,0-1 1,0 1-1,0 0 0,1 0 0,0 0 0,0 0 1,0 1-296,3-5 8,-11 30 531,10-31-517,1 1 0,0-1-1,-1 1 1,1-1 0,0 0-1,0 1 1,0-1 0,0 1-1,0-1 1,0 1 0,1-1-1,-1 1 1,0-1 0,1 0-1,-1 1 1,1-1 0,0 0-1,-1 1 1,1-1 0,0 0-1,0 1-21,0-2 2,0 1-1,-1-1 0,1 0 0,0 1 1,0-1-1,0 0 0,0 1 0,0-1 1,0 0-1,0 0 0,0 0 1,0 0-1,0 0 0,0 0 0,0 0 1,0 0-1,0 0 0,0-1 1,0 1-1,0 0 0,0-1 0,0 1 1,-1 0-1,1-1 0,0 1 1,0-1-2,22-15-7,-15 8-72,0 0-1,-1 0 1,-1-1-1,1 0 1,-1 0-1,-1-1 1,0 0 0,0 0-1,0-2 80,-14 38-224,9-20 252,-1-1-1,1 1 1,1 0-1,-1-1 1,1 1-1,0-1 1,0 1-28,-1-4 0,0-1 1,1 0-1,-1 1 1,1-1-1,-1 0 1,1 1-1,-1-1 1,1 0 0,0 0-1,-1 1 1,1-1-1,0 0 1,0 0-1,0 0 1,0 0-1,0 0 1,0 0-1,0-1 1,0 1-1,0 0 1,1 0-1,-1-1 1,0 1-1,1-1 1,-1 1-1,0-1 1,1 1-1,-1-1 1,0 0-1,2 0 0,5-1 54</inkml:trace>
   <inkml:trace contextRef="#ctx0" brushRef="#br0" timeOffset="1958.369">628 204 3840,'-1'-1'204,"0"0"0,1 1 0,-1-1 0,0 1 0,0 0 0,0-1 0,0 1 0,0 0 0,0-1 0,0 1 0,0 0 0,0 0 0,0 0 0,0 0 0,0 0 0,0 0 1,0 0-1,0 0 0,0 0 0,0 1 0,0-1 0,0 0 0,0 1 0,0-1 0,0 1 0,0-1 0,0 1 0,0-1 0,0 1 0,0 0-204,-1 0 150,1 0 0,-1 0 0,0 1 1,1-1-1,-1 0 0,0 1 0,1-1 0,0 1 0,-1 0 0,1 0 0,0-1 1,0 1-1,0 0 0,0 0 0,0 0-150,1 0 42,-1 0 0,1 0 0,0 0 1,0-1-1,0 1 0,0 0 0,1 0 0,-1 0 0,0-1 1,1 1-1,-1 0 0,1 0 0,-1-1 0,1 1 0,0 0 1,0-1-1,0 1 0,0-1 0,0 1 0,0-1 1,0 1-43,5 4 155,0-1 1,0 1-1,0-1 1,4 2-156,-4-3 79,-1 0 0,0 0 0,0 1 0,4 3-79,-9-7 18,0-1 0,1 1 0,-1 0 0,0-1 0,0 1 0,1-1-1,-1 1 1,0 0 0,0-1 0,0 1 0,0-1 0,0 1 0,0 0 0,0-1 0,0 1 0,0 0 0,0-1 0,0 1 0,0-1 0,-1 1 0,1 0 0,0-1-1,0 1 1,-1-1 0,1 1 0,0-1 0,-1 1 0,1-1 0,0 1 0,-1-1 0,1 1 0,-1-1 0,1 1 0,-1-1 0,1 0 0,-1 1 0,1-1 0,-1 0-1,1 1 1,-1-1 0,0 0-18,-28 14 426,25-12-504,-15 6-1032,15-6 636</inkml:trace>
   <inkml:trace contextRef="#ctx0" brushRef="#br0" timeOffset="2444.285">727 239 6656,'0'0'99,"0"-1"0,0 1 1,0 0-1,0 0 0,0 0 1,0 0-1,0-1 0,0 1 1,0 0-1,0 0 0,0 0 0,0-1 1,-1 1-1,1 0 0,0 0 1,0 0-1,0 0 0,0-1 1,0 1-1,0 0 0,0 0 1,0 0-1,-1 0 0,1-1 0,0 1 1,0 0-1,0 0 0,0 0 1,0 0-1,-1 0 0,1 0 1,0 0-1,0 0 0,0 0 1,-1-1-1,1 1 0,0 0 0,0 0 1,0 0-1,0 0 0,-1 0 1,1 0-1,0 0-99,-4 9 1328,-1 15-926,4-20-340,1 1 0,0 0 0,0 0 0,1 0 0,-1-1 0,1 1 0,0 0 0,1 0-62,-2-3 25,1-1 1,-1 1-1,1-1 0,0 0 1,0 1-1,-1-1 1,1 0-1,0 1 1,0-1-1,0 0 0,1 0 1,-1 0-1,0 0 1,0 0-1,1 0 1,-1 0-1,0 0 0,1-1 1,-1 1-1,1 0 1,-1-1-1,1 1 1,-1-1-1,1 0 0,-1 1 1,1-1-26,1 0 29,0 1 0,0-1 0,0 0 1,0 0-1,0 0 0,0 0 0,0-1 0,0 1 0,0-1 1,0 0-1,0 0 0,0 0 0,-1 0 0,1 0 0,0-1 1,2-1-30,-2 1-35,0-1 1,0 0 0,0-1 0,-1 1 0,1 0-1,-1-1 1,1 0 0,-1 1 0,0-1 0,-1 0 0,2-2 34,2-8-221,-4 9-446,1 0 1,-1 1 0,1 0-1,0-1 1,1 1 0,-1 0-1,1 0 1,0-1 666,1 25 2656,-3-3-1748,3 25 115,-4-39-971,1 0-1,0 1 1,0-1 0,0 0-1,0 0 1,0 0 0,1 0-1,-1 0 1,1 0 0,2 2-52,-4-5-20,0 1 0,1-1 1,-1 0-1,0 1 1,1-1-1,-1 1 0,1-1 1,-1 0-1,1 1 1,-1-1-1,1 0 1,-1 0-1,1 1 0,-1-1 1,1 0-1,-1 0 1,1 0-1,-1 1 0,1-1 1,0 0-1,-1 0 1,1 0-1,-1 0 0,1 0 1,-1 0-1,1-1 1,0 1-1,-1 0 0,1 0 1,-1 0-1,1 0 1,-1-1-1,1 1 1,-1 0-1,1 0 0,-1-1 1,1 1-1,-1 0 1,1-1-1,-1 1 0,0-1 1,1 1-1,-1-1 1,0 1-1,1 0 0,-1-1 1,0 1-1,1-1 1,-1 1-1,0-1 1,0 0-1,0 1 20,5-11-597</inkml:trace>
   <inkml:trace contextRef="#ctx0" brushRef="#br0" timeOffset="2777.72">921 226 7296,'0'1'2822,"3"4"-2322,9 22 906,-9-20-1124,0 1-1,0-1 0,1 1 0,-1-1 1,2 0-1,-1-1 0,1 1 0,0-1 1,0 0-1,4 3-281,-9-9 34,0 0 1,0 0-1,0 0 1,0 0-1,1 0 0,-1 0 1,0 0-1,0 1 1,0-1-1,0 0 1,1 0-1,-1 0 1,0 0-1,0 0 0,0 0 1,0 0-1,1 0 1,-1 0-1,0 0 1,0 0-1,0 0 0,1 0 1,-1 0-1,0 0 1,0 0-1,0 0 1,0 0-1,1 0 0,-1 0 1,0-1-1,0 1 1,0 0-1,0 0 1,1 0-1,-1 0-34,4-8 445,-1-13-678,-3 18 149,0 2 89,1-3-55,-1-1 0,1 0 1,0 1-1,1-1 0,0-3 50,-1 7-84,0 0 1,-1 0-1,1-1 0,0 1 0,0 0 0,-1 0 0,1 0 0,0 0 0,0 0 0,0 1 0,0-1 0,0 0 0,0 0 0,1 1 0,-1-1 0,0 0 0,0 1 0,0-1 0,1 1 0,-1 0 1,0-1-1,2 1 84,7-1-736</inkml:trace>
@@ -826,8 +826,8 @@
   </inkml:definitions>
   <inkml:trace contextRef="#ctx0" brushRef="#br0">94 32 2176,'-13'75'7339,"-4"37"-5072,-1 6-876,15-95-1291,1-11-76,1 0-1,-2 0 1,-3 9-24,6-21-2,0 1 1,0-1-1,0 0 1,0 0-1,0 0 1,0 0-1,0 0 1,0 0-1,0 0 1,0 0-1,0 0 1,0 0-1,0 0 1,0 0-1,0 1 1,0-1-1,0 0 1,0 0-1,0 0 1,0 0-1,0 0 1,0 0 0,0 0-1,0 0 1,-1 0-1,1 0 1,0 0-1,0 0 1,0 0-1,0 0 1,0 0-1,0 0 1,0 0-1,0 0 1,0 0-1,0 0 1,0 0-1,0 0 1,-1 0-1,1 0 1,0 0-1,0 0 1,0 0-1,0 0 1,0 0-1,0 0 1,0 0-1,0 0 1,0 0 0,0 0-1,0 0 1,0 0-1,-1 0 1,1 0-1,0 0 1,0 0-1,0 0 1,0 0-1,0-1 2,-4-5-80,-2-10 61,0-7-38,1 1 1,1-5 56,3 18 53,0-1 1,0 1-1,1-1 1,1 1-1,-1-1 1,3-5-54,-3 13-5,0 1 1,0-1-1,1 1 0,-1-1 1,1 1-1,-1-1 0,1 1 1,-1-1-1,1 1 1,0-1-1,0 1 0,0 0 1,0 0-1,0-1 0,0 1 1,0 0-1,0 0 0,0 0 1,1 0-1,-1 0 0,0 0 1,1 1-1,-1-1 1,0 0-1,1 1 0,0-1 5,3 0 12,0 1-1,0 0 0,-1 0 1,1 0-1,0 0 1,0 1-1,4 1-11,-6-2-18,35 4-648,-18-3-1862</inkml:trace>
   <inkml:trace contextRef="#ctx0" brushRef="#br0" timeOffset="538.285">162 1 5376,'5'17'1923,"-1"0"1,-1 0-1,0 4-1923,-1 3 938,-1-1 0,-1 3-938,-4 35 693,-6 24-693,4-46 1266,6-37-1212,0 0 0,0 0 0,0 0 0,0 0 0,0 0 0,0 0 0,0 0 0,1 0 0,-1 0-54,0-1 0,0-1 0,1 0 0,-1 0 0,0 0 1,0 1-1,0-1 0,0 0 0,0 0 0,0 0 1,0 0-1,1 1 0,-1-1 0,0 0 0,0 0 0,0 0 1,0 0-1,1 0 0,-1 0 0,0 0 0,0 1 1,0-1-1,1 0 0,-1 0 0,0 0 0,0 0 1,0 0-1,1 0 0,-1 0 0,0 0 0,0 0 0,10-6-139,-3-2 44,0 0-1,-1 0 1,5-8 95,12-15-578,-20 28 467,12-13-366,-15 16 471,0 0 1,1 0-1,-1 0 0,0 0 1,0 0-1,0 0 0,1-1 1,-1 1-1,0 0 0,0 0 1,0 0-1,1 0 0,-1 0 1,0 0-1,0 0 0,1 0 0,-1 0 1,0 0-1,0 0 0,0 0 1,1 0-1,-1 0 0,0 0 1,0 0-1,1 1 0,-1-1 1,0 0-1,0 0 6,3 10-26,-3 9-22,0-11 164,0-1 1,0 0-1,1 1 1,-1-1-1,2 1 1,1 5-117,-3-11-6,1-1 0,0 1 1,-1-1-1,1 1 0,0-1 1,0 0-1,0 0 1,0 1-1,0-1 0,0 0 1,0 0-1,0 0 0,0 0 1,1 0-1,-1 0 0,0 0 1,1-1-1,-1 1 0,0 0 1,1-1-1,-1 1 0,1-1 1,-1 0-1,1 1 0,-1-1 1,1 0-1,-1 0 0,1 0 1,0 0-1,-1 0 1,1 0-1,-1 0 0,1-1 1,-1 1-1,1-1 6,8-1-69</inkml:trace>
-  <inkml:trace contextRef="#ctx0" brushRef="#br0" timeOffset="1050.141">368 298 6400,'-1'0'122,"1"1"0,0-1 1,-1 1-1,1-1 0,-1 1 0,1-1 1,0 1-1,0-1 0,-1 1 0,1-1 1,0 1-1,0-1 0,-1 1 0,1-1 1,0 1-1,0-1 0,0 1 0,0 0 1,0-1-1,0 1 0,0-1 0,0 1 1,0 0-1,0-1 0,0 1 1,0-1-1,1 1 0,-1-1 0,0 1 1,0-1-1,1 1 0,-1-1 0,0 1 1,1-1-1,-1 1 0,0-1 0,1 1 1,-1-1-1,1 1 0,-1-1 0,0 0 1,1 1-1,-1-1 0,1 0 0,-1 0 1,1 1-123,1-1 48,-1 1 1,1-1 0,-1 1 0,1-1-1,-1 0 1,0 1 0,1-1 0,-1 0-1,1 0 1,-1 0 0,1 0 0,-1-1-1,1 1 1,-1 0 0,1-1-1,-1 1 1,1-1 0,-1 1-49,2-2 19,-1 1 1,0-1-1,0 0 1,0 0-1,0 0 1,0 0-1,0 0 1,0 0-1,-1-1 1,1 1-1,-1 0 1,0-1-1,0 1 1,0-1-1,0 0 1,0 1-1,0-1 1,-1 0-1,1 1 1,-1-1-1,0-1-19,1 3-7,-1-1 0,0 1-1,0-1 1,0 1 0,0-1-1,-1 1 1,1 0 0,0-1-1,-1 1 1,1-1 0,0 1 0,-1 0-1,0-1 1,1 1 0,-1 0-1,0-1 1,0 1 0,1 0-1,-1 0 1,0 0 0,0 0 0,0 0-1,0 0 1,-1 0 0,1 0-1,0 0 1,0 1 0,-1-1 0,1 0-1,0 1 1,-1-1 0,1 1-1,0-1 1,-1 1 0,1 0-1,-1 0 1,1 0 0,-1-1 0,1 1-1,-1 1 8,1-1-4,-1 0 0,1 0 1,0 0-1,0 0 0,0 0 0,0 1 0,0-1 0,0 0 0,0 1 0,0-1 0,0 1 0,0-1 0,0 1 0,0-1 0,0 1 1,0 0-1,1-1 0,-1 1 0,0 0 0,0 0 0,0 0 4,0 1 8,0 0-1,0 1 1,0-1-1,0 0 1,0 0 0,0 1-1,0-1 1,1 1-1,-1 1-7,0 3 84,1 0-1,0 0 0,0 0 0,0 0 0,1 0 1,1 5-84,10 29 268,-11-38-286,0 0-1,1 0 0,-1 0 1,1 0-1,0-1 1,0 1-1,0 0 0,0-1 1,0 0-1,0 1 1,3 1 18,1-2-427,1-1-106</inkml:trace>
-  <inkml:trace contextRef="#ctx0" brushRef="#br0" timeOffset="1398.343">492 271 4864,'0'0'148,"1"0"1,-1 0 0,0 0-1,1 0 1,-1 0-1,0 0 1,1 1-1,-1-1 1,0 0 0,0 0-1,1 0 1,-1 1-1,0-1 1,0 0 0,1 0-1,-1 0 1,0 1-1,0-1 1,1 0-1,-1 1 1,0-1 0,0 0-1,0 0 1,0 1-1,1-1 1,-1 0-1,0 1 1,0-1 0,0 0-1,0 1 1,0-1-1,0 0 1,0 1-149,6 13 1977,17 46 1132,-24-63-3136,0 0 1,0-1-1,1 1 0,0 0 1,-1-1-1,1 1 0,1-1 1,-1 1-1,0 0 0,1-1 1,0 1-1,-1 0 0,2-1 1,-1 1-1,0 0 0,0 0 1,2-2 26,2 0-640</inkml:trace>
+  <inkml:trace contextRef="#ctx0" brushRef="#br0" timeOffset="1050.14">368 298 6400,'-1'0'122,"1"1"0,0-1 1,-1 1-1,1-1 0,-1 1 0,1-1 1,0 1-1,0-1 0,-1 1 0,1-1 1,0 1-1,0-1 0,-1 1 0,1-1 1,0 1-1,0-1 0,0 1 0,0 0 1,0-1-1,0 1 0,0-1 0,0 1 1,0 0-1,0-1 0,0 1 1,0-1-1,1 1 0,-1-1 0,0 1 1,0-1-1,1 1 0,-1-1 0,0 1 1,1-1-1,-1 1 0,0-1 0,1 1 1,-1-1-1,1 1 0,-1-1 0,0 0 1,1 1-1,-1-1 0,1 0 0,-1 0 1,1 1-123,1-1 48,-1 1 1,1-1 0,-1 1 0,1-1-1,-1 0 1,0 1 0,1-1 0,-1 0-1,1 0 1,-1 0 0,1 0 0,-1-1-1,1 1 1,-1 0 0,1-1-1,-1 1 1,1-1 0,-1 1-49,2-2 19,-1 1 1,0-1-1,0 0 1,0 0-1,0 0 1,0 0-1,0 0 1,0 0-1,-1-1 1,1 1-1,-1 0 1,0-1-1,0 1 1,0-1-1,0 0 1,0 1-1,0-1 1,-1 0-1,1 1 1,-1-1-1,0-1-19,1 3-7,-1-1 0,0 1-1,0-1 1,0 1 0,0-1-1,-1 1 1,1 0 0,0-1-1,-1 1 1,1-1 0,0 1 0,-1 0-1,0-1 1,1 1 0,-1 0-1,0-1 1,0 1 0,1 0-1,-1 0 1,0 0 0,0 0 0,0 0-1,0 0 1,-1 0 0,1 0-1,0 0 1,0 1 0,-1-1 0,1 0-1,0 1 1,-1-1 0,1 1-1,0-1 1,-1 1 0,1 0-1,-1 0 1,1 0 0,-1-1 0,1 1-1,-1 1 8,1-1-4,-1 0 0,1 0 1,0 0-1,0 0 0,0 0 0,0 1 0,0-1 0,0 0 0,0 1 0,0-1 0,0 1 0,0-1 0,0 1 0,0-1 0,0 1 1,0 0-1,1-1 0,-1 1 0,0 0 0,0 0 0,0 0 4,0 1 8,0 0-1,0 1 1,0-1-1,0 0 1,0 0 0,0 1-1,0-1 1,1 1-1,-1 1-7,0 3 84,1 0-1,0 0 0,0 0 0,0 0 0,1 0 1,1 5-84,10 29 268,-11-38-286,0 0-1,1 0 0,-1 0 1,1 0-1,0-1 1,0 1-1,0 0 0,0-1 1,0 0-1,0 1 1,3 1 18,1-2-427,1-1-106</inkml:trace>
+  <inkml:trace contextRef="#ctx0" brushRef="#br0" timeOffset="1398.342">492 271 4864,'0'0'148,"1"0"1,-1 0 0,0 0-1,1 0 1,-1 0-1,0 0 1,1 1-1,-1-1 1,0 0 0,0 0-1,1 0 1,-1 1-1,0-1 1,0 0 0,1 0-1,-1 0 1,0 1-1,0-1 1,1 0-1,-1 1 1,0-1 0,0 0-1,0 0 1,0 1-1,1-1 1,-1 0-1,0 1 1,0-1 0,0 0-1,0 1 1,0-1-1,0 0 1,0 1-149,6 13 1977,17 46 1132,-24-63-3136,0 0 1,0-1-1,1 1 0,0 0 1,-1-1-1,1 1 0,1-1 1,-1 1-1,0 0 0,1-1 1,0 1-1,-1 0 0,2-1 1,-1 1-1,0 0 0,0 0 1,2-2 26,2 0-640</inkml:trace>
   <inkml:trace contextRef="#ctx0" brushRef="#br0" timeOffset="1887.433">640 297 7552,'-1'30'5549,"1"-29"-5472,0 0 1,0 0-1,0 0 0,0 0 1,0 0-1,0 0 0,1-1 1,-1 1-1,0 0 0,1 0 1,-1 0-1,0 0 0,1 0 1,-1 0-1,1-1 0,-1 1 1,1 0-1,0 0 0,-1-1 1,1 1-1,0 0 0,-1-1 1,1 1-1,0 0 0,0-1 1,0 1-1,0-1-77,-1 0 13,1 0 0,0 0 0,-1 0-1,1 0 1,-1 0 0,1-1 0,-1 1 0,1 0 0,-1 0 0,1 0 0,-1-1 0,1 1 0,-1 0 0,1-1-1,-1 1 1,1-1 0,-1 1 0,0 0 0,1-1 0,-1 1 0,0-1 0,1 1 0,-1-1 0,0 1-1,0-1 1,1 1 0,-1-1 0,0 0-13,7-19 49,-4 12-91,0 1-163,8-20-927,-11 26 1059,1-1-1,0 1 1,0-1 0,0 1 0,0-1 0,0 1 0,0 0 0,0 0-1,1-1 1,-1 1 0,0 0 0,1 0 0,0 0 73,-2 1-6,1 0 0,-1 0 0,1-1 0,-1 1 0,1 1 0,-1-1 0,1 0 0,-1 0 0,1 0 0,-1 0 0,1 0 0,-1 0 0,0 0 0,1 0 0,-1 1 0,1-1 0,-1 0 0,0 0 0,1 1 0,-1-1 0,1 0 0,-1 1 0,0-1 0,0 0 0,1 1 0,-1-1 0,0 0 0,1 1 0,-1-1 0,0 1 6,9 15 427,-6-10-194,0-1-97,1 0 0,-1-1-1,0 0 1,1 1 0,0-1 0,1 0-136,-4-3 3,0 0 0,0 0 0,-1-1 0,1 1 0,0-1 0,0 1 0,0 0 0,0-1 0,0 0 0,0 1 0,0-1 0,0 0 0,0 1 0,0-1 0,0 0 0,0 0 0,0 0 0,0 0 0,0 0 0,0 0 0,0 0 0,1 0 0,-1 0 0,0 0 0,0-1 0,0 1 0,0-1 0,0 1 0,0 0 0,0-1 0,-1 1 0,1-1 0,0 0 0,1 0-3,-1 2-90,1 1 1,0-1-1,0 1 0,0-1 1,-1 1-1,1 0 0,-1-1 0,1 1 1,-1 0-1,0 0 90,20 26 209,-16-21-299</inkml:trace>
   <inkml:trace contextRef="#ctx0" brushRef="#br0" timeOffset="2701.64">950 300 3456,'0'-1'198,"0"0"1,0 0-1,0 1 0,0-1 1,0 0-1,0 0 0,-1 0 1,1 1-1,0-1 0,0 0 1,-1 0-1,1 1 0,0-1 1,-1 0-1,1 1 0,-1-1 1,1 0-1,-1 1 0,1-1 1,-1 0-1,1 1 0,-1-1 1,0 1-1,1-1 0,-1 1 1,0 0-1,1-1 1,-1 1-1,0-1 0,0 1 1,1 0-1,-1 0 0,0 0-198,-2 0 146,0 0 0,0 0 0,-1 1-1,1 0 1,0 0 0,0 0 0,1 0 0,-3 1-146,1-1 117,0 1 1,0 0 0,1 0-1,-1 0 1,1 1 0,-1-1-1,1 1 1,0 0 0,0 0-1,0 1-117,2-4 33,0 1-1,0 0 1,1 0-1,-1 0 1,0 0-1,1 1 1,-1-1-1,1 0 1,-1 0-1,1 0 1,-1 0-1,1 1 1,0-1-1,0 0 1,0 0-1,-1 0 1,1 1-1,0-1 1,1 0-1,-1 0 1,0 1-1,0-1 1,0 0-1,1 0 1,-1 0-1,1 1 1,-1-1-1,1 0 1,-1 0-1,1 0 1,0 0-1,-1 0 1,1 0-1,0 0 1,0 0-1,0 0-32,0 0 10,0 0 0,0 0 0,1 0 0,-1 0 0,0 0-1,0-1 1,0 1 0,0-1 0,1 1 0,-1 0 0,0-1 0,1 0-1,-1 1 1,0-1 0,1 0 0,-1 0 0,0 0 0,1 0-1,-1 0 1,1 0 0,-1 0 0,0 0 0,1 0 0,-1-1 0,0 1-1,1 0 1,-1-1 0,0 1 0,0-1 0,1 0 0,-1 1 0,0-1-1,0 0 1,0 0 0,0 0 0,0 0 0,0 0-10,2-1-89,0-1 0,-1 0 0,1 0 0,-1 0 0,0 0 0,1 0 0,-2-1-1,1 1 1,0-1 0,-1 1 0,1-1 0,0-2 89,-1 9 94,0 1-1,0-1 1,1 0-1,-1 0 1,1 0-1,1 2-93,-2-3 17,-1-1 0,1 1 0,0-1-1,0 0 1,0 1 0,0-1-1,0 0 1,1 0 0,-1 0 0,0 1-1,0-1 1,1-1 0,-1 1-1,1 0 1,-1 0 0,1 0-1,-1-1 1,1 1 0,-1-1 0,1 1-1,0-1-16,-1 0 1,1-1 0,0 1 0,0-1 0,0 1 0,0-1 0,0 0 1,-1 0-1,1 1 0,0-1 0,-1 0 0,1-1 0,-1 1 0,1 0 0,-1 0 0,1-1 0,-1 1 0,0-1 0,0 1 0,0-1-1,5-6-55,-2 1-1,1-1 1,1-5 55,-3 7-35,11-25-501,-1-2 0,-2 0 0,-1 0 0,4-29 536,-12 48-82,-3 17 528,-5 21 161,3 5-164,3 1 1,0-1-1,2 1 1,1-1-1,1 1 1,3 4-444,-2-9-149</inkml:trace>
 </inkml:ink>
@@ -886,7 +886,7 @@
     </inkml:brush>
   </inkml:definitions>
   <inkml:trace contextRef="#ctx0" brushRef="#br0">1 152 4480,'0'15'3760,"0"9"-2199,1 0-1,1 0 1,3 11-1561,-5-35 25,0 1-1,0 0 1,0-1 0,0 1-1,1-1 1,-1 1-1,0 0 1,0-1 0,0 1-1,1-1 1,-1 1-1,0-1 1,0 1 0,1-1-1,-1 1 1,1-1-1,-1 1 1,0-1 0,1 1-1,0-1-24,-1 0 8,0 0 0,1 0 0,-1 0-1,1 0 1,-1 0 0,0-1 0,1 1 0,-1 0-1,0 0 1,0 0 0,1-1 0,-1 1 0,0 0-1,1 0 1,-1-1 0,0 1 0,0 0 0,0 0-1,1-1 1,-1 1 0,0 0 0,0-1-1,0 1 1,0-1-8,12-30-70,-9 24 43,-2 5 29,13-30-117,-13 29 126,1 0 0,-1 1-1,1-1 1,0 1 0,0-1-1,0 1 1,0 0 0,0 0 0,0 0-1,1-1-10,-2 3-6,-1 0 0,0 0 0,1 0 0,-1 0 0,0 0 0,1 0 0,-1 1 0,0-1 0,1 0 0,-1 0 0,0 0 0,1 0 0,-1 1 0,0-1 0,0 0-1,1 0 1,-1 0 0,0 1 0,0-1 0,1 0 0,-1 1 0,0-1 0,0 0 0,0 0 0,0 1 0,1-1 0,-1 0 0,0 1 0,0-1 0,0 0 0,0 1 0,0-1 0,0 0 0,0 1 0,0-1 0,0 0-1,0 1 1,0-1 0,0 1 6,3 18-64,-3-17 66,2 7 27,-2-2 20,1 1 0,1-1 1,-1 1-1,2-1 1,-1 1-1,3 5-49,-5-12 4,1-1 0,-1 0 0,0 1 0,0-1 1,1 1-1,-1-1 0,0 0 0,0 1 0,1-1 0,-1 0 0,0 1 0,1-1 1,-1 0-1,1 0 0,-1 1 0,0-1 0,1 0 0,-1 0 0,1 0 1,-1 1-1,1-1 0,-1 0 0,0 0 0,1 0 0,-1 0 0,1 0 0,-1 0 1,1 0-1,-1 0 0,1 0 0,-1 0 0,1 0 0,-1 0 0,0-1 1,1 1-1,-1 0 0,1 0 0,-1 0 0,1-1 0,-1 1 0,0 0 0,1 0 1,-1-1-1,0 1 0,1 0 0,-1-1 0,0 1 0,1 0 0,-1-1 1,0 1-1,0 0 0,1-1 0,-1 1 0,0-1-4,16-25-145,-14 23 35,1-3 39,0 0 39,0 0 0,0 1 0,1-1 1,0 0-1,0 1 0,1 0 0,-1 0 0,1 0 1,0 1 31,-4 21 0,-1-14 32,5 35 361,-5-37-417,0 1 0,0-1 0,1 1 0,-1-1 0,1 0 0,-1 1 0,1-1 1,0 1-1,-1-1 0,1 0 0,0 0 0,0 1 0,0-1 0,0 0 0,0 0 0,0 0 0,0 0 0,0 0 0,0 0 0,1 0 0,-1-1 0,1 1 24,5 0-618</inkml:trace>
-  <inkml:trace contextRef="#ctx0" brushRef="#br0" timeOffset="433.293">284 187 5632,'0'0'67,"0"-1"0,0 1 0,-1 0-1,1 0 1,0 0 0,0 0 0,0 0 0,0 0 0,0 0 0,0-1 0,-1 1 0,1 0 0,0 0-1,0 0 1,0 0 0,0 0 0,0 0 0,-1 0 0,1 0 0,0 0 0,0 0 0,0 0 0,0 0-1,-1 0 1,1 0 0,0 0 0,0 0 0,0 0 0,0 0 0,-1 0 0,1 0 0,0 0 0,0 0-1,0 0 1,0 0 0,0 1 0,-1-1 0,1 0 0,0 0 0,0 0 0,0 0 0,0 0 0,0 0-1,0 0 1,-1 1 0,1-1 0,0 0-67,-6 11 1054,-1 14-239,6-21-653,1 0-1,-1-1 1,1 1-1,0 0 1,0 0-1,0 0 1,1-1-1,-1 1 1,1 0-1,0-1 1,1 3-162,-2-6 46,0 1 0,1 0 0,-1 0 0,1 0 0,-1 0 0,1 0 0,0 0 0,-1-1-1,1 1 1,0 0 0,0-1 0,-1 1 0,1 0 0,0-1 0,0 1 0,0-1 0,0 1 0,0-1-46,0 0 8,1 1 0,-1-1 0,1 0 0,0 0 1,-1 0-1,1 0 0,-1 0 0,1 0 0,-1 0 0,1-1 0,-1 1 0,1 0 0,-1-1 0,0 1 0,2-2-8,6-2-17,0-2 0,0 1 0,-1-1 0,0-1 0,0 1 0,-1-1 0,0-1 1,0 1-1,0-1 0,-1-1 0,0 0 17,-4 5-79,0 2 44,-3 3 61,-5 18 142,6-12-135,0 0 1,1 0-1,0 0 1,0 1-1,1 2-33,-2-9-4,0 1 0,1 0-1,-1-1 1,1 1 0,-1 0-1,1-1 1,0 1 0,-1 0-1,1-1 1,0 1 0,0-1-1,0 0 1,0 1 0,1-1-1,-1 0 1,0 1 0,0-1 0,1 0-1,-1 0 1,1 0 0,-1 0-1,1 0 1,-1-1 0,2 1 4,-2-1-39,-1 0 0,1 0 1,0 0-1,-1 0 1,1 0-1,0 0 0,-1 0 1,1 0-1,0 0 0,-1 0 1,1-1-1,0 1 1,-1 0-1,1-1 0,-1 1 1,1 0-1,-1-1 1,1 1-1,0-1 0,-1 1 1,0-1-1,1 1 1,-1-1-1,1 1 0,-1-1 39,7-7-2794</inkml:trace>
+  <inkml:trace contextRef="#ctx0" brushRef="#br0" timeOffset="433.292">284 187 5632,'0'0'67,"0"-1"0,0 1 0,-1 0-1,1 0 1,0 0 0,0 0 0,0 0 0,0 0 0,0 0 0,0-1 0,-1 1 0,1 0 0,0 0-1,0 0 1,0 0 0,0 0 0,0 0 0,-1 0 0,1 0 0,0 0 0,0 0 0,0 0 0,0 0-1,-1 0 1,1 0 0,0 0 0,0 0 0,0 0 0,0 0 0,-1 0 0,1 0 0,0 0 0,0 0-1,0 0 1,0 0 0,0 1 0,-1-1 0,1 0 0,0 0 0,0 0 0,0 0 0,0 0 0,0 0-1,0 0 1,-1 1 0,1-1 0,0 0-67,-6 11 1054,-1 14-239,6-21-653,1 0-1,-1-1 1,1 1-1,0 0 1,0 0-1,0 0 1,1-1-1,-1 1 1,1 0-1,0-1 1,1 3-162,-2-6 46,0 1 0,1 0 0,-1 0 0,1 0 0,-1 0 0,1 0 0,0 0 0,-1-1-1,1 1 1,0 0 0,0-1 0,-1 1 0,1 0 0,0-1 0,0 1 0,0-1 0,0 1 0,0-1-46,0 0 8,1 1 0,-1-1 0,1 0 0,0 0 1,-1 0-1,1 0 0,-1 0 0,1 0 0,-1 0 0,1-1 0,-1 1 0,1 0 0,-1-1 0,0 1 0,2-2-8,6-2-17,0-2 0,0 1 0,-1-1 0,0-1 0,0 1 0,-1-1 0,0-1 1,0 1-1,0-1 0,-1-1 0,0 0 17,-4 5-79,0 2 44,-3 3 61,-5 18 142,6-12-135,0 0 1,1 0-1,0 0 1,0 1-1,1 2-33,-2-9-4,0 1 0,1 0-1,-1-1 1,1 1 0,-1 0-1,1-1 1,0 1 0,-1 0-1,1-1 1,0 1 0,0-1-1,0 0 1,0 1 0,1-1-1,-1 0 1,0 1 0,0-1 0,1 0-1,-1 0 1,1 0 0,-1 0-1,1 0 1,-1-1 0,2 1 4,-2-1-39,-1 0 0,1 0 1,0 0-1,-1 0 1,1 0-1,0 0 0,-1 0 1,1 0-1,0 0 0,-1 0 1,1-1-1,0 1 1,-1 0-1,1-1 0,-1 1 1,1 0-1,-1-1 1,1 1-1,0-1 0,-1 1 1,0-1-1,1 1 1,-1-1-1,1 1 0,-1-1 39,7-7-2794</inkml:trace>
   <inkml:trace contextRef="#ctx0" brushRef="#br0" timeOffset="803.015">523 6 7680,'0'0'91,"0"-1"0,0 1 1,0 0-1,0 0 0,0-1 0,0 1 1,0 0-1,0 0 0,0 0 0,0-1 1,-1 1-1,1 0 0,0 0 0,0 0 1,0-1-1,0 1 0,-1 0 0,1 0 1,0 0-1,0 0 0,0 0 0,-1 0 1,1-1-1,0 1 0,0 0 0,0 0 1,-1 0-1,1 0 0,0 0 0,0 0 1,-1 0-1,1 0 0,0 0 0,0 0 1,-1 0-1,1 0 0,0 0 0,0 0 1,0 0-1,-1 0 0,1 0 0,0 0 1,0 1-1,-1-1 0,1 0-91,-3 13 945,2-12-1116,-2 28 304,1 0 1,1 25-134,0 3 650,0-40-566,-1 24 121,2-38-213,1 0 1,-1 0-1,0 0 1,1 1-1,0-1 1,-1 0-1,1 0 0,0 0 1,1 0-1,0 1 8,1-1-437,2-3-176</inkml:trace>
   <inkml:trace contextRef="#ctx0" brushRef="#br0" timeOffset="1208.126">631 7 5632,'0'0'128,"0"0"-1,-1 0 1,1 0 0,0 0 0,0 0 0,-1 0-1,1 1 1,0-1 0,0 0 0,0 0 0,-1 0-1,1 0 1,0 1 0,0-1 0,0 0 0,-1 0-1,1 1 1,0-1 0,0 0 0,0 0 0,0 1-1,0-1 1,0 0 0,0 1 0,-1-1-128,-2 16-100,3-13 402,-6 38 1609,3 0 0,2 8-1911,-1 0 439,-3 15-439,1-52 323,2-20-347,-1-18-93,3 22 127,0 1 0,0-1 1,0 1-1,0-1 0,1 0 1,-1 1-1,1-1 0,0 1 0,0-1 1,1 1-11,-1 1-3,-1 1 0,1 0 0,0-1-1,0 1 1,1 0 0,-1 0 0,0 0 0,0-1 0,0 1 0,1 0 0,-1 1 0,1-1 0,-1 0-1,0 0 1,1 1 0,-1-1 0,1 0 0,0 1 0,-1 0 0,1-1 0,-1 1 0,1 0 0,0 0 3,20-1-507,-11 3-42</inkml:trace>
   <inkml:trace contextRef="#ctx0" brushRef="#br0" timeOffset="1565.312">735 186 7168,'-6'-2'2720,"3"4"-2112,-1 3 32,2-1-64,0 2-320,0 2 0,0 1 64,1 2 32,1 0-160,2-2-128,1-1 32,1-2-128,1-3 0,2-6-3008</inkml:trace>
@@ -939,8 +939,8 @@
   <inkml:trace contextRef="#ctx0" brushRef="#br0" timeOffset="2659.699">1030 280 1664,'1'7'608,"0"-3"-480,-1 1 2592,0-1 1088,1 0-1632,0 2-736,1 2-1024,1 1-416,0 0 0,0 0-32,0-1 32,0-4 0,-1-1 0</inkml:trace>
   <inkml:trace contextRef="#ctx0" brushRef="#br0" timeOffset="2660.699">1004 162 7424,'-9'-19'2816,"7"16"-2208,2 0 128,0 3-128,2 2-672,0 1-256</inkml:trace>
   <inkml:trace contextRef="#ctx0" brushRef="#br0" timeOffset="3038.396">1163 261 3456,'-2'-1'329,"0"0"0,0 1 0,0-1 0,0 1 1,0 0-1,0-1 0,0 1 0,0 0 0,0 0 0,0 0 1,0 1-1,0-1 0,0 0 0,1 1 0,-1-1 0,0 1 0,0 0 1,0-1-1,0 1 0,-1 1-329,1-1 156,-1 0 1,1 0-1,0 1 1,0-1-1,0 0 0,0 1 1,1-1-1,-1 1 1,0 0-1,1 0 1,-1 0-1,1-1 1,-1 2-1,1-1 0,0 0 1,0 0-1,0 0-156,0 0 23,1-1 0,0 0 0,-1 0 0,1 0-1,0 1 1,0-1 0,0 0 0,0 0 0,0 0-1,0 1 1,1-1 0,-1 0 0,0 0 0,1 0 0,-1 1-1,0-1 1,1 0 0,0 0 0,-1 0 0,1 0-1,-1 0 1,1 0 0,0 0 0,0 0-23,1 0 25,-1 1 0,1-1 0,0 0 0,0 0 0,0 0 0,0 0 0,0-1 0,0 1 0,0 0 0,0-1 0,0 1 0,0-1 0,1 0-25,3 1 41,0-1 0,0 0 1,-1 0-1,1-1 0,0 1 0,0-1 1,0-1-1,-1 1 0,1-1 1,-1 0-42,-3 2 6,-1-1 1,0 1 0,0-1-1,0 1 1,0-1 0,0 0 0,0 1-1,0-1 1,0 0 0,0 0 0,-1 0-1,1 1 1,0-1 0,0 0-1,-1 0 1,1 0 0,0 0 0,-1 0-1,1-1 1,-1 1 0,0 0-1,1 0 1,-1 0-7,0-1-25,0 1 0,0 0 0,-1-1 0,1 1 0,0 0-1,-1 0 1,1-1 0,-1 1 0,1 0 0,-1 0 0,0 0 0,1 0-1,-1-1 1,0 1 0,0 0 0,0 0 0,0 1 0,0-1 0,0 0-1,0 0 1,0 0 25,-3-2-44,0 0-1,0 1 1,0-1-1,-1 1 1,1 0 0,-1 0-1,1 0 1,-1 1-1,0 0 1,0-1-1,1 2 1,-1-1-1,0 1 1,0-1 0,-2 1 44,1 0-304</inkml:trace>
-  <inkml:trace contextRef="#ctx0" brushRef="#br0" timeOffset="3417.76">1258 262 3584,'-9'26'8522,"9"-25"-8411,0 0-1,-1 0 0,1 0 1,0 0-1,0 0 0,0 0 1,-1 0-1,1 0 1,0 0-1,0 0 0,1 0 1,-1 0-1,0 0 0,0-1 1,0 1-1,1 0 0,-1 0 1,0 0-1,1 0 1,-1 0-1,1 0 0,-1 0 1,1-1-1,-1 1 0,1 0-110,0 0 52,0-1 0,0 1-1,0-1 1,1 1 0,-1-1 0,0 0-1,0 1 1,0-1 0,0 0-1,1 0 1,-1 0 0,0 0 0,0 0-1,1 0 1,-1 0 0,0 0-1,1-1-51,4 0-97,1-1 0,-1 0 0,1 0 0,-1-1 0,0 1 0,4-4 97,1-1-463,7-4-873,-17 10 1313,0 1 1,0 0 0,0 0-1,0-1 1,0 1 0,0 0-1,0 0 1,0 0 0,0 0-1,0 0 1,0 0 0,0 1-1,0-1 1,0 0 0,0 0-1,0 1 1,0-1 0,0 1-1,0-1 23,15 9 261,-10-6-210,1 0-1,-1 1 0,0 0 0,0 0 0,4 4-50,0 2 54</inkml:trace>
-  <inkml:trace contextRef="#ctx0" brushRef="#br0" timeOffset="4518.207">1807 187 3712,'0'0'172,"0"-1"1,-1 1-1,1-1 0,-1 1 1,1-1-1,0 1 0,-1-1 1,1 1-1,-1-1 0,1 1 1,-1-1-1,1 1 0,-1 0 1,1-1-1,-1 1 1,0 0-1,1 0 0,-1-1 1,1 1-1,-1 0 0,0 0 1,1 0-1,-1 0 0,0 0 1,1 0-1,-1 0 0,0 0 1,1 0-1,-1 0 0,0 0 1,1 0-1,-1 0 1,1 1-1,-1-1 0,0 0-172,-24 9 1205,19-6-1040,0 1 0,-1 0 0,1 0 0,0 0 0,1 1 0,-1-1 0,-1 3-165,5-4 50,0-1 1,-1 0-1,1 1 0,0 0 1,0-1-1,1 1 0,-1 0 1,1 0-1,-1 0 0,1 0 1,0 0-1,0 0 0,0 1 1,1-1-1,-1 0 0,1 0 1,-1 1-51,2-2 10,-1-1 1,0 0 0,1 0 0,-1 0-1,1 1 1,-1-1 0,1 0 0,-1 0 0,1 0-1,0 0 1,-1 0 0,1 0 0,0 0-1,0 0 1,0 0 0,0-1 0,0 1 0,0 0-1,0-1 1,0 1 0,0 0 0,0-1-1,0 1 1,1-1 0,-1 0 0,0 1 0,0-1-1,1 0 1,-1 0-11,7 2-34,0-1 1,0 0-1,0 0 0,1-1 34,-4 0-71,12 0-691,-3-1-1878</inkml:trace>
+  <inkml:trace contextRef="#ctx0" brushRef="#br0" timeOffset="3417.759">1258 262 3584,'-9'26'8522,"9"-25"-8411,0 0-1,-1 0 0,1 0 1,0 0-1,0 0 0,0 0 1,-1 0-1,1 0 1,0 0-1,0 0 0,1 0 1,-1 0-1,0 0 0,0-1 1,0 1-1,1 0 0,-1 0 1,0 0-1,1 0 1,-1 0-1,1 0 0,-1 0 1,1-1-1,-1 1 0,1 0-110,0 0 52,0-1 0,0 1-1,0-1 1,1 1 0,-1-1 0,0 0-1,0 1 1,0-1 0,0 0-1,1 0 1,-1 0 0,0 0 0,0 0-1,1 0 1,-1 0 0,0 0-1,1-1-51,4 0-97,1-1 0,-1 0 0,1 0 0,-1-1 0,0 1 0,4-4 97,1-1-463,7-4-873,-17 10 1313,0 1 1,0 0 0,0 0-1,0-1 1,0 1 0,0 0-1,0 0 1,0 0 0,0 0-1,0 0 1,0 0 0,0 1-1,0-1 1,0 0 0,0 0-1,0 1 1,0-1 0,0 1-1,0-1 23,15 9 261,-10-6-210,1 0-1,-1 1 0,0 0 0,0 0 0,4 4-50,0 2 54</inkml:trace>
+  <inkml:trace contextRef="#ctx0" brushRef="#br0" timeOffset="4518.206">1807 187 3712,'0'0'172,"0"-1"1,-1 1-1,1-1 0,-1 1 1,1-1-1,0 1 0,-1-1 1,1 1-1,-1-1 0,1 1 1,-1-1-1,1 1 0,-1 0 1,1-1-1,-1 1 1,0 0-1,1 0 0,-1-1 1,1 1-1,-1 0 0,0 0 1,1 0-1,-1 0 0,0 0 1,1 0-1,-1 0 0,0 0 1,1 0-1,-1 0 0,0 0 1,1 0-1,-1 0 1,1 1-1,-1-1 0,0 0-172,-24 9 1205,19-6-1040,0 1 0,-1 0 0,1 0 0,0 0 0,1 1 0,-1-1 0,-1 3-165,5-4 50,0-1 1,-1 0-1,1 1 0,0 0 1,0-1-1,1 1 0,-1 0 1,1 0-1,-1 0 0,1 0 1,0 0-1,0 0 0,0 1 1,1-1-1,-1 0 0,1 0 1,-1 1-51,2-2 10,-1-1 1,0 0 0,1 0 0,-1 0-1,1 1 1,-1-1 0,1 0 0,-1 0 0,1 0-1,0 0 1,-1 0 0,1 0 0,0 0-1,0 0 1,0 0 0,0-1 0,0 1 0,0 0-1,0-1 1,0 1 0,0 0 0,0-1-1,0 1 1,1-1 0,-1 0 0,0 1 0,0-1-1,1 0 1,-1 0-11,7 2-34,0-1 1,0 0-1,0 0 0,1-1 34,-4 0-71,12 0-691,-3-1-1878</inkml:trace>
   <inkml:trace contextRef="#ctx0" brushRef="#br0" timeOffset="4883.826">1807 309 3712,'0'0'93,"0"1"1,-1-1-1,1 0 1,0 0-1,0 0 1,-1 1-1,1-1 1,0 0-1,0 0 1,0 1-1,-1-1 0,1 0 1,0 1-1,0-1 1,0 0-1,0 0 1,0 1-1,0-1 1,-1 0-1,1 1 1,0-1-1,0 0 1,0 1-1,0-1 1,0 0-1,0 1 0,0-1 1,0 0-1,1 1 1,-1-1-1,0 0 1,0 1-1,0-1 1,0 0-94,11 7 3310,17-2-1217,-14-5-2002,0-1 0,-1 0 0,1-1 0,3-1-91,-12 2 12,-1 0 0,1-1-1,0 1 1,-1-1 0,0 0-1,1 0 1,-1 0 0,0-1-1,0 0 1,0 1 0,0-1 0,-1-1-1,1 1 1,-1-1-12,-2 3 18,0 1 0,-1-1-1,1 0 1,0 1 0,-1-1 0,1 0 0,-1 0 0,1 0-1,-1 0 1,0 1 0,1-1 0,-1 0 0,0 0 0,0 0-1,0 0 1,1 0 0,-1 0 0,0 0 0,0 0 0,0 0-1,-1-1-17,1 2 15,0-1-1,-1 1 0,1-1 0,-1 0 0,1 1 0,-1-1 1,1 1-1,-1-1 0,1 1 0,-1-1 0,0 1 0,1 0 1,-1-1-1,0 1 0,1 0 0,-1-1 0,0 1 0,1 0 1,-1 0-1,0 0 0,0 0-14,-4-1 12,0 0-1,0 1 1,0 0-1,-1 0 1,1 0-1,-5 2-11,-5 1-112,11-1 78,0-1 1,0 0-1,0-1 1,-1 1-1,1 0 1,0-1-1,-1 0 0,1 0 1,0-1-1,-3 0 34,2-2-2746</inkml:trace>
   <inkml:trace contextRef="#ctx0" brushRef="#br0" timeOffset="5689.451">1857 255 4992,'0'-4'1824,"-1"4"-1408,0 1 384,1 0 32,-1 2-96,0 0-64,-1 1-224,-1 2-128,0-1-160,0 1-64,0-1 96,0 1 32,1-1 96,2 1-160,1-2-32,2 0-128,3 1-32</inkml:trace>
   <inkml:trace contextRef="#ctx0" brushRef="#br0" timeOffset="6822.138">2086 274 4992,'17'2'5116,"-16"-2"-4875,1 1 0,0-1 0,-1 0 0,1 0 1,0 0-1,-1 0 0,1 0 0,0 0 0,0 0 0,0-1-241,-1 1 29,0-1 0,0 1 0,-1-1-1,1 1 1,0-1 0,0 0 0,0 1 0,-1-1 0,1 0 0,0 0-1,-1 0 1,1 1 0,-1-1 0,1 0 0,-1 0 0,0 0 0,1 0-1,-1 0 1,0 0 0,1 0 0,-1-1-29,0 0-1,1-1-1,-1 1 1,1 0 0,-1-1-1,0 1 1,0-1 0,0 1-1,-1-1 1,1 1 0,0 0-1,-1-1 1,0 1 0,1 0-1,-1-1 1,0 1-1,0 0 1,-1 0 0,1 0-1,0 0 1,-1 0 1,1 1 6,0-1-1,0 2 1,0-1 0,0 0-1,0 0 1,0 0 0,0 0-1,0 1 1,-1-1 0,1 1-1,0-1 1,-1 1-1,1-1 1,0 1 0,-1 0-1,1-1 1,0 1 0,-1 0-1,1 0 1,0 0 0,-1 0-1,1 0 1,-1 0 0,1 1-1,0-1 1,-1 0-1,1 1 1,0-1 0,-1 1-1,1 0 1,0-1 0,0 1-1,0 0 1,-1-1 0,1 2-6,-2 0-5,0 0 1,0 1-1,0 0 1,1-1 0,-1 1-1,1 0 1,-1 0 0,1 0-1,0 1 1,0-1-1,1 0 1,-1 1 0,0 2 4,1-4 27,1-1 0,-1 1 0,1 0 0,-1-1 0,1 1 0,0 0 0,0-1 1,0 1-1,0 0 0,0 0 0,0-1 0,0 1 0,1 0 0,-1-1 1,0 1-1,1 0 0,0-1 0,-1 1 0,1-1 0,0 1 0,0-1 0,0 1 1,0-1-1,0 0 0,0 1 0,0-1 0,0 0 0,1 0 0,-1 0 0,0 0 1,1 1-28,3 0 48,0 0 0,0 1 1,1-1-1,-1-1 0,1 1 1,-1-1-1,1 0 0,-1-1 1,1 1-1,5-1-48,-2 1 461,3 0 739</inkml:trace>
@@ -956,25 +956,25 @@
   <inkml:trace contextRef="#ctx0" brushRef="#br0" timeOffset="10890.267">2719 138 8576,'-1'-13'3232,"0"13"-2496,1 3-160,0 1-224</inkml:trace>
   <inkml:trace contextRef="#ctx0" brushRef="#br0" timeOffset="34384.578">2839 452 5632,'0'0'73,"0"0"-1,0 0 1,0 0 0,-1 0 0,1 0 0,0 0-1,0 0 1,0 0 0,0-1 0,0 1 0,0 0-1,0 0 1,-1 0 0,1 0 0,0 0 0,0 0-1,0 0 1,0 0 0,0 0 0,0 0 0,-1 0-1,1 0 1,0 0 0,0 0 0,0 0 0,0 0-1,0 0 1,-1 0 0,1 0 0,0 0 0,0 0-1,0 0 1,0 0 0,0 0 0,0 0-1,-1 1 1,1-1 0,0 0 0,0 0 0,0 0-73,-5 7 1354,0 10 17,-5 31-780,2 1-1,3 1 1,1-1 0,3 10-591,1-59-3,0 0 1,0 0 0,0 1 0,0-1 0,0 0-1,0 0 1,0 1 0,1-1 0,-1 0-1,0 0 1,0 0 0,0 1 0,-1-1 0,1 0-1,0 0 1,0 1 0,0-1 0,0 0 0,0 0-1,0 0 1,0 1 0,0-1 0,0 0-1,0 0 1,-1 0 0,1 1 0,0-1 0,0 0-1,0 0 1,0 0 0,-1 0 0,1 0 0,0 1-1,0-1 1,0 0 0,-1 0 0,1 0 0,0 0-1,0 0 1,0 0 0,-1 0 0,1 0-1,0 0 3,-10-7-315,-6-15-330,6 5 447,6 13 314,1-1 0,1 1 0,-1-1-1,1 0 1,0 0 0,0 0 0,-1-3-116,3 7 41,0 1-1,0-1 1,0 0 0,1 0-1,-1 0 1,0 1 0,0-1-1,1 0 1,-1 1 0,0-1-1,1 0 1,-1 1 0,1-1-1,-1 0 1,1 1 0,-1-1-1,1 1 1,-1-1 0,1 1-1,-1-1 1,1 1 0,0-1 0,-1 1-1,1 0 1,0-1 0,-1 1-1,1 0 1,0-1 0,0 1-1,-1 0 1,1 0 0,0 0-1,0 0-40,30-5 176,-28 5-137,28-2-292,0 2 0,19 2 253,-28 0-384</inkml:trace>
   <inkml:trace contextRef="#ctx0" brushRef="#br0" timeOffset="34768.081">2972 630 8192,'-2'-2'334,"0"1"1,0 0 0,0 1 0,0-1-1,0 0 1,0 0 0,0 1 0,0-1-1,0 1 1,0 0 0,0-1-1,-1 1-334,1 1 25,0-1 0,0 0 0,0 1-1,0 0 1,0-1 0,1 1 0,-1 0-1,0 0 1,0 0 0,1 0 0,-1 0 0,1 0-1,-1 0 1,1 1 0,-1-1 0,1 0-1,0 1 1,0 0 0,-1-1 0,0 2-25,0 1 5,0 0 1,-1 0 0,1 0-1,1 0 1,-1 0 0,0 0 0,1 1-1,0-1 1,0 1 0,0 1-6,1-5 12,0 1 1,0-1-1,0 1 1,0-1-1,0 1 1,0-1 0,0 1-1,1-1 1,-1 1-1,1-1 1,-1 1-1,1-1 1,-1 1-1,1-1 1,0 0-1,0 1 1,0-1 0,0 0-1,-1 0 1,2 0-1,-1 1 1,0-1-1,0 0 1,0-1-1,0 1 1,1 0 0,-1 0-1,0 0 1,1-1-1,-1 1 1,1-1-1,-1 1-12,7 1 70,0 1 0,0-2 0,1 1 0,-1-1 0,0 0-70,-4-1 22,-1 0 1,0 0 0,0 0-1,0 0 1,0 0 0,0-1-1,1 1 1,-1-1 0,0 0-1,0 0 1,0 0 0,-1 0-1,1-1 1,3-1-23,-5 2 34,-1 0-1,1 1 1,0-1-1,0 0 1,0 0 0,-1 0-1,1 0 1,-1 0-1,1 0 1,-1-1 0,1 1-1,-1 0 1,1 0-1,-1 0 1,0 0 0,0-1-1,0 1 1,0 0-1,1 0 1,-1 0 0,-1-1-1,1 1 1,0 0-1,0 0 1,0 0 0,-1 0-1,1-1 1,-1 1-1,1 0 1,-1 0 0,1 0-1,-1 0 1,1 0-1,-2 0-33,0-3 47,0 1-1,0 0 0,0 0 0,-1 0 1,1 1-1,-1-1 0,0 1 1,0-1-1,0 1 0,-2-1-46,-10-4-48,-1 3-42</inkml:trace>
-  <inkml:trace contextRef="#ctx0" brushRef="#br0" timeOffset="36106.699">152 1038 6016,'-1'-1'286,"-1"0"0,0-1 0,1 1 1,-1 0-1,0 0 0,1 0 0,-1 0 0,0 0 1,0 1-1,0-1 0,0 1 0,0-1 1,0 1-1,0-1 0,0 1 0,0 0 0,0 0 1,0 0-287,-1 0 105,0 1 0,0 0 0,0-1 0,1 1 0,-1 0 0,0 0 0,0 0 0,1 1 0,-1-1 0,1 1 0,-3 1-105,1 0-1,0 1 0,0-1 0,0 1 0,1 0-1,-1 0 1,1 1 0,0-1 0,0 0 0,0 1 0,1 0 0,0 0 0,0 0 0,-1 2 1,3-6 8,-1 1-1,1 0 1,-1 0 0,1-1-1,0 1 1,-1 0 0,1 0-1,0 0 1,0-1 0,0 1-1,1 0 1,-1 0 0,0-1-1,1 1 1,-1 0 0,1 0-1,0-1 1,-1 1 0,1 0-1,0-1 1,0 1 0,0-1-1,1 2-7,0-2 3,0 0-1,0 1 0,0-1 1,0 0-1,0 0 0,0 0 1,0 0-1,1-1 0,-1 1 1,0-1-1,0 1 0,1-1 1,-1 0-1,0 0 1,1 0-1,-1 0 0,0 0 1,1-1-3,1 1 32,-1-1 1,1 0 0,-1 1 0,0-2-1,0 1 1,1 0 0,-1-1-1,0 1 1,0-1 0,0 0 0,-1 0-1,1 0 1,0-1 0,1-1-33,0 0-19,0-1-1,0 0 1,0 1 0,-1-1-1,0-1 1,0 1 0,0 0 0,0-1 19,-3 5 6,0 1 0,0-1 0,1 1 0,-1-1 0,0 1 0,0-1 0,0 0 0,0 1 0,0-1 0,0 1 0,0-1 0,0 1 0,0-1 0,0 0 0,0 1 0,0-1 0,0 1 0,0-1 0,0 1 0,-1-1 0,1 0 0,0 1 0,-1-1-6,-2 2-46,0 7 183,3-6-112,0 0 0,0 0 0,0 0 0,0 0 1,0 1-1,1-1 0,-1 0 0,1 0 0,-1 0 0,1 0 0,0 0 0,0 0 0,0 0 1,0 0-1,0 0 0,0-1 0,0 1 0,1 0 0,-1-1 0,1 1-25,0 0-29,1 1-1,0-1 1,-1 0 0,1 0-1,0-1 1,0 1-1,0 0 1,0-1 0,0 0-1,0 0 1,1 0-1,1 1 30,20 0-250</inkml:trace>
-  <inkml:trace contextRef="#ctx0" brushRef="#br0" timeOffset="37220.491">576 1001 5376,'-1'-1'190,"-1"1"1,1-1-1,-1 1 1,0 0-1,1 0 0,-1 0 1,1 0-1,-1 0 1,1 0-1,-1 0 0,0 1 1,1-1-1,-1 0 1,1 1-1,-1 0 1,1-1-1,0 1 0,-1 0 1,1-1-1,0 1 1,-1 0-191,-31 21 1985,32-21-1767,-1-1-137,1 1 0,0 0 0,0 0 0,0 0 0,0 0 0,0 0 0,0 0 0,0 0 0,0 0 0,0 0 0,0 0 0,0 0 0,0 1 0,1-1 0,-1 0 0,1 1-81,0-2 18,0 1 0,0-1 0,0 0 0,0 1 0,0-1 0,0 1 0,0-1 0,0 0 0,0 1 0,1-1 0,-1 0 0,0 1 0,0-1 0,0 0 0,1 0 0,-1 1 0,0-1 0,0 0 0,1 0 0,-1 1 0,0-1 0,1 0-18,13 7 319,-7-5-338,1 0 0,-1 1 0,0 1 0,-1-1 0,1 1 0,0 0 0,3 4 19,-9-7 18,1 0-1,-1 0 0,0 0 0,0 0 1,0 1-1,0-1 0,0 0 1,0 1-1,-1-1 0,1 0 1,0 1-1,-1-1 0,1 1 0,-1 0 1,1-1-1,-1 1 0,0 0-17,0-1 68,0 1-1,0 0 1,-1-1-1,1 1 0,0-1 1,-1 1-1,0-1 1,1 1-1,-1-1 0,0 1 1,0-1-1,0 0 0,0 1 1,0-1-1,0 0 1,0 0-1,0 0 0,0 1 1,-1-1-1,0 0-67,-3 3 63,1-1-1,-1 0 1,0-1-1,0 1 1,-1-1-63,4-1-26,-1 0 0,1 0 1,-1 0-1,1 0 1,-1-1-1,0 1 0,1-1 1,-1 0-1,1 0 1,-1 0-1,0 0 1,0 0 25,-1-2-480</inkml:trace>
+  <inkml:trace contextRef="#ctx0" brushRef="#br0" timeOffset="36106.698">152 1038 6016,'-1'-1'286,"-1"0"0,0-1 0,1 1 1,-1 0-1,0 0 0,1 0 0,-1 0 0,0 0 1,0 1-1,0-1 0,0 1 0,0-1 1,0 1-1,0-1 0,0 1 0,0 0 0,0 0 1,0 0-287,-1 0 105,0 1 0,0 0 0,0-1 0,1 1 0,-1 0 0,0 0 0,0 0 0,1 1 0,-1-1 0,1 1 0,-3 1-105,1 0-1,0 1 0,0-1 0,0 1 0,1 0-1,-1 0 1,1 1 0,0-1 0,0 0 0,0 1 0,1 0 0,0 0 0,0 0 0,-1 2 1,3-6 8,-1 1-1,1 0 1,-1 0 0,1-1-1,0 1 1,-1 0 0,1 0-1,0 0 1,0-1 0,0 1-1,1 0 1,-1 0 0,0-1-1,1 1 1,-1 0 0,1 0-1,0-1 1,-1 1 0,1 0-1,0-1 1,0 1 0,0-1-1,1 2-7,0-2 3,0 0-1,0 1 0,0-1 1,0 0-1,0 0 0,0 0 1,0 0-1,1-1 0,-1 1 1,0-1-1,0 1 0,1-1 1,-1 0-1,0 0 1,1 0-1,-1 0 0,0 0 1,1-1-3,1 1 32,-1-1 1,1 0 0,-1 1 0,0-2-1,0 1 1,1 0 0,-1-1-1,0 1 1,0-1 0,0 0 0,-1 0-1,1 0 1,0-1 0,1-1-33,0 0-19,0-1-1,0 0 1,0 1 0,-1-1-1,0-1 1,0 1 0,0 0 0,0-1 19,-3 5 6,0 1 0,0-1 0,1 1 0,-1-1 0,0 1 0,0-1 0,0 0 0,0 1 0,0-1 0,0 1 0,0-1 0,0 1 0,0-1 0,0 0 0,0 1 0,0-1 0,0 1 0,0-1 0,0 1 0,-1-1 0,1 0 0,0 1 0,-1-1-6,-2 2-46,0 7 183,3-6-112,0 0 0,0 0 0,0 0 0,0 0 1,0 1-1,1-1 0,-1 0 0,1 0 0,-1 0 0,1 0 0,0 0 0,0 0 0,0 0 1,0 0-1,0 0 0,0-1 0,0 1 0,1 0 0,-1-1 0,1 1-25,0 0-29,1 1-1,0-1 1,-1 0 0,1 0-1,0-1 1,0 1-1,0 0 1,0-1 0,0 0-1,0 0 1,1 0-1,1 1 30,20 0-250</inkml:trace>
+  <inkml:trace contextRef="#ctx0" brushRef="#br0" timeOffset="37220.49">576 1001 5376,'-1'-1'190,"-1"1"1,1-1-1,-1 1 1,0 0-1,1 0 0,-1 0 1,1 0-1,-1 0 1,1 0-1,-1 0 0,0 1 1,1-1-1,-1 0 1,1 1-1,-1 0 1,1-1-1,0 1 0,-1 0 1,1-1-1,0 1 1,-1 0-191,-31 21 1985,32-21-1767,-1-1-137,1 1 0,0 0 0,0 0 0,0 0 0,0 0 0,0 0 0,0 0 0,0 0 0,0 0 0,0 0 0,0 0 0,0 0 0,0 1 0,1-1 0,-1 0 0,1 1-81,0-2 18,0 1 0,0-1 0,0 0 0,0 1 0,0-1 0,0 1 0,0-1 0,0 0 0,0 1 0,1-1 0,-1 0 0,0 1 0,0-1 0,0 0 0,1 0 0,-1 1 0,0-1 0,0 0 0,1 0 0,-1 1 0,0-1 0,1 0-18,13 7 319,-7-5-338,1 0 0,-1 1 0,0 1 0,-1-1 0,1 1 0,0 0 0,3 4 19,-9-7 18,1 0-1,-1 0 0,0 0 0,0 0 1,0 1-1,0-1 0,0 0 1,0 1-1,-1-1 0,1 0 1,0 1-1,-1-1 0,1 1 0,-1 0 1,1-1-1,-1 1 0,0 0-17,0-1 68,0 1-1,0 0 1,-1-1-1,1 1 0,0-1 1,-1 1-1,0-1 1,1 1-1,-1-1 0,0 1 1,0-1-1,0 0 0,0 1 1,0-1-1,0 0 1,0 0-1,0 0 0,0 1 1,-1-1-1,0 0-67,-3 3 63,1-1-1,-1 0 1,0-1-1,0 1 1,-1-1-63,4-1-26,-1 0 0,1 0 1,-1 0-1,1 0 1,-1-1-1,0 1 0,1-1 1,-1 0-1,1 0 1,-1 0-1,0 0 1,0 0 25,-1-2-480</inkml:trace>
   <inkml:trace contextRef="#ctx0" brushRef="#br0" timeOffset="37680.596">744 1056 7296,'0'0'99,"0"0"1,0-1-1,0 1 1,0 0-1,0 0 1,0 0 0,0-1-1,0 1 1,0 0-1,0 0 1,0 0-1,0-1 1,0 1-1,0 0 1,0 0-1,0 0 1,0-1-1,0 1 1,0 0 0,-1 0-1,1 0 1,0 0-1,0-1 1,0 1-1,0 0 1,0 0-1,0 0 1,-1 0-1,1 0 1,0-1-1,0 1 1,0 0-1,-1 0 1,1 0 0,0 0-1,0 0 1,0 0-1,0 0 1,-1 0-1,1 0 1,0 0-1,0 0 1,0 0-1,-1 0-99,-14-1 633,-15 7-1139,27-4 550,-1 0 0,1 0 1,-1 0-1,1 0 0,0 0 0,0 1 0,0 0 0,0-1 0,0 1 0,0 0 0,1 0 0,-2 2-44,3-3 25,0 0 0,-1 0-1,1 0 1,0 0 0,0 0-1,0 0 1,0 0 0,1 0 0,-1 1-1,1-1 1,-1 0 0,1 0-1,0 1 1,0-1 0,0 0-1,0 0 1,0 1 0,0-1-1,0 0 1,1 0 0,0 1-1,0 0-24,-1-2 8,0 0-1,1-1 0,-1 1 1,1-1-1,-1 1 0,1-1 1,-1 1-1,1-1 0,-1 1 1,1-1-1,-1 0 1,1 1-1,-1-1 0,1 0 1,0 1-1,-1-1 0,1 0 1,0 0-1,-1 0 0,1 1 1,0-1-1,-1 0 0,1 0 1,0 0-1,-1 0 1,1 0-1,0 0 0,-1 0 1,1-1-1,0 1 0,-1 0 1,1 0-1,0 0 0,-1-1 1,1 1-1,-1 0 0,1-1 1,0 1-1,-1-1 1,1 1-1,-1 0 0,1-1 1,-1 1-8,5-4-41,-1 1 1,1-1-1,-1 0 1,2-2 40,0 0-38,-1 0-1,0 0 1,0 0-1,-1 0 1,4-7 38,-8 13-6,0 0 1,0 0-1,0 0 1,0 0-1,0 0 0,0 0 1,0 0-1,0 0 1,0 0-1,1 0 0,-1 0 1,0-1-1,0 1 1,0 0-1,0 0 1,0 0-1,0 0 0,0 0 1,0 0-1,0 0 1,0 0-1,0 0 0,0 0 1,0-1-1,0 1 1,0 0-1,0 0 1,0 0-1,0 0 0,0 0 1,0 0-1,0 0 1,0 0-1,0-1 0,0 1 1,0 0-1,0 0 1,0 0-1,0 0 1,0 0-1,0 0 0,0 0 1,0 0-1,0 0 1,0 0-1,0-1 0,-1 1 1,1 0-1,0 0 1,0 0-1,0 0 0,0 0 1,0 0-1,0 0 1,0 0-1,0 0 1,0 0-1,0 0 0,-1 0 1,1 0-1,0 0 1,0 0-1,0 0 0,0 0 1,0 0-1,0 0 6,-1 0 3,1 0 0,0 0 0,0 1 0,-1-1-1,1 0 1,0 0 0,0 1 0,0-1 0,-1 0-1,1 1 1,0-1 0,0 0 0,0 0 0,0 1-1,-1-1 1,1 0 0,0 1 0,0-1 0,0 0 0,0 1-1,0-1 1,0 0 0,0 1-3,1 4 48,-1-1 0,1 0 0,0 1 0,0-1 0,1 1 0,-1-1 0,1 0 0,0 0 0,2 3-48,-3-5 4,0-1-1,0 1 1,1 0 0,-1-1 0,0 1-1,1-1 1,-1 0 0,1 1 0,0-1 0,-1 0-1,1 0-3,-1 0 2,0-1-1,0 0 0,0 1 0,-1-1 0,1 0 1,0 1-1,0-1 0,0 0 0,0 0 1,0 0-1,0 0 0,0 0 0,0 0 0,0 0 1,0-1-1,0 1 0,0 0 0,0 0 0,0-1 1,-1 1-1,1 0 0,0-1 0,0 1-1,8-6-266</inkml:trace>
   <inkml:trace contextRef="#ctx0" brushRef="#br0" timeOffset="38062.489">922 864 8064,'0'-2'255,"-4"-9"2630,1 11-1752,-1 7-1012,-5 11 43,1 1-1,0 0 0,2 1 1,0 0-1,2 0 0,0 0 1,1 0-1,0 7-163,2-6 79,1-1-1,0 1 1,2-1 0,2 14-79,-8-46-479,-1 0 1,0 0 0,0 1 0,-1 0 0,-4-5 478,0-2 668,10 18-646,0 0 0,0-1 0,0 1 0,0 0 0,0 0 0,0 0 0,0-1 0,-1 1 0,1 0 0,0 0 1,0-1-1,0 1 0,0 0 0,0 0 0,0-1 0,0 1 0,0 0 0,0 0 0,0-1 0,0 1 0,0 0 0,0 0 0,1-1 0,-1 1 0,0 0 0,0 0 0,0-1 0,0 1 0,0 0 0,0 0 1,1 0-1,-1-1 0,0 1 0,0 0 0,0 0-22,11-4 142,15 5-245,-24-1 183,46 5-475,-32-3-2026</inkml:trace>
   <inkml:trace contextRef="#ctx0" brushRef="#br0" timeOffset="38422.802">991 1080 7552,'-9'1'2816,"7"4"-2208,-1 6 0,3-3-224,0 1-256,0 2-32,1 0 96,1-1 32,1 0-96,0-1-288,0-2-64,1-2 288,-1-2 256,0-4-3520</inkml:trace>
   <inkml:trace contextRef="#ctx0" brushRef="#br0" timeOffset="38423.802">975 984 8960,'-10'-26'3424,"9"22"-2656,1 2-224,1 6-512,0 3-704</inkml:trace>
-  <inkml:trace contextRef="#ctx0" brushRef="#br0" timeOffset="38780.73">1120 1063 3456,'-4'0'958,"-1"0"-1,1 1 1,0-1 0,-1 1 0,1 0-1,0 0 1,-3 1-958,7-2 156,-1 0-1,0 1 1,1-1-1,-1 0 1,0 1-1,1-1 1,-1 0-1,1 1 1,-1-1-1,1 1 1,-1-1-1,1 1 1,-1 0-1,1-1 1,-1 1-1,1-1 1,0 1-1,-1 0 1,1-1-1,0 1 1,-1 0-1,1-1 1,0 1-1,0 0-155,0 0-61,0 0 0,0 1 0,0-1 0,0 0 0,1 0 0,-1 0 0,0 0 0,1 0 0,-1 0 0,1 0-1,-1 0 1,1 0 0,0 1 61,22 26-95,-19-24 103,0 0 0,0 1 0,0 0 0,-1-1 0,0 1 0,0 0-1,0 1 1,1 1-8,-4-6 23,0-1 0,0 1 0,0 0 0,0-1 0,0 1 0,0-1 0,0 1 0,0 0 0,0-1 0,0 1 0,0-1 0,0 1-1,0-1 1,0 1 0,-1 0 0,1-1 0,0 1 0,0-1 0,-1 1 0,1-1 0,0 1 0,-1-1 0,1 1 0,-1-1 0,1 0 0,0 1 0,-1-1 0,1 1-1,-1-1 1,1 0 0,-1 1 0,1-1 0,-1 0 0,0 0-23,-20 6-17,11-5-468</inkml:trace>
-  <inkml:trace contextRef="#ctx0" brushRef="#br0" timeOffset="39307.269">1272 1158 6144,'2'2'627,"0"0"-1,0 0 1,0 0 0,1 0 0,-1 0 0,1 0-1,-1 0 1,1-1-627,-2 0 70,0-1 1,-1 1-1,1 0 0,0-1 0,0 0 0,0 1 1,0-1-1,0 1 0,0-1 0,0 0 0,0 0 1,0 0-1,0 0 0,0 0 0,0 0 0,0 0 1,0 0-1,1 0 0,-1 0 0,0 0 1,0 0-1,0-1 0,0 0-70,0 1 62,0-1 0,-1 0-1,1 0 1,0 0 0,-1 0 0,0 0 0,1-1-1,-1 1 1,0 0 0,1 0 0,-1 0 0,0 0-1,0 0 1,0 0 0,0-1 0,0 1 0,0 0-1,0 0 1,0 0 0,-1 0 0,1 0 0,0 0-1,-1-1-61,-7-25 574,-9-13-423,8 19-56,0 1 0,2-1-1,0 0 1,1-1 0,2 0 0,0-2-95,3 21-10,1 0 1,0 0 0,0 1 0,1-1 0,-1 0-1,1 0 1,-1 0 0,1 0 0,0 0-1,0 1 1,0-1 0,0 0 0,1 1 0,-1-1-1,1 1 1,-1-1 0,1 1 0,0 0 0,0-1-1,0 1 1,0 0 0,1 1 0,-1-1 0,0 0-1,1 0 1,-1 1 0,1 0 0,0-1 0,0 1-1,-1 0 1,3 0 9,-1 0-21,1-1-1,-1 2 1,0-1-1,1 0 1,-1 1-1,1 0 1,-1 0-1,1 0 1,-1 0 0,0 1-1,1 0 1,-1 0-1,0 0 1,1 0-1,-1 1 1,0-1-1,0 1 1,0 0-1,0 1 1,3 1 21,-6-3-63,0 0 0,0 0 0,0 0 0,0 0 0,0 0 0,0 1-1,-1-1 1,1 0 0,0 0 0,-1 1 0,1-1 0,0 0 0,-1 1 0,0-1 0,1 0 0,-1 1 0,0 0 63,1 13-869</inkml:trace>
+  <inkml:trace contextRef="#ctx0" brushRef="#br0" timeOffset="38780.729">1120 1063 3456,'-4'0'958,"-1"0"-1,1 1 1,0-1 0,-1 1 0,1 0-1,0 0 1,-3 1-958,7-2 156,-1 0-1,0 1 1,1-1-1,-1 0 1,0 1-1,1-1 1,-1 0-1,1 1 1,-1-1-1,1 1 1,-1-1-1,1 1 1,-1 0-1,1-1 1,-1 1-1,1-1 1,0 1-1,-1 0 1,1-1-1,0 1 1,-1 0-1,1-1 1,0 1-1,0 0-155,0 0-61,0 0 0,0 1 0,0-1 0,0 0 0,1 0 0,-1 0 0,0 0 0,1 0 0,-1 0 0,1 0-1,-1 0 1,1 0 0,0 1 61,22 26-95,-19-24 103,0 0 0,0 1 0,0 0 0,-1-1 0,0 1 0,0 0-1,0 1 1,1 1-8,-4-6 23,0-1 0,0 1 0,0 0 0,0-1 0,0 1 0,0-1 0,0 1 0,0 0 0,0-1 0,0 1 0,0-1 0,0 1-1,0-1 1,0 1 0,-1 0 0,1-1 0,0 1 0,0-1 0,-1 1 0,1-1 0,0 1 0,-1-1 0,1 1 0,-1-1 0,1 0 0,0 1 0,-1-1 0,1 1-1,-1-1 1,1 0 0,-1 1 0,1-1 0,-1 0 0,0 0-23,-20 6-17,11-5-468</inkml:trace>
+  <inkml:trace contextRef="#ctx0" brushRef="#br0" timeOffset="39307.268">1272 1158 6144,'2'2'627,"0"0"-1,0 0 1,0 0 0,1 0 0,-1 0 0,1 0-1,-1 0 1,1-1-627,-2 0 70,0-1 1,-1 1-1,1 0 0,0-1 0,0 0 0,0 1 1,0-1-1,0 1 0,0-1 0,0 0 0,0 0 1,0 0-1,0 0 0,0 0 0,0 0 0,0 0 1,0 0-1,1 0 0,-1 0 0,0 0 1,0 0-1,0-1 0,0 0-70,0 1 62,0-1 0,-1 0-1,1 0 1,0 0 0,-1 0 0,0 0 0,1-1-1,-1 1 1,0 0 0,1 0 0,-1 0 0,0 0-1,0 0 1,0 0 0,0-1 0,0 1 0,0 0-1,0 0 1,0 0 0,-1 0 0,1 0 0,0 0-1,-1-1-61,-7-25 574,-9-13-423,8 19-56,0 1 0,2-1-1,0 0 1,1-1 0,2 0 0,0-2-95,3 21-10,1 0 1,0 0 0,0 1 0,1-1 0,-1 0-1,1 0 1,-1 0 0,1 0 0,0 0-1,0 1 1,0-1 0,0 0 0,1 1 0,-1-1-1,1 1 1,-1-1 0,1 1 0,0 0 0,0-1-1,0 1 1,0 0 0,1 1 0,-1-1 0,0 0-1,1 0 1,-1 1 0,1 0 0,0-1 0,0 1-1,-1 0 1,3 0 9,-1 0-21,1-1-1,-1 2 1,0-1-1,1 0 1,-1 1-1,1 0 1,-1 0-1,1 0 1,-1 0 0,0 1-1,1 0 1,-1 0-1,0 0 1,1 0-1,-1 1 1,0-1-1,0 1 1,0 0-1,0 1 1,3 1 21,-6-3-63,0 0 0,0 0 0,0 0 0,0 0 0,0 0 0,0 1-1,-1-1 1,1 0 0,0 0 0,-1 1 0,1-1 0,0 0 0,-1 1 0,0-1 0,1 0 0,-1 1 0,0 0 63,1 13-869</inkml:trace>
   <inkml:trace contextRef="#ctx0" brushRef="#br0" timeOffset="39691.441">1212 1072 7552,'-10'-7'2816,"10"4"-2208,2 1 256,-1 1 32,5-1-544,-1 0-128,4 0-64,4 0 32,5 0-96,2 1-128,2 1 0,-2 2-32,-1 1 0,1-1-96,-1 1-32</inkml:trace>
   <inkml:trace contextRef="#ctx0" brushRef="#br0" timeOffset="40072.636">1461 1065 4480,'-2'-1'221,"0"0"0,0 0 1,0 1-1,-1-1 0,1 1 0,0-1 0,-1 1 1,1 0-1,0 0 0,-1 0 0,1 0 1,0 1-1,-1-1 0,1 1 0,0-1 0,0 1 1,-1 0-1,1-1 0,0 1 0,0 1 1,0-1-1,0 0 0,0 0 0,0 1 0,0-1 1,1 1-1,-1-1 0,0 1 0,1 0 1,0 0-1,-1 0 0,1 0 0,0 0 0,-1 1-221,0-1 59,1 1-1,-1-1 1,1 1-1,0 0 0,-1 0 1,1 0-1,0 0 1,1 0-1,-1 0 0,0 0 1,1 0-1,0 0 1,0 0-1,0 0 0,0 0 1,0 0-1,1 0 0,-1 1 1,1-1-1,0 0 1,0 0-1,0-1 0,0 1 1,0 0-1,1 0 1,-1 0-59,0-3 2,0 1 1,0 0-1,-1 0 1,1-1 0,0 1-1,0 0 1,0-1-1,0 1 1,0-1-1,0 0 1,0 1 0,0-1-1,0 0 1,0 1-1,0-1 1,0 0 0,0 0-1,1 0 1,-1 0-1,0 0 1,0 0 0,0 0-1,0 0 1,0 0-1,0-1 1,0 1 0,0 0-1,0-1 1,0 1-1,0-1 1,0 1 0,0-1-1,0 0 1,0 1-3,3-3 22,0 1 1,-1-1-1,1 0 1,-1 0-1,0 0 0,1 0 1,0-3-23,0 1-146,-1 1 0,-1-1 0,1 0 0,1-4 146,-3 8-22,-1 0 0,1 0 0,-1 0 0,0 0 0,1 0 0,-1 0 0,0 0 0,0 1 0,1-1 0,-1 0 0,0 0 0,0 0 1,0 0-1,0 0 0,0 0 0,0 0 0,-1 0 0,1 0 0,0 0 0,0 0 0,-1 0 0,1 0 0,0 0 0,-1 1 0,1-1 1,-1 0-1,1 0 0,-1 0 0,0 1 0,1-1 0,-1 0 22,1 1 10,-1 0 1,1 0-1,0-1 1,0 1-1,0 0 1,0 0-1,0 0 1,-1 0-1,1 0 1,0 0-1,0 0 1,0 0-1,-1 0 0,1 0 1,0 0-1,0-1 1,0 1-1,0 0 1,-1 0-1,1 0 1,0 0-1,0 1 1,0-1-1,-1 0 1,1 0-1,0 0 0,0 0 1,0 0-1,-1 0 1,1 0-1,0 0 1,0 0-1,0 0 1,0 0-1,0 1 1,-1-1-1,1 0 1,0 0-1,0 0 1,0 0-1,0 0 0,0 1-10,-1 9 126,5 11-222,-2-17 62,0-1-1,0 0 0,0 0 1,1 0-1,-1 0 0,1 0 1,-1 0-1,1-1 0,0 1 1,3 1 34,3 2-48</inkml:trace>
   <inkml:trace contextRef="#ctx0" brushRef="#br0" timeOffset="40491.532">1627 1075 1664,'1'-1'227,"-1"1"0,0-1 0,0 1 1,1-1-1,-1 1 0,0-1 0,0 1 0,0-1 0,0 1 0,0-1 0,0 1 1,0-1-1,0 1 0,0-1 0,0 1 0,0-1 0,0 1 0,0-1 1,0 1-1,0-1 0,0 1 0,-1-1 0,1 1 0,0-1 0,0 1 1,-1-1-1,1 1 0,0 0 0,-1-1 0,1 0-227,-1 1 161,0 0-1,0 0 1,0 0-1,0 0 1,0 0 0,1 0-1,-1 0 1,0 0-1,0 0 1,0 0-1,0 0 1,0 0 0,1 1-1,-1-1 1,0 0-1,-1 1-160,-2 1 125,0 0 0,0 0-1,0 1 1,0-1-1,0 1 1,0 0 0,0 1-125,2-1 122,-1 0 1,1 0-1,0 0 1,0 0-1,1 1 1,-1-1-1,0 1 1,1-1-1,0 1 1,0-1-1,0 1 1,1 0-1,-1-1 1,1 1-123,0-2 25,0-1-1,0 1 1,0-1 0,0 0-1,0 1 1,0-1 0,1 1-1,-1-1 1,0 0 0,1 1 0,-1-1-1,1 0 1,0 1 0,-1-1-1,1 0 1,0 0 0,0 0 0,0 0-1,0 0 1,0 0 0,0 0-1,0 0 1,0 0 0,0 0-1,0 0 1,1 0 0,-1-1 0,0 1-1,0-1 1,1 1 0,-1-1-1,1 1 1,-1-1 0,0 0-1,1 0 1,-1 0 0,1 1-25,2-1-5,-1-1 1,1 1-1,-1 0 1,1-1-1,-1 0 1,1 0-1,-1 0 1,0 0-1,1 0 1,-1-1-1,0 1 1,0-1-1,0 0 1,0 0-1,0 0 1,0-1-1,-1 1 1,1-1-1,0 0 5,6-6-317,-1-1 0,0 0-1,-1 0 1,6-11 317,-3 3-59,0-2-1,-1 1 1,-1-1-1,-1-1 0,-1 1 1,1-10 59,-7 5 257,0 25-249,0 0 0,0-1 1,0 1-1,0 0 0,0-1 0,0 1 0,0 0 1,0-1-1,-1 1 0,1 0 0,0 0 0,0-1 1,0 1-1,0 0 0,0 0 0,-1-1 0,1 1 1,0 0-1,0 0 0,-1 0 0,1-1 0,0 1 1,0 0-1,-1 0 0,1 0 0,0 0 0,0-1-8,-1 2 16,0-1 0,1 0 0,-1 1 0,1-1-1,-1 0 1,1 1 0,-1-1 0,1 1 0,-1-1-1,1 1 1,-1-1 0,1 1 0,-1-1 0,1 1-1,0-1 1,-1 1 0,1-1 0,0 1 0,0 0-16,-4 7 11,0 1 0,0 0 1,2 0-1,-1 0 1,1 0-1,0 0 1,1 0-1,0 2-11,-2 24 214,3 19-214,0-36 185,1 31 221,-11-87-636,7 26-29,1 7 247,1 1 1,0-1-1,0 0 1,0-1-1,0 0 12,1 6 2,0-1-1,0 0 1,0 0 0,0 1-1,0-1 1,0 0 0,1 0-1,-1 0 1,0 1 0,0-1-1,0 0 1,1 1-1,-1-1 1,0 0 0,1 0-1,-1 1 1,1-1 0,-1 1-1,1-1 1,-1 0 0,1 1-1,-1-1 1,1 1-1,0-1 1,-1 1 0,1 0-1,0-1 1,-1 1 0,1 0-1,0-1 1,-1 1 0,1 0-1,0 0 1,0-1-2,7 0-196,0 0 0,0 1 0,0 0 0,7 1 196,5 0-469</inkml:trace>
-  <inkml:trace contextRef="#ctx0" brushRef="#br0" timeOffset="40877.641">1859 1058 7552,'-3'-1'238,"0"1"-1,0 0 1,0-1 0,0 1 0,0 0 0,0 1 0,0-1 0,0 1-1,0-1 1,0 1 0,0 0 0,0 0 0,0 0 0,0 0-1,1 1 1,-1-1 0,0 1 0,1 0 0,0-1 0,-1 1-1,-1 2-237,2-2 20,1-1 0,0 1 0,-1 0-1,1-1 1,0 1 0,0 0 0,0 0-1,0-1 1,0 1 0,1 0 0,-1 0-1,0 0 1,1 0 0,0 0 0,-1 0-1,1 0 1,0 0 0,0 1 0,0-1-1,0 0 1,0 0 0,1 0 0,-1 0-1,1 0 1,-1 0 0,1 0 0,0 0-1,0 0 1,0-1 0,0 1 0,0 0-1,0 0-19,1 1 3,1 0 0,-1-1-1,1 1 1,-1 0 0,1-1-1,0 0 1,0 0 0,0 0 0,0 0-1,2 1-2,-3-2 7,-1-1 0,1 1 0,-1 0 0,1-1-1,-1 1 1,1-1 0,-1 0 0,1 1 0,-1-1-1,1 0 1,0 0 0,-1 0 0,1 0 0,-1 0-1,1 0 1,0 0 0,-1-1 0,1 1 0,-1-1 0,1 1-1,-1-1 1,1 0 0,-1 1 0,1-1 0,-1 0-7,0 0 34,0-1 1,0 1 0,0 0 0,-1 0-1,1-1 1,0 1 0,-1 0 0,1-1-1,-1 1 1,1-1 0,-1 1 0,0-1 0,0 1-1,0-1 1,0 1 0,0-1 0,0 1-1,0-1 1,0 1 0,0-1 0,-1 1-1,1-1 1,-1 1 0,1 0 0,-1-2-35,0 0-5,0 1 0,0-1 0,0 0 0,-1 1 0,1-1 0,-1 0 1,1 1-1,-1 0 0,0-1 0,0 1 0,0 0 0,-2-1 5,-2 0-426</inkml:trace>
+  <inkml:trace contextRef="#ctx0" brushRef="#br0" timeOffset="40877.64">1859 1058 7552,'-3'-1'238,"0"1"-1,0 0 1,0-1 0,0 1 0,0 0 0,0 1 0,0-1 0,0 1-1,0-1 1,0 1 0,0 0 0,0 0 0,0 0 0,0 0-1,1 1 1,-1-1 0,0 1 0,1 0 0,0-1 0,-1 1-1,-1 2-237,2-2 20,1-1 0,0 1 0,-1 0-1,1-1 1,0 1 0,0 0 0,0 0-1,0-1 1,0 1 0,1 0 0,-1 0-1,0 0 1,1 0 0,0 0 0,-1 0-1,1 0 1,0 0 0,0 1 0,0-1-1,0 0 1,0 0 0,1 0 0,-1 0-1,1 0 1,-1 0 0,1 0 0,0 0-1,0 0 1,0-1 0,0 1 0,0 0-1,0 0-19,1 1 3,1 0 0,-1-1-1,1 1 1,-1 0 0,1-1-1,0 0 1,0 0 0,0 0 0,0 0-1,2 1-2,-3-2 7,-1-1 0,1 1 0,-1 0 0,1-1-1,-1 1 1,1-1 0,-1 0 0,1 1 0,-1-1-1,1 0 1,0 0 0,-1 0 0,1 0 0,-1 0-1,1 0 1,0 0 0,-1-1 0,1 1 0,-1-1 0,1 1-1,-1-1 1,1 0 0,-1 1 0,1-1 0,-1 0-7,0 0 34,0-1 1,0 1 0,0 0 0,-1 0-1,1-1 1,0 1 0,-1 0 0,1-1-1,-1 1 1,1-1 0,-1 1 0,0-1 0,0 1-1,0-1 1,0 1 0,0-1 0,0 1-1,0-1 1,0 1 0,0-1 0,-1 1-1,1-1 1,-1 1 0,1 0 0,-1-2-35,0 0-5,0 1 0,0-1 0,0 0 0,-1 1 0,1-1 0,-1 0 1,1 1-1,-1 0 0,0-1 0,0 1 0,0 0 0,-2-1 5,-2 0-426</inkml:trace>
   <inkml:trace contextRef="#ctx0" brushRef="#br0" timeOffset="41208.401">1934 1132 7424,'1'4'605,"-1"-1"1,0 1-1,1 0 1,0-1 0,0 1-1,0 0 1,0-1-1,0 1 1,1-1-1,0 0 1,1 3-606,-3-9 141,-1 1 0,1-1 0,0 0 0,0 1 0,1-1 0,-1 1 1,0-1-1,1 0 0,0 1 0,-1-1 0,1 0-141,0 2-11,-1-1 0,1 1 0,0-1 0,-1 1 0,1-1 0,0 1 0,0 0 0,0-1 1,0 1-1,0 0 0,0 0 0,0-1 0,0 1 0,1 0 0,-1 0 0,0 1 0,1-1 0,-1 0 0,1 0 0,-1 1 1,1-1 10,8-2 880</inkml:trace>
-  <inkml:trace contextRef="#ctx0" brushRef="#br0" timeOffset="41586.165">2056 1101 6272,'0'0'74,"0"0"1,0 0 0,0-1 0,0 1-1,-1 0 1,1 0 0,0 0-1,0 0 1,0 0 0,-1-1-1,1 1 1,0 0 0,0 0-1,0 0 1,-1 0 0,1 0-1,0 0 1,0 0 0,-1 0-1,1 0 1,0 0 0,0 0-1,0 0 1,-1 0 0,1 0 0,0 0-1,0 0 1,-1 0 0,1 0-1,0 0 1,0 1 0,0-1-1,-1 0 1,1 0 0,0 0-1,0 0 1,0 0 0,-1 0-75,-7 11 112,-3 14 1327,11-24-1316,0 0 0,-1 0 0,1 0 1,0 0-1,0 0 0,0 0 0,0 0 0,0 0 0,0 0 0,0 0 0,1 0 0,-1 0 1,0 0-1,1 0 0,-1 0 0,0 0 0,1 0 0,-1 0 0,1 0 0,-1 0 1,1-1-1,0 1-123,0 1 110,1-1 0,-1 1 1,1-1-1,0 0 0,-1 0 0,1 0 1,0 0-1,0 0 0,0 0 1,0-1-1,0 1-110,3 1 83,-1-1 0,0 0 0,1-1 0,-1 1 0,1-1 0,-1 0 0,1 0 0,-1 0 0,0-1 0,3 0-83,-3 0-145,0 0 0,0-1 0,0 0 0,0 0 0,0 0 0,-1 0 0,1 0 0,-1-1 0,0 0 0,0 0 1,0 0-1,0 0 0,0 0 0,0 0 0,-1-1 0,1 1 0,0-4 145,-17 33-2576,-17 21 3682,15-24-399,-18 25 461,-29 48-560,26-36-1093,27-46-32</inkml:trace>
+  <inkml:trace contextRef="#ctx0" brushRef="#br0" timeOffset="41586.164">2056 1101 6272,'0'0'74,"0"0"1,0 0 0,0-1 0,0 1-1,-1 0 1,1 0 0,0 0-1,0 0 1,0 0 0,-1-1-1,1 1 1,0 0 0,0 0-1,0 0 1,-1 0 0,1 0-1,0 0 1,0 0 0,-1 0-1,1 0 1,0 0 0,0 0-1,0 0 1,-1 0 0,1 0 0,0 0-1,0 0 1,-1 0 0,1 0-1,0 0 1,0 1 0,0-1-1,-1 0 1,1 0 0,0 0-1,0 0 1,0 0 0,-1 0-75,-7 11 112,-3 14 1327,11-24-1316,0 0 0,-1 0 0,1 0 1,0 0-1,0 0 0,0 0 0,0 0 0,0 0 0,0 0 0,0 0 0,1 0 0,-1 0 1,0 0-1,1 0 0,-1 0 0,0 0 0,1 0 0,-1 0 0,1 0 0,-1 0 1,1-1-1,0 1-123,0 1 110,1-1 0,-1 1 1,1-1-1,0 0 0,-1 0 0,1 0 1,0 0-1,0 0 0,0 0 1,0-1-1,0 1-110,3 1 83,-1-1 0,0 0 0,1-1 0,-1 1 0,1-1 0,-1 0 0,1 0 0,-1 0 0,0-1 0,3 0-83,-3 0-145,0 0 0,0-1 0,0 0 0,0 0 0,0 0 0,-1 0 0,1 0 0,-1-1 0,0 0 0,0 0 1,0 0-1,0 0 0,0 0 0,0 0 0,-1-1 0,1 1 0,0-4 145,-17 33-2576,-17 21 3682,15-24-399,-18 25 461,-29 48-560,26-36-1093,27-46-32</inkml:trace>
   <inkml:trace contextRef="#ctx0" brushRef="#br0" timeOffset="53505.812">2512 1064 1792,'1'0'253,"-1"0"0,0-1 1,0 1-1,0 0 0,0-1 0,1 1 1,-1 0-1,0-1 0,0 1 0,0 0 0,0-1 1,0 1-1,0 0 0,0 0 0,0-1 1,0 1-1,0 0 0,0-1 0,0 1 0,0 0 1,0-1-1,0 1 0,-1 0 0,1-1 1,0 1-1,0 0 0,0-1 0,0 1 0,-1 0 1,1 0-1,0-1 0,0 1-253,-11 1 1613,8 1-1612,-1 0-1,1 0 0,0 0 0,0 0 0,0 0 0,-1 1 0,-6 7 142,0 0 0,1 1 0,0 0-1,0 0 1,-2 6-142,11-16 13,0-1 0,-1 1-1,1 0 1,-1-1 0,1 1-1,0 0 1,0 0 0,-1-1-1,1 1 1,0 0 0,0 0 0,0 0-1,0 0 1,0-1 0,0 1-1,0 0 1,0 0 0,0 0-1,0-1 1,1 2-13,-1-2 8,0 1 1,1-1-1,-1 0 1,1 1-1,-1-1 1,0 1-1,1-1 1,-1 0-1,1 1 0,-1-1 1,1 0-1,-1 0 1,1 1-1,-1-1 1,1 0-1,-1 0 1,1 0-1,0 0 0,-1 0 1,1 0-1,-1 0 1,1 0-9,2 0 17,0 0 0,0 0-1,0-1 1,-1 1 0,1-1 0,0 1 0,0-1 0,0 0-1,-1-1 1,2 1-17,4-4-344,0 0 0,0 0-1,0-1 1,-1 1 0,0-2 0,0 1-1,-1-1 1,1 0 0,4-7 344,-11 13 427,-1 1-50,-6 6 268,-6 11 498,13-16-1116,-1 0 1,1 0-1,-1 0 1,1 0-1,0 0 1,-1 0-1,1 0 1,0 0-1,0 0 1,0 0-1,0 0 1,0 1-1,0-1 1,0 0-1,0 0 1,0 0-1,1 0 1,-1 0-1,0 0 1,1 0-1,-1 0 1,1 0-1,-1 0 1,1 0-1,-1 0 1,1 0-1,0 0 1,-1 0-1,1-1 1,0 1-1,0 0 1,0 0-1,0-1 1,-1 1-1,1 0 1,0-1-1,0 1 1,0-1-28,7 4-437</inkml:trace>
   <inkml:trace contextRef="#ctx0" brushRef="#br0" timeOffset="53880.74">2666 1055 1536,'-2'-7'1431,"-3"5"4880,-1 6-1793,1 1-6277,-29 33 2928,31-33-1024,-1 0 1,1 0-1,0 0 0,0 0 1,0 1-1,1-1 1,-1 3-146,3-7 10,0 0 1,-1 0 0,1 0-1,0-1 1,0 1 0,0 0-1,0 0 1,0 0 0,0 0-1,0 0 1,0 0 0,0-1-1,0 1 1,0 0 0,1 0-1,-1 0 1,0 0 0,1-1-1,-1 1 1,0 0 0,1 0-1,-1-1 1,1 1 0,0 0-1,0 0-10,0 0-6,0 0 0,1 0-1,-1 0 1,1-1 0,-1 1-1,1 0 1,0-1 0,-1 1-1,1-1 1,-1 0 0,1 0-1,0 1 1,0-1 6,6 0-211,0 0-1,1-1 1,-1 1-1,8-3 212,1-1-378</inkml:trace>
   <inkml:trace contextRef="#ctx0" brushRef="#br0" timeOffset="54229.328">2803 1056 3712,'0'0'169,"0"0"-1,0 0 1,0-1 0,0 1 0,0 0 0,0 0-1,0 0 1,0-1 0,0 1 0,0 0 0,0 0-1,0-1 1,0 1 0,0 0 0,0 0 0,0 0-1,0-1 1,-1 1 0,1 0 0,0 0 0,0 0-1,0 0 1,0-1 0,0 1 0,-1 0 0,1 0-1,0 0 1,0 0 0,0 0 0,-1-1 0,1 1-1,0 0 1,0 0 0,0 0 0,-1 0 0,1 0-1,0 0 1,0 0 0,0 0 0,-1 0 0,1 0-169,-12 5 1764,-8 11-1415,13-8 50,-17 23-65,23-29-324,0 0 1,0 0-1,0 0 1,0 0-1,0 0 1,0 0 0,0 0-1,1 0 1,-1 1-1,1-1 1,-1 0-1,1 0 1,0 1-1,0 0-10,0-2-11,1 0 0,-1 0 0,0 0 0,0 0 0,1 0 0,-1 0 0,1 0 0,-1 0 0,1-1 0,-1 1 0,1 0 0,-1 0 0,1-1 0,0 1 0,0 0 0,-1-1-1,1 1 1,0 0 0,0-1 0,0 1 0,-1-1 0,1 0 0,0 1 0,0-1 0,0 0 0,0 1 11,2 0-134,0-1 0,0 1-1,1-1 1,-1 0 0,0 0 0,0 0 0,3 0 134,6-2-624</inkml:trace>
   <inkml:trace contextRef="#ctx0" brushRef="#br0" timeOffset="54625.99">2898 1061 7808,'-1'0'156,"1"0"0,0 0 1,-1 0-1,1 0 0,0 0 1,-1 1-1,1-1 0,0 0 0,0 0 1,-1 0-1,1 1 0,0-1 1,0 0-1,-1 0 0,1 1 0,0-1 1,0 0-1,0 1 0,-1-1 1,1 0-1,0 0 0,0 1 0,0-1 1,0 0-1,0 1 0,0-1-156,-5 16 165,1-7 44,3-6-155,-1 2 160,-1 0-1,1 1 1,0-1-1,1 1 0,-1 2-213,2-7 22,0-1 1,-1 1-1,1 0 0,0-1 0,0 1 0,0 0 0,0-1 0,0 1 0,0 0 0,0 0 0,0-1 0,0 1 0,1 0 0,-1-1 0,0 1 0,0 0 0,1-1 1,-1 1-1,0 0 0,1-1 0,-1 1 0,0-1 0,1 1 0,-1-1 0,1 1 0,-1-1 0,1 1 0,-1-1 0,1 1 0,0-1 0,-1 0 0,1 1 1,-1-1-1,1 0 0,0 1 0,-1-1 0,1 0 0,0 0 0,-1 0 0,1 0 0,0 1 0,0-1 0,-1 0 0,1 0 0,0 0 0,-1-1 0,1 1 0,0 0 1,0 0-23,1 0-29,1-1 0,-1 0 0,0 1 0,1-1 0,-1 0 1,0 0-1,0 0 0,0 0 0,0 0 0,0-1 0,0 1 0,0-1 1,1-1 28,23-25-1036,-12 11-236,17-15 200,-34 66 4336,2-26-3038,-2 28 261,3-34-539,0 0-1,0 0 0,0 0 0,1 0 0,-1 0 0,1 0 0,-1 0 0,1 0 0,0-1 0,0 1 0,0 0 0,0 0 0,0-1 0,0 1 1,0 0-1,1-1 53,3 4-704</inkml:trace>
-  <inkml:trace contextRef="#ctx0" brushRef="#br0" timeOffset="54975.991">3073 1079 6400,'0'1'362,"-1"1"1,0-1 0,1 0-1,-1 1 1,1-1 0,-1 1-1,1-1 1,0 1 0,0-1-1,-1 1 1,1-1 0,0 0-1,0 1 1,0-1-1,1 1 1,-1 0-363,3 24 1648,-2-22-1513,2 7 1169,-1-11-709,2-7-383,-2 4-414,-1 0 0,1 0 1,-1 0-1,1 1 1,0-1-1,1 1 1,-1-1-1,0 1 1,1-1-1,-1 1 1,1 0-1,-1 0 1,1 1-1,2-2 202,5-2-506</inkml:trace>
+  <inkml:trace contextRef="#ctx0" brushRef="#br0" timeOffset="54975.99">3073 1079 6400,'0'1'362,"-1"1"1,0-1 0,1 0-1,-1 1 1,1-1 0,-1 1-1,1-1 1,0 1 0,0-1-1,-1 1 1,1-1 0,0 0-1,0 1 1,0-1-1,1 1 1,-1 0-363,3 24 1648,-2-22-1513,2 7 1169,-1-11-709,2-7-383,-2 4-414,-1 0 0,1 0 1,-1 0-1,1 1 1,0-1-1,1 1 1,-1-1-1,0 1 1,1-1-1,-1 1 1,1 0-1,-1 0 1,1 1-1,2-2 202,5-2-506</inkml:trace>
   <inkml:trace contextRef="#ctx0" brushRef="#br0" timeOffset="55409.442">3266 1116 5888,'-7'-8'2418,"6"6"-1899,-1 0 0,1 0 0,-1 1 0,0-1 0,0 0 0,0 1 1,0-1-1,-1 0-519,2 2 68,0-1 0,0 1 1,0 0-1,0 0 0,0-1 1,0 1-1,-1 0 0,1 0 1,0 0-1,0 0 0,0 0 1,0 0-1,0 1 0,0-1 1,0 0-1,0 1 0,0-1 1,0 0-1,0 1 1,0-1-1,0 1 0,-1 0-68,1 0 10,-28 18 104,28-18-70,-1 0 0,0 1 1,1-1-1,0 0 0,-1 1 1,1-1-1,0 1 0,0 0 0,0-1 1,0 1-1,0 0 0,0 0 0,0-1 1,0 1-1,1 0 0,-1 0-44,1-1 9,0 0 0,0-1 0,0 1 0,0 0 0,0-1 0,0 1 0,0 0 0,1-1 0,-1 1 0,0 0 0,0-1 0,0 1 0,1-1 0,-1 1 0,0-1 0,1 1 0,-1 0 0,1-1 0,-1 1 0,1-1 0,-1 0-1,0 1 1,1-1 0,0 1 0,-1-1 0,1 0 0,-1 1 0,1-1 0,-1 0 0,1 1 0,0-1 0,-1 0 0,1 0 0,0 0 0,-1 0 0,1 0 0,0 0 0,-1 0 0,1 0 0,0 0 0,-1 0 0,1 0 0,-1 0 0,1 0-9,2 0 12,0-1 1,-1 1-1,1-1 1,0 1-1,-1-1 1,1 0-1,0 0 0,-1 0 1,3-2-13,6-6-496,-9 7 304,0 0 0,0 0 0,0 1 0,0-1 0,1 0 0,-1 1 0,0 0 0,1 0 0,-1-1 0,1 1 192,6 29 1221,-8-26-1241,0-1-1,0 0 1,0 0-1,1 0 1,-1 0 0,0 0-1,0 0 1,1 0-1,-1-1 1,1 1-1,-1 0 1,1-1 20,6 2-517</inkml:trace>
   <inkml:trace contextRef="#ctx0" brushRef="#br0" timeOffset="55763.289">3386 1089 7040,'-2'1'427,"0"0"1,0-1-1,1 1 1,-1 0-1,0 0 1,1 1-1,-1-1 1,0 0-1,1 1 1,0-1-1,-1 1 1,1-1-1,0 1 0,-1 0-427,-16 26 496,18-27-468,-1 0 1,1 0 0,-1 0 0,1 0 0,0 0 0,-1 0-1,1 0 1,0 0 0,0 0 0,0 0 0,0 0 0,0 0 0,0 1-1,0-1 1,0 0 0,0 0 0,0 0 0,1 0 0,-1 0-1,0 0 1,1 0 0,-1 0 0,1 0 0,-1 0 0,1 0-29,0 0-37,0 0 1,0 0 0,0 0-1,0-1 1,0 1-1,0 0 1,0-1 0,0 1-1,1-1 1,-1 1 0,0-1-1,0 0 1,0 1 0,1-1-1,-1 0 1,0 0-1,1 0 1,-1 0 0,0 0-1,0 0 1,2 0 36,7-1-2821</inkml:trace>
   <inkml:trace contextRef="#ctx0" brushRef="#br0" timeOffset="56140.217">3475 1107 6400,'-1'1'250,"0"-1"0,1 0 1,-1 1-1,0-1 0,0 1 0,0-1 1,1 1-1,-1-1 0,0 1 0,1-1 1,-1 1-1,0 0 0,1-1 0,-1 1 1,1 0-1,-1-1 0,1 1 0,-1 0 1,1 0-1,0 0 0,-1 0-250,0 1 170,-1 1 1,1-1-1,0 0 1,0 1-1,0-1 1,0 0-1,0 1 0,1-1 1,-1 2-171,1-2 54,0-1 0,1 0 0,-1 0 0,0 1 0,1-1 0,-1 0 0,1 0 0,0 0 0,-1 0 0,1 1 0,0-1 0,-1 0 0,1 0 0,0 0 0,0-1 0,0 1 0,0 0 0,0 0 0,0 0 0,0-1 0,0 1 0,0 0 0,1-1 0,-1 1 0,0-1 0,0 1 0,1-1 0,-1 0 0,0 0 0,0 1 0,1-1 0,-1 0 0,0 0 0,0 0 0,1-1-54,5 2 16,0-2 0,-1 1-1,1-1 1,-1 0-1,1 0 1,1-2-16,-3 2-89,0 0-1,0-1 1,0 0 0,0 0-1,0 0 1,0-1 0,-1 1-1,1-1 1,-1 0 0,0-1-1,0 1 1,0-1 89,-4 4-12,0 0 0,0 0 0,0 0 0,0 0 0,0 0-1,0 0 1,0 0 0,0 0 0,0 0 0,0 0 0,0 0 0,0 0 0,0 0 0,-1 0 0,1 0 0,0 0 0,0 0 0,0 0-1,0 0 1,0 0 0,0 0 0,0 0 0,0 0 0,0 0 0,0 0 0,0 0 0,0 0 0,0 0 0,0 0 0,0 0-1,0 0 1,0 0 0,0 0 0,0 0 0,0 0 0,0-1 0,0 1 0,0 0 0,0 0 0,0 0 0,0 0 0,0 0 0,0 0-1,0 0 1,0 0 0,0 0 0,0 0 0,0 0 0,0 0 0,0 0 0,0 0 0,0 0 0,0 0 0,0 0 0,0 0 0,0 0-1,0 0 1,0 0 0,0 0 0,0-1 0,0 1 0,0 0 0,0 0 0,0 0 12,-7 2-290,-7 5 190,2 3 308,0 0 0,0 0 0,1 2 0,-5 4-208,-18 19 550,-9 6-70,10-10-768,-1 0 0,-1-3 0,-21 13 288,25-21-912</inkml:trace>
@@ -985,12 +985,12 @@
   <inkml:trace contextRef="#ctx0" brushRef="#br0" timeOffset="60261.668">1003 1490 4736,'-1'-1'197,"1"0"1,0 1-1,-1-1 0,1 0 1,-1 1-1,0-1 1,1 0-1,-1 1 1,0-1-1,1 1 0,-1-1 1,0 1-1,1 0 1,-1-1-1,0 1 0,0 0 1,0-1-1,1 1 1,-1 0-1,0 0 0,0 0 1,0 0-1,0 0 1,1 0-1,-1 0 0,0 0 1,0 0-1,0 0 1,0 0-1,1 0 0,-1 1 1,0-1-1,0 0 1,0 1-1,0-1-197,-2 2 168,0-1 1,0 0-1,-1 1 0,1 0 1,1 0-1,-1 0 0,0 0 1,-1 1-169,-3 4 343,0 1-1,0 0 1,-4 8-343,9-15 40,1 1-1,0-1 0,0 1 0,0-1 0,0 1 1,1-1-1,-1 1 0,0 0 0,1-1 0,-1 1 1,1 0-1,-1 0 0,1 0 0,0-1 0,0 1 1,0 0-1,0 0 0,0 0 0,0 0 0,0-1 1,1 1-1,-1 0 0,1 0 0,-1-1 0,1 1 1,0 0-40,0-1 11,0-1 1,0 1 0,0 0 0,0 0 0,0-1 0,0 1 0,0-1 0,0 1-1,0-1 1,1 1 0,-1-1 0,0 0 0,0 1 0,0-1 0,1 0-1,-1 0 1,0 0 0,0 0 0,1 0 0,-1 0 0,0 0 0,0-1 0,1 1-1,-1 0 1,0-1 0,0 1 0,0-1 0,0 1 0,1-1-12,3-1-32,0 0 1,-1-1-1,1 0 0,0 1 1,-1-2-1,2 0 32,36-41-1850,-43 49 1929,0 0 0,1-1 0,-1 1 0,1 0 0,0-1 0,0 1 0,0 0 1,1 0-1,-1-1 0,1 1 0,0 0-79,-1-3-32,0 0 1,1 0 0,-1 0-1,1 0 1,-1 0-1,1 0 1,-1 0-1,1 0 1,-1 0-1,1 0 1,0 0-1,0 0 1,0 0 0,-1-1-1,1 1 1,0 0-1,0 0 1,0-1-1,0 1 1,0-1-1,0 1 1,0-1 0,0 1-1,0-1 1,1 0-1,-1 1 1,0-1-1,0 0 1,0 0-1,0 0 1,1 0 0,-1 0-1,0 0 1,0 0-1,0 0 1,0-1-1,1 1 32,9-3-1018</inkml:trace>
   <inkml:trace contextRef="#ctx0" brushRef="#br0" timeOffset="60660.574">1181 1476 6016,'-2'-1'300,"0"1"0,0-1 0,0 0 0,0 1 0,0 0 0,0-1-1,0 1 1,0 0 0,0 0 0,0 0 0,-1 0 0,1 1 0,0-1 0,0 1 0,0-1 0,0 1 0,0 0-300,-1 0 201,-1 0-1,1 1 1,-1-1-1,1 1 1,-1 0-1,1 0 1,0 0 0,-2 3-201,4-5 33,1 1 0,0-1 0,-1 0 0,1 1 0,0-1 0,-1 0 0,1 1 0,0-1 0,0 1 1,0-1-1,-1 1 0,1-1 0,0 1 0,0-1 0,0 0 0,0 1 0,0-1 0,0 1 0,0-1 0,0 1 1,0-1-1,0 1 0,0-1 0,0 1 0,0-1 0,1 1 0,-1-1 0,0 0 0,0 1 0,0-1 0,1 1 0,-1-1 1,0 0-1,1 1 0,-1-1 0,0 1 0,1-1 0,-1 0 0,0 1 0,1-1 0,-1 0 0,1 0-33,19 14 296,-14-11-157,2 2-47,20 14 69,-27-19-128,0 1 0,0 0 0,0-1 0,0 1 0,-1 0 0,1 0 0,0 0 0,0 0 0,-1 0 0,1 0 0,-1 0 0,1 0 0,-1 0 0,1 0 0,-1 0 0,0 0 0,1 0 0,-1 0 0,0 1 0,0-1 0,0 0 0,0 0 0,0 0 0,0 1-33,-1-1 33,1 0 0,-1 1 1,0-1-1,1 0 0,-1 0 0,0 0 1,0 0-1,0 0 0,0 0 0,0 0 1,-1 0-1,1 0 0,0 0 0,0 0 1,0-1-1,-1 1 0,1-1-33,-26 11 40,20-8-80,-22 7-2114,28-9 1146</inkml:trace>
   <inkml:trace contextRef="#ctx0" brushRef="#br0" timeOffset="61048.617">1248 1578 6400,'0'1'4984,"5"-1"-3570,8-1-1236,-3-1-66,-1-1 0,0-1 0,0 1-1,2-3-111,-8 5 10,1-1 0,-1 0 0,0 0 0,0-1-1,0 1 1,0 0 0,0-1 0,-1 0 0,1 0-1,-1 0 1,0 0 0,1-1-10,-3 3 5,1 1-1,-1-1 1,0 1-1,1-1 1,-1 1 0,0-1-1,0 1 1,0-1 0,1 1-1,-1-1 1,0 1-1,0-1 1,0 1 0,0-1-1,0 0 1,0 1-1,0-1 1,0 1 0,0-1-1,0 1 1,0-1 0,-1 1-1,1-1 1,0 1-1,0-1 1,-1 0 0,1 1-1,0 0 1,-1-1-5,1 0 3,-1 1-1,0-1 1,0 1 0,0-1-1,0 1 1,0-1 0,0 1-1,0 0 1,0-1 0,0 1-1,0 0 1,0 0 0,0 0-1,0 0 1,0 0-3,-4 0-5,1 0 0,-1 0 0,1 0 0,0 1 0,-1 0 0,1 0 0,-1 1 5,0 0-7,1 0-1,0 0 1,0 1 0,0 0 0,0 0 0,1 0 0,-1 0 0,-2 4 7,5-6 50,0 0-1,-1 0 1,1 0 0,1 0-1,-1 1 1,0-1-1,0 1 1,0-1 0,1 0-1,-1 1 1,0-1 0,1 1-1,0-1 1,-1 1 0,1 0-1,0-1 1,0 1-1,0-1 1,0 1 0,0 0-1,0-1 1,0 1 0,0-1-1,1 1 1,-1-1 0,1 1-1,-1-1 1,1 1-50,0-1 45,0 0-1,0 0 1,0 0-1,0 0 1,0 0 0,0 0-1,0 0 1,0 0 0,0 0-1,1-1 1,-1 1 0,0 0-1,1-1 1,0 1-45,23 5 133,-15-4-203,34 8-581,-22-5 97</inkml:trace>
-  <inkml:trace contextRef="#ctx0" brushRef="#br0" timeOffset="62431.699">1667 1536 384,'1'-2'437,"-1"1"0,0 0 0,0 0 0,0 0 0,1 0 1,-1 0-1,0-1 0,-1 1 0,1 0 0,0 0 0,0 0 0,0 0 0,-1 0 0,1 0 0,-1-1 1,1 1-1,-1 0 0,1 0 0,-1 0 0,0 0-437,1 1 195,-1 0 0,1-1 0,-1 1 0,1 0 0,-1 0 0,1 0-1,-1-1 1,1 1 0,-1 0 0,1 0 0,-1 0 0,0 0 0,1 0 0,-1 0 0,1 0 0,-1 0 0,1 0 0,-1 1 0,1-1 0,-1 0-195,-12 5-1009,7-1 1023,1-1 0,0 1-1,-1 0 1,1 0 0,1 1 0,-5 4-14,6-7 76,1 1 1,0 0-1,0 0 0,0 0 0,0 1 0,0-1 0,1 0 0,-1 1 1,1-1-1,0 1 0,0-1 0,-1 4-76,2-6 7,0 0 0,0 0 0,0-1 0,0 1 0,0 0 0,0-1 0,0 1 0,1 0 0,-1 0 0,0-1-1,0 1 1,0 0 0,1-1 0,-1 1 0,0 0 0,1-1 0,-1 1 0,1-1 0,-1 1 0,1 0 0,-1-1 0,1 1 0,-1-1 0,1 0 0,0 1-7,0 0 26,1 0 0,-1-1-1,1 1 1,0 0 0,0-1 0,-1 1 0,1-1-1,0 0 1,0 0 0,1 1-26,5-2 84,0 1 0,0-1 0,0 0 0,3-1-84,-7 1-11,0 0 0,-1 0 1,1 0-1,0-1 0,-1 1 0,1-1 1,-1 0-1,0 0 0,0 0 0,0 0 0,0-1 1,0 1-1,0-2 11,-2 4-6,0-1 0,0-1 0,-1 1 0,1 0 0,0 0 0,-1 0 0,1 0-1,-1 0 1,1 0 0,-1-1 0,0 1 0,1 0 0,-1 0 0,0-1 0,0 1 0,0 0 0,0-1 6,0 0-4,-1 1 0,1-1 0,-1 0 1,1 1-1,-1-1 0,0 1 0,0-1 0,1 1 1,-1-1-1,0 1 0,0 0 0,0-1 0,-1 1 1,1 0-1,0 0 0,-1-1 4,1 1-64,0 1 0,0-1 0,0 0 0,-1 0 0,1 1 0,0-1 0,-1 0 0,1 1 0,0-1 0,-1 1 0,1 0 0,0 0 0,-1-1 0,0 1 64,-3 1-741</inkml:trace>
-  <inkml:trace contextRef="#ctx0" brushRef="#br0" timeOffset="62816.029">1783 1611 5120,'8'1'2691,"6"0"1040,-14-2-3678,1 1 0,-1 0 0,0 0 0,1-1 0,-1 1 0,0 0 0,0-1 0,1 1 0,-1 0 0,0-1 0,0 1 0,0 0 0,0-1 0,1 1 0,-1-1 0,0 1 0,0 0 0,0-1 0,0 1 0,0-1 0,0 1 0,0 0 0,0-1 0,0 1 0,0-1 0,0 1 0,0 0 0,0-1 0,0 1 0,-1-1 0,1 1 0,0 0 0,0-1 1,0 1-1,-1 0 0,1-1 0,0 1-53,-5-12 194,-1 1 0,0 1 0,-1-1 0,0 1 0,0 0 0,-2-1-194,-2-3-70,1 0-1,-7-13 71,14 23 83,1-1-1,0 0 0,0 1 1,1-1-1,-1 0 1,1 0-1,0 0 1,0 0-1,1 0 1,-1 0-1,1-3-82,0 6 12,0 0 0,0 0 0,1 0 0,-1 1 0,0-1 0,1 0 0,-1 0 0,1 0 0,0 1 0,-1-1 0,1 0 0,0 1 0,0-1 0,0 1 0,0-1 0,1 1 0,-1-1 0,0 1 0,0 0 0,1 0 0,-1-1 0,1 1 0,-1 0-1,1 0 1,0 0 0,-1 1 0,1-1 0,0 0 0,0 1 0,-1-1 0,1 1 0,0-1 0,0 1 0,0 0 0,0 0 0,1 0-12,1 0-85,1 0 0,-1 1 0,0-1 1,0 1-1,0 0 0,0 0 0,1 0 0,-1 1 0,-1-1 0,1 1 0,0 0 0,0 0 0,-1 0 0,1 1 1,2 1 84,4 7-656,-2-1-128</inkml:trace>
+  <inkml:trace contextRef="#ctx0" brushRef="#br0" timeOffset="62431.698">1667 1536 384,'1'-2'437,"-1"1"0,0 0 0,0 0 0,0 0 0,1 0 1,-1 0-1,0-1 0,-1 1 0,1 0 0,0 0 0,0 0 0,0 0 0,-1 0 0,1 0 0,-1-1 1,1 1-1,-1 0 0,1 0 0,-1 0 0,0 0-437,1 1 195,-1 0 0,1-1 0,-1 1 0,1 0 0,-1 0 0,1 0-1,-1-1 1,1 1 0,-1 0 0,1 0 0,-1 0 0,0 0 0,1 0 0,-1 0 0,1 0 0,-1 0 0,1 0 0,-1 1 0,1-1 0,-1 0-195,-12 5-1009,7-1 1023,1-1 0,0 1-1,-1 0 1,1 0 0,1 1 0,-5 4-14,6-7 76,1 1 1,0 0-1,0 0 0,0 0 0,0 1 0,0-1 0,1 0 0,-1 1 1,1-1-1,0 1 0,0-1 0,-1 4-76,2-6 7,0 0 0,0 0 0,0-1 0,0 1 0,0 0 0,0-1 0,0 1 0,1 0 0,-1 0 0,0-1-1,0 1 1,0 0 0,1-1 0,-1 1 0,0 0 0,1-1 0,-1 1 0,1-1 0,-1 1 0,1 0 0,-1-1 0,1 1 0,-1-1 0,1 0 0,0 1-7,0 0 26,1 0 0,-1-1-1,1 1 1,0 0 0,0-1 0,-1 1 0,1-1-1,0 0 1,0 0 0,1 1-26,5-2 84,0 1 0,0-1 0,0 0 0,3-1-84,-7 1-11,0 0 0,-1 0 1,1 0-1,0-1 0,-1 1 0,1-1 1,-1 0-1,0 0 0,0 0 0,0 0 0,0-1 1,0 1-1,0-2 11,-2 4-6,0-1 0,0-1 0,-1 1 0,1 0 0,0 0 0,-1 0 0,1 0-1,-1 0 1,1 0 0,-1-1 0,0 1 0,1 0 0,-1 0 0,0-1 0,0 1 0,0 0 0,0-1 6,0 0-4,-1 1 0,1-1 0,-1 0 1,1 1-1,-1-1 0,0 1 0,0-1 0,1 1 1,-1-1-1,0 1 0,0 0 0,0-1 0,-1 1 1,1 0-1,0 0 0,-1-1 4,1 1-64,0 1 0,0-1 0,0 0 0,-1 0 0,1 1 0,0-1 0,-1 0 0,1 1 0,0-1 0,-1 1 0,1 0 0,0 0 0,-1-1 0,0 1 64,-3 1-741</inkml:trace>
+  <inkml:trace contextRef="#ctx0" brushRef="#br0" timeOffset="62816.028">1783 1611 5120,'8'1'2691,"6"0"1040,-14-2-3678,1 1 0,-1 0 0,0 0 0,1-1 0,-1 1 0,0 0 0,0-1 0,1 1 0,-1 0 0,0-1 0,0 1 0,0 0 0,0-1 0,1 1 0,-1-1 0,0 1 0,0 0 0,0-1 0,0 1 0,0-1 0,0 1 0,0 0 0,0-1 0,0 1 0,0-1 0,0 1 0,0 0 0,0-1 0,0 1 0,-1-1 0,1 1 0,0 0 0,0-1 1,0 1-1,-1 0 0,1-1 0,0 1-53,-5-12 194,-1 1 0,0 1 0,-1-1 0,0 1 0,0 0 0,-2-1-194,-2-3-70,1 0-1,-7-13 71,14 23 83,1-1-1,0 0 0,0 1 1,1-1-1,-1 0 1,1 0-1,0 0 1,0 0-1,1 0 1,-1 0-1,1-3-82,0 6 12,0 0 0,0 0 0,1 0 0,-1 1 0,0-1 0,1 0 0,-1 0 0,1 0 0,0 1 0,-1-1 0,1 0 0,0 1 0,0-1 0,0 1 0,0-1 0,1 1 0,-1-1 0,0 1 0,0 0 0,1 0 0,-1-1 0,1 1 0,-1 0-1,1 0 1,0 0 0,-1 1 0,1-1 0,0 0 0,0 1 0,-1-1 0,1 1 0,0-1 0,0 1 0,0 0 0,0 0 0,1 0-12,1 0-85,1 0 0,-1 1 0,0-1 1,0 1-1,0 0 0,0 0 0,1 0 0,-1 1 0,-1-1 0,1 1 0,0 0 0,0 0 0,-1 0 0,1 1 1,2 1 84,4 7-656,-2-1-128</inkml:trace>
   <inkml:trace contextRef="#ctx0" brushRef="#br0" timeOffset="63146.851">1697 1505 8192,'-7'-8'3072,"7"6"-2400,2 3-32,1 0-128,1 0-448,3 0-96,4 0 0,4-1 64,3 0 0,1 0-32,2 0 32,-1-1-320,4 2-64</inkml:trace>
-  <inkml:trace contextRef="#ctx0" brushRef="#br0" timeOffset="64098.624">2025 1514 2304,'-2'12'6865,"0"-5"-5971,1 0 0,0 0-1,1 0 1,-1 0 0,1 5-894,0-11 29,0 0 0,0 0-1,1 0 1,-1 1 0,0-1 0,0 0 0,0 0 0,1 0-1,-1 0 1,1 0 0,-1 0 0,1 0 0,-1 0 0,1 0-1,-1 0 1,1 0 0,0-1 0,0 1 0,-1 0-1,1 0 1,0-1 0,0 1 0,0 0 0,0-1 0,0 1-1,0-1 1,0 1 0,0-1 0,0 1 0,0-1 0,0 0-1,0 0 1,0 1 0,0-1 0,0 0 0,0 0 0,1 0-1,-1 0 1,1-1-29,2 1-4,-1 0-1,1-1 1,-1 0-1,1 0 1,0 0 0,-1 0-1,0-1 1,1 1-1,-1-1 1,0 0-1,0 0 1,0 0-1,2-2 5,3-3 30,-1-1 0,-1 1-1,1-1 1,0-2-30,10-12-855,-19 28 864,0-1 0,1 0 0,0 1 0,0 0 1,0-1-1,0 1 0,1 0 0,0-1 0,1 1 1,-1 0-1,1 0-9,-1-5-3,1 0 0,-1 1-1,1-1 1,-1 0 0,1 0 0,-1 0 0,1 0 0,0 1-1,0-1 1,-1 0 0,1 0 0,0 0 0,0 0 0,0-1 0,0 1-1,0 0 1,0 0 0,1-1 0,-1 1 0,0 0 0,0-1-1,0 1 1,1-1 0,-1 0 0,0 1 0,0-1 0,1 0 3,8 1-704</inkml:trace>
+  <inkml:trace contextRef="#ctx0" brushRef="#br0" timeOffset="64098.623">2025 1514 2304,'-2'12'6865,"0"-5"-5971,1 0 0,0 0-1,1 0 1,-1 0 0,1 5-894,0-11 29,0 0 0,0 0-1,1 0 1,-1 1 0,0-1 0,0 0 0,0 0 0,1 0-1,-1 0 1,1 0 0,-1 0 0,1 0 0,-1 0 0,1 0-1,-1 0 1,1 0 0,0-1 0,0 1 0,-1 0-1,1 0 1,0-1 0,0 1 0,0 0 0,0-1 0,0 1-1,0-1 1,0 1 0,0-1 0,0 1 0,0-1 0,0 0-1,0 0 1,0 1 0,0-1 0,0 0 0,0 0 0,1 0-1,-1 0 1,1-1-29,2 1-4,-1 0-1,1-1 1,-1 0-1,1 0 1,0 0 0,-1 0-1,0-1 1,1 1-1,-1-1 1,0 0-1,0 0 1,0 0-1,2-2 5,3-3 30,-1-1 0,-1 1-1,1-1 1,0-2-30,10-12-855,-19 28 864,0-1 0,1 0 0,0 1 0,0 0 1,0-1-1,0 1 0,1 0 0,0-1 0,1 1 1,-1 0-1,1 0-9,-1-5-3,1 0 0,-1 1-1,1-1 1,-1 0 0,1 0 0,-1 0 0,1 0 0,0 1-1,0-1 1,-1 0 0,1 0 0,0 0 0,0 0 0,0-1 0,0 1-1,0 0 1,0 0 0,1-1 0,-1 1 0,0 0 0,0-1-1,0 1 1,1-1 0,-1 0 0,0 1 0,0-1 0,1 0 3,8 1-704</inkml:trace>
   <inkml:trace contextRef="#ctx0" brushRef="#br0" timeOffset="64467.17">2306 1480 7040,'-2'0'261,"1"-1"0,0 1-1,-1 0 1,1-1 0,-1 1 0,1 0 0,-1 0 0,1 0 0,-1 0-1,1 0 1,-1 0 0,1 0 0,0 0 0,-1 1 0,1-1 0,-1 0-1,1 1 1,-1 0-261,-26 11 1017,27-12-977,0 1 1,-1-1 0,1 1 0,0 0-1,0 0 1,-1 0 0,1-1-1,0 1 1,0 0 0,0 1 0,0-1-1,0 0 1,0 0 0,1 0-1,-1 0 1,0 1 0,1-1 0,-1 0-1,1 1 1,-1-1 0,1 1 0,-1-1-1,1 1 1,0-1 0,0 0-1,0 1 1,0-1 0,0 1 0,0-1-1,0 1 1,0-1 0,0 1-1,1-1 1,-1 0 0,1 2-41,2 2-17,1 1 1,-1 0-1,1-1 0,0 0 1,0 1-1,1-2 0,1 3 17,12 12 121,-18-19-108,0 1 1,1-1-1,-1 0 1,0 1-1,1-1 1,-1 1-1,0-1 1,0 1-1,1-1 1,-1 1-1,0-1 0,0 1 1,0-1-1,1 1 1,-1-1-1,0 1 1,0-1-1,0 1 1,0-1-1,0 1 1,0-1-1,0 1 1,-1-1-1,1 1 0,0-1 1,0 1-1,0 0-13,-1-1 21,1 1-1,-1 0 0,0-1 0,1 1 1,-1-1-1,0 1 0,0-1 0,1 1 1,-1-1-1,0 0 0,0 1 0,0-1 1,1 0-1,-1 0 0,-1 1-20,-6 0 87,0 0-1,1-1 1,-1 0-1,0 0-86,-1 0 16,2 1-496,0 0-170</inkml:trace>
-  <inkml:trace contextRef="#ctx0" brushRef="#br0" timeOffset="65115.749">2378 1564 5120,'0'0'219,"0"1"0,0-1 1,0 1-1,0-1 0,0 0 0,0 1 1,0-1-1,0 1 0,0-1 1,0 1-1,0-1 0,0 1 0,0-1 1,0 0-1,0 1 0,1-1 0,-1 1 1,0-1-1,0 0 0,1 1 1,-1-1-1,0 1 0,0-1-219,11 6 1727,-9-5-1709,0 0-1,0-1 0,0 1 1,0-1-1,0 0 0,0 0 1,0 0-1,0 0 0,0 0 1,1 0-18,0-1 70,0-1 1,0 1-1,0-1 1,0 0-1,-1 0 0,1 0 1,0 0-1,-1 0 1,0 0-1,1-1 1,-1 1-1,0-1 1,0 1-1,-1-1 1,1 0-1,0 0 1,-1 0-1,0 0 1,0 0-1,0 0 1,0 0-1,0-1 1,0 1-1,-1 0 0,0 0 1,1-1-1,-1 1 1,-1-3-71,1 5-12,0 0 0,0 0 1,-1 0-1,1 0 0,0 0 0,-1 0 1,1 1-1,0-1 0,-1 0 0,1 0 0,-1 0 1,0 1-1,1-1 0,-1 0 0,1 1 1,-1-1-1,0 0 0,0 1 0,1-1 1,-1 1-1,0-1 0,0 1 0,0-1 1,0 1-1,1 0 0,-1 0 0,0-1 0,0 1 1,0 0-1,0 0 0,0 0 0,0 0 1,0 0-1,0 0 0,0 0 0,0 0 1,0 0-1,0 0 0,1 1 0,-1-1 1,0 0 11,-3 1 5,1 0 1,-1 0-1,0 0 1,1 1 0,0-1-1,-1 1 1,1 0-1,0 0 1,-3 2-6,2 0 46,0 0 0,1 0 0,-1 0 0,1 0 1,0 0-1,0 1 0,0 0 0,1-1 0,-1 1 0,1 1-46,1-4 38,1-1-1,-1 1 1,1-1-1,-1 1 1,1 0 0,0-1-1,0 1 1,0 0-1,0-1 1,0 1-1,0 0 1,0-1 0,0 1-1,1 0 1,-1-1-1,1 1 1,-1-1 0,1 1-1,-1-1 1,1 1-1,0-1 1,0 1-1,0-1 1,0 1 0,0-1-1,0 0 1,0 0-1,0 0 1,1 1-1,-1-1 1,0 0 0,1 0-1,1 0-37,2 2-3,0-1 0,0 0 0,0-1 1,0 1-1,1-1 0,-1 0 0,1 0 0,-1 0 0,0-1 0,6 0 3,9-1-279,0-1 1,6-2 278,-6 1-704</inkml:trace>
+  <inkml:trace contextRef="#ctx0" brushRef="#br0" timeOffset="65115.748">2378 1564 5120,'0'0'219,"0"1"0,0-1 1,0 1-1,0-1 0,0 0 0,0 1 1,0-1-1,0 1 0,0-1 1,0 1-1,0-1 0,0 1 0,0-1 1,0 0-1,0 1 0,1-1 0,-1 1 1,0-1-1,0 0 0,1 1 1,-1-1-1,0 1 0,0-1-219,11 6 1727,-9-5-1709,0 0-1,0-1 0,0 1 1,0-1-1,0 0 0,0 0 1,0 0-1,0 0 0,0 0 1,1 0-18,0-1 70,0-1 1,0 1-1,0-1 1,0 0-1,-1 0 0,1 0 1,0 0-1,-1 0 1,0 0-1,1-1 1,-1 1-1,0-1 1,0 1-1,-1-1 1,1 0-1,0 0 1,-1 0-1,0 0 1,0 0-1,0 0 1,0 0-1,0-1 1,0 1-1,-1 0 0,0 0 1,1-1-1,-1 1 1,-1-3-71,1 5-12,0 0 0,0 0 1,-1 0-1,1 0 0,0 0 0,-1 0 1,1 1-1,0-1 0,-1 0 0,1 0 0,-1 0 1,0 1-1,1-1 0,-1 0 0,1 1 1,-1-1-1,0 0 0,0 1 0,1-1 1,-1 1-1,0-1 0,0 1 0,0-1 1,0 1-1,1 0 0,-1 0 0,0-1 0,0 1 1,0 0-1,0 0 0,0 0 0,0 0 1,0 0-1,0 0 0,0 0 0,0 0 1,0 0-1,0 0 0,1 1 0,-1-1 1,0 0 11,-3 1 5,1 0 1,-1 0-1,0 0 1,1 1 0,0-1-1,-1 1 1,1 0-1,0 0 1,-3 2-6,2 0 46,0 0 0,1 0 0,-1 0 0,1 0 1,0 0-1,0 1 0,0 0 0,1-1 0,-1 1 0,1 1-46,1-4 38,1-1-1,-1 1 1,1-1-1,-1 1 1,1 0 0,0-1-1,0 1 1,0 0-1,0-1 1,0 1-1,0 0 1,0-1 0,0 1-1,1 0 1,-1-1-1,1 1 1,-1-1 0,1 1-1,-1-1 1,1 1-1,0-1 1,0 1-1,0-1 1,0 1 0,0-1-1,0 0 1,0 0-1,0 0 1,1 1-1,-1-1 1,0 0 0,1 0-1,1 0-37,2 2-3,0-1 0,0 0 0,0-1 1,0 1-1,1-1 0,-1 0 0,1 0 0,-1 0 0,0-1 0,6 0 3,9-1-279,0-1 1,6-2 278,-6 1-704</inkml:trace>
 </inkml:ink>
 </file>
 
@@ -1109,10 +1109,10 @@
     </inkml:brush>
   </inkml:definitions>
   <inkml:trace contextRef="#ctx0" brushRef="#br0">0 126 6400,'54'-51'5111,"-34"31"-5269,0 1-1,16-11 159,-36 30-3,1-1-1,0 1 1,0-1-1,-1 1 0,1-1 1,0 1-1,0-1 1,0 1-1,-1 0 1,1-1-1,0 1 0,0 0 1,0 0-1,0-1 1,0 1-1,0 0 0,0 0 4,-1 0 15,1 1-1,-1-1 0,0 0 0,1 0 0,-1 0 1,0 1-1,1-1 0,-1 0 0,0 0 0,0 1 0,1-1 1,-1 0-1,0 1 0,0-1 0,0 0 0,1 1 0,-1-1 1,0 0-1,0 1 0,0-1 0,0 0 0,0 1 1,0-1-1,0 1 0,0-1 0,0 0 0,0 1-14,0 4 97,0 0 0,-1 0 0,0 0 0,0 0 0,0 1-97,1-6-1,-38 125 915,11-40-383,21-68-413,4-13-172,1 0-1,-1 1 1,1-1 0,0 1-1,0-1 1,0 2 54,3-5-405</inkml:trace>
-  <inkml:trace contextRef="#ctx0" brushRef="#br0" timeOffset="1031.85">337 207 6528,'-1'0'90,"1"0"1,0 0-1,0 0 1,0 0-1,0 0 1,-1 1-1,1-1 0,0 0 1,0 0-1,0 0 1,0 0-1,0 0 1,0 0-1,0 1 1,-1-1-1,1 0 1,0 0-1,0 0 1,0 0-1,0 1 0,0-1 1,0 0-1,0 0 1,0 0-1,0 1 1,0-1-1,0 0 1,0 0-1,0 0 1,0 0-1,0 1 0,0-1 1,0 0-1,0 0 1,0 0-1,0 1 1,0-1-91,7 2 1369,12-2-997,-13-2-344,0 0 1,-1 0 0,1 0-1,-1-1 1,1 0 0,-1 0 0,0-1-1,0 1 1,3-4-29,-6 5 2,0 1-1,0-1 1,0 0 0,0-1-1,0 1 1,-1 0 0,1 0-1,0-1 1,-1 1 0,0-1-1,0 1 1,0-1 0,0 0-1,0 0 1,0 1 0,-1-1-1,1 0 1,-1 0 0,0 0-1,0 1 1,0-3-2,0 4 2,0 1 0,0-1 0,-1 0-1,1 1 1,0-1 0,0 1 0,-1-1 0,1 0 0,0 1-1,-1-1 1,1 1 0,-1-1 0,1 1 0,-1-1 0,1 1-1,-1 0 1,1-1 0,-1 1 0,1 0 0,-1-1 0,0 1 0,1 0-1,-1-1 1,0 1 0,1 0 0,-1 0 0,1 0 0,-1 0-1,0 0 1,1 0 0,-1 0 0,0 0 0,1 0 0,-1 0-1,0 0 1,1 0 0,-1 0 0,0 1 0,0-1-2,-27 9 210,27-8-199,-6 2 49,1 1 0,-1-1 0,1 2 0,0-1 0,1 1 0,-1-1 0,1 2 0,0-1 0,0 0-1,0 1 1,1 0 0,-1 2-60,2-4 27,0 1 0,1-1 0,0 0 0,0 1 0,0 0 0,1-1 0,-1 1 0,1 0 0,0 0 0,0 0 0,1-1 1,0 1-1,-1 0 0,2 0 0,-1 0 0,0 0 0,1 0 0,1 4-27,-1-6 11,0-1 0,0 0 0,0 0 0,0 0 1,0 0-1,1 0 0,-1 0 0,0-1 0,1 1 1,0 0-1,-1-1 0,1 1 0,0-1 1,0 1-1,0-1 0,-1 0 0,2 0 0,-1 0 1,0 0-1,0 0 0,0 0 0,2 0-11,0-1-14,-1 1 1,0-1-1,0 1 0,0-1 0,1 0 1,-1-1-1,0 1 0,0 0 0,1-1 1,-1 0-1,0 0 0,0 0 0,0 0 1,0 0-1,0-1 0,0 1 14,13-10-218</inkml:trace>
+  <inkml:trace contextRef="#ctx0" brushRef="#br0" timeOffset="1031.849">337 207 6528,'-1'0'90,"1"0"1,0 0-1,0 0 1,0 0-1,0 0 1,-1 1-1,1-1 0,0 0 1,0 0-1,0 0 1,0 0-1,0 0 1,0 0-1,0 1 1,-1-1-1,1 0 1,0 0-1,0 0 1,0 0-1,0 1 0,0-1 1,0 0-1,0 0 1,0 0-1,0 1 1,0-1-1,0 0 1,0 0-1,0 0 1,0 0-1,0 1 0,0-1 1,0 0-1,0 0 1,0 0-1,0 1 1,0-1-91,7 2 1369,12-2-997,-13-2-344,0 0 1,-1 0 0,1 0-1,-1-1 1,1 0 0,-1 0 0,0-1-1,0 1 1,3-4-29,-6 5 2,0 1-1,0-1 1,0 0 0,0-1-1,0 1 1,-1 0 0,1 0-1,0-1 1,-1 1 0,0-1-1,0 1 1,0-1 0,0 0-1,0 0 1,0 1 0,-1-1-1,1 0 1,-1 0 0,0 0-1,0 1 1,0-3-2,0 4 2,0 1 0,0-1 0,-1 0-1,1 1 1,0-1 0,0 1 0,-1-1 0,1 0 0,0 1-1,-1-1 1,1 1 0,-1-1 0,1 1 0,-1-1 0,1 1-1,-1 0 1,1-1 0,-1 1 0,1 0 0,-1-1 0,0 1 0,1 0-1,-1-1 1,0 1 0,1 0 0,-1 0 0,1 0 0,-1 0-1,0 0 1,1 0 0,-1 0 0,0 0 0,1 0 0,-1 0-1,0 0 1,1 0 0,-1 0 0,0 1 0,0-1-2,-27 9 210,27-8-199,-6 2 49,1 1 0,-1-1 0,1 2 0,0-1 0,1 1 0,-1-1 0,1 2 0,0-1 0,0 0-1,0 1 1,1 0 0,-1 2-60,2-4 27,0 1 0,1-1 0,0 0 0,0 1 0,0 0 0,1-1 0,-1 1 0,1 0 0,0 0 0,0 0 0,1-1 1,0 1-1,-1 0 0,2 0 0,-1 0 0,0 0 0,1 0 0,1 4-27,-1-6 11,0-1 0,0 0 0,0 0 0,0 0 1,0 0-1,1 0 0,-1 0 0,0-1 0,1 1 1,0 0-1,-1-1 0,1 1 0,0-1 1,0 1-1,0-1 0,-1 0 0,2 0 0,-1 0 1,0 0-1,0 0 0,0 0 0,2 0-11,0-1-14,-1 1 1,0-1-1,0 1 0,0-1 0,1 0 1,-1-1-1,0 1 0,0 0 0,1-1 1,-1 0-1,0 0 0,0 0 0,0 0 1,0 0-1,0-1 0,0 1 14,13-10-218</inkml:trace>
   <inkml:trace contextRef="#ctx0" brushRef="#br0" timeOffset="1536.9">627 142 640,'-2'0'818,"0"0"1,1 1-1,-1-1 1,1 1-1,-1-1 0,1 1 1,0 0-1,-1-1 0,1 1 1,-1 1-819,-9 3 253,1-1 448,0 0 1,0 0-1,0 1 0,1 1 1,-9 5-702,16-9 39,-1 0-1,0 1 1,1-1 0,0 1 0,-1-1 0,1 1-1,0 0 1,0 0 0,1 0 0,-1 0-1,0 0 1,1 0 0,0 0 0,0 1 0,0-1-1,0 0 1,1 1 0,-1-1 0,1 1 0,0 2-39,-1-5 1,1 0 1,0 0-1,0 0 0,0 0 1,0-1-1,0 1 1,0 0-1,0 0 1,0 0-1,0 0 1,1-1-1,-1 1 1,0 0-1,0 0 0,1 0 1,-1-1-1,1 1 1,-1 0-1,1-1 1,-1 1-1,1 0 1,-1-1-1,1 1 1,-1 0-1,1-1 1,0 1-1,-1-1 0,1 1 1,0-1-1,0 0 1,-1 1-1,1-1 1,0 0-1,0 1 1,-1-1-1,1 0 1,0 0-1,0 0 1,0 1-1,0-1 0,-1 0 1,1 0-2,2-1 6,0 1 1,-1-1-1,1 0 0,-1 0 1,1 0-1,-1 0 0,0 0 1,1 0-1,-1 0 1,0-1-1,0 1 0,0-1 1,1 0-7,5-7-166,1 0 1,-2 0 0,4-5 165,17-20-880,-27 57 1210,-1-16-176,0 0-1,1 1 0,0-1 0,1 4-153,-2-9-7,0-1-1,0 0 0,1 0 0,-1 0 0,0 0 0,1 1 0,-1-1 0,1 0 0,-1 0 0,1 0 0,0 0 1,-1 0-1,1 0 0,0 0 0,0 0 0,-1 0 0,1-1 0,0 1 0,0 0 0,0 0 0,0-1 0,0 1 1,0-1-1,0 1 0,0-1 0,1 1 0,-1-1 0,0 1 0,0-1 0,0 0 0,2 0 8,5-1-250</inkml:trace>
   <inkml:trace contextRef="#ctx0" brushRef="#br0" timeOffset="1942.716">755 130 3072,'-3'1'476,"0"0"0,0 1 0,0-1 0,0 1-1,0 0 1,0 0 0,0 0 0,1 0 0,-1 0 0,1 0 0,0 1 0,-1-1 0,1 1 0,0 0 0,0 0-1,1-1 1,-2 4-476,3-4 145,1 1 0,-1-1 1,1 0-1,0 0 0,0 0 0,-1 0 0,1 0 0,1 0 0,-1 0 0,0 0 0,1 0-145,1 3 95,-2-2-48,4 4 22,-1 1-1,0 0 0,-1 0 1,0 0-1,2 6-68,-5-11 32,1 0 1,-1 0-1,0 0 0,0 0 1,0 1-1,0-1 0,0 0 1,-1 0-1,0 0 0,1 0 1,-1 0-1,0 0 0,-1 0 1,1 0-1,0 0 0,-1 0 1,0 0-33,-15 18 77,6-13-217,10-8 119,1 0 0,0 0 0,-1 0 1,1 0-1,0 0 0,-1 0 1,1 0-1,0 0 0,-1 0 1,1 0-1,0 0 0,-1 0 1,1 0-1,0 0 0,-1 0 1,1-1-1,0 1 0,-1 0 1,1 0-1,0 0 0,-1 0 1,1-1-1,0 1 0,0 0 1,-1 0-1,1-1 0,0 1 1,0 0-1,-1 0 0,1-1 1,0 1 20,-2-6-384</inkml:trace>
-  <inkml:trace contextRef="#ctx0" brushRef="#br0" timeOffset="4780.773">860 161 6656,'-5'-3'3320,"6"11"-1733,0-3-1630,4 32-35,-5-28 162,1 0 1,1 0-1,-1 0 0,1 0 0,1 0 0,0-1 1,3 7-85,-5-13 61,0 0-1,1-1 1,-1 1 0,1 0 0,-1-1 0,1 0 0,-1 1 0,1-1 0,0 0 0,0 0 0,0 0-1,0 0 1,0 0 0,0 0 0,0 0 0,0-1 0,0 1 0,0-1 0,0 0 0,0 1 0,1-1-1,-1 0 1,0 0 0,0 0 0,0-1 0,0 1 0,2-1-61,3 0 106,0 0-1,0-1 1,0 0 0,0-1-1,0 1 1,-1-1 0,6-4-106,-5 3-7,1-2 0,-1 1 1,-1-1-1,1 0 1,-1 0-1,0-1 7,-2 3-48,-1 0-1,0 0 1,0-1 0,0 1-1,0-1 1,-1 0 0,0 1 0,0-1-1,0 0 1,0-4 48,-2 9 2,0 0-1,1 0 1,-1-1 0,0 1-1,0 0 1,0 0 0,0-1 0,0 1-1,0 0 1,0 0 0,0-1-1,0 1 1,0 0 0,0-1-1,0 1 1,0 0 0,0 0-1,0-1 1,0 1 0,0 0 0,0 0-1,0-1 1,0 1 0,0 0-1,0 0 1,0-1 0,0 1-1,-1 0 1,1 0 0,0 0 0,0-1-1,0 1 1,0 0 0,-1 0-1,1 0 1,0-1 0,0 1-1,-1 0 1,1 0 0,0 0 0,0 0-1,0 0 1,-1 0 0,1 0-1,0-1 1,-1 1 0,1 0-1,0 0 1,0 0 0,-1 0 0,1 0-1,0 0-1,-1 1-4,-1-1-1,1 1 0,0-1 1,0 1-1,0-1 0,0 1 1,0 0-1,0-1 1,0 1-1,0 0 0,-1 1 5,-14 15-101,0 1 0,2 1 0,-8 12 101,-36 66 283,-8 11-177,-7 7-298,63-99-352</inkml:trace>
+  <inkml:trace contextRef="#ctx0" brushRef="#br0" timeOffset="4780.772">860 161 6656,'-5'-3'3320,"6"11"-1733,0-3-1630,4 32-35,-5-28 162,1 0 1,1 0-1,-1 0 0,1 0 0,1 0 0,0-1 1,3 7-85,-5-13 61,0 0-1,1-1 1,-1 1 0,1 0 0,-1-1 0,1 0 0,-1 1 0,1-1 0,0 0 0,0 0 0,0 0-1,0 0 1,0 0 0,0 0 0,0 0 0,0-1 0,0 1 0,0-1 0,0 0 0,0 1 0,1-1-1,-1 0 1,0 0 0,0 0 0,0-1 0,0 1 0,2-1-61,3 0 106,0 0-1,0-1 1,0 0 0,0-1-1,0 1 1,-1-1 0,6-4-106,-5 3-7,1-2 0,-1 1 1,-1-1-1,1 0 1,-1 0-1,0-1 7,-2 3-48,-1 0-1,0 0 1,0-1 0,0 1-1,0-1 1,-1 0 0,0 1 0,0-1-1,0 0 1,0-4 48,-2 9 2,0 0-1,1 0 1,-1-1 0,0 1-1,0 0 1,0 0 0,0-1 0,0 1-1,0 0 1,0 0 0,0-1-1,0 1 1,0 0 0,0-1-1,0 1 1,0 0 0,0 0-1,0-1 1,0 1 0,0 0 0,0 0-1,0-1 1,0 1 0,0 0-1,0 0 1,0-1 0,0 1-1,-1 0 1,1 0 0,0 0 0,0-1-1,0 1 1,0 0 0,-1 0-1,1 0 1,0-1 0,0 1-1,-1 0 1,1 0 0,0 0 0,0 0-1,0 0 1,-1 0 0,1 0-1,0-1 1,-1 1 0,1 0-1,0 0 1,0 0 0,-1 0 0,1 0-1,0 0-1,-1 1-4,-1-1-1,1 1 0,0-1 1,0 1-1,0-1 0,0 1 1,0 0-1,0-1 1,0 1-1,0 0 0,-1 1 5,-14 15-101,0 1 0,2 1 0,-8 12 101,-36 66 283,-8 11-177,-7 7-298,63-99-352</inkml:trace>
   <inkml:trace contextRef="#ctx0" brushRef="#br0" timeOffset="5340.519">211 285 7808,'-4'-6'2976,"1"2"-2304,1 0 0,2 4-64,0 0-480,0-1-160</inkml:trace>
 </inkml:ink>
 </file>
@@ -1148,17 +1148,17 @@
   <inkml:trace contextRef="#ctx0" brushRef="#br0" timeOffset="1820.318">540 335 7552,'-2'-1'327,"1"0"0,0 0 0,-1 0 0,1 0 0,-1 1 0,1-1 0,-1 1 0,1-1 0,-1 1 1,1-1-1,-1 1 0,1 0 0,-1-1 0,0 1 0,1 0 0,-1 0 0,0 1-327,-1-1 193,1 1 0,-1-1-1,1 1 1,-1 0 0,1 0 0,-1 0-1,1 0 1,-1 0 0,1 1 0,-1 0-193,-1 1-1,0 0 1,0 1-1,1-1 1,-1 1-1,1 0 1,0 0-1,0 0 1,0 0-1,1 1 1,-1-1-1,0 2 1,2-2 51,-1 1 0,1-1 0,0 1 0,0-1 0,1 1 0,-1-1 0,1 1 0,0-1 0,0 1 0,1 0 0,-1-1 0,1 2-51,-1-5-24,1 1-1,-1-1 1,1 1-1,-1-1 1,1 1-1,0-1 0,-1 1 1,1-1-1,0 0 1,0 1-1,0-1 1,0 0-1,0 0 1,0 0-1,1 0 0,-1 0 1,0 0-1,0 0 1,1 0-1,-1 0 1,0-1-1,1 1 1,-1 0-1,1-1 0,-1 1 1,1-1-1,0 0 1,-1 1-1,1-1 1,-1 0-1,1 0 0,-1 0 1,1 0-1,0 0 1,-1-1-1,2 1 25,11-5-1002</inkml:trace>
   <inkml:trace contextRef="#ctx0" brushRef="#br0" timeOffset="2200.622">603 30 7296,'0'5'3828,"8"10"-2453,-3-4-1005,0 13 4,-1 1 1,-1-1-1,-1 1 1,-1 0-1,-2 0-374,2 24 368,4 110 1584,-2-151-1801,2-11-143,7-21-259,-5 10 12,-2 6-277,0 0 0,1 1 0,0 0 0,0 0-1,1 0 1,-1 1 0,2 0 0,-1 0 0,6-3 516,-12 9 63,0-1 1,0 1-1,-1-1 1,1 1-1,0 0 1,0-1-1,0 1 1,0 0-1,0 0 0,0 0 1,0-1-1,0 1 1,0 0-1,0 0 1,0 1-1,0-1 1,0 0-1,0 0 0,0 0 1,0 1-1,0-1 1,0 0-1,0 1 1,0-1-1,0 1 1,0-1-1,-1 1 0,1-1 1,0 1-1,0 0 1,-1-1-1,1 1 1,0 0-1,-1 0 1,1 0-1,-1-1 0,1 1 1,-1 0-1,1 0 1,-1 0-1,1 0 1,-1 0-1,0 0 1,0 0-64,3 7 275,0 0 0,-1 0 0,0 0 0,-1 0 0,0 1-275,0-3 89,1 5-33,-1-3 42,0-1 0,0 1 0,1-1 1,0 0-1,0 0 0,4 7-98,-6-14-30,0 0 1,0 1-1,0-1 0,0 0 0,0 0 0,0 1 0,0-1 1,0 0-1,1 0 0,-1 0 0,0 1 0,0-1 0,0 0 1,0 0-1,0 0 0,1 0 0,-1 1 0,0-1 1,0 0-1,0 0 0,0 0 0,1 0 0,-1 0 0,0 0 1,0 1-1,0-1 0,1 0 0,-1 0 0,0 0 0,0 0 1,0 0-1,1 0 0,-1 0 0,0 0 0,0 0 1,1 0-1,-1 0 0,0 0 0,0 0 0,0 0 0,1 0 1,-1 0-1,0 0 0,0 0 0,0-1 0,1 1 0,-1 0 1,0 0-1,0 0 30,5-5-1061</inkml:trace>
   <inkml:trace contextRef="#ctx0" brushRef="#br0" timeOffset="2610.55">917 335 3712,'1'-7'6665,"0"0"-2723,-2 6-3938,1 1 0,-1 0-1,1 0 1,-1 0 0,1 0-1,-1 0 1,1 0-1,-1 0 1,1 0 0,-1 0-1,1 0 1,-1 0 0,1 0-1,-1 1 1,1-1 0,-1 0-1,1 0 1,-1 0 0,1 1-1,0-1 1,-1 0 0,1 1-4,-5 1 32,1 0 1,0 1-1,0 0 1,0 0 0,0 0-1,0 0 1,1 1-1,-1-1 1,1 1 0,0 0-1,0 0 1,1 0 0,-1 0-1,1 1 1,0-1-1,0 1 1,0-1 0,0 1-1,1 0 1,0 0-1,0-1 1,0 1 0,1 0-1,0 0 1,0 0 0,0 3-33,0-7 27,0 0 0,0 0 0,0 0 0,0-1 0,0 1 1,0 0-1,1 0 0,-1 0 0,0 0 0,0-1 1,1 1-1,-1 0 0,0 0 0,1-1 0,-1 1 0,1 0 1,-1 0-1,1-1 0,-1 1 0,1-1 0,0 1 1,0 0-28,0-1 2,-1 0 0,1 0 0,0 1 0,0-1 0,-1 0 0,1 0 0,0 0 0,0 0 0,-1-1 0,1 1 0,0 0 0,-1 0 0,1 0 0,0-1 0,-1 1 0,1 0 0,0 0 0,-1-1 0,1 1 0,0-1-2,3-2-97,0 0 0,0-1 1,0 1-1,0-1 1,-1 0-1,2-2 97,1-1 5,0-1-1,-1 0 1,0 1-1,-1-2 1,0 1 0,0 0-1,2-8-4,-5 9-198,-3 11 179,-2 13-89,3-12 168,1-1 1,0 1-1,1 0 1,-1 0-1,1 0 1,0 0-1,0 0 1,1-1-1,0 2-60,-2-5-22,1 1 0,-1-1 0,1 1 0,0-1-1,-1 0 1,1 0 0,0 1 0,0-1-1,0 0 1,0 0 0,0 0 0,0 0 0,0 0-1,0 0 1,1 0 0,-1 0 0,0-1 0,0 1-1,1 0 1,-1-1 0,1 1 0,-1-1 0,0 1-1,1-1 1,-1 0 0,1 0 0,-1 1 0,1-1-1,-1 0 1,1 0 0,0-1 22,8-1-917</inkml:trace>
-  <inkml:trace contextRef="#ctx0" brushRef="#br0" timeOffset="3036.628">1055 338 7552,'1'2'372,"-1"0"0,1 0 0,0 0 1,0 0-1,0 0 0,0-1 0,0 1 1,1 0-1,-1 0 0,0-1 0,1 1 0,-1-1 1,1 1-1,0-1 0,-1 0 0,1 0 1,2 1-373,-4-1 34,1-1 1,0 0-1,-1 0 1,1 1 0,0-1-1,0 0 1,-1 0-1,1 0 1,0 0 0,-1 0-1,1 0 1,0 0-1,0 0 1,-1 0 0,1-1-1,0 1 1,0 0 0,-1 0-1,1-1 1,0 1-1,-1 0-34,1-1 22,0 0 0,0 0 0,0 0-1,0 0 1,0 0 0,0 0 0,0 0 0,0 0-1,-1-1 1,1 1 0,0 0 0,-1 0-1,1-1 1,-1 1 0,1-1-22,-1 1-5,0 0-1,1 0 1,-1 0 0,0 0-1,0 0 1,1 0 0,-1 0-1,0 0 1,0 0 0,0 0-1,0 0 1,0 0 0,0 0-1,-1 0 1,1 0 0,0 0 0,0 0-1,-1 0 1,1 0 0,-1 1-1,1-1 1,-1 0 0,1 0-1,-1 0 1,1 0 0,-1 1-1,0-1 1,1 0 0,-1 0-1,0 1 1,0-1 0,0 1 0,1-1-1,-1 1 1,0-1 0,0 1-1,0-1 1,0 1 0,-1-1 5,1 1-22,-1 0 0,1 0 0,-1-1 0,1 1 0,-1 0 0,1 0 0,-1 0 0,1 1 0,-1-1 0,1 0 0,-1 1 0,1-1 0,-1 1 0,1-1 0,0 1 0,-1-1 0,1 1 0,0 0 0,-1 0 0,1 0 0,0 0 0,0 0 0,0 0 0,0 0 0,0 0 0,-1 1 22,0 2 59,0 0-1,0 0 1,1 0-1,-1 0 0,1 0 1,0 0-1,0 0 1,0 0-1,1 1 0,-1-1 1,1 0-1,0 0 1,0 1-1,1-1 1,0 3-59,0 1 123,0 0 0,1-1 0,1 1 0,-1-1 0,1 1 0,0-1 0,1 0 1,0 1-124,-3-6-63,0-1 0,0 0 1,0 1-1,0-1 0,0 0 1,0 0-1,0 1 1,1-1-1,-1 0 0,0 0 1,1 0-1,-1-1 0,1 1 1,0 0 62,-1 0-43,0-1 1,0 0-1,0 0 1,0 0-1,0 0 0,0 0 1,1 0-1,-1 0 1,0 0-1,0 0 0,0 0 1,0-1-1,0 1 1,0 0-1,0-1 1,0 1-1,0-1 0,0 1 1,-1-1-1,1 1 1,0-1-1,0 0 0,0 1 1,0-1 42,11-12-389</inkml:trace>
+  <inkml:trace contextRef="#ctx0" brushRef="#br0" timeOffset="3036.627">1055 338 7552,'1'2'372,"-1"0"0,1 0 0,0 0 1,0 0-1,0 0 0,0-1 0,0 1 1,1 0-1,-1 0 0,0-1 0,1 1 0,-1-1 1,1 1-1,0-1 0,-1 0 0,1 0 1,2 1-373,-4-1 34,1-1 1,0 0-1,-1 0 1,1 1 0,0-1-1,0 0 1,-1 0-1,1 0 1,0 0 0,-1 0-1,1 0 1,0 0-1,0 0 1,-1 0 0,1-1-1,0 1 1,0 0 0,-1 0-1,1-1 1,0 1-1,-1 0-34,1-1 22,0 0 0,0 0 0,0 0-1,0 0 1,0 0 0,0 0 0,0 0 0,0 0-1,-1-1 1,1 1 0,0 0 0,-1 0-1,1-1 1,-1 1 0,1-1-22,-1 1-5,0 0-1,1 0 1,-1 0 0,0 0-1,0 0 1,1 0 0,-1 0-1,0 0 1,0 0 0,0 0-1,0 0 1,0 0 0,0 0-1,-1 0 1,1 0 0,0 0 0,0 0-1,-1 0 1,1 0 0,-1 1-1,1-1 1,-1 0 0,1 0-1,-1 0 1,1 0 0,-1 1-1,0-1 1,1 0 0,-1 0-1,0 1 1,0-1 0,0 1 0,1-1-1,-1 1 1,0-1 0,0 1-1,0-1 1,0 1 0,-1-1 5,1 1-22,-1 0 0,1 0 0,-1-1 0,1 1 0,-1 0 0,1 0 0,-1 0 0,1 1 0,-1-1 0,1 0 0,-1 1 0,1-1 0,-1 1 0,1-1 0,0 1 0,-1-1 0,1 1 0,0 0 0,-1 0 0,1 0 0,0 0 0,0 0 0,0 0 0,0 0 0,0 0 0,-1 1 22,0 2 59,0 0-1,0 0 1,1 0-1,-1 0 0,1 0 1,0 0-1,0 0 1,0 0-1,1 1 0,-1-1 1,1 0-1,0 0 1,0 1-1,1-1 1,0 3-59,0 1 123,0 0 0,1-1 0,1 1 0,-1-1 0,1 1 0,0-1 0,1 0 1,0 1-124,-3-6-63,0-1 0,0 0 1,0 1-1,0-1 0,0 0 1,0 0-1,0 1 1,1-1-1,-1 0 0,0 0 1,1 0-1,-1-1 0,1 1 1,0 0 62,-1 0-43,0-1 1,0 0-1,0 0 1,0 0-1,0 0 0,0 0 1,1 0-1,-1 0 1,0 0-1,0 0 0,0 0 1,0-1-1,0 1 1,0 0-1,0-1 1,0 1-1,0-1 0,0 1 1,-1-1-1,1 1 1,0-1-1,0 0 0,0 1 1,0-1 42,11-12-389</inkml:trace>
   <inkml:trace contextRef="#ctx0" brushRef="#br0" timeOffset="3418.967">1257 11 6912,'-1'1'4058,"2"4"-2199,2 9-1089,-3-11-487,2 8-261,0 0-1,-1 0 1,-1 0-1,0 0 0,0 1 1,-1 0-22,-4 24 286,-3 8-286,-1 12 657,3-16-330,3 1 0,1-1 1,2 11-328,0-48-140,0 0 1,0 0-1,1 0 1,-1-1-1,1 1 1,0 0 0,0 2 139,4 2-784</inkml:trace>
   <inkml:trace contextRef="#ctx0" brushRef="#br0" timeOffset="3794.86">1366 324 8064,'-5'-6'1150,"-9"-6"2681,7 22-1520,5-8-2174,-1 1-230,-4 4 136,1 0 1,1 0-1,0 0 1,0 1-1,0 0 1,-1 4-44,5-10 27,0 1 0,0 0 1,1-1-1,-1 1 0,1 0 0,-1 0 1,1-1-1,0 1 0,0 0 0,0 0 1,1-1-1,-1 1 0,1 0 0,-1 0 1,1-1-1,0 1 0,0 0 0,0-1 1,0 1-1,1-1 0,-1 1 0,1-1 0,0 1-26,1 2-172,0-2 194,-1 0 0,0 0 0,0 0-1,0 1 1,0-1 0,-1 1-1,1-1 1,-1 1-23,-1-3 29,0 0 0,0 0-1,0 0 1,0 0 0,0 0 0,0 0 0,0 0-1,0 0 1,-1 0 0,1 0 0,0 0 0,-1 0-1,1 0 1,0 0 0,-1 0 0,1-1 0,-1 1 0,0 0-1,1 0 1,-1 0 0,0-1 0,1 1 0,-1 0-1,0-1 1,0 1 0,0 0 0,0-1 0,1 1-1,-1-1 1,0 1 0,0-1 0,-1 0-29,-1 2-136,-7 3-610,0 0 0,-1-1 1,-2 1 745,11-5-896</inkml:trace>
   <inkml:trace contextRef="#ctx0" brushRef="#br0" timeOffset="4155.511">1485 384 8448,'11'-10'3726,"-11"9"-3689,1 1 0,-1 0 0,0 0 0,0 0 0,1-1 0,-1 1 0,0 0 0,0 0 0,1 0 0,-1 0 0,0-1 0,1 1 0,-1 0 0,0 0 0,1 0 0,-1 0 0,0 0 0,1 0 0,-1 0 0,0 0 0,1 0 0,-1 0 0,0 0 0,1 0 0,-1 0 0,0 0 0,1 0 0,-1 1 0,0-1 0,0 0 0,1 0 0,-1 0 0,0 0 0,1 1 0,-1-1 0,0 0 0,0 0 0,0 1 0,1-1 0,-1 0 0,0 0 0,0 1 0,0-1 0,1 0-37,-1 1-12,0 0 0,0 0 1,0 0-1,0 0 0,0 0 0,-1 0 0,1-1 0,0 1 0,0 0 0,-1 0 0,1 0 1,0 0-1,-1-1 0,1 1 0,-1 0 0,1 0 0,-1-1 0,1 1 12,-14 16 22,11-12 5,-7 7 64,3-4 128,0 0 0,1 1 0,-2 2-219,7-9 37,0 0 1,0-1 0,0 1 0,0 0 0,0-1-1,1 1 1,-1 0 0,1 0 0,-1 0 0,1-1 0,0 1-1,0 0 1,0 0 0,0 0 0,0 0 0,0 0-1,0 0 1,0-1 0,1 1 0,0 1-38,-1-2-4,1 0 1,0 1 0,0-1-1,0 0 1,0-1-1,0 1 1,0 0 0,0 0-1,0 0 1,0-1-1,0 1 1,1 0 0,-1-1-1,0 1 1,0-1-1,1 1 1,-1-1 0,0 0-1,1 0 1,-1 1 0,0-1-1,1 0 1,-1 0-1,0 0 1,1 0 0,-1-1-1,0 1 1,1 0-1,-1-1 1,0 1 0,0 0-1,1-1 4,2 0 16,0 0-1,0-1 1,-1 1 0,1-1 0,0 0-1,-1 0 1,0 0 0,1-1-1,-1 1 1,1-2-16,0 0 99,-1 0 0,0-1 0,0 1 1,-1-1-1,1 0 0,-1 0 0,0 0 0,0 0 0,-1-1-99,0 3 0,0 0 0,0 0-1,0 0 1,-1 0-1,0 0 1,1 0-1,-1 0 1,0-1-1,-1 1 1,1 0-1,-1 0 1,1 0 0,-1 0-1,0 0 1,0 0-1,0-1 1,0 3-51,1 1-1,-1-1 1,0 0 0,1 0-1,-1 1 1,0-1 0,0 1-1,0-1 1,1 1 0,-1-1-1,0 1 1,0-1 0,0 1-1,0-1 1,0 1 0,0 0-1,0 0 1,0 0 0,0-1-1,0 1 1,0 0-1,0 0 1,0 0 0,0 0-1,0 1 1,0-1 0,0 0-1,0 0 1,0 1 0,0-1-1,1 0 1,-1 1 0,0-1-1,0 1 1,-1 0 51,-8 4-613</inkml:trace>
   <inkml:trace contextRef="#ctx0" brushRef="#br0" timeOffset="4574.449">1703 382 7040,'1'1'317,"0"1"-1,-1-1 1,1 0 0,0 1 0,-1-1-1,1 1 1,-1-1 0,1 1 0,-1 0-1,0-1 1,0 1 0,0-1-1,0 1 1,0-1 0,0 1 0,0 0-1,0-1-316,-6 30 1039,6-29-956,-2 6 268,-1 0 1,0 0-1,0 0 0,0 0 0,-1-1 1,0 1-1,-3 2-351,8-8 613,5-4-472,7-5-106,-1-2-733,-1-1 0,10-10 698,-15 13-186,0 0 1,1 1-1,0 0 0,0 0 1,1 0-1,0 1 1,0 0-1,0 1 1,0 0 185,-6 3 41,-1 1 1,1 0 0,0-1 0,-1 1 0,1 0-1,-1 0 1,1 0 0,0 0 0,-1 0-1,1 0 1,-1 1 0,1-1 0,-1 0 0,1 1-1,0-1 1,-1 1 0,1 0 0,-1-1 0,0 1-1,1 0 1,-1 0 0,0 0 0,1 0 0,-1 0-1,0 0 1,0 0 0,0 1 0,0-1-1,0 0-41,5 7 367,-1 0 0,0 0 0,0 1 0,2 6-367,5 8 3,2-2-397,-8-12-38</inkml:trace>
   <inkml:trace contextRef="#ctx0" brushRef="#br0" timeOffset="5539.29">425 675 8064,'-2'-1'3072,"2"6"-2400,0 7 256,2-5-96,-1 4-320,1 2 32,-2 2-128,0 4 0,-2 8-224,1 6-64,-1-2 0,2-2-224,2-2 0,-1-5 32,2-4 96,0-5-576,2-3-192</inkml:trace>
-  <inkml:trace contextRef="#ctx0" brushRef="#br0" timeOffset="5970.403">265 709 8960,'-9'-4'960,"6"2"-466,-1 0 0,0 0 0,1 0 0,-1-1 0,1 0 0,-1 1 0,1-1 0,-1-2-494,4 5 30,0 0 0,0 0 0,0-1 0,0 1 1,0 0-1,0 0 0,0-1 0,0 1 0,0 0 1,1 0-1,-1 0 0,0 0 0,0-1 1,0 1-1,0 0 0,1 0 0,-1 0 0,0 0 1,0-1-1,0 1 0,0 0 0,1 0 0,-1 0 1,0 0-1,0 0 0,1 0 0,-1 0 1,0 0-1,0 0 0,0 0 0,1 0 0,-1 0 1,0 0-1,0 0 0,1 0 0,-1 0 0,0 0-30,11-2 38,-10 2-9,62-10 688,-27 4-110,1 1 1,23 1-608,-48 4-148,1 0 0,-1 1 0,0 0 0,0 2 0,0-1 0,0 1 1,-1 1-1,1 0 0,-1 0 0,1 2 148,7 3-1141</inkml:trace>
+  <inkml:trace contextRef="#ctx0" brushRef="#br0" timeOffset="5970.402">265 709 8960,'-9'-4'960,"6"2"-466,-1 0 0,0 0 0,1 0 0,-1-1 0,1 0 0,-1 1 0,1-1 0,-1-2-494,4 5 30,0 0 0,0 0 0,0-1 0,0 1 1,0 0-1,0 0 0,0-1 0,0 1 0,0 0 1,1 0-1,-1 0 0,0 0 0,0-1 1,0 1-1,0 0 0,1 0 0,-1 0 0,0 0 1,0-1-1,0 1 0,0 0 0,1 0 0,-1 0 1,0 0-1,0 0 0,1 0 0,-1 0 1,0 0-1,0 0 0,0 0 0,1 0 0,-1 0 1,0 0-1,0 0 0,1 0 0,-1 0 0,0 0-30,11-2 38,-10 2-9,62-10 688,-27 4-110,1 1 1,23 1-608,-48 4-148,1 0 0,-1 1 0,0 0 0,0 2 0,0-1 0,0 1 1,-1 1-1,1 0 0,-1 0 0,1 2 148,7 3-1141</inkml:trace>
   <inkml:trace contextRef="#ctx0" brushRef="#br0" timeOffset="6307.554">262 990 7040,'-19'2'2368,"66"-1"1840,-2 1-3371,0-2 38,23 0-449,9-3-426,-55 0-666,0-1-118</inkml:trace>
   <inkml:trace contextRef="#ctx0" brushRef="#br0" timeOffset="6678.383">599 837 7296,'0'0'68,"0"0"1,0 0-1,0 0 1,0 0-1,0 1 1,0-1-1,0 0 1,0 0-1,0 0 1,1 0-1,-1 0 1,0 1-1,0-1 1,0 0-1,0 0 1,0 0-1,1 0 1,-1 0-1,0 0 1,0 0-1,0 1 1,0-1-1,1 0 1,-1 0-1,0 0 1,0 0-1,0 0 1,1 0 0,-1 0-1,0 0 1,0 0-1,0 0 1,1 0-1,-1 0 1,0 0-1,0 0 1,0 0-1,0 0 1,1-1-1,-1 1 1,0 0-1,0 0 1,0 0-1,0 0 1,1 0-1,-1 0 1,0 0-1,0-1 1,0 1-1,0 0 1,0 0-1,1 0 1,-1 0-1,0 0 1,0-1-1,0 1 1,0 0-1,0 0 1,0 0-1,0 0 1,0-1-1,0 1 1,0 0-1,0 0 1,0 0-69,7 16 597,-6-6-26,0-1 0,0 1 0,-1 6-571,-1-10 266,1 1 0,0 0 0,1-1 0,-1 1-1,1 0 1,1-1 0,-1 1 0,3 5-266,-4-12 3,1 1 1,-1-1-1,0 0 0,1 1 0,-1-1 1,0 0-1,1 1 0,-1-1 0,0 0 0,1 0 1,-1 1-1,0-1 0,1 0 0,-1 0 1,1 0-1,-1 1 0,1-1 0,-1 0 0,0 0 1,1 0-1,-1 0 0,1 0 0,-1 0 1,1 0-1,-1 0 0,1 0 0,-1 0 0,1 0 1,-1 0-1,0-1 0,1 1 0,-1 0 1,1 0-1,-1 0 0,0-1 0,1 1 0,-1 0 1,1 0-1,-1-1 0,0 1 0,1 0 1,-1-1-1,0 1 0,0 0 0,1-1 1,-1 1-5,16-17-605,7-19-227,-19 28 686,0 1-1,0 0 1,1 1-1,-1-1 1,2 1-1,-1 0 1,1 0-1,0 0 1,3-2 147,-9 8 1,0 0 1,0 0-1,1 0 0,-1 0 1,0 0-1,0 0 1,0 0-1,1 0 1,-1-1-1,0 1 1,0 0-1,0 0 1,1 0-1,-1 0 1,0 0-1,0 0 1,0 0-1,1 0 1,-1 0-1,0 0 0,0 0 1,0 1-1,0-1 1,1 0-1,-1 0 1,0 0-1,0 0 1,0 0-1,1 0 1,-1 0-1,0 0 1,0 0-1,0 1 1,0-1-2,4 8 134,-1 15 291,-3-19-282,1 9 369,-1-6-336,0 0 1,1 1-1,0-1 1,0 0-1,1 0 1,0 0-1,0 0 1,1 0-1,-1 0 1,2 0-177,-4-7-8,0 0 1,0 0 0,0 1-1,0-1 1,1 0-1,-1 1 1,0-1-1,0 0 1,1 0-1,-1 0 1,0 1 0,0-1-1,1 0 1,-1 0-1,0 0 1,1 0-1,-1 0 1,0 1-1,0-1 1,1 0 0,-1 0-1,0 0 1,1 0-1,-1 0 1,0 0-1,1 0 1,-1 0-1,0 0 1,1 0 0,-1 0-1,0 0 1,1 0-1,-1-1 1,0 1-1,1 0 1,-1 0 0,0 0-1,0 0 1,1 0-1,-1-1 1,0 1-1,1 0 8,8-13-812,-3-1 28</inkml:trace>
   <inkml:trace contextRef="#ctx0" brushRef="#br0" timeOffset="7034.892">849 589 9984,'0'0'124,"-1"0"1,1 0-1,0 0 0,0 0 1,0-1-1,-1 1 1,1 0-1,0 0 1,0 0-1,-1 0 1,1 0-1,0 0 0,-1 0 1,1 0-1,0 0 1,0 0-1,-1 0 1,1 0-1,0 1 1,0-1-1,0 0 0,-1 0 1,1 0-1,0 0 1,0 0-1,-1 0 1,1 0-1,0 1 1,0-1-1,0 0 0,-1 0 1,1 0-125,-2 10 1801,4 21-1539,-1-17-131,4 259 311,-2-244-511,1-50-1152,-4-19 628,-1 29 639,0-1 0,2 0 0,-1 0 0,1 0 0,3-11-46,-3 22 45,-1 0 0,1 0 0,-1 0 0,1-1 0,-1 1 0,1 0 0,0 0 0,-1 0 0,1 0 0,0 0 0,0 0 0,0 0 0,0 0 0,0 1 0,0-1 0,0 0 0,0 0 0,0 1 0,1-1-45,1 0 6,-1 0-1,1 0 0,0 0 1,0 1-1,0-1 0,-1 1 1,1 0-1,0 0 0,1 0-5,2 0 71,-1 1-1,1-1 0,-1 1 0,1 1 1,0-1-1,-1 1 0,0 0 1,1 0-1,0 1-70,9 7 1690</inkml:trace>
-  <inkml:trace contextRef="#ctx0" brushRef="#br0" timeOffset="7488.433">1018 905 7936,'-8'4'3541,"13"0"-2077,-4-4-1373,0 1 0,1-1 0,-1 1 0,1-1 0,-1 0-1,0 0 1,1 1 0,-1-1 0,1 0 0,-1-1 0,1 1-1,-1 0 1,1 0-91,1-2 101,0 0-1,1-1 0,-1 1 1,0-1-1,-1 0 1,1 1-1,0-1 0,-1 0 1,0-1-1,0 1 0,0 0 1,0-1-1,0 1 1,0-2-101,-1 4 0,0-1-1,0 0 1,0 0 0,-1 0 0,1 0 0,-1 0 0,1 0 0,-1 0 0,1 0 0,-1 0-1,0 0 1,0 0 0,0 0 0,0 0 0,-1 0 0,1 0 0,0 0 0,-1 0 0,1 0 0,-1 0-1,0 1 1,0-1 0,0 0 0,0 0 0,0 0 0,0 1 0,-1-2 0,0 1-8,-1 1 1,1 0-1,-1-1 1,1 1-1,-1 0 1,0 0-1,1 0 1,-1 1-1,0-1 1,0 1-1,1-1 1,-1 1-1,0 0 1,0 0-1,0 0 0,0 1 1,1-1-1,-1 1 1,0-1-1,0 1 1,1 0-1,-3 1 8,3-1 3,-1 0 0,0 0 0,1 0 0,-1 0-1,1 0 1,0 1 0,-1-1 0,1 1-1,0 0 1,0 0 0,0 0 0,0 0 0,0 0-1,1 0 1,-1 0 0,0 0 0,1 1 0,0-1-1,0 1 1,0-1 0,0 1 0,0 0 0,0 0-3,1 2 22,0 0 0,0 0 0,0 0 0,1 0 0,0 0 1,0 0-1,0 0 0,1 0 0,0-1 0,0 1 1,0 0-1,0-1 0,2 2-22,5 10-286,2 0 1,11 12 285,-20-25-81,0-1 1,0 0-1,0 1 1,0-1-1,1 0 0,-1 0 1,1 0-1,0 0 1,1 0 80,5 1-880</inkml:trace>
+  <inkml:trace contextRef="#ctx0" brushRef="#br0" timeOffset="7488.432">1018 905 7936,'-8'4'3541,"13"0"-2077,-4-4-1373,0 1 0,1-1 0,-1 1 0,1-1 0,-1 0-1,0 0 1,1 1 0,-1-1 0,1 0 0,-1-1 0,1 1-1,-1 0 1,1 0-91,1-2 101,0 0-1,1-1 0,-1 1 1,0-1-1,-1 0 1,1 1-1,0-1 0,-1 0 1,0-1-1,0 1 0,0 0 1,0-1-1,0 1 1,0-2-101,-1 4 0,0-1-1,0 0 1,0 0 0,-1 0 0,1 0 0,-1 0 0,1 0 0,-1 0 0,1 0 0,-1 0-1,0 0 1,0 0 0,0 0 0,0 0 0,-1 0 0,1 0 0,0 0 0,-1 0 0,1 0 0,-1 0-1,0 1 1,0-1 0,0 0 0,0 0 0,0 0 0,0 1 0,-1-2 0,0 1-8,-1 1 1,1 0-1,-1-1 1,1 1-1,-1 0 1,0 0-1,1 0 1,-1 1-1,0-1 1,0 1-1,1-1 1,-1 1-1,0 0 1,0 0-1,0 0 0,0 1 1,1-1-1,-1 1 1,0-1-1,0 1 1,1 0-1,-3 1 8,3-1 3,-1 0 0,0 0 0,1 0 0,-1 0-1,1 0 1,0 1 0,-1-1 0,1 1-1,0 0 1,0 0 0,0 0 0,0 0 0,0 0-1,1 0 1,-1 0 0,0 0 0,1 1 0,0-1-1,0 1 1,0-1 0,0 1 0,0 0 0,0 0-3,1 2 22,0 0 0,0 0 0,0 0 0,1 0 0,0 0 1,0 0-1,0 0 0,1 0 0,0-1 0,0 1 1,0 0-1,0-1 0,2 2-22,5 10-286,2 0 1,11 12 285,-20-25-81,0-1 1,0 0-1,0 1 1,0-1-1,1 0 0,-1 0 1,1 0-1,0 0 1,1 0 80,5 1-880</inkml:trace>
   <inkml:trace contextRef="#ctx0" brushRef="#br0" timeOffset="7866.959">1133 842 8320,'-4'-6'2593,"7"7"-1141,-2 0-1413,0 0 0,0 0-1,0 0 1,0 0 0,0 0-1,0 0 1,-1 0-1,1 0 1,0 0 0,0 1-39,5 20 992,-2 1 0,0-1 0,-2 1-1,0 7-991,0-19 288,-2-11-278,0 0 0,0 0 0,0 0 0,0 0 1,0 0-1,0 0 0,0 0 0,0 0 0,0 1 0,1-1 0,-1 0 1,0 0-1,0 0 0,0 0 0,0 0 0,0 0 0,0 0 0,0 0 0,0 0 1,0 0-1,0 0 0,0 0 0,0 0 0,0 0 0,0 0 0,0 0 1,1 0-1,-1 0 0,0 0 0,0 0 0,0 0 0,0 0 0,0 0 0,0 0 1,0 0-1,0 0 0,0 0 0,0 0 0,0 0 0,1 0 0,-1 0 0,0 0 1,0 0-1,0 0 0,0 0 0,0 0 0,0 0 0,0 0 0,0 0 1,0 0-1,0 0-10,9-15 751,-8 12-760,4-6-176,-1 0 1,2 1-1,-1 0 0,1 0 1,0 0-1,1 1 0,0 0 1,3-3 184,4-1-661</inkml:trace>
   <inkml:trace contextRef="#ctx0" brushRef="#br0" timeOffset="8290.296">1322 983 7936,'1'1'256,"-1"0"0,0 0 0,0-1 0,1 1-1,-1 0 1,1 0 0,-1 0 0,1 0 0,-1-1 0,1 1 0,-1 0 0,1 0 0,-1-1 0,1 1 0,0-1 0,0 1 0,-1 0 0,1-1 0,0 1-256,0-1 72,-1 0 1,1 0 0,0 0-1,-1 0 1,1 0 0,-1 0-1,1 0 1,-1 0 0,1 0-1,-1 0 1,1 0 0,0-1 0,-1 1-1,1 0 1,-1 0 0,1 0-1,-1-1 1,0 1 0,1 0-1,-1-1 1,1 1 0,-1-1-1,1 1-72,1-2 72,-1 0 0,1 0-1,-1 0 1,1 0 0,-1-1-1,1 1 1,-1 0 0,0-1-1,0 1 1,-1-1 0,1 1 0,0-1-1,-1 0-71,1-7 248,0 0 1,-1 1-1,0-1 0,-1 0 1,0 0-1,-2-9-248,-5-10 811,-6-17-811,5 18 392,-4-22-392,11 41 30,0-1 1,1 1-1,1-1 1,0 1 0,0-1-1,0 0 1,2-3-31,-1 10-54,-1-1 1,1 1-1,0-1 0,0 1 1,0 0-1,1-1 1,-1 1-1,1 0 0,0 0 1,0 0-1,0 0 1,0 0-1,0 1 1,1-1-1,-1 0 0,1 1 1,0 0-1,0 0 1,0 0-1,0 0 0,0 0 1,0 0-1,0 1 1,0 0-1,1-1 1,-1 1-1,1 0 0,-1 1 1,1-1-1,-1 1 1,1-1-1,-1 1 0,1 0 1,0 1-1,-1-1 1,1 0-1,-1 1 0,1 0 1,-1 0-1,1 0 1,-1 0-1,1 1 54,1 0-191,-1 0 0,1 0-1,-1 0 1,0 1 0,0 0-1,0 0 1,0 0 0,1 1 191,9 12-1184</inkml:trace>
   <inkml:trace contextRef="#ctx0" brushRef="#br0" timeOffset="8649.57">1301 854 9088,'-11'-8'3424,"11"5"-2656,1-1 128,2 2-128,4-1-512,1-1-64,2-1-288,4 1-64,5 0 64,1 1 256,0 2 192,1 1-160,-1 1-32,-3 2-256,-2 1-64</inkml:trace>
@@ -1166,8 +1166,8 @@
   <inkml:trace contextRef="#ctx0" brushRef="#br0" timeOffset="9390.199">1613 847 7808,'-1'1'147,"1"-1"0,-1 0 1,1 1-1,-1-1 0,1 0 0,-1 1 1,1-1-1,-1 1 0,1-1 1,-1 1-1,1-1 0,0 1 0,-1-1 1,1 1-1,0-1 0,0 1 0,-1 0 1,1-1-1,0 1 0,0-1 1,0 1-1,0 0 0,-1-1 0,1 1 1,0 0-1,0-1 0,0 1 0,0 0 1,1-1-1,-1 1 0,0-1 1,0 1-1,0 0 0,1 0-147,6 29 740,-4-22-338,-1 4 358,0 0 0,-1 1 0,0-1 0,-1 8-760,0-20 16,0 1-1,0-1 1,0 0 0,0 0 0,0 1 0,0-1-1,0 0 1,0 0 0,0 1 0,0-1 0,0 0-1,0 1 1,0-1 0,0 0 0,0 0-1,0 1 1,0-1 0,1 0 0,-1 0 0,0 0-1,0 1 1,0-1 0,0 0 0,1 0 0,-1 0-1,0 1 1,0-1 0,0 0 0,1 0 0,-1 0-1,0 0 1,0 1 0,1-1 0,-1 0 0,0 0-1,0 0 1,1 0 0,-1 0 0,0 0 0,0 0-1,1 0-15,12-6 57,11-14-1353,-12 8 155</inkml:trace>
   <inkml:trace contextRef="#ctx0" brushRef="#br0" timeOffset="9759.164">1863 912 7040,'3'-9'2624,"0"5"-2048,2-2-128,-4 3-192</inkml:trace>
   <inkml:trace contextRef="#ctx0" brushRef="#br0" timeOffset="9760.164">1844 882 7040,'-4'2'566,"-1"0"1,1 0 0,0 0-1,-1 1 1,1-1-1,0 1 1,1 0-1,-1 1 1,0-1-567,-29 35 1512,28-32-1419,4-5-68,1 0 0,-1 0 1,0 0-1,0 0 0,1 0 1,-1 1-1,1-1 0,-1 0 1,1 0-1,-1 0 1,1 1-1,0-1 0,-1 0 1,1 0-1,0 1 0,0-1 1,0 0-1,0 1 0,0-1 1,0 0-1,1 0 0,-1 1 1,0-1-1,0 0 1,1 0-1,-1 1 0,1-1 1,0 0-1,-1 0 0,1 0 1,0 0-1,-1 0 0,1 0 1,0 0-1,1 1-25,-1-1 54,1 1-1,0-1 1,0 0-1,0 1 1,0-1-1,0 0 1,0 0-1,0 0 1,0-1-1,0 1 0,0 0 1,1-1-1,-1 1 1,0-1-1,0 0 1,1 0-1,-1 0 1,0 0-1,1 0 1,0 0-54,0-1-22,1 0 0,-1 1 0,1-1-1,-1-1 1,0 1 0,1 0 0,-1-1 0,0 0 0,0 1 0,0-1 0,2-2 22,-4 3 29,0-1 1,1 1 0,-1-1-1,0 1 1,0-1-1,0 0 1,-1 1 0,1-1-1,0 0 1,-1 0-1,1 0 1,-1 0 0,1 1-1,-1-1 1,0 0-1,0 0 1,0 0 0,0 0-1,0 0 1,0 0 0,-1-1-30,1 1 6,-8-41 578,7 40-612,0 1-1,0-1 1,0 0-1,0 1 1,0-1-1,0 1 1,0 0-1,-1-1 1,0 1-1,1 0 1,-1 0-1,0 0 1,0 0-1,-1-1 29,-4 1-602,1 2-91</inkml:trace>
-  <inkml:trace contextRef="#ctx0" brushRef="#br0" timeOffset="10447.375">1941 886 6784,'0'4'1008,"0"0"1,0 0-1,0 1 1,-1-1-1,1 0 0,-1 0 1,0 1-1009,-1 1 340,1 1-1,0-1 1,1 1 0,-1-1 0,1 0-1,0 1 1,1-1 0,-1 1 0,2 3-340,-2-10-2,1 1 1,-1-1-1,0 1 1,0-1-1,1 1 1,-1-1-1,0 1 0,0-1 1,1 1-1,-1-1 1,1 1-1,-1-1 1,0 0-1,1 1 1,-1-1-1,1 0 1,-1 1-1,1-1 1,-1 0-1,1 0 0,-1 1 1,1-1-1,-1 0 1,1 0-1,-1 0 1,1 0-1,0 0 1,-1 0 1,2 0 28,0 0 1,0 0 0,-1-1-1,1 1 1,0 0-1,-1-1 1,1 0 0,0 1-1,-1-1 1,1 0-29,5-3-20,0-1 0,0 0-1,5-4 21,-12 9-33,18-16-944,-12 10 506,0 0 0,1 0 1,5-2 470,-12 7 11,1 1 0,-1 0 0,0 0 0,1-1 0,-1 1 0,0 0 0,1 0 0,-1 0 0,1-1 0,-1 1 0,0 0 0,1 0 0,-1 0 0,1 0 0,-1 0 0,1 0 0,-1 0 0,0 0 0,1 0 0,-1 0 0,1 0 0,-1 0 0,0 1 0,1-1 0,-1 0 0,1 0 0,-1 0 0,0 1 0,1-1 0,-1 0 0,0 0 0,1 1 0,-1-1 0,0 0 0,1 0 0,-1 1 0,0-1 1,0 0-1,1 1 0,-1-1 0,0 1 0,0-1 0,0 0 0,1 1 0,-1-1 0,0 1 0,0-1 0,0 0 0,0 1-11,4 27 1613,-2-15-993,-2-12-597,1-1 1,-1 1-1,0 0 0,1-1 0,-1 1 0,0-1 1,1 1-1,-1-1 0,1 1 0,-1-1 1,1 1-1,-1-1 0,1 0 0,-1 1 1,1-1-1,0 0 0,-1 1 0,1-1 0,0 0 1,-1 0-1,1 1 0,0-1 0,-1 0 1,1 0-1,0 0 0,-1 0 0,1 0 0,0 0 1,-1 0-1,1 0 0,0 0 0,-1 0 1,1 0-1,0-1 0,-1 1 0,1 0 0,0 0 1,-1-1-1,1 1-23,30-16-1188,-24 12 755,5-3-21,-7 4 188,0 0 0,0 1 0,0-1 0,0 1 0,1 0 1,4-1 265,-9 3 32,1 0 1,0 0 0,-1 0-1,1 0 1,-1 0 0,1 0 0,0 0-1,-1 1 1,1-1 0,0 0-1,-1 1 1,1 0 0,-1-1 0,1 1-1,-1 0 1,1 0 0,-1-1 0,0 1-1,1 0 1,-1 0 0,0 1-1,0-1 1,0 0 0,0 0 0,1 2-33,9 12 1151,-9-11-1210,0-1-1,1 1 1,0-1 0,0 1 0,0-1 0,0 0 0,0 0 0,0 0 0,1-1 0,3 3 59,2-1-1168</inkml:trace>
-  <inkml:trace contextRef="#ctx0" brushRef="#br0" timeOffset="10990.957">2350 927 5888,'42'33'7530,"-37"-49"-6100,-4 8-1588,1 1 1,-2-1 0,1 0-1,-1 1 1,0-1 0,-1-1 157,1 8-68,0 0 1,0-1-1,0 1 1,-1-1-1,1 1 1,0 0 0,-1-1-1,1 1 1,-1 0-1,1 0 1,-1-1-1,1 1 1,-1 0-1,0 0 1,0 0-1,0-1 1,0 1-1,0 0 1,0 0 0,0 1-1,0-1 1,0 0-1,0 0 1,0 0-1,-1 1 1,1-1-1,0 1 1,0-1-1,-1 1 1,1-1-1,0 1 1,-1 0 0,1-1-1,-1 1 1,1 0-1,0 0 1,-1 0 67,0 1 97,0-1 1,0 1 0,0-1-1,0 1 1,0 0-1,0 0 1,0 0 0,1 0-1,-1 0 1,0 0 0,1 1-1,-1-1 1,1 1-1,-1-1 1,1 1 0,-1-1-1,1 1 1,0 0-1,0-1 1,0 1 0,0 0-1,0 1-97,-3 5 117,1 0-1,0 1 1,0-1-1,-1 6-116,3-7 148,0 0-1,0 1 1,0-1 0,1 0-1,0 1 1,0-1 0,1 1-148,-1-6 33,1 0 0,-1 1 0,1-1-1,-1 0 1,1 0 0,0 0 0,0 0 0,0 0 0,0 0 0,0-1 0,2 3-33,-2-3-8,-1 0 1,1 0-1,0-1 1,0 1-1,0 0 1,0-1-1,1 1 0,-1-1 1,0 1-1,0-1 1,0 1-1,0-1 1,0 0-1,1 1 1,-1-1-1,0 0 0,0 0 1,1 0-1,-1 0 1,0 0-1,1 0 8,12-3-576,2-3-250</inkml:trace>
+  <inkml:trace contextRef="#ctx0" brushRef="#br0" timeOffset="10447.374">1941 886 6784,'0'4'1008,"0"0"1,0 0-1,0 1 1,-1-1-1,1 0 0,-1 0 1,0 1-1009,-1 1 340,1 1-1,0-1 1,1 1 0,-1-1 0,1 0-1,0 1 1,1-1 0,-1 1 0,2 3-340,-2-10-2,1 1 1,-1-1-1,0 1 1,0-1-1,1 1 1,-1-1-1,0 1 0,0-1 1,1 1-1,-1-1 1,1 1-1,-1-1 1,0 0-1,1 1 1,-1-1-1,1 0 1,-1 1-1,1-1 1,-1 0-1,1 0 0,-1 1 1,1-1-1,-1 0 1,1 0-1,-1 0 1,1 0-1,0 0 1,-1 0 1,2 0 28,0 0 1,0 0 0,-1-1-1,1 1 1,0 0-1,-1-1 1,1 0 0,0 1-1,-1-1 1,1 0-29,5-3-20,0-1 0,0 0-1,5-4 21,-12 9-33,18-16-944,-12 10 506,0 0 0,1 0 1,5-2 470,-12 7 11,1 1 0,-1 0 0,0 0 0,1-1 0,-1 1 0,0 0 0,1 0 0,-1 0 0,1-1 0,-1 1 0,0 0 0,1 0 0,-1 0 0,1 0 0,-1 0 0,1 0 0,-1 0 0,0 0 0,1 0 0,-1 0 0,1 0 0,-1 0 0,0 1 0,1-1 0,-1 0 0,1 0 0,-1 0 0,0 1 0,1-1 0,-1 0 0,0 0 0,1 1 0,-1-1 0,0 0 0,1 0 0,-1 1 0,0-1 1,0 0-1,1 1 0,-1-1 0,0 1 0,0-1 0,0 0 0,1 1 0,-1-1 0,0 1 0,0-1 0,0 0 0,0 1-11,4 27 1613,-2-15-993,-2-12-597,1-1 1,-1 1-1,0 0 0,1-1 0,-1 1 0,0-1 1,1 1-1,-1-1 0,1 1 0,-1-1 1,1 1-1,-1-1 0,1 0 0,-1 1 1,1-1-1,0 0 0,-1 1 0,1-1 0,0 0 1,-1 0-1,1 1 0,0-1 0,-1 0 1,1 0-1,0 0 0,-1 0 0,1 0 0,0 0 1,-1 0-1,1 0 0,0 0 0,-1 0 1,1 0-1,0-1 0,-1 1 0,1 0 0,0 0 1,-1-1-1,1 1-23,30-16-1188,-24 12 755,5-3-21,-7 4 188,0 0 0,0 1 0,0-1 0,0 1 0,1 0 1,4-1 265,-9 3 32,1 0 1,0 0 0,-1 0-1,1 0 1,-1 0 0,1 0 0,0 0-1,-1 1 1,1-1 0,0 0-1,-1 1 1,1 0 0,-1-1 0,1 1-1,-1 0 1,1 0 0,-1-1 0,0 1-1,1 0 1,-1 0 0,0 1-1,0-1 1,0 0 0,0 0 0,1 2-33,9 12 1151,-9-11-1210,0-1-1,1 1 1,0-1 0,0 1 0,0-1 0,0 0 0,0 0 0,0 0 0,1-1 0,3 3 59,2-1-1168</inkml:trace>
+  <inkml:trace contextRef="#ctx0" brushRef="#br0" timeOffset="10990.956">2350 927 5888,'42'33'7530,"-37"-49"-6100,-4 8-1588,1 1 1,-2-1 0,1 0-1,-1 1 1,0-1 0,-1-1 157,1 8-68,0 0 1,0-1-1,0 1 1,-1-1-1,1 1 1,0 0 0,-1-1-1,1 1 1,-1 0-1,1 0 1,-1-1-1,1 1 1,-1 0-1,0 0 1,0 0-1,0-1 1,0 1-1,0 0 1,0 0 0,0 1-1,0-1 1,0 0-1,0 0 1,0 0-1,-1 1 1,1-1-1,0 1 1,0-1-1,-1 1 1,1-1-1,0 1 1,-1 0 0,1-1-1,-1 1 1,1 0-1,0 0 1,-1 0 67,0 1 97,0-1 1,0 1 0,0-1-1,0 1 1,0 0-1,0 0 1,0 0 0,1 0-1,-1 0 1,0 0 0,1 1-1,-1-1 1,1 1-1,-1-1 1,1 1 0,-1-1-1,1 1 1,0 0-1,0-1 1,0 1 0,0 0-1,0 1-97,-3 5 117,1 0-1,0 1 1,0-1-1,-1 6-116,3-7 148,0 0-1,0 1 1,0-1 0,1 0-1,0 1 1,0-1 0,1 1-148,-1-6 33,1 0 0,-1 1 0,1-1-1,-1 0 1,1 0 0,0 0 0,0 0 0,0 0 0,0 0 0,0-1 0,2 3-33,-2-3-8,-1 0 1,1 0-1,0-1 1,0 1-1,0 0 1,0-1-1,1 1 0,-1-1 1,0 1-1,0-1 1,0 1-1,0-1 1,0 0-1,1 1 1,-1-1-1,0 0 0,0 0 1,1 0-1,-1 0 1,0 0-1,1 0 8,12-3-576,2-3-250</inkml:trace>
   <inkml:trace contextRef="#ctx0" brushRef="#br0" timeOffset="11363.543">2568 596 8576,'-8'-15'2816,"8"15"-2776,0 0 1,0 0 0,0 0-1,0 1 1,0-1 0,0 0-1,0 0 1,0 0 0,0 0-1,0 1 1,0-1-1,0 0 1,-1 0 0,1 0-1,0 0 1,0 0 0,0 0-1,0 1 1,0-1 0,0 0-1,-1 0 1,1 0 0,0 0-1,0 0 1,0 0 0,0 0-1,0 0 1,-1 0 0,1 1-1,0-1 1,0 0-1,0 0 1,0 0 0,-1 0-1,1 0 1,0 0 0,0 0-1,0 0 1,0 0 0,-1 0-1,1 0 1,0 0 0,0-1-1,0 1 1,0 0 0,-1 0-1,1 0 1,0 0 0,0 0-1,0 0 1,0 0-1,0 0 1,-1 0 0,1-1-1,0 1 1,0 0 0,0 0-1,0 0 1,0 0 0,0 0-1,0 0 1,0-1 0,0 1-1,0 0 1,-1 0 0,1 0-1,0 0 1,0-1 0,0 1-1,0 0-40,-4 15 108,4-13-64,-13 51 372,2-1 0,2 2 0,3-1 0,1 19-416,5 17 832,6-112-706,-2 11-220,-2 2 28,1 0-1,0 0 1,1 1 0,-1 0 0,2-1 0,2-3 66,-5 10-26,0 0 1,0 0 0,1 1 0,-1-1 0,1 1-1,-1-1 1,1 1 0,0 0 0,0 0 0,-1 0-1,2 0 1,-1 1 0,0-1 0,0 1 0,0 0-1,1 0 1,-1 0 0,0 0 0,1 1 0,2-1 25,0 1-162,-1 0 0,1 0 1,-1 0-1,1 0 1,0 1-1,-1 0 1,4 1 161,6 5-869</inkml:trace>
   <inkml:trace contextRef="#ctx0" brushRef="#br0" timeOffset="11843.308">2630 925 7168,'0'0'204,"1"1"1,-1-1 0,0 1-1,1-1 1,-1 1 0,1-1-1,-1 0 1,1 1 0,-1-1-1,1 0 1,-1 1 0,1-1-1,-1 0 1,1 0 0,-1 1-1,1-1 1,-1 0 0,1 0-1,-1 0 1,1 0 0,0 0-1,-1 0-204,18 5 1268,-14-5-1051,1 0 0,-1 0 0,1 0 0,-1 0-1,1-1 1,-1 0 0,0 0 0,1 0 0,-1 0 0,0-1-1,1 1 1,-1-1 0,3-2-217,-5 3 1,-1 0 0,1 0 0,0-1 0,-1 1 0,1-1 0,-1 1 0,0-1 0,1 1 0,-1-1-1,0 0 1,0 1 0,0-1 0,0 0 0,0 0 0,0 0 0,-1 0 0,1 0 0,-1 0 0,1 0 0,-1 0 0,0 0 0,0 0 0,0 0 0,0 0 0,0 0-1,0 0 1,0 0 0,-1 0 0,1 0 0,-1 0 0,0-1-1,1 2-11,-1-1-1,1 1 0,0-1 1,-1 1-1,0-1 1,1 1-1,-1-1 0,0 1 1,0 0-1,0 0 1,0-1-1,0 1 0,0 0 1,0 0-1,0 0 1,-1 0-1,1 0 0,0 0 1,0 0-1,-1 1 1,1-1-1,-1 0 0,1 1 1,-1-1 11,0 1-17,1 0 0,-1 0 1,0 0-1,0 0 0,1 0 0,-1 1 1,0-1-1,0 1 0,1-1 1,-1 1-1,0-1 0,1 1 1,-1 0-1,1 0 0,-1 0 0,1 0 1,0 0-1,-1 0 0,1 0 1,0 1-1,-1 0 17,-5 4 49,1 1 1,0 0-1,1 0 1,-1 1 0,2 0-1,-1 0 1,-2 6-50,6-11 46,-1 0 0,1 0 0,0 1-1,0-1 1,0 0 0,1 1 0,-1-1 0,1 0 0,0 1 0,0-1 0,0 1 0,0-1 0,1 1 0,-1-1 0,1 0 0,0 1 0,0-1 0,0 0 0,1 1 0,-1-1 0,2 2-46,-1-2-82,-1 0 0,1-1 0,0 1 0,0 0 0,0-1 0,1 0 0,-1 1 0,1-1 0,-1 0 0,1 0 0,0 0-1,-1-1 1,1 1 0,0-1 0,0 1 0,0-1 0,0 0 0,1 0 0,-1 0 0,0-1 0,2 1 82,9-1 262</inkml:trace>
   <inkml:trace contextRef="#ctx0" brushRef="#br0" timeOffset="12228">2840 886 8576,'0'0'91,"0"0"1,0 0-1,0 0 1,-1 0 0,1 0-1,0 0 1,0 0-1,0 0 1,0 0 0,0 0-1,0 0 1,-1 0-1,1 0 1,0 0 0,0 0-1,0 0 1,0 0-1,0 0 1,0 0-1,0 0 1,-1 0 0,1 0-1,0 0 1,0 0-1,0 0 1,0 1 0,0-1-1,0 0 1,0 0-1,0 0 1,0 0-1,0 0 1,-1 0 0,1 0-1,0 0 1,0 1-1,0-1 1,0 0 0,0 0-1,0 0 1,0 0-1,0 0-91,-1 10 1514,1 18-1699,0-17 428,1-7-53,-1-1 0,0 1-1,1 0 1,-1-1-1,1 1 1,0-1 0,0 1-1,1-1 1,-1 0 0,1 1-1,-1-1 1,1 0 0,0 0-1,0 0 1,0 0 0,2 1-190,-2-3 73,-1 1 0,0-1 0,1 0 0,0 0 0,-1 0 1,1 0-1,-1 0 0,1-1 0,0 1 0,0 0 0,-1-1 1,1 1-1,0-1 0,0 0 0,0 0 0,0 1 0,0-1 1,-1 0-1,1-1 0,0 1 0,0 0 0,0 0 1,0-1-1,-1 1 0,1-1 0,0 0 0,0 1 0,-1-1 1,1 0-1,0 0 0,-1 0 0,2-1-73,2-2-57,0 0 1,0-1-1,-1 1 0,1-1 1,1-3 56,-2 3-630,0 0-1,1 0 1,0 1 0,0-1 0,1 0 630,7-2-1664</inkml:trace>
@@ -1230,7 +1230,7 @@
     </inkml:brush>
   </inkml:definitions>
   <inkml:trace contextRef="#ctx0" brushRef="#br0">103 226 7808,'0'0'167,"-1"0"0,1-1 1,-1 1-1,1 0 1,-1-1-1,1 1 0,-1 0 1,1 0-1,-1 0 0,1-1 1,-1 1-1,1 0 1,-1 0-1,1 0 0,-1 0 1,0 0-1,1 0 0,-1 0 1,1 0-1,-1 0 0,1 0 1,-1 0-1,1 1 1,-1-1-1,1 0 0,-1 0 1,0 1-1,1-1 0,0 0 1,-1 1-168,-19 11-108,14-8 256,-7 3-160,-15 9 74,26-15-62,0 0-1,0 0 0,1 1 1,-1-1-1,1 1 0,-1-1 1,1 1-1,-1 0 1,1-1-1,0 1 0,0 0 1,0 0 0,1-1 11,0-1 1,0 1-1,0-1 1,0 1 0,0-1-1,0 0 1,0 1 0,0-1-1,0 1 1,0-1-1,0 1 1,1-1 0,-1 1-1,0-1 1,0 1 0,1-1-1,-1 0 1,0 1 0,0-1-1,1 0 1,-1 1-1,1-1 1,-1 0 0,0 1-1,1-1 1,-1 0 0,0 1-1,1-1 1,-1 0-1,1 0 1,-1 0 0,1 1-1,-1-1 1,1 0 0,-1 0-1,1 0 1,-1 0-1,1 0-11,19 4 286,-20-4-277,12 0 82,-7 0-91,0 0 0,0 1 1,0-1-1,0 1 0,0 0 0,0 1 0,-4-2 6,0 0 0,0 1 0,-1-1 0,1 0 0,0 1 0,-1-1 0,1 1 0,0-1 0,-1 1 0,1-1 0,0 1 0,-1-1 0,1 1 0,-1-1 0,1 1 0,-1 0 0,0-1 0,1 1 0,-1 0 0,1 0 0,-1-1 0,0 1 0,0 0 0,0 0 0,1 0 0,-1-1 0,0 1 0,0 0 0,0 0 0,0 0 0,0-1 0,0 1 0,0 0 0,-1 0 0,1 0 0,0-1 0,0 1 0,-1 0-6,0 4-7,-1-1 0,0 1 0,0-1 1,0 0-1,0 0 0,-1 1 0,1-2 1,-1 1-1,0 0 0,-1-1 0,1 1 1,0-1-1,-1 0 0,0 0 1,0 0-1,0-1 0,0 1 0,0-1 1,-1 1 6,-5-2-299,3-4 6</inkml:trace>
-  <inkml:trace contextRef="#ctx0" brushRef="#br0" timeOffset="514.447">154 301 6784,'0'0'99,"-1"0"0,1 0 1,0 0-1,0 0 0,-1 0 1,1 1-1,0-1 0,0 0 0,0 0 1,0 1-1,-1-1 0,1 0 1,0 0-1,0 1 0,0-1 1,0 0-1,0 0 0,0 1 0,0-1 1,0 0-1,0 0 0,0 1 1,0-1-1,0 0 0,0 0 1,0 1-1,0-1 0,0 0 0,0 1 1,0-1-1,0 0 0,0 0-99,8 6 1184,-6-5-1090,1 0 0,-1 0 1,1 0-1,-1-1 0,1 0 0,-1 1 0,1-1 0,-1 0-94,4-1 90,0 0-1,0 0 0,0-1 0,-1 1 1,1-1-1,0-1 0,-1 1 1,2-2-90,-5 3 13,0 0 0,0 0 0,0-1 0,0 1 0,0 0 0,0-1 0,-1 1 0,1-1 0,0 0 0,-1 1 0,0-1 0,1 0 0,-1 0 0,0 0 0,0 0 0,0 0 0,0 0 0,0-1 0,-1 1 0,1 0 0,0 0 0,-1-1 0,0 1-13,0 1-8,0 0 1,0 0-1,0 0 1,0 1-1,0-1 1,0 0-1,0 0 1,0 0-1,-1 1 1,1-1-1,0 0 1,-1 0 0,1 1-1,-1-1 1,1 0-1,0 1 1,-1-1-1,0 0 1,1 1-1,-1-1 1,1 1-1,-1-1 1,0 1-1,1-1 1,-1 0 7,-1 1 8,1-1 0,-1 1 0,0-1 1,1 1-1,-1 0 0,0-1 0,1 1 0,-1 0 0,0 0 0,1 0 1,-1 0-1,0 1-8,-4 0 63,0 0-1,0 0 1,0 1 0,0 0 0,1 1 0,-5 1-63,6-2-12,0 0 1,1 1 0,-1 0-1,0 0 1,1 0 0,0 0-1,0 0 1,0 1 0,0-1 0,0 1-1,1 0 1,-1 0 0,1 0-1,0 0 1,0 0 0,1 0-1,-2 5 12,2-6 31,1 0-1,-1 0 0,1 0 0,0 0 0,0 1 0,0-1 1,0 0-1,1 0 0,-1 0 0,1 0 0,0 0 0,0 0 1,0 0-1,0 0 0,0 0 0,1 0 0,-1 0 0,1 0 0,0-1 1,-1 1-1,1-1 0,1 1 0,-1-1 0,0 0 0,1 0 1,-1 0-31,4 2 32,-1 0 1,1 0-1,0-1 1,0 0-1,4 2-32,-8-4-21,1 0-1,-1 0 1,0-1-1,0 1 1,1 0-1,-1-1 1,0 0-1,1 0 1,-1 1-1,1-2 1,-1 1-1,0 0 1,1 0-1,-1-1 1,0 1 0,1-1-1,-1 0 1,0 1 21,11-9-544</inkml:trace>
+  <inkml:trace contextRef="#ctx0" brushRef="#br0" timeOffset="514.446">154 301 6784,'0'0'99,"-1"0"0,1 0 1,0 0-1,0 0 0,-1 0 1,1 1-1,0-1 0,0 0 0,0 0 1,0 1-1,-1-1 0,1 0 1,0 0-1,0 1 0,0-1 1,0 0-1,0 0 0,0 1 0,0-1 1,0 0-1,0 0 0,0 1 1,0-1-1,0 0 0,0 0 1,0 1-1,0-1 0,0 0 0,0 1 1,0-1-1,0 0 0,0 0-99,8 6 1184,-6-5-1090,1 0 0,-1 0 1,1 0-1,-1-1 0,1 0 0,-1 1 0,1-1 0,-1 0-94,4-1 90,0 0-1,0 0 0,0-1 0,-1 1 1,1-1-1,0-1 0,-1 1 1,2-2-90,-5 3 13,0 0 0,0 0 0,0-1 0,0 1 0,0 0 0,0-1 0,-1 1 0,1-1 0,0 0 0,-1 1 0,0-1 0,1 0 0,-1 0 0,0 0 0,0 0 0,0 0 0,0 0 0,0-1 0,-1 1 0,1 0 0,0 0 0,-1-1 0,0 1-13,0 1-8,0 0 1,0 0-1,0 0 1,0 1-1,0-1 1,0 0-1,0 0 1,0 0-1,-1 1 1,1-1-1,0 0 1,-1 0 0,1 1-1,-1-1 1,1 0-1,0 1 1,-1-1-1,0 0 1,1 1-1,-1-1 1,1 1-1,-1-1 1,0 1-1,1-1 1,-1 0 7,-1 1 8,1-1 0,-1 1 0,0-1 1,1 1-1,-1 0 0,0-1 0,1 1 0,-1 0 0,0 0 0,1 0 1,-1 0-1,0 1-8,-4 0 63,0 0-1,0 0 1,0 1 0,0 0 0,1 1 0,-5 1-63,6-2-12,0 0 1,1 1 0,-1 0-1,0 0 1,1 0 0,0 0-1,0 0 1,0 1 0,0-1 0,0 1-1,1 0 1,-1 0 0,1 0-1,0 0 1,0 0 0,1 0-1,-2 5 12,2-6 31,1 0-1,-1 0 0,1 0 0,0 0 0,0 1 0,0-1 1,0 0-1,1 0 0,-1 0 0,1 0 0,0 0 0,0 0 1,0 0-1,0 0 0,0 0 0,1 0 0,-1 0 0,1 0 0,0-1 1,-1 1-1,1-1 0,1 1 0,-1-1 0,0 0 0,1 0 1,-1 0-31,4 2 32,-1 0 1,1 0-1,0-1 1,0 0-1,4 2-32,-8-4-21,1 0-1,-1 0 1,0-1-1,0 1 1,1 0-1,-1-1 1,0 0-1,1 0 1,-1 1-1,1-2 1,-1 1-1,0 0 1,1 0-1,-1-1 1,0 1 0,1-1-1,-1 0 1,0 1 21,11-9-544</inkml:trace>
   <inkml:trace contextRef="#ctx0" brushRef="#br0" timeOffset="882.782">396 0 6400,'-1'0'163,"1"1"0,-1-1 0,1 1 0,-1-1-1,1 1 1,0-1 0,-1 1 0,1-1 0,0 1 0,-1-1 0,1 1 0,0-1 0,0 1 0,0-1 0,-1 1 0,1-1 0,0 1 0,0 0-1,0-1 1,0 1 0,0-1 0,0 1-163,0 17 319,0-13 119,-2 110 1429,-13 91-1867,14-197 138,1-6 28,0 0 0,0 0 0,0 1-1,-1-1 1,1 0 0,-1 0 0,0 0-1,0 0 1,0 0 0,-1 0 0,1 0 0,-1 1-166,1-4 29,1-1 0,0 1 1,-1-1-1,1 1 0,0-1 1,0 1-1,-1 0 1,1-1-1,0 1 0,0-1 1,0 0-1,-1 1 0,1-1 1,0 1-1,0-1 1,0 1-1,0-1 0,0 1 1,0-1-1,0 1 0,0-1-29,0-15 8,0 11 1,-1-6-147,1 1 0,0-1 1,1 1-1,0 0 0,1-1 0,0 1 0,1 0 0,1-4 138,-3 13 16,0 0 1,-1 0-1,1 0 0,0 0 1,-1 1-1,1-1 0,0 0 0,0 0 1,0 1-1,0-1 0,0 1 0,0-1 1,-1 1-1,1-1 0,1 1 0,-1-1 1,0 1-1,0 0 0,0-1-16,24-1-353,-18 1 72,13 0-284</inkml:trace>
   <inkml:trace contextRef="#ctx0" brushRef="#br0" timeOffset="2200.692">539 294 6784,'0'0'128,"0"0"0,0-1 0,0 1 0,-1 0 0,1 0 0,0-1 0,0 1 1,0 0-1,0-1 0,0 1 0,-1 0 0,1 0 0,0 0 0,0-1 0,0 1 0,-1 0 0,1 0 1,0 0-1,0-1 0,-1 1 0,1 0 0,0 0 0,0 0 0,-1 0 0,1 0 0,0 0 0,0 0 1,-1-1-1,1 1 0,0 0 0,-1 0 0,1 0-128,-4 9 681,2-4-811,0 0 268,1 1 0,0 0 0,0-1 0,0 1 0,0 0 0,1-1 0,0 1-1,1 0 1,-1 2-138,1-6 47,-1 1 0,0 0 0,1 0-1,-1-1 1,1 1 0,0 0 0,0-1-1,0 1 1,0-1 0,1 1 0,-1-1-1,1 0 1,-1 1 0,1-1 0,0 0-1,0 0 1,0 0 0,0 0 0,0-1-1,1 1-46,-2-1 28,0 0-1,0-1 1,1 1-1,-1-1 1,0 0-1,1 1 1,-1-1-1,0 0 1,1 0-1,-1 0 1,0 0-1,1 0 0,-1 0 1,0 0-1,1 0 1,-1-1-1,0 1 1,1-1-28,1 0 20,0 0 0,0-1 1,-1 1-1,1-1 0,-1 1 0,1-1 0,-1 0 1,2-1-21,4-5-37,-1-1 1,1 0 0,-2 0 0,2-1 36,-7 8-10,4-6-16,0 2-108,-1-1-1,0 1 0,0 0 1,-1-1-1,3-6 135,-6 13-14,0-1 0,0 1 1,0 0-1,0 0 0,0 0 0,0 0 1,0 0-1,0-1 0,0 1 0,0 0 0,0 0 1,0 0-1,0 0 0,0-1 0,0 1 1,0 0-1,0 0 0,0 0 0,0 0 0,0-1 1,0 1-1,0 0 0,0 0 0,0 0 1,0 0-1,0 0 0,-1-1 0,1 1 1,0 0-1,0 0 0,0 0 0,0 0 0,0 0 1,0 0-1,-1 0 0,1 0 0,0-1 1,0 1-1,0 0 0,0 0 0,0 0 0,-1 0 1,1 0-1,0 0 0,0 0 0,0 0 1,0 0-1,-1 0 0,1 0 0,0 0 1,0 0-1,0 0 0,0 0 0,-1 0 0,1 0 1,0 0-1,0 0 0,0 1 0,0-1 1,0 0-1,-1 0 0,1 0 0,0 0 0,0 0 1,0 0-1,0 0 0,0 0 0,0 1 1,-1-1-1,1 0 14,-11 8 127,10-6-94,0-1 0,1 1 0,-1 0 1,0 0-1,1 0 0,0-1 1,-1 1-1,1 0 0,0 0 0,0 0 1,0 0-1,0 0 0,0 0 0,0 0 1,0 0-1,1-1 0,-1 1 0,1 0 1,0 0-1,-1 0 0,1 0 1,0-1-1,0 1 0,0 0 0,0-1 1,0 1-1,0-1 0,1 1 0,-1-1 1,0 0-1,1 0 0,0 1-33,0-1-22,-1 1 1,1-1-1,-1 0 0,1 0 0,0 0 1,0 0-1,0 0 0,0-1 0,0 1 0,0 0 1,0-1-1,0 0 0,0 1 0,0-1 0,0 0 1,0 0-1,0 0 0,0 0 0,0 0 1,0-1-1,0 1 0,0-1 0,0 1 0,0-1 1,0 0-1,-1 0 0,1 1 0,0-1 1,0-1-1,-1 1 0,1 0 22,4-4-94,1 0 126,-1 0-1,1 0 1,-1-1 0,-1 0 0,1 0-1,-1-1 1,0 1 0,1-4-32,-8 15 145,-5 11 126,-2 40 749,3 9-1020,3-30 71,-1 0 1,-2 0 0,-1 0 0,-6 15-72,13-48-22,-1-1 0,0 1 0,1-1 0,-1 1 0,0-1 0,0 1 1,0-1-1,0 1 0,0-1 0,0 0 0,0 0 0,-1 1 0,1-1 0,-1 0 22,2-1-12,0 0-1,-1 1 1,1-1-1,0 0 0,-1 0 1,1 0-1,0 0 1,0 0-1,-1 0 0,1 0 1,0 0-1,-1 0 0,1 0 1,0 0-1,0 0 1,-1 0-1,1 0 0,0 0 1,0 0-1,-1 0 1,1 0-1,0 0 0,-1-1 1,1 1-1,0 0 1,0 0-1,0 0 0,-1 0 1,1-1 12,-1 0-35,1 1 0,-1-1 0,1 0 0,-1 0 0,1 0 0,-1 0 1,1 0-1,0 0 0,-1 0 0,1 0 0,0 0 0,0 0 0,0-1 35,-2-12-139,2 1 1,0-1-1,0 0 0,1 0 0,1 1 0,1-2 139,7-33-488,3-3 488,-4 18-183,-5 19 317,-1 1 0,2-1 0,-1 1 0,2 1 0,1-2-134,-5 10 23,0 0 0,0 1 0,1 0 0,-1-1 0,1 1 0,0 0-1,0 1 1,0-1 0,1 0 0,-1 1 0,1 0 0,-1 0 0,1 0 0,0 0 0,0 0 0,-1 1 0,1-1 0,4 0-23,-1 1 101,-1 0 1,1 0-1,-1 1 1,1 0-1,0 0 1,-1 0-1,1 1 1,-1 0-1,1 0 1,-1 1-1,0 0 0,2 0-101,-6-1 29,0 0 0,0 0-1,0 0 1,0 0-1,0 0 1,0 0-1,-1 1 1,1-1-1,0 1 1,0-1-1,-1 1 1,1 0 0,-1-1-1,0 1 1,0 0-1,1 0 1,-1 0-1,0 0 1,-1 0-1,1 0 1,0 1-1,0-1 1,-1 0 0,0 0-1,1 1 1,-1-1-1,0 0 1,0 0-1,0 1 1,0-1-1,0 0 1,-1 0 0,1 1-1,-1-1 1,0 0-1,0 0-28,0 1 28,0 0-1,0 0 1,-1 0-1,0 0 1,0 0-1,1-1 0,-2 1 1,1-1-1,0 0 1,0 1-1,-1-1 1,1 0-1,-1 0 1,0-1-1,1 1 1,-1 0-1,0-1 1,0 0-1,0 0 1,-2 1-28,-4 1-145,-1 0 0,1-1 0,-1 0 0,1-1 0,-1 0 0,-3 0 145,-8-2-1082</inkml:trace>
 </inkml:ink>
@@ -1291,7 +1291,7 @@
   </inkml:definitions>
   <inkml:trace contextRef="#ctx0" brushRef="#br0">117 302 3968,'0'0'102,"-1"-1"0,1 1 1,0-1-1,0 1 0,-1-1 0,1 1 0,0-1 1,0 1-1,0-1 0,0 1 0,0-1 0,0 1 1,0-1-1,0 1 0,0-1 0,0 0 0,0 1 1,0-1-1,0 1 0,1-1 0,-1 1 1,0-1-1,0 1 0,0-1 0,1 1 0,-1-1 1,0 1-1,1 0 0,-1-1 0,0 1 0,1-1-102,-1 1 103,1 0 0,-1-1-1,0 1 1,0 0-1,1 0 1,-1-1-1,0 1 1,0 0 0,0-1-1,1 1 1,-1 0-1,0-1 1,0 1-1,0-1 1,0 1-1,0 0 1,0-1 0,0 1-1,0 0 1,1-1-1,-2 1 1,1-1-1,0 1 1,0 0 0,0-1-1,0 1 1,0-1-1,0 1 1,0 0-1,0-1 1,0 1 0,-1 0-1,1-1 1,0 1-103,-1 0 38,1-1 0,-1 1 0,0 0 0,1 0 0,-1 0 0,1 0 1,-1 0-1,1 0 0,-1 0 0,0 0 0,1 0 0,-1 1 0,1-1 0,-1 0 1,1 0-1,-1 0 0,1 1 0,-1-1 0,1 0 0,-1 0 0,1 1 0,-1-1 1,1 1-1,-1-1 0,1 1-38,-13 10 33,6-4-75,-10 9 87,2 0 0,0 1 1,1 0-1,-5 10-45,18-26 17,1 0 1,-1 0-1,0 1 0,1-1 0,-1 0 1,1 0-1,-1 1 0,1-1 1,0 0-1,-1 1 0,1-1 0,0 0 1,0 1-1,0-1 0,0 1 1,0-1-1,0 0 0,0 1 1,1-1-1,-1 0 0,1 1 0,-1-1 1,1 0-1,-1 1 0,1-1 1,-1 0-1,1 0 0,0 0 0,0 0 1,0 0-1,0 1 0,0-2 1,0 1-1,0 0 0,0 0 1,0 0-1,0 0 0,0-1 0,1 1 1,-1 0-1,0-1 0,2 1-17,2 1 2,1 1 0,0-1-1,0-1 1,0 1 0,0-1-1,0 0 1,0 0 0,1-1-1,1 0-1,17-2-234</inkml:trace>
   <inkml:trace contextRef="#ctx0" brushRef="#br0" timeOffset="565.071">247 11 4864,'0'-1'120,"0"1"0,0 0 0,0-1-1,0 1 1,0 0 0,0-1 0,0 1 0,0 0 0,0-1 0,0 1 0,0 0 0,0-1 0,0 1 0,0 0-1,0-1 1,0 1 0,0 0 0,1-1 0,-1 1 0,0 0 0,0 0 0,0-1 0,1 1 0,-1 0 0,0-1-1,0 1 1,1 0 0,-1 0 0,0 0 0,0-1 0,1 1 0,-1 0 0,1 0-120,-1 0 147,1 1 1,-1 0-1,0-1 0,1 1 1,-1-1-1,0 1 0,1 0 1,-1-1-1,0 1 1,0 0-1,0 0 0,0-1 1,0 1-1,1 0 0,-1-1 1,0 1-1,-1 0 1,1-1-1,0 1-147,-3 69 959,-4 0 0,-9 38-959,-3 29 818,19-136-808,-1 0-1,1 0 1,0 0-1,0 0 1,0 0 0,0-1-1,0 1 1,0 0-1,0 0 1,0 0 0,1 0-1,-1-1 1,0 1 0,0 0-1,1 0 1,-1 0-1,1 0-9,-1-1 8,0 0 0,1 0 0,-1 0-1,0 0 1,0 0 0,1 0 0,-1 0-1,0 0 1,1 0 0,-1 0-1,0 0 1,1 0 0,-1 0 0,0 0-1,1 0 1,-1 0 0,0-1-1,0 1 1,1 0 0,-1 0 0,0 0-1,0 0 1,1-1 0,-1 1-1,0 0 1,0 0 0,0-1 0,1 1-1,-1 0-7,18-25 301,30-68-690,-48 93 383,0 0 1,0 0 0,0-1 0,0 1 0,0 0 0,0 0-1,0 0 1,0 0 0,0 0 0,0 0 0,0 0-1,0 0 1,0-1 0,0 1 0,0 0 0,0 0 0,0 0-1,0 0 1,0 0 0,0 0 0,0 0 0,1 0 0,-1 0-1,0-1 1,0 1 0,0 0 0,0 0 0,0 0-1,0 0 1,0 0 0,0 0 0,0 0 0,0 0 0,1 0-1,-1 0 1,0 0 0,0 0 0,0 0 0,0 0 0,0 0-1,0 0 1,0 0 0,0 0 0,1 0 0,-1 0 0,0 0-1,0 0 1,0 0 0,0 0 0,0 0 0,0 0-1,0 0 1,0 0 0,1 0 0,-1 0 0,0 0 0,0 0-1,0 0 1,0 0 0,0 0 0,0 0 0,0 1 0,0-1-1,0 0 1,0 0 0,0 0 0,0 0 0,1 0 0,-1 0 5,1 13-61,-2 26 246,1-31-187,-1 0-41,0-1 0,1 1-1,0-1 1,1 1 0,0-1 0,0 1 0,1-1-1,-1 0 1,2 1 0,1 3 43,-4-10 24,0 0 0,1-1 0,-1 1-1,1-1 1,-1 1 0,1-1 0,-1 1 0,1-1 0,-1 1 0,1-1 0,-1 1 0,1-1-1,0 0 1,-1 1 0,1-1 0,0 0 0,-1 0 0,1 0 0,0 1 0,-1-1-1,1 0 1,0 0 0,0 0-24,9-2 470</inkml:trace>
-  <inkml:trace contextRef="#ctx0" brushRef="#br0" timeOffset="1039.897">372 347 4352,'0'0'50,"0"0"0,0 0 0,0 0 0,0 0 0,0 0 0,-1 0 0,1 0 0,0 0 0,0 0 0,0 1 0,0-1 0,0 0 0,0 0 0,-1 0 0,1 0 0,0 0 0,0 0 0,0 0 0,0 0 0,0 0 0,0 0 0,0 0 0,0 1 1,-1-1-1,1 0 0,0 0 0,0 0 0,0 0 0,0 0 0,0 0 0,0 1 0,0-1 0,0 0 0,0 0 0,0 0 0,0 0 0,0 0 0,0 0 0,0 1 0,0-1 0,0 0 0,0 0-50,3 9 565,7 6 1782,-8-14-2213,0-1 0,0 1 0,-1-1 0,1 1-1,0-1 1,0 0 0,0 1 0,0-1 0,0 0 0,-1 0 0,1 0 0,0-1-1,0 1 1,0 0 0,0-1 0,-1 1 0,1-1 0,1 0-134,3-1 171,0-1-1,-1 0 1,1 0 0,-1 0 0,1-1-171,-2 1 2,-1 0 1,1 0-1,0 0 1,-1-1-1,0 0 0,0 0 1,1-2-3,-3 5 6,0 0 0,0-1 0,0 1 0,0 0 1,-1-1-1,1 1 0,0-1 0,-1 1 0,1-1 1,-1 0-1,0 1 0,0-1 0,1 1 0,-1-1 1,0 0-1,0 1 0,-1-1 0,1 1 0,0-1 1,0 0-1,-1 1 0,1-1 0,-1 1 0,0-2-6,0 2-6,0 1 0,0-1 0,0 0 0,0 0 0,0 0 0,0 1 0,0-1 0,0 0 0,-1 1 0,1-1 0,0 1 0,0-1 0,-1 1 0,1 0 0,0-1 0,-1 1 0,1 0 0,0 0 0,-1 0 0,1 0 0,0 0 0,-1 1 0,1-1 0,0 0 0,-1 0 0,1 1 0,0-1 0,0 1 0,-1 0 6,-5 1-43,0 1 0,1-1 0,-1 2 0,-4 2 43,6-3-4,1 0 1,-1 0-1,1 1 1,0 0-1,0 0 1,1 0-1,-1 0 1,1 0-1,0 1 1,0-1 0,1 1-1,-3 4 4,4-6 11,0-1 0,0 0 1,1 0-1,-1 0 0,1 0 0,-1 1 0,1-1 0,0 0 0,0 1 1,0-1-1,0 0 0,0 0 0,1 1 0,-1-1 0,0 0 0,1 0 1,0 1-1,0-1 0,0 0 0,0 0 0,0 0 0,0 0 0,0 0 1,0 0-1,1-1 0,-1 1 0,1 0 0,-1-1 0,1 1 0,0-1 1,1 1-12,1 2-3,1-1 0,1-1 0,-1 1 0,0-1 0,1 0 0,-1 0 0,1 0 0,0-1 0,-1 1 1,1-2-1,1 1 3,12 1-464</inkml:trace>
+  <inkml:trace contextRef="#ctx0" brushRef="#br0" timeOffset="1039.896">372 347 4352,'0'0'50,"0"0"0,0 0 0,0 0 0,0 0 0,0 0 0,-1 0 0,1 0 0,0 0 0,0 0 0,0 1 0,0-1 0,0 0 0,0 0 0,-1 0 0,1 0 0,0 0 0,0 0 0,0 0 0,0 0 0,0 0 0,0 0 0,0 0 0,0 1 1,-1-1-1,1 0 0,0 0 0,0 0 0,0 0 0,0 0 0,0 0 0,0 1 0,0-1 0,0 0 0,0 0 0,0 0 0,0 0 0,0 0 0,0 0 0,0 1 0,0-1 0,0 0 0,0 0-50,3 9 565,7 6 1782,-8-14-2213,0-1 0,0 1 0,-1-1 0,1 1-1,0-1 1,0 0 0,0 1 0,0-1 0,0 0 0,-1 0 0,1 0 0,0-1-1,0 1 1,0 0 0,0-1 0,-1 1 0,1-1 0,1 0-134,3-1 171,0-1-1,-1 0 1,1 0 0,-1 0 0,1-1-171,-2 1 2,-1 0 1,1 0-1,0 0 1,-1-1-1,0 0 0,0 0 1,1-2-3,-3 5 6,0 0 0,0-1 0,0 1 0,0 0 1,-1-1-1,1 1 0,0-1 0,-1 1 0,1-1 1,-1 0-1,0 1 0,0-1 0,1 1 0,-1-1 1,0 0-1,0 1 0,-1-1 0,1 1 0,0-1 1,0 0-1,-1 1 0,1-1 0,-1 1 0,0-2-6,0 2-6,0 1 0,0-1 0,0 0 0,0 0 0,0 0 0,0 1 0,0-1 0,0 0 0,-1 1 0,1-1 0,0 1 0,0-1 0,-1 1 0,1 0 0,0-1 0,-1 1 0,1 0 0,0 0 0,-1 0 0,1 0 0,0 0 0,-1 1 0,1-1 0,0 0 0,-1 0 0,1 1 0,0-1 0,0 1 0,-1 0 6,-5 1-43,0 1 0,1-1 0,-1 2 0,-4 2 43,6-3-4,1 0 1,-1 0-1,1 1 1,0 0-1,0 0 1,1 0-1,-1 0 1,1 0-1,0 1 1,0-1 0,1 1-1,-3 4 4,4-6 11,0-1 0,0 0 1,1 0-1,-1 0 0,1 0 0,-1 1 0,1-1 0,0 0 0,0 1 1,0-1-1,0 0 0,0 0 0,1 1 0,-1-1 0,0 0 0,1 0 1,0 1-1,0-1 0,0 0 0,0 0 0,0 0 0,0 0 0,0 0 1,0 0-1,1-1 0,-1 1 0,1 0 0,-1-1 0,1 1 0,0-1 1,1 1-12,1 2-3,1-1 0,1-1 0,-1 1 0,0-1 0,1 0 0,-1 0 0,1 0 0,0-1 0,-1 1 1,1-2-1,1 1 3,12 1-464</inkml:trace>
   <inkml:trace contextRef="#ctx0" brushRef="#br0" timeOffset="1794.998">600 312 3072,'-15'13'1774,"-12"12"3768,13-2-4608,10-16-799,1-3-53,1 0 1,0 0 0,0 1-1,0-1 1,1 0 0,-1 3-83,2-6 6,0-1-1,0 1 1,0 0 0,0-1 0,0 1-1,0 0 1,0-1 0,0 1 0,0 0-1,0-1 1,0 1 0,1 0 0,-1-1-1,0 1 1,0-1 0,1 1 0,-1 0-1,0-1 1,1 1 0,-1-1 0,1 1 0,-1-1-1,1 1 1,-1-1 0,1 0 0,-1 1-1,1-1 1,-1 1 0,1-1 0,0 0-1,-1 0 1,1 1 0,-1-1 0,1 0-1,0 0 1,-1 0 0,1 1 0,0-1 0,-1 0-1,1 0 1,0 0 0,-1 0 0,1 0-1,0-1 1,-1 1 0,1 0 0,0 0-6,4 0 26,0-1 0,1 0 0,-1 0 1,0-1-1,0 1 0,0-1 1,0 0-1,0 0 0,0-1 0,0 1 1,-1-1-1,0 0 0,1-1 1,-1 1-1,0-1 0,0 1 0,0-2-26,-1 2-307,0-1-1,0 0 0,0 0 0,0 0 1,-1 0-1,1 0 0,-1-1 0,0 1 1,-1-1-1,1 0 0,0-4 308,-2 9-61,1-1 0,-1 1 0,0 0 0,0 0 0,0-1 0,0 1 0,0 0-1,0 0 1,0-1 0,0 1 0,0 0 0,0-1 0,0 1 0,0 0 0,0 0 0,0-1 0,0 1 0,0 0 0,0-1 0,0 1-1,0 0 1,0 0 0,0-1 0,0 1 0,-1 0 0,1 0 0,0-1 0,0 1 0,0 0 0,0 0 0,-1 0 0,1-1 0,0 1-1,0 0 1,0 0 0,-1 0 0,1-1 0,0 1 0,0 0 0,-1 0 0,1 0 0,0 0 0,-1 0 61,1 0 113,-1 0 1,1 0 0,-1 1-1,1-1 1,-1 0-1,1 0 1,0 1-1,-1-1 1,1 0 0,-1 1-1,1-1 1,0 1-1,-1-1 1,1 0 0,0 1-1,0-1 1,-1 1-1,1-1 1,0 1-1,0-1 1,0 1 0,-1-1-1,1 1 1,0-1-1,0 1-113,0 1 44,-1 0-1,1 0 1,0 0-1,0 1 1,0-1 0,0 0-1,0 0 1,0 0-1,0 1 1,1-1-1,-1 0 1,1 0-1,0 0 1,0 0-1,0 0 1,0 0-1,0 0 1,0 0-1,0 0 1,0 0-1,1-1 1,-1 1-1,1-1 1,-1 1-1,1-1 1,0 1-1,0-1 1,-1 0 0,1 0-1,0 0 1,0 0-1,0 0 1,0 0-1,0 0 1,1-1-1,-1 1 1,0-1-1,0 0 1,0 1-1,0-1 1,1 0-1,-1 0 1,0 0-1,0-1 1,0 1-1,0 0 1,1-1-1,-1 0 1,0 1-1,0-1 1,0 0 0,0 0-1,0 0 1,0 0-1,-1-1 1,2 1-44,6-7-15,-1-1 0,0 0 0,0 0 0,-1 0 0,3-5 15,19-32 357,-52 135 102,-37 127 680,52-184-1275,7-28 158,-1 0-11,1 0-1,1 0 1,-1-1-1,1 1 0,-1 0 1,1 3-11,2-4-309,1-5-123</inkml:trace>
   <inkml:trace contextRef="#ctx0" brushRef="#br0" timeOffset="2153.718">835 290 6912,'1'-1'257,"0"0"1,1 0 0,-1 0 0,1 0-1,-1 0 1,1 0 0,-1 0-1,1 1 1,-1-1 0,1 1 0,0-1-1,-1 1 1,1 0 0,0-1-1,-1 1 1,1 0 0,0 0 0,0 0-1,0 1-257,1-1 116,-1 1 1,1 0-1,-1-1 0,0 1 0,0 0 0,1 1 1,-1-1-1,0 0 0,0 1 0,0-1 0,0 1 1,1 1-117,0-1 49,-1 1 0,1 0 0,-1 0 0,0 0 0,0 0 0,0 0 0,0 0 0,0 0 0,-1 1 0,1-1 0,-1 1 0,0-1 0,0 1 0,-1 0 0,1-1 0,-1 1 0,1-1 0,-1 3-49,-1-3 71,1-1 1,-1 1 0,1 0-1,-1-1 1,0 1-1,0-1 1,0 1 0,0-1-1,0 1 1,-1-1-1,1 0 1,-1 1-1,0-1 1,1 0 0,-1 0-1,0 0 1,0-1-1,0 1 1,-1 0-1,1-1 1,0 1 0,-1-1-1,1 0-71,-8 3-52,1-1 0,0 0-1,-1 0 1,1-1 0,-9 1 52,-10 2-585,22-2-124</inkml:trace>
   <inkml:trace contextRef="#ctx0" brushRef="#br0" timeOffset="3486.71">1310 45 4992,'1'-2'332,"-1"0"0,1 1-1,0-1 1,0 0 0,0 1 0,0-1 0,0 0 0,0 1-1,0-1-331,-1 2 715,-1 10 149,-25 88 934,-39 126 127,63-220-1869,-6 17 284,8-20-312,-1 0 1,1 0 0,-1 0 0,1-1 0,-1 1 0,1 0 0,-1 0 0,0 0 0,0 0 0,1-1 0,-1 1 0,0 0-1,0-1 1,0 1 0,0 0 0,0-1-29,1 0 7,-1 0 0,1 0 1,0 0-1,-1 0 0,1 0 0,0 0 0,-1 0 0,1 0 0,0 0 0,0 0 0,-1 0 0,1 0 1,0-1-1,-1 1 0,1 0 0,0 0 0,0 0 0,-1-1 0,1 1 0,0 0 0,0 0 0,-1 0 0,1-1 1,0 1-1,0 0 0,0-1 0,0 1 0,-1 0 0,1 0 0,0-1 0,0 1-7,-4-11 115,4 9-103,-1 1-8,-2-7 20,0-1-1,1 0 1,0 0-1,1 0 1,0 0-1,0 0 0,1 0 1,0-4-24,0 12-7,1-1 1,-1 1-1,1 0 1,-1-1-1,1 1 1,-1 0 0,1 0-1,0 0 1,0 0-1,0 0 1,0 0-1,0 0 1,0 0-1,0 0 1,0 0-1,0 0 1,0 0-1,0 1 1,0-1-1,1 1 1,-1-1-1,0 1 1,0-1-1,1 1 1,-1-1-1,0 1 1,2 0 6,4-1-7,-1 0 1,1 1-1,-1-1 0,1 1 1,1 1 6,40 5-104,-34-4 104,0 0-1,0 0 0,1-2 0,5 0 1,-27 5 126,-11 7-159,1 2 0,0-1 0,-1 4 33,17-16-1,0 0 0,0 0 0,1 0 0,-1 0 0,0 0 0,0 0 0,1 0 0,-1 0 0,1 0 0,-1 0 0,1 0 0,0 0 0,-1 1 0,1-1 0,0 0 0,0 0 0,-1 0 0,1 1 0,0-1 0,0 0 0,1 0 0,-1 0 0,0 1 1,0-1 0,1 0 0,0 0 0,-1 0 0,1 0-1,0 0 1,0 0 0,0 0 0,0 0 0,0 0 0,0-1 0,0 1-1,0 0 1,0-1 0,0 1 0,0 0 0,0-1 0,0 1-1,1-1 1,5 2-2,0 0 0,0 0-1,0-1 1,0 0-1,0-1 1,0 1-1,1-1 3,3-1 37,26 0 7,-34 0-28,-1 1 0,1-1 0,0 1 0,-1-1 0,1 0 0,-1 0 0,1 0-1,-1 0 1,1 0 0,-1 0 0,2-2-16,-3 2 3,-1 1 0,0-1 0,1 0 0,-1 1 0,1-1 0,-1 0 0,0 1-1,0-1 1,1 0 0,-1 0 0,0 1 0,0-1 0,0 0 0,0 0 0,0 0 0,0 1 0,0-1-1,0 0 1,0 0 0,0 1 0,0-1 0,0 0 0,-1 0 0,1 1 0,0-1 0,-1 0 0,1 1-1,0-1 1,-1 0-3,-14-23 380,10 17-236,3 4-107,-1-2-81,-1 0 0,1 0-1,-1 0 1,0 0 0,0 1 0,0 0 0,-2-1 44,4 4-549,0 5-80</inkml:trace>
@@ -1407,11 +1407,11 @@
   </inkml:definitions>
   <inkml:trace contextRef="#ctx0" brushRef="#br0">37 270 384,'4'15'7041,"-2"17"-4856,-3 13-962,-3-1 0,-1 1 0,-5 11-1223,2-4 571,1-20-339,5-22-416,0 1 0,0 0 0,0 8 184,4-15-346</inkml:trace>
   <inkml:trace contextRef="#ctx0" brushRef="#br0" timeOffset="359.677">36 315 3968,'0'-1'122,"-1"-1"0,2 1-1,-1 0 1,0-1 0,0 1 0,0-1 0,1 1 0,-1 0 0,0-1-1,1 1 1,0 0 0,-1-1 0,1 1 0,0 0 0,-1 0 0,1 0-1,1-1-121,0 0 238,1 0-1,0 0 1,0 0-1,-1 0 0,1 1 1,0-1-1,2 1-237,-1-1 479,1 0 0,0 1-1,0 0 1,0 0 0,0 0 0,-1 1 0,1 0-1,0 0 1,2 0-479,-1 0 98,-1 1 0,0-1 0,1 1 0,-1 0 0,1 1 1,-1-1-1,0 1 0,0 0 0,0 1 0,0-1 0,0 1 0,0 0 0,0 1-98,-3-3 33,-1 0 1,0 0 0,0 0-1,0 0 1,0 0-1,0 0 1,0 1-1,-1-1 1,1 0-1,0 1 1,0-1-1,-1 0 1,1 1-1,-1-1 1,0 1-1,1-1 1,-1 1 0,0-1-1,0 1 1,0-1-1,0 1 1,0-1-1,0 1 1,0-1-1,0 1 1,-1-1-1,1 1 1,-1-1-1,1 1 1,-1-1-1,1 0 1,-1 1-1,0-1 1,0 0 0,0 0-1,0 1 1,0-1-1,0 0 1,0 0-1,0 0-33,-5 5 44,1-1 0,-1 0 0,0 0-1,0-1 1,-1 0 0,1 0 0,-5 1-44,4-1-47,-1 0 1,-1 0-1,1-1 0,0-1 1,-1 1-1,1-2 0,-1 1 1,-5 0 46,10-4-480,6-1-224</inkml:trace>
-  <inkml:trace contextRef="#ctx0" brushRef="#br0" timeOffset="799.565">253 343 7040,'13'6'4791,"-9"-4"-4637,0 0 1,0 0-1,0 0 0,0 0 0,4 1-154,-5-3 1,1 0 1,-1 0-1,1-1 0,-1 1 0,1-1 0,-1 0 0,0 0 0,1 0 0,-1 0 0,0-1 1,0 1-1,0-1 0,0 0 0,0 0 0,0 0 0,0 0 0,-1 0 0,1-1 0,-1 1 1,1-1-1,-1 0 0,0 1 0,0-1 0,0-1-1,-2 4 9,1-1 0,-1 1 1,0-1-1,0 0 0,1 1 0,-1-1 1,0 0-1,0 1 0,0-1 0,0 0 1,0 1-1,0-1 0,0 0 1,0 1-1,0-1 0,0 0 0,0 1 1,-1-1-1,1 0 0,0 1 0,0-1 1,-1 0-1,1 1 0,0-1 0,-1 1 1,1-1-1,-1 0-9,0 0 18,0 1 0,0-1-1,0 0 1,0 0 0,0 1 0,-1-1 0,1 1 0,0-1 0,-1 1-1,1-1 1,0 1 0,-1 0 0,1 0-18,-5-1-41,0 1 0,0 0-1,1 0 1,-1 0 0,0 1 0,-1 0 41,4 0 24,0-1 0,1 1 1,-1 1-1,0-1 0,1 0 0,-1 1 1,1-1-1,-1 1 0,1 0 1,0-1-1,-1 1 0,1 0 1,0 1-1,0-1 0,1 0 0,-1 0 1,0 1-1,1-1 0,-1 1 1,1 0-1,0-1 0,0 1 1,0 0-1,0 0 0,0 2-24,0 1-4,0 0-1,0 0 1,1-1 0,0 1-1,0 0 1,0 0-1,1 0 1,0-1-1,0 1 1,0 0 0,1-1-1,2 6 5,-4-10-40,0-1-1,0 1 0,1 0 0,-1-1 1,0 1-1,1 0 0,-1-1 0,1 1 1,-1 0-1,1-1 0,-1 1 1,1-1-1,0 1 0,-1-1 0,1 1 1,0-1-1,-1 1 0,1-1 0,0 0 1,-1 1-1,1-1 0,0 0 41,10 1-458</inkml:trace>
+  <inkml:trace contextRef="#ctx0" brushRef="#br0" timeOffset="799.564">253 343 7040,'13'6'4791,"-9"-4"-4637,0 0 1,0 0-1,0 0 0,0 0 0,4 1-154,-5-3 1,1 0 1,-1 0-1,1-1 0,-1 1 0,1-1 0,-1 0 0,0 0 0,1 0 0,-1 0 0,0-1 1,0 1-1,0-1 0,0 0 0,0 0 0,0 0 0,0 0 0,-1 0 0,1-1 0,-1 1 1,1-1-1,-1 0 0,0 1 0,0-1 0,0-1-1,-2 4 9,1-1 0,-1 1 1,0-1-1,0 0 0,1 1 0,-1-1 1,0 0-1,0 1 0,0-1 0,0 0 1,0 1-1,0-1 0,0 0 1,0 1-1,0-1 0,0 0 0,0 1 1,-1-1-1,1 0 0,0 1 0,0-1 1,-1 0-1,1 1 0,0-1 0,-1 1 1,1-1-1,-1 0-9,0 0 18,0 1 0,0-1-1,0 0 1,0 0 0,0 1 0,-1-1 0,1 1 0,0-1 0,-1 1-1,1-1 1,0 1 0,-1 0 0,1 0-18,-5-1-41,0 1 0,0 0-1,1 0 1,-1 0 0,0 1 0,-1 0 41,4 0 24,0-1 0,1 1 1,-1 1-1,0-1 0,1 0 0,-1 1 1,1-1-1,-1 1 0,1 0 1,0-1-1,-1 1 0,1 0 1,0 1-1,0-1 0,1 0 0,-1 0 1,0 1-1,1-1 0,-1 1 1,1 0-1,0-1 0,0 1 1,0 0-1,0 0 0,0 2-24,0 1-4,0 0-1,0 0 1,1-1 0,0 1-1,0 0 1,0 0-1,1 0 1,0-1-1,0 1 1,0 0 0,1-1-1,2 6 5,-4-10-40,0-1-1,0 1 0,1 0 0,-1-1 1,0 1-1,1 0 0,-1-1 0,1 1 1,-1 0-1,1-1 0,-1 1 1,1-1-1,0 1 0,-1-1 0,1 1 1,0-1-1,-1 1 0,1-1 0,0 0 1,-1 1-1,1-1 0,0 0 41,10 1-458</inkml:trace>
   <inkml:trace contextRef="#ctx0" brushRef="#br0" timeOffset="1174.904">435 301 4864,'5'10'5980,"2"17"-4203,-2-7-1257,-5-20-493,1 4 117,-1-1 0,1 0 0,1 0 0,-1 0 0,0 0 0,1 0 0,-1-1 0,1 1 0,0 0 0,0-1 0,0 1 0,1 0-144,-2-3 14,-1 0 1,1 0-1,-1 0 1,1 0-1,-1 0 1,1-1-1,-1 1 1,0 0-1,1 0 1,-1-1 0,1 1-1,-1 0 1,0 0-1,1-1 1,-1 1-1,0 0 1,0-1-1,1 1 1,-1-1 0,0 1-1,0 0 1,1-1-1,-1 1 1,0-1-1,0 1 1,0-1-1,0 1 1,1 0-1,-1-1-14,6-17-145,-6 16 231,1-2-186,0 1-1,0 0 1,1-1-1,-1 1 1,0 0 0,1 0-1,0 0 1,0 0-1,0 0 1,0 0-1,0 1 1,1-1-1,-1 1 1,1-1 0,0 1-1,-1 0 1,1 0-1,3-1 101,5-1-362</inkml:trace>
   <inkml:trace contextRef="#ctx0" brushRef="#br0" timeOffset="1515.072">661 275 6784,'-7'-1'422,"1"0"1,-1 0-1,0 1 1,1 0-1,-1 0 1,0 1-1,1 0 1,-1 0-1,0 0 0,1 1 1,-1 0-1,1 0 1,0 1-1,-2 0-422,8-3 5,-1 1-1,1-1 0,-1 0 0,1 1 0,-1-1 1,1 0-1,0 1 0,-1-1 0,1 1 1,0-1-1,-1 1 0,1-1 0,0 1 1,-1-1-1,1 1 0,0-1 0,0 1 1,0-1-1,0 1 0,-1-1 0,1 1 0,0 0 1,0-1-1,0 1 0,0-1 0,0 1 1,0 0-1,0-1 0,1 1 0,-1-1 1,0 1-1,0-1 0,0 1 0,1-1 1,-1 1-1,0-1 0,0 1 0,1-1 1,-1 1-1,0-1 0,1 1 0,-1-1 0,1 1-4,3 3 12,0 0-1,0 0 1,0-1-1,4 3-11,-1 0 12,-3-3 0,25 27 242,-27-28-258,0 0-1,-1 0 1,1 0-1,-1 0 1,1 1-1,-1-1 1,0 0-1,0 1 1,0-1-1,0 1 1,-1-1-1,1 1 0,-1 0 1,1 0 4,-1-2 21,-1 0 0,1 0-1,0 0 1,0-1 0,-1 1 0,1 0 0,-1 0 0,1 0 0,-1 0-1,1 0 1,-1 0 0,1-1 0,-1 1 0,0 0 0,1 0-1,-1-1 1,0 1 0,0 0 0,1-1 0,-1 1 0,0-1-1,0 1 1,0-1 0,0 0 0,0 1 0,0-1 0,0 0 0,0 1-1,0-1 1,0 0-21,-5 1 16,0 0 0,0 0-1,0-1 1,-3 0-16,1-1-677,5-3-2043</inkml:trace>
-  <inkml:trace contextRef="#ctx0" brushRef="#br0" timeOffset="1881.103">792 307 5120,'-2'0'126,"1"0"1,0 0-1,0 0 1,0 1-1,0-1 1,-1 0-1,1 1 1,0-1-1,0 1 1,0-1-1,0 1 1,0 0-1,0-1 1,0 1-1,0 0 1,0 0 0,1-1-1,-1 1 1,0 0-1,0 0 1,1 0-1,-1 0 1,0 0-1,1 1-126,-2 0 250,0 1 0,1 0 0,-1-1 0,1 1-1,0 0 1,0 0 0,0 0 0,0 0 0,0 2-250,1-2 90,0 0 0,0 0-1,1 0 1,-1 0 0,1 1 0,0-1-1,0 0 1,0-1 0,0 1 0,1 0 0,-1 0-1,1 0 1,0-1 0,-1 1 0,1-1-1,0 1 1,1-1 0,-1 0 0,0 0 0,1 0-1,-1 0 1,1 0 0,1 0-90,-3-1 12,1 0 1,0 0-1,0 0 1,0 0-1,-1-1 0,1 1 1,0-1-1,0 1 1,0-1-1,0 0 0,0 1 1,0-1-1,0 0 1,0 0-1,0-1 1,0 1-1,0 0 0,0-1 1,0 1-1,0-1 1,0 0-1,0 1 1,0-1-1,-1 0 0,1 0 1,0 0-1,0 0 1,-1-1-1,1 1 0,-1 0 1,1-1-1,-1 1 1,0-1-1,0 1 1,1-1-1,-1-1-12,1 1 6,-1 0-1,0-1 1,0 1-1,0-1 1,0 0-1,0 1 1,0-1 0,-1 0-1,1 1 1,-1-1-1,0 0 1,0 0 0,0 1-1,0-1 1,0 0-1,0 0 1,-1 1-1,1-1 1,-1 0 0,0 1-1,0-1 1,0 0-1,0 1 1,-1-1-6,1 1-15,-1 0-1,1 0 1,0 0 0,-1 0 0,0 0-1,1 1 1,-1-1 0,0 1 0,0-1-1,0 1 1,0-1 0,0 1 0,0 0-1,0 0 1,0 0 0,0 0-1,-1 1 1,1-1 0,0 1 0,-1-1-1,1 1 1,0 0 0,-1 0 0,1 0-1,0 0 1,-1 0 0,1 0 0,-1 1 15,-7 1-400</inkml:trace>
-  <inkml:trace contextRef="#ctx0" brushRef="#br0" timeOffset="2280.206">904 305 3968,'1'0'201,"0"0"-1,0 0 1,0 1 0,0-1 0,0 0 0,0 1-1,0-1 1,0 0 0,0 1 0,0-1 0,-1 1-1,1-1 1,0 1 0,0 0 0,0-1 0,-1 1-1,1 0 1,0 0 0,-1-1 0,1 1-1,-1 0 1,1 0 0,-1 0 0,1 0 0,-1 0-1,0 0 1,1 0 0,-1 0 0,0 0 0,0 0-1,1 0 1,-1 0 0,0 0-201,1 7 712,-1 0 0,0 0-1,0 0 1,-1 2-712,1 3 196,0-12-181,1 16 558,3-14-376,3-10 10,11-21-160,-14 21-210,1-1 0,0 1 0,0 0 0,0 0 0,5-3 163,-10 9 0,0 1 0,0 0 0,1 0 0,-1-1 0,0 1 0,1 0 0,-1 0 0,0 0 0,1-1 0,-1 1 0,0 0 0,1 0 0,-1 0 0,0 0 0,1 0 0,-1 0 0,0 0 0,1 0 0,-1 0 0,0 0 0,1 0 0,-1 0 0,0 0 0,1 0 0,-1 0 0,0 0 0,1 0 0,-1 0 0,0 1 0,1-1 0,-1 0 0,0 0 0,1 0 0,-1 0 0,0 1 0,1-1 0,-1 0 0,0 0 0,0 1 0,0-1 0,1 0 0,-1 1 0,0-1 0,0 0 0,0 1 0,1-1 0,-1 0 0,0 1 0,8 20 150,-6-14-124,-2-7-28,18 39 119,-17-37-161,0 0 0,0 0 0,0-1 0,0 1 1,1 0-1,-1 0 0,1-1 0,0 1 0,-1-1 0,1 1 0,0-1 1,0 0-1,0 1 0,0-1 0,0 0 0,2 0 44,5 0-650</inkml:trace>
+  <inkml:trace contextRef="#ctx0" brushRef="#br0" timeOffset="1881.102">792 307 5120,'-2'0'126,"1"0"1,0 0-1,0 0 1,0 1-1,0-1 1,-1 0-1,1 1 1,0-1-1,0 1 1,0-1-1,0 1 1,0 0-1,0-1 1,0 1-1,0 0 1,0 0 0,1-1-1,-1 1 1,0 0-1,0 0 1,1 0-1,-1 0 1,0 0-1,1 1-126,-2 0 250,0 1 0,1 0 0,-1-1 0,1 1-1,0 0 1,0 0 0,0 0 0,0 0 0,0 2-250,1-2 90,0 0 0,0 0-1,1 0 1,-1 0 0,1 1 0,0-1-1,0 0 1,0-1 0,0 1 0,1 0 0,-1 0-1,1 0 1,0-1 0,-1 1 0,1-1-1,0 1 1,1-1 0,-1 0 0,0 0 0,1 0-1,-1 0 1,1 0 0,1 0-90,-3-1 12,1 0 1,0 0-1,0 0 1,0 0-1,-1-1 0,1 1 1,0-1-1,0 1 1,0-1-1,0 0 0,0 1 1,0-1-1,0 0 1,0 0-1,0-1 1,0 1-1,0 0 0,0-1 1,0 1-1,0-1 1,0 0-1,0 1 1,0-1-1,-1 0 0,1 0 1,0 0-1,0 0 1,-1-1-1,1 1 0,-1 0 1,1-1-1,-1 1 1,0-1-1,0 1 1,1-1-1,-1-1-12,1 1 6,-1 0-1,0-1 1,0 1-1,0-1 1,0 0-1,0 1 1,0-1 0,-1 0-1,1 1 1,-1-1-1,0 0 1,0 0 0,0 1-1,0-1 1,0 0-1,0 0 1,-1 1-1,1-1 1,-1 0 0,0 1-1,0-1 1,0 0-1,0 1 1,-1-1-6,1 1-15,-1 0-1,1 0 1,0 0 0,-1 0 0,0 0-1,1 1 1,-1-1 0,0 1 0,0-1-1,0 1 1,0-1 0,0 1 0,0 0-1,0 0 1,0 0 0,0 0-1,-1 1 1,1-1 0,0 1 0,-1-1-1,1 1 1,0 0 0,-1 0 0,1 0-1,0 0 1,-1 0 0,1 0 0,-1 1 15,-7 1-400</inkml:trace>
+  <inkml:trace contextRef="#ctx0" brushRef="#br0" timeOffset="2280.205">904 305 3968,'1'0'201,"0"0"-1,0 0 1,0 1 0,0-1 0,0 0 0,0 1-1,0-1 1,0 0 0,0 1 0,0-1 0,-1 1-1,1-1 1,0 1 0,0 0 0,0-1 0,-1 1-1,1 0 1,0 0 0,-1-1 0,1 1-1,-1 0 1,1 0 0,-1 0 0,1 0 0,-1 0-1,0 0 1,1 0 0,-1 0 0,0 0 0,0 0-1,1 0 1,-1 0 0,0 0-201,1 7 712,-1 0 0,0 0-1,0 0 1,-1 2-712,1 3 196,0-12-181,1 16 558,3-14-376,3-10 10,11-21-160,-14 21-210,1-1 0,0 1 0,0 0 0,0 0 0,5-3 163,-10 9 0,0 1 0,0 0 0,1 0 0,-1-1 0,0 1 0,1 0 0,-1 0 0,0 0 0,1-1 0,-1 1 0,0 0 0,1 0 0,-1 0 0,0 0 0,1 0 0,-1 0 0,0 0 0,1 0 0,-1 0 0,0 0 0,1 0 0,-1 0 0,0 0 0,1 0 0,-1 0 0,0 0 0,1 0 0,-1 0 0,0 1 0,1-1 0,-1 0 0,0 0 0,1 0 0,-1 0 0,0 1 0,1-1 0,-1 0 0,0 0 0,0 1 0,0-1 0,1 0 0,-1 1 0,0-1 0,0 0 0,0 1 0,1-1 0,-1 0 0,0 1 0,8 20 150,-6-14-124,-2-7-28,18 39 119,-17-37-161,0 0 0,0 0 0,0-1 0,0 1 1,1 0-1,-1 0 0,1-1 0,0 1 0,-1-1 0,1 1 0,0-1 1,0 0-1,0 1 0,0-1 0,0 0 0,2 0 44,5 0-650</inkml:trace>
   <inkml:trace contextRef="#ctx0" brushRef="#br0" timeOffset="2647.354">1119 311 4352,'0'1'220,"0"0"1,0-1-1,0 1 0,0 0 1,0 0-1,0 0 1,0 0-1,0-1 0,1 1 1,-1 0-1,0 0 0,1-1 1,-1 1-1,0 0 1,1-1-1,-1 1 0,1 0 1,-1-1-1,1 1 1,0 0-1,-1-1 0,1 1 1,0-1-1,-1 1 0,1-1 1,0 0-1,-1 1 1,1-1-1,0 0 0,0 1 1,-1-1-1,2 0-220,1 2 280,0-1 0,1 0 0,-1 0 1,1-1-1,-1 1 0,1-1 0,0 1-280,-1-1-21,0-1 0,0 1 0,0 0-1,0-1 1,0 0 0,0 0 0,-1 0 0,1 0 0,0 0 0,-1-1 0,1 1-1,-1-1 1,1 0 21,-2 2-10,-1-1 0,1 1 0,0-1 0,-1 1 0,1-1 0,-1 1 1,1-1-1,-1 0 0,0 1 0,1-1 0,-1 0 0,0 1 0,1-1 0,-1 0 0,0 0 0,0 1 0,1-1 0,-1 0 0,0 0 0,0 0 10,0 0-5,-1 0 0,1 0 1,0 0-1,-1 0 0,1 0 0,-1 0 0,1 0 0,-1 0 1,0 0-1,1 0 0,-1 0 0,0 0 0,0 0 1,1 1-1,-1-1 0,0 0 0,0 1 0,0-1 1,0 0 4,-1 0-7,-1-1 1,1 1 0,0 0 0,-1 0-1,1 0 1,-1 0 0,1 1-1,-1-1 1,0 0 0,1 1 0,-1 0-1,0 0 1,1 0 0,-1 0-1,0 0 1,1 0 0,-1 1 0,0-1-1,1 1 1,-1 0 0,1 0-1,-1 0 1,1 0 0,-2 1 6,1-1-5,1 1-1,-1-1 1,1 1 0,-1 0 0,1 0-1,0 0 1,0 0 0,0 0 0,0 1-1,0-1 1,0 0 0,1 1-1,-1 0 1,1-1 0,0 1 0,-1 0-1,1 0 1,1-1 0,-1 1 0,0 0-1,1 2 6,-1 1 34,2-1-1,-1 1 1,1 0-1,0 0 1,0-1-1,0 1 1,1-1-1,0 1 1,0-1-1,0 1 1,3 4-34,-3-7-17,0 1 0,0-1 1,1 0-1,-1 0 1,0 0-1,1 0 0,0 0 1,0 0-1,0-1 0,0 1 1,0-1-1,0 0 0,1 0 1,-1 0-1,1 0 0,0-1 1,3 2 16,10-3-331,0-6-154</inkml:trace>
   <inkml:trace contextRef="#ctx0" brushRef="#br0" timeOffset="3047.377">1378 4 7296,'-3'-4'1995,"2"5"-924,0 11-620,2-5-534,-5 115 2136,0-63-1242,4 0 0,4 39-811,4-24-587,-8-63 209</inkml:trace>
 </inkml:ink>
@@ -1443,14 +1443,14 @@
   </inkml:definitions>
   <inkml:trace contextRef="#ctx0" brushRef="#br0">241 39 2304,'9'23'6970,"-7"29"-5189,-3 1 0,-5 33-1781,-2 48-84,8-135 36</inkml:trace>
   <inkml:trace contextRef="#ctx0" brushRef="#br0" timeOffset="406.186">355 289 4992,'0'2'1920,"0"1"-1504,0 3 608,0-2 160,0 2-480,0 1-64,0 1-96,0 2-64,0 0-224,0 0-224,0 0-64,2-1 32,-1 0 0,1-3 0</inkml:trace>
-  <inkml:trace contextRef="#ctx0" brushRef="#br0" timeOffset="778.407">352 146 3840,'-8'-19'1472,"7"15"-1120,1 3 288,0 4 96,0 1-640,0 1-256,1 4-32,2 2 96,0 2-1568,4 2-704</inkml:trace>
+  <inkml:trace contextRef="#ctx0" brushRef="#br0" timeOffset="778.406">352 146 3840,'-8'-19'1472,"7"15"-1120,1 3 288,0 4 96,0 1-640,0 1-256,1 4-32,2 2 96,0 2-1568,4 2-704</inkml:trace>
   <inkml:trace contextRef="#ctx0" brushRef="#br0" timeOffset="1131.587">519 290 7040,'-1'-1'303,"0"-1"122,0 0 0,-1 0 0,1 1 0,-1-1 0,1 1 1,-1-1-1,1 1 0,-1 0 0,0-1-425,1 2 9,0 0 0,0 0 1,1-1-1,-1 1 1,0 0-1,0 0 1,1 0-1,-1 0 1,0 0-1,0 0 0,0 1 1,1-1-1,-1 0 1,0 0-1,0 0 1,1 1-1,-1-1 1,0 0-1,0 1 1,1-1-1,-1 1 0,0-1 1,1 1-1,-1-1 1,1 1-1,-1-1 1,0 1-10,-3 3-8,1 1 0,-1 0 0,0 0 0,1 0 0,0 0 0,0 0 1,1 0-1,-1 1 0,1-1 0,0 1 0,1 0 0,0 0 0,-1-1 0,2 1 1,-1 0-1,1 0 0,0 0 0,0 0 0,0 0 0,1 0 0,0 1 8,-1-7 17,0 0 0,0 1-1,0-1 1,0 0 0,1 1-1,-1-1 1,0 0 0,0 1-1,0-1 1,0 0 0,0 0-1,1 1 1,-1-1 0,0 0 0,0 1-1,0-1 1,1 0 0,-1 0-1,0 0 1,0 1 0,1-1-1,-1 0 1,0 0 0,0 0-1,1 0 1,-1 0 0,0 1-1,1-1 1,-1 0 0,0 0-1,1 0 1,-1 0 0,0 0-17,11-7 109,6-16-124,-16 21 96,29-49-396,-30 51 310,0 0 0,0 0 0,0 0 0,0 0 0,0 0 0,0 0 0,1-1 0,-1 1 0,0 0 1,0 0-1,0 0 0,0 0 0,0 0 0,0 0 0,0 0 0,0 0 0,0 0 0,0 0 0,0 0 0,1 0 0,-1 0 0,0-1 0,0 1 0,0 0 0,0 0 0,0 0 1,0 0-1,0 0 0,0 0 0,1 0 0,-1 0 0,0 0 0,0 0 0,0 0 0,0 0 0,0 0 0,0 0 0,0 0 0,0 0 0,1 0 0,-1 0 0,0 1 0,0-1 0,0 0 1,0 0-1,0 0 0,0 0 0,0 0 5,3 7-45,0 12 44,-3-16-63,6 50 54,-2 1-1,-2 0 0,-6 48 11,4-102-18,-1 7 97,0-1-1,0 1 0,0-1 1,-1 0-1,0 2-78,2-8 20,0 1 0,-1 0 1,1-1-1,0 1 0,0 0 0,-1-1 1,1 1-1,0-1 0,-1 1 0,1-1 0,-1 1 1,1 0-1,0-1 0,-1 0 0,1 1 1,-1-1-1,0 1 0,1-1 0,-1 0 0,1 1 1,-1-1-1,0 0 0,1 1 0,-1-1 1,1 0-1,-1 0 0,0 0 0,1 0 0,-1 1 1,0-1-1,0 0 0,1 0 0,-1 0 0,0-1 1,1 1-1,-1 0 0,0 0 0,1 0 1,-1 0-1,1-1 0,-1 1 0,0 0 0,1 0 1,-1-1-1,1 1 0,-1-1 0,0 1 1,1 0-1,-1-1 0,1 1 0,0-1 0,-1 1 1,1-1-21,-7-6 24,1 0 1,0 0-1,1-1 1,-1 1 0,1-1-1,1-1 1,0 1 0,0-1-1,1 1 1,0-1-1,0 0 1,1 0 0,-1-4-25,3 11-11,0 0 1,-1 0 0,1 0 0,0-1 0,0 1 0,1 0-1,-1 0 1,0-1 0,1 1 0,-1 0 0,1 0-1,0 0 1,0 0 0,0 0 0,0 0 0,0 0 0,0 0-1,0 0 1,1 0 0,-1 1 0,0-1 0,2-1 10,6-4-224</inkml:trace>
   <inkml:trace contextRef="#ctx0" brushRef="#br0" timeOffset="1631.386">586 0 4864,'0'3'517,"1"0"0,0-1 0,-1 1 0,1 0 0,0 0 1,0-1-1,1 2-517,4 10 1201,2 25-481,-2 1 0,-1-1 0,-2 21-720,0-24 421,-3-33-386,3 37 436,-2-1-1,-2 21-470,3-74 105,2 0-1,0-1 1,1-2-105,-2 9-161,0-1-1,1 0 1,0 1-1,0 0 1,0 0 0,1 0-1,4-4 162,-9 12-2,0 0-1,1 0 0,-1 0 1,0-1-1,0 1 1,0 0-1,1 0 0,-1 0 1,0 0-1,1-1 1,-1 1-1,0 0 0,0 0 1,1 0-1,-1 0 1,0 0-1,1 0 0,-1 0 1,0 0-1,0 0 1,1 0-1,-1 0 0,0 0 1,1 0-1,-1 0 1,0 0-1,0 0 0,1 0 1,-1 1-1,0-1 1,1 0-1,-1 0 0,0 0 1,0 0-1,1 0 1,-1 1-1,0-1 0,0 0 1,0 0-1,1 1 1,-1-1-1,0 0 0,0 0 1,0 1-1,0-1 0,0 0 1,1 0-1,-1 1 1,0-1-1,0 0 0,0 1 3,7 16 109,-7-15-202,25 97 152,-19-85 85</inkml:trace>
   <inkml:trace contextRef="#ctx0" brushRef="#br0" timeOffset="2115.253">830 17 6016,'-7'-7'1721,"7"7"-1690,0 0 0,-1-1 0,1 1 0,0 0 0,0 0 0,0 0 0,0 0 0,-1 0 0,1 0 0,0 0 0,0 0 0,0 0 0,0 0 0,-1 0 0,1 0 0,0 0 0,0 0 0,0 1 0,0-1 0,0 0 0,-1 0 0,1 0 0,0 0 0,0 0 0,0 0 0,0 0 0,0 0 0,0 0 0,-1 1 0,1-1 0,0 0 0,0 0 0,0 0-31,-1 2 47,0 0 1,1 0 0,-1 0 0,1 1-1,-1-1 1,1 0 0,0 0-1,0 0 1,0 1-48,0 37 898,1 0 0,3 0 0,1-1 0,3 5-898,4 33 61,-6-26 89,-18-97-2124,-3-2 1974,11 39 594,-2-11 286,6 19-872,-1 1 0,1 0 0,0-1-1,0 1 1,0-1 0,0 1 0,0-1 0,1 1 0,-1-1 0,0 1 0,0-1 0,0 1-1,0-1 1,0 1 0,1 0 0,-1-1 0,0 1 0,0-1 0,1 1 0,-1 0-1,0-1 1,1 1 0,-1 0 0,0-1 0,1 1 0,-1 0 0,0-1 0,1 1 0,-1 0-1,1 0 1,-1 0 0,1-1 0,-1 1 0,0 0 0,1 0 0,-1 0 0,1 0-8,59-5 138,-27 0-196</inkml:trace>
   <inkml:trace contextRef="#ctx0" brushRef="#br0" timeOffset="3016.55">1199 17 3712,'1'36'6037,"-5"67"-3672,0 22-1887,4-118-421,0 1 1,1-1 0,0 0 0,0 1-1,1-1 1,1 5-58,0-7-138</inkml:trace>
   <inkml:trace contextRef="#ctx0" brushRef="#br0" timeOffset="3408.035">1092 188 4480,'-5'1'1760,"7"1"-1376,2 2 608,1-1 160,3-1-448,3 3-128,3-1-224,4 0-64,1 2-160,2 0-32,0 2 32,-3 1 64,3-4 32</inkml:trace>
-  <inkml:trace contextRef="#ctx0" brushRef="#br0" timeOffset="3753.208">1375 236 5248,'-1'-1'80,"1"1"1,0-1-1,-1 0 1,1 0-1,-1 0 1,0 1-1,1-1 1,-1 0-1,0 0 1,1 1-1,-1-1 1,0 1-1,0-1 1,0 1-1,1-1 1,-1 1-1,0-1 1,0 1-1,0 0 0,0-1 1,0 1-1,0 0 1,0 0-1,0 0 1,0-1-1,0 1 1,0 0-1,0 1 1,0-1-1,0 0 1,1 0-1,-1 0 1,0 0-1,0 1 1,0-1-1,0 1 1,0-1-1,0 0 1,0 1-1,1-1 1,-1 1-1,0 0 1,0-1-1,0 1-80,-5 4 334,-1 0 0,1 0 0,1 0-1,-1 0 1,1 1 0,0 0 0,0 0 0,0 2-334,3-6 74,0 1 1,1 0-1,-1 0 1,1 0-1,0 0 1,0 0-1,0 0 1,0 0-1,0 0 0,1 1 1,-1-1-1,1 0 1,0 0-1,0 1 1,0-1-1,0 0 1,1 1-1,0-1 0,-1 0 1,2 3-75,-2-6 6,0 0 0,0 1 1,1-1-1,-1 0 0,0 1 0,0-1 0,0 0 1,0 1-1,1-1 0,-1 0 0,0 1 1,0-1-1,1 0 0,-1 0 0,0 1 0,0-1 1,1 0-1,-1 0 0,0 0 0,1 1 0,-1-1 1,0 0-1,1 0 0,-1 0 0,1 0 1,-1 0-1,0 0 0,1 0 0,-1 0 0,1 0-6,11-5-7,9-17-110,-19 20 135,0 0-82,0 0-1,0 0 1,0 0-1,-1 0 1,1-1-1,-1 1 1,1 0 0,-1-1-1,0 1 1,0-1-1,0 0 1,0 1 0,-1-2 64,-2 6-91,0 7 315,2-1-266,1 0 0,0 0-1,0 0 1,1 2 42,-1-6 3,0-1 0,0 1-1,0-1 1,0 0 0,1 0 0,0 0-1,-1 1 1,1-1 0,0-1 0,0 1-1,1 1-2,-3-4-46,1 0 0,-1 1-1,1-1 1,0 1 0,-1-1-1,1 0 1,-1 0-1,1 1 1,0-1 0,-1 0-1,1 0 1,-1 0 0,1 1-1,0-1 1,-1 0 0,1 0-1,0 0 1,-1 0-1,1 0 1,0 0 0,-1-1-1,1 1 1,0 0 0,-1 0-1,1 0 1,0-1 46,7-4-1957</inkml:trace>
-  <inkml:trace contextRef="#ctx0" brushRef="#br0" timeOffset="4164.907">1481 18 4992,'0'2'265,"-1"0"0,1 0 0,0 0-1,-1 0 1,1 0 0,0 0 0,0 1 0,0-1 0,1 0 0,-1 0 0,0 0 0,1 0 0,-1 0-1,1 0-264,2 11 958,-1 21 555,-1 0-1,-2 22-1512,0-39 218,-1 0 1,-1-1 0,0 1-1,-1-1 1,-1 0-1,-3 6-218,6-13 216,8-14-281,4-2-187,-4 3 130,1 1 1,-1 0-1,1 0 1,-1 1-1,1 0 1,1 0 121,-7 1-7,0 1 1,0 0 0,0-1-1,0 1 1,0 0 0,0 0 0,-1 0-1,1 0 1,0 0 0,0 0 0,0 0-1,0 0 1,0 1 0,0-1 0,0 0-1,0 0 1,0 1 0,0-1-1,0 1 1,0-1 0,0 1 0,-1-1-1,1 1 1,0 0 0,0-1 0,-1 1-1,1 0 1,0-1 0,-1 1 0,1 0-1,-1 0 1,1 0 0,-1 0-1,1 0 1,-1-1 0,1 1 0,-1 0-1,0 0 1,0 0 0,1 0 0,-1 0-1,0 0 1,0 0 0,0 0-1,0 0 1,0 0 0,-1 1 6,1 2 29,-1-1-1,1 1 1,-1-1 0,0 1-1,0-1 1,-1 0 0,1 1-1,-1-1 1,1 0 0,-1 0-1,0 0 1,0 0 0,-1 0-1,1 0 1,0-1 0,-1 1-1,0-1 1,1 0 0,-1 0-1,0 0 1,0 0 0,-1 0-1,1 0 1,0-1 0,0 0-1,-1 1 1,1-1 0,-1-1-1,1 1 1,-1 0 0,1-1-1,-3 0-28,6 0-43,-1 0 0,0 0 0,1 0 0,-1 0 0,1 0 0,-1 0-1,0-1 1,1 1 0,-1 0 0,1 0 0,-1-1 0,1 1 0,-1 0 0,1-1 0,-1 1-1,1-1 1,-1 1 0,1 0 0,-1-1 0,1 1 0,0-1 0,-1 1 0,1-1 0,0 0 43,-2-6-1360</inkml:trace>
+  <inkml:trace contextRef="#ctx0" brushRef="#br0" timeOffset="3753.207">1375 236 5248,'-1'-1'80,"1"1"1,0-1-1,-1 0 1,1 0-1,-1 0 1,0 1-1,1-1 1,-1 0-1,0 0 1,1 1-1,-1-1 1,0 1-1,0-1 1,0 1-1,1-1 1,-1 1-1,0-1 1,0 1-1,0 0 0,0-1 1,0 1-1,0 0 1,0 0-1,0 0 1,0-1-1,0 1 1,0 0-1,0 1 1,0-1-1,0 0 1,1 0-1,-1 0 1,0 0-1,0 1 1,0-1-1,0 1 1,0-1-1,0 0 1,0 1-1,1-1 1,-1 1-1,0 0 1,0-1-1,0 1-80,-5 4 334,-1 0 0,1 0 0,1 0-1,-1 0 1,1 1 0,0 0 0,0 0 0,0 2-334,3-6 74,0 1 1,1 0-1,-1 0 1,1 0-1,0 0 1,0 0-1,0 0 1,0 0-1,0 0 0,1 1 1,-1-1-1,1 0 1,0 0-1,0 1 1,0-1-1,0 0 1,1 1-1,0-1 0,-1 0 1,2 3-75,-2-6 6,0 0 0,0 1 1,1-1-1,-1 0 0,0 1 0,0-1 0,0 0 1,0 1-1,1-1 0,-1 0 0,0 1 1,0-1-1,1 0 0,-1 0 0,0 1 0,0-1 1,1 0-1,-1 0 0,0 0 0,1 1 0,-1-1 1,0 0-1,1 0 0,-1 0 0,1 0 1,-1 0-1,0 0 0,1 0 0,-1 0 0,1 0-6,11-5-7,9-17-110,-19 20 135,0 0-82,0 0-1,0 0 1,0 0-1,-1 0 1,1-1-1,-1 1 1,1 0 0,-1-1-1,0 1 1,0-1-1,0 0 1,0 1 0,-1-2 64,-2 6-91,0 7 315,2-1-266,1 0 0,0 0-1,0 0 1,1 2 42,-1-6 3,0-1 0,0 1-1,0-1 1,0 0 0,1 0 0,0 0-1,-1 1 1,1-1 0,0-1 0,0 1-1,1 1-2,-3-4-46,1 0 0,-1 1-1,1-1 1,0 1 0,-1-1-1,1 0 1,-1 0-1,1 1 1,0-1 0,-1 0-1,1 0 1,-1 0 0,1 1-1,0-1 1,-1 0 0,1 0-1,0 0 1,-1 0-1,1 0 1,0 0 0,-1-1-1,1 1 1,0 0 0,-1 0-1,1 0 1,0-1 46,7-4-1957</inkml:trace>
+  <inkml:trace contextRef="#ctx0" brushRef="#br0" timeOffset="4164.906">1481 18 4992,'0'2'265,"-1"0"0,1 0 0,0 0-1,-1 0 1,1 0 0,0 0 0,0 1 0,0-1 0,1 0 0,-1 0 0,0 0 0,1 0 0,-1 0-1,1 0-264,2 11 958,-1 21 555,-1 0-1,-2 22-1512,0-39 218,-1 0 1,-1-1 0,0 1-1,-1-1 1,-1 0-1,-3 6-218,6-13 216,8-14-281,4-2-187,-4 3 130,1 1 1,-1 0-1,1 0 1,-1 1-1,1 0 1,1 0 121,-7 1-7,0 1 1,0 0 0,0-1-1,0 1 1,0 0 0,0 0 0,-1 0-1,1 0 1,0 0 0,0 0 0,0 0-1,0 0 1,0 1 0,0-1 0,0 0-1,0 0 1,0 1 0,0-1-1,0 1 1,0-1 0,0 1 0,-1-1-1,1 1 1,0 0 0,0-1 0,-1 1-1,1 0 1,0-1 0,-1 1 0,1 0-1,-1 0 1,1 0 0,-1 0-1,1 0 1,-1-1 0,1 1 0,-1 0-1,0 0 1,0 0 0,1 0 0,-1 0-1,0 0 1,0 0 0,0 0-1,0 0 1,0 0 0,-1 1 6,1 2 29,-1-1-1,1 1 1,-1-1 0,0 1-1,0-1 1,-1 0 0,1 1-1,-1-1 1,1 0 0,-1 0-1,0 0 1,0 0 0,-1 0-1,1 0 1,0-1 0,-1 1-1,0-1 1,1 0 0,-1 0-1,0 0 1,0 0 0,-1 0-1,1 0 1,0-1 0,0 0-1,-1 1 1,1-1 0,-1-1-1,1 1 1,-1 0 0,1-1-1,-3 0-28,6 0-43,-1 0 0,0 0 0,1 0 0,-1 0 0,1 0 0,-1 0-1,0-1 1,1 1 0,-1 0 0,1 0 0,-1-1 0,1 1 0,-1 0 0,1-1 0,-1 1-1,1-1 1,-1 1 0,1 0 0,-1-1 0,1 1 0,0-1 0,-1 1 0,1-1 0,0 0 43,-2-6-1360</inkml:trace>
   <inkml:trace contextRef="#ctx0" brushRef="#br0" timeOffset="4540.28">1690 39 7168,'0'5'2720,"0"0"-2112,-2 7 256,0-4 0,0 9-320,-5 10 32,-1 4-288,0-1-32,1 1-128,-2-1-96,3 0 64,1-1-64,2-2-32,1-3-64,2-6-32,2-8-32,1-6 0</inkml:trace>
   <inkml:trace contextRef="#ctx0" brushRef="#br0" timeOffset="4928.085">1704 300 4736,'0'0'44,"0"0"1,0 0-1,-1 0 1,1 0-1,0-1 0,0 1 1,0 0-1,0 0 1,0 0-1,-1 0 1,1 0-1,0 0 0,0 0 1,0 0-1,0 1 1,-1-1-1,1 0 0,0 0 1,0 0-1,0 0 1,0 0-1,0 0 1,-1 0-1,1 0 0,0 0 1,0 0-1,0 0 1,0 1-1,0-1 1,0 0-1,-1 0 0,1 0 1,0 0-1,0 0 1,0 0-1,0 1 1,0-1-1,0 0 0,0 0 1,0 0-1,0 0 1,0 1-1,0-1 0,0 0 1,0 0-1,0 0 1,0 0-1,0 0 1,0 1-1,0-1 0,0 0 1,0 0-1,0 0 1,0 0-1,0 1 1,0-1-1,0 0 0,0 0 1,0 0-1,1 0-44,-1 1 125,0-1 0,0 1-1,0 0 1,1-1 0,-1 1-1,0-1 1,1 1 0,-1-1-1,0 1 1,1-1-1,-1 1 1,1-1 0,-1 0-1,0 1 1,1-1 0,-1 1-1,1-1 1,0 0 0,-1 0-1,1 1 1,-1-1 0,1 0-125,2 1 151,1-1 0,-1 0 0,0 0 1,1 0-1,-1-1 0,0 1 0,1-1 0,-1 0 1,0 0-1,0 0 0,1 0 0,-1 0 0,0-1 1,0 0-152,-1 1 7,0 0 0,1 0 1,-1 0-1,0-1 1,0 1-1,0-1 1,0 1-1,0-1 0,0 0 1,0 0-1,-1 0 1,1 0-1,-1 0 1,0 0-1,1-1 0,-1 1 1,0 0-1,0-2-7,-1 4 3,1 0 0,-1 0-1,0-1 1,0 1 0,0 0 0,0 0-1,0 0 1,0-1 0,0 1 0,0 0-1,0 0 1,0-1 0,0 1-1,0 0 1,0 0 0,0 0 0,-1-1-1,1 1 1,0 0 0,0 0 0,0 0-1,0 0 1,0-1 0,0 1-1,0 0 1,-1 0 0,1 0 0,0 0-1,0-1 1,0 1 0,0 0-1,0 0 1,-1 0 0,1 0 0,0 0-1,0 0 1,0 0 0,-1 0-3,-9 1-133,-12 10-176,19-10 327,1 0-5,-1 1-1,1-1 0,-1 1 0,1 0 0,-1 0 1,1 0-1,0 0 0,0 0 0,0 0 0,0 0 1,0 2-13,1-3 30,1 0 1,-1 0 0,1 0-1,0 0 1,-1 0 0,1 0-1,0 1 1,0-1 0,0 0-1,-1 0 1,1 0 0,1 0-1,-1 1 1,0-1 0,0 0-1,0 0 1,1 0 0,-1 0-1,0 0 1,1 1 0,-1-1 0,1 0-1,-1 0 1,1 0 0,0 0-1,-1 0 1,1 0 0,0-1-1,0 2-30,2 1 22,-1-1-1,1 1 0,-1 0 1,1-1-1,0 0 0,0 1 1,0-1-1,0-1 0,1 1 1,-1 0-1,0-1 0,1 1 1,-1-1-1,1 0 0,0 0 1,2 0-22,12-1-320</inkml:trace>
   <inkml:trace contextRef="#ctx0" brushRef="#br0" timeOffset="6037.713">15 240 5120,'-2'-8'2016,"4"5"-1568,-1 2-128,4 6 1376,0 4-1056,1 1 32,2 1-160,0 1-288,0-1 64,0 1 128,0 1-288,0 0-160,1 1 32,-1 0 32,-1-1 64,-1-6 96</inkml:trace>
@@ -1461,14 +1461,14 @@
   <inkml:trace contextRef="#ctx0" brushRef="#br0" timeOffset="8426.267">167 769 7296,'-6'-7'2816,"3"7"-2208,-2 2 0,4-1-128,-4 2-288,-2 1-32,-2 5 0,-2 2 32,-2 6-96,-1 2-256,-1 0-64,3-4 32,1 0 96,2-6-96</inkml:trace>
   <inkml:trace contextRef="#ctx0" brushRef="#br0" timeOffset="8785.492">50 841 5632,'7'2'2112,"-2"-2"-1664,5-3 448,-4 3 160,4-2-544,2 2-128,4 0-96,2 2-32,0 1-128,-3-2-160,-3 2-64</inkml:trace>
   <inkml:trace contextRef="#ctx0" brushRef="#br0" timeOffset="9729.929">377 663 2944,'5'59'8154,"-3"-41"-7471,-1 0-1,0 0 1,-2 2-683,-1 6 569,-6 18-569,4-23 258,33-45-562,-26 22 290,-1 0 1,1 0-1,0 1 0,0-1 1,0 1-1,0 0 1,0 0-1,0 0 0,1 0 1,-1 1-1,0-1 1,0 1-1,1 0 0,-1 0 1,0 0-1,0 0 1,1 0-1,-1 1 0,0-1 1,0 1-1,1 0 14,-2 0-6,0 0 0,0 0 0,0 0 0,0 0 0,0 0 0,0 0 0,0 1-1,0-1 1,-1 1 0,1-1 0,-1 1 0,1 0 0,-1-1 0,1 1 0,-1 0 0,0 0 0,0 0-1,0 0 1,0 0 0,0 0 0,0 0 0,-1 0 0,1 1 0,-1-1 0,1 0 0,-1 0 0,0 1 0,0-1-1,0 0 1,0 0 0,0 1 6,-1-1 27,1 0 0,-1 0 0,0 0 0,1 0-1,-1 1 1,0-1 0,0 0 0,0-1 0,-1 1-1,1 0 1,0 0 0,-1 0 0,1-1 0,-1 1 0,1-1-1,-1 1 1,0-1 0,0 0 0,0 1 0,0-1-1,0 0 1,0 0 0,0 0 0,0-1 0,-1 1-27,-2 1 38,1-1 0,-1 0 0,0 0 0,1 0 0,-1 0-1,0-1 1,0 0 0,0 0 0,1 0 0,-1-1 0,-4 0-38,-1-4-117,4-5-64</inkml:trace>
-  <inkml:trace contextRef="#ctx0" brushRef="#br0" timeOffset="10354.858">549 879 384,'1'2'414,"-1"0"1,1 0-1,0 0 0,0 0 1,0-1-1,0 1 1,0 0-1,1-1 0,-1 1 1,0-1-1,1 1 0,-1-1 1,1 0-1,0 0 0,-1 1 1,1-1-1,1 0-414,-2-1 313,0 1-1,0-1 1,0 0-1,0 0 1,0 0-1,0 0 1,0 0-1,1 0 1,-1 0-1,0 0 1,0 0-1,0 0 1,0-1-1,0 1 1,0 0 0,1-1-313,12-9-45,-12 9 74,0-1 1,-1 0-1,1 0 1,-1 0-1,1 0 1,-1 0-1,0-1 1,0 1-1,0 0 1,0 0-1,0-1 1,0 1-1,-1-1 1,1 1-1,-1-1 1,0 1-1,0-2-29,0 3-4,0-1 1,0 1-1,0-1 0,0 1 0,0-1 0,-1 1 0,1-1 0,0 1 0,-1 0 1,1-1-1,-1 1 0,0 0 0,0-1 0,1 1 0,-1 0 0,0 0 0,0 0 1,0-1-1,0 1 0,0 0 0,0 0 0,-1 1 0,1-1 0,0 0 0,0 0 1,-1 0-1,1 1 0,0-1 0,-2 0 4,2 1-3,0 0 0,0 0 0,-1 0 0,1 0 0,0 0 0,0 0 1,0 0-1,0 1 0,-1-1 0,1 0 0,0 1 0,0-1 0,0 1 0,0-1 0,0 1 0,0-1 0,0 1 0,0 0 0,0 0 1,0-1-1,0 1 0,1 0 0,-1 0 0,0 0 0,0 0 0,1 0 0,-1 0 0,1 0 0,-1 0 0,1 0 0,-1 1 3,-1 2-1,0 1-1,0-1 1,0 1-1,1 0 1,0 0-1,-1 0 1,2 0 1,-1 2 20,1-1 1,0 1 0,0 0 0,0 0 0,1-1 0,0 1 0,1 0 0,1 3-21,-3-8-22,1 0-1,-1 0 1,1 0 0,0 0 0,0 0 0,0 0 0,0 0-1,1 0 1,-1-1 0,0 1 0,1 0 0,-1-1 0,1 1-1,-1-1 1,1 0 0,0 1 0,0-1 0,0 0 0,0 0 0,0 0-1,0 0 1,0 0 0,0-1 0,0 1 0,0-1 0,0 1-1,0-1 1,0 0 22,12-1-2682</inkml:trace>
+  <inkml:trace contextRef="#ctx0" brushRef="#br0" timeOffset="10354.857">549 879 384,'1'2'414,"-1"0"1,1 0-1,0 0 0,0 0 1,0-1-1,0 1 1,0 0-1,1-1 0,-1 1 1,0-1-1,1 1 0,-1-1 1,1 0-1,0 0 0,-1 1 1,1-1-1,1 0-414,-2-1 313,0 1-1,0-1 1,0 0-1,0 0 1,0 0-1,0 0 1,0 0-1,1 0 1,-1 0-1,0 0 1,0 0-1,0 0 1,0-1-1,0 1 1,0 0 0,1-1-313,12-9-45,-12 9 74,0-1 1,-1 0-1,1 0 1,-1 0-1,1 0 1,-1 0-1,0-1 1,0 1-1,0 0 1,0 0-1,0-1 1,0 1-1,-1-1 1,1 1-1,-1-1 1,0 1-1,0-2-29,0 3-4,0-1 1,0 1-1,0-1 0,0 1 0,0-1 0,-1 1 0,1-1 0,0 1 0,-1 0 1,1-1-1,-1 1 0,0 0 0,0-1 0,1 1 0,-1 0 0,0 0 0,0 0 1,0-1-1,0 1 0,0 0 0,0 0 0,-1 1 0,1-1 0,0 0 0,0 0 1,-1 0-1,1 1 0,0-1 0,-2 0 4,2 1-3,0 0 0,0 0 0,-1 0 0,1 0 0,0 0 0,0 0 1,0 0-1,0 1 0,-1-1 0,1 0 0,0 1 0,0-1 0,0 1 0,0-1 0,0 1 0,0-1 0,0 1 0,0 0 0,0 0 1,0-1-1,0 1 0,1 0 0,-1 0 0,0 0 0,0 0 0,1 0 0,-1 0 0,1 0 0,-1 0 0,1 0 0,-1 1 3,-1 2-1,0 1-1,0-1 1,0 1-1,1 0 1,0 0-1,-1 0 1,2 0 1,-1 2 20,1-1 1,0 1 0,0 0 0,0 0 0,1-1 0,0 1 0,1 0 0,1 3-21,-3-8-22,1 0-1,-1 0 1,1 0 0,0 0 0,0 0 0,0 0 0,0 0-1,1 0 1,-1-1 0,0 1 0,1 0 0,-1-1 0,1 1-1,-1-1 1,1 0 0,0 1 0,0-1 0,0 0 0,0 0 0,0 0-1,0 0 1,0 0 0,0-1 0,0 1 0,0-1 0,0 1-1,0-1 1,0 0 22,12-1-2682</inkml:trace>
   <inkml:trace contextRef="#ctx0" brushRef="#br0" timeOffset="11397.891">756 837 4224,'-1'0'206,"0"-1"1,0 1-1,0 0 1,0 0-1,0 0 1,0 0-1,0 0 0,-1 0 1,1 0-1,0 0 1,0 0-1,0 0 1,0 0-1,0 1 1,0-1-1,0 0 0,0 1 1,0-1-1,0 1 1,0-1-1,0 1 1,1-1-1,-1 1 1,0 0-1,0-1 0,0 1 1,1 0-1,-1 0 1,0 0-1,1 0 1,-1 0-207,-5 6 168,1 0 0,0 1 0,-2 3-168,6-8 66,-1 1-13,-1 0 0,1 1-1,0 0 1,1-1 0,-1 1-1,1 0 1,0 0-1,0 0 1,0 4-53,1-8 24,0 0 0,0 0-1,0 1 1,0-1 0,0 0-1,0 0 1,1 0 0,-1 0 0,0 1-1,1-1 1,-1 0 0,1 0-1,-1 0 1,1 0 0,-1 0-1,1 0 1,0 0 0,-1 0 0,1-1-1,0 1 1,0 0 0,0 0-1,0 0 1,0-1 0,0 1 0,0-1-1,0 1 1,0-1 0,0 1-1,0-1 1,0 1 0,0-1 0,0 0-1,0 0 1,1 1 0,-1-1-1,0 0 1,0 0 0,0 0 0,0 0-1,1-1 1,-1 1 0,0 0-24,2 0-15,-1-1 0,0 1 0,0-1 0,0 1 0,0-1 1,0 0-1,0 1 0,0-1 0,0 0 0,0-1 0,0 1 1,0 0-1,0 0 0,-1-1 0,1 1 0,-1-1 0,1 1 1,-1-1-1,1 0 0,-1 0 0,0 0 0,1-1 15,0-2-60,0 1-1,0 0 0,-1-1 0,1 0 1,-1 1-1,0-1 0,0 0 1,-1 1-1,0-1 0,0-1 61,0 0-227,-1 11 90,0 12 37,1-14 213,1 1 0,-1 0-1,1 0 1,0 0 0,0-1-1,1 1 1,-1 0 0,1-1-1,-1 1 1,2 0-113,-3-4 33,1 1 0,-1 0-1,1-1 1,-1 1 0,1 0 0,0-1-1,-1 1 1,1-1 0,0 1 0,0-1-1,-1 1 1,1-1 0,0 1 0,0-1-1,0 0 1,-1 1 0,1-1-1,0 0 1,0 0-33,0 0 18,1 0 0,-1 0 0,0 0-1,0-1 1,0 1 0,0 0 0,0-1 0,0 1-1,0-1 1,0 1 0,0-1 0,0 1 0,0-1-1,0 0 1,0 0 0,0 1 0,0-1 0,0-1-18,6-5 164,-6 5-247,1-1 1,0 1-1,0 0 0,0 0 1,0 0-1,1 0 1,-1 0-1,0 0 1,1 1-1,-1-1 1,1 1-1,2-1 83,-4 3 29,1 0 0,-1 1-1,0-1 1,1 1 0,-1 0 0,0-1 0,0 1-1,0 0 1,0 0 0,-1-1 0,1 1 0,0 0-29,1 4 11,-1-5 41,0 1 0,0 0 0,0-1 0,0 1 0,0-1 0,0 0 0,0 1 0,0-1 0,1 0 0,-1 0 0,1 1 0,-1-1 0,1 0 0,0 0-52,-2-1 2,1 0-1,0 0 0,0 0 1,0 0-1,0 0 0,0 0 1,0 0-1,-1 0 0,1 0 1,0 0-1,0-1 0,0 1 1,0 0-1,0 0 0,-1-1 1,1 1-1,0-1 0,0 1 1,-1-1-1,1 1 0,0-1 1,-1 1-1,1-1 0,0 0 1,-1 1-1,1-1 0,-1 0 1,1 1-1,-1-1 0,1 0-1,21-33-358,-17 25-94,1 0 0,0 1 0,0 0 0,1 0 0,6-5 452,-13 12 4,0 1 1,0 0-1,0 0 1,1 0-1,-1 0 1,0-1-1,0 1 1,0 0-1,1 0 1,-1 0-1,0 0 1,0 0-1,1 0 1,-1 0-1,0 0 1,0 0 0,1 0-1,-1 0 1,0 0-1,0 0 1,1 0-1,-1 0 1,0 0-1,0 0 1,1 0-1,-1 0 1,0 0-1,0 0 1,0 0-1,1 0 1,-1 0-1,0 1 1,0-1-5,6 9 307,2 16 482,-7-21-605,0 2 75,7 19 571,-8-24-809,0 0 1,1 0 0,-1 0-1,1 0 1,-1 0-1,1 1 1,0-2-1,-1 1 1,1 0 0,0 0-1,0 0 1,-1 0-1,1 0 1,0 0 0,0-1-1,0 1 1,0 0-1,0-1-21,0 0 10,-1 0 1,1 0-1,-1 0 0,0 0 0,1 0 1,-1 0-1,1 0 0,-1 0 0,1 0 0,-1 0 1,0 0-1,1-1 0,-1 1 0,1 0 0,-1 0 1,0 0-1,1-1 0,-1 1 0,0 0 0,1 0 1,-1-1-1,0 1 0,1 0 0,-1-1 1,0 1-1,0 0 0,0-1 0,1 1 0,-1-1 1,0 1-1,0 0 0,0-1 0,0 1 0,1-1 1,-1 1-11,4-17-56,-4 15 53,2-8-73,-1 1-25,1 0-1,0 0 1,0 1 0,1-1 0,0 1 0,2-5 101,5 34 91,27 52-672,-29-59-2539</inkml:trace>
   <inkml:trace contextRef="#ctx0" brushRef="#br0" timeOffset="20976.837">1453 796 3712,'-2'-1'398,"0"0"1,-1 0 0,1 1-1,0-1 1,-1 1-1,1 0 1,-1-1 0,1 1-1,0 0 1,-1 0-1,1 1 1,-1-1-1,1 0 1,-1 1-399,-1 0 145,0 0 0,1 1 0,-1-1 0,1 1 0,-1 0 0,1 0 0,0 0 1,0 0-1,-1 1-145,1-1 0,0 1 0,0 0-1,1 0 1,-1 0 0,0 0 0,1 0 0,0 0 0,0 1 0,0-1 0,0 1 0,0-1 0,1 1 0,0 0 0,0 0 0,0 0 0,0 0 0,0 0 0,1 0 0,0-2 15,0 0-1,0 0 1,0 0 0,0 0-1,1 0 1,-1 0 0,1 0-1,0-1 1,-1 1-1,1 0 1,0 0 0,0-1-1,0 1 1,0-1 0,0 1-1,1 0-14,2 2 15,0-1-1,0 0 1,0 0-1,0 0 1,1 1-15,16 11 290,-21-15-277,1 0-1,-1 0 1,0 0-1,0 0 0,0 0 1,0 0-1,0 0 1,0 1-1,0-1 0,0 0 1,0 0-1,0 0 1,0 0-1,0 0 0,0 0 1,0 1-1,0-1 1,0 0-1,0 0 0,0 0 1,0 0-1,0 0 1,0 0-1,0 0 0,0 1 1,0-1-1,0 0 1,0 0-1,0 0 0,0 0 1,0 0-1,0 0 1,0 1-1,0-1 1,0 0-1,0 0 0,0 0 1,0 0-1,-1 0 1,1 0-13,-7 5 248,-12 2-116,14-5-70,-10 6 7,12-5-85,0-1 0,-1 0 0,1-1 0,-1 1 0,0-1 0,1 1 0,-2-1 16,6-3-1050</inkml:trace>
   <inkml:trace contextRef="#ctx0" brushRef="#br0" timeOffset="21340.022">1526 834 3200,'-2'10'1216,"4"-3"-928,-4 10 320,2-8 160,-1 3 704,-1 4 352,-1 3-704,-2-1-224,-1 0-544,-4 2-448,3 1-96,-3 1 128,0 1 192,1-3-64,-1-4-32,1-6-1408,1-6-608</inkml:trace>
   <inkml:trace contextRef="#ctx0" brushRef="#br0" timeOffset="21696.687">1531 805 5376,'0'-1'209,"1"1"0,0 0 1,0 0-1,0-1 0,0 1 1,-1 0-1,1 0 0,0 0 0,0 0 1,0 0-1,0 0 0,-1 0 1,1 0-1,0 1 0,0-1 0,0 0 1,0 0-1,-1 1 0,1-1 1,0 1-1,0-1 0,-1 0-209,3 2 184,-1-1 0,0 1 0,-1 0 0,1 0 0,0 0 1,0-1-1,-1 1 0,1 1-184,2 3 132,-1-1 1,0 1 0,0 0 0,0 1 0,1 4-133,-4-8 26,1 1 0,-1-1 0,-1 0 0,1 0 0,0 0 0,-1 1 0,0-1-1,0 0 1,0 0 0,0 0 0,0 0 0,0 0 0,-1-1 0,1 1 0,-1 0 0,0-1 0,0 1 0,0-1 0,0 1 0,0-1 0,-1 0 0,0 1-26,-7 2-304</inkml:trace>
-  <inkml:trace contextRef="#ctx0" brushRef="#br0" timeOffset="22057.609">1720 593 5376,'0'0'142,"0"0"1,0 0 0,0 0-1,0 0 1,0 0 0,0 0-1,0 0 1,0 0 0,0 0-1,0 0 1,0 0 0,0 0-1,0 0 1,1 0 0,-1 0-1,0 0 1,0 0 0,0 0-1,0 0 1,0 0 0,0 0-1,0 0 1,0 0 0,0 0-1,0 0 1,0 0 0,0 0-1,0 0 1,0 0 0,0 0-143,3 9 1164,1 16-976,-4 12 130,-2-1 0,-1 0 0,-1 1 1,-3-1-1,0-1 0,-13 32-318,16-50-309</inkml:trace>
+  <inkml:trace contextRef="#ctx0" brushRef="#br0" timeOffset="22057.608">1720 593 5376,'0'0'142,"0"0"1,0 0 0,0 0-1,0 0 1,0 0 0,0 0-1,0 0 1,0 0 0,0 0-1,0 0 1,0 0 0,0 0-1,0 0 1,1 0 0,-1 0-1,0 0 1,0 0 0,0 0-1,0 0 1,0 0 0,0 0-1,0 0 1,0 0 0,0 0-1,0 0 1,0 0 0,0 0-1,0 0 1,0 0 0,0 0-143,3 9 1164,1 16-976,-4 12 130,-2-1 0,-1 0 0,-1 1 1,-3-1-1,0-1 0,-13 32-318,16-50-309</inkml:trace>
   <inkml:trace contextRef="#ctx0" brushRef="#br0" timeOffset="22401.146">1785 796 6656,'-2'0'2528,"2"4"-1952,0 5-320,0-4-192,0 2-128,0 2 96,2 1 192,-2 1 192,0 0-224,0 2 32,0-2 0,-2 1-96,1-4-96,1-2 0,0-6-32</inkml:trace>
-  <inkml:trace contextRef="#ctx0" brushRef="#br0" timeOffset="23751.115">1920 662 4480,'1'-1'188,"-1"0"0,0-1 0,0 1-1,1 0 1,-1 0 0,0 0 0,1 0 0,-1-1 0,1 1 0,0 0 0,-1 0 0,1 0 0,0 0 0,0 1-1,-1-1 1,1 0 0,0 0 0,0 0 0,1 0-188,3-4 1982,-7 29-78,-2-3-1228,0 0 1,-3 4-677,1-5 313,1 0-1,0 13-312,2-4 50,2-11-320,-2-1 0,-2 12 270,4-24-432</inkml:trace>
+  <inkml:trace contextRef="#ctx0" brushRef="#br0" timeOffset="23751.114">1920 662 4480,'1'-1'188,"-1"0"0,0-1 0,0 1-1,1 0 1,-1 0 0,0 0 0,1 0 0,-1-1 0,1 1 0,0 0 0,-1 0 0,1 0 0,0 0 0,0 1-1,-1-1 1,1 0 0,0 0 0,0 0 0,1 0-188,3-4 1982,-7 29-78,-2-3-1228,0 0 1,-3 4-677,1-5 313,1 0-1,0 13-312,2-4 50,2-11-320,-2-1 0,-2 12 270,4-24-432</inkml:trace>
   <inkml:trace contextRef="#ctx0" brushRef="#br0" timeOffset="24119.548">2013 622 4864,'-2'13'1824,"2"-2"-1408,0 5 736,2-7 192,-2 4-352,0 3-128,0-1-480,0 4-160,-2 2-160,1 5 32,-3 2 0,3-1-32,-2-4-64,1-3 160,1-4 128,-1-3-448</inkml:trace>
   <inkml:trace contextRef="#ctx0" brushRef="#br0" timeOffset="24489.893">1873 761 1408,'0'0'158,"0"0"1,0 0-1,0 0 1,0 0-1,0 0 0,0-1 1,0 1-1,0 0 1,0 0-1,0 0 1,0 0-1,0 0 0,0 0 1,0 0-1,1 0 1,-1 0-1,0 0 0,0 0 1,0 0-1,0 0 1,0 0-1,0 0 1,0 0-1,0 0 0,0-1 1,0 1-1,0 0 1,0 0-1,0 0 0,0 0 1,0 0-1,0 0 1,0 0-1,0 0 1,0 0-1,0 0 0,0 0 1,-1 0-1,1 0 1,0 0-1,0 0 0,0 0 1,0-1-1,0 1 1,0 0-1,0 0 1,0 0-1,0 0 0,0 0 1,0 0-1,0 0 1,0 0-1,0 0 0,0 0 1,0 0-1,0 0 1,0 0-159,10 1 3020,26 4-4659,-20-3 2556,93 8-1205,-84-7 64</inkml:trace>
   <inkml:trace contextRef="#ctx0" brushRef="#br0" timeOffset="24867.959">2096 858 4992,'-1'1'66,"1"-1"0,0 0-1,0 1 1,0-1 0,0 0 0,-1 1 0,1-1 0,0 1 0,0-1-1,0 0 1,0 1 0,0-1 0,0 1 0,0-1 0,0 0 0,0 1-1,0-1 1,0 1 0,1-1 0,-1 0 0,0 1 0,0-1 0,0 0-1,0 1 1,1-1 0,-1 0 0,0 1 0,0-1 0,0 0 0,1 1-1,-1-1 1,0 0 0,1 0 0,-1 1 0,0-1 0,1 0 0,-1 0-1,0 0 1,1 1 0,-1-1 0,0 0 0,1 0 0,-1 0 0,1 0-1,-1 0 1,0 0 0,1 0 0,-1 0 0,1 0-66,1 1 96,0-1 0,0 1 0,1-1 0,-1 0 0,0 0-1,0 0 1,1 0 0,0-1-96,3 0 342,0-2 0,0 1 0,-1-1 0,1 1 0,0-2 0,1 0-342,-5 2 53,1 1 0,-1-1 0,1 1 0,-1-1 0,0 0 0,0 0 0,0 0 0,0-1 0,0 1 1,-1 0-1,1-1 0,-1 1 0,1-1 0,0-2-53,-2 4 4,0 1 0,0-1 0,0 0-1,0 0 1,0 0 0,0 0 0,-1 1 0,1-1 0,0 0 0,0 0-1,-1 0 1,1 1 0,0-1 0,-1 0 0,1 0 0,-1 1 0,1-1 0,-1 0-1,1 1 1,-1-1 0,0 1 0,1-1 0,-1 0 0,0 1 0,1 0-1,-1-1 1,0 1 0,0-1 0,1 1 0,-1 0 0,0-1 0,0 1-1,0 0 1,0 0 0,1 0 0,-1 0-4,-3-1-49,1 0 1,-1 0-1,0 1 0,1 0 0,-1 0 1,0 0-1,1 0 0,-1 0 49,1 1 7,1-1-1,-1 1 0,0 0 1,1 0-1,-1 0 0,1 0 1,0 0-1,-1 0 0,1 1 1,0-1-1,0 1 0,-1-1 0,1 1 1,1 0-1,-1 0 0,0 0 1,0 0-1,1 0 0,-1 1 1,1-1-1,0 0 0,-1 1 1,1-1-1,0 1 0,0-1 1,1 1-1,-1 0-6,0 2 13,0-1 0,1 1 0,0 0 1,0 0-1,0-1 0,0 1 0,1 0 0,0 0 0,0-1 1,0 1-1,0-1 0,1 1 0,0-1 0,0 1 0,0 0-13,-1-4-6,0 1-1,0 0 0,0-1 1,0 1-1,1-1 0,-1 1 1,0-1-1,1 0 0,-1 1 1,1-1-1,-1 0 0,2 0 7,6 3-42</inkml:trace>
@@ -1506,8 +1506,8 @@
   <inkml:trace contextRef="#ctx0" brushRef="#br0" timeOffset="719.68">5 122 4096,'2'1'1568,"-1"1"-1216,3-1 832,-3 0 320,2 1-512,4 1-160,-1 0-448,4-1-96,2 1-160,6-3-288,1 2-160</inkml:trace>
   <inkml:trace contextRef="#ctx0" brushRef="#br0" timeOffset="1584.175">420 43 5632,'0'-1'101,"-1"1"-1,1-1 1,0 0 0,-1 1-1,1-1 1,0 1 0,0-1-1,0 1 1,-1-1 0,1 0 0,0 1-1,0-1 1,0 0 0,0 1-1,0-1 1,0 0 0,0 1-1,0-1 1,0 1 0,0-1-1,1 0 1,-1 1 0,0-1 0,0 1-1,0-1 1,1 0 0,-1 1-1,0-1 1,1 1 0,-1-1-101,3-1 97,-1 0 1,0 1-1,0-1 1,1 0-1,-1 1 1,1 0-1,-1-1-97,-1 2-2,2-1 147,0-1 0,0 1 1,1 0-1,-1-1 0,0 1 0,1 1 0,-1-1 1,1 0-1,0 1 0,-1 0 0,2 0-145,-4 0 35,0 0 0,0 0 0,0 1 0,1-1 0,-1 0 0,0 1 0,0-1 0,0 1 0,0-1 0,0 1 0,0-1 0,0 1 0,0 0 0,-1 0 0,1-1 0,0 1-1,0 0 1,0 0 0,-1 0 0,1 0 0,0 0 0,-1 0 0,1 0 0,-1 0 0,0 0 0,1 0 0,-1 0 0,0 0 0,1 0 0,-1 1 0,0-1 0,0 0 0,0 0 0,0 0 0,0 0 0,0 0 0,0 1-35,-1 3-21,1 0 1,-1 0-1,0 0 1,0 0-1,0 0 1,-1 0-1,0-1 1,0 1-1,-1 2 21,-28 42 92,8-13 150,23-35-223,-1 0-1,0 0 1,1 1-1,-1-1 1,1 0-1,-1 0 1,1 0-1,0 0 1,-1 1 0,1-1-1,0 0 1,0 0-1,0 1 1,0-1-1,0 0 1,0 1-1,0-1 1,0 0 0,1 0-1,-1 1 1,0-1-1,1 0 1,-1 0-1,1 0 1,-1 0-1,1 1 1,0-1 0,-1 0-1,1 0 1,0 0-1,0 0 1,0 0-19,1 0-23,0 0-1,0 1 1,0-1 0,0 0 0,0 0-1,0 0 1,0-1 0,0 1 0,0-1 0,1 1-1,-1-1 1,0 1 0,1-1 0,-1 0 0,0 0-1,0 0 1,1-1 0,-1 1 23,15-3-2789</inkml:trace>
   <inkml:trace contextRef="#ctx0" brushRef="#br0" timeOffset="2402.291">651 122 6400,'1'5'817,"-1"0"0,1 0 0,0 0 1,0 0-1,1 0 0,0 2-817,0-3 212,0 1-1,-1-1 1,2 1 0,-1-1-1,0 0 1,1 0 0,0 0-1,0 0 1,0 0 0,1-1 0,-1 1-212,-2-4 6,-1 0 0,1 0 1,-1 0-1,1 1 0,-1-1 1,1 0-1,-1 0 1,1 0-1,-1 0 0,0 0 1,1 0-1,-1 0 0,1 0 1,-1 0-1,1-1 0,-1 1 1,1 0-1,-1 0 1,1 0-1,-1 0 0,0-1 1,1 1-1,-1 0 0,1 0 1,-1-1-1,0 1 0,1 0 1,-1-1-1,0 1 1,1 0-1,-1-1 0,0 1 1,0-1-1,1 1-6,10-17-92,-10 15 85,8-16-278,-7 12 238,1 0 0,0 1 0,0-1 0,0 1 0,1 0 0,0 0 0,0 0 0,3-3 47,-7 8 2,0 0 1,1 0 0,-1 0-1,0-1 1,0 1 0,0 0-1,1 0 1,-1 0 0,0 0 0,0 0-1,1 0 1,-1 0 0,0 0-1,0 0 1,1-1 0,-1 1-1,0 0 1,0 0 0,1 0 0,-1 0-1,0 1 1,0-1 0,1 0-1,-1 0 1,0 0 0,0 0-1,1 0 1,-1 0 0,0 0-1,0 0 1,0 0 0,1 1 0,-1-1-3,5 8-101,-1 16 4,-3-21 200,-1 3 119,1-2-169,-1 1-1,1-1 1,0 0-1,0 0 1,1 4-53,-2-8-2,1 1 0,-1-1 1,0 1-1,0-1 0,1 0 0,-1 1 0,0-1 1,0 1-1,1-1 0,-1 0 0,0 1 0,1-1 1,-1 0-1,1 1 0,-1-1 0,0 0 0,1 1 1,-1-1-1,1 0 0,-1 0 0,1 0 0,-1 0 1,1 1-1,-1-1 0,1 0 0,-1 0 0,1 0 1,-1 0-1,1 0 0,-1 0 0,1 0 0,-1 0 1,1 0-1,-1 0 0,1-1 0,-1 1 0,1 0 1,-1 0-1,1 0 0,-1-1 0,0 1 0,1 0 1,-1 0-1,1-1 0,-1 1 0,0 0 0,1-1 1,-1 1-1,0 0 0,1-1 2,25-25-307,-22 21 290,0 1-1,0 0 1,0 0 0,0 0 0,0 0-1,1 1 1,0 0 0,-1 0-1,1 0 1,1 0 17,-5 3-9,-1 0 0,1 0-1,-1 0 1,1 0 0,-1 0 0,1 0 0,-1 0 0,1 0 0,-1 0-1,1 0 1,-1 0 0,0 0 0,1 0 0,-1 0 0,1 0-1,-1 1 1,1-1 0,-1 0 0,1 0 0,-1 0 0,0 1 0,1-1-1,-1 0 1,0 1 0,1-1 0,-1 0 0,0 1 0,1-1-1,-1 0 1,0 1 0,0-1 0,1 1 0,-1-1 0,0 1 0,0-1-1,0 0 1,0 1 9,6 22-43,-4-16 196,1 4 125,-2-6-220,0 0 0,0 0 0,0-1 0,1 1 0,0 0 1,0 0-1,1-1 0,-1 0 0,1 1 0,0-1 0,0 0 1,3 3-59,-1-4-182,0-5-36</inkml:trace>
-  <inkml:trace contextRef="#ctx0" brushRef="#br0" timeOffset="2791.168">1001 111 5760,'-3'9'2176,"3"1"-1664,0 7 544,1-8 128,1 2-608,0 2-224,1-2-160,0-1 0,0-1-96,0-4-128,2-6 448,0-6 224</inkml:trace>
-  <inkml:trace contextRef="#ctx0" brushRef="#br0" timeOffset="2792.168">974 17 7296,'-9'-14'2720,"7"14"-2112,2 3-32,0-3-96</inkml:trace>
+  <inkml:trace contextRef="#ctx0" brushRef="#br0" timeOffset="2791.167">1001 111 5760,'-3'9'2176,"3"1"-1664,0 7 544,1-8 128,1 2-608,0 2-224,1-2-160,0-1 0,0-1-96,0-4-128,2-6 448,0-6 224</inkml:trace>
+  <inkml:trace contextRef="#ctx0" brushRef="#br0" timeOffset="2792.167">974 17 7296,'-9'-14'2720,"7"14"-2112,2 3-32,0-3-96</inkml:trace>
   <inkml:trace contextRef="#ctx0" brushRef="#br0" timeOffset="3162.365">1089 127 7296,'3'24'3764,"0"-15"-3233,0 1 0,1-1 0,0 0 0,4 8-531,-8-17 9,0 0-1,0 0 1,0 0 0,0-1 0,0 1 0,0 0 0,0 0 0,0 0 0,1 0 0,-1 0 0,0 0 0,0 0 0,0 0 0,0 0 0,0 0 0,0 0 0,0 0-1,0 0 1,0 0 0,0 0 0,1 0 0,-1 0 0,0 0 0,0 0 0,0 0 0,0 0 0,0 0 0,0 0 0,0 0 0,0 0 0,1 0 0,-1 0 0,0 0-1,0 0 1,0 0 0,0 0 0,0 0 0,0 0 0,0 0 0,0 0 0,0 0 0,1 0 0,-1 0 0,0 0 0,0 0 0,0 0 0,0 0 0,0 0 0,0 1-1,0-1 1,0 0 0,0 0 0,0 0 0,0 0 0,0 0 0,0 0 0,0 0 0,0 0 0,0 0 0,0 1 0,0-1 0,0 0 0,0 0 0,0 0 0,0 0-1,0 0 1,0 0 0,0 0 0,0 0 0,0 1-9,1-13 275,-4-20-138,3 29-108,-1-2-48,0-1-1,1 1 1,0 0-1,0-1 0,1 1 1,0-2 19,2-3-117</inkml:trace>
   <inkml:trace contextRef="#ctx0" brushRef="#br0" timeOffset="3510.925">1241 192 6144,'1'2'371,"-1"0"1,1-1-1,-1 0 0,1 1 1,-1-1-1,1 1 1,0-1-1,0 0 0,0 1 1,0-1-1,0 0 0,0 1-371,-1-2 83,0 0-1,1 0 1,-1 1-1,0-1 1,0 0-1,1 0 1,-1 0-1,0 1 0,0-1 1,1 0-1,-1 0 1,0 0-1,1 0 1,-1 0-1,0 0 1,0 0-1,1 0 0,-1 0 1,0 0-1,1 0 1,-1 0-1,0 0 1,1 0-1,-1 0 0,0 0-82,1 0 47,-1 0-1,0-1 1,1 1-1,-1-1 0,1 1 1,-1 0-1,0-1 0,1 1 1,-1-1-1,0 1 1,0-1-1,1 1 0,-1-1 1,0 1-1,0-1 0,0 1 1,0-1-1,1 1 1,-1-1-1,0 0-46,1-10-9,1 0-1,-1-1 1,-1 0-1,0 1 1,-1-1 0,-1-3 9,1 3-552,1 6-461</inkml:trace>
   <inkml:trace contextRef="#ctx0" brushRef="#br0" timeOffset="3885.373">1402 133 5248,'-3'0'433,"0"0"0,0 0 1,-1 1-1,1-1 0,0 1 1,0-1-1,0 1 0,0 0 1,0 0-1,0 1 0,1-1 0,-3 1-433,4-1 45,-1 0 0,0 0 0,1 0 0,-1 0 0,1 0 0,-1 0 0,1 0 0,0 0 0,-1 1 0,1-1 0,0 0 0,0 1 0,0-1 0,0 1 0,0 0 0,0-1 0,0 1 0,0 0 0,1-1 0,-1 1 0,1 1-45,0-1 28,0-1 1,1 1-1,-1-1 1,1 1-1,-1-1 1,1 1-1,0-1 1,0 1-1,0-1 1,0 0-1,0 1 0,0-1 1,0 0-1,0 0 1,0 0-1,0 0 1,1 0-1,-1 0 1,1 0-1,-1 0 1,0-1-1,2 1-28,3 3 97,1-2 0,-1 1-1,1-1 1,3 1-97,-7-2-1,1 0 0,-1 0 0,0-1 0,0 0 0,0 1 0,0-1-1,0 0 1,0 0 0,0-1 0,3 0 1,-6 1 12,1 0 0,0 0-1,0-1 1,-1 1-1,1 0 1,-1-1 0,1 1-1,0-1 1,-1 1 0,1-1-1,-1 1 1,1-1-1,-1 1 1,1-1 0,-1 1-1,0-1 1,1 0 0,-1 1-1,0-1-11,1 0 29,-1-1-1,1 1 1,-1 0-1,0-1 1,0 1-1,0 0 1,0-1 0,0 1-1,0 0 1,0-1-1,0 1 1,-1 0-1,1-2-28,-2-1 53,0-1-1,0 1 0,0-1 1,0 1-1,0 0 1,-1 0-1,0 0 1,0 0-1,0 0-52,-5-5-47,-1 0 0,1 1 0,-3-1 47,9 8-1349,1 3-635</inkml:trace>
@@ -1541,9 +1541,9 @@
     </inkml:brush>
   </inkml:definitions>
   <inkml:trace contextRef="#ctx0" brushRef="#br0">37 1 4736,'-1'4'1824,"2"0"-1408,1 2 512,1-2 192,1 2-320,0 2-96,1 2-256,2 2-32,-1-1-256,0 0-32,2 0 0,0-1-64,0-1-64,-2-2 96,1-5 64</inkml:trace>
-  <inkml:trace contextRef="#ctx0" brushRef="#br0" timeOffset="372.886">143 1 3712,'-2'4'3792,"-4"5"-1755,-14 4-812,-19 15-18,-24 12-1207,51-34-5</inkml:trace>
+  <inkml:trace contextRef="#ctx0" brushRef="#br0" timeOffset="372.885">143 1 3712,'-2'4'3792,"-4"5"-1755,-14 4-812,-19 15-18,-24 12-1207,51-34-5</inkml:trace>
   <inkml:trace contextRef="#ctx0" brushRef="#br0" timeOffset="705.721">7 35 4992,'-4'0'1824,"4"1"-1408,1-1 320,1 2 0,1 0-160,0 1 64,4 2-352,-1-1-160,3 1-96,3 0 96,0-1 160,3-1-160,2-2-64</inkml:trace>
-  <inkml:trace contextRef="#ctx0" brushRef="#br0" timeOffset="1064.689">76 12 5120,'-3'6'2016,"3"-1"-1568,-4 5 224,4-3 0,-1 3-64,-1 3 32,0 2-160,1 1-32,0-1-256,1-1-256,0-1-64,2-12 192</inkml:trace>
+  <inkml:trace contextRef="#ctx0" brushRef="#br0" timeOffset="1064.688">76 12 5120,'-3'6'2016,"3"-1"-1568,-4 5 224,4-3 0,-1 3-64,-1 3 32,0 2-160,1 1-32,0-1-256,1-1-256,0-1-64,2-12 192</inkml:trace>
 </inkml:ink>
 </file>
 
@@ -1580,13 +1580,13 @@
   <inkml:trace contextRef="#ctx0" brushRef="#br0" timeOffset="3607.165">1185 416 7424,'-9'-9'5454,"9"8"-5447,0 1 0,-1-1 0,1 1 0,-1-1-1,1 1 1,0-1 0,-1 1 0,1-1 0,-1 1 0,1 0 0,-1-1 0,1 1 0,-1-1 0,0 1 0,1 0-1,-1 0 1,1-1 0,-1 1-7,0 0 25,0 1-1,0-1 1,0 0-1,0 1 1,0-1 0,0 1-1,0 0 1,0-1-1,0 1 1,0-1-1,0 1 1,0 0-1,0 0 1,1 0 0,-1-1-1,0 1 1,1 0-1,-1 0 1,0 0-1,1 0 1,0 0-1,-1 0 1,1 0 0,-1 1-25,0 1 3,-1 1 0,1 0 0,0 0 0,0 0 0,1 0 0,-1 1-3,1-1 72,0 1-1,0 0 0,1-1 0,-1 1 0,2 2-71,-2-6-3,0 0 0,1 1 0,-1-1-1,0 0 1,1 0 0,-1 1 0,1-1-1,-1 0 1,1 0 0,0 0 0,-1 0-1,1 0 1,0 0 0,0 0 0,0 0-1,0 0 1,0 0 0,0-1 0,0 1-1,0 0 1,1 0 3,-1-1 13,0 0-1,-1 0 1,1 0-1,0-1 1,0 1 0,0 0-1,0 0 1,-1-1-1,1 1 1,0 0-1,0-1 1,-1 1-1,1-1 1,0 1 0,-1-1-1,1 1 1,0-1-1,-1 1 1,1-1-1,-1 0 1,1 1-1,-1-1 1,1 0 0,-1 1-1,0-1 1,1 0-1,-1 0 1,0 0-1,1 1-12,8-26-230,-5-2 177,-4 22-2,1-1 1,-1 1-1,2 0 1,-1 0-1,2-5 55,10 47-10,-10-27 165,1-1 0,0 1 0,0-1 1,2 1-156,-5-6-49,1-1 1,0 0-1,-1 1 1,1-1-1,0 0 1,0 0-1,0 0 1,0-1-1,1 1 1,-1 0-1,0-1 0,1 1 1,-1-1-1,1 0 1,2 1 48,3-1-3061</inkml:trace>
   <inkml:trace contextRef="#ctx0" brushRef="#br0" timeOffset="3960.129">1312 103 8960,'-1'3'607,"1"1"-1,-1-1 1,1 0 0,-1 0 0,1 0 0,0 0 0,0 2-607,7 36 666,-3-19-316,11 92 327,-2 111-677,-12-212-101,-1-4 53</inkml:trace>
   <inkml:trace contextRef="#ctx0" brushRef="#br0" timeOffset="5876.418">1570 450 5888,'7'1'6515,"24"-4"-5820,-29 2-695,1 1 0,-1-1-1,0 0 1,1-1 0,-1 1-1,0 0 1,0-1 0,1 1 0,-1-1-1,0 0 1,-1 1 0,1-1-1,0 0 1,0 0 0,-1 0 0,1-1-1,-1 1 1,0 0 0,0-1-1,0 1 1,0 0 0,0-1-1,0 1 1,-1-1 0,1 1 0,-1-1-1,1 0 1,-1 1 0,0-1-1,0 1 1,0-1 0,-1 0-1,1 1 1,-1-1 0,1 1 0,-1-2 0,0 4 7,1-1 1,0 1 0,0-1 0,-1 1 0,1-1-1,0 1 1,-1-1 0,1 1 0,0 0-1,-1-1 1,1 1 0,-1-1 0,1 1 0,-1 0-1,1-1 1,-1 1 0,1 0 0,-1 0 0,1-1-1,-1 1 1,1 0 0,-1 0 0,0 0 0,1 0-1,-1 0 1,1 0 0,-1 0 0,1 0 0,-1 0-1,0 0 1,1 0 0,-1 0 0,1 0-1,-1 0 1,1 0 0,-1 1 0,0-1 0,1 0-1,-1 0 1,1 1 0,-1-1 0,1 1-8,-24 14-252,22-14 225,-6 6-24,2-3 70,0 0 0,1 1 0,-1 0 1,1 0-1,-4 5-19,8-8 30,0-1 0,0 1 0,0 0 0,0 0 0,0 0 0,0-1 0,1 1 0,-1 0 0,1 0 0,-1 0 0,1 0 0,0 0 0,0 0 0,0 0 0,0 0 0,0 0 0,0 0 0,0 0 0,1 0 0,-1 0 1,1 0-1,0 0 0,0 0-30,1 5 40,1 0 0,1-1 0,-1 1 0,1-1 0,1 0 0,-1 0 0,1-1 1,1 2-41,-4-5-24,-1 0 1,0-1 0,1 1 0,0-1 0,-1 0 0,1 0 0,0 1-1,0-1 1,0 0 0,0-1 0,-1 1 0,1 0 0,0 0 0,1-1-1,-1 1 1,0-1 0,0 0 0,0 0 0,0 1 0,0-1 0,0-1-1,0 1 1,0 0 0,1 0 0,-1-1 0,0 1 0,0-1 0,0 0-1,0 0 1,0 0 23,10-6-602</inkml:trace>
-  <inkml:trace contextRef="#ctx0" brushRef="#br0" timeOffset="6226.475">1694 352 8320,'0'1'208,"0"0"1,0 0-1,0-1 1,-1 1-1,1 0 0,0 0 1,0 0-1,0-1 1,0 1-1,0 0 1,1 0-1,-1 0 1,0 0-1,0-1 1,0 1-1,1 0 1,-1 0-1,0-1 0,1 1 1,-1 0-1,1 0-208,10 17 652,16 13-260,1-1 0,14 10-392,-39-37 42,0 0-83,0 0 0,1 0 0,-1 0 0,1 0 0,0 0 0,0-1 0,0 1 0,0-1 0,0 0 0,3 0 41,-3-2-261</inkml:trace>
+  <inkml:trace contextRef="#ctx0" brushRef="#br0" timeOffset="6226.474">1694 352 8320,'0'1'208,"0"0"1,0 0-1,0-1 1,-1 1-1,1 0 0,0 0 1,0 0-1,0-1 1,0 1-1,0 0 1,1 0-1,-1 0 1,0 0-1,0-1 1,0 1-1,1 0 1,-1 0-1,0-1 0,1 1 1,-1 0-1,1 0-208,10 17 652,16 13-260,1-1 0,14 10-392,-39-37 42,0 0-83,0 0 0,1 0 0,-1 0 0,1 0 0,0 0 0,0-1 0,0 1 0,0-1 0,0 0 0,3 0 41,-3-2-261</inkml:trace>
   <inkml:trace contextRef="#ctx0" brushRef="#br0" timeOffset="6610.375">1816 342 7552,'-3'13'5426,"-2"1"-5363,-1-1 0,-6 12-63,-7 2 442,-21 25-442,13-17 134,5-6-748,14-19-36</inkml:trace>
   <inkml:trace contextRef="#ctx0" brushRef="#br0" timeOffset="6960.64">1918 363 5888,'0'56'5799,"2"4"-4837,-4-1-1,-6 37-961,5-78-288,-2-5-138</inkml:trace>
-  <inkml:trace contextRef="#ctx0" brushRef="#br0" timeOffset="7322.934">1926 342 8320,'1'-1'184,"-1"0"1,1 0-1,0 0 1,0 0-1,-1 1 1,1-1-1,0 0 1,0 1-1,0-1 1,0 0-1,0 1 1,0-1-1,0 1 1,0 0-1,0-1 1,0 1-1,0 0 1,0-1-1,0 1 1,0 0-1,0 0 1,1 0-185,0 0 117,1 0 0,0 1 0,0-1 0,0 1 0,0-1 0,0 1 0,0 0 0,-1 0 0,1 0-117,3 2 27,1 1 0,-1-1 0,0 1 0,0 0 0,-1 0 0,1 1 0,0 1-27,-3-3 39,0 0 1,-1 0 0,1 0-1,-1 1 1,0-1-1,0 1 1,0 0 0,0 0-1,1 3-39,-3-6 35,1 0 0,-1 1-1,0-1 1,0 1 0,0-1-1,0 0 1,0 1 0,0-1-1,0 0 1,0 1 0,0-1 0,-1 1-1,1-1 1,-1 0 0,1 1-1,-1-1 1,1 0 0,-1 0-1,0 0 1,1 1 0,-1-1 0,0 0-1,0 0 1,0 0 0,0 0-1,0 0 1,0 0 0,0 0 0,0-1-1,-1 1-34,-4 3 32,0-2-1,0 1 0,0-1 1,0 1-1,0-2 0,0 1 1,-2-1-32,-11 4-1078,11-2 38</inkml:trace>
+  <inkml:trace contextRef="#ctx0" brushRef="#br0" timeOffset="7322.933">1926 342 8320,'1'-1'184,"-1"0"1,1 0-1,0 0 1,0 0-1,-1 1 1,1-1-1,0 0 1,0 1-1,0-1 1,0 0-1,0 1 1,0-1-1,0 1 1,0 0-1,0-1 1,0 1-1,0 0 1,0-1-1,0 1 1,0 0-1,0 0 1,1 0-185,0 0 117,1 0 0,0 1 0,0-1 0,0 1 0,0-1 0,0 1 0,0 0 0,-1 0 0,1 0-117,3 2 27,1 1 0,-1-1 0,0 1 0,0 0 0,-1 0 0,1 1 0,0 1-27,-3-3 39,0 0 1,-1 0 0,1 0-1,-1 1 1,0-1-1,0 1 1,0 0 0,0 0-1,1 3-39,-3-6 35,1 0 0,-1 1-1,0-1 1,0 1 0,0-1-1,0 0 1,0 1 0,0-1-1,0 0 1,0 1 0,0-1 0,-1 1-1,1-1 1,-1 0 0,1 1-1,-1-1 1,1 0 0,-1 0-1,0 0 1,1 1 0,-1-1 0,0 0-1,0 0 1,0 0 0,0 0-1,0 0 1,0 0 0,0 0 0,0-1-1,-1 1-34,-4 3 32,0-2-1,0 1 0,0-1 1,0 1-1,0-2 0,0 1 1,-2-1-32,-11 4-1078,11-2 38</inkml:trace>
   <inkml:trace contextRef="#ctx0" brushRef="#br0" timeOffset="7789.951">2146 347 8064,'-6'5'4003,"-2"5"-2705,-4 2-1287,6-7-12,0 1 1,0 0-1,1 0 1,0 1-1,0-1 1,-2 4 0,6-8-4,0-1 0,0 1 0,0-1 1,1 1-1,-1 0 0,0-1 0,1 1 0,-1 0 0,1-1 0,-1 1 0,1 0 1,0 0-1,0 0 0,0 0 0,0-1 0,0 1 0,0 0 0,0 0 0,1 0 1,-1-1-1,0 1 0,1 0 0,0 0 0,-1-1 0,1 1 0,0-1 0,0 1 1,0-1-1,0 1 0,0-1 0,2 2 4,-3-3 1,0 1 0,1-1 1,0 1-1,-1-1 0,1 1 0,-1-1 1,1 1-1,-1-1 0,1 0 0,0 1 1,-1-1-1,1 0 0,0 0 0,-1 1 0,1-1 1,0 0-1,0 0 0,-1 0 0,1 0 1,0 0-1,-1 0 0,1 0 0,0 0 1,0 0-1,-1 0 0,1-1-1,0 1 0,0-1-1,1 0 1,-1 1 0,0-1-1,0 0 1,0 0 0,0 0 0,0 0-1,0 0 1,0 0 0,-1 0-1,1 0 1,0-1 0,3-5 3,-1 0 1,1 0-1,-1-1 1,0-4-4,-1 9 17,-2 1-17,6-14 0,-6 15 0,0 1 0,0 0 0,0-1 0,0 1 0,0-1 0,1 1 0,-1-1 0,0 1 0,0-1 0,1 1 0,-1 0 0,0-1 0,1 1 0,-1-1 0,0 1 0,1 0 0,-1-1 0,1 1 0,-1 0 0,0 0 0,1-1 0,-1 1 0,1 0 0,0 1-24,-1 1 1,1-1-1,0 1 1,-1 0 0,1-1-1,-1 1 1,0 0 0,0-1-1,1 1 1,-1 0 0,0-1-1,0 1 24,0 3 83,1 3-96,0 0 0,0 1 0,1-1 0,0 0 1,1 0-1,0 0 0,3 7 13,-2-10-320</inkml:trace>
   <inkml:trace contextRef="#ctx0" brushRef="#br0" timeOffset="8193.832">2235 375 6656,'0'6'5208,"4"11"-3979,-2-11-1058,6 17 1231,8 16-1402,-16-39 0,0 1 1,0-1-1,0 1 0,0-1 0,1 1 0,-1-1 1,0 1-1,0-1 0,0 0 0,1 1 1,-1-1-1,0 1 0,1-1 0,-1 0 0,0 1 1,1-1-1,-1 0 0,0 1 0,1-1 0,-1 0 1,1 0-1,-1 1 0,1-1 0,-1 0 0,0 0 1,1 0-1,-1 1 0,1-1 0,-1 0 0,1 0 1,-1 0-1,1 0 0,-1 0 0,1 0 1,-1 0-1,1 0 0,-1 0 0,1 0 0,-1-1 1,1 1-1,-1 0 0,0 0 0,1 0 0,-1-1 1,1 1-1,-1 0 0,1 0 0,-1-1 0,0 1 1,1 0-1,-1-1 0,0 1 0,1 0 1,-1-1-1,0 1 0,1-1 0,2-3 16,0-1 1,0 0-1,0 0 1,2-5-17,-2 4-88,-2 4 53,2-4 29,0 1-1,0 0 1,1 0-1,-1 0 1,1 1-1,2-3 7,-6 7 2,1-1 0,0 0 0,-1 1 0,1 0 0,0-1 0,-1 1 0,1-1 0,0 1 1,0 0-1,-1-1 0,1 1 0,0 0 0,0 0 0,0 0 0,-1 0 0,1-1 0,0 1 0,0 0 0,0 0 0,0 1-2,0-1-12,0 1 0,0-1 0,0 1 0,0-1-1,1 1 1,-1 0 0,-1-1 0,1 1 0,0 0 0,0 0 0,0 0 0,0 0 0,0 0-1,-1 0 1,1 0 0,-1 0 0,1 0 0,0 0 12,9 21 158,-7-15-247,0-1 0,1 1-1,0-1 1,0 0 0,1 2 89,0-3-517</inkml:trace>
-  <inkml:trace contextRef="#ctx0" brushRef="#br0" timeOffset="8638.465">2527 325 7424,'-2'-1'291,"0"1"-1,-1 0 1,1 1 0,0-1-1,0 0 1,0 1 0,0-1 0,-1 1-1,1-1 1,0 1 0,0 0-1,0 0 1,0 0 0,1 0 0,-1 1-1,0-1 1,0 0 0,1 1 0,-1-1-1,0 1 1,0 0-291,-4 6 153,-1-1 1,1 1-1,-5 9-153,8-13 48,0 0-25,1 0 0,-1 0 0,1 1 0,-1-1-1,1 1 1,1-1 0,-1 2-23,2-5-2,0 0 1,-1 0 0,1 0-1,0 1 1,0-1 0,0 0-1,1 0 1,-1 0-1,0 0 1,0 0 0,0 0-1,1 0 1,-1 0 0,1 0-1,-1 0 1,1 0 0,-1 0-1,1 0 1,-1 0-1,1-1 1,0 1 0,0 0-1,-1 0 1,1-1 0,0 1-1,0 0 1,0-1-1,0 1 1,0-1 0,0 1-1,0-1 1,0 1 0,0-1-1,0 0 1,1 1 1,15 4 166,15 6 24,-30-10-157,0 0 0,0 0 0,-1 0 0,1 0 0,-1 0-1,1 0 1,-1 0 0,1 1 0,-1-1 0,1 1-1,-1-1 1,0 1 0,0-1 0,1 2-33,-2-2 3,1 1 1,-1-1-1,0 1 0,0-1 1,0 0-1,0 1 1,0-1-1,0 1 0,0-1 1,0 1-1,-1-1 1,1 0-1,-1 1 0,1-1 1,-1 0-1,1 1 1,-1-1-1,0 0 0,1 0 1,-1 1-1,0-1 1,0 0-1,0 0 0,0 0 1,0 0-4,-5 5-46,1-1 0,-1 1 0,-5 2 46,7-5-12,0 1-77,-1-1-1,1 1 1,-1-1-1,0 0 1,-1 0 0,1 0-1,0-1 1,-1 0 0,-2 1 89,4-3-582,1-2-164</inkml:trace>
+  <inkml:trace contextRef="#ctx0" brushRef="#br0" timeOffset="8638.464">2527 325 7424,'-2'-1'291,"0"1"-1,-1 0 1,1 1 0,0-1-1,0 0 1,0 1 0,0-1 0,-1 1-1,1-1 1,0 1 0,0 0-1,0 0 1,0 0 0,1 0 0,-1 1-1,0-1 1,0 0 0,1 1 0,-1-1-1,0 1 1,0 0-291,-4 6 153,-1-1 1,1 1-1,-5 9-153,8-13 48,0 0-25,1 0 0,-1 0 0,1 1 0,-1-1-1,1 1 1,1-1 0,-1 2-23,2-5-2,0 0 1,-1 0 0,1 0-1,0 1 1,0-1 0,0 0-1,1 0 1,-1 0-1,0 0 1,0 0 0,0 0-1,1 0 1,-1 0 0,1 0-1,-1 0 1,1 0 0,-1 0-1,1 0 1,-1 0-1,1-1 1,0 1 0,0 0-1,-1 0 1,1-1 0,0 1-1,0 0 1,0-1-1,0 1 1,0-1 0,0 1-1,0-1 1,0 1 0,0-1-1,0 0 1,1 1 1,15 4 166,15 6 24,-30-10-157,0 0 0,0 0 0,-1 0 0,1 0 0,-1 0-1,1 0 1,-1 0 0,1 1 0,-1-1 0,1 1-1,-1-1 1,0 1 0,0-1 0,1 2-33,-2-2 3,1 1 1,-1-1-1,0 1 0,0-1 1,0 0-1,0 1 1,0-1-1,0 1 0,0-1 1,0 1-1,-1-1 1,1 0-1,-1 1 0,1-1 1,-1 0-1,1 1 1,-1-1-1,0 0 0,1 0 1,-1 1-1,0-1 1,0 0-1,0 0 0,0 0 1,0 0-4,-5 5-46,1-1 0,-1 1 0,-5 2 46,7-5-12,0 1-77,-1-1-1,1 1 1,-1-1-1,0 0 1,-1 0 0,1 0-1,0-1 1,-1 0 0,-2 1 89,4-3-582,1-2-164</inkml:trace>
   <inkml:trace contextRef="#ctx0" brushRef="#br0" timeOffset="9005.553">2589 440 8960,'-6'6'3424,"4"-1"-2656,1 3 64,-1-3-192,1 1-416,0 2-128,1 3-64,0 1 32,1 1-32,0-1-160,1-2-64,-2-3-352,1-2-96</inkml:trace>
   <inkml:trace contextRef="#ctx0" brushRef="#br0" timeOffset="9006.553">2570 305 8064,'-4'-8'3072,"4"6"-2400,1-2-384,-1 3-288</inkml:trace>
   <inkml:trace contextRef="#ctx0" brushRef="#br0" timeOffset="9579.33">2707 431 8320,'5'-1'4805,"2"0"-4605,-11 5-91,-3 1-118,-1 0 0,1 1 0,1-1 0,-1 1 0,-4 6 9,9-10 28,1 0 1,-1 1-1,1-1 1,0 0-1,-1 0 1,1 1-1,0-1 1,0 1-1,1-1 1,-1 1-1,1-1 1,-1 1-1,1 0 1,0-1-1,0 1 1,0 0-1,0-1 1,0 1-1,1-1 1,-1 1-1,1 0 1,-1-1-29,1 0 6,-1-1 1,0 0 0,1 0 0,-1 0 0,1 0 0,-1 0-1,1 0 1,-1 0 0,1 0 0,0 0 0,-1 0-1,1 0 1,0-1 0,0 1 0,0 0 0,0 0 0,0-1-1,0 1 1,0-1 0,0 1 0,0-1 0,0 1 0,1 0-7,0-1 20,0 0 1,0 0 0,0 1 0,0-1 0,0-1 0,0 1 0,0 0 0,0 0 0,0-1 0,0 1 0,0-1 0,-1 0 0,2 0-21,1 0 36,0-1 0,1-1 0,-1 1 1,0-1-1,0 1 0,-1-1 0,1 0 0,0 0 0,-1-1 0,0 1 0,2-3-36,-4 4-44,0-1-1,0 1 1,0 0 0,-1-1-1,1 1 1,-1-1-1,1 1 1,-1-1 0,0 0-1,0 1 1,0-1-1,0 1 1,0-1 0,0 1-1,-1-1 1,0 1-1,1-1 1,-1 1 44,-1-3-19,1 0 0,-1 1 0,0 0 0,0-1 0,-1 1 0,1 0 0,-1 0 0,0 0 0,0 0 19,2 3-36,0 0 0,0 1 1,0-1-1,1 0 1,-1 1-1,0-1 1,0 1-1,0-1 1,0 1-1,0 0 0,0-1 1,0 1-1,0 0 1,0 0-1,0-1 1,0 1-1,0 0 1,0 0-1,0 0 0,0 0 1,-1 0 35,-7 1-741</inkml:trace>
@@ -1655,8 +1655,8 @@
   <inkml:trace contextRef="#ctx0" brushRef="#br0" timeOffset="3028.92">182 222 5504,'-2'8'2112,"2"0"-1664,0 2 256,2-6 32,-2 2-256,0-1 0,1 2 64,-1-1 32,2 0-288,-1-2-320,1-1-64,0 0 32,-2-3 96,2-2-352,-2-2-192</inkml:trace>
   <inkml:trace contextRef="#ctx0" brushRef="#br0" timeOffset="3029.92">230 112 7168,'-8'-10'2720,"8"9"-2112,0 1-32,0 1-96,0 2-512,0 1-96,1 0-224,1 2-32</inkml:trace>
   <inkml:trace contextRef="#ctx0" brushRef="#br0" timeOffset="3621.642">319 184 4608,'-3'0'159,"1"0"0,0 0 1,-1 0-1,1 1 0,0-1 0,-1 1 1,1 0-1,0-1 0,0 1 0,0 0 1,-1 0-1,1 0 0,0 1 0,0-1 1,1 0-1,-1 1 0,0-1 0,-1 2-159,0 0 243,1-1 1,-1 1-1,1 0 0,0 0 0,0 0 0,0 0 0,0 1 1,0-1-1,0 0 0,1 1 0,-1 1-243,2-4 42,0 0 0,-1 0 0,1 0 0,0 0 0,0 0 0,0 0 0,0-1 0,0 1 0,0 0 0,0 0 0,0 0 0,1 0 0,-1 0 0,0 0 0,0-1 0,1 1 0,-1 0 0,0 0 0,1 0 0,-1-1 0,1 1 0,-1 0 0,1-1 0,0 1 0,-1 0 0,1-1 0,0 1 0,-1-1 0,1 1 0,0-1 0,-1 1 0,1-1 0,0 1 0,0-1 0,0 0 0,0 1 0,-1-1 0,1 0 0,0 0 0,0 0 0,0 0 0,0 1 0,0-1-42,2 0 3,0 0 1,0 0-1,0 0 0,0 0 0,0-1 1,0 1-1,0-1 0,0 1 1,-1-1-1,1 0 0,0 0 0,2-2-3,-2 1 11,-1 0-1,1 0 1,-1 0-1,0 0 1,0 0 0,0-1-1,0 1 1,0-2-11,-1 3 8,0 0 1,0 0-1,-1 0 1,1 0 0,0-1-1,-1 1 1,1 0-1,-1-1 1,0 1-1,1 0 1,-1-1 0,0 1-1,0 0 1,0-1-1,0 1 1,0 0 0,0-1-1,0 1 1,-1 0-1,1-2-8,-3 3-394,0 6 174,-2 8 178,3 9 79,0 0 0,2 0 0,1 1-37,0-4-12,-1 0 0,0-1 1,-2 1-1,-2 11 12,3-29 5,0 1 0,1-1 0,-1 0 0,0 0 0,0 1 0,0-1 0,0 0 1,-1 0-1,1 0 0,-2 1-5,3-3 2,-1 1 1,1-1 0,0 0-1,-1 1 1,1-1-1,0 0 1,-1 0 0,1 1-1,-1-1 1,1 0 0,0 0-1,-1 0 1,1 0 0,-1 1-1,1-1 1,0 0 0,-1 0-1,1 0 1,-1 0 0,1 0-1,-1 0 1,1 0 0,-1 0-1,1 0-2,-1-1-2,0 1-1,1-1 0,-1 1 1,0-1-1,0 1 1,1-1-1,-1 0 0,1 1 1,-1-1-1,0 0 0,1 0 1,-1 1-1,1-1 1,0 0-1,-1 0 0,1 1 1,-1-2 2,-1-4-17,-1-1 0,1 1 0,1-1 0,-1 1 0,1-1 0,0 0 0,0 0 0,1 0 0,0-2 17,0 4-17,1 1 1,-1 0-1,1-1 1,0 1-1,0 0 1,0 0-1,0 0 1,1-1-1,-1 1 1,1 1-1,0-1 1,1 0 0,-1 0-1,1 1 1,1-3 16,6-2-128</inkml:trace>
-  <inkml:trace contextRef="#ctx0" brushRef="#br0" timeOffset="4004.789">438 220 2816,'0'3'1120,"2"2"-864,-2 3 1280,1-4 480,-1 2-608,2 1-256,-1 0-544,2 1-160,1-3-256,-1 1-256,0-2-128,0-2 160,0-2 64</inkml:trace>
-  <inkml:trace contextRef="#ctx0" brushRef="#br0" timeOffset="4005.789">446 105 7552,'-6'-16'2816,"4"15"-2208,2 1 64,0 0-96,2 3-608,-1 0-160</inkml:trace>
+  <inkml:trace contextRef="#ctx0" brushRef="#br0" timeOffset="4004.788">438 220 2816,'0'3'1120,"2"2"-864,-2 3 1280,1-4 480,-1 2-608,2 1-256,-1 0-544,2 1-160,1-3-256,-1 1-256,0-2-128,0-2 160,0-2 64</inkml:trace>
+  <inkml:trace contextRef="#ctx0" brushRef="#br0" timeOffset="4005.788">446 105 7552,'-6'-16'2816,"4"15"-2208,2 1 64,0 0-96,2 3-608,-1 0-160</inkml:trace>
   <inkml:trace contextRef="#ctx0" brushRef="#br0" timeOffset="4385.681">533 11 2304,'-1'1'208,"0"0"0,0 1 1,0-1-1,0 0 0,0 0 0,0 1 1,1-1-1,-1 0 0,0 1 0,1-1 1,-1 1-1,1-1 0,-1 1 0,1-1 1,0 1-1,0-1 0,0 1-208,-3 31 3036,3-26-2604,1 43 1134,1 0 1,4 9-1567,-2-26 8,-3-23 5,-1-15 117,2-15-49,-1 17-68,0 0 0,0 0 1,0 0-1,1 0 0,-1 0 0,1 1 1,-1-1-1,1 0 0,0 1 0,0-1 0,0 1 1,0 0-1,1-1 0,-1 1 0,1 0 1,-1 0-1,1 1 0,0-1 0,0 1 0,-1-1 1,1 1-1,0 0 0,0 0 0,1 0 1,1 0-14,4-2-336</inkml:trace>
   <inkml:trace contextRef="#ctx0" brushRef="#br0" timeOffset="4805.972">705 219 6400,'-3'0'387,"0"-1"0,0 1 0,0 0 0,0 0 0,0 0 0,0 0 0,-1 1 0,1-1 0,0 1 0,0 0 0,0 0 0,0 0-387,1 0 89,0-1 1,0 1 0,0 0-1,0 0 1,0 0-1,1 0 1,-1 0 0,0 0-1,1 0 1,-1 1-1,1-1 1,-1 1 0,1-1-1,0 1 1,0-1-1,-1 1 1,1 0 0,0 0-1,0 0-89,1-1 16,0-1-1,0 1 1,0 0-1,0 0 1,0-1-1,0 1 1,0 0 0,0-1-1,0 1 1,1 0-1,-1-1 1,0 1-1,0 0 1,1-1-1,-1 1 1,0 0-1,1-1 1,-1 1-1,1-1 1,-1 1-1,0 0 1,1-1-1,0 1 1,-1-1 0,1 0-1,-1 1 1,1-1-1,-1 1 1,1-1-1,0 0 1,-1 0-1,1 1 1,0-1-1,-1 0 1,1 0-1,0 0 1,0 1-16,1-1 0,0 1-1,1-1 1,-1 1-1,0-1 1,1 0 0,-1 0-1,0 0 1,1 0 0,-1 0-1,0 0 1,1-1 0,-2 0-10,1 1-1,0-1 1,0 0 0,-1 0 0,1 0-1,-1 0 1,1-1 0,-1 1 0,1 0-1,-1-1 1,0 1 0,0-1-1,1 0 11,6-7-346,-8 9 357,0 1-1,-1 0 1,1 0 0,0-1-1,0 1 1,-1 0 0,1 0-1,0 0 1,0 0 0,0-1-1,0 1 1,0 0 0,0 0-1,0 0 1,0 0 0,0-1-1,1 1 1,-1 0 0,0 0-1,1 0 1,-1-1 0,0 1-1,1 0 1,-1-1 0,1 1-1,-1 0-10,15 18 128,-15-18-203,1-1 0,0 1 0,-1-1 0,1 1 0,0-1 0,0 0 0,-1 1 0,1-1 0,0 0 0,0 1 0,-1-1 0,1 0 0,0 0 0,0 0 0,0 0 0,0 0 0,-1 0 0,1 0 0,0 0 1,0 0-1,0 0 0,-1 0 0,1-1 0,0 1 0,0 0 0,0-1 0,-1 1 0,1 0 0,0-1 0,-1 1 0,1-1 0,0 1 0,0-1 75,6-5-2960</inkml:trace>
   <inkml:trace contextRef="#ctx0" brushRef="#br0" timeOffset="5146.815">771 7 7168,'-2'-7'2246,"4"8"-714,-2 0-1432,1 0 1,0 0 0,-1 0-1,1 0 1,0 0 0,-1 1-1,0-1 1,1 0 0,-1 0-1,0 1 1,1-1-101,6 56 1059,-4-25-736,2-1-1,1 0 1,3 8-323,29 71 181,-35-98-490</inkml:trace>
@@ -1694,15 +1694,15 @@
   <inkml:trace contextRef="#ctx0" brushRef="#br0" timeOffset="-4672.809">533 1703 5120,'0'-1'132,"0"1"0,0 0 0,0-1-1,1 1 1,-1-1 0,0 1 0,0 0 0,1-1 0,-1 1 0,0-1 0,1 1 0,-1 0 0,0 0-1,1-1 1,-1 1 0,0 0 0,1-1 0,-1 1 0,0 0 0,1 0 0,0-1-132,3-1 1283,-4 2-1240,0 0 0,0 0 0,0 0 0,1 0 0,-1 0 1,0 0-1,0 0 0,0 0 0,0-1 0,0 1 0,0 0 0,0 0 0,0 0 0,1 0 0,-1 0 0,0 0 0,0-1 1,0 1-1,0 0 0,0 0 0,0 0 0,0 0 0,0 0 0,0-1 0,0 1 0,0 0 0,0 0 0,0 0 0,0 0 1,0 0-1,0-1 0,0 1 0,0 0 0,0 0 0,0 0 0,0 0 0,0 0 0,-1 0 0,1-1 0,0 1 0,0 0 1,0 0-1,0 0 0,0 0 0,0 0 0,0 0 0,0 0 0,0-1 0,-1 1 0,1 0 0,0 0 0,0 0 0,0 0 1,0 0-1,0 0 0,-1 0 0,1 0 0,0 0 0,0 0 0,0 0 0,0 0 0,0 0 0,-1 0 0,1 0 0,0 0 1,0 0-1,0 0-43,-11-2 686,6 3-670,0 0-1,0 1 1,0 0-1,0 0 1,1 0-1,-1 0 1,1 1-1,-1-1 0,1 1 1,0 0-1,0 1 1,0-1-1,1 1 1,-4 3-16,5-4 3,-1 0 0,1 0 0,0 0 0,0 0 0,0 1 0,1-1 0,-1 1 0,1-1 0,-1 1 0,1-1 0,0 1 0,1 0 0,-1 0 0,1-1 0,0 1 0,-1 0 0,2 0 1,-1 0-1,0-1 0,1 3-3,-1-5 7,0 1 0,1-1 0,-1 1 0,1-1 0,-1 1 0,1-1 0,-1 0 0,1 1 0,0-1 0,-1 0 1,1 1-1,0-1 0,0 0 0,0 0 0,0 0 0,0 0 0,0 0 0,0 0 0,1 0 0,-1 0 0,0-1 1,0 1-1,1 0 0,-1-1 0,0 1 0,1-1 0,-1 1 0,1-1 0,-1 1 0,1-1 0,-1 0 0,1 0 1,-1 0-1,1 0 0,-1 0 0,1 0 0,-1-1 0,1 1 0,-1 0 0,0-1 0,1 1-7,3-2-16,0 0-1,0 0 0,-1 0 0,1-1 1,-1 1-1,1-1 0,-1 0 0,0 0 1,0-1-1,-1 1 0,2-3 17,18-24-233,-22 28 212,0 0 1,0 0-1,0 1 1,0-1 0,0 0-1,-1 0 1,1 0-1,0 0 1,-1 0 0,0 0-1,1 0 1,-1 0-1,0-1 1,0 1 0,0 0-1,-1-2 21,1 4 5,0 0-1,0-1 1,0 1-1,0 0 1,0 0-1,0-1 1,0 1-1,0 0 1,0 0-1,-1 0 1,1-1-1,0 1 1,0 0-1,0 0 1,0-1-1,0 1 1,-1 0-1,1 0 1,0 0-1,0-1 0,0 1 1,-1 0-1,1 0 1,0 0-1,0 0 1,-1 0-1,1 0 1,0-1-1,0 1 1,-1 0-1,1 0 1,0 0-1,0 0 1,-1 0-1,1 0 1,0 0-1,0 0 1,-1 0-1,1 0 1,0 0-1,0 0 1,-1 0-1,1 0 1,0 1-1,0-1 1,-1 0-1,1 0 1,0 0-1,0 0 1,0 0-1,-1 0 1,1 1-1,0-1 1,0 0-1,0 0 1,-1 0-1,1 1 0,0-1 1,0 0-1,0 0 1,0 0-1,0 1 1,0-1-1,-1 0 1,1 0-5,-9 16 322,9-12-335,-1 0 0,0 0 0,1 0 0,0 0 0,0-1 0,0 1 1,0 0-1,1 0 0,0 0 0,-1-1 0,1 1 0,1 0 0,-1 0 1,0-1-1,1 1 0,0-1 0,1 2 13,4 3-517</inkml:trace>
   <inkml:trace contextRef="#ctx0" brushRef="#br0" timeOffset="-4301.778">727 1684 6400,'-1'-1'242,"-1"0"0,1 0 0,0 0 0,-1 0-1,1 0 1,-1 1 0,1-1 0,-1 1 0,1-1 0,-1 1 0,0-1 0,1 1 0,-1 0 0,1 0 0,-1 0 0,0 0 0,1 0-1,-1 0 1,1 0 0,-1 1 0,0-1 0,1 0 0,-1 1 0,0 0-242,1-1 24,0 0 1,0 0-1,0 1 0,0-1 1,0 1-1,0-1 0,0 1 1,0-1-1,0 1 0,0-1 1,1 1-1,-1 0 0,0-1 1,0 1-1,0 0 0,1 0 1,-1 0-1,1-1 0,-1 1 0,0 0 1,1 0-1,0 0 0,-1 0 1,1 0-1,-1 0 0,1 0 1,0 0-1,0 0 0,0 0 1,0 0-1,0 1 0,0-1 1,0 0-1,0 0 0,0 0 1,0 0-1,0 0 0,1 0-24,2 7 23,1-1-1,0 1 1,0-1-1,1 0 1,0 0-23,-1-2-10,0 0 1,-1 1 0,1-1-1,-1 1 1,0 0-1,-1 0 1,1 1 0,0 3 9,-3-9 47,0 1 0,0-1 0,0 0 1,0 0-1,0 0 0,-1 1 0,1-1 1,0 0-1,-1 0 0,1 0 0,0 1 1,-1-1-1,0 0 0,1 0 0,-1 0 1,0 0-1,1 0 0,-1 0 0,0 0 1,0 0-1,0-1 0,0 1 0,0 0 1,0 0-1,0-1 0,0 1 0,0-1 1,0 1-1,0-1 0,0 1 0,-1-1 1,1 0-1,0 1-47,-8 1-133,1 1 1,-1-1-1,0-1 0,-2 0 133,5 0-394,0-1-384</inkml:trace>
   <inkml:trace contextRef="#ctx0" brushRef="#br0" timeOffset="-3869.556">808 1782 4224,'0'0'134,"-1"1"1,1-1-1,0 0 1,-1 0 0,1 0-1,0 0 1,-1 1-1,1-1 1,0 0-1,0 0 1,-1 1-1,1-1 1,0 0-1,0 1 1,-1-1 0,1 0-1,0 1 1,0-1-1,0 0 1,0 1-1,-1-1 1,1 0-1,0 1 1,0-1-1,0 0 1,0 1-1,0-1 1,0 1 0,0-1-1,0 0 1,0 1-1,0-1 1,0 0-1,0 1-134,1-1 121,-1 1 1,1-1-1,-1 0 0,0 0 1,1 1-1,-1-1 0,1 0 0,-1 0 1,0 0-1,1 0 0,-1 0 0,1 0 1,-1 0-1,0 0 0,1 0 0,-1 0 1,1 0-1,-1 0 0,1 0 0,-1 0 1,1 0-1,-1 0 0,0 0 0,1-1 1,-1 1-1,1 0 0,-1 0 0,0 0 1,1-1-1,-1 1 0,0 0 0,1-1 1,-1 1-122,5-3 36,0-1 0,0 0 0,0 0 0,-1-1 0,0 1 0,1-1 1,-2 0-1,2-1-36,-4 5 1,0 0 0,0 0 1,-1 0-1,1-1 0,0 1 0,0 0 1,-1-1-1,1 1 0,-1-1 1,1 1-1,-1-1 0,0 1 1,0 0-1,1-1 0,-1 1 1,0-1-1,0 1 0,-1-1 0,1 1 1,0-1-1,0 1 0,-1-1 1,1 1-1,-1-1 0,1 1 1,-1 0-1,1-1 0,-1 1 0,0 0 1,0-1-1,0 1 0,0 0 1,0 0-1,0 0 0,0 0 1,-1-1-2,1 1-8,0 0 0,0 0 0,-1 0 0,1 1 0,0-1 0,0 0 1,-1 1-1,1-1 0,-1 0 0,1 1 0,0 0 0,-1-1 0,1 1 0,-1 0 1,1 0-1,-1 0 0,1 0 0,-1 0 0,1 0 0,-1 0 0,1 0 1,-2 1 7,1 0 3,0 0 1,0 0-1,1 0 1,-1 0-1,0 1 1,0-1-1,1 1 1,-1-1-1,1 1 1,-1-1 0,1 1-1,0 0 1,0 0-1,-1 0-3,-1 4 54,0 0-1,0 0 0,1 0 1,0 1-1,0-1 1,0 0-1,1 1 0,0-1 1,0 7-54,1-5 26,1 0 1,-1 0-1,2 0 1,-1 0-1,2 4-26,-2-10-25,-1 0-1,1 0 0,-1 0 1,1-1-1,0 1 1,-1 0-1,1-1 0,0 1 1,0 0-1,0-1 1,1 0-1,-1 1 0,0-1 1,0 1-1,1-1 1,-1 0-1,1 0 0,-1 0 1,1 0-1,-1 0 1,1 0-1,0 0 0,0-1 1,-1 1-1,1-1 1,1 1 25,8-1-384</inkml:trace>
-  <inkml:trace contextRef="#ctx0" brushRef="#br0" timeOffset="-3505.37">919 1758 5632,'14'20'4933,"2"17"-2288,-9-18-1775,-4-11-660,1-1 950,-6-17-568,1 5-619,0 0-1,1 1 0,-1-1 1,1 0-1,0 0 1,1 1-1,-1-1 0,2-4 28,-2 7-19,1 0-1,-1 0 0,1 0 0,0 0 1,-1 0-1,1 1 0,0-1 1,1 0-1,-1 0 0,0 1 1,0-1-1,1 0 0,-1 1 0,1-1 1,-1 1-1,1 0 0,0 0 1,-1-1-1,1 1 0,0 0 1,0 0 19,10-3-464</inkml:trace>
-  <inkml:trace contextRef="#ctx0" brushRef="#br0" timeOffset="-2720.321">1357 1694 7040,'0'-1'73,"0"1"1,0 0 0,0 0-1,0 0 1,0 0-1,0-1 1,0 1 0,0 0-1,0 0 1,0 0-1,0 0 1,0-1 0,0 1-1,0 0 1,0 0-1,0 0 1,0 0-1,0-1 1,0 1 0,0 0-1,0 0 1,0 0-1,0 0 1,0-1 0,0 1-1,-1 0 1,1 0-1,0 0 1,0 0 0,0 0-1,0-1 1,0 1-1,0 0 1,-1 0 0,1 0-1,0 0 1,0 0-1,0 0 1,0 0 0,0 0-1,-1 0 1,1 0-1,0 0 1,0 0 0,0-1-1,0 1 1,-1 0-1,1 0 1,0 0 0,0 0-1,0 0 1,-1 1-74,-9 6 1005,8-5-1272,-7 8 248,-1 2-1,1-1 1,1 1 0,0 1-1,0-1 1,2 2 0,-1-1-1,0 5 20,6-15 69,0-1 0,0 1 0,0 0-1,1 0 1,-1-1 0,1 1 0,0 0 0,-1 0-1,1 0 1,1 0 0,-1 0 0,0-1-1,1 3-68,-1-4 3,1 0 0,-1 0 0,0 0 0,1 0-1,-1 0 1,1 0 0,-1 0 0,1 0 0,0-1-1,0 1 1,-1 0 0,1 0 0,0 0 0,0-1-1,0 1 1,0 0 0,-1-1 0,1 1 0,0-1-1,0 1 1,0-1 0,0 1 0,1-1 0,-1 0-1,0 0 1,0 1 0,0-1 0,0 0 0,0 0-1,0 0 1,0 0 0,0 0 0,1 0-1,-1-1 1,0 1-3,4-1 39,-1 1 1,0-2-1,1 1 0,-1 0 0,0-1 0,1 0 0,-1 0 0,0 0 0,0-1-39,12-7-58</inkml:trace>
+  <inkml:trace contextRef="#ctx0" brushRef="#br0" timeOffset="-3505.371">919 1758 5632,'14'20'4933,"2"17"-2288,-9-18-1775,-4-11-660,1-1 950,-6-17-568,1 5-619,0 0-1,1 1 0,-1-1 1,1 0-1,0 0 1,1 1-1,-1-1 0,2-4 28,-2 7-19,1 0-1,-1 0 0,1 0 0,0 0 1,-1 0-1,1 1 0,0-1 1,1 0-1,-1 0 0,0 1 1,0-1-1,1 0 0,-1 1 0,1-1 1,-1 1-1,1 0 0,0 0 1,-1-1-1,1 1 0,0 0 1,0 0 19,10-3-464</inkml:trace>
+  <inkml:trace contextRef="#ctx0" brushRef="#br0" timeOffset="-2720.322">1357 1694 7040,'0'-1'73,"0"1"1,0 0 0,0 0-1,0 0 1,0 0-1,0-1 1,0 1 0,0 0-1,0 0 1,0 0-1,0 0 1,0-1 0,0 1-1,0 0 1,0 0-1,0 0 1,0 0-1,0-1 1,0 1 0,0 0-1,0 0 1,0 0-1,0 0 1,0-1 0,0 1-1,-1 0 1,1 0-1,0 0 1,0 0 0,0 0-1,0-1 1,0 1-1,0 0 1,-1 0 0,1 0-1,0 0 1,0 0-1,0 0 1,0 0 0,0 0-1,-1 0 1,1 0-1,0 0 1,0 0 0,0-1-1,0 1 1,-1 0-1,1 0 1,0 0 0,0 0-1,0 0 1,-1 1-74,-9 6 1005,8-5-1272,-7 8 248,-1 2-1,1-1 1,1 1 0,0 1-1,0-1 1,2 2 0,-1-1-1,0 5 20,6-15 69,0-1 0,0 1 0,0 0-1,1 0 1,-1-1 0,1 1 0,0 0 0,-1 0-1,1 0 1,1 0 0,-1 0 0,0-1-1,1 3-68,-1-4 3,1 0 0,-1 0 0,0 0 0,1 0-1,-1 0 1,1 0 0,-1 0 0,1 0 0,0-1-1,0 1 1,-1 0 0,1 0 0,0 0 0,0-1-1,0 1 1,0 0 0,-1-1 0,1 1 0,0-1-1,0 1 1,0-1 0,0 1 0,1-1 0,-1 0-1,0 0 1,0 1 0,0-1 0,0 0 0,0 0-1,0 0 1,0 0 0,0 0 0,1 0-1,-1-1 1,0 1-3,4-1 39,-1 1 1,0-2-1,1 1 0,-1 0 0,0-1 0,1 0 0,-1 0 0,0 0 0,0-1-39,12-7-58</inkml:trace>
   <inkml:trace contextRef="#ctx0" brushRef="#br0" timeOffset="-2347.445">1457 1542 7552,'-3'-8'933,"3"6"-653,-1 0 0,1 0-1,-1 0 1,0 0 0,0 0 0,0 0-1,0 0 1,0 0 0,-1 1 0,1-1-1,-2-1-279,3 3 29,0 0 0,-1 0 1,1 0-1,-1 0 0,1 0 0,0 1 0,-1-1 0,1 0 0,0 0 0,-1 0 0,1 0 0,-1 0 0,1 1 0,0-1 0,-1 0 1,1 0-1,0 1 0,0-1 0,-1 0 0,1 0 0,0 1 0,0-1 0,-1 0 0,1 1 0,0-1 0,0 0 0,0 1 0,-1-1 1,1 1-30,-7 10 63,1 3 141,1 0-1,0 1 1,1-1-1,1 1 1,0 0 0,0 8-204,-1 27 301,2 15-301,1-44 8,1-11-21,-1-5-17,1-1 0,-1 1 0,1 0 0,1-1 0,-1 1 1,1 0-1,0-1 0,0 1 0,0 0 0,0-1 0,3 4 30,-1-5-186</inkml:trace>
   <inkml:trace contextRef="#ctx0" brushRef="#br0" timeOffset="-1997.063">1489 1783 7424,'-2'13'2816,"1"-6"-2208,1 5 416,1-5 64,1 0-800,0 3-192,-1 0-96,0-1 32,1-2 0,0-3-160,-2-4 0</inkml:trace>
   <inkml:trace contextRef="#ctx0" brushRef="#br0" timeOffset="-1996.063">1503 1657 8320,'-10'-13'3072,"9"11"-2400,1 1-32,0 1-128,0 3-448,0 1-96,0 2-576,1-1-224</inkml:trace>
   <inkml:trace contextRef="#ctx0" brushRef="#br0" timeOffset="-1628.088">1667 1776 6784,'-1'-1'206,"1"0"-1,-1 1 1,1-1 0,-1 0-1,0 0 1,0 0 0,1 0-1,-1 0 1,0 1 0,0-1 0,0 0-1,0 1 1,0-1 0,0 1-1,0-1 1,0 1 0,0 0 0,0-1-1,0 1 1,0 0 0,0 0-1,-1-1-205,0 1 77,0 0-1,0 1 1,0-1-1,0 0 1,0 1-1,0-1 1,0 1-1,0 0 1,0-1 0,0 1-1,0 0 1,-1 1-77,1 0 42,-1-1 0,0 1 1,1 0-1,-1 0 1,1 1-1,0-1 1,0 0-1,0 1 0,0-1 1,0 1-1,0 0 1,1-1-1,-1 1 1,1 0-1,0 0 1,0 0-1,0 1-42,0-3 1,1 1 0,0-1 0,0 1 0,0-1-1,0 1 1,0-1 0,1 1 0,-1-1 0,0 1 0,1-1 0,-1 1 0,1-1 0,-1 1 0,1-1-1,0 0 1,-1 1 0,1-1 0,0 0 0,0 0 0,0 1 0,0-1 0,0 0 0,0 0-1,2 0-14,-1 1 1,0-1-1,1 1 1,-1-1-1,1 0 0,-1 0 1,1 0-1,-1 0 1,1 0-1,0-1 1,-1 1-1,4-1 14,-2 0-6,0 0-1,0 0 0,0 0 1,0 0-1,0-1 0,0 0 1,-1 1-1,1-2 1,1 1 6,-3 0 20,0 0 1,0 1-1,0-1 1,0 0 0,-1-1-1,1 1 1,0 0-1,0 0 1,-1-1-1,1 1 1,-1-1 0,1 1-1,-1-1 1,0 0-1,0 0 1,1 0-21,-2 0 12,1 0 0,0 0 0,0 0 0,-1-1 0,1 1 1,-1 0-1,0 0 0,0-1 0,0 1 0,0 0 0,0-1 0,0 1 0,-1 0 0,1 0 0,-1-1 1,1 1-1,-1 0 0,0 0 0,0 0 0,0 0 0,0 0 0,0 0 0,-1 0 0,1 0 0,-1 0 1,0 0-13,1 0 8,-1 0 0,0 1 1,0-1-1,0 0 0,0 1 1,0-1-1,0 1 0,0 0 1,0-1-1,0 1 0,-1 0 1,1 1-1,-1-1 0,1 0 1,-1 1-1,1-1 0,-1 1 1,1 0-1,-1 0 1,1 0-1,-1 0 0,1 0 1,-2 1-9,-6 2-272</inkml:trace>
   <inkml:trace contextRef="#ctx0" brushRef="#br0" timeOffset="-1268.112">1867 1779 512,'1'0'206,"-1"0"1,1-1-1,-1 1 1,1 0-1,-1-1 1,1 1-1,-1 0 1,1-1-1,-1 1 1,0-1-1,1 1 1,-1-1-1,0 1 1,0-1-1,1 1 1,-1-1-1,0 1 1,0-1-1,0 0 1,1 1-1,-1-1 0,0 1 1,0-1-1,0 1 1,0-1-1,0 0 1,0 1-207,-1-1 235,1 1-1,0-1 1,-1 0-1,1 1 1,-1-1 0,1 1-1,-1-1 1,0 1 0,1-1-1,-1 1 1,1 0 0,-1-1-1,0 1 1,1 0-1,-1-1 1,0 1 0,1 0-1,-1 0-234,-4-2 320,1 1 0,0 1 0,0-1-1,-1 0 1,1 1 0,-5 0-320,5 1 25,0 0 0,0 0 1,0 1-1,0-1 0,1 1 0,-1 0 1,0 0-1,1 0 0,-1 0 1,1 1-1,0-1 0,-1 1 0,1 0 1,1 0-1,-1 0 0,0 0 0,1 1 1,-1-1-1,1 1 0,0-1 0,0 1 1,1 0-1,-1 0 0,1 0 0,0 0 1,0 0-1,0 0 0,0 0 0,1 0 1,0 0-1,-1 0 0,2 0 0,-1 1 1,1 2-26,-1-6 1,0 0 1,0 0-1,1-1 1,-1 1-1,0 0 1,1 0-1,-1 0 1,1 0-1,-1 0 1,1 0 0,-1-1-1,1 1 1,0 0-1,-1 0 1,1-1-1,0 1 1,0 0-1,-1-1 1,1 1-1,0-1 1,0 1-1,0-1 1,0 0 0,0 1-2,1-1-22,-1 0 0,1 1 0,0-1 0,0 0 0,-1 0 0,1 0 0,0-1 0,0 1 0,-1 0 0,1-1 0,0 1 0,-1-1 1,1 0 21,4-1-95,-1-1 1,0 0 0,0 0-1,0 0 1,0 0 0,0-1-1,-1 0 1,1 0 94,15-22-469</inkml:trace>
   <inkml:trace contextRef="#ctx0" brushRef="#br0" timeOffset="-899.418">1988 1542 6272,'0'-2'109,"-6"-18"3101,5 20-3141,1 0 0,0-1 0,-1 1 0,1 0-1,0-1 1,-1 1 0,1 0 0,0 0 0,-1-1 0,1 1-1,-1 0 1,1 0 0,0 0 0,-1-1 0,1 1-1,-1 0 1,1 0 0,0 0 0,-1 0 0,1 0 0,-1 0-1,1 0 1,-1 0 0,1 0 0,-1 0 0,1 0-1,0 0 1,-1 0 0,1 1 0,-1-1 0,1 0-1,-1 0 1,1 0 0,0 1 0,-1-1 0,1 0 0,0 0-1,-1 1 1,1-1 0,0 0 0,-1 1 0,1-1-1,0 0 1,0 1 0,-1-1 0,1 0-69,-9 11 175,-1 0 1,2 0-1,-1 1 1,2 0-1,0 1 0,0 0 1,1 0-1,1 0 1,-2 7-176,2-6-86,1 0 1,1 0 0,1 1-1,0-1 1,1 1 0,0-1-1,1 1 1,1 9 85,3-7-533</inkml:trace>
-  <inkml:trace contextRef="#ctx0" brushRef="#br0" timeOffset="-536.708">1977 1806 3328,'0'1'141,"-1"-1"0,1 0 0,0 0 0,-1 1 0,1-1 0,0 0 1,-1 1-1,1-1 0,0 0 0,-1 1 0,1-1 0,0 0 0,-1 1 0,1-1 0,0 1 0,0-1 1,0 1-1,-1-1 0,1 0 0,0 1 0,0-1 0,0 1 0,0-1 0,0 1 0,0-1 0,0 1 1,0-1-1,0 1 0,0-1 0,0 1 0,0-1 0,0 1 0,1-1 0,-1 0 0,0 1 0,0-1 1,0 1-1,1-1 0,-1 1 0,0-1 0,0 0 0,1 1 0,-1-1 0,0 0 0,1 1 0,-1-1 1,1 0-142,-1 1 128,1 0 0,0-1 1,0 1-1,0 0 0,0-1 1,0 1-1,0-1 0,0 1 1,0-1-1,0 0 1,0 1-1,0-1 0,0 0 1,0 0-1,0 0 0,1 0 1,-1 0-1,0 0 1,0 0-1,0 0 0,0 0 1,1-1-129,2 0 27,0 0 0,0-1 0,-1 0 0,1 0 1,0 0-1,-1-1 0,1 1 0,-1-1 0,0 0 1,0 0-1,2-3-27,-4 5-30,0 0 1,0 0-1,0-1 0,0 1 1,-1 0-1,1-1 1,-1 1-1,1 0 1,-1-1-1,1 1 0,-1 0 1,0-1-1,1 1 1,-1-1-1,0 1 1,0-1-1,0 1 0,0-1 1,-1 1-1,1-1 1,0 1-1,-1 0 1,1-1-1,-1 1 0,1 0 1,-1-1-1,1 1 1,-1 0-1,0-1 1,0 1-1,0 0 0,0 0 1,0 0-1,0 0 1,0-1 29,0 2-7,0-1 1,0 0 0,0 1 0,1-1-1,-1 0 1,0 1 0,0-1 0,0 1-1,0 0 1,0-1 0,0 1 0,0 0-1,0-1 1,0 1 0,0 0 0,0 0-1,0 0 1,0 0 0,-1 0 0,1 0-1,0 1 7,-2-1 7,1 1 1,-1 0-1,1-1 0,-1 1 0,1 1 0,0-1 1,-1 0-1,1 0 0,0 1-7,-3 2 26,1-1 1,-1 1-1,1 0 0,0 0 1,1 0-1,-1 1 0,1-1 1,-1 2-27,3-4 62,0 0 0,0 1 0,0-1 0,0 0 0,0 0 1,0 0-1,1 1 0,0-1 0,-1 0 0,1 0 1,0 1-1,0-1 0,0 0 0,0 1 0,0-1 0,1 0 1,-1 0-1,1 1 0,-1-1 0,1 0 0,0 0 0,0 0 1,1 1-63,-1 0 28,1 0 1,1-1 0,-1 1 0,0 0-1,1-1 1,-1 0 0,1 0 0,0 0-1,0 0 1,0 0 0,0 0 0,0-1-1,0 1 1,0-1 0,2 1-29,49 12-421,-28-8-219</inkml:trace>
+  <inkml:trace contextRef="#ctx0" brushRef="#br0" timeOffset="-536.709">1977 1806 3328,'0'1'141,"-1"-1"0,1 0 0,0 0 0,-1 1 0,1-1 0,0 0 1,-1 1-1,1-1 0,0 0 0,-1 1 0,1-1 0,0 0 0,-1 1 0,1-1 0,0 1 0,0-1 1,0 1-1,-1-1 0,1 0 0,0 1 0,0-1 0,0 1 0,0-1 0,0 1 0,0-1 0,0 1 1,0-1-1,0 1 0,0-1 0,0 1 0,0-1 0,0 1 0,1-1 0,-1 0 0,0 1 0,0-1 1,0 1-1,1-1 0,-1 1 0,0-1 0,0 0 0,1 1 0,-1-1 0,0 0 0,1 1 0,-1-1 1,1 0-142,-1 1 128,1 0 0,0-1 1,0 1-1,0 0 0,0-1 1,0 1-1,0-1 0,0 1 1,0-1-1,0 0 1,0 1-1,0-1 0,0 0 1,0 0-1,0 0 0,1 0 1,-1 0-1,0 0 1,0 0-1,0 0 0,0 0 1,1-1-129,2 0 27,0 0 0,0-1 0,-1 0 0,1 0 1,0 0-1,-1-1 0,1 1 0,-1-1 0,0 0 1,0 0-1,2-3-27,-4 5-30,0 0 1,0 0-1,0-1 0,0 1 1,-1 0-1,1-1 1,-1 1-1,1 0 1,-1-1-1,1 1 0,-1 0 1,0-1-1,1 1 1,-1-1-1,0 1 1,0-1-1,0 1 0,0-1 1,-1 1-1,1-1 1,0 1-1,-1 0 1,1-1-1,-1 1 0,1 0 1,-1-1-1,1 1 1,-1 0-1,0-1 1,0 1-1,0 0 0,0 0 1,0 0-1,0 0 1,0-1 29,0 2-7,0-1 1,0 0 0,0 1 0,1-1-1,-1 0 1,0 1 0,0-1 0,0 1-1,0 0 1,0-1 0,0 1 0,0 0-1,0-1 1,0 1 0,0 0 0,0 0-1,0 0 1,0 0 0,-1 0 0,1 0-1,0 1 7,-2-1 7,1 1 1,-1 0-1,1-1 0,-1 1 0,1 1 0,0-1 1,-1 0-1,1 0 0,0 1-7,-3 2 26,1-1 1,-1 1-1,1 0 0,0 0 1,1 0-1,-1 1 0,1-1 1,-1 2-27,3-4 62,0 0 0,0 1 0,0-1 0,0 0 0,0 0 1,0 0-1,1 1 0,0-1 0,-1 0 0,1 0 1,0 1-1,0-1 0,0 0 0,0 1 0,0-1 0,1 0 1,-1 0-1,1 1 0,-1-1 0,1 0 0,0 0 0,0 0 1,1 1-63,-1 0 28,1 0 1,1-1 0,-1 1 0,0 0-1,1-1 1,-1 0 0,1 0 0,0 0-1,0 0 1,0 0 0,0 0 0,0-1-1,0 1 1,0-1 0,2 1-29,49 12-421,-28-8-219</inkml:trace>
   <inkml:trace contextRef="#ctx0" brushRef="#br0" timeOffset="1983.607">502 2016 7040,'0'25'4880,"-4"73"-4283,1-62-265,1-17-266,0 0 0,2 1 1,0-1-1,2 6-66,-2-24 5,0 0-12,0 0 1,0 0-1,0 0 0,0-1 1,1 1-1,-1 0 1,0-1-1,0 1 1,0 0-1,1 0 1,-1-1-1,0 1 1,1 0-1,-1-1 1,1 1-1,-1-1 1,1 1 6,3-2-240</inkml:trace>
   <inkml:trace contextRef="#ctx0" brushRef="#br0" timeOffset="2410.551">565 2236 6144,'4'2'3284,"-2"-1"-3069,0-1 1,0 0 0,0 0 0,0 0 0,0 0 0,0 0 0,-1-1-1,1 1 1,1 0-216,4-4 142,-1 0 0,1 0-1,-1 0 1,1-1-1,-1 0 1,0 0 0,-1-1-1,1 1 1,-1-1-142,-5 5 8,1 0 0,-1 1 1,1-1-1,-1 0 0,1 1 0,-1-1 0,0 0 1,1 1-1,-1-1 0,0 0 0,0 0 1,0 0-1,0 1 0,1-1 0,-1 0 0,0 0 1,0 1-1,-1-1 0,1 0 0,0 0 0,0 0 1,0 1-1,0-1 0,-1 0 0,1 0 1,0 1-1,-1-1-8,0 0 14,1 0 0,-1 0 0,-1 0 0,1 0 0,0 0 0,0 0 0,0 0 1,0 0-1,-1 1 0,1-1 0,0 1 0,0-1 0,-1 1 0,0-1-14,-2 0 7,1 0 0,-1 0 0,0 1 0,1-1 0,-1 1 0,0 0 0,0 0 0,1 1 0,-1-1 0,0 1 0,-2 0-7,4 0 1,-1 0 0,1 1 0,0 0-1,0-1 1,-1 1 0,1 0 0,0 0 0,1 0 0,-1 0 0,0 0 0,1 1 0,-1-1-1,1 0 1,-1 1 0,1-1 0,0 1 0,0 0 0,0-1 0,1 1 0,-1 0 0,1-1-1,-1 1 1,1 0 0,0 0 0,0 0 0,0 2-1,1 1 9,-1 1-1,1-1 1,0 1-1,0-1 1,0 0-1,1 0 1,0 0 0,0 0-1,1 0 1,0 0-1,1 1-8,-3-4-35,1 0 0,-1-1 0,1 0 0,0 1 0,0-1 0,0 0 0,0 0 0,1 0 0,-1 0 0,0 0 0,1 0 0,0-1 0,-1 1 0,1-1 0,0 0 0,1 1 35,6-3-1114</inkml:trace>
   <inkml:trace contextRef="#ctx0" brushRef="#br0" timeOffset="2848.605">722 2169 5120,'1'0'408,"0"1"0,0 0-1,-1 0 1,1 0 0,0 1 0,-1-1 0,1 0 0,0 0-1,-1 0 1,0 0 0,1 1 0,-1-1 0,0 0 0,1 1-408,4 20 1703,-1 6-917,7 27-116,-12-55-663,1 0 0,0 1 1,0-1-1,0 0 0,1 0 0,-1 1 0,0-1 1,0 0-1,0 0 0,0 0 0,0 1 0,0-1 1,0 0-1,0 0 0,0 0 0,0 1 0,1-1 1,-1 0-1,0 0 0,0 0 0,0 0 0,0 1 1,1-1-1,-1 0 0,0 0 0,0 0 1,0 0-1,0 0 0,1 0 0,-1 1 0,0-1 1,0 0-1,1 0 0,-1 0 0,0 0 0,0 0 1,0 0-1,1 0 0,-1 0-7,7-8 39,5-17-134,-11 23 121,1-2-26,0-2-142,0 0-1,1 1 1,0-1-1,0 1 1,0 0-1,0-1 1,1 2 0,0-1-1,0 0 1,4-3 142,-8 8-9,1 0 1,-1 0 0,0 0 0,0 0-1,1 0 1,-1 1 0,0-1 0,0 0-1,1 0 1,-1 0 0,0 0 0,0 0-1,0 0 1,0 1 0,1-1 0,-1 0-1,0 0 1,0 0 0,0 1 0,0-1-1,0 0 1,1 0 0,-1 0-1,0 1 1,0-1 0,0 0 0,0 0-1,0 1 1,0-1 0,0 0 0,0 0-1,0 0 1,0 1 0,0-1 0,0 0-1,0 0 1,0 1 0,0-1 0,0 0-1,0 0 1,0 1 8,1 17 412,0-12-187,-1-4-178,2 11 216,0 0 1,3 9-264,-5-19-4,1-1 1,0 1-1,0 0 1,0-1-1,0 1 1,0-1-1,1 0 1,-1 1-1,1-1 1,-1 0-1,1 0 1,0 0-1,0 0 1,0 0-1,0 0 1,1 0 3,6 1-64</inkml:trace>
@@ -1731,7 +1731,7 @@
   <inkml:trace contextRef="#ctx0" brushRef="#br0" timeOffset="22307.907">2146 2477 7808,'-3'-15'2592,"3"15"-2568,0 0 1,0 0-1,0 0 1,0 0-1,0 0 1,0 0-1,0 0 1,0-1-1,0 1 1,0 0-1,0 0 1,0 0-1,0 0 1,0 0-1,0 0 1,0 0-1,-1 0 1,1 0-1,0 0 1,0 0 0,0 0-1,0 0 1,0-1-1,0 1 1,0 0-1,0 0 1,0 0-1,0 0 1,0 0-1,0 0 1,0 0-1,0 0 1,-1 0-1,1 0 1,0 0-1,0 0 1,0 0-1,0 0 1,0 0-1,0 0 1,0 0-1,0 0 1,0 0-1,0 0 1,-1 0-1,1 0 1,0 0-1,0 0 1,0 0-1,0 0 1,0 0 0,0 0-1,0 1 1,0-1-1,0 0-24,-5 5 434,-2 8-366,-31 79 2654,-25 94-2722,47-135 377,15-47-444,-5 14 48,6-17-21,0 0-1,0-1 1,-1 1-1,1 0 1,0-1-1,0 1 0,0-1 1,0 1-1,0 0 1,0-1-1,0 1 1,1 0-1,-1-1 0,0 1 1,0 0-1,0-1 1,1 1-1,-1-1 1,0 1-1,0-1 0,1 1 1,-1 0-1,1-1 41,4 2-858</inkml:trace>
   <inkml:trace contextRef="#ctx0" brushRef="#br0" timeOffset="22673.621">2167 2718 7680,'-2'-5'2880,"2"12"-2240,-2 7-160,2-7-256,-1 1-224,-1 2 64,0 0 32,1 0 32,-1 0-64,1-1-128,1-1-32,0-1 192,0-1 96,0-2-256,0 2 0</inkml:trace>
   <inkml:trace contextRef="#ctx0" brushRef="#br0" timeOffset="23024.165">2192 2631 7936,'-2'-10'2976,"2"10"-2304,0 1-192,0-1-192,2 3-480</inkml:trace>
-  <inkml:trace contextRef="#ctx0" brushRef="#br0" timeOffset="23406.839">2367 2683 7424,'-1'-1'200,"0"0"0,-1 1 0,1-1 0,0 0 0,0 1 1,-1-1-1,1 1 0,-1 0 0,1-1 0,0 1 0,-1 0 0,1 0 0,-1 0 1,1 0-1,0 0 0,-1 0 0,1 0 0,-1 0 0,0 1-200,-1 0 127,-1 0 0,1 1-1,-1-1 1,1 1 0,0-1-1,0 1 1,0 0 0,-1 1-127,-2 2 89,-1 1-1,1 0 1,0 0 0,0 1 0,1-1 0,-4 7-89,7-10 71,0 0 0,1 0-1,0 0 1,-1 1 0,1-1 0,0 0 0,0 0-1,1 1 1,-1-1 0,1 0 0,0 3-71,0-5 9,0 0 0,0 0 0,0-1 0,0 1 0,0 0 0,0 0 0,1-1 0,-1 1 0,0 0 0,0 0 0,1-1 0,-1 1 0,1-1 0,-1 1 0,1 0 0,-1-1 0,1 1 0,-1-1 0,1 1 0,-1-1 0,1 1-9,0-1-8,1 1-1,-1-1 1,0 1 0,0-1-1,1 0 1,-1 0 0,0 1-1,1-1 1,-1 0 0,0 0-1,1 0 1,-1-1 0,0 1 0,0 0-1,1 0 1,-1-1 0,0 1 8,3-1-11,-1 0 0,0-1 0,0 1 1,0-1-1,0 1 0,0-1 1,0 0-1,-1 0 0,1 0 1,-1 0-1,1-1 0,1-1 11,2-5-435,1 0 0,-1 0-1,1-2 436,-5 7-288,-3 6 201,0 1-1,1 0 1,-1 0-1,1 0 1,0-1 0,-1 1-1,1 1 88,0 6-23,-8 61 391,-5 36 59,12-102-386,-1 1-1,1-1 1,-1 1-1,0-1 1,0 0 0,-1 0-1,0 0-40,3-4 10,0 0 0,-1 0 1,1 0-1,-1 0 0,1-1 0,-1 1 0,1 0 0,-1-1 1,1 1-1,-1 0 0,0-1 0,1 1 0,-1-1 0,0 1 1,0-1-1,1 1 0,-1-1 0,0 1 0,0-1 1,0 0-1,0 1 0,0-1 0,1 0 0,-1 0 0,0 0 1,0 0-1,0 0 0,0 0 0,0 0 0,0 0 0,0 0 1,0 0-1,1 0 0,-1-1 0,0 1 0,0 0 0,0-1 1,0 1-1,1-1 0,-1 1 0,0-1 0,0 1 0,1-1 1,-1 1-1,0-1 0,0 0-10,-3-3 28,1 0-1,-1 0 1,1-1 0,0 1-1,0-1 1,1 0 0,-1 1-1,0-4-27,2 6 12,0-1-1,0 0 1,0 0-1,0-1 1,0 1 0,1 0-1,-1 0 1,1 0-1,0 0 1,0-1-1,0 1 1,0 0-1,1 0 1,-1 0 0,1 0-12,0 1 11,0 0-1,0 1 1,0-1 0,1 1 0,-1-1 0,0 1 0,1 0 0,-1-1 0,1 1 0,-1 0 0,1 0 0,0 0 0,-1 0 0,1 0 0,0 1 0,0-1-1,0 0 1,-1 1 0,1-1 0,1 1-11,6-2-183,0 0 0,1 1 0,4 0 183,2 1-2389</inkml:trace>
+  <inkml:trace contextRef="#ctx0" brushRef="#br0" timeOffset="23406.838">2367 2683 7424,'-1'-1'200,"0"0"0,-1 1 0,1-1 0,0 0 0,0 1 1,-1-1-1,1 1 0,-1 0 0,1-1 0,0 1 0,-1 0 0,1 0 0,-1 0 1,1 0-1,0 0 0,-1 0 0,1 0 0,-1 0 0,0 1-200,-1 0 127,-1 0 0,1 1-1,-1-1 1,1 1 0,0-1-1,0 1 1,0 0 0,-1 1-127,-2 2 89,-1 1-1,1 0 1,0 0 0,0 1 0,1-1 0,-4 7-89,7-10 71,0 0 0,1 0-1,0 0 1,-1 1 0,1-1 0,0 0 0,0 0-1,1 1 1,-1-1 0,1 0 0,0 3-71,0-5 9,0 0 0,0 0 0,0-1 0,0 1 0,0 0 0,0 0 0,1-1 0,-1 1 0,0 0 0,0 0 0,1-1 0,-1 1 0,1-1 0,-1 1 0,1 0 0,-1-1 0,1 1 0,-1-1 0,1 1 0,-1-1 0,1 1-9,0-1-8,1 1-1,-1-1 1,0 1 0,0-1-1,1 0 1,-1 0 0,0 1-1,1-1 1,-1 0 0,0 0-1,1 0 1,-1-1 0,0 1 0,0 0-1,1 0 1,-1-1 0,0 1 8,3-1-11,-1 0 0,0-1 0,0 1 1,0-1-1,0 1 0,0-1 1,0 0-1,-1 0 0,1 0 1,-1 0-1,1-1 0,1-1 11,2-5-435,1 0 0,-1 0-1,1-2 436,-5 7-288,-3 6 201,0 1-1,1 0 1,-1 0-1,1 0 1,0-1 0,-1 1-1,1 1 88,0 6-23,-8 61 391,-5 36 59,12-102-386,-1 1-1,1-1 1,-1 1-1,0-1 1,0 0 0,-1 0-1,0 0-40,3-4 10,0 0 0,-1 0 1,1 0-1,-1 0 0,1-1 0,-1 1 0,1 0 0,-1-1 1,1 1-1,-1 0 0,0-1 0,1 1 0,-1-1 0,0 1 1,0-1-1,1 1 0,-1-1 0,0 1 0,0-1 1,0 0-1,0 1 0,0-1 0,1 0 0,-1 0 0,0 0 1,0 0-1,0 0 0,0 0 0,0 0 0,0 0 0,0 0 1,0 0-1,1 0 0,-1-1 0,0 1 0,0 0 0,0-1 1,0 1-1,1-1 0,-1 1 0,0-1 0,0 1 0,1-1 1,-1 1-1,0-1 0,0 0-10,-3-3 28,1 0-1,-1 0 1,1-1 0,0 1-1,0-1 1,1 0 0,-1 1-1,0-4-27,2 6 12,0-1-1,0 0 1,0 0-1,0-1 1,0 1 0,1 0-1,-1 0 1,1 0-1,0 0 1,0-1-1,0 1 1,0 0-1,1 0 1,-1 0 0,1 0-12,0 1 11,0 0-1,0 1 1,0-1 0,1 1 0,-1-1 0,0 1 0,1 0 0,-1-1 0,1 1 0,-1 0 0,1 0 0,0 0 0,-1 0 0,1 0 0,0 1 0,0-1-1,0 0 1,-1 1 0,1-1 0,1 1-11,6-2-183,0 0 0,1 1 0,4 0 183,2 1-2389</inkml:trace>
   <inkml:trace contextRef="#ctx0" brushRef="#br0" timeOffset="23808.198">2432 2556 640,'6'-8'1137,"-5"8"-913,-1 0 0,1 0 0,-1 0-1,0 0 1,1 0 0,-1 0 0,1 0 0,-1 0 0,0 0 0,1 0 0,-1 1-1,1-1 1,-1 0 0,0 0 0,1 0 0,-1 0 0,1 1 0,-1-1-1,0 0 1,1 0 0,-1 1 0,0-1 0,1 0 0,-1 0 0,0 1-1,0-1-223,9 13 4801,-5-4-5477,-1 7 1024,0 1 0,-1 0 1,-1-1-1,0 1 0,-1 0 0,-1 0 0,-1 1-348,1 10 312,0-1 1,2 2-313,-1-28 6,0 0 1,0 0-1,0 0 1,0 0-1,1 0 1,-1 0 0,0 0-1,0-1 1,1 1-1,-1 0 1,0 0-1,1 0 1,-1 0 0,1 0-1,0 0-6,-1-1 3,0 0 1,0 0-1,1 0 0,-1 0 0,0 0 0,0 0 0,1 0 1,-1 0-1,0 0 0,0 0 0,1 0 0,-1 0 0,0 0 1,0 0-1,1 0 0,-1-1 0,0 1 0,0 0 1,1 0-1,-1 0 0,0 0 0,0-1 0,0 1 0,1 0 1,-1 0-1,0 0 0,0-1 0,0 1 0,0 0 0,0 0 1,0 0-1,1-1-3,11-26-147,-7 15 10,-4 6 54,1 0 1,0 1-1,1-1 1,-1 1-1,1-1 1,0 1-1,3-3 83,-6 7 2,1 1-1,-1 0 0,0 0 1,0 0-1,1-1 0,-1 1 1,0 0-1,0 0 0,1 0 1,-1 0-1,0 0 0,0-1 1,1 1-1,-1 0 0,0 0 1,1 0-1,-1 0 0,0 0 1,1 0-1,-1 0 0,0 0 1,1 0-1,-1 0 0,0 0 1,0 0-1,1 1 0,-1-1 1,0 0-1,1 0 0,-1 0 1,0 0-1,0 0 0,1 1-1,9 9 102,5 17 90,-14-25-183,14 29-110,-10-22 69</inkml:trace>
   <inkml:trace contextRef="#ctx0" brushRef="#br0" timeOffset="24193.774">2650 2538 6272,'-1'1'2368,"1"5"-1856,0 3-256,0-2-288,1 3 544,-1 3 448,2 1-128,-1 7-64,1 6-448,-1 2 64,3-2 64,-1-2-160,0-1-32,-2-5-192,1-1-128,-2-4-192,0-3 0</inkml:trace>
   <inkml:trace contextRef="#ctx0" brushRef="#br0" timeOffset="24557.813">2601 2773 8064,'-8'-18'3072,"8"14"-2400,2-5 96,1 7-64,3-3-384,3 0-32,4-1-160,1 2-96,2 2 0,0 5-32,5 0 0</inkml:trace>
@@ -1743,11 +1743,11 @@
   <inkml:trace contextRef="#ctx0" brushRef="#br0" timeOffset="46546.602">4478 58 4736,'7'5'1760,"0"6"-1376,6 13 320,-6-11 96,2 5-96,2-1 32,2 0-192,-1-1-64,0-1-288,-3 0 0,-1-2 128,-1-2-256,-1-1-32,-1-3 32,0-3 32</inkml:trace>
   <inkml:trace contextRef="#ctx0" brushRef="#br0" timeOffset="46931.166">4659 60 6016,'0'2'378,"-1"0"0,0 0 0,0 0 0,0 0 1,0 0-1,0 0 0,0 0 0,0 0 0,-1 0 0,1 0 1,-2 0-379,-18 21 501,6-12-260,1-1 0,-1 0 0,-1-1-1,0-1 1,0 0 0,-7 2-241,-35 16 363,80-33-156,0 1 1,21-4-208,-17 5 81,52-10-12,-57 11-63</inkml:trace>
   <inkml:trace contextRef="#ctx0" brushRef="#br0" timeOffset="47305.965">4582 18 6144,'-4'0'2368,"3"5"-1856,-3 8 32,3-3-96,-2 7-128,-2 4 128,-3 3 320,-2 3 160,1-3-480,1-1-128,2 1-64,-1 0-224,4-2-64,2-3 0,2-5 0,2-6-192,4-4 0</inkml:trace>
-  <inkml:trace contextRef="#ctx0" brushRef="#br0" timeOffset="48035.199">4890 162 4224,'2'-5'865,"-1"3"-524,0 1-1,-1 0 1,1-1 0,0 1-1,-1 0 1,0-1 0,1 1-1,-1-1 1,0 1 0,0 0-1,0-1 1,1 1 0,-2-1-1,1 1 1,0-1 0,0 1-1,0 0 1,-1-1-341,0 2 41,1 0 1,-1 0-1,0 0 0,0 0 1,0 0-1,0 0 0,1 0 1,-1 1-1,0-1 0,0 0 1,0 1-1,1-1 0,-1 1 1,0-1-1,1 1 0,-1-1 1,0 1-1,1-1 0,-1 1 1,1-1-1,-1 1-41,0 0 44,-24 18-22,16-13 43,1 0 1,-1 1-1,1 0 1,0 0-1,1 1 1,-1 0-1,-3 7-65,10-14 4,1-1 0,-1 1 0,1-1 0,0 0 0,0 1 0,-1-1 0,1 1 0,0 0 0,0-1 0,-1 1 0,1-1 0,0 1 0,0-1 0,0 1-1,0-1 1,0 1 0,0 0 0,0-1 0,0 1 0,0-1 0,0 1 0,0-1 0,0 1 0,1-1 0,-1 1 0,0 0 0,0-1 0,1 1 0,-1-1 0,0 1 0,0-1 0,1 1-4,0 0 13,1-1-1,-1 1 1,0 0 0,0-1-1,1 1 1,-1-1 0,0 1-1,1-1 1,-1 0 0,1 0 0,-1 1-1,1-1 1,0 0-13,6 0 51,0-1 0,0 1 0,0-1 0,3-1-51,-6 0-31,0 0 0,0 0-1,0 0 1,0 0 0,0-1 0,0 0 0,-1 0 0,2-1 31,-1 0-57,1 0 1,0 0 0,0 1-1,2-1 57,-7 24-277,-1-18 292,0-1 0,0 1 0,0 0-1,1 0 1,-1 0 0,1 0 0,-1 0 0,1-1 0,0 1 0,0 0-1,-1 0 1,1-1 0,0 1 0,1 1-15,4 2-85</inkml:trace>
-  <inkml:trace contextRef="#ctx0" brushRef="#br0" timeOffset="48390.105">5003 170 6656,'0'0'70,"0"0"0,0 0 0,0 0 1,-1 0-1,1 0 0,0-1 0,0 1 0,0 0 1,0 0-1,-1 0 0,1 0 0,0 0 0,0 0 0,0 0 1,0 0-1,-1 0 0,1 0 0,0-1 0,0 1 1,0 0-1,-1 0 0,1 0 0,0 0 0,0 0 1,0 0-1,-1 1 0,1-1 0,0 0 0,0 0 1,0 0-1,-1 0 0,1 0 0,0 0 0,0 0 0,0 0 1,0 0-1,-1 0 0,1 1 0,0-1 0,0 0 1,0 0-1,0 0 0,0 0 0,0 1 0,-1-1 1,1 0-1,0 0 0,0 0-70,0 14 1244,1-9-975,0 0-1,1 0 1,0 0 0,-1-1 0,2 1-269,-2-3 77,0 0-1,0 0 1,0 0-1,0-1 1,1 1 0,-1 0-1,1-1 1,-1 1-1,1-1 1,0 0 0,0 1-1,-1-1 1,1 0 0,0 0-1,0 0 1,0-1-1,0 1 1,0 0 0,1-1-77,-1 1 18,0-1 0,0 0 0,-1 0 0,1-1 0,0 1 0,0 0 0,-1 0 0,1-1 0,0 1 1,0-1-1,-1 0 0,1 0 0,-1 1 0,1-1 0,-1 0 0,1 0 0,-1 0 0,1 0 0,-1-1 1,0 1-1,1 0 0,-1-1 0,0 1-18,12-16-427,-7 9 1</inkml:trace>
+  <inkml:trace contextRef="#ctx0" brushRef="#br0" timeOffset="48035.198">4890 162 4224,'2'-5'865,"-1"3"-524,0 1-1,-1 0 1,1-1 0,0 1-1,-1 0 1,0-1 0,1 1-1,-1-1 1,0 1 0,0 0-1,0-1 1,1 1 0,-2-1-1,1 1 1,0-1 0,0 1-1,0 0 1,-1-1-341,0 2 41,1 0 1,-1 0-1,0 0 0,0 0 1,0 0-1,0 0 0,1 0 1,-1 1-1,0-1 0,0 0 1,0 1-1,1-1 0,-1 1 1,0-1-1,1 1 0,-1-1 1,0 1-1,1-1 0,-1 1 1,1-1-1,-1 1-41,0 0 44,-24 18-22,16-13 43,1 0 1,-1 1-1,1 0 1,0 0-1,1 1 1,-1 0-1,-3 7-65,10-14 4,1-1 0,-1 1 0,1-1 0,0 0 0,0 1 0,-1-1 0,1 1 0,0 0 0,0-1 0,-1 1 0,1-1 0,0 1 0,0-1 0,0 1-1,0-1 1,0 1 0,0 0 0,0-1 0,0 1 0,0-1 0,0 1 0,0-1 0,0 1 0,1-1 0,-1 1 0,0 0 0,0-1 0,1 1 0,-1-1 0,0 1 0,0-1 0,1 1-4,0 0 13,1-1-1,-1 1 1,0 0 0,0-1-1,1 1 1,-1-1 0,0 1-1,1-1 1,-1 0 0,1 0 0,-1 1-1,1-1 1,0 0-13,6 0 51,0-1 0,0 1 0,0-1 0,3-1-51,-6 0-31,0 0 0,0 0-1,0 0 1,0 0 0,0-1 0,0 0 0,-1 0 0,2-1 31,-1 0-57,1 0 1,0 0 0,0 1-1,2-1 57,-7 24-277,-1-18 292,0-1 0,0 1 0,0 0-1,1 0 1,-1 0 0,1 0 0,-1 0 0,1-1 0,0 1 0,0 0-1,-1 0 1,1-1 0,0 1 0,1 1-15,4 2-85</inkml:trace>
+  <inkml:trace contextRef="#ctx0" brushRef="#br0" timeOffset="48390.104">5003 170 6656,'0'0'70,"0"0"0,0 0 0,0 0 1,-1 0-1,1 0 0,0-1 0,0 1 0,0 0 1,0 0-1,-1 0 0,1 0 0,0 0 0,0 0 0,0 0 1,0 0-1,-1 0 0,1 0 0,0-1 0,0 1 1,0 0-1,-1 0 0,1 0 0,0 0 0,0 0 1,0 0-1,-1 1 0,1-1 0,0 0 0,0 0 1,0 0-1,-1 0 0,1 0 0,0 0 0,0 0 0,0 0 1,0 0-1,-1 0 0,1 1 0,0-1 0,0 0 1,0 0-1,0 0 0,0 0 0,0 1 0,-1-1 1,1 0-1,0 0 0,0 0-70,0 14 1244,1-9-975,0 0-1,1 0 1,0 0 0,-1-1 0,2 1-269,-2-3 77,0 0-1,0 0 1,0 0-1,0-1 1,1 1 0,-1 0-1,1-1 1,-1 1-1,1-1 1,0 0 0,0 1-1,-1-1 1,1 0 0,0 0-1,0 0 1,0-1-1,0 1 1,0 0 0,1-1-77,-1 1 18,0-1 0,0 0 0,-1 0 0,1-1 0,0 1 0,0 0 0,-1 0 0,1-1 0,0 1 1,0-1-1,-1 0 0,1 0 0,-1 1 0,1-1 0,-1 0 0,1 0 0,-1 0 0,1 0 0,-1-1 1,0 1-1,1 0 0,-1-1 0,0 1-18,12-16-427,-7 9 1</inkml:trace>
   <inkml:trace contextRef="#ctx0" brushRef="#br0" timeOffset="49255.156">5210 177 5888,'-1'0'133,"0"0"1,1 0 0,-1-1 0,0 1-1,0 0 1,0 0 0,1 0-1,-1 0 1,0 0 0,0 0-1,0 0 1,0 0 0,1 0-1,-1 0 1,0 0 0,0 0-1,0 1 1,1-1 0,-1 0-1,0 1 1,0-1-134,-1 2 169,-1-1-1,1 1 1,0-1 0,0 1-1,0 0 1,0 0-1,-1 1-168,-1 2 241,1-1-1,-1 1 0,1 0 0,0 0 1,1 1-1,-1-1 0,1 1-240,1-5 22,1-1-1,0 1 1,-1-1 0,1 1-1,0 0 1,0 0 0,0-1-1,-1 1 1,1 0 0,0-1-1,0 1 1,0 0 0,0 0-1,0-1 1,0 1 0,1 0-1,-1-1 1,0 1 0,0 0-1,0 0 1,1-1 0,-1 1-1,0 0 1,1-1 0,-1 1-1,0-1 1,1 1-22,0 0 16,0-1 0,0 0 0,-1 1 0,1-1 0,0 0-1,0 0 1,0 0 0,0 1 0,0-1 0,0 0 0,0 0 0,0 0 0,0 0 0,0-1-1,0 1 1,0 0 0,0-1-16,6 0 24,-1-2 0,1 1 1,-1-1-1,0 0 0,3-2-24,-2 0-4,0 0-1,0-1 1,0 0 0,-1 0 0,0-1 0,0 1-1,0-1 1,-1-1 0,2-3 4,9-16-225,-2 0 1,0-4 224,-9 19-180,0 2 217,-1 0-1,-1 0 0,1-1 0,-2 1 1,1-6-37,-3 16-6,0 0 1,0-1 0,1 1-1,-1 0 1,0 0 0,0 0-1,0 0 1,0 0 0,0-1-1,0 1 1,0 0 0,0 0-1,0 0 1,0 0 0,0 0-1,0-1 1,0 1 0,0 0-1,0 0 1,0 0 0,0 0-1,0 0 1,0-1 0,0 1-1,0 0 1,0 0-1,0 0 1,-1 0 0,1 0-1,0-1 1,0 1 0,0 0-1,0 0 1,0 0 0,0 0-1,0 0 1,0 0 0,-1 0-1,1 0 1,0 0 0,0-1-1,0 1 1,0 0 0,0 0-1,-1 0 6,-5 6-304,-6 11 91,5-2 402,2 1 0,0 0 1,0 0-1,2 1 0,0-1 0,1 1 0,0 0 0,2 0 0,0-1 0,0 1 0,3 9-189,-3-25 4,0 0 0,0 1 0,1-1 0,-1 0 0,0 0 0,0 0 0,1 1 0,-1-1 0,1 0 0,-1 0 0,1 0 0,0 0 0,-1 0 0,1 0 0,0 0 0,0 0 0,0 0 0,-1-1 0,1 1 0,0 0 0,0 0 0,0-1 0,0 1 0,0 0 0,1-1 0,-1 0 0,0 1 0,0-1 0,0 1 0,1-1-4,0 0 12,0 0 1,0-1-1,-1 1 0,1 0 1,0-1-1,0 0 1,-1 1-1,1-1 1,-1 0-1,1 0 0,0 0 1,-1 0-1,0 0 1,1 0-1,-1 0 1,0 0-1,1-1 0,-1 1 1,0-1-1,1 0-12,21-40-526,-21 37 50,-2 8 496,0-1-1,1 0 1,-1 0 0,0 0 0,1 0 0,-1 0 0,1 0 0,0 0 0,-1 0-1,1 0 1,0 0 0,1 0 0,-1 0 0,0 0 0,0-1 0,1 1 0,-1-1 0,1 1-1,-1-1 1,1 1 0,0-1 0,-1 0 0,1 0 0,0 0 0,0 0 0,0 0 0,0 0-1,0 0 1,0-1 0,0 1 0,0-1 0,0 1 0,0-1 0,0 0 0,1 0 0,-1 0-1,0 0 1,0 0 0,0 0 0,0-1 0,0 1 0,0-1 0,0 1 0,0-1 0,0 0-1,0 0 1,0 0 0,1-1-20,4-2-77,-1-1 0,1 0 0,-1 0 0,-1-1 0,1 1 1,-1-1-1,4-5 77,-10 12 10,1 0 1,-1 0-1,1 1 1,0-1-1,-1 0 1,1 0-1,0 0 0,0 1 1,0-1-1,0 0 1,0 1-1,0-1 1,0 0-1,1 0 1,-1 0-1,0 1 1,1-1-1,-1 0 1,1 0-1,-1 0 1,1 0-1,-1 1 1,1-1-1,0 0 1,0 0-1,-1 0 1,1-1-1,0 1 1,0 0-11,4 4-38,-1-1 1,0 1 0,1-1-1,0-1 1,3 4 37,-6-7 13,-1 1 1,1 0-1,-1 0 1,1 0-1,-1-1 1,1 1-1,-1 0 1,1-1-1,-1 0 1,1 1-1,0-1 1,-1 0-1,1 0 1,0 0-1,-1 0 1,1 0-1,0 0-13,5-2-442</inkml:trace>
-  <inkml:trace contextRef="#ctx0" brushRef="#br0" timeOffset="49642.213">5616 170 5760,'-2'2'2176,"0"1"-1664,1 5 320,1-2 128,1 1-224,-1 1-32,2 1-192,0 0-64,-1-1-256,1 0-128,1-1-32,0-1-128,0-3 0,1-3-32,0-2 0</inkml:trace>
-  <inkml:trace contextRef="#ctx0" brushRef="#br0" timeOffset="49643.213">5589 30 7424,'-7'-7'2816,"5"7"-2208,1 2 0,1-1-224,0 2-256,0 1-32,1 2-192,3 1 0</inkml:trace>
+  <inkml:trace contextRef="#ctx0" brushRef="#br0" timeOffset="49642.212">5616 170 5760,'-2'2'2176,"0"1"-1664,1 5 320,1-2 128,1 1-224,-1 1-32,2 1-192,0 0-64,-1-1-256,1 0-128,1-1-32,0-1-128,0-3 0,1-3-32,0-2 0</inkml:trace>
+  <inkml:trace contextRef="#ctx0" brushRef="#br0" timeOffset="49643.212">5589 30 7424,'-7'-7'2816,"5"7"-2208,1 2 0,1-1-224,0 2-256,0 1-32,1 2-192,3 1 0</inkml:trace>
   <inkml:trace contextRef="#ctx0" brushRef="#br0" timeOffset="50252.106">5690 187 6400,'0'3'524,"0"0"0,0 0 0,0-1 0,0 1 1,0 0-1,0 0 0,1 0 0,-1-1-524,2 16 2521,-2-17-2454,0 0-1,0 0 1,0 0-1,0 0 1,0 0-1,0 0 0,0 0 1,0 0-1,1 0 1,-1 0-1,0 0 1,1 0-1,-1 0 1,1-1-1,-1 1 1,1 0-1,-1 0 1,1 0-1,-1 0 0,1-1 1,0 1-1,-1 0 1,1-1-1,0 1-66,1 0 19,-1-1 0,0 0 0,0 1-1,0-1 1,0 0 0,1 0 0,-1 0-1,0 0 1,0 0 0,0 0 0,1 0-1,-1-1 1,0 1 0,0 0 0,0-1-1,0 1 1,1-1-19,5-2-166,0-1 0,0 0-1,0 0 1,-1-1 0,4-2 166,-2 0-315,-5 4 195,-1 1 0,1 0 0,0 0-1,0 0 1,0 0 0,0 0 0,1 0 120,-3 2 3,0 0 0,0 0 0,0-1 0,0 1 0,0 0 0,0 0 0,0 0 0,0 0 0,0 0 0,0 0 0,0 0 0,0 1 0,0-1 0,0 0 0,0 1 0,0-1 0,0 0 0,0 1 0,0-1 0,0 1 0,-1 0 0,1-1 0,0 1 1,0 0-1,0-1 0,0 1-3,1 2 53,0-1 0,1 0 1,-1 0-1,1-1 0,0 1 1,0 0-1,-1-1 0,1 0 0,0 1 1,0-1-1,3 0-53,-5-1-75,1 1 0,0-1 0,0 0-1,-1 0 1,1 0 0,0 0 0,-1-1-1,1 1 1,0 0 0,0-1 75,0 1-404,-1-1 1,1 0-1,0 0 0,0 0 1,-1 0-1,1 0 0,-1 0 0,1 0 1,-1 0-1,1-1 404,-2 2 61,0 0 0,-1 1 0,1-1 0,0 1 0,-1-1 0,1 1 0,0-1 0,0 0 0,0 1 0,-1-1 0,1 1 0,0-1 0,0 1 0,0-1 0,0 1 0,0-1 0,0 1 0,0-1 0,0 1 0,0-1 0,0 1 0,0-1 0,0 1 0,0-1 0,1 1 0,-1-1 0,0 1 0,0-1 0,0 1 0,1-1 0,-1 1 0,0-1 0,1 0 0,-1 1 0,0-1-1,1 1 1,-1-1 0,0 0 0,1 0 0,-1 1 0,1-1 0,-1 0 0,1 0 0,-1 1 0,1-1-61,21 10 803,-15-9-678,1 1 1,0-2-1,-1 1 0,1-1 1,0 0-1,2-1-125,-8 1 26,0 0 0,0 0 0,1 0 0,-1-1 0,0 1 0,0-1 0,0 1 0,0-1 0,0 0 0,-1 0 0,1 0 0,0 0 0,0 0 0,0 0 0,-1 0 0,1-1 0,-1 1 0,1-1 0,-1 1 0,1-1 0,-1 1 0,0-1 0,0 0 0,0 0 0,0 0-26,0 0 41,-1 0-1,0 0 0,0 0 1,1 1-1,-1-1 1,-1 0-1,1 0 1,0 0-1,0 0 0,-1 1 1,1-1-1,-1 0 1,0 0-1,1 1 0,-1-1 1,0 0-1,0 1 1,0-1-1,0 1 0,0-1 1,0 1-1,-1 0 1,1-1-1,0 1 0,-2-1-40,0 0-12,1 0 0,-1 0-1,0 0 1,1 0 0,-1 1-1,0-1 1,0 1 0,0 0-1,0 0 1,0 0 0,0 0-1,-1 0 1,1 1 0,-1-1 12,-2 1-566,2-1-228</inkml:trace>
   <inkml:trace contextRef="#ctx0" brushRef="#br0" timeOffset="51204.712">4512 510 4480,'-1'-1'82,"1"1"0,0 0-1,0 0 1,0-1 0,-1 1 0,1 0 0,0-1 0,0 1-1,0 0 1,0-1 0,0 1 0,0 0 0,0 0 0,0-1-1,0 1 1,0 0 0,0-1 0,0 1 0,0 0 0,0-1-1,0 1 1,0 0 0,0-1 0,0 1 0,0 0 0,0-1-1,0 1 1,1 0 0,-1-1-82,7 7 1503,10 14-238,13 37 793,-20-37-1735,0 0 0,2-1-1,0-1 1,10 12-323,-16-24-373,0-1-96</inkml:trace>
   <inkml:trace contextRef="#ctx0" brushRef="#br0" timeOffset="51579.43">4701 501 5632,'-1'0'154,"0"0"1,1 0 0,-1 0-1,0 0 1,0 0-1,1 1 1,-1-1-1,0 0 1,1 0-1,-1 0 1,0 1 0,1-1-1,-1 0 1,0 1-1,1-1 1,-1 0-1,0 1 1,1-1 0,-1 1-1,1-1-154,-15 15 509,6-6 120,-76 61 2005,68-58-2526,0 0 0,-1-2 0,0 0 1,-7 2-109,15-8 0,10-4 2,0 0-1,0 0 0,0 0 1,0 0-1,0 0 1,0 0-1,0 0 1,0 0-1,0 0 1,0 0-1,0 0 0,0 0 1,0-1-1,0 1 1,0 0-1,0 0 1,0 0-1,0 0 1,0 0-1,0 0 1,0 0-1,0 0 0,0 0 1,0 0-1,0 0 1,0 0-1,0 0 1,0 0-1,0 0 1,0 0-1,0 0 0,0 0 1,0 0-2,17-7 37,136-32-432,-130 33 1</inkml:trace>
@@ -1759,7 +1759,7 @@
   <inkml:trace contextRef="#ctx0" brushRef="#br0" timeOffset="59523.971">5544 631 1024,'-3'-3'8769,"4"11"-7375,1 5-944,-5 16 766,2-25-1010,0 1 0,0 0 0,1 0 1,-1 0-1,1 0 0,1 0 0,-1 0 1,1 0-1,0 1-206,-1-5 10,0-1 0,0 0 0,1 1 0,-1-1 0,0 0 0,0 1 0,1-1 0,-1 0 0,0 0 0,1 1 0,-1-1 0,1 0 0,-1 0 0,0 0 0,1 1 0,-1-1 0,0 0 0,1 0 0,-1 0 0,1 0 0,-1 0 0,0 0 0,1 0 0,-1 0 0,1 0-1,-1 0 1,1 0 0,-1 0 0,0 0 0,1 0 0,-1 0 0,0-1 0,1 1 0,-1 0 0,1 0 0,-1 0 0,0-1 0,1 1 0,-1 0 0,0 0 0,1-1 0,-1 1 0,0 0-10,16-13-157,-9 5-1,-1-1 1,1 0-1,0-3 158,-2 4-265,1 0-1,-1 0 0,1 0 0,2 0 266,-8 8-4,0-1 0,0 1 0,0 0 1,0 0-1,0 0 0,1 0 0,-1-1 0,0 1 0,0 0 1,0 0-1,0 0 0,1 0 0,-1 0 0,0 0 0,0 0 0,0-1 1,0 1-1,1 0 0,-1 0 0,0 0 0,0 0 0,1 0 1,-1 0-1,0 0 0,0 0 0,0 0 0,1 0 0,-1 0 1,0 0-1,0 0 0,0 0 0,1 0 0,-1 1 0,0-1 1,0 0-1,1 0 4,2 9 43,-3 19 465,0-19-121,0-8-357,0 0 0,0 1 1,0-1-1,0 0 0,0 0 1,0 0-1,0 0 0,1 0 0,-1 0 1,0 0-1,1 0 0,-1 0 0,0 0 1,1 0-1,-1 0 0,1-1 0,0 1 1,-1 0-1,1 0 0,0 0 1,-1 0-1,1-1 0,0 1 0,0 0 1,0-1-1,0 1 0,-1-1 0,1 1 1,0-1-1,0 1 0,0-1 1,0 0-1,0 1 0,1-1-30,0 0 5,1 0-1,-1-1 1,0 1-1,1-1 1,-1 1 0,1-1-1,-1 0 1,0 0-1,0 0 1,1 0-1,-1 0 1,0 0 0,0-1-1,2-1-4,24-22-772,-20 17 455,0 1 0,0 0 1,6-3 316,-14 10 3,0 0 1,1 0 0,-1 0 0,0 0 0,0 0-1,0-1 1,1 1 0,-1 0 0,0 0 0,0 0-1,1 0 1,-1 0 0,0 0 0,0 0 0,1 0-1,-1 0 1,0 0 0,0 0 0,1 0 0,-1 0 0,0 0-1,0 0 1,1 0 0,-1 1 0,0-1 0,0 0-1,0 0 1,1 0 0,-1 0 0,0 0 0,0 1-1,0-1 1,1 0 0,-1 0 0,0 0 0,0 0-1,0 1 1,0-1 0,0 0 0,1 0 0,-1 1-1,0-1 1,0 0 0,0 0 0,0 0 0,0 1-1,0-1 1,0 0 0,0 0 0,0 1 0,0-1-1,0 0 1,0 1-4,2 19 260,-1-8-39,-1-10-252,1 0 1,-1 0-1,1 0 0,0-1 0,0 1 0,0 0 1,0 0-1,0-1 0,0 1 0,1-1 0,-1 1 1,0-1-1,1 1 0,-1-1 0,1 0 1,0 0-1,-1 0 0,1 0 0,0 0 0,0 0 1,-1 0-1,1 0 0,0-1 0,0 1 0,0-1 1,0 1-1,0-1 0,0 0 0,0 0 0,0 0 1,2 0 30,5-2-1088</inkml:trace>
   <inkml:trace contextRef="#ctx0" brushRef="#br0" timeOffset="59904.259">5865 628 3584,'-5'20'3330,"3"-12"-2155,1-1-1,-1 1 1,1-1-1,1 1-1174,0-6 59,0 0 0,0 0 0,0 0 0,0 0 0,1 0 0,-1 0-1,0 0 1,1 0 0,0 0 0,0 0 0,-1 0 0,1 0 0,0 0 0,0-1-1,1 1 1,0 1-59,0-1 20,-1-1-1,1 0 0,0 0 1,-1 0-1,1 0 1,0 0-1,0-1 0,0 1 1,0-1-1,0 1 1,-1-1-1,1 1 0,0-1 1,0 0-1,0 0 0,0 0 1,0 0-1,0 0 1,0-1-1,1 1-19,4-1 137,0-1 0,-1 0 0,1 0-1,-1 0 1,3-2-137,-8 4-3,0 0 0,0-1 0,0 1 0,0-1 0,0 1 0,0-1-1,-1 0 1,1 1 0,0-1 0,0 0 0,-1 0 0,1 1 0,0-1 0,-1 0-1,1 0 1,-1 0 0,1 0 0,-1 0 0,0 0 0,1 0 0,-1 0 0,0 0-1,1 0 1,-1 0 0,0 0 3,0-2 7,0 1-1,-1 0 1,1-1-1,-1 1 1,1 0-1,-1 0 1,0-1-1,1 1 1,-1 0-1,0 0 1,-1-1-7,-2-3 23,0 0 0,0 1-1,0 0 1,0 0 0,-1 0 0,0 1-1,0-1 1,-1 1-23,-10-6-192,10 7-170</inkml:trace>
   <inkml:trace contextRef="#ctx0" brushRef="#br0" timeOffset="61016.441">6153 613 4736,'2'-4'1326,"3"-11"1587,-5 15-2842,0 0 0,0 0-1,1-1 1,-1 1 0,0 0 0,0 0 0,0-1 0,0 1 0,0 0 0,0 0-1,0-1 1,0 1 0,0 0 0,0 0 0,0-1 0,0 1 0,0 0 0,0 0-1,0-1 1,0 1 0,0 0 0,0 0 0,0 0 0,0-1 0,0 1 0,0 0-1,-1 0 1,1-1 0,0 1 0,0 0 0,0 0 0,0 0 0,0-1 0,-1 1-1,1 0 1,0 0 0,0 0 0,0 0 0,-1 0 0,1-1 0,0 1 0,-1 0-71,-1 1 25,0 0 0,0 1 0,0-1-1,0 0 1,0 1 0,0-1 0,0 1 0,0 0 0,0 0 0,1 0 0,-1 0-25,-1 2 3,-20 16-60,-9 9 292,30-27-194,0 0-1,0 1 1,0-1-1,0 1 1,0-1-1,1 1 1,-1 0-1,1 0 1,0 0-1,0 0 1,0 1-41,0-2 1,1 0-1,0 1 1,0-1-1,0 0 1,1 0 0,-1 1-1,1-1 1,-1 0-1,1 0 1,-1 1 0,1-1-1,0 0 1,0 0-1,0 0 1,0 0 0,1 0-1,-1 0 1,1-1 0,-1 1-1,1 0 1,-1-1-1,1 1 1,0-1 0,0 1-1,0-1 1,0 0-1,0 0 1,0 0 0,0 0-1,0 0 1,0 0-1,0 0 1,1-1 0,-1 1-1,2-1 0,13 0-234</inkml:trace>
-  <inkml:trace contextRef="#ctx0" brushRef="#br0" timeOffset="61384.223">6317 652 4864,'0'0'127,"-1"-1"1,1 1-1,0-1 0,-1 0 1,1 1-1,0-1 0,-1 1 1,1-1-1,-1 1 1,1-1-1,-1 1 0,1-1 1,-1 1-1,1-1 0,-1 1 1,0 0-1,1-1 1,-1 1-1,0 0 0,1 0 1,-1 0-1,0-1 0,1 1 1,-1 0-1,0 0 0,1 0 1,-1 0-128,-2 0 124,1 0 1,-1 1-1,1-1 1,0 1-1,-1-1 1,1 1-1,0 0 1,0 0-1,-1 0-124,-6 4 411,-1 1 0,1 0 0,-5 4-411,14-10 101,-4 4 114,0-1-1,0 0 1,0 1 0,0 0 0,1 0-1,-2 3-214,4-7 16,1 1-1,-1 0 1,1-1-1,-1 1 1,1 0-1,0-1 1,-1 1 0,1 0-1,0-1 1,0 1-1,-1 0 1,1-1-1,0 1 1,0 0-1,0 0 1,0-1-1,0 1 1,0 0-1,0 0 1,0-1-1,0 1 1,0 0-1,1 0 1,-1-1-1,0 1 1,0 0-1,1-1 1,-1 1-1,0 0 1,1-1-1,-1 1 1,1-1-1,-1 1 1,1 0-1,-1-1 1,1 1-1,-1-1 1,1 1-1,0-1 1,-1 0-1,1 1 1,-1-1-1,1 0 1,0 1-1,0-1 1,-1 0-1,1 0 1,0 0-1,-1 1 1,2-1-16,4 1 58,0 1 0,0-1 0,1-1 1,-1 1-1,0-1 0,6 0-58,-8 0 31,-1-1 1,0 1-1,0 0 1,0-1-1,1 0 1,-1 0-1,0 0 1,0 0-1,0 0 0,0-1 1,-1 1-1,1-1 1,0 0-1,1-1-31,-3 2 4,-1 0 1,1 0-1,0-1 0,-1 1 0,1 0 0,-1-1 0,1 1 0,-1-1 0,0 1 1,1 0-1,-1-1 0,0 1 0,0-1 0,0 1 0,0-1 0,-1 1 0,1 0 1,0-1-1,0 1 0,-1-1 0,1 1 0,-1 0 0,1-1 0,-1 1 0,0 0 1,0-1-5,1 1-25,-1-1 1,0 0 0,0 1-1,0-1 1,0 1 0,0-1-1,0 1 1,0-1 0,-1 1 0,1 0-1,-1-1 1,1 1 0,-1 0-1,1 0 1,-1 0 0,1 0-1,-1 1 1,0-1 0,0 0 0,0 1 24,-3-1-528</inkml:trace>
+  <inkml:trace contextRef="#ctx0" brushRef="#br0" timeOffset="61384.222">6317 652 4864,'0'0'127,"-1"-1"1,1 1-1,0-1 0,-1 0 1,1 1-1,0-1 0,-1 1 1,1-1-1,-1 1 1,1-1-1,-1 1 0,1-1 1,-1 1-1,1-1 0,-1 1 1,0 0-1,1-1 1,-1 1-1,0 0 0,1 0 1,-1 0-1,0-1 0,1 1 1,-1 0-1,0 0 0,1 0 1,-1 0-128,-2 0 124,1 0 1,-1 1-1,1-1 1,0 1-1,-1-1 1,1 1-1,0 0 1,0 0-1,-1 0-124,-6 4 411,-1 1 0,1 0 0,-5 4-411,14-10 101,-4 4 114,0-1-1,0 0 1,0 1 0,0 0 0,1 0-1,-2 3-214,4-7 16,1 1-1,-1 0 1,1-1-1,-1 1 1,1 0-1,0-1 1,-1 1 0,1 0-1,0-1 1,0 1-1,-1 0 1,1-1-1,0 1 1,0 0-1,0 0 1,0-1-1,0 1 1,0 0-1,0 0 1,0-1-1,0 1 1,0 0-1,1 0 1,-1-1-1,0 1 1,0 0-1,1-1 1,-1 1-1,0 0 1,1-1-1,-1 1 1,1-1-1,-1 1 1,1 0-1,-1-1 1,1 1-1,-1-1 1,1 1-1,0-1 1,-1 0-1,1 1 1,-1-1-1,1 0 1,0 1-1,0-1 1,-1 0-1,1 0 1,0 0-1,-1 1 1,2-1-16,4 1 58,0 1 0,0-1 0,1-1 1,-1 1-1,0-1 0,6 0-58,-8 0 31,-1-1 1,0 1-1,0 0 1,0-1-1,1 0 1,-1 0-1,0 0 1,0 0-1,0 0 0,0-1 1,-1 1-1,1-1 1,0 0-1,1-1-31,-3 2 4,-1 0 1,1 0-1,0-1 0,-1 1 0,1 0 0,-1-1 0,1 1 0,-1-1 0,0 1 1,1 0-1,-1-1 0,0 1 0,0-1 0,0 1 0,0-1 0,-1 1 0,1 0 1,0-1-1,0 1 0,-1-1 0,1 1 0,-1 0 0,1-1 0,-1 1 0,0 0 1,0-1-5,1 1-25,-1-1 1,0 0 0,0 1-1,0-1 1,0 1 0,0-1-1,0 1 1,0-1 0,-1 1 0,1 0-1,-1-1 1,1 1 0,-1 0-1,1 0 1,-1 0 0,1 0-1,-1 1 1,0-1 0,0 0 0,0 1 24,-3-1-528</inkml:trace>
   <inkml:trace contextRef="#ctx0" brushRef="#br0" timeOffset="61865.34">6389 678 4480,'-1'-6'2945,"0"6"-1017,-3 9-207,-1 18-449,5-26-1237,0 1 0,0-1-1,1 1 1,-1-1 0,0 1-1,1-1 1,-1 0 0,1 1-1,0-1 1,0 0 0,-1 1 0,1-1-1,0 0 1,0 0 0,0 0-1,0 0 1,0 0 0,0 0-1,0 0 1,1 0 0,-1 0-1,0 0-34,2 0 36,-1 0 0,1 0 0,0-1 0,-1 1 0,1 0 0,0-1-1,-1 0 1,1 1 0,0-1 0,0 0 0,2-1-36,2 0 11,0 0-1,0 0 1,0-1-1,0 0 1,0-1 0,-1 1-1,1-1 1,-1-1 0,3-1-11,-5 3-48,0-1 0,0 0 1,-1 0-1,1 0 1,-1-1-1,1 1 0,-1-1 1,0 0-1,0 0 1,-1 0-1,1 0 1,-1-1-1,2-3 48,-5 6-37,-2 6-42,-3 7-13,6-10 103,0 1 0,0 0 0,-1 0 1,1 0-1,0 0 0,1 0 0,-1-1 0,0 1 1,0 0-1,1 0 0,-1 0 0,1 0 0,0-1 0,0 1 1,-1 0-1,1-1 0,0 1 0,0-1 0,0 1 1,1-1-1,-1 1 0,0-1 0,1 0 0,-1 1 1,0-1-1,1 0 0,0 0 0,-1 0 0,1 0 0,0 0 1,0-1-12,7 2-2368</inkml:trace>
   <inkml:trace contextRef="#ctx0" brushRef="#br0" timeOffset="62215.306">6634 618 6912,'-2'0'2624,"0"8"-2048,1 4-128,1-3-192,-2 2-160,1 3 32,-2 3 288,-1 6 192,-1 8-320,1 3 0,-1-3-64,2-3-96,0-1-96,0-7 0,1-3 32,-2-4-192,3-5-32</inkml:trace>
   <inkml:trace contextRef="#ctx0" brushRef="#br0" timeOffset="62586.892">6641 614 7808,'1'-1'125,"-1"1"-1,0-1 1,0 0 0,1 1 0,-1-1 0,1 0 0,-1 1 0,0-1 0,1 0-1,-1 1 1,1-1 0,0 1 0,-1-1 0,1 1 0,-1-1 0,1 1-1,0-1 1,-1 1 0,1-1 0,0 1 0,-1 0 0,1 0 0,0-1-1,0 1 1,-1 0 0,1 0 0,0 0 0,0 0 0,0 0-125,1 0 45,0 0 1,-1 1-1,1 0 1,0-1 0,0 1-1,-1 0 1,1 0-1,0 0 1,-1 0-1,1 0 1,-1 0-1,1 1 1,0 0-46,3 2 207,-1 0 0,0 0 0,0 1 0,0-1 0,0 1 0,-1 0 0,3 5-207,-5-9 30,-1 1-1,1-1 1,-1 0 0,1 1-1,-1-1 1,0 1-1,1-1 1,-1 0 0,0 1-1,0-1 1,0 1-1,0-1 1,0 1 0,0-1-1,-1 1 1,1-1-1,0 0 1,-1 1 0,1-1-1,-1 1 1,0-1-1,1 0 1,-1 0 0,0 1-1,0-1 1,1 0-1,-1 0 1,0 0 0,0 0-1,0 0 1,-1 0-1,1 0 1,0 0 0,0 0-1,-1-1-29,-4 5-10,0-1 0,-1-1 1,0 1-1,0-1 0,0 0 0,0-1 0,-3 1 10,10-3-33,0 0-1,0 1 1,0-1 0,-1 0-1,1 0 1,0 0 0,0 0 0,-1 0-1,1 0 1,0 0 0,0 0-1,-1 0 1,1 0 0,0 0 0,0 0-1,0 0 1,-1 0 0,1 0-1,0 0 1,0-1 0,-1 1-1,1 0 1,0 0 0,0 0 0,0 0-1,-1 0 1,1 0 0,0-1-1,0 1 1,0 0 0,0 0 0,-1 0-1,1 0 34,2-4-1274</inkml:trace>
@@ -1768,19 +1768,19 @@
   <inkml:trace contextRef="#ctx0" brushRef="#br0" timeOffset="63336.119">7106 559 3968,'-5'16'5479,"-8"13"-3204,12-26-2030,-1 0-1,1 0 0,0 0 1,0 0-1,0 0 1,0 0-1,0 0 0,1 0 1,-1 0-1,1 3-244,0-4 29,0-1 0,1 1 0,-1 0 0,1-1-1,-1 1 1,1-1 0,-1 1 0,1-1 0,0 0 0,0 1 0,0-1 0,0 0 0,0 1 0,0-1-1,0 0 1,0 0 0,1 0 0,-1 0 0,0 0 0,1 0 0,0 0-29,-1 0 8,0-1-1,0 1 1,0-1 0,0 1 0,0 0-1,0-1 1,0 1 0,0 0 0,0 0 0,0-1-1,-1 1 1,1 0 0,0 0 0,-1 0-1,1 0 1,0 0 0,-1 0 0,1 0-1,-1 0 1,0 0 0,1 0 0,-1 0 0,0 1-1,0-1 1,0 0 0,0 0 0,0 0-1,0 0 1,0 0 0,0 1 0,0-1-1,0 0 1,0 0 0,-1 0 0,1 0-8,-3 3 64,1 0 1,-1 0 0,1-1-1,-1 1 1,0-1 0,0 0 0,-1 0-1,-2 2-64,6-5-1,-2 2-77,0-1-1,1 1 1,-1-1-1,0 1 1,1 0-1,-1 0 1,1 0 0,0 0-1,-1 0 1,1 0-1,0 1 79,1 1-778</inkml:trace>
   <inkml:trace contextRef="#ctx0" brushRef="#br0" timeOffset="64656.184">4556 1003 5504,'0'-4'2112,"0"4"-1664,0 0 448,0 0 96,3 4-384,2 5-32,1 5 32,4 4 0,-1 2-320,2 1-160,1-1-32,-1 0 0,-2-5 32,1-1-64,-2-1 32,-2-1-64,-1-2 64,-2-3-224</inkml:trace>
   <inkml:trace contextRef="#ctx0" brushRef="#br0" timeOffset="65065.83">4709 1025 5888,'-1'-1'120,"1"1"0,-1 0-1,1 0 1,-1 0 0,1 0 0,-1 0 0,1 0 0,-1 0 0,1 0-1,0 0 1,-1 1 0,1-1 0,-1 0 0,1 0 0,-1 0-1,1 0 1,0 1 0,-1-1 0,1 0 0,-1 0 0,1 1 0,0-1-1,-1 0 1,1 1 0,0-1 0,0 0 0,-1 1 0,1-1 0,0 1-1,0-1 1,-1 0 0,1 1-120,-12 18 1616,7-9-411,-1-3-1044,0 1 0,0-2 1,-1 1-1,0-1 0,0 0 1,0 0-1,-1-1 0,0 0 1,0 0-1,-3 1-161,-16 5-142,0 0 1,-18 4 141,34-12 14,71-15-388,0 3 1,14 1 373,-60 6-533</inkml:trace>
-  <inkml:trace contextRef="#ctx0" brushRef="#br0" timeOffset="65401.22">4658 988 7040,'-8'4'2720,"3"3"-2112,-3 10-32,5-6-192,-2 8 0,-3 2 160,-3 1-288,0 1-128,0-2-96,0 0 160,3 1 192,1-1-192,2-2-96,4-5-64,0-5-32</inkml:trace>
+  <inkml:trace contextRef="#ctx0" brushRef="#br0" timeOffset="65401.219">4658 988 7040,'-8'4'2720,"3"3"-2112,-3 10-32,5-6-192,-2 8 0,-3 2 160,-3 1-288,0 1-128,0-2-96,0 0 160,3 1 192,1-1-192,2-2-96,4-5-64,0-5-32</inkml:trace>
   <inkml:trace contextRef="#ctx0" brushRef="#br0" timeOffset="66711.776">7303 495 5376,'0'0'108,"0"0"0,0 0 0,0-1 0,-1 1 0,1-1 1,0 1-1,0 0 0,0-1 0,0 1 0,0 0 0,0-1 0,0 1 0,0 0 1,0-1-1,0 1 0,0-1 0,0 1 0,0 0 0,0-1 0,0 1 1,0 0-1,0-1 0,0 1 0,1-1 0,-1 1 0,0 0 0,0-1 0,0 1 1,1 0-1,-1 0 0,0-1 0,0 1 0,1 0 0,-1 0 0,0-1 0,1 1 1,-1 0-109,2-1 78,-1 0 1,1 1 0,0-1 0,0 1-1,-1-1 1,1 1 0,0 0 0,0-1 0,1 1-79,4 0 34,1 1 1,0-1-1,-1 1 1,3 1-35,-9-2 17,0 0 0,0 0 0,0 1 0,0-1-1,0 0 1,-1 1 0,1-1 0,0 1 0,0-1 0,0 1 0,-1-1 0,1 1 0,0 0 0,0-1 0,-1 1 0,1 0 0,-1 0 0,1-1 0,-1 1 0,1 0 0,-1 0 0,1 0 0,-1 0-17,1 1 63,-1 0 1,1 0 0,-1 1 0,0-1 0,0 0 0,0 0-1,0 0 1,0 0 0,-1 0 0,1 0 0,-1 1-64,-1 5 194,-1 0 0,0 0 1,-1 0-1,1 0 1,-2 1-195,-15 17 12,16-20-20,-1-1-1,1 1 1,1-1-1,-4 6 9,7-11 8,0 1-1,0-1 0,0 0 1,0 1-1,0-1 0,0 1 1,0-1-1,0 0 1,0 1-1,0-1 0,1 1 1,-1-1-1,0 0 0,0 1 1,0-1-1,0 1 0,1-1 1,-1 0-1,0 1 0,0-1 1,1 0-1,-1 1 1,0-1-1,0 0 0,1 0 1,-1 1-1,0-1 0,1 0 1,-1 0-1,0 1 0,1-1 1,-1 0-1,1 0 0,-1 0 1,0 0-1,1 0-7,20 8-144,-13-6 114,-6-1 121,2 0-49,0 1 1,-1-1-1,1 1 1,-1 0-1,0 0 1,0 0-1,2 2-42,-4-3 0,-1-1-1,1 1 1,-1-1-1,1 1 1,-1 0 0,1 0-1,-1-1 1,0 1-1,1 0 1,-1 0 0,0 0-1,0-1 1,1 1-1,-1 0 1,0 0 0,0 0-1,0 0 1,0 0-1,0-1 1,0 1 0,0 0-1,-1 0 1,1 0-1,0-1 1,0 1 0,-1 0-1,1 0 1,0 0-1,-1-1 1,1 1 0,-1 0-1,1-1 1,-1 1-1,1 0 1,-1-1 0,0 1-1,1 0 1,-5 5 23,-1 0 0,0-1 0,1 1 0,-2-1 0,1 0-1,0 0 1,-2 0-23,4-3-186</inkml:trace>
   <inkml:trace contextRef="#ctx0" brushRef="#br0" timeOffset="67091.223">7491 647 7424,'2'5'2816,"1"4"-2208,3 2-96,-3-5-192,1 0-192,0-1 0,1 1-160,-1 0 32,0 0 0,-1-1 0,2 1 64,-2-2-96,0 0 0</inkml:trace>
-  <inkml:trace contextRef="#ctx0" brushRef="#br0" timeOffset="67468.296">7556 655 6144,'-4'3'2368,"1"0"-1856,-3 3 96,3-2-64,-1 2-160,-6-1 96,-1 2-128,-4 1 32,1 0-224,0 2-96,1-2-32,4 0-128</inkml:trace>
+  <inkml:trace contextRef="#ctx0" brushRef="#br0" timeOffset="67468.295">7556 655 6144,'-4'3'2368,"1"0"-1856,-3 3 96,3-2-64,-1 2-160,-6-1 96,-1 2-128,-4 1 32,1 0-224,0 2-96,1-2-32,4 0-128</inkml:trace>
   <inkml:trace contextRef="#ctx0" brushRef="#br0" timeOffset="148703.23">4957 1075 4864,'2'20'4863,"2"7"-3124,-6 38 405,-6 35-2144,-15 64-2160,23-160 342</inkml:trace>
-  <inkml:trace contextRef="#ctx0" brushRef="#br0" timeOffset="149046.886">4955 1113 4480,'1'-2'197,"0"0"0,1-1-1,-1 1 1,0 0 0,1 0 0,-1 0 0,1 0 0,0 0 0,-1 0 0,1 0-1,0 1 1,0-1 0,0 1 0,0-1 0,1 1 0,-1 0 0,0 0 0,1 0-1,-1 0 1,0 0 0,1 0 0,-1 1 0,1-1 0,-1 1 0,2 0-197,0-1 124,-1 1 1,0 0-1,1 0 1,-1 1-1,0-1 1,1 1 0,-1-1-1,0 1 1,0 0-1,0 0 1,0 1-1,0-1 1,0 0 0,0 1-1,0 0 1,0 0-1,0 0 1,-1 0-1,1 0 1,-1 1-125,1 0 76,0 1-1,0-1 1,0 1 0,0 0 0,-1 0-1,0 0 1,0 1 0,0-1-1,0 1-75,-2-4 39,1 1 0,-1-1 0,0 1 0,0-1 0,0 0 0,0 1 0,0-1 0,0 1 0,0-1 0,0 1 0,0-1-1,-1 0 1,1 1 0,-1-1 0,1 1 0,-1-1 0,1 0 0,-1 0 0,0 1 0,0-1 0,1 0 0,-1 0 0,0 0-1,0 0 1,0 0 0,0 0 0,0 0 0,-1 0 0,1 0 0,0-1 0,-1 2-39,-6 2-3,0 1 0,0-2 0,-1 1 0,1-1 0,-1 0 0,0 0 0,-3-1 3,-4 1-128</inkml:trace>
+  <inkml:trace contextRef="#ctx0" brushRef="#br0" timeOffset="149046.885">4955 1113 4480,'1'-2'197,"0"0"0,1-1-1,-1 1 1,0 0 0,1 0 0,-1 0 0,1 0 0,0 0 0,-1 0 0,1 0-1,0 1 1,0-1 0,0 1 0,0-1 0,1 1 0,-1 0 0,0 0 0,1 0-1,-1 0 1,0 0 0,1 0 0,-1 1 0,1-1 0,-1 1 0,2 0-197,0-1 124,-1 1 1,0 0-1,1 0 1,-1 1-1,0-1 1,1 1 0,-1-1-1,0 1 1,0 0-1,0 0 1,0 1-1,0-1 1,0 0 0,0 1-1,0 0 1,0 0-1,0 0 1,-1 0-1,1 0 1,-1 1-125,1 0 76,0 1-1,0-1 1,0 1 0,0 0 0,-1 0-1,0 0 1,0 1 0,0-1-1,0 1-75,-2-4 39,1 1 0,-1-1 0,0 1 0,0-1 0,0 0 0,0 1 0,0-1 0,0 1 0,0-1 0,0 1 0,0-1-1,-1 0 1,1 1 0,-1-1 0,1 1 0,-1-1 0,1 0 0,-1 0 0,0 1 0,0-1 0,1 0 0,-1 0 0,0 0-1,0 0 1,0 0 0,0 0 0,0 0 0,-1 0 0,1 0 0,0-1 0,-1 2-39,-6 2-3,0 1 0,0-2 0,-1 1 0,1-1 0,-1 0 0,0 0 0,-3-1 3,-4 1-128</inkml:trace>
   <inkml:trace contextRef="#ctx0" brushRef="#br0" timeOffset="149567.27">5149 1167 4992,'1'3'736,"-1"0"-1,1 0 1,-1-1 0,1 1 0,0 0 0,0-1 0,0 1-1,0 0-735,1-1 408,-1 1-1,0 0 1,0 0-1,0 0 1,-1 0-1,1 0 1,-1 0-1,1 0-407,-1 5 1096,0-17-875,3-26-306,-2 32 92,-1 1 0,1 0 0,0 0 0,-1 0 0,1 0 0,0 0 0,0 0 0,1 0 0,-1 0 0,0 0 0,1 0 0,-1 0 0,1 1 0,-1-1 0,1 1 0,0-1 1,0 1-1,-1 0 0,1-1 0,1 1-7,0 0-131,0 0 0,0 0 1,0 0-1,0 1 1,1-1-1,-1 1 0,0 0 1,0 0-1,1 0 1,-1 0-1,0 1 0,0-1 1,3 2 130,6 0-2869</inkml:trace>
   <inkml:trace contextRef="#ctx0" brushRef="#br0" timeOffset="150098.966">5283 1187 2048,'6'1'4596,"7"1"-2248,-8-2-1992,1 0 0,-1-1 0,0 0 0,0 1 0,0-1 0,0-1 0,-1 1 0,4-2-356,-6 2 4,-1 1 0,0-1 0,0 0 1,1 1-1,-1-1 0,0 0 0,0 0 0,0 0 1,0 0-1,0 0 0,0 0 0,0 0 0,0 0 1,0-1-1,-1 1 0,1 0 0,0 0 0,-1-1 1,1 1-1,-1 0 0,0-1 0,1 1 0,-1-1 1,0 1-1,0-1 0,0 1 0,0 0 0,0-1 1,0 1-1,0-1 0,0 1 0,-1 0 0,1-1-4,0 0 13,-1 1-1,1 0 1,0 0-1,-1 0 1,1 0-1,-1 0 0,1 0 1,-1 0-1,0 0 1,0 0-1,1 0 1,-1 0-1,0 0 0,0 0 1,0 0-1,0 0 1,0 1-1,0-1 1,0 0-1,0 1 1,0-1-1,0 1 0,0-1-12,-2 1 9,1-1-1,0 1 0,-1-1 0,1 1 0,-1 0 0,1 0 0,0 0 1,-1 0-1,1 1 0,-1-1 0,-1 1-8,1 0 8,-1 0 0,1 0 0,0 0 1,0 0-1,0 0 0,0 1 0,1-1 0,-1 1 0,0 0 1,1 0-1,-1 0 0,1 0 0,-1 1 0,1-1 0,0 0 1,0 1-1,0 0 0,0 1-8,1-2 7,1 0 0,0 0 0,0 0 0,0 0 0,0 0 0,0 0 0,0 0 0,1 0 1,-1 0-1,1 0 0,-1 0 0,1 0 0,0 0 0,-1 0 0,1 0 0,0-1 0,1 1 0,-1 0 0,0 0 0,1 0-7,4 6 53,0-1-1,1 1 1,4 2-53,-10-8-40,1 0 0,0 0 0,0-1 0,0 1 0,0-1 0,0 0 0,0 1 0,0-1 0,0 0 0,1 0 0,-1 0 0,0-1 0,1 1 0,-1-1 0,1 1 0,-1-1 40,11-2-2592</inkml:trace>
   <inkml:trace contextRef="#ctx0" brushRef="#br0" timeOffset="150489.575">5540 1133 256,'-1'0'569,"0"0"-1,0 0 1,0 0-1,-1 0 1,1 0 0,0 0-1,0 0 1,0 0 0,-1 0-1,1 0 1,0 1-1,0-1 1,0 0 0,0 1-1,-1 0-568,-11 3 1188,7-1-885,0 0 1,0 0-1,1 0 0,-1 1 1,1 0-1,-1 0 0,1 0 1,-1 2-304,5-6 13,0 1 0,0 1 1,0-1-1,0 0 0,1 0 1,-1 0-1,0 0 0,0 1 1,1-1-1,-1 0 0,1 0 1,-1 1-1,1-1 0,0 0 1,-1 1-1,1-1 0,0 1 1,0-1-1,0 1 0,0-1 1,0 0-1,0 1 0,0-1 1,1 1-1,-1-1 0,0 0 1,1 1-1,-1-1 0,1 0 1,0 0-1,-1 1 0,1-1 1,0 0-1,0 0 0,0 0 1,0 0-1,0 0 0,0 0 1,0 0-1,1 1-13,0 0-15,1 0-1,0 0 1,0-1 0,0 1-1,1-1 1,-1 1 0,0-1-1,1 0 1,-1 0 0,0-1-1,1 1 1,-1-1 0,1 1-1,-1-1 1,1 0 0,-1 0 15,12-3-304</inkml:trace>
   <inkml:trace contextRef="#ctx0" brushRef="#br0" timeOffset="150847.566">5639 1157 7424,'-5'-3'2816,"4"8"-2208,0 2 64,1-3-96,0 2-320,0 1 0,0 0-192,0 2-128,1 1 32,0-1 64,3 0 64,-1-2-32,0-4 32,3-3-928,3-3-352</inkml:trace>
   <inkml:trace contextRef="#ctx0" brushRef="#br0" timeOffset="151238.482">5628 1016 7040,'-12'-10'2720,"8"7"-2112,1 3 96,3 2-96,0 2-480,0 2-32,0 1-160,2 1-64</inkml:trace>
   <inkml:trace contextRef="#ctx0" brushRef="#br0" timeOffset="151239.482">5810 1126 5888,'-4'0'329,"0"0"1,0 1 0,0-1-1,0 1 1,0 0 0,0 0-1,0 0 1,0 1 0,1-1-1,-1 1 1,1 0 0,-1 0-1,1 0 1,0 0 0,-1 1-1,-1 2-329,4-5 25,1 1 0,0-1 0,-1 1-1,1-1 1,0 1 0,0-1-1,0 1 1,-1 0 0,1-1 0,0 1-1,0-1 1,0 1 0,0-1 0,0 1-1,0 0 1,0-1 0,0 1-1,0-1 1,0 1 0,0-1 0,1 1-1,-1-1 1,0 1 0,0 0 0,1-1-1,-1 1 1,0-1 0,0 1 0,1-1-1,-1 0 1,1 1 0,-1-1-1,0 1 1,1-1 0,-1 0 0,1 1-1,0-1-24,23 17-276,-13-11 261,-7-3 28,0-1-3,-1 0 1,0 1-1,0-1 1,-1 0-1,1 1 1,0 0-1,-1-1 1,1 1-1,-1 0 1,0 0-1,0 1-10,-2-3 23,0-1-1,0 0 1,0 1-1,0-1 1,0 0-1,0 1 0,0-1 1,0 0-1,0 1 1,0-1-1,0 0 1,0 1-1,0-1 1,-1 0-1,1 0 0,0 1 1,0-1-1,0 0 1,0 0-1,-1 1 1,1-1-1,0 0 1,0 0-1,-1 0 0,1 1 1,0-1-1,0 0 1,-1 0-1,1 0 1,0 0-1,-1 1 1,1-1-1,0 0 0,-1 0 1,1 0-1,0 0 1,-1 0-1,1 0 1,0 0-1,0 0 1,-1 0-1,1 0 0,-1 0-22,-18 0 754,16 0-617,-9 0 58,7 1-137,1-1 0,-1 0 0,0 0 0,1-1 1,-2 0-59,3-1-592,4 1-400</inkml:trace>
-  <inkml:trace contextRef="#ctx0" brushRef="#br0" timeOffset="151617.891">5900 1209 5248,'4'0'515,"-1"0"0,1 0 0,0 0-1,-1 0 1,1 0 0,-1-1 0,1 0 0,0 0-515,1 0 158,0 0-1,0-1 1,0 0 0,0 0 0,0-1-1,0 1 1,-1-1 0,3-2-158,-6 5-18,-1 0-1,1-1 1,-1 1-1,1-1 1,0 1-1,-1-1 1,1 1-1,-1-1 1,0 1-1,1-1 1,-1 1 0,1-1-1,-1 1 1,0-1-1,1 0 1,-1 1-1,0-1 1,0 0-1,0 1 1,1-1-1,-1 0 1,0 0 0,0 1-1,0-1 1,0 0-1,0 1 1,0-1-1,0 0 1,0 1-1,-1-1 1,1 0-1,0 1 1,0-1 0,-1 0-1,1 1 1,0-1-1,-1 0 1,1 1-1,0-1 1,-1 1-1,1-1 1,-1 1-1,0-1 19,0 0-13,0 0 0,0 0-1,-1 0 1,1 0-1,-1 0 1,1 0 0,-1 1-1,1-1 1,-1 1 0,1-1-1,-1 1 1,0-1-1,1 1 1,-1 0 0,0 0-1,1 0 1,-1 0-1,0 0 14,-2 1 123,1-1-1,0 1 0,0 0 0,0 0 0,0 0 0,0 0 0,0 1 1,1-1-1,-1 1 0,0 0 0,1 0 0,-1 0 0,1 0 0,0 0 1,-1 0-1,1 1 0,-1 1-122,2-2 71,0 0 0,0-1 0,0 1 0,0 0 0,0 0 0,1 0 1,-1 0-1,1 1 0,-1-1 0,1 0 0,0 0 0,-1 0 0,1 0 0,1 0 0,-1 1 1,0-1-1,0 0 0,1 0 0,-1 0 0,1 0 0,0 0 0,-1 0 0,1 0 0,0 0 0,0 0 1,1 0-72,0 1-5,-1 0 1,1 0 0,1-1 0,-1 1-1,0-1 1,1 1 0,-1-1-1,1 0 1,0 0 0,2 1 4,18 7-37</inkml:trace>
+  <inkml:trace contextRef="#ctx0" brushRef="#br0" timeOffset="151617.89">5900 1209 5248,'4'0'515,"-1"0"0,1 0 0,0 0-1,-1 0 1,1 0 0,-1-1 0,1 0 0,0 0-515,1 0 158,0 0-1,0-1 1,0 0 0,0 0 0,0-1-1,0 1 1,-1-1 0,3-2-158,-6 5-18,-1 0-1,1-1 1,-1 1-1,1-1 1,0 1-1,-1-1 1,1 1-1,-1-1 1,0 1-1,1-1 1,-1 1 0,1-1-1,-1 1 1,0-1-1,1 0 1,-1 1-1,0-1 1,0 0-1,0 1 1,1-1-1,-1 0 1,0 0 0,0 1-1,0-1 1,0 0-1,0 1 1,0-1-1,0 0 1,0 1-1,-1-1 1,1 0-1,0 1 1,0-1 0,-1 0-1,1 1 1,0-1-1,-1 0 1,1 1-1,0-1 1,-1 1-1,1-1 1,-1 1-1,0-1 19,0 0-13,0 0 0,0 0-1,-1 0 1,1 0-1,-1 0 1,1 0 0,-1 1-1,1-1 1,-1 1 0,1-1-1,-1 1 1,0-1-1,1 1 1,-1 0 0,0 0-1,1 0 1,-1 0-1,0 0 14,-2 1 123,1-1-1,0 1 0,0 0 0,0 0 0,0 0 0,0 0 0,0 1 1,1-1-1,-1 1 0,0 0 0,1 0 0,-1 0 0,1 0 0,0 0 1,-1 0-1,1 1 0,-1 1-122,2-2 71,0 0 0,0-1 0,0 1 0,0 0 0,0 0 0,1 0 1,-1 0-1,1 1 0,-1-1 0,1 0 0,0 0 0,-1 0 0,1 0 0,1 0 0,-1 1 1,0-1-1,0 0 0,1 0 0,-1 0 0,1 0 0,0 0 0,-1 0 0,1 0 0,0 0 0,0 0 1,1 0-72,0 1-5,-1 0 1,1 0 0,1-1 0,-1 1-1,0-1 1,1 1 0,-1-1-1,1 0 1,0 0 0,2 1 4,18 7-37</inkml:trace>
   <inkml:trace contextRef="#ctx0" brushRef="#br0" timeOffset="152486.573">6349 932 5120,'-1'12'4671,"-3"11"-3025,-1 7-1377,-1 15 193,-1 0 0,-3-1 0,-2 0 0,-1-1 0,-10 19-462,13-35-475,10-27-138</inkml:trace>
   <inkml:trace contextRef="#ctx0" brushRef="#br0" timeOffset="152862.211">6358 1187 5504,'0'0'2112,"0"2"-1664,0 2 448,0-1 96,0 1-384,2 0-32,-2 2-128,0 1 32,0 1-256,0 2-64,0 0 32,2 0-320,-2-2-64,1-2 160,1-3 160</inkml:trace>
   <inkml:trace contextRef="#ctx0" brushRef="#br0" timeOffset="153233.769">6384 1129 5760,'-6'-3'2176,"2"4"-1664,3 1 32,1 1 0,0-1-576,-2 3-96</inkml:trace>
@@ -1804,27 +1804,27 @@
   <inkml:trace contextRef="#ctx0" brushRef="#br0" timeOffset="161681.79">7189 1413 384,'-1'-6'3438,"0"14"2933,0-1-6906,-5 36 3571,1 31-3036,3-36 477,-1 0 0,-5 17-477,7-54 7,1 0 0,0 0 0,0 0 0,-1 0 0,1 0 0,0 0 1,-1 0-1,1 0 0,-1 0 0,1 0 0,-1 0 0,0 0 0,1-1 0,-1 1 1,0 0-1,0 0 0,0-1-7,1 0 4,0 0 1,0 0-1,0 1 1,0-1-1,0 0 1,0 0-1,-1 0 1,1 0-1,0 0 1,0 0-1,0 0 0,0 0 1,0 0-1,-1 0 1,1 0-1,0 0 1,0 0-1,0 0 1,0-1-1,0 1 1,-1 0-1,1 0 1,0 0-1,0 0 1,0 0-1,0 0 1,0 0-1,0 0 0,-1 0 1,1 0-1,0-1 1,0 1-1,0 0 1,0 0-1,0 0 1,0 0-5,-2-11-37,2 8 31,0 1 1,0 0-1,0 0 1,0 0-1,1 0 1,-1-1-1,1 1 1,0 0-1,-1 0 0,1 0 1,0 0-1,0 0 1,0 1-1,0-1 1,1 0-1,-1 0 1,0 1-1,1-1 1,-1 0-1,1 1 0,0 0 1,-1-1-1,1 1 1,0 0-1,0 0 1,0 0-1,0 0 1,0 0-1,0 0 1,0 1-1,0-1 0,0 1 1,0-1-1,0 1 1,1 0-1,-1 0 1,0 0-1,0 0 1,0 0-1,0 1 0,1-1 1,-1 0-1,0 1 1,0 0-1,0-1 1,0 1-1,0 0 1,0 0-1,0 0 1,0 1 5,6 2 16</inkml:trace>
   <inkml:trace contextRef="#ctx0" brushRef="#br0" timeOffset="162047.432">7259 1651 7552,'-7'3'2816,"6"1"-2208,-1 0 128,2-1-64,0 1-576,0 1-96,0 0-96,-1 1 32</inkml:trace>
   <inkml:trace contextRef="#ctx0" brushRef="#br0" timeOffset="162048.432">7284 1528 8064,'-6'-34'3072,"3"25"-2400,1 4 192,2 3-64,0 2-736,0 0-160,0 3-256,0 3-128,0 2 288,2 2-64,-1 2 32</inkml:trace>
-  <inkml:trace contextRef="#ctx0" brushRef="#br0" timeOffset="162394.826">7324 1610 7808,'-1'-2'3616,"3"8"-2552,2 11-470,-4-15-551,0 3 110,0-1 0,0 1 0,0 0-1,1-1 1,0 1 0,0 1-153,-1-6 4,0 1 0,0-1 0,1 0 0,-1 1 0,0-1 0,0 1 0,0-1 0,1 0 0,-1 1 0,0-1 0,1 0 0,-1 1 0,0-1 0,1 0 0,-1 1 0,0-1 0,1 0-1,-1 0 1,0 0 0,1 1 0,-1-1 0,1 0 0,-1 0 0,0 0 0,1 0-4,0 0-37,0 0-1,0 0 1,0 0-1,0-1 1,0 1-1,0 0 1,0-1-1,0 1 1,0-1-1,0 1 0,0-1 1,0 0-1,-1 1 1,1-1-1,0 0 1,0 0 37,1 0-72,-1-1 0,0 1 0,1-1 0,-1 1 0,0-1 0,0 0 0,0 1 0,0-1 0,0 0 0,0 0 0,0 0 0,-1 0 0,1 0 0,0-1 72,-3 10 681,-1 5-423,3-10-257,1-1 1,-1 1 0,0-1 0,1 1 0,-1 0 0,1-1 0,0 1 0,0-1 0,-1 1-1,1-1 1,0 0 0,0 1 0,0-1 0,0 0 0,0 0 0,1 0 0,0 1-2,7 2-64</inkml:trace>
+  <inkml:trace contextRef="#ctx0" brushRef="#br0" timeOffset="162394.825">7324 1610 7808,'-1'-2'3616,"3"8"-2552,2 11-470,-4-15-551,0 3 110,0-1 0,0 1 0,0 0-1,1-1 1,0 1 0,0 1-153,-1-6 4,0 1 0,0-1 0,1 0 0,-1 1 0,0-1 0,0 1 0,0-1 0,1 0 0,-1 1 0,0-1 0,1 0 0,-1 1 0,0-1 0,1 0 0,-1 1 0,0-1 0,1 0-1,-1 0 1,0 0 0,1 1 0,-1-1 0,1 0 0,-1 0 0,0 0 0,1 0-4,0 0-37,0 0-1,0 0 1,0 0-1,0-1 1,0 1-1,0 0 1,0-1-1,0 1 1,0-1-1,0 1 0,0-1 1,0 0-1,-1 1 1,1-1-1,0 0 1,0 0 37,1 0-72,-1-1 0,0 1 0,1-1 0,-1 1 0,0-1 0,0 0 0,0 1 0,0-1 0,0 0 0,0 0 0,0 0 0,-1 0 0,1 0 0,0-1 72,-3 10 681,-1 5-423,3-10-257,1-1 1,-1 1 0,0-1 0,1 1 0,-1 0 0,1-1 0,0 1 0,0-1 0,-1 1-1,1-1 1,0 0 0,0 1 0,0-1 0,0 0 0,0 0 0,1 0 0,0 1-2,7 2-64</inkml:trace>
   <inkml:trace contextRef="#ctx0" brushRef="#br0" timeOffset="162926.948">7496 1607 1792,'-2'2'524,"1"0"1,-1 0-1,1 0 1,0 0-1,-1 0 0,1 0 1,0 1-1,1-1 1,-1 0-1,0 1 0,1-1 1,-1 0-1,1 1 0,0 1-524,-1-3 385,2 1 0,-1 0 0,0-1 0,0 1 0,0 0-1,1-1 1,-1 1 0,1 0 0,-1-1 0,1 1 0,0-1-1,0 1-384,9 9-877,-9-10 873,0-1 0,-1 0 0,1 1 0,0-1 0,-1 0 0,1 0 0,0 1-1,-1-1 1,1 0 0,0 0 0,-1 0 0,1 0 0,0 0 0,0 0 0,-1 0 0,1 0 0,0 0-1,-1-1 1,1 1 0,0 0 0,-1 0 0,1-1 0,0 1 0,-1 0 0,1-1 0,0 1 0,-1 0-1,1-1 1,-1 1 0,1-1 0,-1 1 0,1-1 0,-1 1 0,1-1 0,-1 0 0,0 1 0,1-1 0,-1 1-1,0-1 1,1 0 0,-1 1 0,0-1 0,0 0 0,0 0 0,1 1 4,-1-3-15,1 1 1,0-1 0,0 1-1,-1-1 1,1 1-1,-1-1 1,0 1 0,0-1-1,0 0 1,0 1-1,-1-1 1,1 0 14,-2 2 122,-1 5-111,0 7-256,-2 23 165,-1 30 80,-1 14 267,5-66-343,-8 48-68,8-55 181,1 0-1,-1 0 0,0 0 1,0 0-1,0-1 0,0 1 1,-1-1-1,0 0 0,0 1 1,-1 0-37,3-4 19,0-1 1,0 1 0,0 0-1,1 0 1,-1-1 0,0 1 0,-1 0-1,1-1 1,0 1 0,0-1-1,0 0 1,0 1 0,0-1-1,0 0 1,-1 1 0,1-1 0,0 0-1,0 0 1,0 0 0,-1 0-1,1 0 1,0-1 0,0 1 0,0 0-1,0 0 1,-1-1 0,1 1-1,0-1 1,0 1 0,0-1 0,0 1-1,0-1 1,0 0 0,0 1-1,0-1 1,0 0 0,1 0-1,-1 0 1,0 0-20,-2-2 67,1 0 0,-1 1 0,1-1 0,0 0 0,0-1 1,0 1-1,0 0 0,1-1 0,-1 1 0,1-1 0,0 1 0,0-2-67,1 1 15,-1 1 0,1-1 0,0 0 0,1 1-1,-1-1 1,1 0 0,-1 1 0,1-1 0,0 1 0,0-1 0,1 1 0,-1 0 0,1-1 0,0 1 0,0 0 0,0 0 0,0 0-1,0 0 1,0 1 0,1-1 0,1 0-15,3-4-79,1 0 0,0 1 0,0 1 0,1-1 0,0 1 0,0 1 0,2-1 79,9-4-85</inkml:trace>
   <inkml:trace contextRef="#ctx0" brushRef="#br0" timeOffset="163956.936">4512 1931 6656,'0'-2'2528,"3"5"-1952,6 5 32,-3 0-32,4 4-96,3 7 96,-2 1-192,0 0-64,-1-1-160,-1 0 32,-3-2 96,1-1-96,-2 0-32,-1-2-160,0-1 0,-3-2-352,-1 1-160</inkml:trace>
   <inkml:trace contextRef="#ctx0" brushRef="#br0" timeOffset="164316.058">4683 2005 6528,'-1'-1'262,"1"0"0,-1 1 1,0-1-1,0 1 0,0-1 0,0 1 0,0-1 1,0 1-1,0 0 0,0 0 0,0-1 1,0 1-1,0 0 0,0 0 0,0 0 1,0 0-1,0 0 0,0 0 0,0 0 1,0 1-1,0-1 0,-1 0-262,-25 9-424,21-6 871,-28 9-239,14-6 57,0 2 0,0 0 1,0 1-1,0 3-265,19-12 4,1 0 1,-1 0-1,1 1 0,-1-1 1,1 0-1,-1 1 1,1-1-1,-1 0 0,1 1 1,-1-1-1,1 1 0,0-1 1,-1 1-1,1-1 1,0 1-1,-1-1 0,1 1 1,0-1-1,-1 1-4,2 0 2,-1-1-1,0 0 1,0 0 0,0 1 0,0-1-1,0 0 1,1 0 0,-1 1-1,0-1 1,0 0 0,0 0-1,1 1 1,-1-1 0,0 0-1,0 0 1,1 0 0,-1 0-1,0 1 1,0-1 0,1 0-1,-1 0 1,0 0 0,1 0-1,-1 0 1,0 0 0,1 0-2,26 3 55,-21-3-24,75 7-452,-62-7 160</inkml:trace>
   <inkml:trace contextRef="#ctx0" brushRef="#br0" timeOffset="164664.602">4637 1890 7552,'-8'-2'2816,"3"7"-2208,2 2 0,0-2-224,0 7-64,-3 7 32,-3 8-32,0 2-32,-2-2-160,0-2 128,-1-2 64,1-4-320,2 1-64,-1-3-32,6-1-64</inkml:trace>
   <inkml:trace contextRef="#ctx0" brushRef="#br0" timeOffset="165546.519">4998 2023 5632,'-8'-1'1306,"-1"0"1,0 1 0,-8 0-1307,14 0 219,1 0 0,-1 1 1,0-1-1,1 1 0,-1-1 1,1 1-1,-1 0 0,1 0 1,0 0-1,-1 0 0,1 1 1,0-1-1,0 0 0,0 1 1,0 0-1,-1 0-219,2-1-4,1 0 0,0 0 1,-1 0-1,1 1 0,0-1 0,-1 0 0,1 0 1,0 0-1,0 0 0,0 1 0,0-1 0,0 0 1,0 0-1,0 0 0,1 0 0,-1 1 1,0-1-1,1 0 0,-1 0 0,0 0 0,1 0 1,0 0-1,-1 0 0,1 0 0,0 0 0,-1 0 1,1 0-1,0 0 4,2 3-15,0 0-1,0-1 1,1 1 0,-1-1 0,1 1 0,1 0 15,1 0 6,-1-1-1,0 1 1,0 0 0,-1 0 0,1 0 0,3 5-6,-8-8 17,1 0 0,0 0 1,-1 0-1,1 0 0,-1 0 0,1 0 1,-1 0-1,1 0 0,-1 0 0,0 0 0,0 0 1,0 0-1,1 0 0,-1 1 0,0-1 1,0 0-1,0 0 0,-1 0 0,1 0 0,0 0 1,0 0-1,-1 1 0,1-1 0,0 0 0,-1 0 1,1 0-1,-1 0 0,1 0 0,-1 0 1,0-1-1,0 1 0,1 0 0,-1 0 0,0 0 1,0 0-1,0-1 0,0 1 0,1 0 0,-1-1 1,0 1-1,-1-1-17,-1 2 54,0 0 0,0 0 0,0 0 0,-1-1 0,1 1 0,0-1 1,-1 0-1,1 0 0,-1-1 0,0 1 0,1-1 0,-1 1 0,0-1 0,-2 0-54,2-2-165,3-1 80</inkml:trace>
   <inkml:trace contextRef="#ctx0" brushRef="#br0" timeOffset="165915.511">5164 2078 7040,'0'0'94,"0"-1"1,0 1-1,0 0 1,0-1-1,0 1 1,0 0 0,0-1-1,0 1 1,-1 0-1,1-1 1,0 1-1,0 0 1,0 0-1,0-1 1,0 1-1,0 0 1,-1-1-1,1 1 1,0 0-1,0 0 1,0-1 0,-1 1-1,1 0 1,0 0-1,0 0 1,-1-1-1,1 1 1,0 0-1,-1 0 1,1 0-1,0 0 1,0 0-1,-1 0 1,1 0 0,-1-1-95,-9 8 504,4-2-387,2-1 36,-1 0 0,1 0 0,0 0 0,0 1-1,1 0 1,-1 0-153,3-3 84,0 0 1,0-1-1,0 1 0,0 0 0,0 0 0,1 0 0,-1 0 0,1 0 1,-1 1-85,1-3 7,0 1 0,0 0 0,0 0 1,0 0-1,0-1 0,0 1 1,0 0-1,0 0 0,1 0 0,-1-1 1,0 1-1,0 0 0,1-1 1,-1 1-1,1 0 0,-1 0 0,0-1 1,1 1-1,-1-1 0,1 1 1,0 0-1,-1-1-7,1 1 6,0-1 0,0 1 0,0-1 0,0 0 0,0 1 1,0-1-1,1 0 0,-1 0 0,0 0 0,0 1 0,0-1 0,0 0 0,0-1 0,0 1 0,0 0 0,0 0 1,0 0-1,0-1 0,0 1 0,0 0 0,0-1 0,0 1 0,0-1 0,0 1 0,0-1-6,3-1-129,-1 0-1,1 0 0,0-1 1,-1 0-1,3-2 130,2-4-2229</inkml:trace>
-  <inkml:trace contextRef="#ctx0" brushRef="#br0" timeOffset="166465.454">5179 2114 5632,'0'2'310,"0"0"0,0-1 0,-1 1 0,1 0-1,0-1 1,0 1 0,0 0 0,1-1 0,-1 1 0,0 0 0,1-1 0,-1 1 0,1 0 0,-1-1 0,1 1 0,0-1 0,0 1 0,-1-1 0,1 0-1,1 2-309,-1-3 32,0 1 0,-1 0 0,1 0 0,0-1 0,0 1 0,0 0 0,0-1 0,0 1 0,0-1 0,0 1 0,0-1 0,0 0 0,0 1 0,0-1 0,0 0 0,0 0 0,1 0 0,-1 1-1,0-1 1,0-1 0,0 1 0,0 0 0,0 0 0,0 0 0,0 0 0,1-1 0,-1 1 0,0-1 0,0 1 0,0-1-32,26-16 204,-22 13-321,-1 1-1,1 0 0,0 0 1,0 0-1,0 1 1,5-2 117,-10 4 5,0 0 1,0 0-1,0 0 0,0 0 1,1 0-1,-1 0 1,0 0-1,0 0 1,0 0-1,0 0 1,1 0-1,-1 0 1,0 0-1,0 1 0,0-1 1,0 0-1,0 0 1,0 0-1,1 0 1,-1 0-1,0 0 1,0 1-1,0-1 1,0 0-1,0 0 0,0 0 1,0 0-1,0 0 1,0 1-1,0-1 1,0 0-1,0 0 1,0 0-1,1 0 1,-1 1-1,0-1 0,0 0 1,-1 0-1,1 0 1,0 1-6,1 10 711,-1-1 13,1-9-715,-1-1 1,0 1-1,0 0 0,0-1 1,1 1-1,-1-1 0,0 1 1,1-1-1,-1 1 1,0-1-1,1 1 0,-1-1 1,1 0-1,-1 1 0,1-1 1,-1 1-1,1-1 0,-1 0 1,1 1-1,-1-1 1,1 0-1,-1 0 0,1 0 1,0 1-1,-1-1 0,1 0 1,0 0-10,0 0-8,1 0 1,-1 0-1,1-1 1,-1 1-1,1 0 1,-1-1-1,1 1 1,-1-1-1,1 1 1,-1-1-1,1 0 8,4-3-212,0 0 0,0-1 1,0 1-1,1-3 212,12-12-107,-17 20 180,-1 0 1,1 0-1,-1 0 1,0 1-1,1-1 1,-1 1-1,0-1 1,0 1-1,0 0-73,3 5 90,0 0-1,-1 1 0,0 0 1,0-1-1,0 1 1,-1 2-90,5 15-489,-4-19-33</inkml:trace>
+  <inkml:trace contextRef="#ctx0" brushRef="#br0" timeOffset="166465.453">5179 2114 5632,'0'2'310,"0"0"0,0-1 0,-1 1 0,1 0-1,0-1 1,0 1 0,0 0 0,1-1 0,-1 1 0,0 0 0,1-1 0,-1 1 0,1 0 0,-1-1 0,1 1 0,0-1 0,0 1 0,-1-1 0,1 0-1,1 2-309,-1-3 32,0 1 0,-1 0 0,1 0 0,0-1 0,0 1 0,0 0 0,0-1 0,0 1 0,0-1 0,0 1 0,0-1 0,0 0 0,0 1 0,0-1 0,0 0 0,0 0 0,1 0 0,-1 1-1,0-1 1,0-1 0,0 1 0,0 0 0,0 0 0,0 0 0,0 0 0,1-1 0,-1 1 0,0-1 0,0 1 0,0-1-32,26-16 204,-22 13-321,-1 1-1,1 0 0,0 0 1,0 0-1,0 1 1,5-2 117,-10 4 5,0 0 1,0 0-1,0 0 0,0 0 1,1 0-1,-1 0 1,0 0-1,0 0 1,0 0-1,0 0 1,1 0-1,-1 0 1,0 0-1,0 1 0,0-1 1,0 0-1,0 0 1,0 0-1,1 0 1,-1 0-1,0 0 1,0 1-1,0-1 1,0 0-1,0 0 0,0 0 1,0 0-1,0 0 1,0 1-1,0-1 1,0 0-1,0 0 1,0 0-1,1 0 1,-1 1-1,0-1 0,0 0 1,-1 0-1,1 0 1,0 1-6,1 10 711,-1-1 13,1-9-715,-1-1 1,0 1-1,0 0 0,0-1 1,1 1-1,-1-1 0,0 1 1,1-1-1,-1 1 1,0-1-1,1 1 0,-1-1 1,1 0-1,-1 1 0,1-1 1,-1 1-1,1-1 0,-1 0 1,1 1-1,-1-1 1,1 0-1,-1 0 0,1 0 1,0 1-1,-1-1 0,1 0 1,0 0-10,0 0-8,1 0 1,-1 0-1,1-1 1,-1 1-1,1 0 1,-1-1-1,1 1 1,-1-1-1,1 1 1,-1-1-1,1 0 8,4-3-212,0 0 0,0-1 1,0 1-1,1-3 212,12-12-107,-17 20 180,-1 0 1,1 0-1,-1 0 1,0 1-1,1-1 1,-1 1-1,0-1 1,0 1-1,0 0-73,3 5 90,0 0-1,-1 1 0,0 0 1,0-1-1,0 1 1,-1 2-90,5 15-489,-4-19-33</inkml:trace>
   <inkml:trace contextRef="#ctx0" brushRef="#br0" timeOffset="167115.7">5423 2181 6016,'0'0'245,"0"-1"-1,-1 1 1,1 0 0,0-1-1,0 1 1,0-1 0,0 1 0,0 0-1,0-1 1,0 1 0,0 0-1,0-1 1,0 1 0,0 0 0,1-1-1,-1 1 1,0 0 0,0-1-1,0 1 1,0 0 0,0-1 0,1 1-1,-1 0-244,8-12 1304,10-6-1740,-15 15 415,0 0 0,1 1 1,-1-1-1,1 1 0,0 0 1,0 0-1,0 0 0,0 1 1,0-1-1,0 1 0,0 0 1,0 0-1,0 0 0,1 1 1,-1 0-1,1-1 21,-5 1 8,1 1 0,-1-1-1,1 0 1,-1 0 0,1 0 0,-1 0 0,1 0 0,-1 1 0,1-1-1,-1 0 1,0 0 0,1 1 0,-1-1 0,1 0 0,-1 1-1,0-1 1,1 0 0,-1 1 0,0-1 0,1 1 0,-1-1-1,0 1 1,1-1 0,-1 1 0,0-1 0,0 1 0,0-1 0,0 1-1,1-1 1,-1 1 0,0-1 0,0 1 0,0-1 0,0 1-1,0-1-7,-4 24 779,2-6-525,5-6-180,2-9-68</inkml:trace>
   <inkml:trace contextRef="#ctx0" brushRef="#br0" timeOffset="167460.525">5606 2109 4992,'-3'3'1824,"3"1"-1408,0 3 224,0-3 32,0 2 288,0 2 256,0 7-160,-2 5 0,1 4-576,-3 1-352,1-1-192,0 0 160,0-3 96,0-1-256,-1-4 0</inkml:trace>
-  <inkml:trace contextRef="#ctx0" brushRef="#br0" timeOffset="167795.381">5630 2083 7168,'0'0'92,"0"0"1,0-1 0,0 1-1,1 0 1,-1 0 0,0 0-1,0-1 1,0 1 0,1 0-1,-1 0 1,0 0 0,0-1-1,1 1 1,-1 0-1,0 0 1,1 0 0,-1 0-1,0 0 1,0 0 0,1 0-1,-1 0 1,0 0 0,1 0-1,-1 0 1,0 0 0,1 0-1,-1 0 1,0 0 0,1 0-1,-1 0 1,0 0-1,0 0 1,1 0 0,-1 0-1,0 0 1,1 0 0,-1 1-1,0-1 1,0 0 0,1 0-1,-1 0 1,0 1 0,0-1-1,0 0 1,1 0 0,-1 1-1,0-1 1,0 0-1,0 0 1,0 1-93,17 15 404,-13-11-134,-2-3-189,0-1 0,0 1 0,-1 0 0,1 0 0,-1 0 0,1 1 0,-1-1-1,0 0 1,1 0 0,-1 1 0,-1-1 0,1 1 0,0-1 0,0 1 0,-1 1-81,0-1 90,0-1 1,0 0 0,-1 0 0,1 1 0,-1-1-1,1 0 1,-1 0 0,0 0 0,0 0 0,0 0 0,0 0-1,0 0 1,0 0 0,-1-1 0,1 1 0,-1 0-1,1-1 1,-2 2-91,-3 1-240,6-4 230,0 0 0,0 0 1,0 0-1,0 0 0,0 1 0,0-1 1,0 0-1,0 0 0,0 0 0,-1 0 1,1 0-1,0 0 0,0 0 0,0 0 1,0 0-1,0 0 0,0 0 0,0 0 1,-1 0-1,1 0 0,0 0 0,0 1 1,0-1-1,0 0 0,0 0 0,0 0 1,-1 0-1,1 0 0,0-1 0,0 1 1,0 0-1,0 0 0,0 0 0,0 0 1,-1 0-1,1 0 0,0 0 0,0 0 1,0 0-1,0 0 0,0 0 0,0 0 1,0 0-1,-1 0 0,1-1 0,0 1 1,0 0 9,1-2 64</inkml:trace>
+  <inkml:trace contextRef="#ctx0" brushRef="#br0" timeOffset="167795.38">5630 2083 7168,'0'0'92,"0"0"1,0-1 0,0 1-1,1 0 1,-1 0 0,0 0-1,0-1 1,0 1 0,1 0-1,-1 0 1,0 0 0,0-1-1,1 1 1,-1 0-1,0 0 1,1 0 0,-1 0-1,0 0 1,0 0 0,1 0-1,-1 0 1,0 0 0,1 0-1,-1 0 1,0 0 0,1 0-1,-1 0 1,0 0 0,1 0-1,-1 0 1,0 0-1,0 0 1,1 0 0,-1 0-1,0 0 1,1 0 0,-1 1-1,0-1 1,0 0 0,1 0-1,-1 0 1,0 1 0,0-1-1,0 0 1,1 0 0,-1 1-1,0-1 1,0 0-1,0 0 1,0 1-93,17 15 404,-13-11-134,-2-3-189,0-1 0,0 1 0,-1 0 0,1 0 0,-1 0 0,1 1 0,-1-1-1,0 0 1,1 0 0,-1 1 0,-1-1 0,1 1 0,0-1 0,0 1 0,-1 1-81,0-1 90,0-1 1,0 0 0,-1 0 0,1 1 0,-1-1-1,1 0 1,-1 0 0,0 0 0,0 0 0,0 0 0,0 0-1,0 0 1,0 0 0,-1-1 0,1 1 0,-1 0-1,1-1 1,-2 2-91,-3 1-240,6-4 230,0 0 0,0 0 1,0 0-1,0 0 0,0 1 0,0-1 1,0 0-1,0 0 0,0 0 0,-1 0 1,1 0-1,0 0 0,0 0 0,0 0 1,0 0-1,0 0 0,0 0 0,0 0 1,-1 0-1,1 0 0,0 0 0,0 1 1,0-1-1,0 0 0,0 0 0,0 0 1,-1 0-1,1 0 0,0-1 0,0 1 1,0 0-1,0 0 0,0 0 0,0 0 1,-1 0-1,1 0 0,0 0 0,0 0 1,0 0-1,0 0 0,0 0 0,0 0 1,0 0-1,-1 0 0,1-1 0,0 1 1,0 0 9,1-2 64</inkml:trace>
   <inkml:trace contextRef="#ctx0" brushRef="#br0" timeOffset="168134.712">5826 1893 7680,'-2'3'2880,"2"1"-2240,2 4 192,-2-2-96,0 2-128,-2 5 32,-1 7-96,-2 4 0,-1 0-288,-1 0-160,1-1-64,1-4-192,2 1-32,1-4-64,2-4 64,3-2 896,1-3 383</inkml:trace>
-  <inkml:trace contextRef="#ctx0" brushRef="#br0" timeOffset="168493.461">5867 2093 7168,'-1'1'184,"1"-1"0,0 0 0,0 1 0,0-1 0,0 0 0,0 1-1,-1-1 1,1 1 0,0-1 0,0 0 0,0 1 0,0-1 0,0 0 0,0 1 0,0-1 0,0 1 0,0-1 0,1 0 0,-1 1 0,0-1 0,0 1 0,0-1 0,0 0 0,0 1 0,1-1 0,-1 0 0,0 1 0,0-1 0,1 0-1,-1 0 1,0 1 0,1-1-184,-1 1 15,0-1-1,1 1 0,-1-1 1,0 1-1,1-1 0,-1 1 1,0-1-1,1 1 0,-1-1 0,1 1 1,-1-1-1,1 0 0,-1 1 1,1-1-1,-1 0 0,1 1 1,-1-1-1,1 0 0,0 0 1,-1 1-1,1-1 0,-1 0 1,1 0-1,0 0 0,-1 0 0,1 0 1,0 0-1,-1 0 0,1 0 1,-1 0-1,1 0 0,0-1 1,-1 1-1,1 0-14,1-1-11,-1 0-1,1 0 1,-1 0 0,0 0-1,0 0 1,1-1 0,-1 1 0,0 0-1,0-1 1,0 1 0,0-1-1,-1 1 1,1-1 0,0 1-1,-1-1 1,1 0 0,-1 1 0,1-1-1,-1 0 12,0 1-3,1 0-1,-1 0 1,0 1-1,0-1 0,0 0 1,0 0-1,0 0 1,0 1-1,0-1 1,0 0-1,0 0 0,0 0 1,0 1-1,-1-1 1,1 0-1,0 0 1,0 1-1,-1-1 0,1 0 1,-1 0-1,1 1 1,-1-1-1,1 0 1,-1 1-1,1-1 1,-1 1-1,1-1 0,-1 1 1,0-1-1,1 1 1,-1-1-1,0 1 1,0 0-1,1-1 0,-1 1 1,0 0-1,0-1 1,1 1-1,-1 0 1,0 0 3,0 0 8,-1 0 0,1 0-1,0 0 1,0 0 0,-1 0 0,1 0 0,0 0 0,0 0 0,0 1 0,-1-1 0,1 1 0,0-1 0,0 1 0,0-1 0,0 1 0,0-1 0,0 1 0,0 0 0,0 0 0,0-1 0,0 1 0,0 0 0,0 0 0,1 0 0,-1 0 0,0 0 0,1 0 0,-1 0 0,0 0 0,1 1 0,0-1-1,-1 0 1,1 0 0,0 0 0,-1 1 0,1-1 0,0 0 0,0 0 0,0 1-8,0 2 37,-1 1 0,1-1-1,0 1 1,1 0 0,-1-1-1,1 1 1,0-1 0,0 1-1,0-1 1,1 1-37,9 15 72,-10-19-90,0 0-1,-1 0 1,1-1-1,0 1 1,0 0-1,-1-1 0,1 1 1,0-1-1,0 1 1,0-1-1,0 1 1,0-1-1,0 0 0,0 1 1,0-1-1,0 0 1,0 0-1,0 0 1,0 0-1,0 0 0,0 0 1,0 0 18,11-1-341</inkml:trace>
+  <inkml:trace contextRef="#ctx0" brushRef="#br0" timeOffset="168493.46">5867 2093 7168,'-1'1'184,"1"-1"0,0 0 0,0 1 0,0-1 0,0 0 0,0 1-1,-1-1 1,1 1 0,0-1 0,0 0 0,0 1 0,0-1 0,0 0 0,0 1 0,0-1 0,0 1 0,0-1 0,1 0 0,-1 1 0,0-1 0,0 1 0,0-1 0,0 0 0,0 1 0,1-1 0,-1 0 0,0 1 0,0-1 0,1 0-1,-1 0 1,0 1 0,1-1-184,-1 1 15,0-1-1,1 1 0,-1-1 1,0 1-1,1-1 0,-1 1 1,0-1-1,1 1 0,-1-1 0,1 1 1,-1-1-1,1 0 0,-1 1 1,1-1-1,-1 0 0,1 1 1,-1-1-1,1 0 0,0 0 1,-1 1-1,1-1 0,-1 0 1,1 0-1,0 0 0,-1 0 0,1 0 1,0 0-1,-1 0 0,1 0 1,-1 0-1,1 0 0,0-1 1,-1 1-1,1 0-14,1-1-11,-1 0-1,1 0 1,-1 0 0,0 0-1,0 0 1,1-1 0,-1 1 0,0 0-1,0-1 1,0 1 0,0-1-1,-1 1 1,1-1 0,0 1-1,-1-1 1,1 0 0,-1 1 0,1-1-1,-1 0 12,0 1-3,1 0-1,-1 0 1,0 1-1,0-1 0,0 0 1,0 0-1,0 0 1,0 1-1,0-1 1,0 0-1,0 0 0,0 0 1,0 1-1,-1-1 1,1 0-1,0 0 1,0 1-1,-1-1 0,1 0 1,-1 0-1,1 1 1,-1-1-1,1 0 1,-1 1-1,1-1 1,-1 1-1,1-1 0,-1 1 1,0-1-1,1 1 1,-1-1-1,0 1 1,0 0-1,1-1 0,-1 1 1,0 0-1,0-1 1,1 1-1,-1 0 1,0 0 3,0 0 8,-1 0 0,1 0-1,0 0 1,0 0 0,-1 0 0,1 0 0,0 0 0,0 0 0,0 1 0,-1-1 0,1 1 0,0-1 0,0 1 0,0-1 0,0 1 0,0-1 0,0 1 0,0 0 0,0 0 0,0-1 0,0 1 0,0 0 0,0 0 0,1 0 0,-1 0 0,0 0 0,1 0 0,-1 0 0,0 0 0,1 1 0,0-1-1,-1 0 1,1 0 0,0 0 0,-1 1 0,1-1 0,0 0 0,0 0 0,0 1-8,0 2 37,-1 1 0,1-1-1,0 1 1,1 0 0,-1-1-1,1 1 1,0-1 0,0 1-1,0-1 1,1 1-37,9 15 72,-10-19-90,0 0-1,-1 0 1,1-1-1,0 1 1,0 0-1,-1-1 0,1 1 1,0-1-1,0 1 1,0-1-1,0 1 1,0-1-1,0 0 0,0 1 1,0-1-1,0 0 1,0 0-1,0 0 1,0 0-1,0 0 0,0 0 1,0 0 18,11-1-341</inkml:trace>
   <inkml:trace contextRef="#ctx0" brushRef="#br0" timeOffset="168864.417">6058 2010 4992,'-2'0'124,"0"0"0,0 0 0,0 1 0,0-1 0,0 1 0,0-1 0,1 1 0,-1 0 0,0-1 0,0 1 0,1 0 0,-1 0 1,0 1-1,1-1 0,-1 0 0,1 0 0,0 1 0,-1 0-124,-25 27 3324,26-28-3246,0 0 0,0 0 1,1 0-1,-1 0 0,0 0 0,1 0 0,-1 0 1,1 1-1,0-1 0,-1 0 0,1 0 0,0 0 1,-1 1-1,1-1 0,0 0 0,0 0 0,0 1 1,0-1-1,0 0 0,1 0 0,-1 0 0,0 1 1,0-1-1,1 0 0,-1 0 0,1 0 0,-1 0 1,1 0-1,0 1 0,-1-1 0,1 0 0,0 0-77,4 4 40,-1-1 0,1 1 1,0-1-1,0-1 0,0 1 1,2 0-42,16 13 246,-22-16-235,1 0 0,-1 0-1,0 1 1,0-1-1,1 1 1,-1-1 0,0 1-1,0-1 1,0 1-1,-1 0 1,1 0 0,0-1-1,-1 1 1,1 0 0,-1 0-1,1 0-10,-1 0 36,-1-1-1,1 0 0,0 0 1,-1 1-1,1-1 0,0 0 1,-1 0-1,0 0 0,1 0 1,-1 0-1,0 0 1,1 0-1,-1 0 0,0 0 1,0 0-1,0 0 0,0 0 1,0 0-1,0 0 0,0-1 1,0 1-1,0-1 1,0 1-1,-2 0-35,-15 8-323,-1-1 1,-8 2 322,12-4-2720</inkml:trace>
   <inkml:trace contextRef="#ctx0" brushRef="#br0" timeOffset="169531.915">4452 2411 7296,'-4'-4'2816,"5"4"-2208,1 0 0,1 2-128,2 2-288,1 4 64,2 5 128,2 4 128,-1 3-256,2 1 64,1-1 32,-1-1 0,-2-3 32,-1-2-288,-3-1-32,-2 0-288,-4-6-96</inkml:trace>
   <inkml:trace contextRef="#ctx0" brushRef="#br0" timeOffset="169948.036">4652 2413 7936,'-1'0'219,"0"0"1,0 0 0,1 0-1,-1 0 1,0 0 0,0 0-1,1 0 1,-1 0-1,0 0 1,1 1 0,-1-1-1,0 0 1,1 0 0,-1 1-1,0-1 1,1 0 0,-1 1-1,0-1 1,1 1-1,-1-1 1,1 1-220,-22 14-277,10-6 630,-139 85 137,149-93-468,1-1 0,-1 1-1,1 0 1,0 0-1,-1 0 1,1 1 0,0-1-1,0 0 1,0 0 0,-1 2-22,5-1 91,10-3-132,9-2 87,1 1 0,0 0 0,19 3-46,-11-1-197,-12-1-101</inkml:trace>
   <inkml:trace contextRef="#ctx0" brushRef="#br0" timeOffset="170298.192">4577 2378 6784,'-7'0'2528,"4"1"-1952,-3 3 256,4 1-32,-2 2-480,-3 4-192,-2 7 288,-4 5 160,0 1-288,0-1 64,2-1 0,1-2-352,3-2-64,0-2 32,5-1 64</inkml:trace>
   <inkml:trace contextRef="#ctx0" brushRef="#br0" timeOffset="175329.519">4900 2343 7552,'-1'-2'4456,"1"10"-3437,2 12-969,-8 150 2062,6-168-2084,0 0 1,0 0 0,0 0-1,0 0 1,1 0-1,-1 0 1,1-1-1,-1 1 1,1 0-1,0 0-28,-1-2 5,0 0-1,0 0 0,0 1 0,0-1 0,0 0 0,0 0 0,1 0 0,-1 0 0,0 0 0,0 0 0,0 1 0,0-1 0,0 0 0,1 0 0,-1 0 0,0 0 1,0 0-1,0 0 0,0 0 0,1 0 0,-1 0 0,0 0 0,0 0 0,0 0 0,0 0 0,1 0 0,-1 0 0,0 0 0,0 0 0,0 0 0,0 0 0,1 0 0,-1 0 1,0 0-1,0 0-4,9-10-44,9-25-32,-14 26-93,1 0-1,0 1 0,0-1 1,1 1-1,-1 0 1,5-3 169,-10 10-7,1 1 0,-1-1 0,0 1 1,1 0-1,-1-1 0,0 1 0,1-1 0,-1 1 1,0 0-1,1 0 0,-1-1 0,1 1 1,-1 0-1,1 0 0,-1-1 0,1 1 1,-1 0-1,1 0 0,-1 0 0,1 0 1,-1 0-1,1 0 0,-1 0 0,1 0 1,-1 0-1,1 0 0,-1 0 0,1 0 7,0 1 1,-1-1-1,1 1 0,-1-1 1,1 1-1,-1-1 0,1 1 1,-1 0-1,0-1 0,1 1 1,-1 0-1,0-1 0,1 1 1,-1 0-1,0 0 0,0-1 1,0 1-1,0 0 0,1 7 178,0 0-1,-1 0 1,0 6-178,0-8 216,-2 16 380,2-18-567,-1 1 1,1-1-1,-1 0 1,1 1-1,0-1 1,1 1-1,-1-1 0,1 0 1,0 1-1,0-1 1,0 0-1,1 1-29,2-1-416,0-4-250</inkml:trace>
-  <inkml:trace contextRef="#ctx0" brushRef="#br0" timeOffset="175782.054">5089 2557 7680,'0'1'167,"0"-1"0,1 1 1,-1 0-1,0-1 0,1 1 1,-1 0-1,0-1 0,1 1 0,-1 0 1,1-1-1,-1 1 0,1-1 1,-1 1-1,1-1 0,-1 0 1,1 1-1,0-1 0,-1 1 1,1-1-1,0 0 0,-1 0 0,1 1 1,0-1-1,-1 0 0,1 0 1,0 0-1,0 0 0,-1 0 1,1 1-1,0-2 0,0 1-167,1 1 109,0-1 0,0 0-1,-1 0 1,1 0 0,0 0-1,0-1 1,0 1 0,-1 0-1,1-1 1,0 1 0,0-1-1,1 0-108,-1-1 32,0 0 0,0 0 0,0 0 0,-1-1 0,1 1 0,-1 0 0,1-1 0,-1 1 1,0 0-1,1-1 0,-1 0 0,-1 1 0,1-1 0,0 0 0,-1 1 0,1-1 0,-1 0 0,0-2-32,0 2 4,0 1 1,0 0 0,0 0-1,0-1 1,0 1-1,-1 0 1,1-1-1,-1 1 1,0 0 0,0 0-1,0 0 1,0 0-1,0 0 1,0 0-1,0 0 1,-1 0 0,1 0-1,-1 0 1,1 0-1,-1 1 1,0-1 0,-1 0-5,2 2 7,1-1 0,-1 1 1,1 0-1,-1 0 1,1 0-1,-1 0 1,1 0-1,-1 0 1,0 0-1,1 0 0,-1 0 1,1 0-1,-1 0 1,1 0-1,-1 0 1,1 0-1,-1 0 1,0 1-1,1-1 0,-1 0 1,1 0-1,0 1 1,-1-1-1,1 0 1,-1 1-1,1-1 0,-1 0 1,1 1-1,0-1 1,-1 1-1,1-1 1,0 1-1,-1-1 1,1 1-1,0-1 0,0 1 1,-1-1-1,1 1 1,0-1-1,0 1 1,0-1-1,0 1-7,-7 24 434,5-15-391,0 1-1,1-1 1,1 1 0,0 6-43,0-14-23,0-1-1,0 1 1,1 0 0,0 0 0,-1-1 0,1 1 0,0-1 0,0 1 0,1 2 23,-1-4-18,0 0 1,0 0-1,-1-1 0,1 1 0,0 0 0,0 0 1,0 0-1,0 0 0,0-1 0,0 1 0,0 0 1,0-1-1,0 1 0,0-1 0,0 1 1,0-1-1,1 0 0,-1 1 0,0-1 0,0 0 1,1 0 17,6 0-720</inkml:trace>
+  <inkml:trace contextRef="#ctx0" brushRef="#br0" timeOffset="175782.053">5089 2557 7680,'0'1'167,"0"-1"0,1 1 1,-1 0-1,0-1 0,1 1 1,-1 0-1,0-1 0,1 1 0,-1 0 1,1-1-1,-1 1 0,1-1 1,-1 1-1,1-1 0,-1 0 1,1 1-1,0-1 0,-1 1 1,1-1-1,0 0 0,-1 0 0,1 1 1,0-1-1,-1 0 0,1 0 1,0 0-1,0 0 0,-1 0 1,1 1-1,0-2 0,0 1-167,1 1 109,0-1 0,0 0-1,-1 0 1,1 0 0,0 0-1,0-1 1,0 1 0,-1 0-1,1-1 1,0 1 0,0-1-1,1 0-108,-1-1 32,0 0 0,0 0 0,0 0 0,-1-1 0,1 1 0,-1 0 0,1-1 0,-1 1 1,0 0-1,1-1 0,-1 0 0,-1 1 0,1-1 0,0 0 0,-1 1 0,1-1 0,-1 0 0,0-2-32,0 2 4,0 1 1,0 0 0,0 0-1,0-1 1,0 1-1,-1 0 1,1-1-1,-1 1 1,0 0 0,0 0-1,0 0 1,0 0-1,0 0 1,0 0-1,0 0 1,-1 0 0,1 0-1,-1 0 1,1 0-1,-1 1 1,0-1 0,-1 0-5,2 2 7,1-1 0,-1 1 1,1 0-1,-1 0 1,1 0-1,-1 0 1,1 0-1,-1 0 1,0 0-1,1 0 0,-1 0 1,1 0-1,-1 0 1,1 0-1,-1 0 1,1 0-1,-1 0 1,0 1-1,1-1 0,-1 0 1,1 0-1,0 1 1,-1-1-1,1 0 1,-1 1-1,1-1 0,-1 0 1,1 1-1,0-1 1,-1 1-1,1-1 1,0 1-1,-1-1 1,1 1-1,0-1 0,0 1 1,-1-1-1,1 1 1,0-1-1,0 1 1,0-1-1,0 1-7,-7 24 434,5-15-391,0 1-1,1-1 1,1 1 0,0 6-43,0-14-23,0-1-1,0 1 1,1 0 0,0 0 0,-1-1 0,1 1 0,0-1 0,0 1 0,1 2 23,-1-4-18,0 0 1,0 0-1,-1-1 0,1 1 0,0 0 0,0 0 1,0 0-1,0 0 0,0-1 0,0 1 0,0 0 1,0-1-1,0 1 0,0-1 0,0 1 1,0-1-1,1 0 0,-1 1 0,0-1 0,0 0 1,1 0 17,6 0-720</inkml:trace>
   <inkml:trace contextRef="#ctx0" brushRef="#br0" timeOffset="176642.791">5289 2519 6912,'1'-1'249,"-1"0"1,0 0-1,1 0 1,-1-1-1,0 1 1,0 0-1,0 0 1,0 0-1,0 0 1,0 0-1,0 0 1,-1-1-1,1 1 1,0 0-1,-1 0 1,1 0-1,0 0 1,-1 0-250,0 0 70,1 1 0,0-1 0,-1 1 0,1 0 0,-1 0 0,1-1 0,-1 1 1,1 0-1,-1 0 0,1-1 0,-1 1 0,0 0 0,1 0 0,-1 0 0,1 0 0,-1 0 1,1 0-1,-1 0 0,1 0 0,-1 0 0,0 0 0,1 0 0,-1 0 0,1 1 1,-1-1-71,-2 1 102,-1 0 0,1 1 0,-1 0 0,1-1 0,0 1 0,0 0 0,-1 1 0,2-1 0,-3 2-102,2 0 67,-1-1-1,1 1 0,0 0 1,0 1-1,1-1 1,-1 0-1,0 3-66,3-6 27,-1 0 0,0 0 0,1 0 0,-1 0 1,1 0-1,0 0 0,-1 1 0,1-1 0,0 0 0,0 0 0,0 0 0,0 1 1,0-1-1,0 0 0,0 0 0,0 0 0,0 1 0,1-1 0,-1 0 1,0 0-1,1 0 0,-1 0 0,1 0 0,-1 0 0,1 0 0,-1 0 0,1 0 1,0 0-1,0 0 0,-1 0 0,1 0 0,0 0 0,1 0-27,-1 0 13,1-1 0,0 1-1,0-1 1,0 0 0,-1 1 0,1-1-1,0 0 1,0 0 0,0 0 0,0 0-1,0 0 1,-1-1 0,1 1 0,0 0-1,0-1 1,0 0 0,-1 1 0,1-1-1,0 0 1,-1 0 0,1 0 0,0 0-13,3-2-130,0 0 1,-1 0-1,1-1 1,-1 1 0,0-1-1,4-4 130,-2 0-338,3-1 4,-9 10 354,0 0-1,1 0 1,-1-1-1,0 1 1,0 0-1,0 0 1,0 0 0,0 0-1,0 0 1,0 0-1,-1 0 1,1 0-1,0 0 1,-1 0 0,1 0-20,0 2 88,-1 1 0,1-1 0,0 0 0,0 1 1,0-1-1,1 0 0,-1 0 0,1 1 1,0 0-89,0-2 17,-1-1 0,0 0 0,1 1 0,-1-1 1,1 0-1,0 1 0,-1-1 0,1 0 0,0 0 0,0 0 1,0 0-1,0 0 0,0 0 0,0 0 0,0 0 1,0 0-1,0 0 0,0 0 0,1-1 0,-1 1 0,0 0 1,0-1-1,1 1-17,-1-1-12,0 0-1,0 0 1,-1 0 0,1-1-1,0 1 1,0 0 0,0 0-1,0 0 1,-1-1 0,1 1-1,0-1 1,0 1 0,-1 0-1,1-1 1,0 1 0,-1-1-1,1 1 1,0-1 0,-1 0-1,1 1 1,-1-1 0,1 0-1,-1 1 1,1-1 0,-1 0-1,1 0 1,-1 1 0,0-1-1,0 0 1,1-1 12,8-28-613,-8 27 577,13-53-265,-3 0 0,4-46 301,-15 84 442,8 284 92,-12-272-2310,0-8 528,3 8 745,-1 2 749,1-1 0,0 0 1,1 1-1,-1-1 0,1 0 1,0-4-247,0 9 44,0-1 0,1 0 0,-1 0 0,0 0 0,0 0 0,1 1 0,-1-1 0,0 0 0,1 0 0,-1 1 0,1-1 0,-1 0 0,1 0 0,-1 1 0,1-1 1,0 1-1,-1-1 0,1 1 0,0-1 0,-1 1 0,1-1 0,0 1 0,0-1 0,-1 1 0,1 0 0,0-1 0,0 1 0,0 0 0,0 0 0,-1 0 0,1 0 0,0-1 1,0 1-1,0 0 0,0 1 0,0-1 0,0 0 0,-1 0 0,2 0-44,6 1-3,0 1 0,0 0 1,0 0-1,6 3 3,20 5-517,-21-8-64</inkml:trace>
-  <inkml:trace contextRef="#ctx0" brushRef="#br0" timeOffset="176995.825">5571 2547 3200,'-8'7'1216,"5"-4"-928,0 4 1600,3-3 640,0 2-1216,0 3-544,0-4-224,1 2-32,3 0-256,-2-1-64,1 0-64,1-2-64,-1-1-64</inkml:trace>
+  <inkml:trace contextRef="#ctx0" brushRef="#br0" timeOffset="176995.824">5571 2547 3200,'-8'7'1216,"5"-4"-928,0 4 1600,3-3 640,0 2-1216,0 3-544,0-4-224,1 2-32,3 0-256,-2-1-64,1 0-64,1-2-64,-1-1-64</inkml:trace>
   <inkml:trace contextRef="#ctx0" brushRef="#br0" timeOffset="177364.787">5573 2448 8704,'-7'-18'3232,"3"12"-2496,-1 2 64,3 4-96,0 0-512,1 1-192,-2 2 0,0 3-32,1 2 32,2 4-288,2 0-64</inkml:trace>
   <inkml:trace contextRef="#ctx0" brushRef="#br0" timeOffset="177756.781">5634 2568 3840,'4'41'8782,"2"-15"-6930,-6-26-1841,0 1-1,0-1 1,0 0-1,0 0 1,0 1-1,0-1 0,1 0 1,-1 0-1,0 1 1,0-1-1,0 0 1,0 0-1,0 1 1,1-1-1,-1 0 1,0 0-1,0 0 0,0 1 1,1-1-1,-1 0 1,0 0-1,0 0 1,1 0-1,-1 1 1,0-1-1,1 0 1,-1 0-1,0 0 0,0 0 1,1 0-1,-1 0 1,0 0-1,1 0-10,8-5-223,11-17-861,-16 17 825,3-4-58,-5 6 294,-1 1 1,1 0-1,0-1 0,0 1 1,0 0-1,0 0 1,1 0-1,-1 0 1,0 0-1,1 0 1,0 0 22,-2 3 45,-1-1 0,1 0 1,-1 0-1,1 0 1,-1 0-1,1 0 1,-1 1-1,1-1 0,-1 0 1,1 0-1,-1 1 1,1-1-1,-1 0 1,0 1-1,1-1 0,-1 1 1,0-1-1,1 0 1,-1 1-1,0-1 0,1 1 1,-1-1-1,0 1 1,0-1-1,1 1-45,7 17 883,-4-11-181,-3-4-738,1-1 0,-1 1 0,1-1 0,-1 0 1,1 1-1,0-1 0,0 0 0,0 0 1,0 0-1,1-1 0,-1 1 0,0 0 1,1-1-1,-1 0 0,1 1 0,0-1 1,1 0 35,4 2-1040</inkml:trace>
   <inkml:trace contextRef="#ctx0" brushRef="#br0" timeOffset="178116.849">5876 2543 8704,'0'0'126,"-1"0"0,1-1 1,0 1-1,-1 0 0,1 0 1,0 0-1,-1 0 0,1 0 1,-1-1-1,1 1 0,0 0 0,-1 0 1,1 0-1,0 0 0,-1 0 1,1 0-1,-1 0 0,1 1 1,0-1-1,-1 0 0,1 0 1,-1 0-1,1 0 0,0 0 0,-1 0 1,1 1-1,0-1 0,-1 0 1,1 0-1,0 1 0,0-1 1,-1 0-1,1 1-126,-10 15 585,7-10-600,1 0 0,0 1 0,1-1-1,0 0 1,-1 3 15,2-6 118,1 1 1,-1-1-1,0 0 1,1 0-1,0 0 1,-1 0-1,1 1 0,1-1-118,-2-2 0,0-1 0,0 1-1,0 0 1,1-1-1,-1 1 1,0-1-1,0 0 1,0 1-1,1-1 1,-1 1-1,0-1 1,1 1-1,-1-1 1,0 0-1,1 1 1,-1-1-1,0 1 1,1-1-1,-1 0 1,1 0-1,-1 1 1,1-1-1,-1 0 1,1 0-1,-1 1 1,1-1-1,-1 0 1,1 0-1,-1 0 1,1 0-1,-1 0 1,1 0-1,-1 0 1,1 0-1,-1 0 1,1 0-1,-1 0 1,1 0-1,-1 0 1,1 0-1,-1-1 1,1 1-1,-1 0 1,1 0-1,-1-1 1,1 1-1,-1 0 1,1 0 0,-1-1-1,0 1 1,1-1 0,0 0-66,1-1 1,-1 0 0,0 0 0,0 1 0,1-1-1,-1 0 1,-1 0 0,1-1 0,0 1 0,0 0-1,-1 0 1,1 0 0,-1-1 65,3-28-1654,-4 27 1571,0 7 171,-2 9-173,5 24 1026,2 14-941,-1-26 226,-1 0 0,-1 1 0,-1-1 1,-2 7-227,2-30 19,0 0 1,0 0 0,0 0 0,-1 0 0,1 0 0,0 0 0,0 0 0,-1 0-1,1 0 1,0 0 0,-1 0 0,1 0 0,-1 0 0,1 0 0,-1-1 0,0 1-1,1 0 1,-1 0 0,0-1 0,0 1 0,1 0 0,-1-1 0,0 1 0,0 0-1,0-1 1,0 0 0,0 1 0,0-1 0,0 1 0,0-1 0,0 0 0,0 0-1,0 1 1,0-1 0,0 0 0,0 0 0,0 0 0,0 0-20,-2-1 72,0 1 0,0-1 1,0 0-1,0 0 1,1 0-1,-1 0 0,0 0 1,1-1-1,-1 1 0,1-1 1,-1 0-1,1 0 1,-1 0-73,2 1 11,0 0 1,0-1 0,0 1 0,0-1-1,0 1 1,1-1 0,-1 1 0,0-1-1,1 1 1,-1-1 0,1 0 0,-1 1 0,1-1-1,0 0 1,-1 1 0,1-1 0,0 0-1,0 1 1,1-1 0,-1 0 0,0 0 0,0 1-1,1-1 1,-1 0 0,1 1 0,-1-1-1,1 1 1,0-1 0,0 1 0,0-1-12,1-2-26,1-1 0,-1 1 1,1 0-1,0 0 0,0 0 0,1 1 1,-1-1-1,1 1 0,-1 0 1,2-1 25,13-5-480</inkml:trace>
@@ -1859,7 +1859,7 @@
     </inkml:brush>
   </inkml:definitions>
   <inkml:trace contextRef="#ctx0" brushRef="#br0">0 173 5376,'5'2'5306,"-1"5"-3547,1 10-2057,-4-14 741,13 77 1195,-14-80-1634,0 0 0,0 0 0,0 0 0,0 0 0,0 1 0,0-1 0,0 0 0,0 0 0,0 0 0,0 0 0,0 0 0,0 0 1,0 1-1,0-1 0,0 0 0,0 0 0,0 0 0,1 0 0,-1 0 0,0 0 0,0 0 0,0 0 0,0 1 0,0-1 0,0 0 1,0 0-1,0 0 0,0 0 0,1 0 0,-1 0 0,0 0 0,0 0 0,0 0 0,0 0 0,0 0 0,0 0 0,0 0 0,1 0 0,-1 0 1,0 0-1,0 0 0,0 0 0,0 0 0,0 0 0,0 0 0,1 0 0,-1 0 0,0 0-4,5-6 56,4-15-189,-8 19 89,8-23-256,-7 18 187,0 0 1,1 0-1,0 0 0,0 0 0,4-5 113,-7 12 9,0-1 0,0 1 1,1 0-1,-1 0 0,0 0 0,0 0 0,1 0 0,-1 0 0,0 0 0,0 0 1,1 0-1,-1 0 0,0 0 0,0 0 0,1 0 0,-1 0 0,0 0 0,0 0 0,1 0 1,-1 0-1,0 0 0,0 0 0,1 0 0,-1 0 0,0 0 0,0 1 0,1-1 1,-1 0-1,0 0 0,0 0 0,0 0 0,0 1 0,1-1 0,-1 0 0,0 0 0,0 0 1,0 1-1,0-1 0,0 0 0,1 0 0,-1 1 0,0-1 0,0 0 0,0 0 1,0 1-1,0-1-9,10 19 136,-4-8 274,-5-10-405,0 0 0,0 0 0,0 0 1,0-1-1,0 1 0,0-1 0,0 1 1,0 0-1,0-1 0,0 0 1,0 1-1,0-1 0,0 0 0,0 1 1,0-1-1,1 0 0,-1 0 0,0 0 1,0 0-1,0 0 0,0 0 0,1 0 1,-1-1-1,0 1 0,0 0 1,0-1-1,0 1 0,0 0 0,0-1 1,0 1-1,0-1 0,0 0 0,0 1 1,0-1-6,7-5-192,0 1 1,-1-1 0,1 0-1,0-1 192,1-1-299,-8 6 361,1 1-134,0-1-1,0 0 1,0 1-1,1-1 1,-1 1-1,0-1 1,2 1 72,-4 1-18,1 0 0,-1-1 1,0 1-1,0 0 0,1 0 1,-1 0-1,0 0 0,0 0 1,1 0-1,-1 0 0,0 0 1,1 0-1,-1 1 0,0-1 1,0 0-1,1 0 0,-1 0 1,0 0-1,0 0 1,1 0-1,-1 0 0,0 1 1,0-1-1,0 0 0,1 0 1,-1 0-1,0 1 18,3 12-6,-4 1 917,0 15-154,1-27-741,1 0 0,-1 0-1,0-1 1,0 1 0,1 0-1,-1-1 1,1 1 0,-1 0-1,1-1 1,0 1 0,0-1 0,-1 1-1,2 0-15,2 1 560,0-1 262</inkml:trace>
-  <inkml:trace contextRef="#ctx0" brushRef="#br0" timeOffset="498.913">282 206 6784,'0'0'78,"0"0"1,0 0 0,-1 0-1,1 0 1,0 0-1,0 1 1,0-1-1,0 0 1,0 0 0,-1 0-1,1 0 1,0 0-1,0 0 1,0 0-1,0 0 1,0 1 0,0-1-1,0 0 1,0 0-1,0 0 1,-1 0-1,1 0 1,0 1 0,0-1-1,0 0 1,0 0-1,0 0 1,0 0-1,0 0 1,0 1 0,0-1-1,0 0 1,0 0-1,0 0 1,0 0-1,0 1 1,0-1 0,0 0-1,0 0-78,6 7 1022,9 2 588,-13-8-1532,1-1-1,-1 0 1,0 0 0,1 1 0,-1-2 0,0 1 0,1 0 0,-1 0 0,0-1 0,0 1 0,1-1 0,-1 0 0,0 1 0,0-1 0,0 0-1,0 0 1,0-1 0,0 1 0,0 0 0,1-1-78,-2 1 2,0 0 0,-1 0 0,1 0 0,0 0 0,0 0 0,0 0 0,-1 0 0,1 0 0,-1 0 0,1 0 0,0 0 0,-1-1 0,0 1 0,1 0 0,-1 0 0,0-1 0,0 1 0,0 0 0,0 0 0,0-1 0,0 1 0,0 0 0,0 0 0,0-1 0,0 1 0,-1 0 0,1 0 0,0 0 0,-1-1 0,0 1 0,1 0 0,-1 0 0,1 0 0,-1 0 0,0 0 0,0 0 0,0-1-2,0 2-7,1-1 0,0 1 0,-1-1 0,1 1 0,-1-1 0,1 1 0,-1 0 0,1-1 0,-1 1 0,0 0 0,1-1 0,-1 1 0,1 0 0,-1 0 0,0-1 0,1 1 0,-1 0 1,1 0-1,-1 0 0,0 0 0,1 0 0,-1 0 0,0 0 0,1 0 0,-1 0 0,0 0 0,0 0 7,0 1 10,-1 0 1,1-1-1,-1 1 1,1 0-1,0 0 0,-1 0 1,1 0-1,0 0 0,0 0 1,-1 1-1,1 0-10,-2 1 98,1 0-1,0 0 1,0 0-1,0 1 1,0-1-1,1 1 0,-1-1 1,1 1-1,0-1 1,-1 3-98,3 1 15,0 0 1,0 0-1,0-1 1,1 1-1,0 0 0,0 0 1,1-1-1,-1 1 1,3 1-16,-5-7-24,0 0 1,1-1-1,-1 1 1,0 0 0,1-1-1,-1 1 1,1 0 0,-1-1-1,1 1 1,-1-1 0,1 1-1,-1-1 1,1 1 0,-1-1-1,1 1 1,0-1 0,-1 0-1,1 1 1,0-1 0,-1 0-1,1 0 1,0 1-1,0-1 1,-1 0 0,1 0-1,0 0 1,0 0 0,-1 0-1,1 0 1,0 0 0,0 0-1,-1 0 1,1 0 0,0 0-1,-1-1 1,1 1 0,0 0 23,10-4-880</inkml:trace>
+  <inkml:trace contextRef="#ctx0" brushRef="#br0" timeOffset="498.912">282 206 6784,'0'0'78,"0"0"1,0 0 0,-1 0-1,1 0 1,0 0-1,0 1 1,0-1-1,0 0 1,0 0 0,-1 0-1,1 0 1,0 0-1,0 0 1,0 0-1,0 0 1,0 1 0,0-1-1,0 0 1,0 0-1,0 0 1,-1 0-1,1 0 1,0 1 0,0-1-1,0 0 1,0 0-1,0 0 1,0 0-1,0 0 1,0 1 0,0-1-1,0 0 1,0 0-1,0 0 1,0 0-1,0 1 1,0-1 0,0 0-1,0 0-78,6 7 1022,9 2 588,-13-8-1532,1-1-1,-1 0 1,0 0 0,1 1 0,-1-2 0,0 1 0,1 0 0,-1 0 0,0-1 0,0 1 0,1-1 0,-1 0 0,0 1 0,0-1 0,0 0-1,0 0 1,0-1 0,0 1 0,0 0 0,1-1-78,-2 1 2,0 0 0,-1 0 0,1 0 0,0 0 0,0 0 0,0 0 0,-1 0 0,1 0 0,-1 0 0,1 0 0,0 0 0,-1-1 0,0 1 0,1 0 0,-1 0 0,0-1 0,0 1 0,0 0 0,0 0 0,0-1 0,0 1 0,0 0 0,0 0 0,0-1 0,0 1 0,-1 0 0,1 0 0,0 0 0,-1-1 0,0 1 0,1 0 0,-1 0 0,1 0 0,-1 0 0,0 0 0,0 0 0,0-1-2,0 2-7,1-1 0,0 1 0,-1-1 0,1 1 0,-1-1 0,1 1 0,-1 0 0,1-1 0,-1 1 0,0 0 0,1-1 0,-1 1 0,1 0 0,-1 0 0,0-1 0,1 1 0,-1 0 1,1 0-1,-1 0 0,0 0 0,1 0 0,-1 0 0,0 0 0,1 0 0,-1 0 0,0 0 0,0 0 7,0 1 10,-1 0 1,1-1-1,-1 1 1,1 0-1,0 0 0,-1 0 1,1 0-1,0 0 0,0 0 1,-1 1-1,1 0-10,-2 1 98,1 0-1,0 0 1,0 0-1,0 1 1,0-1-1,1 1 0,-1-1 1,1 1-1,0-1 1,-1 3-98,3 1 15,0 0 1,0 0-1,0-1 1,1 1-1,0 0 0,0 0 1,1-1-1,-1 1 1,3 1-16,-5-7-24,0 0 1,1-1-1,-1 1 1,0 0 0,1-1-1,-1 1 1,1 0 0,-1-1-1,1 1 1,-1-1 0,1 1-1,-1-1 1,1 1 0,-1-1-1,1 1 1,0-1 0,-1 0-1,1 1 1,0-1 0,-1 0-1,1 0 1,0 1-1,0-1 1,-1 0 0,1 0-1,0 0 1,0 0 0,-1 0-1,1 0 1,0 0 0,0 0-1,-1 0 1,1 0 0,0 0-1,-1-1 1,1 1 0,0 0 23,10-4-880</inkml:trace>
   <inkml:trace contextRef="#ctx0" brushRef="#br0" timeOffset="1279.867">413 186 7552,'2'3'4065,"8"10"-2840,-7-8-926,-1 0 0,0 0-1,0 0 1,1 5-299,-2-6 119,1 0-1,-1 0 1,1 0 0,-1 0-1,1 0 1,0-1 0,0 1-1,2 1-118,-4-5 15,1 1-1,-1-1 0,1 0 1,-1 0-1,1 1 0,-1-1 1,1 0-1,-1 0 0,1 0 1,-1 0-1,1 1 0,-1-1 1,1 0-1,0 0 0,-1 0 1,1 0-1,-1 0 0,1 0 1,-1-1-1,1 1 0,-1 0 1,1 0-1,-1 0 0,1 0 1,-1-1-1,1 1 0,-1 0 1,1 0-1,-1-1 0,1 1 1,-1 0-1,0-1 0,1 1 1,-1 0-1,1-1 0,-1 1 1,0-1-1,1 1-14,14-20-891,-13 18 811,0-1 70,0-1-88,1 1-1,-1 0 1,0 0-1,1 0 1,-1 1-1,1-1 1,0 1-1,0-1 1,1 1 98,-3 3 41,0 1 0,0-1 0,-1 0 0,1 1 1,0 0-1,-1-1 0,1 1 0,-1-1 0,1 1 1,-1 0-1,0 1-41,1 1 91,0-1-16,0 0 0,0 0 1,0 0-1,1 0 1,-1 0-1,1 0 1,-1-1-1,1 2-75,-1-4 8,-1 0 0,0 1 0,1-1 0,-1 0 0,0 0 0,1 1 0,-1-1 0,0 0 0,1 0 0,-1 0 0,0 1 0,1-1 0,-1 0 0,1 0 0,-1 0 0,0 0 0,1 0 0,-1 0 0,1 0 0,-1 0 0,0 0 0,1 0 0,-1 0 0,1 0 0,-1 0-8,1 0-2,0-1 1,0 1-1,0-1 0,0 0 0,0 1 0,0-1 1,0 0-1,0 0 0,-1 1 0,1-1 1,0 0-1,-1 0 0,1 0 0,0 0 2,5-9-68,-1-1 1,0 1-1,-1-1 0,0 0 0,0-1 0,-1 1 0,0-8 68,9-27-138,-6 27 177,1 1 1,0 0-1,2 0 1,0 0-1,1 1-39,-10 16 2,0 1 0,0 0 0,0 0 0,0 0 0,0-1 0,0 1 0,1 0 0,-1 0 0,0-1 0,0 1 0,0 0 0,0 0 1,0 0-1,1 0 0,-1-1 0,0 1 0,0 0 0,0 0 0,0 0 0,1 0 0,-1 0 0,0-1 0,0 1 0,1 0 0,-1 0 0,0 0 0,0 0 0,0 0 0,1 0 0,-1 0 0,0 0 0,0 0 0,1 0 0,-1 0 0,0 0 0,0 0 0,1 0 0,-1 0 0,0 0 0,0 0 0,0 0 0,1 0 0,-1 1 0,0-1 0,0 0 0,1 0 0,-1 0 0,0 0 0,0 0 0,0 1 0,0-1 0,1 0 0,-1 0 0,0 0 0,0 0 0,0 1 0,0-1 1,0 0-1,0 0 0,1 1 0,-1-1-2,5 16 31,6 31 177,-2 0 0,-3 1 0,1 44-208,-6-91-17,-1 1 1,0 0-1,0 0 1,-1-1-1,1 1 1,0 0-1,0 0 0,-1-1 1,1 1-1,-1 0 1,0-1-1,1 1 1,-1 0 16,1-2-2,-1 0 0,1 1 1,0-1-1,0 0 0,-1 0 1,1 0-1,0 0 0,0 0 1,-1 1-1,1-1 0,0 0 1,0 0-1,-1 0 0,1 0 1,0 0-1,-1 0 0,1 0 0,0 0 1,0 0-1,-1 0 0,1 0 1,0 0-1,-1 0 0,1 0 1,0 0-1,-1-1 2,-11-7-130,4 1-147,0-1 1,1-1-1,0 1 1,0-1 0,-5-9 276,10 14 137,-1 0 0,1 0 1,0 0-1,0 0 0,1-1 0,0 1 1,-1-1-1,1 1 0,1-1 0,-1 1 1,1-1-1,-1 1 0,1-1 1,1 1-1,-1-4-137,1 6 19,0 0 0,-1 0 0,1 0 0,0 0 0,0 0 0,0 0 0,0 0 0,1 1 0,-1-1 1,0 0-1,1 1 0,-1-1 0,1 1 0,-1-1 0,1 1 0,0 0 0,0 0 0,0 0 0,0 0 0,0 0 0,-1 0 0,2 0 0,-1 1 0,0-1 1,0 1-1,0-1 0,1 1-19,8-1-246,0 0 1,0 0-1,0 1 0,11 2 246,-14-1-188,14 0-521</inkml:trace>
 </inkml:ink>
 </file>
@@ -1889,21 +1889,21 @@
     </inkml:brush>
   </inkml:definitions>
   <inkml:trace contextRef="#ctx0" brushRef="#br0">2900 313 7424,'0'0'116,"0"0"1,1-1-1,-1 1 1,0-1-1,0 1 0,0-1 1,0 1-1,0 0 1,0-1-1,0 1 1,0-1-1,0 1 1,0-1-1,0 1 1,0 0-1,-1-1 0,1 1 1,0-1-1,0 1 1,0 0-1,0-1 1,-1 1-1,1-1 1,0 1-1,0 0 1,-1-1-1,1 1 0,0 0 1,-1 0-1,1-1 1,0 1-1,-1 0 1,1 0-1,-1-1 1,1 1-1,-1 0-116,-18 1 944,-2 3-580,1 1 1,0 1 0,0 1 0,0 0 0,-1 3-365,20-10 13,1 0 1,0 0 0,0 0 0,-1 0 0,1 0 0,0 0 0,-1 1 0,1-1 0,0 0 0,-1 0 0,1 0 0,0 0-1,0 1 1,-1-1 0,1 0 0,0 0 0,0 1 0,0-1 0,-1 0 0,1 1 0,0-1 0,0 0 0,0 0 0,0 1-1,0-1 1,0 0 0,0 1 0,-1-1-14,8 5 154,20 1-132,-22-5 10,5 1-37,1 1-1,-1 0 1,0 1 0,0 0 0,-1 0 0,1 1-1,4 4 6,-11-8-11,-1 1-1,1 0 0,-1 0 1,1 0-1,-1 1 0,0-1 1,0 0-1,0 1 0,-1 0 1,1-1-1,0 1 0,0 2 12,-1-3-5,-1 0 0,1 0 0,-1 0 0,0 1 0,1-1 0,-1 0 0,0 0 0,0 0 0,-1 0 0,1 1 0,0-1 0,-1 0 0,1 0 0,-1 0 0,0 0 0,0 0 0,0 0 0,0 0 0,0 0 0,0 0 5,-2 2 92,0 0 1,0 0-1,0-1 1,-1 1-1,1-1 1,-1 0 0,0 1-1,0-2 1,-4 4-93,5-5-15,0 1 1,0 0-1,0-1 1,0 0-1,0 1 0,-1-1 1,1 0-1,0-1 1,-1 1-1,1-1 1,-1 1-1,1-1 0,0 0 1,-3-1 14,-2-3-491,5-6-79</inkml:trace>
-  <inkml:trace contextRef="#ctx0" brushRef="#br0" timeOffset="383.931">3132 13 8064,'0'-1'149,"-1"1"0,0-1 0,1 0 0,-1 0 0,0 0 0,1 1 0,-1-1 1,0 0-1,0 0 0,0 1 0,0-1 0,0 1 0,0-1 0,0 1 0,0-1 0,0 1 1,0 0-1,0 0 0,0-1 0,0 1 0,0 0 0,0 0 0,0 0-149,-1 1 78,0-1 0,1 1 0,-1 0 0,0 0 0,1 1 0,-1-1 0,1 0 0,0 0 0,-1 1-1,1-1 1,0 1 0,0-1 0,-1 2-78,-3 3 4,1 1 1,0 0-1,1-1 0,0 1 0,0 0 0,0 1 0,1-1 1,0 0-1,-1 6-4,-1 13 29,1 1 1,1 2-30,1-21 21,-2 71 453,3 0 1,9 59-475,-13-164 161,2 14 65,0 0-1,1-1 1,0 1-1,1 0 1,0-1-1,2 0-225,-2 10 34,1-1-1,-1 1 0,1 0 0,0 0 1,0 0-1,1-1 0,-1 1 1,1 0-1,-1 1 0,1-1 0,0 0 1,0 0-1,0 1 0,0-1 1,1 1-1,-1 0 0,1-1 0,-1 1 1,1 0-1,0 1 0,0-1 1,0 0-1,0 1 0,0 0 0,3-1-32,-1 0-82,1 1 0,-1 0 1,1 0-1,-1 0 1,1 1-1,-1 0 0,1 0 1,-1 0-1,6 2 81,7 3-826</inkml:trace>
-  <inkml:trace contextRef="#ctx0" brushRef="#br0" timeOffset="782.825">3248 379 2560,'-7'-6'-564,"-7"0"4798,14 6-4032,-1 0 0,1 0 0,-1 0 0,1 0 0,0 0 0,-1 0 0,1 0 0,-1 0 0,1 0 0,0 0 0,-1 0 0,1 0 0,0 1 0,-1-1 0,1 0 0,-1 0 0,1 0 0,0 0 1,-1 1-1,1-1 0,0 0 0,-1 0 0,1 1-202,0-1 131,-1 1 0,1 0 1,0-1-1,0 1 0,-1 0 0,1-1 1,0 1-1,0 0 0,0 0 1,0-1-1,0 1 0,0 0 1,0-1-1,0 1 0,0 0 1,0 0-1,0 0-131,1 5 120,1 0 0,-1 0 0,1 0 0,0 0 0,1-1 0,-1 1 0,1-1-1,0 1 1,2 1-120,-4-5 22,0 0 0,0-1 1,1 1-1,-1 0 0,1-1 0,-1 1 0,1 0 0,0-1 0,-1 0 0,1 1 0,0-1 0,0 0 0,0 0 0,0 0 0,0 0 0,0-1 0,0 1 0,0 0 0,0-1 0,0 0 0,1 1 0,-1-1 0,0 0 0,0 0 0,0 0 0,1 0 1,-1-1-23,5-1 57,0 0 1,-1-1-1,0 0 1,1 0 0,-1-1-1,0 1 1,0-1-1,0-1-57,-2 2-28,-1 0 0,1 0-1,-1 0 1,0 0-1,0-1 1,0 1-1,0-1 1,-1 0-1,0 0 1,1 1-1,-1-2 1,-1 1-1,1-1 29,-1 5 5,-1-1 0,0 1 0,0 0 0,0 0 0,0-1 0,-1 1 0,1 0 0,0 0 0,0 0 0,0-1 0,0 1 0,0 0 0,0 0-1,0 0 1,0 0 0,0-1 0,0 1 0,-1 0 0,1 0 0,0 0 0,0 0 0,0-1 0,0 1 0,0 0 0,-1 0 0,1 0 0,0 0 0,0 0 0,0 0 0,-1 0 0,1-1 0,0 1-1,0 0 1,0 0 0,-1 0 0,1 0 0,0 0 0,0 0 0,0 0 0,-1 0 0,1 0 0,0 0 0,0 0 0,0 0 0,-1 0 0,1 1 0,0-1 0,0 0 0,0 0 0,-1 0 0,1 0-1,0 0 1,0 0 0,0 0 0,-1 1 0,1-1 0,0 0 0,0 0 0,0 0 0,0 0 0,0 0 0,0 1 0,-1-1 0,1 0 0,0 0 0,0 0 0,0 1 0,0-1 0,0 0-5,-1 3-13,0-1 0,0 1 1,0 0-1,1 0 0,-1-1 1,1 1-1,-1 0 0,1 0 1,0 0-1,0 0 0,1-1 1,-1 1-1,0 0 0,1 0 1,0 0 12,0 3 5,1 0 1,0 0 0,1 0 0,-1 0 0,1 0 0,1 1-6,-1-2-51,1-1 0,-1 0 0,0 0 0,1 0 0,0 0 0,0-1 1,0 1-1,1-1 0,-1 0 0,1 0 0,4 1 51,11 3-517</inkml:trace>
+  <inkml:trace contextRef="#ctx0" brushRef="#br0" timeOffset="383.93">3132 13 8064,'0'-1'149,"-1"1"0,0-1 0,1 0 0,-1 0 0,0 0 0,1 1 0,-1-1 1,0 0-1,0 0 0,0 1 0,0-1 0,0 1 0,0-1 0,0 1 0,0-1 0,0 1 1,0 0-1,0 0 0,0-1 0,0 1 0,0 0 0,0 0 0,0 0-149,-1 1 78,0-1 0,1 1 0,-1 0 0,0 0 0,1 1 0,-1-1 0,1 0 0,0 0 0,-1 1-1,1-1 1,0 1 0,0-1 0,-1 2-78,-3 3 4,1 1 1,0 0-1,1-1 0,0 1 0,0 0 0,0 1 0,1-1 1,0 0-1,-1 6-4,-1 13 29,1 1 1,1 2-30,1-21 21,-2 71 453,3 0 1,9 59-475,-13-164 161,2 14 65,0 0-1,1-1 1,0 1-1,1 0 1,0-1-1,2 0-225,-2 10 34,1-1-1,-1 1 0,1 0 0,0 0 1,0 0-1,1-1 0,-1 1 1,1 0-1,-1 1 0,1-1 0,0 0 1,0 0-1,0 1 0,0-1 1,1 1-1,-1 0 0,1-1 0,-1 1 1,1 0-1,0 1 0,0-1 1,0 0-1,0 1 0,0 0 0,3-1-32,-1 0-82,1 1 0,-1 0 1,1 0-1,-1 0 1,1 1-1,-1 0 0,1 0 1,-1 0-1,6 2 81,7 3-826</inkml:trace>
+  <inkml:trace contextRef="#ctx0" brushRef="#br0" timeOffset="782.824">3248 379 2560,'-7'-6'-564,"-7"0"4798,14 6-4032,-1 0 0,1 0 0,-1 0 0,1 0 0,0 0 0,-1 0 0,1 0 0,-1 0 0,1 0 0,0 0 0,-1 0 0,1 0 0,0 1 0,-1-1 0,1 0 0,-1 0 0,1 0 0,0 0 1,-1 1-1,1-1 0,0 0 0,-1 0 0,1 1-202,0-1 131,-1 1 0,1 0 1,0-1-1,0 1 0,-1 0 0,1-1 1,0 1-1,0 0 0,0 0 1,0-1-1,0 1 0,0 0 1,0-1-1,0 1 0,0 0 1,0 0-1,0 0-131,1 5 120,1 0 0,-1 0 0,1 0 0,0 0 0,1-1 0,-1 1 0,1-1-1,0 1 1,2 1-120,-4-5 22,0 0 0,0-1 1,1 1-1,-1 0 0,1-1 0,-1 1 0,1 0 0,0-1 0,-1 0 0,1 1 0,0-1 0,0 0 0,0 0 0,0 0 0,0 0 0,0-1 0,0 1 0,0 0 0,0-1 0,0 0 0,1 1 0,-1-1 0,0 0 0,0 0 0,0 0 0,1 0 1,-1-1-23,5-1 57,0 0 1,-1-1-1,0 0 1,1 0 0,-1-1-1,0 1 1,0-1-1,0-1-57,-2 2-28,-1 0 0,1 0-1,-1 0 1,0 0-1,0-1 1,0 1-1,0-1 1,-1 0-1,0 0 1,1 1-1,-1-2 1,-1 1-1,1-1 29,-1 5 5,-1-1 0,0 1 0,0 0 0,0 0 0,0-1 0,-1 1 0,1 0 0,0 0 0,0 0 0,0-1 0,0 1 0,0 0 0,0 0-1,0 0 1,0 0 0,0-1 0,0 1 0,-1 0 0,1 0 0,0 0 0,0 0 0,0-1 0,0 1 0,0 0 0,-1 0 0,1 0 0,0 0 0,0 0 0,0 0 0,-1 0 0,1-1 0,0 1-1,0 0 1,0 0 0,-1 0 0,1 0 0,0 0 0,0 0 0,0 0 0,-1 0 0,1 0 0,0 0 0,0 0 0,0 0 0,-1 0 0,1 1 0,0-1 0,0 0 0,0 0 0,-1 0 0,1 0-1,0 0 1,0 0 0,0 0 0,-1 1 0,1-1 0,0 0 0,0 0 0,0 0 0,0 0 0,0 0 0,0 1 0,-1-1 0,1 0 0,0 0 0,0 0 0,0 1 0,0-1 0,0 0-5,-1 3-13,0-1 0,0 1 1,0 0-1,1 0 0,-1-1 1,1 1-1,-1 0 0,1 0 1,0 0-1,0 0 0,1-1 1,-1 1-1,0 0 0,1 0 1,0 0 12,0 3 5,1 0 1,0 0 0,1 0 0,-1 0 0,1 0 0,1 1-6,-1-2-51,1-1 0,-1 0 0,0 0 0,1 0 0,0 0 0,0-1 1,0 1-1,1-1 0,-1 0 0,1 0 0,4 1 51,11 3-517</inkml:trace>
   <inkml:trace contextRef="#ctx0" brushRef="#br0" timeOffset="1185.12">3629 393 512,'-4'-7'-1364,"4"6"1828,0 0 0,0 1 0,-1-1 0,1 0 0,0 1 0,-1-1 1,1 0-1,-1 1 0,1-1 0,-1 1 1,1-1-1,-1 1 0,1-1 0,-1 1 0,0-1 1,1 1-1,-1 0 0,0-1 0,1 1 1,-1 0-465,-9-1 1509,7 2-1393,1 0 0,-1 0 0,0 0 1,0 0-1,0 0 0,0 0 0,1 1 0,-1 0 0,1-1 0,-1 1 0,1 0 1,0 0-1,-1 0 0,1 1 0,0-1 0,0 0 0,1 1 0,-1-1 1,0 1-1,1 0 0,0 0 0,0-1 0,-1 1 0,2 0 0,-1 0 0,0 1-116,-1 1 47,1 0-1,0-1 0,0 1 0,1 0 0,-1 0 0,1 0 1,0 0-1,1 0 0,-1 0 0,1 0 0,0 0 0,0 0 1,0-1-1,1 1 0,1 4-46,-2-8 2,-1 0 0,1 1 0,-1-1 1,1 0-1,0 0 0,-1 0 0,1 0 0,0 0 1,0 0-1,0-1 0,0 1 0,0 0 0,0 0 1,0-1-1,0 1 0,0 0 0,0-1 0,0 1 0,0-1 1,0 1-1,1-1 0,-1 0 0,0 1 0,0-1 1,0 0-1,1 0 0,-1 0 0,0 0 0,0 0 1,1 0-1,-1 0 0,0-1 0,0 1 0,1 0 0,-1-1 1,0 1-1,0-1 0,0 1 0,0-1 0,0 1 1,0-1-1,0 0 0,0 0 0,0 1 0,1-2-2,5-4-58,-1 0 0,1-1 0,-1 0 0,0 0 0,3-5 58,-8 10-43,19-25-1493,2-3-746</inkml:trace>
   <inkml:trace contextRef="#ctx0" brushRef="#br0" timeOffset="1567.505">3794 59 7424,'-1'-1'142,"0"0"1,0-1 0,0 1 0,0 0-1,-1 0 1,1 0 0,0 0-1,0 0 1,-1 0 0,1 1-1,0-1 1,-1 0 0,1 1 0,-1-1-1,1 1 1,-1-1 0,1 1-1,-1 0 1,1-1 0,-1 1-1,0 0 1,1 0 0,-1 0 0,1 0-1,-1 0 1,1 1 0,-1-1-1,1 0 1,-1 1 0,1-1-1,-1 1 1,1 0 0,-1-1 0,1 1-1,0 0 1,-1 0 0,1 0-143,-3 2-8,0 0 0,0 0 1,1 0-1,-1 1 1,1-1-1,0 1 1,0 0-1,0 0 1,0 0-1,1 0 0,-1 1 1,1-1-1,0 1 8,-5 13 138,1-1 0,-3 16-138,7-25 79,-5 24 239,1 0 1,1 1-1,2-1 0,1 1 1,1 0-1,2 0 1,4 22-319,-4-46-45,-1-7 2,0 1 1,0 0-1,1-1 1,-1 1-1,0 0 1,1-1-1,0 1 1,0-1-1,0 1 1,0-1-1,0 1 1,0-1-1,1 0 1,-1 1-1,1-1 1,0 1 42,8 0-704</inkml:trace>
-  <inkml:trace contextRef="#ctx0" brushRef="#br0" timeOffset="1967.184">3822 342 8576,'7'11'3912,"19"16"-2247,-23-24-1682,-1-1 0,1 0 0,0 0 0,0 0 1,1 0-1,-1-1 0,0 1 0,2-1 17,-4 0 37,1-1 0,-1 1 0,0-1 0,1 0 0,-1 0 0,1 0-1,-1 0 1,1 0 0,-1 0 0,1 0 0,-1 0 0,0-1 0,1 1 0,-1 0 0,1-1 0,-1 0 0,0 1 0,1-1 0,-1 0 0,1 0-37,-2 1 4,0-1 1,1 1-1,-1 0 0,1-1 1,-1 1-1,0-1 0,0 1 1,1-1-1,-1 1 0,0-1 1,0 1-1,1-1 1,-1 1-1,0-1 0,0 0 1,0 1-1,0-1 0,0 1 1,0-1-1,0 1 0,0-1 1,0 0-1,0 1 1,0-1-1,0 1 0,-1-1 1,1 1-1,0-1 0,0 1 1,0-1-1,-1 1 0,1-1 1,0 1-1,-1-1 0,1 1 1,0-1-1,-1 1 1,1 0-1,-1-1 0,1 1-4,-2-3-69,0 1 0,0 0 0,-1 0 0,1 0 0,0 1 0,-1-1 0,-1-1 69,-1 2-18,0-1 0,-1 1 0,1-1 0,-1 1 1,1 1-1,-1-1 0,1 1 0,-1 0 1,1 0-1,-1 1 0,1 0 0,-1 0 0,1 0 1,0 0-1,-1 1 0,1 0 0,0 0 1,0 0-1,0 1 0,0 0 0,-3 2 18,6-3 21,0 0 0,0 0 0,1 0-1,-1 1 1,1-1 0,0 0 0,-1 0 0,1 1-1,0-1 1,0 1 0,1-1 0,-1 1 0,0-1-1,1 1 1,0 0 0,0-1 0,-1 1 0,1 0-1,1-1 1,-1 1 0,0-1 0,1 1 0,-1 0-1,1-1 1,0 1 0,0-1 0,0 1-21,2 5 38,1 0 0,0 0-1,0 0 1,1-1 0,-1 0 0,2 0 0,4 5-38,6 2-240,0-6-149</inkml:trace>
+  <inkml:trace contextRef="#ctx0" brushRef="#br0" timeOffset="1967.183">3822 342 8576,'7'11'3912,"19"16"-2247,-23-24-1682,-1-1 0,1 0 0,0 0 0,0 0 1,1 0-1,-1-1 0,0 1 0,2-1 17,-4 0 37,1-1 0,-1 1 0,0-1 0,1 0 0,-1 0 0,1 0-1,-1 0 1,1 0 0,-1 0 0,1 0 0,-1 0 0,0-1 0,1 1 0,-1 0 0,1-1 0,-1 0 0,0 1 0,1-1 0,-1 0 0,1 0-37,-2 1 4,0-1 1,1 1-1,-1 0 0,1-1 1,-1 1-1,0-1 0,0 1 1,1-1-1,-1 1 0,0-1 1,0 1-1,1-1 1,-1 1-1,0-1 0,0 0 1,0 1-1,0-1 0,0 1 1,0-1-1,0 1 0,0-1 1,0 0-1,0 1 1,0-1-1,0 1 0,-1-1 1,1 1-1,0-1 0,0 1 1,0-1-1,-1 1 0,1-1 1,0 1-1,-1-1 0,1 1 1,0-1-1,-1 1 1,1 0-1,-1-1 0,1 1-4,-2-3-69,0 1 0,0 0 0,-1 0 0,1 0 0,0 1 0,-1-1 0,-1-1 69,-1 2-18,0-1 0,-1 1 0,1-1 0,-1 1 1,1 1-1,-1-1 0,1 1 0,-1 0 1,1 0-1,-1 1 0,1 0 0,-1 0 0,1 0 1,0 0-1,-1 1 0,1 0 0,0 0 1,0 0-1,0 1 0,0 0 0,-3 2 18,6-3 21,0 0 0,0 0 0,1 0-1,-1 1 1,1-1 0,0 0 0,-1 0 0,1 1-1,0-1 1,0 1 0,1-1 0,-1 1 0,0-1-1,1 1 1,0 0 0,0-1 0,-1 1 0,1 0-1,1-1 1,-1 1 0,0-1 0,1 1 0,-1 0-1,1-1 1,0 1 0,0-1 0,0 1-21,2 5 38,1 0 0,0 0-1,0 0 1,1-1 0,-1 0 0,2 0 0,4 5-38,6 2-240,0-6-149</inkml:trace>
   <inkml:trace contextRef="#ctx0" brushRef="#br0" timeOffset="2347.347">3966 370 7808,'2'6'713,"0"-1"0,-1 1 0,1-1 0,-1 1 0,0-1 1,-1 1-1,1 0 0,-1 2-713,5 36 1590,-4-40-1461,0 0-1,0 0 1,0 0 0,1 0-1,-1 0 1,1-1 0,0 1-1,0-1 1,2 2-129,-4-4-1,1 0 1,0 0-1,-1 0 1,1-1-1,0 1 0,0 0 1,0-1-1,-1 1 1,1-1-1,0 1 1,0-1-1,0 1 0,0-1 1,0 1-1,0-1 1,0 0-1,0 0 1,0 1-1,0-1 0,0 0 1,0 0-1,0 0 1,0 0 0,1-1-53,0 1-1,0-1 1,0 1 0,0-1 0,0 0 0,0 0 0,0 0-1,-1 0 1,1 0 0,0 0 0,0-1 53,4-3-228,0 0-1,-1 0 1,0-1 0,0 0-1,-1 0 1,1 0 228,8-18-435,10-11 465,-23 35-24,0 0 1,0 0-1,0 0 1,0-1-1,0 1 1,1 0-1,-1 0 1,0 0-1,0-1 1,0 1 0,0 0-1,1 0 1,-1 0-1,0 0 1,0 0-1,1-1 1,-1 1-1,0 0 1,0 0 0,0 0-1,1 0 1,-1 0-1,0 0 1,0 0-1,1 0 1,-1 0-1,0 0 1,0 0-1,1 0 1,-1 0 0,0 0-1,0 0 1,1 0-1,-1 0 1,0 0-1,0 0 1,1 1-1,-1-1 1,0 0-1,0 0 1,0 0 0,1 0-1,-1 0 1,0 1-1,0-1 1,0 0-1,1 0 1,-1 0-1,0 1 1,0-1-1,0 0 1,0 0 0,0 0-1,0 1 1,0-1-1,1 0-6,5 18 285,-5-14-184,6 19 323,7 21 304,-12-40-712,0 0 0,0 0 0,0 0 0,0-1 0,0 1 0,1-1 0,0 0 0,0 1 0,1 0-16,-3-3-22,0-1 1,-1 1 0,1 0 0,0-1 0,0 1 0,0-1-1,0 1 1,0-1 0,0 0 0,0 1 0,0-1 0,0 0-1,0 1 1,0-1 0,0 0 0,0 0 0,0 0 0,0 0-1,0 0 1,0 0 0,0 0 0,0-1 0,0 1 0,0 0 0,0 0-1,0-1 1,0 1 0,0-1 0,0 1 0,0-1 21,2-1-146,1-1 1,-1 1-1,0-1 1,0 0-1,0 0 1,0 0-1,-1-1 146,18-20-906</inkml:trace>
   <inkml:trace contextRef="#ctx0" brushRef="#br0" timeOffset="2727.787">4311 45 8704,'-1'-1'246,"0"0"100,0 0 1,-1 0 0,1 0-1,-1 0 1,1 1 0,-1-1-1,1 0 1,-1 1 0,-1-1-347,3 1 41,-1 0 1,1 0 0,-1 0-1,1 0 1,-1 1-1,1-1 1,-1 0 0,1 0-1,-1 1 1,1-1-1,-1 0 1,1 0 0,0 1-1,-1-1 1,1 1 0,-1-1-1,1 0 1,0 1-1,-1-1 1,1 1 0,0-1-1,0 1 1,-1-1-1,1 1 1,0-1 0,0 1-1,0-1 1,0 1-1,0-1 1,-1 1 0,1-1-1,0 1 1,0-1-1,0 1 1,0-1 0,1 1-42,-6 42 418,2 0 1,3 0 0,1 0-1,6 38-418,-3-47 130,1-1-1,1 1 0,2-1 1,5 7-130,-8-27 54,-4-19-301,-6-22-366,2 17 368,-1 1 1,0 1-1,-5-10 245,5 12 35,0 0-1,1-1 1,0 0 0,0 0 0,1 0 0,0 0 0,0-1-35,2 7 15,0 1 0,0 0 0,0 0 0,1-1 0,-1 1 1,1 0-1,-1 0 0,0 0 0,1 0 0,0-1 0,-1 1 1,1 0-1,0 0 0,-1 0 0,1 0 0,0 0 1,0 1-1,0-1 0,0 0 0,0 0 0,0 0 0,0 1 1,0-1-1,0 1 0,0-1 0,1 1 0,-1-1 0,0 1 1,0-1-1,2 1-15,5-3-25,1 1 0,0 1 0,8-2 25,-13 3 100,35-3-143,0 2 0,-1 2 1,22 3 42,-5 0-512,-50-3 655,-4 1-41,-11 3 10,-16 5-48,6-5-1,12-3-11,0 0 0,0 1 1,0 0-1,-6 3-52,13-5 14,0-1 1,1 1-1,-1-1 1,0 1 0,1-1-1,-1 1 1,1-1-1,-1 1 1,0 0-1,1-1 1,0 1-1,-1 0 1,1 0-1,-1-1 1,1 1-1,0 0 1,0 0-1,-1-1 1,1 1 0,0 0-1,0 0 1,0 0-1,0 0 1,0-1-1,0 1 1,0 0-1,0 0 1,0 0-1,0-1 1,1 1-1,-1 0 1,0 0-1,1 0 1,-1-1 0,0 1-1,1 0 1,-1 0-15,4 5 24,-1 0 1,1 0 0,1-1-1,2 4-24,1 1 4,10 12-140,-13-18 115,0 1 1,-1 0-1,0 0 1,0 0-1,0 1 1,-1 0-1,0-1 1,0 1-1,0 0 1,0 3 20,-2-6 29,-1-1 1,0 1-1,0-1 1,-1 1-1,1-1 1,0 1-1,-1-1 1,1 1-1,-1-1 1,0 0-1,0 1 1,0-1-1,0 0 1,0 0-1,-1 0 1,1 0 0,-1 0-1,1 0 1,-1 0-1,0 0 1,1 0-1,-1-1 1,0 1-1,0-1 1,-2 2-30,-6 3-92,1-1-1,-1 1 1,0-1 0,0-1 0,-2 1 92,-29 9-619,1 2-159</inkml:trace>
   <inkml:trace contextRef="#ctx0" brushRef="#br0" timeOffset="-3083.623">267 338 5120,'-5'-28'5021,"4"22"-4743,0 0 1,0 0-1,0 0 1,-1 0-1,1 0 0,-3-3-278,4 8 41,-1 0-1,0 0 1,1 0-1,-1 0 0,0 0 1,0 0-1,0 0 1,0 0-1,0 0 0,0 0 1,0 0-1,0 0 1,0 1-1,0-1 0,0 0 1,-1 1-1,1-1 1,0 1-1,-1 0 1,1-1-1,0 1 0,-1 0 1,1 0-1,0 0 1,-1-1-1,1 1 0,0 1 1,-1-1-1,1 0 1,-1 0-41,-8 3 95,0-1 1,1 1 0,0 0-1,0 1 1,0 0 0,-5 4-96,-13 8 130,-10 9-130,28-19-9,0 1 0,1 0 1,0 1-1,1-1 1,-3 5 8,6-8 1,1 1 0,0 0 0,0 0 0,0 0 0,0 0 0,1 0 0,0 0 0,0 1 0,0-1 1,0 5-2,1-9 0,1 1 0,0-1 0,0 0 0,0 1 0,-1-1 0,1 1 0,0-1 0,1 0 0,-1 1 0,0-1 1,0 0-1,1 1 0,-1-1 0,1 0 0,-1 1 0,1-1 0,-1 0 0,1 0 0,0 1 0,0-1 0,-1 0 0,2 1 0,-1-1 3,1 0-1,-1-1 1,1 1-1,-1 0 1,1-1-1,-1 1 1,1-1-1,-1 1 0,1-1 1,0 0-1,-1 1 1,1-1-1,-1 0 1,1 0-1,0 0 1,0-1-3,7 0 23,-1-1 0,1 0 1,-1 0-1,0-1 1,0 0-1,5-3-23,23-14-17,0-2 0,-1-1 0,-2-2 0,7-8 17,-37 31-1,-10 23-111,4-15 140,1 0 1,0 1 0,0-1 0,1 1 0,0 0-1,0 0 1,0-1 0,1 1 0,0 0 0,0 0-1,1 0 1,0-1 0,0 1 0,1 0 0,0 2-29,-1-8 8,-1 0 1,0-1-1,1 1 0,-1 0 1,1-1-1,-1 1 1,1 0-1,0-1 1,-1 1-1,1 0 1,0-1-1,-1 1 1,1-1-1,0 0 1,0 1-1,-1-1 1,1 0-1,0 1 1,0-1-1,0 0 1,-1 0-1,1 1 0,0-1 1,0 0-1,0 0 1,0 0-1,0 0 1,-1 0-1,1-1 1,0 1-1,0 0 1,0 0-1,0 0 1,-1-1-1,1 1 1,0 0-1,0-1 1,0 1-1,-1-1 1,1 0-10,7-3-12,-1 0-1,0-1 0,-1 1 1,3-4 13,2 0-34,104-82-56,-114 90 89,-1 0 1,1-1 0,-1 1-1,1-1 1,0 1 0,-1 0-1,1-1 1,-1 1 0,1 0-1,0 0 1,-1-1 0,1 1 0,0 0-1,-1 0 1,1 0 0,0 0-1,-1 0 1,1 0 0,0 0-1,-1 0 1,1 0 0,0 0-1,0 0 1,-1 1 4,1-1-1,-1 1 0,1-1 0,-1 1 1,1-1-1,-1 1 0,1-1 0,-1 1 0,0 0 1,1-1-1,-1 1 0,0 0 0,1-1 0,-1 1 1,0 0-1,0-1 0,0 1 0,0 0 1,0 0-4,1 6 64,-1 0 0,0 0 1,0 0-1,-1 4-64,0-2 105,0 5 64,0 46 479,1-54-557,1 0 0,-1-1 0,1 1 1,1 0-1,-1-1 0,1 1 0,0-1 0,2 6-91,-3-11 3,-1 1 0,0-1 0,0 1 1,0-1-1,1 1 0,-1-1 0,0 0 0,1 1 0,-1-1 0,0 1 0,1-1 0,-1 0 0,1 1 1,-1-1-1,0 0 0,1 1 0,-1-1 0,1 0 0,-1 0 0,1 1 0,-1-1 0,1 0 0,-1 0 0,1 0 1,-1 0-1,1 0 0,0 0 0,-1 0 0,1 0 0,-1 0 0,1 0 0,-1 0 0,1 0 0,-1 0 1,1 0-1,-1 0 0,1-1 0,-1 1 0,1 0 0,-1 0 0,1-1 0,-1 1 0,1 0 0,-1-1 0,0 1 1,1 0-1,-1-1 0,0 1 0,1-1 0,-1 1 0,0 0 0,1-1 0,-1 1 0,0-1-3,5-5 15,-1 0 0,-1 0-1,1 0 1,0-3-15,0 1 36,-3 7-38,45-70-493,-38 60 398,0 0 0,1 1 0,0 0 0,1 0 0,2 0 97,-11 9 5,0 0 0,0 0 0,0 0 0,1 0 0,-1 0 0,0 1-1,0-1 1,1 1 0,-1-1 0,0 1 0,1-1 0,-1 1 0,0-1 0,1 1 0,-1 0 0,1 0-1,-1 0 1,1 0-5,-1 0 5,0 1-1,0-1 1,-1 1-1,1-1 1,0 1-1,0-1 0,-1 1 1,1 0-1,0-1 1,-1 1-1,1 0 1,0 0-1,-1-1 0,1 1 1,-1 0-1,1 0 1,-1 0-1,0 0 1,1 0-1,-1-1 1,0 1-1,0 0 0,0 0 1,1 0-1,-1 0 1,0 0-1,0 1-4,2 40 338,-2-32-198,0-1 1,1 1-1,0-1 1,0 1-1,1-1 1,0 1-1,1-1 0,1 1-140,-4-9 5,0 0-1,0 0 1,1 0-1,-1 0 1,1 0-1,-1 0 0,1 0 1,-1 0-1,1-1 1,0 1-1,-1 0 1,1 0-1,0-1 0,-1 1 1,1 0-1,0-1 1,0 1-1,0-1 1,0 1-1,-1-1 0,1 1 1,0-1-1,0 0 1,0 1-1,0-1 1,0 0-1,0 0 1,0 0-1,0 0 0,0 0 1,0 0-1,0 0 1,0 0-1,0 0 1,0 0-1,0 0 0,0-1 1,0 1-1,0 0 1,0-1-1,0 1 1,0-1-1,0 1 0,0-1 1,0 1-5,5-5-74,0 0 0,-1 0 0,0 0 0,1 0 0,-2-1 0,1 0 74,2-2 10,12-14-146,-9 10-133,1 0 0,0 0 0,0 1 0,1 1 0,1 0 1,8-5 268,-21 14 0,1 1 0,0-1 0,0 1 1,-1 0-1,1-1 0,0 1 0,0 0 1,0-1-1,-1 1 0,1 0 0,0 0 1,0 0-1,0 0 0,0 0 1,0 0-1,0 0 0,-1 0 0,1 0 1,0 0-1,0 0 0,0 1 0,0-1 1,0 0-1,-1 1 0,1-1 0,0 0 1,0 1-1,-1-1 0,1 1 1,0-1-1,0 1 0,-1 0 0,1-1 1,-1 1-1,1 0 0,-1-1 0,1 1 1,-1 0-1,1-1 0,-1 1 0,1 0 1,-1 0-1,3 6 221,-1 0 0,0 0 0,0-1 0,0 1 1,0 4-222,1 4-131,1 2 189,-2-8-29,0-1-1,0 1 1,1-1-1,1 1 1,-1-1 0,3 2-29,2 0-976</inkml:trace>
   <inkml:trace contextRef="#ctx0" brushRef="#br0" timeOffset="-2069.298">1179 327 5504,'-2'-1'266,"1"0"1,0 0-1,0 1 1,-1-1-1,1 0 1,0 0-1,-1 1 0,1-1 1,-1 1-1,1-1 1,0 1-1,-1-1 1,0 1-1,1 0 1,-1 0-1,1 0 1,-1 0-1,1 0 0,-1 0 1,1 0-1,-1 0 1,1 1-1,-1-1 1,1 1-1,-1-1 1,1 1-267,-12 3 258,-1 0-36,0 1 0,1 0 0,-1 1 0,-9 6-222,19-9 26,0 0 0,0 0 0,0 1 0,0-1 0,1 1 0,-1 0 0,1 0 0,0 0 0,0 0 0,0 1 0,1-1 0,0 1 0,-1-1 0,2 1 0,-2 3-26,1-2 54,1 0 1,0 0 0,0 1 0,0-1 0,1 0 0,0 1 0,0-1-1,1 0 1,-1 1 0,2-1-55,-2-4 13,0 0-1,0 0 1,1-1-1,-1 1 1,1 0-1,-1-1 1,1 1-1,0 0 1,0-1-1,0 1 1,0-1-1,0 1 1,0-1-1,0 0 1,0 1-1,0-1 1,1 0-1,-1 0 1,0 0-1,1 0 1,-1 0-1,1 0 1,-1 0-1,1-1 1,0 1-1,-1 0 1,1-1-1,0 0 1,-1 1-1,1-1 1,0 0-1,0 0 1,-1 1 0,1-2-1,0 1 1,0 0-1,-1 0 1,1 0-13,4-2-29,-1 0 0,1 0 0,-1 0 1,0 0-1,0-1 0,0 0 0,0 0 1,0 0-1,0-1 0,-1 0 0,0 0 1,0 0-1,0 0 0,0 0 1,-1-1-1,1-1 29,7-8-217,-2-1 0,0-1 0,-1 0 0,4-11 217,-2-1 304,-10 37-196,1 0 0,0 0 0,1 0 0,-1 0 0,2-1 0,-1 1 0,1 0 0,1-1 0,-1 0 0,1 1 0,1-2 0,3 6-108,-8-12 10,1 0 0,-1-1 0,1 1 1,0 0-1,-1-1 0,1 1 1,0 0-1,0-1 0,-1 1 1,1-1-1,0 1 0,0-1 1,0 1-1,0-1 0,-1 0 1,1 1-1,0-1 0,0 0 1,0 0-1,0 0 0,0 0 1,0 0-1,0 0 0,0 0-10,0 0-23,1-1 1,-1 1-1,0-1 1,0 1-1,1-1 0,-1 0 1,0 1-1,0-1 0,0 0 1,0 0-1,0 0 0,0 0 1,0 0-1,0 0 0,0 0 23,4-7-238,-1 1 0,0 0 0,0-1 0,0 0 0,-1 0 238,-2 5-72,3-7 64,1 0 1,0 0-1,0 0 0,1 1 1,1-1-1,-1 1 1,1 1-1,1 0 0,1-1 8,-3 4 66,0 0 0,0 0-1,0 1 1,1 0-1,0 0 1,0 1-1,0 0 1,1 0 0,-1 0-1,0 1 1,1 0-1,0 1 1,3-1-66,-1 1 119,0 1 1,0-1-1,3 2-119,-10-1 1,-1 0-1,1 0 1,-1 0 0,1 1-1,0-1 1,-1 1 0,1 0-1,-1 0 1,0 0 0,1 0-1,-1 0 1,0 1 0,1-1-1,-1 1 1,0 0-1,-1-2 3,-1 1 0,1 0 1,-1-1-1,0 1 0,1 0 1,-1 0-1,0 0 0,1-1 0,-1 1 1,0 0-1,0 0 0,0 0 1,0-1-1,0 1 0,0 0 0,0 0 1,0 0-1,0 0 0,0-1 1,0 1-1,0 0 0,-1 0 0,1 0 1,0-1-1,-1 1 0,1 0-3,-13 21-102,10-18 71,-14 19 382,-18 18-351,18-23 137,2 1 0,0 1 1,0 1-138,14-20 9,1 0 0,-1 0 0,0 0 1,1 0-1,-1 0 0,1 1 1,-1-1-1,1 0 0,-1 0 1,1 0-1,0 0 0,0 1 0,-1-1 1,1 0-1,0 0 0,0 0 1,0 1-1,1-1 0,-1 0 1,0 0-1,0 0 0,1 1 1,-1-1-10,1 0 7,-1 0 0,1 0 1,0-1-1,0 1 0,0 0 1,0 0-1,0-1 1,0 1-1,0 0 0,0-1 1,0 1-1,0-1 0,0 1 1,0-1-1,0 0 1,0 1-1,1-1 0,-1 0 1,0 0-8,6 1-16,1-1 1,-1 0-1,0 0 1,0 0-1,1-1 1,5-2 15,14-3-308,-1-2 1,-1 0-1,0-2 1,4-2 307,-14 4-190,0 0 1,-1 0 0,0-1 0,0-1 0,-1 0-1,0-1 1,3-5 189,-10 10-50,-6 6 170,-9 14 445,7-9-458,1 0-1,-1 1 1,1-1 0,0 1-1,0-1 1,1 1 0,0 0-1,0-1 1,0 1 0,0 0-1,1-1 1,0 1 0,0-1-1,1 1 1,-1-1 0,1 0-1,0 0 1,1 1 0,-1-1-1,1-1 1,4 6-107,-7-10-36,0 1 1,0-1-1,1 0 1,-1 1-1,0-1 1,1 0-1,-1 1 0,1-1 1,-1 0-1,1 1 1,-1-1-1,0 0 1,1 0-1,-1 1 1,1-1-1,-1 0 0,1 0 1,-1 0-1,1 0 1,-1 0-1,1 0 1,-1 0-1,1 0 1,-1 0-1,1 0 0,-1 0 1,1 0-1,-1 0 1,1 0-1,0-1 36,8-4-954</inkml:trace>
   <inkml:trace contextRef="#ctx0" brushRef="#br0" timeOffset="-1728.369">1702 196 9728,'-14'-30'3584,"6"14"-2784,2 2-64,4 12-288,0 0-672,0 2-192,0 2-352,0 2-96</inkml:trace>
   <inkml:trace contextRef="#ctx0" brushRef="#br0" timeOffset="-1360.766">1816 365 7936,'-1'4'851,"0"0"1,0 0-1,1 1 1,-1-1 0,1 0-1,0 3-851,6 44 1960,-4-38-1680,-1-8-232,0 0-1,1 0 1,-1 0 0,1 0 0,0 0-1,2 3-47,-4-7-1,0 0 0,1 0-1,-1-1 1,1 1-1,-1 0 1,1-1 0,0 1-1,-1 0 1,1-1 0,-1 1-1,1-1 1,0 1-1,0-1 1,-1 1 0,1-1-1,0 0 1,0 1 0,0-1 1,0 0 11,0 0 1,0 0-1,0 0 1,-1 0 0,1-1-1,0 1 1,0 0 0,0 0-1,0-1 1,-1 1-1,1 0 1,0-1 0,0 1-1,-1-1 1,1 1-1,0-1 1,-1 0 0,1 1-1,-1-1 1,1 1 0,0-1-1,-1 0-11,12-15-188,-1 1 0,-1-1 1,3-9 187,-1 3-722,12-14 722,-24 35 4,1 0 0,-1 1 1,0-1-1,1 1 0,-1-1 1,0 1-1,1-1 0,-1 1 0,1-1 1,-1 1-1,1-1 0,-1 1 1,1 0-1,0-1 0,-1 1 0,1 0 1,-1-1-1,1 1 0,0 0 1,-1 0-1,1 0 0,0-1 0,-1 1 1,1 0-1,-1 0 0,1 0 1,0 0-1,-1 0 0,1 0 0,0 1 1,-1-1-1,1 0 0,0 0 1,-1 0-1,1 0 0,0 1 0,-1-1 1,1 0-1,-1 1 0,1-1 1,-1 0-1,1 1 0,-1-1 0,1 1 1,-1-1-1,1 1-4,2 3 59,1 1 0,-1-1 1,0 1-1,0-1 0,1 5-59,1-1 30,6 13 79,12 19 231,-21-37-442,0 1 1,1-1-1,0 0 1,0 0-1,-1 0 1,2 0-1,-1-1 1,0 1 0,2 0 101,12 3-1040</inkml:trace>
-  <inkml:trace contextRef="#ctx0" brushRef="#br0" timeOffset="-899.775">2194 344 4864,'-1'-2'158,"-1"1"0,1 0 0,-1-1 1,1 1-1,-1 0 0,1 0 0,-1 0 1,0 0-1,1 0 0,-1 0 0,0 1 0,0-1 1,0 1-1,0-1 0,0 1 0,1-1 0,-1 1 1,0 0-1,0 0 0,0 0 0,0 0 1,0 1-1,0-1 0,0 0 0,0 1 0,1-1 1,-1 1-1,0 0 0,0-1 0,0 1 0,0 0-158,0 1 136,-1-1-1,0 1 0,1 0 0,-1-1 0,1 1 0,0 1 0,-1-1 0,1 0 0,0 0 1,0 1-1,0-1 0,1 1 0,-1-1 0,1 1 0,-1 0 0,1 0 0,0 0 1,0 0-1,0 1-135,0 2 151,0 0 1,1 1 0,0-1-1,0 0 1,1 0-1,0 0 1,0 1 0,0-1-1,1 0 1,1 3-152,-3-6 8,1-1 0,0 0 0,0 0 0,0 0 0,0 0 0,0 0 0,0 0 0,1 0 0,-1 0 0,1 0 0,-1 0 0,1-1 0,0 1 0,0-1 0,0 1 1,0-1-1,0 0 0,0 0 0,0 0 0,0 0 0,0 0 0,0 0 0,0 0 0,1-1 0,-1 1 0,0-1 0,1 0 0,-1 1 0,2-1-8,-1-1-7,1 0 0,-1 0 1,0 0-1,1 0 0,-1-1 1,0 1-1,0-1 0,0 0 0,0 0 1,0 0-1,0 0 0,0-1 0,-1 1 1,1-1-1,-1 1 0,0-1 1,0 0-1,0 0 0,0 0 7,2-3-152,0 0 1,0-1-1,-1 1 0,0-1 1,0 1-1,-1-1 0,0 0 0,0 0 1,0-1 151,-1-1-442,2 15 65,-1 2 417,10 29 9,-2 2-1,-2 0 1,-2 0 0,-1 0 0,-2 1 0,-2-1-1,-2 25-48,-1-52 35,1 1-1,-2-1 0,1-1 1,-1 1-1,-1 0 0,0-1 1,-4 6-35,6-13 33,0 0 0,0 0 0,0-1 1,0 1-1,-1-1 0,1 1 0,-1-1 0,0 0 1,0 0-1,-1 0 0,1 0 0,0-1 0,-1 0 0,0 1 1,1-1-1,-1 0 0,0-1 0,0 1 0,0-1 1,0 0-1,0 0 0,-4 1-33,5-2 30,0 0 0,0 0 0,0-1 0,0 1 0,1 0 0,-1-1 0,0 0 1,0 0-1,0 0 0,1 0 0,-1 0 0,0-1 0,1 1 0,-1-1 0,1 1 0,0-1 0,-1 0 0,1 0 0,0 0 0,0 0 1,-1-2-31,-4-6 93,0 0 0,0 0 0,1-1 0,-2-5-93,5 11 41,-1-4 83,-1 0 0,1 0 0,1 0 0,0-1 0,0 0 0,0 1 0,2-1 0,-1-5-124,1 12 27,1-1 0,0 0 0,1 0 0,-1 1 0,1-1 0,0 0-1,0 1 1,0-1 0,0 1 0,0-1 0,1 1 0,0-1 0,-1 1 0,1 0 0,1 0-1,-1 0 1,0 0 0,1 0 0,-1 1 0,1-1 0,0 1 0,0-1 0,0 1 0,1 0-27,18-11-161,0 2 1,1 0 0,20-5 160,-23 8-133,31-12-213</inkml:trace>
+  <inkml:trace contextRef="#ctx0" brushRef="#br0" timeOffset="-899.776">2194 344 4864,'-1'-2'158,"-1"1"0,1 0 0,-1-1 1,1 1-1,-1 0 0,1 0 0,-1 0 1,0 0-1,1 0 0,-1 0 0,0 1 0,0-1 1,0 1-1,0-1 0,0 1 0,1-1 0,-1 1 1,0 0-1,0 0 0,0 0 0,0 0 1,0 1-1,0-1 0,0 0 0,0 1 0,1-1 1,-1 1-1,0 0 0,0-1 0,0 1 0,0 0-158,0 1 136,-1-1-1,0 1 0,1 0 0,-1-1 0,1 1 0,0 1 0,-1-1 0,1 0 0,0 0 1,0 1-1,0-1 0,1 1 0,-1-1 0,1 1 0,-1 0 0,1 0 0,0 0 1,0 0-1,0 1-135,0 2 151,0 0 1,1 1 0,0-1-1,0 0 1,1 0-1,0 0 1,0 1 0,0-1-1,1 0 1,1 3-152,-3-6 8,1-1 0,0 0 0,0 0 0,0 0 0,0 0 0,0 0 0,0 0 0,1 0 0,-1 0 0,1 0 0,-1 0 0,1-1 0,0 1 0,0-1 0,0 1 1,0-1-1,0 0 0,0 0 0,0 0 0,0 0 0,0 0 0,0 0 0,0 0 0,1-1 0,-1 1 0,0-1 0,1 0 0,-1 1 0,2-1-8,-1-1-7,1 0 0,-1 0 1,0 0-1,1 0 0,-1-1 1,0 1-1,0-1 0,0 0 0,0 0 1,0 0-1,0 0 0,0-1 0,-1 1 1,1-1-1,-1 1 0,0-1 1,0 0-1,0 0 0,0 0 7,2-3-152,0 0 1,0-1-1,-1 1 0,0-1 1,0 1-1,-1-1 0,0 0 0,0 0 1,0-1 151,-1-1-442,2 15 65,-1 2 417,10 29 9,-2 2-1,-2 0 1,-2 0 0,-1 0 0,-2 1 0,-2-1-1,-2 25-48,-1-52 35,1 1-1,-2-1 0,1-1 1,-1 1-1,-1 0 0,0-1 1,-4 6-35,6-13 33,0 0 0,0 0 0,0-1 1,0 1-1,-1-1 0,1 1 0,-1-1 0,0 0 1,0 0-1,-1 0 0,1 0 0,0-1 0,-1 0 0,0 1 1,1-1-1,-1 0 0,0-1 0,0 1 0,0-1 1,0 0-1,0 0 0,-4 1-33,5-2 30,0 0 0,0 0 0,0-1 0,0 1 0,1 0 0,-1-1 0,0 0 1,0 0-1,0 0 0,1 0 0,-1 0 0,0-1 0,1 1 0,-1-1 0,1 1 0,0-1 0,-1 0 0,1 0 0,0 0 0,0 0 1,-1-2-31,-4-6 93,0 0 0,0 0 0,1-1 0,-2-5-93,5 11 41,-1-4 83,-1 0 0,1 0 0,1 0 0,0-1 0,0 0 0,0 1 0,2-1 0,-1-5-124,1 12 27,1-1 0,0 0 0,1 0 0,-1 1 0,1-1 0,0 0-1,0 1 1,0-1 0,0 1 0,0-1 0,1 1 0,0-1 0,-1 1 0,1 0 0,1 0-1,-1 0 1,0 0 0,1 0 0,-1 1 0,1-1 0,0 1 0,0-1 0,0 1 0,1 0-27,18-11-161,0 2 1,1 0 0,20-5 160,-23 8-133,31-12-213</inkml:trace>
   <inkml:trace contextRef="#ctx0" brushRef="#br0" timeOffset="3295.637">1258 948 7552,'-7'2'581,"3"-2"-352,0 1-1,0 0 1,0 0-1,1 0 1,-1 1-1,1-1 1,-1 1-1,1 0 1,-1 0-1,1 0 1,0 0-1,0 1 1,-1 0-229,-8 10 521,0 1 0,1 0 1,0 1-1,1 1-521,-38 65 1349,40-67-1250,1 1 0,1 0 0,0 0 0,1 0 0,1 0 0,0 1 1,1 0-1,1 0 0,0 0 0,1 0 0,1 0 0,0 0 0,1 0 0,1 0 0,1 0 0,0-1 0,1 1 0,1-1 0,0 0 0,1 0 0,1 0-99,-1-1-227,2-1-1,0 0 0,1 0 228,-6-8-181,1-1 0,0 0-1,0 0 1,0 0 0,1 0-1,-1-1 1,1 1 0,0-1 0,4 2 181,16 6-864</inkml:trace>
   <inkml:trace contextRef="#ctx0" brushRef="#br0" timeOffset="3804.807">1329 1296 7040,'-2'1'172,"1"-1"1,0 1 0,0-1 0,0 1-1,0 0 1,0 0 0,0 0-1,0 0 1,0-1 0,0 1-1,0 0 1,0 1 0,1-1-1,-1 0 1,0 0 0,1 0-1,-1 0 1,1 0 0,-1 1-1,1-1 1,0 0 0,-1 1 0,1-1-1,0 0 1,0 0 0,0 1-1,0-1 1,0 0 0,0 1-1,0 0-172,1 6 189,1 0 0,-1 0 1,2 0-1,1 5-189,-2-6 223,0-1-103,0 0 1,1 0-1,0 0 1,0 0-1,1 0 1,0-1-1,-1 1 1,2-1-1,-1 0 1,4 2-121,-7-5 29,0-1 1,1 1-1,-1-1 1,1 0-1,0 0 1,-1 0-1,1 0 1,0 0-1,0 0 1,0 0-1,-1-1 1,1 1-1,0-1 1,0 1-1,0-1 0,0 0 1,0 1-1,0-1 1,0 0-1,0 0 1,0-1-1,0 1 1,0 0-1,0-1 1,0 1-1,0-1 1,0 0-1,0 1 1,-1-1-1,1 0 1,0 0-1,0 0 1,-1-1-1,1 1 1,-1 0-1,1-1-29,7-6 3,-1-1 0,-1 0 0,0 0 0,0-1 0,2-5-3,27-52-454,-35 66 445,-1 1 8,1-2 2,0-1 0,1 1 0,-1-1-1,0 1 1,0-1 0,0 1 0,-1-1 0,1 0 0,0 1-1,-1-1 1,0 0 0,0 0 0,0 1 0,0-3-1,3 43 203,-2-31-195,1 1 0,1-1 0,-1 0 0,1 0 0,0 0 0,1 0 0,0 0 0,0-1 0,0 1 0,1-1 0,0 0 0,1 0-8,11 8-448</inkml:trace>
-  <inkml:trace contextRef="#ctx0" brushRef="#br0" timeOffset="4164.347">1818 1239 8576,'0'0'178,"0"-1"1,-1 0 0,1 1 0,-1-1-1,1 0 1,-1 1 0,1-1-1,-1 1 1,1-1 0,-1 1-1,1-1 1,-1 1 0,0 0-1,1-1 1,-1 1 0,0 0 0,1-1-1,-1 1 1,0 0 0,0 0-1,1 0 1,-1 0 0,0 0-1,1 0 1,-1 0 0,0 0 0,0 0-179,-2 0 42,1 1 1,-1 0 0,1 0 0,0 0 0,-1 1 0,1-1 0,-2 2-43,1-2 32,1 1 1,-1 0-1,1 0 0,0 0 1,-1 0-1,1 1 1,0-1-1,0 1 0,0-1 1,1 1-1,-1-1 0,0 1 1,1 0-1,0 0 1,0 0-1,0 0-32,0 2 87,0 0 0,0 0 1,1 0-1,-1 0 0,1-1 0,0 1 0,1 0 1,-1 0-1,2 4-87,2 8 145,1-1-1,1 0 1,1 0 0,0-1 0,5 7-145,-11-20 14,0 0 0,0-1 0,-1 1 0,1 0 1,0 0-1,-1-1 0,1 1 0,-1 0 1,1 0-1,-1 0 0,0 0 0,0 0 0,0 0 1,0 0-1,0 0 0,0 0 0,-1 0 1,1-1-1,-1 2-14,0-1 1,0 0-1,0 0 1,0-1 0,-1 1 0,1 0-1,-1-1 1,1 1 0,-1-1 0,0 1 0,1-1-1,-1 0 1,0 0 0,0 0 0,0 0-1,0 0 1,-2 1-1,-60 19-1525,48-15 416</inkml:trace>
+  <inkml:trace contextRef="#ctx0" brushRef="#br0" timeOffset="4164.346">1818 1239 8576,'0'0'178,"0"-1"1,-1 0 0,1 1 0,-1-1-1,1 0 1,-1 1 0,1-1-1,-1 1 1,1-1 0,-1 1-1,1-1 1,-1 1 0,0 0-1,1-1 1,-1 1 0,0 0 0,1-1-1,-1 1 1,0 0 0,0 0-1,1 0 1,-1 0 0,0 0-1,1 0 1,-1 0 0,0 0 0,0 0-179,-2 0 42,1 1 1,-1 0 0,1 0 0,0 0 0,-1 1 0,1-1 0,-2 2-43,1-2 32,1 1 1,-1 0-1,1 0 0,0 0 1,-1 0-1,1 1 1,0-1-1,0 1 0,0-1 1,1 1-1,-1-1 0,0 1 1,1 0-1,0 0 1,0 0-1,0 0-32,0 2 87,0 0 0,0 0 1,1 0-1,-1 0 0,1-1 0,0 1 0,1 0 1,-1 0-1,2 4-87,2 8 145,1-1-1,1 0 1,1 0 0,0-1 0,5 7-145,-11-20 14,0 0 0,0-1 0,-1 1 0,1 0 1,0 0-1,-1-1 0,1 1 0,-1 0 1,1 0-1,-1 0 0,0 0 0,0 0 0,0 0 1,0 0-1,0 0 0,0 0 0,-1 0 1,1-1-1,-1 2-14,0-1 1,0 0-1,0 0 1,0-1 0,-1 1 0,1 0-1,-1-1 1,1 1 0,-1-1 0,0 1 0,1-1-1,-1 0 1,0 0 0,0 0 0,0 0-1,0 0 1,-2 1-1,-60 19-1525,48-15 416</inkml:trace>
   <inkml:trace contextRef="#ctx0" brushRef="#br0" timeOffset="5304.143">2212 964 5760,'-10'3'2176,"6"5"-1664,0 6 608,2-3 224,-2 7-256,0 6-64,-2 3-224,0 1-128,0 0-352,-2-1-192,0-2-96,0 2-32,2-4 0,2-2-160,-2-1 32,6-2 64,6-3 96</inkml:trace>
   <inkml:trace contextRef="#ctx0" brushRef="#br0" timeOffset="5657.158">2124 1412 8832,'-14'-6'3328,"12"6"-2592,2 8 32,2-3-160,1 0-2464,0-1-1024</inkml:trace>
   <inkml:trace contextRef="#ctx0" brushRef="#br0" timeOffset="6789.502">2488 955 7040,'5'1'3163,"15"10"-2524,-11-3-516,-1 0 0,0 1 0,0-1 0,-1 1 0,0 1-1,-1 0 1,0 0 0,4 8-123,-4-6 111,9 14 142,-2 1 1,-1 0-1,-1 0 1,1 9-254,-7-18 240,0 0 1,-2 0 0,0 0-1,-1 0 1,-1 0 0,-1 1-1,-1 9-240,0-19 104,-1 1-1,0-1 0,0 0 1,-1 1-1,0-1 1,-1 0-1,0-1 0,0 1 1,-1-1-1,0 0 1,-1 0-1,-5 7-103,-5 2-212,0-1 1,0 0-1,-2-1 1,-15 11 211,-7-1-629</inkml:trace>
@@ -1980,8 +1980,8 @@
   <inkml:trace contextRef="#ctx0" brushRef="#br0" timeOffset="6883.687">2270 259 4224,'-5'1'1664,"4"0"-1312,-1 4 576,2-3 96,-1 3 288,-1 2 160,1 3-608,0 3-256,-1 2-352,2 1-192,0-3-32,0-2 32,2-2 32,0-3-32,1-8-64,1-6-64,0-3-32</inkml:trace>
   <inkml:trace contextRef="#ctx0" brushRef="#br0" timeOffset="6884.687">2278 104 7040,'-5'-19'2624,"5"18"-2048,0 1 0,0 1-96,0 1-416,0 3-32,0 1 32,1 4 32,2 2-32,2 0-1024,5-1-480</inkml:trace>
   <inkml:trace contextRef="#ctx0" brushRef="#br0" timeOffset="7269.197">2438 230 6144,'-2'-1'256,"-1"0"0,1 1-1,0-1 1,0 1 0,-1 0 0,1 0 0,0 0 0,0 0-1,-1 0 1,1 0 0,0 1 0,0-1 0,-1 1 0,1-1-1,0 1-255,-36 13 7,32-11 218,6-3-214,0 0 0,-1 0 1,1 0-1,-1 0 0,1 0 0,-1 0 1,1 1-1,0-1 0,-1 0 0,1 0 0,-1 0 1,1 1-1,0-1 0,-1 0 0,1 0 0,0 1 1,0-1-1,-1 0 0,1 1 0,0-1 0,0 1 1,-1-1-1,1 0 0,0 1 0,0-1 1,0 1-1,-1-1 0,1 0 0,0 1 0,0-1 1,0 1-1,0-1 0,0 1 0,0-1 0,0 0 1,0 1-1,0-1 0,0 1 0,0-1 0,1 1 1,-1-1-1,0 0 0,0 1 0,0-1 1,0 1-1,1-1 0,-1 0 0,0 1-11,3 2 63,-1 0-1,1-1 1,0 1 0,0-1-1,3 3-62,5 4 301,-8-6-306,0 1 0,0-1 0,0 1 0,-1 0 0,0 0 0,0 0 0,0 0 0,0 0 0,-1 0 0,1 2 5,-2-5 21,1 0 0,-1 1 0,0-1 0,0 0 0,0 0-1,0 0 1,0 1 0,0-1 0,0 0 0,0 0-1,0 0 1,-1 1 0,1-1 0,-1 0 0,1 0 0,-1 0-1,1 0 1,-1 0 0,1 0 0,-1 0 0,0 0 0,0 0-1,1 0 1,-1 0 0,0 0 0,0-1 0,0 1 0,0 0-1,0 0 1,0-1 0,0 1 0,0-1 0,0 1 0,0-1-1,-1 1 1,1-1 0,0 0 0,0 0 0,-1 1-21,1-1 10,0 0 1,1 0 0,-1 0 0,0 0 0,0 0 0,1 0 0,-1 0-1,0 0 1,1 0 0,-1 0 0,0-1 0,1 1 0,-1 0 0,1 0-1,-1-1 1,0 1 0,1 0 0,-1-1 0,1 1 0,-1 0 0,1-1-1,-1 1 1,1-1 0,-1 1 0,1-1 0,-1 1 0,1-1 0,-1 0-11,0-5-80</inkml:trace>
-  <inkml:trace contextRef="#ctx0" brushRef="#br0" timeOffset="7609.444">2601 57 6528,'-2'13'2464,"0"3"-1920,-4 19 544,5-16 192,0 5-736,-1-3-288,2 1-96,0 1 0,2 0-64,-1 0-64,0-2 0,-1-3-32,0-4 0,-2-3 0,-4-5 0,-3-7-224,-2-6 0</inkml:trace>
-  <inkml:trace contextRef="#ctx0" brushRef="#br0" timeOffset="7610.444">2493 249 3072,'-7'-15'1120,"5"10"-864,2-4 1696,2 7 704,0-2-1024,3 0-416,1-1-704,8 1-192,6 2-192,4-1 64,5 3 96,-1 3-224,2 1-32,2-1-256,-2-4-96</inkml:trace>
+  <inkml:trace contextRef="#ctx0" brushRef="#br0" timeOffset="7609.443">2601 57 6528,'-2'13'2464,"0"3"-1920,-4 19 544,5-16 192,0 5-736,-1-3-288,2 1-96,0 1 0,2 0-64,-1 0-64,0-2 0,-1-3-32,0-4 0,-2-3 0,-4-5 0,-3-7-224,-2-6 0</inkml:trace>
+  <inkml:trace contextRef="#ctx0" brushRef="#br0" timeOffset="7610.443">2493 249 3072,'-7'-15'1120,"5"10"-864,2-4 1696,2 7 704,0-2-1024,3 0-416,1-1-704,8 1-192,6 2-192,4-1 64,5 3 96,-1 3-224,2 1-32,2-1-256,-2-4-96</inkml:trace>
   <inkml:trace contextRef="#ctx0" brushRef="#br0" timeOffset="8572.785">2893 164 3584,'0'0'57,"0"0"-1,0-1 1,-1 1 0,1 0-1,0 0 1,0 0 0,0 0 0,0 0-1,0-1 1,-1 1 0,1 0 0,0 0-1,0 0 1,0 0 0,0 0-1,-1 0 1,1 0 0,0 0 0,0 0-1,0 0 1,-1 0 0,1 0-1,0 0 1,0 0 0,0 0 0,-1 0-1,1 0 1,0 0 0,0 0-1,0 0 1,-1 0 0,1 0 0,0 0-1,0 0 1,0 0 0,0 0 0,-1 0-1,1 0 1,0 1 0,0-1-1,0 0-56,-18 8 984,-19 13-74,37-21-889,-6 3 207,0 1 1,0 0-1,0 1 1,0-1-1,1 1 0,-1 1-228,5-5 38,0 0 0,0 0 0,0 0-1,1 0 1,-1 1 0,0-1-1,0 0 1,1 1 0,-1-1-1,1 0 1,-1 1 0,1-1-1,0 1 1,-1-1 0,1 1-1,0-1 1,0 1 0,0-1-1,0 1 1,0-1 0,0 1-1,1-1 1,-1 1 0,0-1-1,1 1 1,-1-1 0,1 0-1,0 1 1,-1-1 0,1 0-1,1 2-37,15 16 359,-14-17-316,0 0 1,-1 1-1,1-1 0,-1 1 0,0 0 0,0 0 0,0-1 0,0 2-43,-2-3 18,1 0 1,-1 0-1,0 0 0,0 0 0,0 0 0,-1 0 0,1 0 0,0 0 0,0 0 1,0 0-1,-1 0 0,1 0 0,0 0 0,-1-1 0,1 1 0,-1 0 1,1 0-1,-1 0 0,0-1 0,1 1 0,-1 0 0,0-1 0,1 1 0,-1 0 1,0-1-1,0 1 0,1-1 0,-1 1 0,0-1 0,-1 1-18,-27 14-56,29-15 59,-13 5 47,9-2-20,-1-1 1,0 0 0,0 0-1,0 0 1,0 0-1,-1-1 1,1 0 0,0 0-1,-2-1-30,-1-1 214</inkml:trace>
 </inkml:ink>
 </file>
@@ -2042,8 +2042,8 @@
   </inkml:definitions>
   <inkml:trace contextRef="#ctx0" brushRef="#br0">2 16 6912,'-2'-5'2438,"5"4"-1178,-3 1-1250,1 1-1,-1-1 1,1 1 0,0-1 0,-1 1 0,1-1-1,-1 1 1,1-1 0,-1 1 0,1-1 0,-1 1 0,0 0-1,1-1 1,-1 1 0,1 0-10,2 11 171,0 0-1,0 0 1,-1 1 0,-1-1 0,0 1-1,-1 10-170,1 1 219,0 100 998,-1-81-274,0-42-953,0-1-1,0 1 1,0-1 0,0 1 0,0-1 0,0 1 0,0-1 0,0 1 0,0-1 0,0 1 0,0-1 0,0 1 0,1-1 0,-1 1 0,0-1 0,0 1 0,1-1 0,-1 1 0,1-1 10,-1 0-10,0 0 1,0 0-1,1 0 0,-1 0 1,0 0-1,0 0 1,1 0-1,-1 0 1,0 0-1,1 0 1,-1 0-1,0 0 1,0 0-1,1 0 1,-1 0-1,0 0 1,0 0-1,1-1 1,-1 1-1,0 0 1,0 0-1,0 0 1,1 0-1,-1-1 1,0 1-1,0 0 10,18-23-395,-9 11 418,-8 10-20,0 1-1,0 0 1,1 0 0,-1 0-1,0 0 1,1 0 0,-1 0-1,0 0 1,1 0 0,-1 1-1,1-1 1,-1 0 0,1 1 0,0-1-1,-1 1 1,1 0 0,-1-1-1,1 1 1,0 0 0,-1 0-1,1 0 1,0 0 0,-1 0-1,1 1 1,0-1 0,-1 0-1,1 1 1,-1-1 0,1 1 0,-1 0-1,1-1 1,-1 1 0,1 0-1,-1 0 1,0 0 0,1 0-1,0 1-2,3 3 15,0 1 0,0-1 0,0 1-1,-1 0 1,0 0 0,0 0 0,3 7-15,1-1-624,-4-8-1968</inkml:trace>
   <inkml:trace contextRef="#ctx0" brushRef="#br0" timeOffset="652.287">300 237 4096,'0'-1'283,"0"0"1,-1 0-1,1 0 1,0 0-1,-1 0 1,1 0-1,0 0 1,-1 0-1,0 0 1,1 0-1,-1 0 1,1 0-1,-1 0 0,0 1 1,0-1-1,0 0 1,1 0-1,-1 1 1,0-1-1,-1 0-283,2 1 61,-1 0 1,0 0-1,0 0 0,0 0 0,0 0 0,0 0 0,0 0 0,1 0 0,-1 0 0,0 0 1,0 0-1,0 1 0,0-1 0,0 0 0,1 1 0,-1-1 0,0 1 0,0-1 0,1 0 1,-1 1-1,0 0 0,1-1 0,-1 1 0,0-1 0,1 1 0,-1 0-61,-6 7 77,0 0-1,1 0 0,0 0 0,1 1 0,-1 0-76,4-5 105,0 1-1,-1 0 0,1-1 1,1 1-1,-1 0 0,1 0 0,0 0 1,0 0-1,0 0 0,1 5-104,0-9 6,-1 0-1,1 0 0,0 0 0,1-1 1,-1 1-1,0 0 0,0 0 1,0 0-1,0 0 0,1-1 0,-1 1 1,0 0-1,1 0 0,-1 0 0,1-1 1,-1 1-1,1 0 0,-1-1 1,1 1-1,-1 0 0,1-1 0,0 1 1,-1-1-1,1 1 0,0-1-5,0 1 11,0-1 1,0 0-1,0 0 0,0 0 0,0 0 0,0 0 0,1 0 0,-1 0 1,0 0-1,0 0 0,0 0 0,0 0 0,0-1 0,0 1 1,0-1-1,0 1 0,0-1-11,4-1-96,-1 0-1,0-1 1,0 1 0,0-1 0,-1 0 0,1-1-1,-1 1 1,3-3 96,0-3-1722,-1 0-726</inkml:trace>
-  <inkml:trace contextRef="#ctx0" brushRef="#br0" timeOffset="1009.402">310 249 4608,'-1'3'1760,"-1"0"-1376,1 4 672,1-2 256,-1 0-224,0 2 0,1 1-320,0 0-96,0 0-384,2 0-320,0 0-64,0 0 32,1-1 32,1 0-64,0-3 0</inkml:trace>
-  <inkml:trace contextRef="#ctx0" brushRef="#br0" timeOffset="1379.353">363 303 7296,'0'0'123,"0"0"1,0 1 0,-1-1-1,1 0 1,0 0-1,0 0 1,-1 1 0,1-1-1,0 0 1,0 0-1,0 1 1,-1-1 0,1 0-1,0 1 1,0-1-1,0 0 1,0 0 0,0 1-1,0-1 1,0 0-1,0 1 1,0-1 0,0 0-1,0 1 1,0-1-1,0 0 1,0 1 0,0-1-1,0 0 1,0 1 0,0-1-1,0 0 1,0 1-124,9 13 1342,-7-12-1304,0 0-1,0 0 1,0 0-1,0 0 1,1 0 0,-1-1-1,0 1 1,1-1-1,-1 1 1,2-1-38,-4-1 13,0 0 0,1 0 0,-1 0 0,0 0 0,1 0 0,-1 0 0,0 0 0,1 0 0,-1 0 0,0-1 0,1 1 0,-1 0 0,0 0-1,0 0 1,1-1 0,-1 1 0,0 0 0,0 0 0,1-1 0,-1 1 0,0 0 0,0-1 0,0 1 0,0 0 0,1 0 0,-1-1 0,0 1 0,0 0 0,0-1 0,0 1 0,0 0 0,0-1 0,0 1 0,0 0-13,3-18-169,-1 7 377,-2 9-295,1 1 0,-1-1 0,1 0-1,0 0 1,-1 1 0,1-1 0,0 0 0,0 1 0,0-1 0,0 1 0,0-1 0,1 1 0,-1 0-1,0-1 1,1 1 0,-1 0 0,1 0 0,0 0 87,3-1-1477</inkml:trace>
+  <inkml:trace contextRef="#ctx0" brushRef="#br0" timeOffset="1009.401">310 249 4608,'-1'3'1760,"-1"0"-1376,1 4 672,1-2 256,-1 0-224,0 2 0,1 1-320,0 0-96,0 0-384,2 0-320,0 0-64,0 0 32,1-1 32,1 0-64,0-3 0</inkml:trace>
+  <inkml:trace contextRef="#ctx0" brushRef="#br0" timeOffset="1379.352">363 303 7296,'0'0'123,"0"0"1,0 1 0,-1-1-1,1 0 1,0 0-1,0 0 1,-1 1 0,1-1-1,0 0 1,0 0-1,0 1 1,-1-1 0,1 0-1,0 1 1,0-1-1,0 0 1,0 0 0,0 1-1,0-1 1,0 0-1,0 1 1,0-1 0,0 0-1,0 1 1,0-1-1,0 0 1,0 1 0,0-1-1,0 0 1,0 1 0,0-1-1,0 0 1,0 1-124,9 13 1342,-7-12-1304,0 0-1,0 0 1,0 0-1,0 0 1,1 0 0,-1-1-1,0 1 1,1-1-1,-1 1 1,2-1-38,-4-1 13,0 0 0,1 0 0,-1 0 0,0 0 0,1 0 0,-1 0 0,0 0 0,1 0 0,-1 0 0,0-1 0,1 1 0,-1 0 0,0 0-1,0 0 1,1-1 0,-1 1 0,0 0 0,0 0 0,1-1 0,-1 1 0,0 0 0,0-1 0,0 1 0,0 0 0,1 0 0,-1-1 0,0 1 0,0 0 0,0-1 0,0 1 0,0 0 0,0-1 0,0 1 0,0 0-13,3-18-169,-1 7 377,-2 9-295,1 1 0,-1-1 0,1 0-1,0 0 1,-1 1 0,1-1 0,0 0 0,0 1 0,0-1 0,0 1 0,0-1 0,1 1 0,-1 0-1,0-1 1,1 1 0,-1 0 0,1 0 0,0 0 87,3-1-1477</inkml:trace>
   <inkml:trace contextRef="#ctx0" brushRef="#br0" timeOffset="1755.657">529 280 7168,'-1'-1'177,"0"1"0,1-1 0,-1 1 1,0 0-1,0-1 0,1 1 0,-1 0 1,0 0-1,0 0 0,0 0 0,1 0 1,-1 0-1,0 0 0,0 0 0,0 0 0,1 0 1,-1 0-1,0 0 0,0 0 0,0 1 1,1-1-1,-1 0 0,0 0 0,1 1 1,-2 0-178,-12 15-377,7-7 797,5-6-400,0 0 0,-1 1 0,1-1 1,0 1-1,0 0 0,0 1-20,2-4 34,-1 1 1,1-1-1,0 0 1,-1 0-1,1 0 1,0 0-1,0 0 1,0 1-1,0-1 1,0 0 0,0 0-1,0 0 1,0 0-1,0 1 1,0-1-1,1 0 1,-1 0-1,1 0 1,-1 0-1,1 0 1,-1 0 0,1 0-1,-1 0 1,2 1-35,-2-2 26,1 1-1,0-1 1,0 0 0,0 1 0,-1-1 0,1 0 0,0 0 0,0 0 0,0 1 0,0-1 0,0 0 0,0 0-1,-1 0 1,1-1 0,0 1 0,0 0 0,0 0 0,0 0 0,0-1 0,-1 1 0,1 0 0,0-1 0,0 1-1,-1 0 1,2-1-26,19-12-418,-9 4-339</inkml:trace>
   <inkml:trace contextRef="#ctx0" brushRef="#br0" timeOffset="2160.327">603 45 5888,'-6'6'2272,"2"4"-1760,-1 10 352,4-8 96,1 2-224,-2 2-32,1 3-192,1 10-64,0 2-256,0-1 0,3-1 32,-1-3-32,2-3-32,3-2-96,0-4 32,-1-4-480,1-4-160</inkml:trace>
   <inkml:trace contextRef="#ctx0" brushRef="#br0" timeOffset="3020.937">883 1 7168,'-2'2'4562,"2"10"-3282,1 18-2241,0-22 1397,1 34-58,1 16 588,-4 47-966,0-99 151,1-1 0,-1 0 0,0 0 0,0 0-1,-1 0 1,0 0 0,1 0 0,-4 4-151,5-8 29,-1 0-1,1 0 1,-1 0-1,0 0 1,1-1-1,-1 1 1,0 0 0,1 0-1,-1-1 1,0 1-1,0-1 1,0 1-1,0 0 1,0-1 0,0 0-1,0 1 1,0-1-1,0 0 1,0 1-29,0-1 6,-1 0 0,1 0-1,-1-1 1,1 1 0,0 0 0,-1 0 0,1-1 0,0 1 0,-1-1 0,1 1 0,0-1-1,0 0 1,-1 1 0,1-1 0,0 0 0,0 0 0,0 0 0,-1-1-6,-2-2 6,1 0-1,-1 0 1,1 0 0,0-1 0,0 0-1,0 1 1,0-1 0,1 0 0,0-1-1,0 1 1,0 0 0,1 0 0,-1-4-6,2 8-1,1 0 1,-1 1 0,0-1 0,0 0-1,0 1 1,1-1 0,-1 1 0,0-1-1,1 1 1,-1-1 0,0 1 0,1-1-1,-1 1 1,1-1 0,-1 1 0,1-1-1,-1 1 1,1-1 0,-1 1 0,1 0-1,-1-1 1,1 1 0,0 0 0,-1 0-1,1-1 1,-1 1 0,1 0 0,0 0-1,-1 0 1,1 0 0,0 0 0,-1 0-1,1 0 1,26-2 153,-21 2-185,12 0 14,1 1 1,0 1-1,7 3 18,35 2-102,-53-7 262,-8-1 150,-1 2-322,0-1 1,0 0 0,0 1-1,0-1 1,0 0 0,0 1-1,0-1 1,1 1-1,-1-1 1,0 1 0,0 0-1,0-1 1,1 1 0,-1 0-1,0 0 1,0 0 11,-4 6-81,1 1 0,-1-1 0,1 1 0,1 0 0,0 0 0,-3 8 81,5-13-14,1-1-1,-1 1 1,1 0-1,0 0 1,-1-1-1,1 1 1,1 0-1,-1 0 1,0-1-1,1 1 0,-1 1 15,1-3-14,-1 0 0,1 1-1,0-1 1,-1 0-1,1 1 1,0-1-1,0 0 1,0 0-1,-1 0 1,2 0-1,-1 0 1,0 0-1,0 0 1,0 0-1,0 0 1,0 0-1,1-1 1,-1 1-1,0 0 1,1-1 0,0 1 14,1 0 35,-1-1 0,1 1 0,0-1 0,0 0 0,-1 1 0,1-1 0,0-1 1,0 1-1,0 0 0,-1-1 0,1 1 0,0-1 0,0 0 0,-1 0 0,1 0 1,-1 0-1,1 0 0,-1-1 0,1 1 0,-1-1 0,1 0-35,-1 1 32,-1-1 0,1 1 1,-1 0-1,0 0 0,1-1 0,-1 1 0,0-1 0,0 0 0,0 1 0,0-1 1,0 0-1,0 1 0,-1-1 0,1 0 0,-1 0 0,1 0 0,-1 0 0,1 1 0,-1-1 1,0 0-1,0 0 0,0 0 0,0 0 0,0 0 0,-1 0 0,1 0 0,-1 0 0,1 1 1,-1-1-1,1 0 0,-2-1-32,0-2 68,-1 0 0,-1 0 0,1 0 0,-1 1 1,-3-4-69,5 6-2,0 0 0,0 0 0,0 0 0,0 1 0,0-1 0,0 1 1,0-1-1,0 1 0,-1 0 0,1 0 0,-1 0 0,1 0 0,-1 1 0,0-1 2,2 1-5,0 0-1,-1 1 0,1-1 0,0 0 0,0 1 0,0-1 0,-1 1 0,1-1 0,0 1 0,0 0 0,0-1 0,0 1 0,0 0 0,0 0 0,0 0 0,1 0 0,-1 0 0,0 0 0,0 0 0,1 0 0,-1 0 0,1 0 0,-1 0 0,1 0 6,-2 2 170,-7 10 747</inkml:trace>
@@ -2081,8 +2081,8 @@
   <inkml:trace contextRef="#ctx0" brushRef="#br0" timeOffset="765.736">209 152 7040,'-2'0'169,"1"0"0,-1 1 0,0-1 0,0 1 0,0-1 0,0 1 0,1-1 1,-1 1-1,0 0 0,1 0 0,-1 0 0,0 0 0,1 0 0,0 0 0,-1 1 0,1-1 0,0 0 0,-1 1 1,1-1-1,0 1 0,0-1 0,0 1 0,0 0 0,0-1 0,1 1 0,-1 0 0,0 0-169,-2 7 9,-1 0 1,2 0-1,-1 1 0,0 8-9,3-17 21,-1 1-1,1-1 0,0 1 0,0-1 1,0 1-1,0-1 0,0 1 0,0-1 1,1 1-1,-1-1 0,0 0 1,1 1-1,-1-1 0,1 1 0,-1-1 1,1 0-1,0 1 0,0-1 0,-1 0 1,2 1-21,0 0 80,1 0 1,0 1-1,0-1 1,0-1 0,0 1-1,0 0 1,1 0-81,13 7-58,-17-9 65,1 0-1,-1 0 1,1 1-1,0-1 1,-1 0 0,1 1-1,-1-1 1,0 0-1,1 1 1,-1-1-1,1 0 1,-1 1-1,1-1 1,-1 1-1,0-1 1,1 1-1,-1-1 1,0 1 0,0-1-1,1 1 1,-1-1-1,0 1 1,0-1-1,0 1 1,0-1-1,0 1 1,1 0-1,-1-1 1,0 1-1,0-1 1,0 1 0,-1-1-1,1 1 1,0 0-1,0-1 1,0 1-1,0-1 1,0 1-1,-1-1 1,1 1-1,0-1 1,0 1 0,-1-1-1,1 1 1,-1-1-7,-2 3 44,0 0 1,0 0-1,-1 0 1,1-1-1,-1 1 1,-1-1-45,-13 11-1831,16-10-334</inkml:trace>
   <inkml:trace contextRef="#ctx0" brushRef="#br0" timeOffset="1142.046">294 198 5248,'-3'9'944,"1"0"0,0 0 0,0 0 0,1 0 0,0 1-944,1-6 162,0-1 0,0 1 0,0 0 0,0 0 0,1-1 0,-1 1 0,1 0 0,0 0 0,0-1 0,1 1 0,-1-1 0,1 1 0,1 2-162,-3-6 8,1 0 1,-1 1-1,0-1 0,0 0 0,1 1 0,-1-1 0,0 0 1,1 1-1,-1-1 0,1 0 0,-1 0 0,0 1 0,1-1 1,-1 0-1,1 0 0,-1 0 0,0 0 0,1 0 0,-1 1 1,1-1-1,-1 0 0,1 0 0,-1 0 0,1 0 0,-1 0 1,1 0-1,-1 0 0,0-1 0,1 1 0,0 0-8,0-1-2,1 1-1,-1-1 0,1 0 1,-1 0-1,0 0 0,1 0 0,-1 0 1,0 0-1,1-1 3,19-26-50,-2-11-298,-3 4-344,-13 34 502,-1 7 36,-1 11 54,0-14 155,1 15 663,2 0 0,3 12-718,-5-23-130,1 4-312</inkml:trace>
   <inkml:trace contextRef="#ctx0" brushRef="#br0" timeOffset="1498.002">454 247 6144,'4'7'2368,"-2"-4"-1941,-1-1-1,1 1 1,-1-1-1,0 1 1,0-1 0,0 1-1,0-1 1,0 1 0,-1 0-1,1 1-426,-2-6 216,0 0-1,0 0 0,0 0 1,1-1-1,-1 1 0,0 0 1,1-1-1,0 0-215,0-1-44,0 1 0,0 0 0,1 0 0,0-1 1,-1 1-1,1 0 0,1 0 0,-1 0 0,0 0 0,1 0 1,-1 0-1,1 0 0,0 1 0,0-1 0,0 0 0,0 1 0,1 0 1,0-1 43,5-3-656</inkml:trace>
-  <inkml:trace contextRef="#ctx0" brushRef="#br0" timeOffset="1875.179">584 258 7296,'1'0'327,"-1"1"0,1-1 1,0 1-1,-1-1 0,1 1 1,0-1-1,0 0 0,0 1 1,-1-1-1,1 0 0,0 0 1,0 1-1,0-1 0,0 0 1,-1 0-1,1 0 0,1 0-327,-1 0-31,0 0 0,0 0-1,1-1 1,-1 1 0,0 0-1,0-1 1,0 1 0,1-1-1,-1 1 1,0-1 0,0 1-1,0-1 1,0 0 0,0 1-1,0-1 1,0 0 0,0 0 0,-1 0-1,1 0 1,0 0 0,0 0-1,-1 0 1,1 0 0,-1 0-1,1 0 1,-1 0 0,1 0-1,-1-1 1,1 1 0,-1 0 0,0 0-1,0 0 1,0-1 0,0 1-1,0 0 1,0 0 31,0-3 62,-2-20 185,2 23-219,-1 0 1,1 0 0,0-1 0,0 1-1,-1 0 1,1 0 0,-1 0-1,1 0 1,-1-1 0,0 1-1,1 0 1,-1 0 0,0 0 0,0 0-1,1 1 1,-2-2-29,2 2-47,0 0 0,-1 0 0,1 0 0,-1 0 0,1 0 0,0 0 0,-1 0 0,1 0 0,-1 0-1,1 0 1,0 0 0,-1 0 0,1 1 0,-1-1 0,1 0 0,0 0 0,-1 0 0,1 1 0,0-1 0,-1 0 0,1 0 0,0 1 0,-1-1 0,1 0 0,0 0 0,-1 1 0,1-1 0,0 0 0,0 1 0,0-1-1,-1 0 1,1 1 0,0-1 0,0 1 47,-9 16-2060,7-13 1853,-1 2 581,0 0 0,1 0 0,-1 0 0,1 1 0,1-1 1,-1 1-1,1-1 0,0 4-374,1-8 47,-1 0 0,2 0 0,-1 0 1,0 0-1,0 0 0,0 0 1,1-1-1,-1 1 0,1 0 1,0 0-1,-1 0 0,1 0 0,0-1 1,0 1-1,0 0 0,0-1 1,1 1-1,-1-1 0,0 1 1,1-1-1,-1 0 0,1 1 1,-1-1-1,1 0 0,-1 0 0,1 0 1,0 0-1,0 0 0,-1-1 1,1 1-1,1 0-47,9 2-37</inkml:trace>
-  <inkml:trace contextRef="#ctx0" brushRef="#br0" timeOffset="2820.264">882 322 8064,'1'1'223,"0"0"1,0-1 0,0 1-1,0-1 1,0 1 0,0-1-1,1 1 1,-1-1 0,0 1 0,0-1-1,1 0 1,-1 0 0,0 0-1,0 0 1,1 0 0,-1 0-1,0 0 1,0 0 0,1 0-1,-1-1 1,0 1 0,0-1-224,1 1 72,0-1 0,-1 0 1,1 0-1,-1-1 0,0 1 1,1 0-1,-1 0 0,0-1 1,0 1-1,0-1 0,0 1 1,0-1-1,0 1 0,0-1-72,1-4-49,1 1-1,-1-1 0,0 0 0,-1 0 1,0 1-1,0-1 0,0 0 1,0-6 49,-3-7 48,0 0 0,-1 0 1,-1 0-1,-1 1 1,-1-1-1,-5-12-48,-7-23 1086,17 52-1030,1 0 0,-1 1 0,1-1 0,-1 0 0,1 0 0,0 0 0,0 0 0,0 0 0,0 0 0,0 0 1,0 0-1,0 0 0,1 1 0,-1-1 0,1 0 0,0 0 0,0-1-56,0 2-12,0 0-1,0 0 1,0 0-1,0-1 1,0 1 0,1 0-1,-1 1 1,0-1 0,1 0-1,-1 0 1,1 1-1,-1-1 1,0 0 0,1 1-1,0 0 1,-1-1-1,1 1 1,-1 0 0,1 0-1,-1 0 1,2 0 12,6-1-192,1 1 0,-1 0 0,1 1 0,-1 0 0,1 0 0,-1 1 0,1 0 0,-1 1 0,0 0 0,8 4 192,-3 0-853</inkml:trace>
+  <inkml:trace contextRef="#ctx0" brushRef="#br0" timeOffset="1875.178">584 258 7296,'1'0'327,"-1"1"0,1-1 1,0 1-1,-1-1 0,1 1 1,0-1-1,0 0 0,0 1 1,-1-1-1,1 0 0,0 0 1,0 1-1,0-1 0,0 0 1,-1 0-1,1 0 0,1 0-327,-1 0-31,0 0 0,0 0-1,1-1 1,-1 1 0,0 0-1,0-1 1,0 1 0,1-1-1,-1 1 1,0-1 0,0 1-1,0-1 1,0 0 0,0 1-1,0-1 1,0 0 0,0 0 0,-1 0-1,1 0 1,0 0 0,0 0-1,-1 0 1,1 0 0,-1 0-1,1 0 1,-1 0 0,1 0-1,-1-1 1,1 1 0,-1 0 0,0 0-1,0 0 1,0-1 0,0 1-1,0 0 1,0 0 31,0-3 62,-2-20 185,2 23-219,-1 0 1,1 0 0,0-1 0,0 1-1,-1 0 1,1 0 0,-1 0-1,1 0 1,-1-1 0,0 1-1,1 0 1,-1 0 0,0 0 0,0 0-1,1 1 1,-2-2-29,2 2-47,0 0 0,-1 0 0,1 0 0,-1 0 0,1 0 0,0 0 0,-1 0 0,1 0 0,-1 0-1,1 0 1,0 0 0,-1 0 0,1 1 0,-1-1 0,1 0 0,0 0 0,-1 0 0,1 1 0,0-1 0,-1 0 0,1 0 0,0 1 0,-1-1 0,1 0 0,0 0 0,-1 1 0,1-1 0,0 0 0,0 1 0,0-1-1,-1 0 1,1 1 0,0-1 0,0 1 47,-9 16-2060,7-13 1853,-1 2 581,0 0 0,1 0 0,-1 0 0,1 1 0,1-1 1,-1 1-1,1-1 0,0 4-374,1-8 47,-1 0 0,2 0 0,-1 0 1,0 0-1,0 0 0,0 0 1,1-1-1,-1 1 0,1 0 1,0 0-1,-1 0 0,1 0 0,0-1 1,0 1-1,0 0 0,0-1 1,1 1-1,-1-1 0,0 1 1,1-1-1,-1 0 0,1 1 1,-1-1-1,1 0 0,-1 0 0,1 0 1,0 0-1,0 0 0,-1-1 1,1 1-1,1 0-47,9 2-37</inkml:trace>
+  <inkml:trace contextRef="#ctx0" brushRef="#br0" timeOffset="2820.263">882 322 8064,'1'1'223,"0"0"1,0-1 0,0 1-1,0-1 1,0 1 0,0-1-1,1 1 1,-1-1 0,0 1 0,0-1-1,1 0 1,-1 0 0,0 0-1,0 0 1,1 0 0,-1 0-1,0 0 1,0 0 0,1 0-1,-1-1 1,0 1 0,0-1-224,1 1 72,0-1 0,-1 0 1,1 0-1,-1-1 0,0 1 1,1 0-1,-1 0 0,0-1 1,0 1-1,0-1 0,0 1 1,0-1-1,0 1 0,0-1-72,1-4-49,1 1-1,-1-1 0,0 0 0,-1 0 1,0 1-1,0-1 0,0 0 1,0-6 49,-3-7 48,0 0 0,-1 0 1,-1 0-1,-1 1 1,-1-1-1,-5-12-48,-7-23 1086,17 52-1030,1 0 0,-1 1 0,1-1 0,-1 0 0,1 0 0,0 0 0,0 0 0,0 0 0,0 0 0,0 0 1,0 0-1,0 0 0,1 1 0,-1-1 0,1 0 0,0 0 0,0-1-56,0 2-12,0 0-1,0 0 1,0 0-1,0-1 1,0 1 0,1 0-1,-1 1 1,0-1 0,1 0-1,-1 0 1,1 1-1,-1-1 1,0 0 0,1 1-1,0 0 1,-1-1-1,1 1 1,-1 0 0,1 0-1,-1 0 1,2 0 12,6-1-192,1 1 0,-1 0 0,1 1 0,-1 0 0,1 0 0,-1 1 0,1 0 0,-1 1 0,0 0 0,8 4 192,-3 0-853</inkml:trace>
   <inkml:trace contextRef="#ctx0" brushRef="#br0" timeOffset="3199.487">892 204 8960,'-4'-11'3328,"7"11"-2592,-2 3-64,3 0-128,0 1-576,2 0-32,3 3 96,4-1 96,2 0-32,3 1-256,0-3-160,-1 0-96,-1-2-64,-1-2-2784</inkml:trace>
   <inkml:trace contextRef="#ctx0" brushRef="#br0" timeOffset="3568.635">1094 221 7040,'-2'1'360,"0"-1"1,0 1 0,1 0-1,-1 0 1,0 0-1,0 1 1,0-1 0,1 0-1,-1 1 1,1-1-1,-1 1 1,0 1-361,-1 0 143,1 0 1,0 0-1,0 1 1,0-1-1,0 1 0,1-1 1,-1 4-144,1-6 10,0 1 1,0 0 0,1 0 0,-1 0-1,1 0 1,0 0 0,0 0 0,-1 0-1,1 0 1,0 0 0,0 0 0,1 0-1,-1 0 1,0 0 0,1 0 0,-1 0-1,1 0 1,0 0 0,0-1 0,-1 1-1,1 0 1,0 0 0,1-1-1,-1 1 1,0 0 0,0-1 0,1 1-1,-1-1 1,1 0 0,0 1-11,0-1 11,0 0 0,0-1 0,0 0 0,-1 1 0,1-1 0,0 0 0,0 0 0,0 0 1,0 0-1,0 0 0,-1-1 0,1 1 0,0 0 0,0-1 0,-1 0 0,1 1 0,0-1 0,0 0 0,-1 0 0,1 0 0,-1 0 0,1 0 0,-1 0-11,3-1 0,-1 0-1,-1 0 0,1-1 0,0 1 0,0-1 0,-1 0 1,0 1-1,1-1 0,-1 0 0,0 0 0,0-2 1,-1 2-5,0 0 0,-1-1 0,0 1 0,0 0 0,0 0 0,0 0 1,0 0-1,-1 0 0,1 0 0,-1 0 0,0 0 0,0 0 0,0 0 0,0 0 0,0 0 0,-1 1 0,1-1 0,-1 0 0,0 1 0,0-1 0,0 1 0,0 0 0,0-1 0,0 1 0,-1 0 0,1 1 0,-1-1 0,0 0 0,0 0 5,-4 0-538</inkml:trace>
   <inkml:trace contextRef="#ctx0" brushRef="#br0" timeOffset="3914.993">1213 222 7168,'2'5'4035,"4"10"-2679,-4-10-961,9 19-85,-7-17-261,-1 1 0,0-1 0,0 1 0,-1-1 0,2 8-49,-6-13 314,-1-6 56,-3-7 263,5 10-598,1-1 1,0 1-1,0 0 0,0 0 0,0 0 1,0 0-1,0 0 0,0 0 0,0-1 1,0 1-1,1 0 0,-1 0 0,0 0 0,1 0 1,-1 0-1,1 0 0,-1 0 0,1 0 1,-1 0-1,1 0 0,0 0 0,0 1 0,0-2-35,2-1-13,1 1-1,-1-1 0,1 1 0,-1-1 1,4 0 13,4-4-534,0-1-260</inkml:trace>
@@ -2146,7 +2146,7 @@
     </inkml:brush>
   </inkml:definitions>
   <inkml:trace contextRef="#ctx0" brushRef="#br0">143 193 4224,'1'-11'1571,"0"9"-1094,0-1 0,-1 0 0,0 0 0,1 0 0,-1 0 0,0 0-1,-1 0 1,1 0-477,0 3 38,0 0 0,0-1 0,0 1 0,0 0 0,-1-1 0,1 1 0,0 0 0,0-1 0,0 1 0,0 0 0,-1 0 0,1-1 0,0 1 0,0 0 0,-1 0 0,1 0 0,0-1 0,0 1 0,-1 0 0,1 0 0,0 0 0,-1 0 0,1 0 0,0-1 0,0 1 0,-1 0 0,1 0-38,-1 0-15,-1 0-1,1 0 0,0 1 0,0-1 1,0 0-1,0 0 0,-1 1 1,1-1-1,0 1 0,0-1 0,0 1 1,-1 0 15,-8 5-107,1 1 0,-1 0 1,1 0-1,-7 8 107,-4 3 117,18-17-68,1 1-1,-1-1 1,0 1-1,0-1 1,1 1-1,-1 0 0,1 0 1,0 0-1,-1-1 1,1 1-1,0 0 1,0 1-1,0 0-48,1-2 34,0 0-1,0 0 1,1 0-1,-1 0 1,0 0-1,0 0 1,1 0 0,-1 0-1,1 0 1,-1 0-1,1 0 1,-1 0-1,1 0 1,0 0 0,0 0-1,-1 0 1,1 0-1,0-1 1,0 1-1,0 0 1,0-1-1,0 1 1,0 0 0,0-1-1,0 0 1,0 1-1,0-1-33,4 3 55,0 1-1,0-1 0,-1 1 0,1 0 0,-1 0 1,0 0-1,0 0 0,-1 1 0,1-1 1,-1 1-55,-2-3 26,0-1 0,-1 0 0,1 1 0,-1-1 0,1 0 0,-1 1 0,1-1 1,-1 1-1,0-1 0,0 1 0,0-1 0,0 1 0,0-1 0,0 1 1,0-1-1,0 1 0,0 0-26,-1-1 34,0 1 0,0 0 1,1-1-1,-1 0 0,0 1 0,0-1 1,-1 0-1,1 1 0,0-1 0,0 0 1,0 0-1,-1 0 0,1 0 0,-1 0 1,1 0-1,-1 0 0,1-1 0,-1 1 1,1 0-35,-7 2-117,1 0 0,-1-1 1,0 1-1,0-2 1,0 1-1,0-1 1,-5 0 116,8-2-1760,4-2-688</inkml:trace>
-  <inkml:trace contextRef="#ctx0" brushRef="#br0" timeOffset="1320.784">204 238 4736,'0'0'155,"-1"0"0,0 0-1,1 0 1,-1 0 0,1-1 0,-1 1 0,1 0 0,-1 0 0,1 0-1,-1 0 1,0 0 0,1 1 0,-1-1 0,1 0 0,-1 0 0,1 0-1,-1 0 1,1 1 0,-1-1 0,1 0 0,-1 0 0,1 1 0,-1-1-1,1 1-154,-17 10-614,12-7 856,-1 0 33,0 0 0,0 1 1,1 0-1,0 0 0,-3 3-275,7-6 133,-1 0 1,0 0-1,1 0 0,0 0 1,-1 0-1,1 0 0,0 1 1,0-1-1,1 0 0,-1 1 0,0-1 1,1 1-1,-1-1 0,1 1 1,0-1-1,0 1 0,0 2-133,0-5 13,0 1 0,0 0-1,0-1 1,0 1 0,0 0 0,1-1-1,-1 1 1,0-1 0,0 1 0,1 0-1,-1-1 1,0 1 0,1-1-1,-1 1 1,0-1 0,1 1 0,-1-1-1,1 1 1,-1-1 0,1 1-1,-1-1 1,1 1 0,-1-1 0,1 0-1,0 1-12,0-1 41,0 0 0,0 0 0,0 0 0,0 0 0,0 0-1,1 0 1,-1 0 0,0 0 0,0 0 0,0 0 0,0-1-1,0 1 1,0-1 0,1 1-41,4-3 132,0-1-1,0 1 0,-1-1 1,5-3-132,-8 5-93,7-5 2,1-1 1,-2 0-1,1 0 0,-1 0 1,7-10 90,-15 49-118,0-28 199,0 0-1,0 0 1,0-1-1,1 1 1,-1 0-1,1 0 1,0 1-81,-1-4 9,0 0 0,0 0 1,0 0-1,0 1 0,1-1 1,-1 0-1,0 0 0,0 0 1,0 1-1,0-1 0,0 0 0,1 0 1,-1 0-1,0 0 0,0 0 1,0 0-1,1 1 0,-1-1 1,0 0-1,0 0 0,0 0 1,1 0-1,-1 0 0,0 0 1,0 0-1,1 0 0,-1 0 0,0 0 1,0 0-1,1 0-9,10-7 96,-1-4-334,-6 6 241,1 0 1,-1 1-1,1 0 1,0-1-1,0 2 1,1-1 0,0 0-4,-6 4-4,0 0 0,0 0 0,0 0 0,0 0 0,1 0 0,-1 0 0,0 0 1,0-1-1,0 1 0,0 0 0,0 0 0,1 0 0,-1 0 0,0 0 0,0 0 0,0 0 1,0 0-1,1 0 0,-1 0 0,0 0 0,0 0 0,0 0 0,0 0 0,0 0 0,1 1 1,-1-1-1,0 0 0,0 0 0,0 0 0,0 0 0,0 0 0,1 0 0,-1 0 0,0 0 1,0 0-1,0 1 0,0-1 0,0 0 4,0 7-84,-5 13-53,3-16 47,1 0 25,-4 17 486,5-21-375,-1 1 1,1 0-1,0 0 0,0 0 1,0 0-1,0 0 1,0 0-1,0 0 0,0 0 1,0 0-1,0-1 1,1 1-1,-1 0 0,0 0 1,0 0-1,1 0 0,-1 0 1,1-1-1,-1 1-46,1-1 13,-1 1 1,1-1-1,-1 0 0,1 0 0,-1 0 0,1 0 1,-1 0-1,1 0 0,-1 0 0,1 0 0,-1 0 1,1 0-1,-1 0 0,1 0 0,-1-1 0,1 1 1,-1 0-1,1 0 0,-1 0 0,1-1 0,-1 1 1,1 0-1,-1-1 0,0 1 0,1 0 0,-1-1 1,0 1-1,1-1-13,14-13-154,-11 11 45,18-21-365,-15 16 177,0 1 0,0-1 0,7-3 297,-14 11-2,0 0 0,0 0 0,0 0-1,0-1 1,0 1 0,0 0 0,0 0 0,1 0 0,-1 0 0,0 0 0,0 0 0,0 0 0,0 0 0,0 0 0,1 0 0,-1 0 0,0 0 0,0 0 0,0 0 0,0 0 0,0 0 0,1 0 0,-1 0 0,0 0 0,0 0 0,0 0 0,0 0 0,0 0 0,1 0 0,-1 0-1,0 0 1,0 0 0,0 0 0,0 0 0,0 0 0,0 0 0,1 0 0,-1 1 2,1 6 140,-2 14 403,0-14-343,1-4-189,0-1 65,0 1 0,-1-1 0,1 0 0,1 0 0,-1 0 0,0 0 0,1 1 0,-1-1-76,0-1 8,0-1 1,1 0 0,-1 0-1,0 0 1,0 0-1,0 1 1,0-1 0,0 0-1,0 0 1,1 0-1,-1 0 1,0 0-1,0 1 1,0-1 0,0 0-1,1 0 1,-1 0-1,0 0 1,0 0 0,0 0-1,1 0 1,-1 0-1,0 0 1,0 0 0,0 0-1,1 0 1,-1 0-1,0 0 1,0 0-1,0 0 1,1 0-9,9-6-69,5-7 22,-10 8-62,-1 1 1,1 0-1,-1 0 1,1 1-1,0-1 1,1 1-1,-1 0 0,1 1 1,-1-1 108,-4 3 4,-1 0-1,1 0 1,-1 0 0,0 0-1,1 1 1,-1-1-1,0 0 1,1 0 0,-1 0-1,0 0 1,0 0 0,1 1-1,-1-1 1,0 0 0,1 0-1,-1 1 1,0-1 0,0 0-1,1 0 1,-1 1-1,0-1 1,0 0 0,0 1-1,0-1 1,1 0 0,-1 1-1,0-1 1,0 0 0,0 1-1,0-1 1,0 0 0,0 1-1,0-1 1,0 1 0,0-1-1,0 0 1,0 1-1,0-1 1,0 0 0,0 1-4,-1 19 137,1-17-271,-1 3-82,0 6 87,1 0 0,0 0 1,0 1 128,2-4-480</inkml:trace>
+  <inkml:trace contextRef="#ctx0" brushRef="#br0" timeOffset="1320.783">204 238 4736,'0'0'155,"-1"0"0,0 0-1,1 0 1,-1 0 0,1-1 0,-1 1 0,1 0 0,-1 0 0,1 0-1,-1 0 1,0 0 0,1 1 0,-1-1 0,1 0 0,-1 0 0,1 0-1,-1 0 1,1 1 0,-1-1 0,1 0 0,-1 0 0,1 1 0,-1-1-1,1 1-154,-17 10-614,12-7 856,-1 0 33,0 0 0,0 1 1,1 0-1,0 0 0,-3 3-275,7-6 133,-1 0 1,0 0-1,1 0 0,0 0 1,-1 0-1,1 0 0,0 1 1,0-1-1,1 0 0,-1 1 0,0-1 1,1 1-1,-1-1 0,1 1 1,0-1-1,0 1 0,0 2-133,0-5 13,0 1 0,0 0-1,0-1 1,0 1 0,0 0 0,1-1-1,-1 1 1,0-1 0,0 1 0,1 0-1,-1-1 1,0 1 0,1-1-1,-1 1 1,0-1 0,1 1 0,-1-1-1,1 1 1,-1-1 0,1 1-1,-1-1 1,1 1 0,-1-1 0,1 0-1,0 1-12,0-1 41,0 0 0,0 0 0,0 0 0,0 0 0,0 0-1,1 0 1,-1 0 0,0 0 0,0 0 0,0 0 0,0-1-1,0 1 1,0-1 0,1 1-41,4-3 132,0-1-1,0 1 0,-1-1 1,5-3-132,-8 5-93,7-5 2,1-1 1,-2 0-1,1 0 0,-1 0 1,7-10 90,-15 49-118,0-28 199,0 0-1,0 0 1,0-1-1,1 1 1,-1 0-1,1 0 1,0 1-81,-1-4 9,0 0 0,0 0 1,0 0-1,0 1 0,1-1 1,-1 0-1,0 0 0,0 0 1,0 1-1,0-1 0,0 0 0,1 0 1,-1 0-1,0 0 0,0 0 1,0 0-1,1 1 0,-1-1 1,0 0-1,0 0 0,0 0 1,1 0-1,-1 0 0,0 0 1,0 0-1,1 0 0,-1 0 0,0 0 1,0 0-1,1 0-9,10-7 96,-1-4-334,-6 6 241,1 0 1,-1 1-1,1 0 1,0-1-1,0 2 1,1-1 0,0 0-4,-6 4-4,0 0 0,0 0 0,0 0 0,0 0 0,1 0 0,-1 0 0,0 0 1,0-1-1,0 1 0,0 0 0,0 0 0,1 0 0,-1 0 0,0 0 0,0 0 0,0 0 1,0 0-1,1 0 0,-1 0 0,0 0 0,0 0 0,0 0 0,0 0 0,0 0 0,1 1 1,-1-1-1,0 0 0,0 0 0,0 0 0,0 0 0,0 0 0,1 0 0,-1 0 0,0 0 1,0 0-1,0 1 0,0-1 0,0 0 4,0 7-84,-5 13-53,3-16 47,1 0 25,-4 17 486,5-21-375,-1 1 1,1 0-1,0 0 0,0 0 1,0 0-1,0 0 1,0 0-1,0 0 0,0 0 1,0 0-1,0-1 1,1 1-1,-1 0 0,0 0 1,0 0-1,1 0 0,-1 0 1,1-1-1,-1 1-46,1-1 13,-1 1 1,1-1-1,-1 0 0,1 0 0,-1 0 0,1 0 1,-1 0-1,1 0 0,-1 0 0,1 0 0,-1 0 1,1 0-1,-1 0 0,1 0 0,-1-1 0,1 1 1,-1 0-1,1 0 0,-1 0 0,1-1 0,-1 1 1,1 0-1,-1-1 0,0 1 0,1 0 0,-1-1 1,0 1-1,1-1-13,14-13-154,-11 11 45,18-21-365,-15 16 177,0 1 0,0-1 0,7-3 297,-14 11-2,0 0 0,0 0 0,0 0-1,0-1 1,0 1 0,0 0 0,0 0 0,1 0 0,-1 0 0,0 0 0,0 0 0,0 0 0,0 0 0,0 0 0,1 0 0,-1 0 0,0 0 0,0 0 0,0 0 0,0 0 0,0 0 0,1 0 0,-1 0 0,0 0 0,0 0 0,0 0 0,0 0 0,0 0 0,1 0 0,-1 0-1,0 0 1,0 0 0,0 0 0,0 0 0,0 0 0,0 0 0,1 0 0,-1 1 2,1 6 140,-2 14 403,0-14-343,1-4-189,0-1 65,0 1 0,-1-1 0,1 0 0,1 0 0,-1 0 0,0 0 0,1 1 0,-1-1-76,0-1 8,0-1 1,1 0 0,-1 0-1,0 0 1,0 0-1,0 1 1,0-1 0,0 0-1,0 0 1,1 0-1,-1 0 1,0 0-1,0 1 1,0-1 0,0 0-1,1 0 1,-1 0-1,0 0 1,0 0 0,0 0-1,1 0 1,-1 0-1,0 0 1,0 0 0,0 0-1,1 0 1,-1 0-1,0 0 1,0 0-1,0 0 1,1 0-9,9-6-69,5-7 22,-10 8-62,-1 1 1,1 0-1,-1 0 1,1 1-1,0-1 1,1 1-1,-1 0 0,1 1 1,-1-1 108,-4 3 4,-1 0-1,1 0 1,-1 0 0,0 0-1,1 1 1,-1-1-1,0 0 1,1 0 0,-1 0-1,0 0 1,0 0 0,1 1-1,-1-1 1,0 0 0,1 0-1,-1 1 1,0-1 0,0 0-1,1 0 1,-1 1-1,0-1 1,0 0 0,0 1-1,0-1 1,1 0 0,-1 1-1,0-1 1,0 0 0,0 1-1,0-1 1,0 0 0,0 1-1,0-1 1,0 1 0,0-1-1,0 0 1,0 1-1,0-1 1,0 0 0,0 1-4,-1 19 137,1-17-271,-1 3-82,0 6 87,1 0 0,0 0 1,0 1 128,2-4-480</inkml:trace>
   <inkml:trace contextRef="#ctx0" brushRef="#br0" timeOffset="1715.223">570 255 4608,'-2'20'6276,"-6"11"-4587,2-6-1233,-26 139-1608,34-174 475</inkml:trace>
   <inkml:trace contextRef="#ctx0" brushRef="#br0" timeOffset="2111.27">580 260 3968,'3'-1'301,"0"-1"1,0 1-1,0 0 0,0 0 1,0 1-1,0-1 0,0 1 1,0-1-1,0 1 0,0 0 1,0 0-1,1 0 1,-1 1-1,0-1 0,0 1 1,2 0-302,-3-1 147,0 1 1,0-1 0,0 1 0,0 0 0,-1 0 0,1 0-1,0 0 1,0 0 0,0 0 0,-1 0 0,1 0-1,-1 1 1,1-1 0,-1 1 0,1-1 0,-1 1-1,0-1 1,0 1 0,0 0 0,0 0 0,0 0 0,0 0-1,0-1 1,0 1 0,0 2-148,-1-1 108,0-1 0,-1 0 1,1 1-1,0-1 0,-1 1 0,1-1 0,-1 0 1,0 0-1,0 1 0,0-1 0,0 0 0,0 0 1,0 0-1,-1 0 0,1 0 0,0 0 1,-3 1-109,2 0-99,-1 0 0,0-1 1,1 1-1,-1-1 0,0 1 1,-1-1-1,1 0 1,0 0-1,-1-1 0,-2 2 99,1-3-1301,3-4-400</inkml:trace>
   <inkml:trace contextRef="#ctx0" brushRef="#br0" timeOffset="2503.412">814 10 4992,'1'-10'1694,"-1"14"-411,0 17-463,-5 5 318,0 0 0,-2-1 0,-1 0 0,-7 14-1138,-5 19 605,14-39-474,1-8-107,2 0-1,0 0 1,0 1-1,1-1 1,0 1-1,1 0-23,1-11-6,0-1-1,0 0 1,0 1-1,0-1 1,0 1 0,0-1-1,0 1 1,0-1-1,0 0 1,0 1-1,0-1 1,0 1-1,1-1 1,-1 0 0,0 1-1,0-1 1,0 0-1,1 1 1,-1-1-1,0 0 1,0 1-1,1-1 1,-1 0 0,1 1 6,3-1-272</inkml:trace>
@@ -8086,8 +8086,8 @@
           </a:p>
         </p:txBody>
       </p:sp>
-      <mc:AlternateContent xmlns:mc="http://schemas.openxmlformats.org/markup-compatibility/2006">
-        <mc:Choice xmlns:p14="http://schemas.microsoft.com/office/powerpoint/2010/main" Requires="p14">
+      <mc:AlternateContent xmlns:mc="http://schemas.openxmlformats.org/markup-compatibility/2006" xmlns:p14="http://schemas.microsoft.com/office/powerpoint/2010/main">
+        <mc:Choice Requires="p14">
           <p:contentPart p14:bwMode="auto" r:id="rId4">
             <p14:nvContentPartPr>
               <p14:cNvPr id="95" name="Ink 94">
@@ -8106,7 +8106,7 @@
             </p14:xfrm>
           </p:contentPart>
         </mc:Choice>
-        <mc:Fallback>
+        <mc:Fallback xmlns="">
           <p:pic>
             <p:nvPicPr>
               <p:cNvPr id="95" name="Ink 94">
@@ -8137,8 +8137,8 @@
           </p:pic>
         </mc:Fallback>
       </mc:AlternateContent>
-      <mc:AlternateContent xmlns:mc="http://schemas.openxmlformats.org/markup-compatibility/2006">
-        <mc:Choice xmlns:p14="http://schemas.microsoft.com/office/powerpoint/2010/main" Requires="p14">
+      <mc:AlternateContent xmlns:mc="http://schemas.openxmlformats.org/markup-compatibility/2006" xmlns:p14="http://schemas.microsoft.com/office/powerpoint/2010/main">
+        <mc:Choice Requires="p14">
           <p:contentPart p14:bwMode="auto" r:id="rId6">
             <p14:nvContentPartPr>
               <p14:cNvPr id="115" name="Ink 114">
@@ -8157,7 +8157,7 @@
             </p14:xfrm>
           </p:contentPart>
         </mc:Choice>
-        <mc:Fallback>
+        <mc:Fallback xmlns="">
           <p:pic>
             <p:nvPicPr>
               <p:cNvPr id="115" name="Ink 114">
@@ -8188,8 +8188,8 @@
           </p:pic>
         </mc:Fallback>
       </mc:AlternateContent>
-      <mc:AlternateContent xmlns:mc="http://schemas.openxmlformats.org/markup-compatibility/2006">
-        <mc:Choice xmlns:p14="http://schemas.microsoft.com/office/powerpoint/2010/main" Requires="p14">
+      <mc:AlternateContent xmlns:mc="http://schemas.openxmlformats.org/markup-compatibility/2006" xmlns:p14="http://schemas.microsoft.com/office/powerpoint/2010/main">
+        <mc:Choice Requires="p14">
           <p:contentPart p14:bwMode="auto" r:id="rId8">
             <p14:nvContentPartPr>
               <p14:cNvPr id="145" name="Ink 144">
@@ -8208,7 +8208,7 @@
             </p14:xfrm>
           </p:contentPart>
         </mc:Choice>
-        <mc:Fallback>
+        <mc:Fallback xmlns="">
           <p:pic>
             <p:nvPicPr>
               <p:cNvPr id="145" name="Ink 144">
@@ -8239,8 +8239,8 @@
           </p:pic>
         </mc:Fallback>
       </mc:AlternateContent>
-      <mc:AlternateContent xmlns:mc="http://schemas.openxmlformats.org/markup-compatibility/2006">
-        <mc:Choice xmlns:p14="http://schemas.microsoft.com/office/powerpoint/2010/main" Requires="p14">
+      <mc:AlternateContent xmlns:mc="http://schemas.openxmlformats.org/markup-compatibility/2006" xmlns:p14="http://schemas.microsoft.com/office/powerpoint/2010/main">
+        <mc:Choice Requires="p14">
           <p:contentPart p14:bwMode="auto" r:id="rId10">
             <p14:nvContentPartPr>
               <p14:cNvPr id="166" name="Ink 165">
@@ -8259,7 +8259,7 @@
             </p14:xfrm>
           </p:contentPart>
         </mc:Choice>
-        <mc:Fallback>
+        <mc:Fallback xmlns="">
           <p:pic>
             <p:nvPicPr>
               <p:cNvPr id="166" name="Ink 165">
@@ -8290,8 +8290,8 @@
           </p:pic>
         </mc:Fallback>
       </mc:AlternateContent>
-      <mc:AlternateContent xmlns:mc="http://schemas.openxmlformats.org/markup-compatibility/2006">
-        <mc:Choice xmlns:p14="http://schemas.microsoft.com/office/powerpoint/2010/main" Requires="p14">
+      <mc:AlternateContent xmlns:mc="http://schemas.openxmlformats.org/markup-compatibility/2006" xmlns:p14="http://schemas.microsoft.com/office/powerpoint/2010/main">
+        <mc:Choice Requires="p14">
           <p:contentPart p14:bwMode="auto" r:id="rId12">
             <p14:nvContentPartPr>
               <p14:cNvPr id="170" name="Ink 169">
@@ -8310,7 +8310,7 @@
             </p14:xfrm>
           </p:contentPart>
         </mc:Choice>
-        <mc:Fallback>
+        <mc:Fallback xmlns="">
           <p:pic>
             <p:nvPicPr>
               <p:cNvPr id="170" name="Ink 169">
@@ -8341,8 +8341,8 @@
           </p:pic>
         </mc:Fallback>
       </mc:AlternateContent>
-      <mc:AlternateContent xmlns:mc="http://schemas.openxmlformats.org/markup-compatibility/2006">
-        <mc:Choice xmlns:p14="http://schemas.microsoft.com/office/powerpoint/2010/main" Requires="p14">
+      <mc:AlternateContent xmlns:mc="http://schemas.openxmlformats.org/markup-compatibility/2006" xmlns:p14="http://schemas.microsoft.com/office/powerpoint/2010/main">
+        <mc:Choice Requires="p14">
           <p:contentPart p14:bwMode="auto" r:id="rId14">
             <p14:nvContentPartPr>
               <p14:cNvPr id="182" name="Ink 181">
@@ -8361,7 +8361,7 @@
             </p14:xfrm>
           </p:contentPart>
         </mc:Choice>
-        <mc:Fallback>
+        <mc:Fallback xmlns="">
           <p:pic>
             <p:nvPicPr>
               <p:cNvPr id="182" name="Ink 181">
@@ -8392,8 +8392,8 @@
           </p:pic>
         </mc:Fallback>
       </mc:AlternateContent>
-      <mc:AlternateContent xmlns:mc="http://schemas.openxmlformats.org/markup-compatibility/2006">
-        <mc:Choice xmlns:p14="http://schemas.microsoft.com/office/powerpoint/2010/main" Requires="p14">
+      <mc:AlternateContent xmlns:mc="http://schemas.openxmlformats.org/markup-compatibility/2006" xmlns:p14="http://schemas.microsoft.com/office/powerpoint/2010/main">
+        <mc:Choice Requires="p14">
           <p:contentPart p14:bwMode="auto" r:id="rId16">
             <p14:nvContentPartPr>
               <p14:cNvPr id="193" name="Ink 192">
@@ -8412,7 +8412,7 @@
             </p14:xfrm>
           </p:contentPart>
         </mc:Choice>
-        <mc:Fallback>
+        <mc:Fallback xmlns="">
           <p:pic>
             <p:nvPicPr>
               <p:cNvPr id="193" name="Ink 192">
@@ -8443,8 +8443,8 @@
           </p:pic>
         </mc:Fallback>
       </mc:AlternateContent>
-      <mc:AlternateContent xmlns:mc="http://schemas.openxmlformats.org/markup-compatibility/2006">
-        <mc:Choice xmlns:p14="http://schemas.microsoft.com/office/powerpoint/2010/main" Requires="p14">
+      <mc:AlternateContent xmlns:mc="http://schemas.openxmlformats.org/markup-compatibility/2006" xmlns:p14="http://schemas.microsoft.com/office/powerpoint/2010/main">
+        <mc:Choice Requires="p14">
           <p:contentPart p14:bwMode="auto" r:id="rId18">
             <p14:nvContentPartPr>
               <p14:cNvPr id="199" name="Ink 198">
@@ -8463,7 +8463,7 @@
             </p14:xfrm>
           </p:contentPart>
         </mc:Choice>
-        <mc:Fallback>
+        <mc:Fallback xmlns="">
           <p:pic>
             <p:nvPicPr>
               <p:cNvPr id="199" name="Ink 198">
@@ -8494,8 +8494,8 @@
           </p:pic>
         </mc:Fallback>
       </mc:AlternateContent>
-      <mc:AlternateContent xmlns:mc="http://schemas.openxmlformats.org/markup-compatibility/2006">
-        <mc:Choice xmlns:p14="http://schemas.microsoft.com/office/powerpoint/2010/main" Requires="p14">
+      <mc:AlternateContent xmlns:mc="http://schemas.openxmlformats.org/markup-compatibility/2006" xmlns:p14="http://schemas.microsoft.com/office/powerpoint/2010/main">
+        <mc:Choice Requires="p14">
           <p:contentPart p14:bwMode="auto" r:id="rId20">
             <p14:nvContentPartPr>
               <p14:cNvPr id="207" name="Ink 206">
@@ -8514,7 +8514,7 @@
             </p14:xfrm>
           </p:contentPart>
         </mc:Choice>
-        <mc:Fallback>
+        <mc:Fallback xmlns="">
           <p:pic>
             <p:nvPicPr>
               <p:cNvPr id="207" name="Ink 206">
@@ -8545,8 +8545,8 @@
           </p:pic>
         </mc:Fallback>
       </mc:AlternateContent>
-      <mc:AlternateContent xmlns:mc="http://schemas.openxmlformats.org/markup-compatibility/2006">
-        <mc:Choice xmlns:p14="http://schemas.microsoft.com/office/powerpoint/2010/main" Requires="p14">
+      <mc:AlternateContent xmlns:mc="http://schemas.openxmlformats.org/markup-compatibility/2006" xmlns:p14="http://schemas.microsoft.com/office/powerpoint/2010/main">
+        <mc:Choice Requires="p14">
           <p:contentPart p14:bwMode="auto" r:id="rId22">
             <p14:nvContentPartPr>
               <p14:cNvPr id="208" name="Ink 207">
@@ -8565,7 +8565,7 @@
             </p14:xfrm>
           </p:contentPart>
         </mc:Choice>
-        <mc:Fallback>
+        <mc:Fallback xmlns="">
           <p:pic>
             <p:nvPicPr>
               <p:cNvPr id="208" name="Ink 207">
@@ -8596,8 +8596,8 @@
           </p:pic>
         </mc:Fallback>
       </mc:AlternateContent>
-      <mc:AlternateContent xmlns:mc="http://schemas.openxmlformats.org/markup-compatibility/2006">
-        <mc:Choice xmlns:p14="http://schemas.microsoft.com/office/powerpoint/2010/main" Requires="p14">
+      <mc:AlternateContent xmlns:mc="http://schemas.openxmlformats.org/markup-compatibility/2006" xmlns:p14="http://schemas.microsoft.com/office/powerpoint/2010/main">
+        <mc:Choice Requires="p14">
           <p:contentPart p14:bwMode="auto" r:id="rId24">
             <p14:nvContentPartPr>
               <p14:cNvPr id="209" name="Ink 208">
@@ -8616,7 +8616,7 @@
             </p14:xfrm>
           </p:contentPart>
         </mc:Choice>
-        <mc:Fallback>
+        <mc:Fallback xmlns="">
           <p:pic>
             <p:nvPicPr>
               <p:cNvPr id="209" name="Ink 208">
@@ -8647,8 +8647,8 @@
           </p:pic>
         </mc:Fallback>
       </mc:AlternateContent>
-      <mc:AlternateContent xmlns:mc="http://schemas.openxmlformats.org/markup-compatibility/2006">
-        <mc:Choice xmlns:p14="http://schemas.microsoft.com/office/powerpoint/2010/main" Requires="p14">
+      <mc:AlternateContent xmlns:mc="http://schemas.openxmlformats.org/markup-compatibility/2006" xmlns:p14="http://schemas.microsoft.com/office/powerpoint/2010/main">
+        <mc:Choice Requires="p14">
           <p:contentPart p14:bwMode="auto" r:id="rId26">
             <p14:nvContentPartPr>
               <p14:cNvPr id="222" name="Ink 221">
@@ -8667,7 +8667,7 @@
             </p14:xfrm>
           </p:contentPart>
         </mc:Choice>
-        <mc:Fallback>
+        <mc:Fallback xmlns="">
           <p:pic>
             <p:nvPicPr>
               <p:cNvPr id="222" name="Ink 221">
@@ -8698,8 +8698,8 @@
           </p:pic>
         </mc:Fallback>
       </mc:AlternateContent>
-      <mc:AlternateContent xmlns:mc="http://schemas.openxmlformats.org/markup-compatibility/2006">
-        <mc:Choice xmlns:p14="http://schemas.microsoft.com/office/powerpoint/2010/main" Requires="p14">
+      <mc:AlternateContent xmlns:mc="http://schemas.openxmlformats.org/markup-compatibility/2006" xmlns:p14="http://schemas.microsoft.com/office/powerpoint/2010/main">
+        <mc:Choice Requires="p14">
           <p:contentPart p14:bwMode="auto" r:id="rId28">
             <p14:nvContentPartPr>
               <p14:cNvPr id="242" name="Ink 241">
@@ -8718,7 +8718,7 @@
             </p14:xfrm>
           </p:contentPart>
         </mc:Choice>
-        <mc:Fallback>
+        <mc:Fallback xmlns="">
           <p:pic>
             <p:nvPicPr>
               <p:cNvPr id="242" name="Ink 241">
@@ -8749,8 +8749,8 @@
           </p:pic>
         </mc:Fallback>
       </mc:AlternateContent>
-      <mc:AlternateContent xmlns:mc="http://schemas.openxmlformats.org/markup-compatibility/2006">
-        <mc:Choice xmlns:p14="http://schemas.microsoft.com/office/powerpoint/2010/main" Requires="p14">
+      <mc:AlternateContent xmlns:mc="http://schemas.openxmlformats.org/markup-compatibility/2006" xmlns:p14="http://schemas.microsoft.com/office/powerpoint/2010/main">
+        <mc:Choice Requires="p14">
           <p:contentPart p14:bwMode="auto" r:id="rId30">
             <p14:nvContentPartPr>
               <p14:cNvPr id="277" name="Ink 276">
@@ -8769,7 +8769,7 @@
             </p14:xfrm>
           </p:contentPart>
         </mc:Choice>
-        <mc:Fallback>
+        <mc:Fallback xmlns="">
           <p:pic>
             <p:nvPicPr>
               <p:cNvPr id="277" name="Ink 276">
@@ -8800,8 +8800,8 @@
           </p:pic>
         </mc:Fallback>
       </mc:AlternateContent>
-      <mc:AlternateContent xmlns:mc="http://schemas.openxmlformats.org/markup-compatibility/2006">
-        <mc:Choice xmlns:p14="http://schemas.microsoft.com/office/powerpoint/2010/main" Requires="p14">
+      <mc:AlternateContent xmlns:mc="http://schemas.openxmlformats.org/markup-compatibility/2006" xmlns:p14="http://schemas.microsoft.com/office/powerpoint/2010/main">
+        <mc:Choice Requires="p14">
           <p:contentPart p14:bwMode="auto" r:id="rId32">
             <p14:nvContentPartPr>
               <p14:cNvPr id="283" name="Ink 282">
@@ -8820,7 +8820,7 @@
             </p14:xfrm>
           </p:contentPart>
         </mc:Choice>
-        <mc:Fallback>
+        <mc:Fallback xmlns="">
           <p:pic>
             <p:nvPicPr>
               <p:cNvPr id="283" name="Ink 282">
@@ -8851,8 +8851,8 @@
           </p:pic>
         </mc:Fallback>
       </mc:AlternateContent>
-      <mc:AlternateContent xmlns:mc="http://schemas.openxmlformats.org/markup-compatibility/2006">
-        <mc:Choice xmlns:p14="http://schemas.microsoft.com/office/powerpoint/2010/main" Requires="p14">
+      <mc:AlternateContent xmlns:mc="http://schemas.openxmlformats.org/markup-compatibility/2006" xmlns:p14="http://schemas.microsoft.com/office/powerpoint/2010/main">
+        <mc:Choice Requires="p14">
           <p:contentPart p14:bwMode="auto" r:id="rId34">
             <p14:nvContentPartPr>
               <p14:cNvPr id="290" name="Ink 289">
@@ -8871,7 +8871,7 @@
             </p14:xfrm>
           </p:contentPart>
         </mc:Choice>
-        <mc:Fallback>
+        <mc:Fallback xmlns="">
           <p:pic>
             <p:nvPicPr>
               <p:cNvPr id="290" name="Ink 289">
@@ -8902,8 +8902,8 @@
           </p:pic>
         </mc:Fallback>
       </mc:AlternateContent>
-      <mc:AlternateContent xmlns:mc="http://schemas.openxmlformats.org/markup-compatibility/2006">
-        <mc:Choice xmlns:p14="http://schemas.microsoft.com/office/powerpoint/2010/main" Requires="p14">
+      <mc:AlternateContent xmlns:mc="http://schemas.openxmlformats.org/markup-compatibility/2006" xmlns:p14="http://schemas.microsoft.com/office/powerpoint/2010/main">
+        <mc:Choice Requires="p14">
           <p:contentPart p14:bwMode="auto" r:id="rId36">
             <p14:nvContentPartPr>
               <p14:cNvPr id="323" name="Ink 322">
@@ -8922,7 +8922,7 @@
             </p14:xfrm>
           </p:contentPart>
         </mc:Choice>
-        <mc:Fallback>
+        <mc:Fallback xmlns="">
           <p:pic>
             <p:nvPicPr>
               <p:cNvPr id="323" name="Ink 322">
@@ -8953,8 +8953,8 @@
           </p:pic>
         </mc:Fallback>
       </mc:AlternateContent>
-      <mc:AlternateContent xmlns:mc="http://schemas.openxmlformats.org/markup-compatibility/2006">
-        <mc:Choice xmlns:p14="http://schemas.microsoft.com/office/powerpoint/2010/main" Requires="p14">
+      <mc:AlternateContent xmlns:mc="http://schemas.openxmlformats.org/markup-compatibility/2006" xmlns:p14="http://schemas.microsoft.com/office/powerpoint/2010/main">
+        <mc:Choice Requires="p14">
           <p:contentPart p14:bwMode="auto" r:id="rId38">
             <p14:nvContentPartPr>
               <p14:cNvPr id="352" name="Ink 351">
@@ -8973,7 +8973,7 @@
             </p14:xfrm>
           </p:contentPart>
         </mc:Choice>
-        <mc:Fallback>
+        <mc:Fallback xmlns="">
           <p:pic>
             <p:nvPicPr>
               <p:cNvPr id="352" name="Ink 351">
@@ -9004,8 +9004,8 @@
           </p:pic>
         </mc:Fallback>
       </mc:AlternateContent>
-      <mc:AlternateContent xmlns:mc="http://schemas.openxmlformats.org/markup-compatibility/2006">
-        <mc:Choice xmlns:p14="http://schemas.microsoft.com/office/powerpoint/2010/main" Requires="p14">
+      <mc:AlternateContent xmlns:mc="http://schemas.openxmlformats.org/markup-compatibility/2006" xmlns:p14="http://schemas.microsoft.com/office/powerpoint/2010/main">
+        <mc:Choice Requires="p14">
           <p:contentPart p14:bwMode="auto" r:id="rId40">
             <p14:nvContentPartPr>
               <p14:cNvPr id="357" name="Ink 356">
@@ -9024,7 +9024,7 @@
             </p14:xfrm>
           </p:contentPart>
         </mc:Choice>
-        <mc:Fallback>
+        <mc:Fallback xmlns="">
           <p:pic>
             <p:nvPicPr>
               <p:cNvPr id="357" name="Ink 356">
@@ -9055,8 +9055,8 @@
           </p:pic>
         </mc:Fallback>
       </mc:AlternateContent>
-      <mc:AlternateContent xmlns:mc="http://schemas.openxmlformats.org/markup-compatibility/2006">
-        <mc:Choice xmlns:p14="http://schemas.microsoft.com/office/powerpoint/2010/main" Requires="p14">
+      <mc:AlternateContent xmlns:mc="http://schemas.openxmlformats.org/markup-compatibility/2006" xmlns:p14="http://schemas.microsoft.com/office/powerpoint/2010/main">
+        <mc:Choice Requires="p14">
           <p:contentPart p14:bwMode="auto" r:id="rId42">
             <p14:nvContentPartPr>
               <p14:cNvPr id="362" name="Ink 361">
@@ -9075,7 +9075,7 @@
             </p14:xfrm>
           </p:contentPart>
         </mc:Choice>
-        <mc:Fallback>
+        <mc:Fallback xmlns="">
           <p:pic>
             <p:nvPicPr>
               <p:cNvPr id="362" name="Ink 361">
@@ -9106,8 +9106,8 @@
           </p:pic>
         </mc:Fallback>
       </mc:AlternateContent>
-      <mc:AlternateContent xmlns:mc="http://schemas.openxmlformats.org/markup-compatibility/2006">
-        <mc:Choice xmlns:p14="http://schemas.microsoft.com/office/powerpoint/2010/main" Requires="p14">
+      <mc:AlternateContent xmlns:mc="http://schemas.openxmlformats.org/markup-compatibility/2006" xmlns:p14="http://schemas.microsoft.com/office/powerpoint/2010/main">
+        <mc:Choice Requires="p14">
           <p:contentPart p14:bwMode="auto" r:id="rId44">
             <p14:nvContentPartPr>
               <p14:cNvPr id="371" name="Ink 370">
@@ -9126,7 +9126,7 @@
             </p14:xfrm>
           </p:contentPart>
         </mc:Choice>
-        <mc:Fallback>
+        <mc:Fallback xmlns="">
           <p:pic>
             <p:nvPicPr>
               <p:cNvPr id="371" name="Ink 370">
@@ -9157,8 +9157,8 @@
           </p:pic>
         </mc:Fallback>
       </mc:AlternateContent>
-      <mc:AlternateContent xmlns:mc="http://schemas.openxmlformats.org/markup-compatibility/2006">
-        <mc:Choice xmlns:p14="http://schemas.microsoft.com/office/powerpoint/2010/main" Requires="p14">
+      <mc:AlternateContent xmlns:mc="http://schemas.openxmlformats.org/markup-compatibility/2006" xmlns:p14="http://schemas.microsoft.com/office/powerpoint/2010/main">
+        <mc:Choice Requires="p14">
           <p:contentPart p14:bwMode="auto" r:id="rId46">
             <p14:nvContentPartPr>
               <p14:cNvPr id="378" name="Ink 377">
@@ -9177,7 +9177,7 @@
             </p14:xfrm>
           </p:contentPart>
         </mc:Choice>
-        <mc:Fallback>
+        <mc:Fallback xmlns="">
           <p:pic>
             <p:nvPicPr>
               <p:cNvPr id="378" name="Ink 377">
@@ -9208,8 +9208,8 @@
           </p:pic>
         </mc:Fallback>
       </mc:AlternateContent>
-      <mc:AlternateContent xmlns:mc="http://schemas.openxmlformats.org/markup-compatibility/2006">
-        <mc:Choice xmlns:p14="http://schemas.microsoft.com/office/powerpoint/2010/main" Requires="p14">
+      <mc:AlternateContent xmlns:mc="http://schemas.openxmlformats.org/markup-compatibility/2006" xmlns:p14="http://schemas.microsoft.com/office/powerpoint/2010/main">
+        <mc:Choice Requires="p14">
           <p:contentPart p14:bwMode="auto" r:id="rId48">
             <p14:nvContentPartPr>
               <p14:cNvPr id="405" name="Ink 404">
@@ -9228,7 +9228,7 @@
             </p14:xfrm>
           </p:contentPart>
         </mc:Choice>
-        <mc:Fallback>
+        <mc:Fallback xmlns="">
           <p:pic>
             <p:nvPicPr>
               <p:cNvPr id="405" name="Ink 404">
@@ -9259,8 +9259,8 @@
           </p:pic>
         </mc:Fallback>
       </mc:AlternateContent>
-      <mc:AlternateContent xmlns:mc="http://schemas.openxmlformats.org/markup-compatibility/2006">
-        <mc:Choice xmlns:p14="http://schemas.microsoft.com/office/powerpoint/2010/main" Requires="p14">
+      <mc:AlternateContent xmlns:mc="http://schemas.openxmlformats.org/markup-compatibility/2006" xmlns:p14="http://schemas.microsoft.com/office/powerpoint/2010/main">
+        <mc:Choice Requires="p14">
           <p:contentPart p14:bwMode="auto" r:id="rId50">
             <p14:nvContentPartPr>
               <p14:cNvPr id="422" name="Ink 421">
@@ -9279,7 +9279,7 @@
             </p14:xfrm>
           </p:contentPart>
         </mc:Choice>
-        <mc:Fallback>
+        <mc:Fallback xmlns="">
           <p:pic>
             <p:nvPicPr>
               <p:cNvPr id="422" name="Ink 421">
@@ -9310,8 +9310,8 @@
           </p:pic>
         </mc:Fallback>
       </mc:AlternateContent>
-      <mc:AlternateContent xmlns:mc="http://schemas.openxmlformats.org/markup-compatibility/2006">
-        <mc:Choice xmlns:p14="http://schemas.microsoft.com/office/powerpoint/2010/main" Requires="p14">
+      <mc:AlternateContent xmlns:mc="http://schemas.openxmlformats.org/markup-compatibility/2006" xmlns:p14="http://schemas.microsoft.com/office/powerpoint/2010/main">
+        <mc:Choice Requires="p14">
           <p:contentPart p14:bwMode="auto" r:id="rId52">
             <p14:nvContentPartPr>
               <p14:cNvPr id="464" name="Ink 463">
@@ -9330,7 +9330,7 @@
             </p14:xfrm>
           </p:contentPart>
         </mc:Choice>
-        <mc:Fallback>
+        <mc:Fallback xmlns="">
           <p:pic>
             <p:nvPicPr>
               <p:cNvPr id="464" name="Ink 463">
@@ -9361,8 +9361,8 @@
           </p:pic>
         </mc:Fallback>
       </mc:AlternateContent>
-      <mc:AlternateContent xmlns:mc="http://schemas.openxmlformats.org/markup-compatibility/2006">
-        <mc:Choice xmlns:p14="http://schemas.microsoft.com/office/powerpoint/2010/main" Requires="p14">
+      <mc:AlternateContent xmlns:mc="http://schemas.openxmlformats.org/markup-compatibility/2006" xmlns:p14="http://schemas.microsoft.com/office/powerpoint/2010/main">
+        <mc:Choice Requires="p14">
           <p:contentPart p14:bwMode="auto" r:id="rId54">
             <p14:nvContentPartPr>
               <p14:cNvPr id="469" name="Ink 468">
@@ -9381,7 +9381,7 @@
             </p14:xfrm>
           </p:contentPart>
         </mc:Choice>
-        <mc:Fallback>
+        <mc:Fallback xmlns="">
           <p:pic>
             <p:nvPicPr>
               <p:cNvPr id="469" name="Ink 468">
@@ -9412,8 +9412,8 @@
           </p:pic>
         </mc:Fallback>
       </mc:AlternateContent>
-      <mc:AlternateContent xmlns:mc="http://schemas.openxmlformats.org/markup-compatibility/2006">
-        <mc:Choice xmlns:p14="http://schemas.microsoft.com/office/powerpoint/2010/main" Requires="p14">
+      <mc:AlternateContent xmlns:mc="http://schemas.openxmlformats.org/markup-compatibility/2006" xmlns:p14="http://schemas.microsoft.com/office/powerpoint/2010/main">
+        <mc:Choice Requires="p14">
           <p:contentPart p14:bwMode="auto" r:id="rId56">
             <p14:nvContentPartPr>
               <p14:cNvPr id="473" name="Ink 472">
@@ -9432,7 +9432,7 @@
             </p14:xfrm>
           </p:contentPart>
         </mc:Choice>
-        <mc:Fallback>
+        <mc:Fallback xmlns="">
           <p:pic>
             <p:nvPicPr>
               <p:cNvPr id="473" name="Ink 472">
@@ -9463,8 +9463,8 @@
           </p:pic>
         </mc:Fallback>
       </mc:AlternateContent>
-      <mc:AlternateContent xmlns:mc="http://schemas.openxmlformats.org/markup-compatibility/2006">
-        <mc:Choice xmlns:p14="http://schemas.microsoft.com/office/powerpoint/2010/main" Requires="p14">
+      <mc:AlternateContent xmlns:mc="http://schemas.openxmlformats.org/markup-compatibility/2006" xmlns:p14="http://schemas.microsoft.com/office/powerpoint/2010/main">
+        <mc:Choice Requires="p14">
           <p:contentPart p14:bwMode="auto" r:id="rId58">
             <p14:nvContentPartPr>
               <p14:cNvPr id="478" name="Ink 477">
@@ -9483,7 +9483,7 @@
             </p14:xfrm>
           </p:contentPart>
         </mc:Choice>
-        <mc:Fallback>
+        <mc:Fallback xmlns="">
           <p:pic>
             <p:nvPicPr>
               <p:cNvPr id="478" name="Ink 477">
@@ -9514,8 +9514,8 @@
           </p:pic>
         </mc:Fallback>
       </mc:AlternateContent>
-      <mc:AlternateContent xmlns:mc="http://schemas.openxmlformats.org/markup-compatibility/2006">
-        <mc:Choice xmlns:p14="http://schemas.microsoft.com/office/powerpoint/2010/main" Requires="p14">
+      <mc:AlternateContent xmlns:mc="http://schemas.openxmlformats.org/markup-compatibility/2006" xmlns:p14="http://schemas.microsoft.com/office/powerpoint/2010/main">
+        <mc:Choice Requires="p14">
           <p:contentPart p14:bwMode="auto" r:id="rId60">
             <p14:nvContentPartPr>
               <p14:cNvPr id="488" name="Ink 487">
@@ -9534,7 +9534,7 @@
             </p14:xfrm>
           </p:contentPart>
         </mc:Choice>
-        <mc:Fallback>
+        <mc:Fallback xmlns="">
           <p:pic>
             <p:nvPicPr>
               <p:cNvPr id="488" name="Ink 487">
@@ -9565,8 +9565,8 @@
           </p:pic>
         </mc:Fallback>
       </mc:AlternateContent>
-      <mc:AlternateContent xmlns:mc="http://schemas.openxmlformats.org/markup-compatibility/2006">
-        <mc:Choice xmlns:p14="http://schemas.microsoft.com/office/powerpoint/2010/main" Requires="p14">
+      <mc:AlternateContent xmlns:mc="http://schemas.openxmlformats.org/markup-compatibility/2006" xmlns:p14="http://schemas.microsoft.com/office/powerpoint/2010/main">
+        <mc:Choice Requires="p14">
           <p:contentPart p14:bwMode="auto" r:id="rId62">
             <p14:nvContentPartPr>
               <p14:cNvPr id="492" name="Ink 491">
@@ -9585,7 +9585,7 @@
             </p14:xfrm>
           </p:contentPart>
         </mc:Choice>
-        <mc:Fallback>
+        <mc:Fallback xmlns="">
           <p:pic>
             <p:nvPicPr>
               <p:cNvPr id="492" name="Ink 491">
@@ -9616,8 +9616,8 @@
           </p:pic>
         </mc:Fallback>
       </mc:AlternateContent>
-      <mc:AlternateContent xmlns:mc="http://schemas.openxmlformats.org/markup-compatibility/2006">
-        <mc:Choice xmlns:p14="http://schemas.microsoft.com/office/powerpoint/2010/main" Requires="p14">
+      <mc:AlternateContent xmlns:mc="http://schemas.openxmlformats.org/markup-compatibility/2006" xmlns:p14="http://schemas.microsoft.com/office/powerpoint/2010/main">
+        <mc:Choice Requires="p14">
           <p:contentPart p14:bwMode="auto" r:id="rId64">
             <p14:nvContentPartPr>
               <p14:cNvPr id="497" name="Ink 496">
@@ -9636,7 +9636,7 @@
             </p14:xfrm>
           </p:contentPart>
         </mc:Choice>
-        <mc:Fallback>
+        <mc:Fallback xmlns="">
           <p:pic>
             <p:nvPicPr>
               <p:cNvPr id="497" name="Ink 496">
@@ -9667,8 +9667,8 @@
           </p:pic>
         </mc:Fallback>
       </mc:AlternateContent>
-      <mc:AlternateContent xmlns:mc="http://schemas.openxmlformats.org/markup-compatibility/2006">
-        <mc:Choice xmlns:p14="http://schemas.microsoft.com/office/powerpoint/2010/main" Requires="p14">
+      <mc:AlternateContent xmlns:mc="http://schemas.openxmlformats.org/markup-compatibility/2006" xmlns:p14="http://schemas.microsoft.com/office/powerpoint/2010/main">
+        <mc:Choice Requires="p14">
           <p:contentPart p14:bwMode="auto" r:id="rId66">
             <p14:nvContentPartPr>
               <p14:cNvPr id="500" name="Ink 499">
@@ -9687,7 +9687,7 @@
             </p14:xfrm>
           </p:contentPart>
         </mc:Choice>
-        <mc:Fallback>
+        <mc:Fallback xmlns="">
           <p:pic>
             <p:nvPicPr>
               <p:cNvPr id="500" name="Ink 499">
@@ -9718,8 +9718,8 @@
           </p:pic>
         </mc:Fallback>
       </mc:AlternateContent>
-      <mc:AlternateContent xmlns:mc="http://schemas.openxmlformats.org/markup-compatibility/2006">
-        <mc:Choice xmlns:p14="http://schemas.microsoft.com/office/powerpoint/2010/main" Requires="p14">
+      <mc:AlternateContent xmlns:mc="http://schemas.openxmlformats.org/markup-compatibility/2006" xmlns:p14="http://schemas.microsoft.com/office/powerpoint/2010/main">
+        <mc:Choice Requires="p14">
           <p:contentPart p14:bwMode="auto" r:id="rId68">
             <p14:nvContentPartPr>
               <p14:cNvPr id="520" name="Ink 519">
@@ -9738,7 +9738,7 @@
             </p14:xfrm>
           </p:contentPart>
         </mc:Choice>
-        <mc:Fallback>
+        <mc:Fallback xmlns="">
           <p:pic>
             <p:nvPicPr>
               <p:cNvPr id="520" name="Ink 519">
@@ -9769,8 +9769,8 @@
           </p:pic>
         </mc:Fallback>
       </mc:AlternateContent>
-      <mc:AlternateContent xmlns:mc="http://schemas.openxmlformats.org/markup-compatibility/2006">
-        <mc:Choice xmlns:p14="http://schemas.microsoft.com/office/powerpoint/2010/main" Requires="p14">
+      <mc:AlternateContent xmlns:mc="http://schemas.openxmlformats.org/markup-compatibility/2006" xmlns:p14="http://schemas.microsoft.com/office/powerpoint/2010/main">
+        <mc:Choice Requires="p14">
           <p:contentPart p14:bwMode="auto" r:id="rId70">
             <p14:nvContentPartPr>
               <p14:cNvPr id="523" name="Ink 522">
@@ -9789,7 +9789,7 @@
             </p14:xfrm>
           </p:contentPart>
         </mc:Choice>
-        <mc:Fallback>
+        <mc:Fallback xmlns="">
           <p:pic>
             <p:nvPicPr>
               <p:cNvPr id="523" name="Ink 522">
@@ -9820,8 +9820,8 @@
           </p:pic>
         </mc:Fallback>
       </mc:AlternateContent>
-      <mc:AlternateContent xmlns:mc="http://schemas.openxmlformats.org/markup-compatibility/2006">
-        <mc:Choice xmlns:p14="http://schemas.microsoft.com/office/powerpoint/2010/main" Requires="p14">
+      <mc:AlternateContent xmlns:mc="http://schemas.openxmlformats.org/markup-compatibility/2006" xmlns:p14="http://schemas.microsoft.com/office/powerpoint/2010/main">
+        <mc:Choice Requires="p14">
           <p:contentPart p14:bwMode="auto" r:id="rId72">
             <p14:nvContentPartPr>
               <p14:cNvPr id="541" name="Ink 540">
@@ -9840,7 +9840,7 @@
             </p14:xfrm>
           </p:contentPart>
         </mc:Choice>
-        <mc:Fallback>
+        <mc:Fallback xmlns="">
           <p:pic>
             <p:nvPicPr>
               <p:cNvPr id="541" name="Ink 540">
@@ -9871,8 +9871,8 @@
           </p:pic>
         </mc:Fallback>
       </mc:AlternateContent>
-      <mc:AlternateContent xmlns:mc="http://schemas.openxmlformats.org/markup-compatibility/2006">
-        <mc:Choice xmlns:p14="http://schemas.microsoft.com/office/powerpoint/2010/main" Requires="p14">
+      <mc:AlternateContent xmlns:mc="http://schemas.openxmlformats.org/markup-compatibility/2006" xmlns:p14="http://schemas.microsoft.com/office/powerpoint/2010/main">
+        <mc:Choice Requires="p14">
           <p:contentPart p14:bwMode="auto" r:id="rId74">
             <p14:nvContentPartPr>
               <p14:cNvPr id="551" name="Ink 550">
@@ -9891,7 +9891,7 @@
             </p14:xfrm>
           </p:contentPart>
         </mc:Choice>
-        <mc:Fallback>
+        <mc:Fallback xmlns="">
           <p:pic>
             <p:nvPicPr>
               <p:cNvPr id="551" name="Ink 550">
@@ -9922,8 +9922,8 @@
           </p:pic>
         </mc:Fallback>
       </mc:AlternateContent>
-      <mc:AlternateContent xmlns:mc="http://schemas.openxmlformats.org/markup-compatibility/2006">
-        <mc:Choice xmlns:p14="http://schemas.microsoft.com/office/powerpoint/2010/main" Requires="p14">
+      <mc:AlternateContent xmlns:mc="http://schemas.openxmlformats.org/markup-compatibility/2006" xmlns:p14="http://schemas.microsoft.com/office/powerpoint/2010/main">
+        <mc:Choice Requires="p14">
           <p:contentPart p14:bwMode="auto" r:id="rId76">
             <p14:nvContentPartPr>
               <p14:cNvPr id="588" name="Ink 587">
@@ -9942,7 +9942,7 @@
             </p14:xfrm>
           </p:contentPart>
         </mc:Choice>
-        <mc:Fallback>
+        <mc:Fallback xmlns="">
           <p:pic>
             <p:nvPicPr>
               <p:cNvPr id="588" name="Ink 587">
@@ -9973,8 +9973,8 @@
           </p:pic>
         </mc:Fallback>
       </mc:AlternateContent>
-      <mc:AlternateContent xmlns:mc="http://schemas.openxmlformats.org/markup-compatibility/2006">
-        <mc:Choice xmlns:p14="http://schemas.microsoft.com/office/powerpoint/2010/main" Requires="p14">
+      <mc:AlternateContent xmlns:mc="http://schemas.openxmlformats.org/markup-compatibility/2006" xmlns:p14="http://schemas.microsoft.com/office/powerpoint/2010/main">
+        <mc:Choice Requires="p14">
           <p:contentPart p14:bwMode="auto" r:id="rId78">
             <p14:nvContentPartPr>
               <p14:cNvPr id="600" name="Ink 599">
@@ -9993,7 +9993,7 @@
             </p14:xfrm>
           </p:contentPart>
         </mc:Choice>
-        <mc:Fallback>
+        <mc:Fallback xmlns="">
           <p:pic>
             <p:nvPicPr>
               <p:cNvPr id="600" name="Ink 599">
@@ -10024,8 +10024,8 @@
           </p:pic>
         </mc:Fallback>
       </mc:AlternateContent>
-      <mc:AlternateContent xmlns:mc="http://schemas.openxmlformats.org/markup-compatibility/2006">
-        <mc:Choice xmlns:p14="http://schemas.microsoft.com/office/powerpoint/2010/main" Requires="p14">
+      <mc:AlternateContent xmlns:mc="http://schemas.openxmlformats.org/markup-compatibility/2006" xmlns:p14="http://schemas.microsoft.com/office/powerpoint/2010/main">
+        <mc:Choice Requires="p14">
           <p:contentPart p14:bwMode="auto" r:id="rId80">
             <p14:nvContentPartPr>
               <p14:cNvPr id="605" name="Ink 604">
@@ -10044,7 +10044,7 @@
             </p14:xfrm>
           </p:contentPart>
         </mc:Choice>
-        <mc:Fallback>
+        <mc:Fallback xmlns="">
           <p:pic>
             <p:nvPicPr>
               <p:cNvPr id="605" name="Ink 604">
@@ -10075,8 +10075,8 @@
           </p:pic>
         </mc:Fallback>
       </mc:AlternateContent>
-      <mc:AlternateContent xmlns:mc="http://schemas.openxmlformats.org/markup-compatibility/2006">
-        <mc:Choice xmlns:p14="http://schemas.microsoft.com/office/powerpoint/2010/main" Requires="p14">
+      <mc:AlternateContent xmlns:mc="http://schemas.openxmlformats.org/markup-compatibility/2006" xmlns:p14="http://schemas.microsoft.com/office/powerpoint/2010/main">
+        <mc:Choice Requires="p14">
           <p:contentPart p14:bwMode="auto" r:id="rId82">
             <p14:nvContentPartPr>
               <p14:cNvPr id="670" name="Ink 669">
@@ -10095,7 +10095,7 @@
             </p14:xfrm>
           </p:contentPart>
         </mc:Choice>
-        <mc:Fallback>
+        <mc:Fallback xmlns="">
           <p:pic>
             <p:nvPicPr>
               <p:cNvPr id="670" name="Ink 669">
@@ -10126,8 +10126,8 @@
           </p:pic>
         </mc:Fallback>
       </mc:AlternateContent>
-      <mc:AlternateContent xmlns:mc="http://schemas.openxmlformats.org/markup-compatibility/2006">
-        <mc:Choice xmlns:p14="http://schemas.microsoft.com/office/powerpoint/2010/main" Requires="p14">
+      <mc:AlternateContent xmlns:mc="http://schemas.openxmlformats.org/markup-compatibility/2006" xmlns:p14="http://schemas.microsoft.com/office/powerpoint/2010/main">
+        <mc:Choice Requires="p14">
           <p:contentPart p14:bwMode="auto" r:id="rId84">
             <p14:nvContentPartPr>
               <p14:cNvPr id="683" name="Ink 682">
@@ -10146,7 +10146,7 @@
             </p14:xfrm>
           </p:contentPart>
         </mc:Choice>
-        <mc:Fallback>
+        <mc:Fallback xmlns="">
           <p:pic>
             <p:nvPicPr>
               <p:cNvPr id="683" name="Ink 682">
@@ -10177,8 +10177,8 @@
           </p:pic>
         </mc:Fallback>
       </mc:AlternateContent>
-      <mc:AlternateContent xmlns:mc="http://schemas.openxmlformats.org/markup-compatibility/2006">
-        <mc:Choice xmlns:p14="http://schemas.microsoft.com/office/powerpoint/2010/main" Requires="p14">
+      <mc:AlternateContent xmlns:mc="http://schemas.openxmlformats.org/markup-compatibility/2006" xmlns:p14="http://schemas.microsoft.com/office/powerpoint/2010/main">
+        <mc:Choice Requires="p14">
           <p:contentPart p14:bwMode="auto" r:id="rId86">
             <p14:nvContentPartPr>
               <p14:cNvPr id="785" name="Ink 784">
@@ -10197,7 +10197,7 @@
             </p14:xfrm>
           </p:contentPart>
         </mc:Choice>
-        <mc:Fallback>
+        <mc:Fallback xmlns="">
           <p:pic>
             <p:nvPicPr>
               <p:cNvPr id="785" name="Ink 784">
@@ -10228,8 +10228,8 @@
           </p:pic>
         </mc:Fallback>
       </mc:AlternateContent>
-      <mc:AlternateContent xmlns:mc="http://schemas.openxmlformats.org/markup-compatibility/2006">
-        <mc:Choice xmlns:p14="http://schemas.microsoft.com/office/powerpoint/2010/main" Requires="p14">
+      <mc:AlternateContent xmlns:mc="http://schemas.openxmlformats.org/markup-compatibility/2006" xmlns:p14="http://schemas.microsoft.com/office/powerpoint/2010/main">
+        <mc:Choice Requires="p14">
           <p:contentPart p14:bwMode="auto" r:id="rId88">
             <p14:nvContentPartPr>
               <p14:cNvPr id="789" name="Ink 788">
@@ -10248,7 +10248,7 @@
             </p14:xfrm>
           </p:contentPart>
         </mc:Choice>
-        <mc:Fallback>
+        <mc:Fallback xmlns="">
           <p:pic>
             <p:nvPicPr>
               <p:cNvPr id="789" name="Ink 788">
@@ -10279,8 +10279,8 @@
           </p:pic>
         </mc:Fallback>
       </mc:AlternateContent>
-      <mc:AlternateContent xmlns:mc="http://schemas.openxmlformats.org/markup-compatibility/2006">
-        <mc:Choice xmlns:p14="http://schemas.microsoft.com/office/powerpoint/2010/main" Requires="p14">
+      <mc:AlternateContent xmlns:mc="http://schemas.openxmlformats.org/markup-compatibility/2006" xmlns:p14="http://schemas.microsoft.com/office/powerpoint/2010/main">
+        <mc:Choice Requires="p14">
           <p:contentPart p14:bwMode="auto" r:id="rId90">
             <p14:nvContentPartPr>
               <p14:cNvPr id="813" name="Ink 812">
@@ -10299,7 +10299,7 @@
             </p14:xfrm>
           </p:contentPart>
         </mc:Choice>
-        <mc:Fallback>
+        <mc:Fallback xmlns="">
           <p:pic>
             <p:nvPicPr>
               <p:cNvPr id="813" name="Ink 812">
@@ -10330,8 +10330,8 @@
           </p:pic>
         </mc:Fallback>
       </mc:AlternateContent>
-      <mc:AlternateContent xmlns:mc="http://schemas.openxmlformats.org/markup-compatibility/2006">
-        <mc:Choice xmlns:p14="http://schemas.microsoft.com/office/powerpoint/2010/main" Requires="p14">
+      <mc:AlternateContent xmlns:mc="http://schemas.openxmlformats.org/markup-compatibility/2006" xmlns:p14="http://schemas.microsoft.com/office/powerpoint/2010/main">
+        <mc:Choice Requires="p14">
           <p:contentPart p14:bwMode="auto" r:id="rId92">
             <p14:nvContentPartPr>
               <p14:cNvPr id="816" name="Ink 815">
@@ -10350,7 +10350,7 @@
             </p14:xfrm>
           </p:contentPart>
         </mc:Choice>
-        <mc:Fallback>
+        <mc:Fallback xmlns="">
           <p:pic>
             <p:nvPicPr>
               <p:cNvPr id="816" name="Ink 815">
@@ -10381,8 +10381,8 @@
           </p:pic>
         </mc:Fallback>
       </mc:AlternateContent>
-      <mc:AlternateContent xmlns:mc="http://schemas.openxmlformats.org/markup-compatibility/2006">
-        <mc:Choice xmlns:p14="http://schemas.microsoft.com/office/powerpoint/2010/main" Requires="p14">
+      <mc:AlternateContent xmlns:mc="http://schemas.openxmlformats.org/markup-compatibility/2006" xmlns:p14="http://schemas.microsoft.com/office/powerpoint/2010/main">
+        <mc:Choice Requires="p14">
           <p:contentPart p14:bwMode="auto" r:id="rId94">
             <p14:nvContentPartPr>
               <p14:cNvPr id="837" name="Ink 836">
@@ -10401,7 +10401,7 @@
             </p14:xfrm>
           </p:contentPart>
         </mc:Choice>
-        <mc:Fallback>
+        <mc:Fallback xmlns="">
           <p:pic>
             <p:nvPicPr>
               <p:cNvPr id="837" name="Ink 836">

</xml_diff>